<commit_message>
Added 1.1.21&1.1.23, updated 1.1.22
</commit_message>
<xml_diff>
--- a/volunteer/Drawings.pptx
+++ b/volunteer/Drawings.pptx
@@ -14,6 +14,7 @@
     <p:sldId id="262" r:id="rId8"/>
     <p:sldId id="263" r:id="rId9"/>
     <p:sldId id="264" r:id="rId10"/>
+    <p:sldId id="265" r:id="rId11"/>
   </p:sldIdLst>
   <p:sldSz cx="12192000" cy="6858000"/>
   <p:notesSz cx="6858000" cy="9144000"/>
@@ -267,7 +268,7 @@
           <a:p>
             <a:fld id="{F0249701-11FC-451D-B9AC-2A68C1C5D58E}" type="datetimeFigureOut">
               <a:rPr lang="en-US" smtClean="0"/>
-              <a:t>6/14/2024</a:t>
+              <a:t>6/15/2024</a:t>
             </a:fld>
             <a:endParaRPr lang="en-US"/>
           </a:p>
@@ -465,7 +466,7 @@
           <a:p>
             <a:fld id="{F0249701-11FC-451D-B9AC-2A68C1C5D58E}" type="datetimeFigureOut">
               <a:rPr lang="en-US" smtClean="0"/>
-              <a:t>6/14/2024</a:t>
+              <a:t>6/15/2024</a:t>
             </a:fld>
             <a:endParaRPr lang="en-US"/>
           </a:p>
@@ -673,7 +674,7 @@
           <a:p>
             <a:fld id="{F0249701-11FC-451D-B9AC-2A68C1C5D58E}" type="datetimeFigureOut">
               <a:rPr lang="en-US" smtClean="0"/>
-              <a:t>6/14/2024</a:t>
+              <a:t>6/15/2024</a:t>
             </a:fld>
             <a:endParaRPr lang="en-US"/>
           </a:p>
@@ -871,7 +872,7 @@
           <a:p>
             <a:fld id="{F0249701-11FC-451D-B9AC-2A68C1C5D58E}" type="datetimeFigureOut">
               <a:rPr lang="en-US" smtClean="0"/>
-              <a:t>6/14/2024</a:t>
+              <a:t>6/15/2024</a:t>
             </a:fld>
             <a:endParaRPr lang="en-US"/>
           </a:p>
@@ -1146,7 +1147,7 @@
           <a:p>
             <a:fld id="{F0249701-11FC-451D-B9AC-2A68C1C5D58E}" type="datetimeFigureOut">
               <a:rPr lang="en-US" smtClean="0"/>
-              <a:t>6/14/2024</a:t>
+              <a:t>6/15/2024</a:t>
             </a:fld>
             <a:endParaRPr lang="en-US"/>
           </a:p>
@@ -1411,7 +1412,7 @@
           <a:p>
             <a:fld id="{F0249701-11FC-451D-B9AC-2A68C1C5D58E}" type="datetimeFigureOut">
               <a:rPr lang="en-US" smtClean="0"/>
-              <a:t>6/14/2024</a:t>
+              <a:t>6/15/2024</a:t>
             </a:fld>
             <a:endParaRPr lang="en-US"/>
           </a:p>
@@ -1823,7 +1824,7 @@
           <a:p>
             <a:fld id="{F0249701-11FC-451D-B9AC-2A68C1C5D58E}" type="datetimeFigureOut">
               <a:rPr lang="en-US" smtClean="0"/>
-              <a:t>6/14/2024</a:t>
+              <a:t>6/15/2024</a:t>
             </a:fld>
             <a:endParaRPr lang="en-US"/>
           </a:p>
@@ -1964,7 +1965,7 @@
           <a:p>
             <a:fld id="{F0249701-11FC-451D-B9AC-2A68C1C5D58E}" type="datetimeFigureOut">
               <a:rPr lang="en-US" smtClean="0"/>
-              <a:t>6/14/2024</a:t>
+              <a:t>6/15/2024</a:t>
             </a:fld>
             <a:endParaRPr lang="en-US"/>
           </a:p>
@@ -2077,7 +2078,7 @@
           <a:p>
             <a:fld id="{F0249701-11FC-451D-B9AC-2A68C1C5D58E}" type="datetimeFigureOut">
               <a:rPr lang="en-US" smtClean="0"/>
-              <a:t>6/14/2024</a:t>
+              <a:t>6/15/2024</a:t>
             </a:fld>
             <a:endParaRPr lang="en-US"/>
           </a:p>
@@ -2388,7 +2389,7 @@
           <a:p>
             <a:fld id="{F0249701-11FC-451D-B9AC-2A68C1C5D58E}" type="datetimeFigureOut">
               <a:rPr lang="en-US" smtClean="0"/>
-              <a:t>6/14/2024</a:t>
+              <a:t>6/15/2024</a:t>
             </a:fld>
             <a:endParaRPr lang="en-US"/>
           </a:p>
@@ -2676,7 +2677,7 @@
           <a:p>
             <a:fld id="{F0249701-11FC-451D-B9AC-2A68C1C5D58E}" type="datetimeFigureOut">
               <a:rPr lang="en-US" smtClean="0"/>
-              <a:t>6/14/2024</a:t>
+              <a:t>6/15/2024</a:t>
             </a:fld>
             <a:endParaRPr lang="en-US"/>
           </a:p>
@@ -2917,7 +2918,7 @@
           <a:p>
             <a:fld id="{F0249701-11FC-451D-B9AC-2A68C1C5D58E}" type="datetimeFigureOut">
               <a:rPr lang="en-US" smtClean="0"/>
-              <a:t>6/14/2024</a:t>
+              <a:t>6/15/2024</a:t>
             </a:fld>
             <a:endParaRPr lang="en-US"/>
           </a:p>
@@ -3388,6 +3389,1940 @@
     <p:extLst>
       <p:ext uri="{BB962C8B-B14F-4D97-AF65-F5344CB8AC3E}">
         <p14:creationId xmlns:p14="http://schemas.microsoft.com/office/powerpoint/2010/main" val="2229426285"/>
+      </p:ext>
+    </p:extLst>
+  </p:cSld>
+  <p:clrMapOvr>
+    <a:masterClrMapping/>
+  </p:clrMapOvr>
+</p:sld>
+</file>
+
+<file path=ppt/slides/slide10.xml><?xml version="1.0" encoding="utf-8"?>
+<p:sld xmlns:a="http://schemas.openxmlformats.org/drawingml/2006/main" xmlns:r="http://schemas.openxmlformats.org/officeDocument/2006/relationships" xmlns:p="http://schemas.openxmlformats.org/presentationml/2006/main">
+  <p:cSld>
+    <p:spTree>
+      <p:nvGrpSpPr>
+        <p:cNvPr id="1" name=""/>
+        <p:cNvGrpSpPr/>
+        <p:nvPr/>
+      </p:nvGrpSpPr>
+      <p:grpSpPr>
+        <a:xfrm>
+          <a:off x="0" y="0"/>
+          <a:ext cx="0" cy="0"/>
+          <a:chOff x="0" y="0"/>
+          <a:chExt cx="0" cy="0"/>
+        </a:xfrm>
+      </p:grpSpPr>
+      <p:sp>
+        <p:nvSpPr>
+          <p:cNvPr id="45" name="Rectangle 44">
+            <a:extLst>
+              <a:ext uri="{FF2B5EF4-FFF2-40B4-BE49-F238E27FC236}">
+                <a16:creationId xmlns:a16="http://schemas.microsoft.com/office/drawing/2014/main" id="{17DEC270-B359-42C4-9AA5-1775D9C8798D}"/>
+              </a:ext>
+            </a:extLst>
+          </p:cNvPr>
+          <p:cNvSpPr/>
+          <p:nvPr/>
+        </p:nvSpPr>
+        <p:spPr>
+          <a:xfrm rot="9162768">
+            <a:off x="7576628" y="3904162"/>
+            <a:ext cx="80097" cy="90933"/>
+          </a:xfrm>
+          <a:prstGeom prst="rect">
+            <a:avLst/>
+          </a:prstGeom>
+          <a:noFill/>
+          <a:ln w="15875">
+            <a:solidFill>
+              <a:schemeClr val="tx1"/>
+            </a:solidFill>
+          </a:ln>
+        </p:spPr>
+        <p:style>
+          <a:lnRef idx="2">
+            <a:schemeClr val="accent1">
+              <a:shade val="50000"/>
+            </a:schemeClr>
+          </a:lnRef>
+          <a:fillRef idx="1">
+            <a:schemeClr val="accent1"/>
+          </a:fillRef>
+          <a:effectRef idx="0">
+            <a:schemeClr val="accent1"/>
+          </a:effectRef>
+          <a:fontRef idx="minor">
+            <a:schemeClr val="lt1"/>
+          </a:fontRef>
+        </p:style>
+        <p:txBody>
+          <a:bodyPr rtlCol="0" anchor="ctr"/>
+          <a:lstStyle/>
+          <a:p>
+            <a:pPr algn="ctr"/>
+            <a:endParaRPr lang="en-US"/>
+          </a:p>
+        </p:txBody>
+      </p:sp>
+      <p:sp>
+        <p:nvSpPr>
+          <p:cNvPr id="2" name="Oval 1">
+            <a:extLst>
+              <a:ext uri="{FF2B5EF4-FFF2-40B4-BE49-F238E27FC236}">
+                <a16:creationId xmlns:a16="http://schemas.microsoft.com/office/drawing/2014/main" id="{F1BA3C44-3B61-4178-8868-673CB7A79C64}"/>
+              </a:ext>
+            </a:extLst>
+          </p:cNvPr>
+          <p:cNvSpPr/>
+          <p:nvPr/>
+        </p:nvSpPr>
+        <p:spPr>
+          <a:xfrm>
+            <a:off x="5296783" y="2444521"/>
+            <a:ext cx="3585030" cy="3388807"/>
+          </a:xfrm>
+          <a:prstGeom prst="ellipse">
+            <a:avLst/>
+          </a:prstGeom>
+          <a:noFill/>
+          <a:ln w="28575">
+            <a:solidFill>
+              <a:schemeClr val="tx1"/>
+            </a:solidFill>
+            <a:prstDash val="solid"/>
+            <a:extLst>
+              <a:ext uri="{C807C97D-BFC1-408E-A445-0C87EB9F89A2}">
+                <ask:lineSketchStyleProps xmlns:ask="http://schemas.microsoft.com/office/drawing/2018/sketchyshapes" sd="849061371">
+                  <a:custGeom>
+                    <a:avLst/>
+                    <a:gdLst>
+                      <a:gd name="connsiteX0" fmla="*/ 0 w 3585030"/>
+                      <a:gd name="connsiteY0" fmla="*/ 1694404 h 3388807"/>
+                      <a:gd name="connsiteX1" fmla="*/ 1792515 w 3585030"/>
+                      <a:gd name="connsiteY1" fmla="*/ 0 h 3388807"/>
+                      <a:gd name="connsiteX2" fmla="*/ 3585030 w 3585030"/>
+                      <a:gd name="connsiteY2" fmla="*/ 1694404 h 3388807"/>
+                      <a:gd name="connsiteX3" fmla="*/ 1792515 w 3585030"/>
+                      <a:gd name="connsiteY3" fmla="*/ 3388808 h 3388807"/>
+                      <a:gd name="connsiteX4" fmla="*/ 0 w 3585030"/>
+                      <a:gd name="connsiteY4" fmla="*/ 1694404 h 3388807"/>
+                    </a:gdLst>
+                    <a:ahLst/>
+                    <a:cxnLst>
+                      <a:cxn ang="0">
+                        <a:pos x="connsiteX0" y="connsiteY0"/>
+                      </a:cxn>
+                      <a:cxn ang="0">
+                        <a:pos x="connsiteX1" y="connsiteY1"/>
+                      </a:cxn>
+                      <a:cxn ang="0">
+                        <a:pos x="connsiteX2" y="connsiteY2"/>
+                      </a:cxn>
+                      <a:cxn ang="0">
+                        <a:pos x="connsiteX3" y="connsiteY3"/>
+                      </a:cxn>
+                      <a:cxn ang="0">
+                        <a:pos x="connsiteX4" y="connsiteY4"/>
+                      </a:cxn>
+                    </a:cxnLst>
+                    <a:rect l="l" t="t" r="r" b="b"/>
+                    <a:pathLst>
+                      <a:path w="3585030" h="3388807" extrusionOk="0">
+                        <a:moveTo>
+                          <a:pt x="0" y="1694404"/>
+                        </a:moveTo>
+                        <a:cubicBezTo>
+                          <a:pt x="-68063" y="624350"/>
+                          <a:pt x="874039" y="182532"/>
+                          <a:pt x="1792515" y="0"/>
+                        </a:cubicBezTo>
+                        <a:cubicBezTo>
+                          <a:pt x="2748785" y="-130006"/>
+                          <a:pt x="3502096" y="714073"/>
+                          <a:pt x="3585030" y="1694404"/>
+                        </a:cubicBezTo>
+                        <a:cubicBezTo>
+                          <a:pt x="3611624" y="2587939"/>
+                          <a:pt x="2766733" y="3215801"/>
+                          <a:pt x="1792515" y="3388808"/>
+                        </a:cubicBezTo>
+                        <a:cubicBezTo>
+                          <a:pt x="677699" y="3258506"/>
+                          <a:pt x="122954" y="2498957"/>
+                          <a:pt x="0" y="1694404"/>
+                        </a:cubicBezTo>
+                        <a:close/>
+                      </a:path>
+                    </a:pathLst>
+                  </a:custGeom>
+                  <ask:type>
+                    <ask:lineSketchNone/>
+                  </ask:type>
+                </ask:lineSketchStyleProps>
+              </a:ext>
+            </a:extLst>
+          </a:ln>
+        </p:spPr>
+        <p:style>
+          <a:lnRef idx="2">
+            <a:schemeClr val="accent1">
+              <a:shade val="50000"/>
+            </a:schemeClr>
+          </a:lnRef>
+          <a:fillRef idx="1">
+            <a:schemeClr val="accent1"/>
+          </a:fillRef>
+          <a:effectRef idx="0">
+            <a:schemeClr val="accent1"/>
+          </a:effectRef>
+          <a:fontRef idx="minor">
+            <a:schemeClr val="lt1"/>
+          </a:fontRef>
+        </p:style>
+        <p:txBody>
+          <a:bodyPr rtlCol="0" anchor="ctr"/>
+          <a:lstStyle/>
+          <a:p>
+            <a:pPr algn="ctr"/>
+            <a:endParaRPr lang="en-US"/>
+          </a:p>
+        </p:txBody>
+      </p:sp>
+      <p:sp>
+        <p:nvSpPr>
+          <p:cNvPr id="3" name="Oval 2">
+            <a:extLst>
+              <a:ext uri="{FF2B5EF4-FFF2-40B4-BE49-F238E27FC236}">
+                <a16:creationId xmlns:a16="http://schemas.microsoft.com/office/drawing/2014/main" id="{05C707A7-1043-4984-A007-6E49162E4272}"/>
+              </a:ext>
+            </a:extLst>
+          </p:cNvPr>
+          <p:cNvSpPr/>
+          <p:nvPr/>
+        </p:nvSpPr>
+        <p:spPr>
+          <a:xfrm>
+            <a:off x="6313920" y="3206375"/>
+            <a:ext cx="1839687" cy="1738994"/>
+          </a:xfrm>
+          <a:prstGeom prst="ellipse">
+            <a:avLst/>
+          </a:prstGeom>
+          <a:noFill/>
+          <a:ln w="28575">
+            <a:solidFill>
+              <a:schemeClr val="tx1"/>
+            </a:solidFill>
+            <a:prstDash val="solid"/>
+            <a:extLst>
+              <a:ext uri="{C807C97D-BFC1-408E-A445-0C87EB9F89A2}">
+                <ask:lineSketchStyleProps xmlns:ask="http://schemas.microsoft.com/office/drawing/2018/sketchyshapes" sd="4172447036">
+                  <a:custGeom>
+                    <a:avLst/>
+                    <a:gdLst>
+                      <a:gd name="connsiteX0" fmla="*/ 0 w 1839687"/>
+                      <a:gd name="connsiteY0" fmla="*/ 869497 h 1738994"/>
+                      <a:gd name="connsiteX1" fmla="*/ 919844 w 1839687"/>
+                      <a:gd name="connsiteY1" fmla="*/ 0 h 1738994"/>
+                      <a:gd name="connsiteX2" fmla="*/ 1839688 w 1839687"/>
+                      <a:gd name="connsiteY2" fmla="*/ 869497 h 1738994"/>
+                      <a:gd name="connsiteX3" fmla="*/ 919844 w 1839687"/>
+                      <a:gd name="connsiteY3" fmla="*/ 1738994 h 1738994"/>
+                      <a:gd name="connsiteX4" fmla="*/ 0 w 1839687"/>
+                      <a:gd name="connsiteY4" fmla="*/ 869497 h 1738994"/>
+                    </a:gdLst>
+                    <a:ahLst/>
+                    <a:cxnLst>
+                      <a:cxn ang="0">
+                        <a:pos x="connsiteX0" y="connsiteY0"/>
+                      </a:cxn>
+                      <a:cxn ang="0">
+                        <a:pos x="connsiteX1" y="connsiteY1"/>
+                      </a:cxn>
+                      <a:cxn ang="0">
+                        <a:pos x="connsiteX2" y="connsiteY2"/>
+                      </a:cxn>
+                      <a:cxn ang="0">
+                        <a:pos x="connsiteX3" y="connsiteY3"/>
+                      </a:cxn>
+                      <a:cxn ang="0">
+                        <a:pos x="connsiteX4" y="connsiteY4"/>
+                      </a:cxn>
+                    </a:cxnLst>
+                    <a:rect l="l" t="t" r="r" b="b"/>
+                    <a:pathLst>
+                      <a:path w="1839687" h="1738994" extrusionOk="0">
+                        <a:moveTo>
+                          <a:pt x="0" y="869497"/>
+                        </a:moveTo>
+                        <a:cubicBezTo>
+                          <a:pt x="-8602" y="372553"/>
+                          <a:pt x="370886" y="43826"/>
+                          <a:pt x="919844" y="0"/>
+                        </a:cubicBezTo>
+                        <a:cubicBezTo>
+                          <a:pt x="1482617" y="32966"/>
+                          <a:pt x="1825013" y="361436"/>
+                          <a:pt x="1839688" y="869497"/>
+                        </a:cubicBezTo>
+                        <a:cubicBezTo>
+                          <a:pt x="1816452" y="1344825"/>
+                          <a:pt x="1438269" y="1655612"/>
+                          <a:pt x="919844" y="1738994"/>
+                        </a:cubicBezTo>
+                        <a:cubicBezTo>
+                          <a:pt x="380257" y="1695479"/>
+                          <a:pt x="32684" y="1304960"/>
+                          <a:pt x="0" y="869497"/>
+                        </a:cubicBezTo>
+                        <a:close/>
+                      </a:path>
+                    </a:pathLst>
+                  </a:custGeom>
+                  <ask:type>
+                    <ask:lineSketchNone/>
+                  </ask:type>
+                </ask:lineSketchStyleProps>
+              </a:ext>
+            </a:extLst>
+          </a:ln>
+        </p:spPr>
+        <p:style>
+          <a:lnRef idx="2">
+            <a:schemeClr val="accent1">
+              <a:shade val="50000"/>
+            </a:schemeClr>
+          </a:lnRef>
+          <a:fillRef idx="1">
+            <a:schemeClr val="accent1"/>
+          </a:fillRef>
+          <a:effectRef idx="0">
+            <a:schemeClr val="accent1"/>
+          </a:effectRef>
+          <a:fontRef idx="minor">
+            <a:schemeClr val="lt1"/>
+          </a:fontRef>
+        </p:style>
+        <p:txBody>
+          <a:bodyPr rtlCol="0" anchor="ctr"/>
+          <a:lstStyle/>
+          <a:p>
+            <a:pPr algn="ctr"/>
+            <a:endParaRPr lang="en-US"/>
+          </a:p>
+        </p:txBody>
+      </p:sp>
+      <p:sp>
+        <p:nvSpPr>
+          <p:cNvPr id="4" name="Oval 3">
+            <a:extLst>
+              <a:ext uri="{FF2B5EF4-FFF2-40B4-BE49-F238E27FC236}">
+                <a16:creationId xmlns:a16="http://schemas.microsoft.com/office/drawing/2014/main" id="{BE6C6D2D-5516-41EE-8D2A-9779E6E2D454}"/>
+              </a:ext>
+            </a:extLst>
+          </p:cNvPr>
+          <p:cNvSpPr/>
+          <p:nvPr/>
+        </p:nvSpPr>
+        <p:spPr>
+          <a:xfrm>
+            <a:off x="7098024" y="4076700"/>
+            <a:ext cx="112402" cy="116281"/>
+          </a:xfrm>
+          <a:prstGeom prst="ellipse">
+            <a:avLst/>
+          </a:prstGeom>
+          <a:solidFill>
+            <a:schemeClr val="tx1"/>
+          </a:solidFill>
+          <a:ln>
+            <a:noFill/>
+          </a:ln>
+        </p:spPr>
+        <p:style>
+          <a:lnRef idx="2">
+            <a:schemeClr val="accent1">
+              <a:shade val="50000"/>
+            </a:schemeClr>
+          </a:lnRef>
+          <a:fillRef idx="1">
+            <a:schemeClr val="accent1"/>
+          </a:fillRef>
+          <a:effectRef idx="0">
+            <a:schemeClr val="accent1"/>
+          </a:effectRef>
+          <a:fontRef idx="minor">
+            <a:schemeClr val="lt1"/>
+          </a:fontRef>
+        </p:style>
+        <p:txBody>
+          <a:bodyPr rtlCol="0" anchor="ctr"/>
+          <a:lstStyle/>
+          <a:p>
+            <a:pPr algn="ctr"/>
+            <a:endParaRPr lang="en-US"/>
+          </a:p>
+        </p:txBody>
+      </p:sp>
+      <p:cxnSp>
+        <p:nvCxnSpPr>
+          <p:cNvPr id="6" name="Straight Connector 5">
+            <a:extLst>
+              <a:ext uri="{FF2B5EF4-FFF2-40B4-BE49-F238E27FC236}">
+                <a16:creationId xmlns:a16="http://schemas.microsoft.com/office/drawing/2014/main" id="{4B16AEC1-508F-4F49-8631-1E11FC9F7CFF}"/>
+              </a:ext>
+            </a:extLst>
+          </p:cNvPr>
+          <p:cNvCxnSpPr>
+            <a:cxnSpLocks/>
+            <a:endCxn id="2" idx="5"/>
+          </p:cNvCxnSpPr>
+          <p:nvPr/>
+        </p:nvCxnSpPr>
+        <p:spPr>
+          <a:xfrm>
+            <a:off x="6921991" y="2444521"/>
+            <a:ext cx="1434807" cy="2892528"/>
+          </a:xfrm>
+          <a:prstGeom prst="line">
+            <a:avLst/>
+          </a:prstGeom>
+          <a:ln w="28575">
+            <a:solidFill>
+              <a:srgbClr val="00B050"/>
+            </a:solidFill>
+          </a:ln>
+        </p:spPr>
+        <p:style>
+          <a:lnRef idx="1">
+            <a:schemeClr val="accent1"/>
+          </a:lnRef>
+          <a:fillRef idx="0">
+            <a:schemeClr val="accent1"/>
+          </a:fillRef>
+          <a:effectRef idx="0">
+            <a:schemeClr val="accent1"/>
+          </a:effectRef>
+          <a:fontRef idx="minor">
+            <a:schemeClr val="tx1"/>
+          </a:fontRef>
+        </p:style>
+      </p:cxnSp>
+      <p:cxnSp>
+        <p:nvCxnSpPr>
+          <p:cNvPr id="8" name="Straight Connector 7">
+            <a:extLst>
+              <a:ext uri="{FF2B5EF4-FFF2-40B4-BE49-F238E27FC236}">
+                <a16:creationId xmlns:a16="http://schemas.microsoft.com/office/drawing/2014/main" id="{684063E3-1998-4F78-BBA6-5C5A5F39CBC7}"/>
+              </a:ext>
+            </a:extLst>
+          </p:cNvPr>
+          <p:cNvCxnSpPr>
+            <a:cxnSpLocks/>
+            <a:endCxn id="4" idx="1"/>
+          </p:cNvCxnSpPr>
+          <p:nvPr/>
+        </p:nvCxnSpPr>
+        <p:spPr>
+          <a:xfrm>
+            <a:off x="6907967" y="2466728"/>
+            <a:ext cx="206518" cy="1627001"/>
+          </a:xfrm>
+          <a:prstGeom prst="line">
+            <a:avLst/>
+          </a:prstGeom>
+          <a:ln w="22225">
+            <a:solidFill>
+              <a:srgbClr val="0070C0"/>
+            </a:solidFill>
+            <a:prstDash val="dash"/>
+          </a:ln>
+        </p:spPr>
+        <p:style>
+          <a:lnRef idx="1">
+            <a:schemeClr val="accent1"/>
+          </a:lnRef>
+          <a:fillRef idx="0">
+            <a:schemeClr val="accent1"/>
+          </a:fillRef>
+          <a:effectRef idx="0">
+            <a:schemeClr val="accent1"/>
+          </a:effectRef>
+          <a:fontRef idx="minor">
+            <a:schemeClr val="tx1"/>
+          </a:fontRef>
+        </p:style>
+      </p:cxnSp>
+      <p:cxnSp>
+        <p:nvCxnSpPr>
+          <p:cNvPr id="11" name="Straight Connector 10">
+            <a:extLst>
+              <a:ext uri="{FF2B5EF4-FFF2-40B4-BE49-F238E27FC236}">
+                <a16:creationId xmlns:a16="http://schemas.microsoft.com/office/drawing/2014/main" id="{A78DC7FF-4E86-4ED6-BB68-350B4BD13456}"/>
+              </a:ext>
+            </a:extLst>
+          </p:cNvPr>
+          <p:cNvCxnSpPr>
+            <a:cxnSpLocks/>
+            <a:stCxn id="4" idx="5"/>
+            <a:endCxn id="2" idx="5"/>
+          </p:cNvCxnSpPr>
+          <p:nvPr/>
+        </p:nvCxnSpPr>
+        <p:spPr>
+          <a:xfrm>
+            <a:off x="7193965" y="4175952"/>
+            <a:ext cx="1162833" cy="1161097"/>
+          </a:xfrm>
+          <a:prstGeom prst="line">
+            <a:avLst/>
+          </a:prstGeom>
+          <a:ln w="22225">
+            <a:solidFill>
+              <a:srgbClr val="0070C0"/>
+            </a:solidFill>
+            <a:prstDash val="dash"/>
+          </a:ln>
+        </p:spPr>
+        <p:style>
+          <a:lnRef idx="1">
+            <a:schemeClr val="accent1"/>
+          </a:lnRef>
+          <a:fillRef idx="0">
+            <a:schemeClr val="accent1"/>
+          </a:fillRef>
+          <a:effectRef idx="0">
+            <a:schemeClr val="accent1"/>
+          </a:effectRef>
+          <a:fontRef idx="minor">
+            <a:schemeClr val="tx1"/>
+          </a:fontRef>
+        </p:style>
+      </p:cxnSp>
+      <p:cxnSp>
+        <p:nvCxnSpPr>
+          <p:cNvPr id="18" name="Straight Connector 17">
+            <a:extLst>
+              <a:ext uri="{FF2B5EF4-FFF2-40B4-BE49-F238E27FC236}">
+                <a16:creationId xmlns:a16="http://schemas.microsoft.com/office/drawing/2014/main" id="{5DF6D174-E2D2-4094-8044-9273A3C1D84F}"/>
+              </a:ext>
+            </a:extLst>
+          </p:cNvPr>
+          <p:cNvCxnSpPr>
+            <a:cxnSpLocks/>
+            <a:stCxn id="4" idx="6"/>
+          </p:cNvCxnSpPr>
+          <p:nvPr/>
+        </p:nvCxnSpPr>
+        <p:spPr>
+          <a:xfrm>
+            <a:off x="7210426" y="4134841"/>
+            <a:ext cx="745791" cy="444126"/>
+          </a:xfrm>
+          <a:prstGeom prst="line">
+            <a:avLst/>
+          </a:prstGeom>
+          <a:ln w="19050">
+            <a:solidFill>
+              <a:srgbClr val="FF0000"/>
+            </a:solidFill>
+            <a:prstDash val="dash"/>
+          </a:ln>
+        </p:spPr>
+        <p:style>
+          <a:lnRef idx="1">
+            <a:schemeClr val="accent1"/>
+          </a:lnRef>
+          <a:fillRef idx="0">
+            <a:schemeClr val="accent1"/>
+          </a:fillRef>
+          <a:effectRef idx="0">
+            <a:schemeClr val="accent1"/>
+          </a:effectRef>
+          <a:fontRef idx="minor">
+            <a:schemeClr val="tx1"/>
+          </a:fontRef>
+        </p:style>
+      </p:cxnSp>
+      <p:cxnSp>
+        <p:nvCxnSpPr>
+          <p:cNvPr id="21" name="Straight Connector 20">
+            <a:extLst>
+              <a:ext uri="{FF2B5EF4-FFF2-40B4-BE49-F238E27FC236}">
+                <a16:creationId xmlns:a16="http://schemas.microsoft.com/office/drawing/2014/main" id="{044E7354-6755-4D81-A8A4-727658BE3B87}"/>
+              </a:ext>
+            </a:extLst>
+          </p:cNvPr>
+          <p:cNvCxnSpPr>
+            <a:cxnSpLocks/>
+            <a:stCxn id="4" idx="0"/>
+          </p:cNvCxnSpPr>
+          <p:nvPr/>
+        </p:nvCxnSpPr>
+        <p:spPr>
+          <a:xfrm flipV="1">
+            <a:off x="7154225" y="3228582"/>
+            <a:ext cx="134095" cy="848118"/>
+          </a:xfrm>
+          <a:prstGeom prst="line">
+            <a:avLst/>
+          </a:prstGeom>
+          <a:ln w="19050">
+            <a:solidFill>
+              <a:srgbClr val="FF0000"/>
+            </a:solidFill>
+            <a:prstDash val="dash"/>
+          </a:ln>
+        </p:spPr>
+        <p:style>
+          <a:lnRef idx="1">
+            <a:schemeClr val="accent1"/>
+          </a:lnRef>
+          <a:fillRef idx="0">
+            <a:schemeClr val="accent1"/>
+          </a:fillRef>
+          <a:effectRef idx="0">
+            <a:schemeClr val="accent1"/>
+          </a:effectRef>
+          <a:fontRef idx="minor">
+            <a:schemeClr val="tx1"/>
+          </a:fontRef>
+        </p:style>
+      </p:cxnSp>
+      <mc:AlternateContent xmlns:mc="http://schemas.openxmlformats.org/markup-compatibility/2006">
+        <mc:Choice xmlns:a14="http://schemas.microsoft.com/office/drawing/2010/main" Requires="a14">
+          <p:sp>
+            <p:nvSpPr>
+              <p:cNvPr id="41" name="TextBox 40">
+                <a:extLst>
+                  <a:ext uri="{FF2B5EF4-FFF2-40B4-BE49-F238E27FC236}">
+                    <a16:creationId xmlns:a16="http://schemas.microsoft.com/office/drawing/2014/main" id="{6BE59969-A403-42E1-8C90-851613952648}"/>
+                  </a:ext>
+                </a:extLst>
+              </p:cNvPr>
+              <p:cNvSpPr txBox="1"/>
+              <p:nvPr/>
+            </p:nvSpPr>
+            <p:spPr>
+              <a:xfrm>
+                <a:off x="6726541" y="2929376"/>
+                <a:ext cx="207108" cy="276999"/>
+              </a:xfrm>
+              <a:prstGeom prst="rect">
+                <a:avLst/>
+              </a:prstGeom>
+              <a:noFill/>
+            </p:spPr>
+            <p:txBody>
+              <a:bodyPr wrap="none" lIns="0" tIns="0" rIns="0" bIns="0" rtlCol="0">
+                <a:spAutoFit/>
+              </a:bodyPr>
+              <a:lstStyle/>
+              <a:p>
+                <a14:m>
+                  <m:oMathPara xmlns:m="http://schemas.openxmlformats.org/officeDocument/2006/math">
+                    <m:oMathParaPr>
+                      <m:jc m:val="centerGroup"/>
+                    </m:oMathParaPr>
+                    <m:oMath xmlns:m="http://schemas.openxmlformats.org/officeDocument/2006/math">
+                      <m:r>
+                        <a:rPr lang="en-US" b="0" i="1" smtClean="0">
+                          <a:solidFill>
+                            <a:srgbClr val="0070C0"/>
+                          </a:solidFill>
+                          <a:latin typeface="Cambria Math" panose="02040503050406030204" pitchFamily="18" charset="0"/>
+                        </a:rPr>
+                        <m:t>𝑅</m:t>
+                      </m:r>
+                    </m:oMath>
+                  </m:oMathPara>
+                </a14:m>
+                <a:endParaRPr lang="en-US" dirty="0">
+                  <a:solidFill>
+                    <a:srgbClr val="0070C0"/>
+                  </a:solidFill>
+                </a:endParaRPr>
+              </a:p>
+            </p:txBody>
+          </p:sp>
+        </mc:Choice>
+        <mc:Fallback>
+          <p:sp>
+            <p:nvSpPr>
+              <p:cNvPr id="41" name="TextBox 40">
+                <a:extLst>
+                  <a:ext uri="{FF2B5EF4-FFF2-40B4-BE49-F238E27FC236}">
+                    <a16:creationId xmlns:a16="http://schemas.microsoft.com/office/drawing/2014/main" id="{6BE59969-A403-42E1-8C90-851613952648}"/>
+                  </a:ext>
+                </a:extLst>
+              </p:cNvPr>
+              <p:cNvSpPr txBox="1">
+                <a:spLocks noRot="1" noChangeAspect="1" noMove="1" noResize="1" noEditPoints="1" noAdjustHandles="1" noChangeArrowheads="1" noChangeShapeType="1" noTextEdit="1"/>
+              </p:cNvSpPr>
+              <p:nvPr/>
+            </p:nvSpPr>
+            <p:spPr>
+              <a:xfrm>
+                <a:off x="6726541" y="2929376"/>
+                <a:ext cx="207108" cy="276999"/>
+              </a:xfrm>
+              <a:prstGeom prst="rect">
+                <a:avLst/>
+              </a:prstGeom>
+              <a:blipFill>
+                <a:blip r:embed="rId2"/>
+                <a:stretch>
+                  <a:fillRect l="-26471" r="-23529" b="-6667"/>
+                </a:stretch>
+              </a:blipFill>
+            </p:spPr>
+            <p:txBody>
+              <a:bodyPr/>
+              <a:lstStyle/>
+              <a:p>
+                <a:r>
+                  <a:rPr lang="en-US">
+                    <a:noFill/>
+                  </a:rPr>
+                  <a:t> </a:t>
+                </a:r>
+              </a:p>
+            </p:txBody>
+          </p:sp>
+        </mc:Fallback>
+      </mc:AlternateContent>
+      <mc:AlternateContent xmlns:mc="http://schemas.openxmlformats.org/markup-compatibility/2006">
+        <mc:Choice xmlns:a14="http://schemas.microsoft.com/office/drawing/2010/main" Requires="a14">
+          <p:sp>
+            <p:nvSpPr>
+              <p:cNvPr id="42" name="TextBox 41">
+                <a:extLst>
+                  <a:ext uri="{FF2B5EF4-FFF2-40B4-BE49-F238E27FC236}">
+                    <a16:creationId xmlns:a16="http://schemas.microsoft.com/office/drawing/2014/main" id="{770F2028-8065-4EB2-B949-E30F1A0A6AB7}"/>
+                  </a:ext>
+                </a:extLst>
+              </p:cNvPr>
+              <p:cNvSpPr txBox="1"/>
+              <p:nvPr/>
+            </p:nvSpPr>
+            <p:spPr>
+              <a:xfrm>
+                <a:off x="7697891" y="4945369"/>
+                <a:ext cx="207108" cy="276999"/>
+              </a:xfrm>
+              <a:prstGeom prst="rect">
+                <a:avLst/>
+              </a:prstGeom>
+              <a:noFill/>
+            </p:spPr>
+            <p:txBody>
+              <a:bodyPr wrap="none" lIns="0" tIns="0" rIns="0" bIns="0" rtlCol="0">
+                <a:spAutoFit/>
+              </a:bodyPr>
+              <a:lstStyle/>
+              <a:p>
+                <a14:m>
+                  <m:oMathPara xmlns:m="http://schemas.openxmlformats.org/officeDocument/2006/math">
+                    <m:oMathParaPr>
+                      <m:jc m:val="centerGroup"/>
+                    </m:oMathParaPr>
+                    <m:oMath xmlns:m="http://schemas.openxmlformats.org/officeDocument/2006/math">
+                      <m:r>
+                        <a:rPr lang="en-US" b="0" i="1" smtClean="0">
+                          <a:solidFill>
+                            <a:srgbClr val="0070C0"/>
+                          </a:solidFill>
+                          <a:latin typeface="Cambria Math" panose="02040503050406030204" pitchFamily="18" charset="0"/>
+                        </a:rPr>
+                        <m:t>𝑅</m:t>
+                      </m:r>
+                    </m:oMath>
+                  </m:oMathPara>
+                </a14:m>
+                <a:endParaRPr lang="en-US" dirty="0">
+                  <a:solidFill>
+                    <a:srgbClr val="0070C0"/>
+                  </a:solidFill>
+                </a:endParaRPr>
+              </a:p>
+            </p:txBody>
+          </p:sp>
+        </mc:Choice>
+        <mc:Fallback>
+          <p:sp>
+            <p:nvSpPr>
+              <p:cNvPr id="42" name="TextBox 41">
+                <a:extLst>
+                  <a:ext uri="{FF2B5EF4-FFF2-40B4-BE49-F238E27FC236}">
+                    <a16:creationId xmlns:a16="http://schemas.microsoft.com/office/drawing/2014/main" id="{770F2028-8065-4EB2-B949-E30F1A0A6AB7}"/>
+                  </a:ext>
+                </a:extLst>
+              </p:cNvPr>
+              <p:cNvSpPr txBox="1">
+                <a:spLocks noRot="1" noChangeAspect="1" noMove="1" noResize="1" noEditPoints="1" noAdjustHandles="1" noChangeArrowheads="1" noChangeShapeType="1" noTextEdit="1"/>
+              </p:cNvSpPr>
+              <p:nvPr/>
+            </p:nvSpPr>
+            <p:spPr>
+              <a:xfrm>
+                <a:off x="7697891" y="4945369"/>
+                <a:ext cx="207108" cy="276999"/>
+              </a:xfrm>
+              <a:prstGeom prst="rect">
+                <a:avLst/>
+              </a:prstGeom>
+              <a:blipFill>
+                <a:blip r:embed="rId3"/>
+                <a:stretch>
+                  <a:fillRect l="-29412" r="-20588" b="-6522"/>
+                </a:stretch>
+              </a:blipFill>
+            </p:spPr>
+            <p:txBody>
+              <a:bodyPr/>
+              <a:lstStyle/>
+              <a:p>
+                <a:r>
+                  <a:rPr lang="en-US">
+                    <a:noFill/>
+                  </a:rPr>
+                  <a:t> </a:t>
+                </a:r>
+              </a:p>
+            </p:txBody>
+          </p:sp>
+        </mc:Fallback>
+      </mc:AlternateContent>
+      <p:cxnSp>
+        <p:nvCxnSpPr>
+          <p:cNvPr id="44" name="Straight Connector 43">
+            <a:extLst>
+              <a:ext uri="{FF2B5EF4-FFF2-40B4-BE49-F238E27FC236}">
+                <a16:creationId xmlns:a16="http://schemas.microsoft.com/office/drawing/2014/main" id="{E8FE75FC-C64F-46DB-A11F-67840F40C445}"/>
+              </a:ext>
+            </a:extLst>
+          </p:cNvPr>
+          <p:cNvCxnSpPr>
+            <a:cxnSpLocks/>
+            <a:stCxn id="4" idx="7"/>
+          </p:cNvCxnSpPr>
+          <p:nvPr/>
+        </p:nvCxnSpPr>
+        <p:spPr>
+          <a:xfrm flipV="1">
+            <a:off x="7193965" y="3912993"/>
+            <a:ext cx="431405" cy="180736"/>
+          </a:xfrm>
+          <a:prstGeom prst="line">
+            <a:avLst/>
+          </a:prstGeom>
+          <a:ln w="15875">
+            <a:prstDash val="sysDot"/>
+          </a:ln>
+        </p:spPr>
+        <p:style>
+          <a:lnRef idx="1">
+            <a:schemeClr val="dk1"/>
+          </a:lnRef>
+          <a:fillRef idx="0">
+            <a:schemeClr val="dk1"/>
+          </a:fillRef>
+          <a:effectRef idx="0">
+            <a:schemeClr val="dk1"/>
+          </a:effectRef>
+          <a:fontRef idx="minor">
+            <a:schemeClr val="tx1"/>
+          </a:fontRef>
+        </p:style>
+      </p:cxnSp>
+      <mc:AlternateContent xmlns:mc="http://schemas.openxmlformats.org/markup-compatibility/2006">
+        <mc:Choice xmlns:a14="http://schemas.microsoft.com/office/drawing/2010/main" Requires="a14">
+          <p:sp>
+            <p:nvSpPr>
+              <p:cNvPr id="46" name="TextBox 45">
+                <a:extLst>
+                  <a:ext uri="{FF2B5EF4-FFF2-40B4-BE49-F238E27FC236}">
+                    <a16:creationId xmlns:a16="http://schemas.microsoft.com/office/drawing/2014/main" id="{BDAB21A8-851C-4899-BDB2-40E7297B796B}"/>
+                  </a:ext>
+                </a:extLst>
+              </p:cNvPr>
+              <p:cNvSpPr txBox="1"/>
+              <p:nvPr/>
+            </p:nvSpPr>
+            <p:spPr>
+              <a:xfrm>
+                <a:off x="7349641" y="3748770"/>
+                <a:ext cx="163826" cy="246221"/>
+              </a:xfrm>
+              <a:prstGeom prst="rect">
+                <a:avLst/>
+              </a:prstGeom>
+              <a:noFill/>
+            </p:spPr>
+            <p:txBody>
+              <a:bodyPr wrap="none" lIns="0" tIns="0" rIns="0" bIns="0" rtlCol="0">
+                <a:spAutoFit/>
+              </a:bodyPr>
+              <a:lstStyle/>
+              <a:p>
+                <a14:m>
+                  <m:oMathPara xmlns:m="http://schemas.openxmlformats.org/officeDocument/2006/math">
+                    <m:oMathParaPr>
+                      <m:jc m:val="centerGroup"/>
+                    </m:oMathParaPr>
+                    <m:oMath xmlns:m="http://schemas.openxmlformats.org/officeDocument/2006/math">
+                      <m:r>
+                        <a:rPr lang="en-US" sz="1600" b="0" i="1" smtClean="0">
+                          <a:solidFill>
+                            <a:schemeClr val="tx1"/>
+                          </a:solidFill>
+                          <a:latin typeface="Cambria Math" panose="02040503050406030204" pitchFamily="18" charset="0"/>
+                        </a:rPr>
+                        <m:t>h</m:t>
+                      </m:r>
+                    </m:oMath>
+                  </m:oMathPara>
+                </a14:m>
+                <a:endParaRPr lang="en-US" sz="1600" dirty="0">
+                  <a:solidFill>
+                    <a:schemeClr val="tx1"/>
+                  </a:solidFill>
+                </a:endParaRPr>
+              </a:p>
+            </p:txBody>
+          </p:sp>
+        </mc:Choice>
+        <mc:Fallback>
+          <p:sp>
+            <p:nvSpPr>
+              <p:cNvPr id="46" name="TextBox 45">
+                <a:extLst>
+                  <a:ext uri="{FF2B5EF4-FFF2-40B4-BE49-F238E27FC236}">
+                    <a16:creationId xmlns:a16="http://schemas.microsoft.com/office/drawing/2014/main" id="{BDAB21A8-851C-4899-BDB2-40E7297B796B}"/>
+                  </a:ext>
+                </a:extLst>
+              </p:cNvPr>
+              <p:cNvSpPr txBox="1">
+                <a:spLocks noRot="1" noChangeAspect="1" noMove="1" noResize="1" noEditPoints="1" noAdjustHandles="1" noChangeArrowheads="1" noChangeShapeType="1" noTextEdit="1"/>
+              </p:cNvSpPr>
+              <p:nvPr/>
+            </p:nvSpPr>
+            <p:spPr>
+              <a:xfrm>
+                <a:off x="7349641" y="3748770"/>
+                <a:ext cx="163826" cy="246221"/>
+              </a:xfrm>
+              <a:prstGeom prst="rect">
+                <a:avLst/>
+              </a:prstGeom>
+              <a:blipFill>
+                <a:blip r:embed="rId4"/>
+                <a:stretch>
+                  <a:fillRect l="-29630" r="-25926" b="-7500"/>
+                </a:stretch>
+              </a:blipFill>
+            </p:spPr>
+            <p:txBody>
+              <a:bodyPr/>
+              <a:lstStyle/>
+              <a:p>
+                <a:r>
+                  <a:rPr lang="en-US">
+                    <a:noFill/>
+                  </a:rPr>
+                  <a:t> </a:t>
+                </a:r>
+              </a:p>
+            </p:txBody>
+          </p:sp>
+        </mc:Fallback>
+      </mc:AlternateContent>
+      <mc:AlternateContent xmlns:mc="http://schemas.openxmlformats.org/markup-compatibility/2006">
+        <mc:Choice xmlns:a14="http://schemas.microsoft.com/office/drawing/2010/main" Requires="a14">
+          <p:sp>
+            <p:nvSpPr>
+              <p:cNvPr id="47" name="TextBox 46">
+                <a:extLst>
+                  <a:ext uri="{FF2B5EF4-FFF2-40B4-BE49-F238E27FC236}">
+                    <a16:creationId xmlns:a16="http://schemas.microsoft.com/office/drawing/2014/main" id="{6A3796DA-D62C-447C-9A7B-CA0FE218B4A4}"/>
+                  </a:ext>
+                </a:extLst>
+              </p:cNvPr>
+              <p:cNvSpPr txBox="1"/>
+              <p:nvPr/>
+            </p:nvSpPr>
+            <p:spPr>
+              <a:xfrm>
+                <a:off x="7089298" y="3234554"/>
+                <a:ext cx="166969" cy="276999"/>
+              </a:xfrm>
+              <a:prstGeom prst="rect">
+                <a:avLst/>
+              </a:prstGeom>
+              <a:noFill/>
+            </p:spPr>
+            <p:txBody>
+              <a:bodyPr wrap="none" lIns="0" tIns="0" rIns="0" bIns="0" rtlCol="0">
+                <a:spAutoFit/>
+              </a:bodyPr>
+              <a:lstStyle/>
+              <a:p>
+                <a14:m>
+                  <m:oMathPara xmlns:m="http://schemas.openxmlformats.org/officeDocument/2006/math">
+                    <m:oMathParaPr>
+                      <m:jc m:val="centerGroup"/>
+                    </m:oMathParaPr>
+                    <m:oMath xmlns:m="http://schemas.openxmlformats.org/officeDocument/2006/math">
+                      <m:r>
+                        <a:rPr lang="en-US" b="0" i="1" smtClean="0">
+                          <a:solidFill>
+                            <a:srgbClr val="FF0000"/>
+                          </a:solidFill>
+                          <a:latin typeface="Cambria Math" panose="02040503050406030204" pitchFamily="18" charset="0"/>
+                        </a:rPr>
+                        <m:t>𝑟</m:t>
+                      </m:r>
+                    </m:oMath>
+                  </m:oMathPara>
+                </a14:m>
+                <a:endParaRPr lang="en-US" dirty="0">
+                  <a:solidFill>
+                    <a:srgbClr val="FF0000"/>
+                  </a:solidFill>
+                </a:endParaRPr>
+              </a:p>
+            </p:txBody>
+          </p:sp>
+        </mc:Choice>
+        <mc:Fallback>
+          <p:sp>
+            <p:nvSpPr>
+              <p:cNvPr id="47" name="TextBox 46">
+                <a:extLst>
+                  <a:ext uri="{FF2B5EF4-FFF2-40B4-BE49-F238E27FC236}">
+                    <a16:creationId xmlns:a16="http://schemas.microsoft.com/office/drawing/2014/main" id="{6A3796DA-D62C-447C-9A7B-CA0FE218B4A4}"/>
+                  </a:ext>
+                </a:extLst>
+              </p:cNvPr>
+              <p:cNvSpPr txBox="1">
+                <a:spLocks noRot="1" noChangeAspect="1" noMove="1" noResize="1" noEditPoints="1" noAdjustHandles="1" noChangeArrowheads="1" noChangeShapeType="1" noTextEdit="1"/>
+              </p:cNvSpPr>
+              <p:nvPr/>
+            </p:nvSpPr>
+            <p:spPr>
+              <a:xfrm>
+                <a:off x="7089298" y="3234554"/>
+                <a:ext cx="166969" cy="276999"/>
+              </a:xfrm>
+              <a:prstGeom prst="rect">
+                <a:avLst/>
+              </a:prstGeom>
+              <a:blipFill>
+                <a:blip r:embed="rId5"/>
+                <a:stretch>
+                  <a:fillRect l="-22222" r="-18519"/>
+                </a:stretch>
+              </a:blipFill>
+            </p:spPr>
+            <p:txBody>
+              <a:bodyPr/>
+              <a:lstStyle/>
+              <a:p>
+                <a:r>
+                  <a:rPr lang="en-US">
+                    <a:noFill/>
+                  </a:rPr>
+                  <a:t> </a:t>
+                </a:r>
+              </a:p>
+            </p:txBody>
+          </p:sp>
+        </mc:Fallback>
+      </mc:AlternateContent>
+      <mc:AlternateContent xmlns:mc="http://schemas.openxmlformats.org/markup-compatibility/2006">
+        <mc:Choice xmlns:a14="http://schemas.microsoft.com/office/drawing/2010/main" Requires="a14">
+          <p:sp>
+            <p:nvSpPr>
+              <p:cNvPr id="48" name="TextBox 47">
+                <a:extLst>
+                  <a:ext uri="{FF2B5EF4-FFF2-40B4-BE49-F238E27FC236}">
+                    <a16:creationId xmlns:a16="http://schemas.microsoft.com/office/drawing/2014/main" id="{69A426DE-5950-4682-B6EE-1223FB754A58}"/>
+                  </a:ext>
+                </a:extLst>
+              </p:cNvPr>
+              <p:cNvSpPr txBox="1"/>
+              <p:nvPr/>
+            </p:nvSpPr>
+            <p:spPr>
+              <a:xfrm>
+                <a:off x="7697891" y="4437064"/>
+                <a:ext cx="166969" cy="276999"/>
+              </a:xfrm>
+              <a:prstGeom prst="rect">
+                <a:avLst/>
+              </a:prstGeom>
+              <a:noFill/>
+            </p:spPr>
+            <p:txBody>
+              <a:bodyPr wrap="none" lIns="0" tIns="0" rIns="0" bIns="0" rtlCol="0">
+                <a:spAutoFit/>
+              </a:bodyPr>
+              <a:lstStyle/>
+              <a:p>
+                <a14:m>
+                  <m:oMathPara xmlns:m="http://schemas.openxmlformats.org/officeDocument/2006/math">
+                    <m:oMathParaPr>
+                      <m:jc m:val="centerGroup"/>
+                    </m:oMathParaPr>
+                    <m:oMath xmlns:m="http://schemas.openxmlformats.org/officeDocument/2006/math">
+                      <m:r>
+                        <a:rPr lang="en-US" b="0" i="1" smtClean="0">
+                          <a:solidFill>
+                            <a:srgbClr val="FF0000"/>
+                          </a:solidFill>
+                          <a:latin typeface="Cambria Math" panose="02040503050406030204" pitchFamily="18" charset="0"/>
+                        </a:rPr>
+                        <m:t>𝑟</m:t>
+                      </m:r>
+                    </m:oMath>
+                  </m:oMathPara>
+                </a14:m>
+                <a:endParaRPr lang="en-US" dirty="0">
+                  <a:solidFill>
+                    <a:srgbClr val="FF0000"/>
+                  </a:solidFill>
+                </a:endParaRPr>
+              </a:p>
+            </p:txBody>
+          </p:sp>
+        </mc:Choice>
+        <mc:Fallback>
+          <p:sp>
+            <p:nvSpPr>
+              <p:cNvPr id="48" name="TextBox 47">
+                <a:extLst>
+                  <a:ext uri="{FF2B5EF4-FFF2-40B4-BE49-F238E27FC236}">
+                    <a16:creationId xmlns:a16="http://schemas.microsoft.com/office/drawing/2014/main" id="{69A426DE-5950-4682-B6EE-1223FB754A58}"/>
+                  </a:ext>
+                </a:extLst>
+              </p:cNvPr>
+              <p:cNvSpPr txBox="1">
+                <a:spLocks noRot="1" noChangeAspect="1" noMove="1" noResize="1" noEditPoints="1" noAdjustHandles="1" noChangeArrowheads="1" noChangeShapeType="1" noTextEdit="1"/>
+              </p:cNvSpPr>
+              <p:nvPr/>
+            </p:nvSpPr>
+            <p:spPr>
+              <a:xfrm>
+                <a:off x="7697891" y="4437064"/>
+                <a:ext cx="166969" cy="276999"/>
+              </a:xfrm>
+              <a:prstGeom prst="rect">
+                <a:avLst/>
+              </a:prstGeom>
+              <a:blipFill>
+                <a:blip r:embed="rId6"/>
+                <a:stretch>
+                  <a:fillRect l="-22222" r="-18519"/>
+                </a:stretch>
+              </a:blipFill>
+            </p:spPr>
+            <p:txBody>
+              <a:bodyPr/>
+              <a:lstStyle/>
+              <a:p>
+                <a:r>
+                  <a:rPr lang="en-US">
+                    <a:noFill/>
+                  </a:rPr>
+                  <a:t> </a:t>
+                </a:r>
+              </a:p>
+            </p:txBody>
+          </p:sp>
+        </mc:Fallback>
+      </mc:AlternateContent>
+      <p:sp>
+        <p:nvSpPr>
+          <p:cNvPr id="50" name="Oval 49">
+            <a:extLst>
+              <a:ext uri="{FF2B5EF4-FFF2-40B4-BE49-F238E27FC236}">
+                <a16:creationId xmlns:a16="http://schemas.microsoft.com/office/drawing/2014/main" id="{BE48278F-F122-489D-976A-457FE64D768D}"/>
+              </a:ext>
+            </a:extLst>
+          </p:cNvPr>
+          <p:cNvSpPr/>
+          <p:nvPr/>
+        </p:nvSpPr>
+        <p:spPr>
+          <a:xfrm>
+            <a:off x="8302966" y="5266975"/>
+            <a:ext cx="107663" cy="111185"/>
+          </a:xfrm>
+          <a:prstGeom prst="ellipse">
+            <a:avLst/>
+          </a:prstGeom>
+          <a:solidFill>
+            <a:srgbClr val="FFFF00"/>
+          </a:solidFill>
+        </p:spPr>
+        <p:style>
+          <a:lnRef idx="2">
+            <a:schemeClr val="accent1">
+              <a:shade val="50000"/>
+            </a:schemeClr>
+          </a:lnRef>
+          <a:fillRef idx="1">
+            <a:schemeClr val="accent1"/>
+          </a:fillRef>
+          <a:effectRef idx="0">
+            <a:schemeClr val="accent1"/>
+          </a:effectRef>
+          <a:fontRef idx="minor">
+            <a:schemeClr val="lt1"/>
+          </a:fontRef>
+        </p:style>
+        <p:txBody>
+          <a:bodyPr rtlCol="0" anchor="ctr"/>
+          <a:lstStyle/>
+          <a:p>
+            <a:pPr algn="ctr"/>
+            <a:endParaRPr lang="en-US"/>
+          </a:p>
+        </p:txBody>
+      </p:sp>
+      <p:cxnSp>
+        <p:nvCxnSpPr>
+          <p:cNvPr id="64" name="Straight Arrow Connector 63">
+            <a:extLst>
+              <a:ext uri="{FF2B5EF4-FFF2-40B4-BE49-F238E27FC236}">
+                <a16:creationId xmlns:a16="http://schemas.microsoft.com/office/drawing/2014/main" id="{0D35DD79-9190-4F47-8DD9-F2EC738554B7}"/>
+              </a:ext>
+            </a:extLst>
+          </p:cNvPr>
+          <p:cNvCxnSpPr>
+            <a:cxnSpLocks/>
+            <a:stCxn id="50" idx="1"/>
+          </p:cNvCxnSpPr>
+          <p:nvPr/>
+        </p:nvCxnSpPr>
+        <p:spPr>
+          <a:xfrm flipH="1" flipV="1">
+            <a:off x="8058150" y="4728210"/>
+            <a:ext cx="260583" cy="555048"/>
+          </a:xfrm>
+          <a:prstGeom prst="straightConnector1">
+            <a:avLst/>
+          </a:prstGeom>
+          <a:ln w="25400">
+            <a:solidFill>
+              <a:schemeClr val="tx1"/>
+            </a:solidFill>
+            <a:tailEnd type="stealth" w="lg" len="lg"/>
+          </a:ln>
+        </p:spPr>
+        <p:style>
+          <a:lnRef idx="1">
+            <a:schemeClr val="accent1"/>
+          </a:lnRef>
+          <a:fillRef idx="0">
+            <a:schemeClr val="accent1"/>
+          </a:fillRef>
+          <a:effectRef idx="0">
+            <a:schemeClr val="accent1"/>
+          </a:effectRef>
+          <a:fontRef idx="minor">
+            <a:schemeClr val="tx1"/>
+          </a:fontRef>
+        </p:style>
+      </p:cxnSp>
+      <mc:AlternateContent xmlns:mc="http://schemas.openxmlformats.org/markup-compatibility/2006">
+        <mc:Choice xmlns:a14="http://schemas.microsoft.com/office/drawing/2010/main" Requires="a14">
+          <p:sp>
+            <p:nvSpPr>
+              <p:cNvPr id="67" name="TextBox 66">
+                <a:extLst>
+                  <a:ext uri="{FF2B5EF4-FFF2-40B4-BE49-F238E27FC236}">
+                    <a16:creationId xmlns:a16="http://schemas.microsoft.com/office/drawing/2014/main" id="{1377DA9F-531F-4FB1-BCD8-CB64C7FBE362}"/>
+                  </a:ext>
+                </a:extLst>
+              </p:cNvPr>
+              <p:cNvSpPr txBox="1"/>
+              <p:nvPr/>
+            </p:nvSpPr>
+            <p:spPr>
+              <a:xfrm>
+                <a:off x="8182286" y="4673307"/>
+                <a:ext cx="184666" cy="276999"/>
+              </a:xfrm>
+              <a:prstGeom prst="rect">
+                <a:avLst/>
+              </a:prstGeom>
+              <a:noFill/>
+            </p:spPr>
+            <p:txBody>
+              <a:bodyPr wrap="none" lIns="0" tIns="0" rIns="0" bIns="0" rtlCol="0">
+                <a:spAutoFit/>
+              </a:bodyPr>
+              <a:lstStyle/>
+              <a:p>
+                <a14:m>
+                  <m:oMathPara xmlns:m="http://schemas.openxmlformats.org/officeDocument/2006/math">
+                    <m:oMathParaPr>
+                      <m:jc m:val="centerGroup"/>
+                    </m:oMathParaPr>
+                    <m:oMath xmlns:m="http://schemas.openxmlformats.org/officeDocument/2006/math">
+                      <m:acc>
+                        <m:accPr>
+                          <m:chr m:val="⃗"/>
+                          <m:ctrlPr>
+                            <a:rPr lang="en-US" i="1" smtClean="0">
+                              <a:solidFill>
+                                <a:schemeClr val="tx1"/>
+                              </a:solidFill>
+                              <a:latin typeface="Cambria Math" panose="02040503050406030204" pitchFamily="18" charset="0"/>
+                            </a:rPr>
+                          </m:ctrlPr>
+                        </m:accPr>
+                        <m:e>
+                          <m:r>
+                            <a:rPr lang="en-US" b="0" i="1" smtClean="0">
+                              <a:solidFill>
+                                <a:schemeClr val="tx1"/>
+                              </a:solidFill>
+                              <a:latin typeface="Cambria Math" panose="02040503050406030204" pitchFamily="18" charset="0"/>
+                            </a:rPr>
+                            <m:t>𝑣</m:t>
+                          </m:r>
+                        </m:e>
+                      </m:acc>
+                    </m:oMath>
+                  </m:oMathPara>
+                </a14:m>
+                <a:endParaRPr lang="en-US" dirty="0">
+                  <a:solidFill>
+                    <a:schemeClr val="tx1"/>
+                  </a:solidFill>
+                </a:endParaRPr>
+              </a:p>
+            </p:txBody>
+          </p:sp>
+        </mc:Choice>
+        <mc:Fallback>
+          <p:sp>
+            <p:nvSpPr>
+              <p:cNvPr id="67" name="TextBox 66">
+                <a:extLst>
+                  <a:ext uri="{FF2B5EF4-FFF2-40B4-BE49-F238E27FC236}">
+                    <a16:creationId xmlns:a16="http://schemas.microsoft.com/office/drawing/2014/main" id="{1377DA9F-531F-4FB1-BCD8-CB64C7FBE362}"/>
+                  </a:ext>
+                </a:extLst>
+              </p:cNvPr>
+              <p:cNvSpPr txBox="1">
+                <a:spLocks noRot="1" noChangeAspect="1" noMove="1" noResize="1" noEditPoints="1" noAdjustHandles="1" noChangeArrowheads="1" noChangeShapeType="1" noTextEdit="1"/>
+              </p:cNvSpPr>
+              <p:nvPr/>
+            </p:nvSpPr>
+            <p:spPr>
+              <a:xfrm>
+                <a:off x="8182286" y="4673307"/>
+                <a:ext cx="184666" cy="276999"/>
+              </a:xfrm>
+              <a:prstGeom prst="rect">
+                <a:avLst/>
+              </a:prstGeom>
+              <a:blipFill>
+                <a:blip r:embed="rId7"/>
+                <a:stretch>
+                  <a:fillRect l="-29032" t="-48889" r="-100000" b="-8889"/>
+                </a:stretch>
+              </a:blipFill>
+            </p:spPr>
+            <p:txBody>
+              <a:bodyPr/>
+              <a:lstStyle/>
+              <a:p>
+                <a:r>
+                  <a:rPr lang="en-US">
+                    <a:noFill/>
+                  </a:rPr>
+                  <a:t> </a:t>
+                </a:r>
+              </a:p>
+            </p:txBody>
+          </p:sp>
+        </mc:Fallback>
+      </mc:AlternateContent>
+      <p:sp>
+        <p:nvSpPr>
+          <p:cNvPr id="69" name="Oval 68">
+            <a:extLst>
+              <a:ext uri="{FF2B5EF4-FFF2-40B4-BE49-F238E27FC236}">
+                <a16:creationId xmlns:a16="http://schemas.microsoft.com/office/drawing/2014/main" id="{1932B4F6-0B20-443F-A106-E7D24224ACD4}"/>
+              </a:ext>
+            </a:extLst>
+          </p:cNvPr>
+          <p:cNvSpPr/>
+          <p:nvPr/>
+        </p:nvSpPr>
+        <p:spPr>
+          <a:xfrm>
+            <a:off x="7256267" y="3171146"/>
+            <a:ext cx="100127" cy="92757"/>
+          </a:xfrm>
+          <a:prstGeom prst="ellipse">
+            <a:avLst/>
+          </a:prstGeom>
+          <a:solidFill>
+            <a:srgbClr val="7030A0"/>
+          </a:solidFill>
+          <a:ln>
+            <a:noFill/>
+          </a:ln>
+        </p:spPr>
+        <p:style>
+          <a:lnRef idx="2">
+            <a:schemeClr val="accent1">
+              <a:shade val="50000"/>
+            </a:schemeClr>
+          </a:lnRef>
+          <a:fillRef idx="1">
+            <a:schemeClr val="accent1"/>
+          </a:fillRef>
+          <a:effectRef idx="0">
+            <a:schemeClr val="accent1"/>
+          </a:effectRef>
+          <a:fontRef idx="minor">
+            <a:schemeClr val="lt1"/>
+          </a:fontRef>
+        </p:style>
+        <p:txBody>
+          <a:bodyPr rtlCol="0" anchor="ctr"/>
+          <a:lstStyle/>
+          <a:p>
+            <a:pPr algn="ctr"/>
+            <a:endParaRPr lang="en-US"/>
+          </a:p>
+        </p:txBody>
+      </p:sp>
+      <p:sp>
+        <p:nvSpPr>
+          <p:cNvPr id="70" name="Oval 69">
+            <a:extLst>
+              <a:ext uri="{FF2B5EF4-FFF2-40B4-BE49-F238E27FC236}">
+                <a16:creationId xmlns:a16="http://schemas.microsoft.com/office/drawing/2014/main" id="{E0A4365E-CE2F-4640-9CCD-0F40F1B67C1F}"/>
+              </a:ext>
+            </a:extLst>
+          </p:cNvPr>
+          <p:cNvSpPr/>
+          <p:nvPr/>
+        </p:nvSpPr>
+        <p:spPr>
+          <a:xfrm>
+            <a:off x="7946431" y="4529184"/>
+            <a:ext cx="100127" cy="92757"/>
+          </a:xfrm>
+          <a:prstGeom prst="ellipse">
+            <a:avLst/>
+          </a:prstGeom>
+          <a:solidFill>
+            <a:srgbClr val="7030A0"/>
+          </a:solidFill>
+          <a:ln>
+            <a:noFill/>
+          </a:ln>
+        </p:spPr>
+        <p:style>
+          <a:lnRef idx="2">
+            <a:schemeClr val="accent1">
+              <a:shade val="50000"/>
+            </a:schemeClr>
+          </a:lnRef>
+          <a:fillRef idx="1">
+            <a:schemeClr val="accent1"/>
+          </a:fillRef>
+          <a:effectRef idx="0">
+            <a:schemeClr val="accent1"/>
+          </a:effectRef>
+          <a:fontRef idx="minor">
+            <a:schemeClr val="lt1"/>
+          </a:fontRef>
+        </p:style>
+        <p:txBody>
+          <a:bodyPr rtlCol="0" anchor="ctr"/>
+          <a:lstStyle/>
+          <a:p>
+            <a:pPr algn="ctr"/>
+            <a:endParaRPr lang="en-US"/>
+          </a:p>
+        </p:txBody>
+      </p:sp>
+      <p:sp>
+        <p:nvSpPr>
+          <p:cNvPr id="71" name="Oval 70">
+            <a:extLst>
+              <a:ext uri="{FF2B5EF4-FFF2-40B4-BE49-F238E27FC236}">
+                <a16:creationId xmlns:a16="http://schemas.microsoft.com/office/drawing/2014/main" id="{65C976CA-2809-41CD-875B-B63F9A31AA39}"/>
+              </a:ext>
+            </a:extLst>
+          </p:cNvPr>
+          <p:cNvSpPr/>
+          <p:nvPr/>
+        </p:nvSpPr>
+        <p:spPr>
+          <a:xfrm>
+            <a:off x="6889222" y="2398142"/>
+            <a:ext cx="100127" cy="92757"/>
+          </a:xfrm>
+          <a:prstGeom prst="ellipse">
+            <a:avLst/>
+          </a:prstGeom>
+          <a:solidFill>
+            <a:srgbClr val="7030A0"/>
+          </a:solidFill>
+          <a:ln>
+            <a:noFill/>
+          </a:ln>
+        </p:spPr>
+        <p:style>
+          <a:lnRef idx="2">
+            <a:schemeClr val="accent1">
+              <a:shade val="50000"/>
+            </a:schemeClr>
+          </a:lnRef>
+          <a:fillRef idx="1">
+            <a:schemeClr val="accent1"/>
+          </a:fillRef>
+          <a:effectRef idx="0">
+            <a:schemeClr val="accent1"/>
+          </a:effectRef>
+          <a:fontRef idx="minor">
+            <a:schemeClr val="lt1"/>
+          </a:fontRef>
+        </p:style>
+        <p:txBody>
+          <a:bodyPr rtlCol="0" anchor="ctr"/>
+          <a:lstStyle/>
+          <a:p>
+            <a:pPr algn="ctr"/>
+            <a:endParaRPr lang="en-US"/>
+          </a:p>
+        </p:txBody>
+      </p:sp>
+      <mc:AlternateContent xmlns:mc="http://schemas.openxmlformats.org/markup-compatibility/2006">
+        <mc:Choice xmlns:a14="http://schemas.microsoft.com/office/drawing/2010/main" Requires="a14">
+          <p:sp>
+            <p:nvSpPr>
+              <p:cNvPr id="73" name="TextBox 72">
+                <a:extLst>
+                  <a:ext uri="{FF2B5EF4-FFF2-40B4-BE49-F238E27FC236}">
+                    <a16:creationId xmlns:a16="http://schemas.microsoft.com/office/drawing/2014/main" id="{E3E18719-17FE-4C11-BA5F-EFFDD6690985}"/>
+                  </a:ext>
+                </a:extLst>
+              </p:cNvPr>
+              <p:cNvSpPr txBox="1"/>
+              <p:nvPr/>
+            </p:nvSpPr>
+            <p:spPr>
+              <a:xfrm>
+                <a:off x="8423588" y="5239660"/>
+                <a:ext cx="205184" cy="276999"/>
+              </a:xfrm>
+              <a:prstGeom prst="rect">
+                <a:avLst/>
+              </a:prstGeom>
+              <a:noFill/>
+            </p:spPr>
+            <p:txBody>
+              <a:bodyPr wrap="none" lIns="0" tIns="0" rIns="0" bIns="0" rtlCol="0">
+                <a:spAutoFit/>
+              </a:bodyPr>
+              <a:lstStyle/>
+              <a:p>
+                <a14:m>
+                  <m:oMathPara xmlns:m="http://schemas.openxmlformats.org/officeDocument/2006/math">
+                    <m:oMathParaPr>
+                      <m:jc m:val="centerGroup"/>
+                    </m:oMathParaPr>
+                    <m:oMath xmlns:m="http://schemas.openxmlformats.org/officeDocument/2006/math">
+                      <m:r>
+                        <a:rPr lang="en-US" b="1" i="1" smtClean="0">
+                          <a:solidFill>
+                            <a:srgbClr val="7030A0"/>
+                          </a:solidFill>
+                          <a:latin typeface="Cambria Math" panose="02040503050406030204" pitchFamily="18" charset="0"/>
+                        </a:rPr>
+                        <m:t>𝑨</m:t>
+                      </m:r>
+                    </m:oMath>
+                  </m:oMathPara>
+                </a14:m>
+                <a:endParaRPr lang="en-US" b="1" dirty="0">
+                  <a:solidFill>
+                    <a:srgbClr val="7030A0"/>
+                  </a:solidFill>
+                </a:endParaRPr>
+              </a:p>
+            </p:txBody>
+          </p:sp>
+        </mc:Choice>
+        <mc:Fallback>
+          <p:sp>
+            <p:nvSpPr>
+              <p:cNvPr id="73" name="TextBox 72">
+                <a:extLst>
+                  <a:ext uri="{FF2B5EF4-FFF2-40B4-BE49-F238E27FC236}">
+                    <a16:creationId xmlns:a16="http://schemas.microsoft.com/office/drawing/2014/main" id="{E3E18719-17FE-4C11-BA5F-EFFDD6690985}"/>
+                  </a:ext>
+                </a:extLst>
+              </p:cNvPr>
+              <p:cNvSpPr txBox="1">
+                <a:spLocks noRot="1" noChangeAspect="1" noMove="1" noResize="1" noEditPoints="1" noAdjustHandles="1" noChangeArrowheads="1" noChangeShapeType="1" noTextEdit="1"/>
+              </p:cNvSpPr>
+              <p:nvPr/>
+            </p:nvSpPr>
+            <p:spPr>
+              <a:xfrm>
+                <a:off x="8423588" y="5239660"/>
+                <a:ext cx="205184" cy="276999"/>
+              </a:xfrm>
+              <a:prstGeom prst="rect">
+                <a:avLst/>
+              </a:prstGeom>
+              <a:blipFill>
+                <a:blip r:embed="rId8"/>
+                <a:stretch>
+                  <a:fillRect l="-30303" r="-27273" b="-6667"/>
+                </a:stretch>
+              </a:blipFill>
+            </p:spPr>
+            <p:txBody>
+              <a:bodyPr/>
+              <a:lstStyle/>
+              <a:p>
+                <a:r>
+                  <a:rPr lang="en-US">
+                    <a:noFill/>
+                  </a:rPr>
+                  <a:t> </a:t>
+                </a:r>
+              </a:p>
+            </p:txBody>
+          </p:sp>
+        </mc:Fallback>
+      </mc:AlternateContent>
+      <mc:AlternateContent xmlns:mc="http://schemas.openxmlformats.org/markup-compatibility/2006">
+        <mc:Choice xmlns:a14="http://schemas.microsoft.com/office/drawing/2010/main" Requires="a14">
+          <p:sp>
+            <p:nvSpPr>
+              <p:cNvPr id="74" name="TextBox 73">
+                <a:extLst>
+                  <a:ext uri="{FF2B5EF4-FFF2-40B4-BE49-F238E27FC236}">
+                    <a16:creationId xmlns:a16="http://schemas.microsoft.com/office/drawing/2014/main" id="{D2EDE013-E08F-4E1E-AD80-534AAB677062}"/>
+                  </a:ext>
+                </a:extLst>
+              </p:cNvPr>
+              <p:cNvSpPr txBox="1"/>
+              <p:nvPr/>
+            </p:nvSpPr>
+            <p:spPr>
+              <a:xfrm>
+                <a:off x="8075501" y="4385426"/>
+                <a:ext cx="219611" cy="276999"/>
+              </a:xfrm>
+              <a:prstGeom prst="rect">
+                <a:avLst/>
+              </a:prstGeom>
+              <a:noFill/>
+            </p:spPr>
+            <p:txBody>
+              <a:bodyPr wrap="none" lIns="0" tIns="0" rIns="0" bIns="0" rtlCol="0">
+                <a:spAutoFit/>
+              </a:bodyPr>
+              <a:lstStyle/>
+              <a:p>
+                <a14:m>
+                  <m:oMathPara xmlns:m="http://schemas.openxmlformats.org/officeDocument/2006/math">
+                    <m:oMathParaPr>
+                      <m:jc m:val="centerGroup"/>
+                    </m:oMathParaPr>
+                    <m:oMath xmlns:m="http://schemas.openxmlformats.org/officeDocument/2006/math">
+                      <m:r>
+                        <a:rPr lang="en-US" b="1" i="1" smtClean="0">
+                          <a:solidFill>
+                            <a:srgbClr val="7030A0"/>
+                          </a:solidFill>
+                          <a:latin typeface="Cambria Math" panose="02040503050406030204" pitchFamily="18" charset="0"/>
+                        </a:rPr>
+                        <m:t>𝑩</m:t>
+                      </m:r>
+                    </m:oMath>
+                  </m:oMathPara>
+                </a14:m>
+                <a:endParaRPr lang="en-US" b="1" dirty="0">
+                  <a:solidFill>
+                    <a:srgbClr val="7030A0"/>
+                  </a:solidFill>
+                </a:endParaRPr>
+              </a:p>
+            </p:txBody>
+          </p:sp>
+        </mc:Choice>
+        <mc:Fallback>
+          <p:sp>
+            <p:nvSpPr>
+              <p:cNvPr id="74" name="TextBox 73">
+                <a:extLst>
+                  <a:ext uri="{FF2B5EF4-FFF2-40B4-BE49-F238E27FC236}">
+                    <a16:creationId xmlns:a16="http://schemas.microsoft.com/office/drawing/2014/main" id="{D2EDE013-E08F-4E1E-AD80-534AAB677062}"/>
+                  </a:ext>
+                </a:extLst>
+              </p:cNvPr>
+              <p:cNvSpPr txBox="1">
+                <a:spLocks noRot="1" noChangeAspect="1" noMove="1" noResize="1" noEditPoints="1" noAdjustHandles="1" noChangeArrowheads="1" noChangeShapeType="1" noTextEdit="1"/>
+              </p:cNvSpPr>
+              <p:nvPr/>
+            </p:nvSpPr>
+            <p:spPr>
+              <a:xfrm>
+                <a:off x="8075501" y="4385426"/>
+                <a:ext cx="219611" cy="276999"/>
+              </a:xfrm>
+              <a:prstGeom prst="rect">
+                <a:avLst/>
+              </a:prstGeom>
+              <a:blipFill>
+                <a:blip r:embed="rId9"/>
+                <a:stretch>
+                  <a:fillRect l="-27778" r="-22222" b="-6522"/>
+                </a:stretch>
+              </a:blipFill>
+            </p:spPr>
+            <p:txBody>
+              <a:bodyPr/>
+              <a:lstStyle/>
+              <a:p>
+                <a:r>
+                  <a:rPr lang="en-US">
+                    <a:noFill/>
+                  </a:rPr>
+                  <a:t> </a:t>
+                </a:r>
+              </a:p>
+            </p:txBody>
+          </p:sp>
+        </mc:Fallback>
+      </mc:AlternateContent>
+      <mc:AlternateContent xmlns:mc="http://schemas.openxmlformats.org/markup-compatibility/2006">
+        <mc:Choice xmlns:a14="http://schemas.microsoft.com/office/drawing/2010/main" Requires="a14">
+          <p:sp>
+            <p:nvSpPr>
+              <p:cNvPr id="75" name="TextBox 74">
+                <a:extLst>
+                  <a:ext uri="{FF2B5EF4-FFF2-40B4-BE49-F238E27FC236}">
+                    <a16:creationId xmlns:a16="http://schemas.microsoft.com/office/drawing/2014/main" id="{3E6E3F2B-439F-46CD-81E1-2A6B7F7302EE}"/>
+                  </a:ext>
+                </a:extLst>
+              </p:cNvPr>
+              <p:cNvSpPr txBox="1"/>
+              <p:nvPr/>
+            </p:nvSpPr>
+            <p:spPr>
+              <a:xfrm>
+                <a:off x="7356291" y="2945509"/>
+                <a:ext cx="197170" cy="276999"/>
+              </a:xfrm>
+              <a:prstGeom prst="rect">
+                <a:avLst/>
+              </a:prstGeom>
+              <a:noFill/>
+            </p:spPr>
+            <p:txBody>
+              <a:bodyPr wrap="none" lIns="0" tIns="0" rIns="0" bIns="0" rtlCol="0">
+                <a:spAutoFit/>
+              </a:bodyPr>
+              <a:lstStyle/>
+              <a:p>
+                <a14:m>
+                  <m:oMathPara xmlns:m="http://schemas.openxmlformats.org/officeDocument/2006/math">
+                    <m:oMathParaPr>
+                      <m:jc m:val="centerGroup"/>
+                    </m:oMathParaPr>
+                    <m:oMath xmlns:m="http://schemas.openxmlformats.org/officeDocument/2006/math">
+                      <m:r>
+                        <a:rPr lang="en-US" b="1" i="1" smtClean="0">
+                          <a:solidFill>
+                            <a:srgbClr val="7030A0"/>
+                          </a:solidFill>
+                          <a:latin typeface="Cambria Math" panose="02040503050406030204" pitchFamily="18" charset="0"/>
+                        </a:rPr>
+                        <m:t>𝑪</m:t>
+                      </m:r>
+                    </m:oMath>
+                  </m:oMathPara>
+                </a14:m>
+                <a:endParaRPr lang="en-US" b="1" dirty="0">
+                  <a:solidFill>
+                    <a:srgbClr val="7030A0"/>
+                  </a:solidFill>
+                </a:endParaRPr>
+              </a:p>
+            </p:txBody>
+          </p:sp>
+        </mc:Choice>
+        <mc:Fallback>
+          <p:sp>
+            <p:nvSpPr>
+              <p:cNvPr id="75" name="TextBox 74">
+                <a:extLst>
+                  <a:ext uri="{FF2B5EF4-FFF2-40B4-BE49-F238E27FC236}">
+                    <a16:creationId xmlns:a16="http://schemas.microsoft.com/office/drawing/2014/main" id="{3E6E3F2B-439F-46CD-81E1-2A6B7F7302EE}"/>
+                  </a:ext>
+                </a:extLst>
+              </p:cNvPr>
+              <p:cNvSpPr txBox="1">
+                <a:spLocks noRot="1" noChangeAspect="1" noMove="1" noResize="1" noEditPoints="1" noAdjustHandles="1" noChangeArrowheads="1" noChangeShapeType="1" noTextEdit="1"/>
+              </p:cNvSpPr>
+              <p:nvPr/>
+            </p:nvSpPr>
+            <p:spPr>
+              <a:xfrm>
+                <a:off x="7356291" y="2945509"/>
+                <a:ext cx="197170" cy="276999"/>
+              </a:xfrm>
+              <a:prstGeom prst="rect">
+                <a:avLst/>
+              </a:prstGeom>
+              <a:blipFill>
+                <a:blip r:embed="rId10"/>
+                <a:stretch>
+                  <a:fillRect l="-31250" r="-28125" b="-6522"/>
+                </a:stretch>
+              </a:blipFill>
+            </p:spPr>
+            <p:txBody>
+              <a:bodyPr/>
+              <a:lstStyle/>
+              <a:p>
+                <a:r>
+                  <a:rPr lang="en-US">
+                    <a:noFill/>
+                  </a:rPr>
+                  <a:t> </a:t>
+                </a:r>
+              </a:p>
+            </p:txBody>
+          </p:sp>
+        </mc:Fallback>
+      </mc:AlternateContent>
+      <mc:AlternateContent xmlns:mc="http://schemas.openxmlformats.org/markup-compatibility/2006">
+        <mc:Choice xmlns:a14="http://schemas.microsoft.com/office/drawing/2010/main" Requires="a14">
+          <p:sp>
+            <p:nvSpPr>
+              <p:cNvPr id="76" name="TextBox 75">
+                <a:extLst>
+                  <a:ext uri="{FF2B5EF4-FFF2-40B4-BE49-F238E27FC236}">
+                    <a16:creationId xmlns:a16="http://schemas.microsoft.com/office/drawing/2014/main" id="{F3728744-6517-4A6F-8DC3-3D2837F5C564}"/>
+                  </a:ext>
+                </a:extLst>
+              </p:cNvPr>
+              <p:cNvSpPr txBox="1"/>
+              <p:nvPr/>
+            </p:nvSpPr>
+            <p:spPr>
+              <a:xfrm>
+                <a:off x="6717083" y="2114986"/>
+                <a:ext cx="226023" cy="276999"/>
+              </a:xfrm>
+              <a:prstGeom prst="rect">
+                <a:avLst/>
+              </a:prstGeom>
+              <a:noFill/>
+            </p:spPr>
+            <p:txBody>
+              <a:bodyPr wrap="none" lIns="0" tIns="0" rIns="0" bIns="0" rtlCol="0">
+                <a:spAutoFit/>
+              </a:bodyPr>
+              <a:lstStyle/>
+              <a:p>
+                <a14:m>
+                  <m:oMathPara xmlns:m="http://schemas.openxmlformats.org/officeDocument/2006/math">
+                    <m:oMathParaPr>
+                      <m:jc m:val="centerGroup"/>
+                    </m:oMathParaPr>
+                    <m:oMath xmlns:m="http://schemas.openxmlformats.org/officeDocument/2006/math">
+                      <m:r>
+                        <a:rPr lang="en-US" b="1" i="1" smtClean="0">
+                          <a:solidFill>
+                            <a:srgbClr val="7030A0"/>
+                          </a:solidFill>
+                          <a:latin typeface="Cambria Math" panose="02040503050406030204" pitchFamily="18" charset="0"/>
+                        </a:rPr>
+                        <m:t>𝑫</m:t>
+                      </m:r>
+                    </m:oMath>
+                  </m:oMathPara>
+                </a14:m>
+                <a:endParaRPr lang="en-US" b="1" dirty="0">
+                  <a:solidFill>
+                    <a:srgbClr val="7030A0"/>
+                  </a:solidFill>
+                </a:endParaRPr>
+              </a:p>
+            </p:txBody>
+          </p:sp>
+        </mc:Choice>
+        <mc:Fallback>
+          <p:sp>
+            <p:nvSpPr>
+              <p:cNvPr id="76" name="TextBox 75">
+                <a:extLst>
+                  <a:ext uri="{FF2B5EF4-FFF2-40B4-BE49-F238E27FC236}">
+                    <a16:creationId xmlns:a16="http://schemas.microsoft.com/office/drawing/2014/main" id="{F3728744-6517-4A6F-8DC3-3D2837F5C564}"/>
+                  </a:ext>
+                </a:extLst>
+              </p:cNvPr>
+              <p:cNvSpPr txBox="1">
+                <a:spLocks noRot="1" noChangeAspect="1" noMove="1" noResize="1" noEditPoints="1" noAdjustHandles="1" noChangeArrowheads="1" noChangeShapeType="1" noTextEdit="1"/>
+              </p:cNvSpPr>
+              <p:nvPr/>
+            </p:nvSpPr>
+            <p:spPr>
+              <a:xfrm>
+                <a:off x="6717083" y="2114986"/>
+                <a:ext cx="226023" cy="276999"/>
+              </a:xfrm>
+              <a:prstGeom prst="rect">
+                <a:avLst/>
+              </a:prstGeom>
+              <a:blipFill>
+                <a:blip r:embed="rId11"/>
+                <a:stretch>
+                  <a:fillRect l="-27027" r="-24324" b="-6667"/>
+                </a:stretch>
+              </a:blipFill>
+            </p:spPr>
+            <p:txBody>
+              <a:bodyPr/>
+              <a:lstStyle/>
+              <a:p>
+                <a:r>
+                  <a:rPr lang="en-US">
+                    <a:noFill/>
+                  </a:rPr>
+                  <a:t> </a:t>
+                </a:r>
+              </a:p>
+            </p:txBody>
+          </p:sp>
+        </mc:Fallback>
+      </mc:AlternateContent>
+    </p:spTree>
+    <p:extLst>
+      <p:ext uri="{BB962C8B-B14F-4D97-AF65-F5344CB8AC3E}">
+        <p14:creationId xmlns:p14="http://schemas.microsoft.com/office/powerpoint/2010/main" val="3817910402"/>
       </p:ext>
     </p:extLst>
   </p:cSld>

</xml_diff>

<commit_message>
Added 1.2.11, updated 1.2.9,1.2.10,1.2.12
</commit_message>
<xml_diff>
--- a/volunteer/Drawings.pptx
+++ b/volunteer/Drawings.pptx
@@ -15,6 +15,7 @@
     <p:sldId id="263" r:id="rId9"/>
     <p:sldId id="264" r:id="rId10"/>
     <p:sldId id="265" r:id="rId11"/>
+    <p:sldId id="266" r:id="rId12"/>
   </p:sldIdLst>
   <p:sldSz cx="12192000" cy="6858000"/>
   <p:notesSz cx="6858000" cy="9144000"/>
@@ -3992,8 +3993,8 @@
           </a:fontRef>
         </p:style>
       </p:cxnSp>
-      <mc:AlternateContent xmlns:mc="http://schemas.openxmlformats.org/markup-compatibility/2006">
-        <mc:Choice xmlns:a14="http://schemas.microsoft.com/office/drawing/2010/main" Requires="a14">
+      <mc:AlternateContent xmlns:mc="http://schemas.openxmlformats.org/markup-compatibility/2006" xmlns:a14="http://schemas.microsoft.com/office/drawing/2010/main">
+        <mc:Choice Requires="a14">
           <p:sp>
             <p:nvSpPr>
               <p:cNvPr id="41" name="TextBox 40">
@@ -4022,6 +4023,7 @@
               </a:bodyPr>
               <a:lstStyle/>
               <a:p>
+                <a:pPr/>
                 <a14:m>
                   <m:oMathPara xmlns:m="http://schemas.openxmlformats.org/officeDocument/2006/math">
                     <m:oMathParaPr>
@@ -4049,7 +4051,7 @@
             </p:txBody>
           </p:sp>
         </mc:Choice>
-        <mc:Fallback>
+        <mc:Fallback xmlns="">
           <p:sp>
             <p:nvSpPr>
               <p:cNvPr id="41" name="TextBox 40">
@@ -4094,8 +4096,8 @@
           </p:sp>
         </mc:Fallback>
       </mc:AlternateContent>
-      <mc:AlternateContent xmlns:mc="http://schemas.openxmlformats.org/markup-compatibility/2006">
-        <mc:Choice xmlns:a14="http://schemas.microsoft.com/office/drawing/2010/main" Requires="a14">
+      <mc:AlternateContent xmlns:mc="http://schemas.openxmlformats.org/markup-compatibility/2006" xmlns:a14="http://schemas.microsoft.com/office/drawing/2010/main">
+        <mc:Choice Requires="a14">
           <p:sp>
             <p:nvSpPr>
               <p:cNvPr id="42" name="TextBox 41">
@@ -4124,6 +4126,7 @@
               </a:bodyPr>
               <a:lstStyle/>
               <a:p>
+                <a:pPr/>
                 <a14:m>
                   <m:oMathPara xmlns:m="http://schemas.openxmlformats.org/officeDocument/2006/math">
                     <m:oMathParaPr>
@@ -4151,7 +4154,7 @@
             </p:txBody>
           </p:sp>
         </mc:Choice>
-        <mc:Fallback>
+        <mc:Fallback xmlns="">
           <p:sp>
             <p:nvSpPr>
               <p:cNvPr id="42" name="TextBox 41">
@@ -4238,8 +4241,8 @@
           </a:fontRef>
         </p:style>
       </p:cxnSp>
-      <mc:AlternateContent xmlns:mc="http://schemas.openxmlformats.org/markup-compatibility/2006">
-        <mc:Choice xmlns:a14="http://schemas.microsoft.com/office/drawing/2010/main" Requires="a14">
+      <mc:AlternateContent xmlns:mc="http://schemas.openxmlformats.org/markup-compatibility/2006" xmlns:a14="http://schemas.microsoft.com/office/drawing/2010/main">
+        <mc:Choice Requires="a14">
           <p:sp>
             <p:nvSpPr>
               <p:cNvPr id="46" name="TextBox 45">
@@ -4268,6 +4271,7 @@
               </a:bodyPr>
               <a:lstStyle/>
               <a:p>
+                <a:pPr/>
                 <a14:m>
                   <m:oMathPara xmlns:m="http://schemas.openxmlformats.org/officeDocument/2006/math">
                     <m:oMathParaPr>
@@ -4295,7 +4299,7 @@
             </p:txBody>
           </p:sp>
         </mc:Choice>
-        <mc:Fallback>
+        <mc:Fallback xmlns="">
           <p:sp>
             <p:nvSpPr>
               <p:cNvPr id="46" name="TextBox 45">
@@ -4340,8 +4344,8 @@
           </p:sp>
         </mc:Fallback>
       </mc:AlternateContent>
-      <mc:AlternateContent xmlns:mc="http://schemas.openxmlformats.org/markup-compatibility/2006">
-        <mc:Choice xmlns:a14="http://schemas.microsoft.com/office/drawing/2010/main" Requires="a14">
+      <mc:AlternateContent xmlns:mc="http://schemas.openxmlformats.org/markup-compatibility/2006" xmlns:a14="http://schemas.microsoft.com/office/drawing/2010/main">
+        <mc:Choice Requires="a14">
           <p:sp>
             <p:nvSpPr>
               <p:cNvPr id="47" name="TextBox 46">
@@ -4370,6 +4374,7 @@
               </a:bodyPr>
               <a:lstStyle/>
               <a:p>
+                <a:pPr/>
                 <a14:m>
                   <m:oMathPara xmlns:m="http://schemas.openxmlformats.org/officeDocument/2006/math">
                     <m:oMathParaPr>
@@ -4397,7 +4402,7 @@
             </p:txBody>
           </p:sp>
         </mc:Choice>
-        <mc:Fallback>
+        <mc:Fallback xmlns="">
           <p:sp>
             <p:nvSpPr>
               <p:cNvPr id="47" name="TextBox 46">
@@ -4442,8 +4447,8 @@
           </p:sp>
         </mc:Fallback>
       </mc:AlternateContent>
-      <mc:AlternateContent xmlns:mc="http://schemas.openxmlformats.org/markup-compatibility/2006">
-        <mc:Choice xmlns:a14="http://schemas.microsoft.com/office/drawing/2010/main" Requires="a14">
+      <mc:AlternateContent xmlns:mc="http://schemas.openxmlformats.org/markup-compatibility/2006" xmlns:a14="http://schemas.microsoft.com/office/drawing/2010/main">
+        <mc:Choice Requires="a14">
           <p:sp>
             <p:nvSpPr>
               <p:cNvPr id="48" name="TextBox 47">
@@ -4472,6 +4477,7 @@
               </a:bodyPr>
               <a:lstStyle/>
               <a:p>
+                <a:pPr/>
                 <a14:m>
                   <m:oMathPara xmlns:m="http://schemas.openxmlformats.org/officeDocument/2006/math">
                     <m:oMathParaPr>
@@ -4499,7 +4505,7 @@
             </p:txBody>
           </p:sp>
         </mc:Choice>
-        <mc:Fallback>
+        <mc:Fallback xmlns="">
           <p:sp>
             <p:nvSpPr>
               <p:cNvPr id="48" name="TextBox 47">
@@ -4638,8 +4644,8 @@
           </a:fontRef>
         </p:style>
       </p:cxnSp>
-      <mc:AlternateContent xmlns:mc="http://schemas.openxmlformats.org/markup-compatibility/2006">
-        <mc:Choice xmlns:a14="http://schemas.microsoft.com/office/drawing/2010/main" Requires="a14">
+      <mc:AlternateContent xmlns:mc="http://schemas.openxmlformats.org/markup-compatibility/2006" xmlns:a14="http://schemas.microsoft.com/office/drawing/2010/main">
+        <mc:Choice Requires="a14">
           <p:sp>
             <p:nvSpPr>
               <p:cNvPr id="67" name="TextBox 66">
@@ -4668,6 +4674,7 @@
               </a:bodyPr>
               <a:lstStyle/>
               <a:p>
+                <a:pPr/>
                 <a14:m>
                   <m:oMathPara xmlns:m="http://schemas.openxmlformats.org/officeDocument/2006/math">
                     <m:oMathParaPr>
@@ -4710,7 +4717,7 @@
             </p:txBody>
           </p:sp>
         </mc:Choice>
-        <mc:Fallback>
+        <mc:Fallback xmlns="">
           <p:sp>
             <p:nvSpPr>
               <p:cNvPr id="67" name="TextBox 66">
@@ -4911,8 +4918,8 @@
           </a:p>
         </p:txBody>
       </p:sp>
-      <mc:AlternateContent xmlns:mc="http://schemas.openxmlformats.org/markup-compatibility/2006">
-        <mc:Choice xmlns:a14="http://schemas.microsoft.com/office/drawing/2010/main" Requires="a14">
+      <mc:AlternateContent xmlns:mc="http://schemas.openxmlformats.org/markup-compatibility/2006" xmlns:a14="http://schemas.microsoft.com/office/drawing/2010/main">
+        <mc:Choice Requires="a14">
           <p:sp>
             <p:nvSpPr>
               <p:cNvPr id="73" name="TextBox 72">
@@ -4941,6 +4948,7 @@
               </a:bodyPr>
               <a:lstStyle/>
               <a:p>
+                <a:pPr/>
                 <a14:m>
                   <m:oMathPara xmlns:m="http://schemas.openxmlformats.org/officeDocument/2006/math">
                     <m:oMathParaPr>
@@ -4968,7 +4976,7 @@
             </p:txBody>
           </p:sp>
         </mc:Choice>
-        <mc:Fallback>
+        <mc:Fallback xmlns="">
           <p:sp>
             <p:nvSpPr>
               <p:cNvPr id="73" name="TextBox 72">
@@ -5013,8 +5021,8 @@
           </p:sp>
         </mc:Fallback>
       </mc:AlternateContent>
-      <mc:AlternateContent xmlns:mc="http://schemas.openxmlformats.org/markup-compatibility/2006">
-        <mc:Choice xmlns:a14="http://schemas.microsoft.com/office/drawing/2010/main" Requires="a14">
+      <mc:AlternateContent xmlns:mc="http://schemas.openxmlformats.org/markup-compatibility/2006" xmlns:a14="http://schemas.microsoft.com/office/drawing/2010/main">
+        <mc:Choice Requires="a14">
           <p:sp>
             <p:nvSpPr>
               <p:cNvPr id="74" name="TextBox 73">
@@ -5043,6 +5051,7 @@
               </a:bodyPr>
               <a:lstStyle/>
               <a:p>
+                <a:pPr/>
                 <a14:m>
                   <m:oMathPara xmlns:m="http://schemas.openxmlformats.org/officeDocument/2006/math">
                     <m:oMathParaPr>
@@ -5070,7 +5079,7 @@
             </p:txBody>
           </p:sp>
         </mc:Choice>
-        <mc:Fallback>
+        <mc:Fallback xmlns="">
           <p:sp>
             <p:nvSpPr>
               <p:cNvPr id="74" name="TextBox 73">
@@ -5115,8 +5124,8 @@
           </p:sp>
         </mc:Fallback>
       </mc:AlternateContent>
-      <mc:AlternateContent xmlns:mc="http://schemas.openxmlformats.org/markup-compatibility/2006">
-        <mc:Choice xmlns:a14="http://schemas.microsoft.com/office/drawing/2010/main" Requires="a14">
+      <mc:AlternateContent xmlns:mc="http://schemas.openxmlformats.org/markup-compatibility/2006" xmlns:a14="http://schemas.microsoft.com/office/drawing/2010/main">
+        <mc:Choice Requires="a14">
           <p:sp>
             <p:nvSpPr>
               <p:cNvPr id="75" name="TextBox 74">
@@ -5145,6 +5154,7 @@
               </a:bodyPr>
               <a:lstStyle/>
               <a:p>
+                <a:pPr/>
                 <a14:m>
                   <m:oMathPara xmlns:m="http://schemas.openxmlformats.org/officeDocument/2006/math">
                     <m:oMathParaPr>
@@ -5172,7 +5182,7 @@
             </p:txBody>
           </p:sp>
         </mc:Choice>
-        <mc:Fallback>
+        <mc:Fallback xmlns="">
           <p:sp>
             <p:nvSpPr>
               <p:cNvPr id="75" name="TextBox 74">
@@ -5217,8 +5227,8 @@
           </p:sp>
         </mc:Fallback>
       </mc:AlternateContent>
-      <mc:AlternateContent xmlns:mc="http://schemas.openxmlformats.org/markup-compatibility/2006">
-        <mc:Choice xmlns:a14="http://schemas.microsoft.com/office/drawing/2010/main" Requires="a14">
+      <mc:AlternateContent xmlns:mc="http://schemas.openxmlformats.org/markup-compatibility/2006" xmlns:a14="http://schemas.microsoft.com/office/drawing/2010/main">
+        <mc:Choice Requires="a14">
           <p:sp>
             <p:nvSpPr>
               <p:cNvPr id="76" name="TextBox 75">
@@ -5247,6 +5257,7 @@
               </a:bodyPr>
               <a:lstStyle/>
               <a:p>
+                <a:pPr/>
                 <a14:m>
                   <m:oMathPara xmlns:m="http://schemas.openxmlformats.org/officeDocument/2006/math">
                     <m:oMathParaPr>
@@ -5274,7 +5285,7 @@
             </p:txBody>
           </p:sp>
         </mc:Choice>
-        <mc:Fallback>
+        <mc:Fallback xmlns="">
           <p:sp>
             <p:nvSpPr>
               <p:cNvPr id="76" name="TextBox 75">
@@ -5323,6 +5334,774 @@
     <p:extLst>
       <p:ext uri="{BB962C8B-B14F-4D97-AF65-F5344CB8AC3E}">
         <p14:creationId xmlns:p14="http://schemas.microsoft.com/office/powerpoint/2010/main" val="3817910402"/>
+      </p:ext>
+    </p:extLst>
+  </p:cSld>
+  <p:clrMapOvr>
+    <a:masterClrMapping/>
+  </p:clrMapOvr>
+</p:sld>
+</file>
+
+<file path=ppt/slides/slide11.xml><?xml version="1.0" encoding="utf-8"?>
+<p:sld xmlns:a="http://schemas.openxmlformats.org/drawingml/2006/main" xmlns:r="http://schemas.openxmlformats.org/officeDocument/2006/relationships" xmlns:p="http://schemas.openxmlformats.org/presentationml/2006/main">
+  <p:cSld>
+    <p:spTree>
+      <p:nvGrpSpPr>
+        <p:cNvPr id="1" name=""/>
+        <p:cNvGrpSpPr/>
+        <p:nvPr/>
+      </p:nvGrpSpPr>
+      <p:grpSpPr>
+        <a:xfrm>
+          <a:off x="0" y="0"/>
+          <a:ext cx="0" cy="0"/>
+          <a:chOff x="0" y="0"/>
+          <a:chExt cx="0" cy="0"/>
+        </a:xfrm>
+      </p:grpSpPr>
+      <p:sp>
+        <p:nvSpPr>
+          <p:cNvPr id="2" name="Isosceles Triangle 1">
+            <a:extLst>
+              <a:ext uri="{FF2B5EF4-FFF2-40B4-BE49-F238E27FC236}">
+                <a16:creationId xmlns:a16="http://schemas.microsoft.com/office/drawing/2014/main" id="{1347EAE8-1A0A-476A-B1B2-A00AEF53D148}"/>
+              </a:ext>
+            </a:extLst>
+          </p:cNvPr>
+          <p:cNvSpPr/>
+          <p:nvPr/>
+        </p:nvSpPr>
+        <p:spPr>
+          <a:xfrm rot="18029815">
+            <a:off x="3725801" y="2750862"/>
+            <a:ext cx="2758623" cy="2341317"/>
+          </a:xfrm>
+          <a:prstGeom prst="triangle">
+            <a:avLst/>
+          </a:prstGeom>
+          <a:gradFill flip="none" rotWithShape="1">
+            <a:gsLst>
+              <a:gs pos="0">
+                <a:schemeClr val="accent3">
+                  <a:lumMod val="40000"/>
+                  <a:lumOff val="60000"/>
+                </a:schemeClr>
+              </a:gs>
+              <a:gs pos="46000">
+                <a:schemeClr val="accent3">
+                  <a:lumMod val="95000"/>
+                  <a:lumOff val="5000"/>
+                </a:schemeClr>
+              </a:gs>
+              <a:gs pos="100000">
+                <a:schemeClr val="accent3">
+                  <a:lumMod val="60000"/>
+                </a:schemeClr>
+              </a:gs>
+            </a:gsLst>
+            <a:path path="circle">
+              <a:fillToRect l="50000" t="130000" r="50000" b="-30000"/>
+            </a:path>
+            <a:tileRect/>
+          </a:gradFill>
+          <a:ln>
+            <a:solidFill>
+              <a:schemeClr val="tx1"/>
+            </a:solidFill>
+          </a:ln>
+        </p:spPr>
+        <p:style>
+          <a:lnRef idx="2">
+            <a:schemeClr val="accent1">
+              <a:shade val="50000"/>
+            </a:schemeClr>
+          </a:lnRef>
+          <a:fillRef idx="1">
+            <a:schemeClr val="accent1"/>
+          </a:fillRef>
+          <a:effectRef idx="0">
+            <a:schemeClr val="accent1"/>
+          </a:effectRef>
+          <a:fontRef idx="minor">
+            <a:schemeClr val="lt1"/>
+          </a:fontRef>
+        </p:style>
+        <p:txBody>
+          <a:bodyPr rtlCol="0" anchor="ctr"/>
+          <a:lstStyle/>
+          <a:p>
+            <a:pPr algn="ctr"/>
+            <a:endParaRPr lang="en-US" dirty="0"/>
+          </a:p>
+        </p:txBody>
+      </p:sp>
+      <p:sp>
+        <p:nvSpPr>
+          <p:cNvPr id="3" name="Oval 2">
+            <a:extLst>
+              <a:ext uri="{FF2B5EF4-FFF2-40B4-BE49-F238E27FC236}">
+                <a16:creationId xmlns:a16="http://schemas.microsoft.com/office/drawing/2014/main" id="{30886648-0281-43EC-B689-4B10DE3FA965}"/>
+              </a:ext>
+            </a:extLst>
+          </p:cNvPr>
+          <p:cNvSpPr/>
+          <p:nvPr/>
+        </p:nvSpPr>
+        <p:spPr>
+          <a:xfrm>
+            <a:off x="4084321" y="2948338"/>
+            <a:ext cx="2729488" cy="696592"/>
+          </a:xfrm>
+          <a:prstGeom prst="ellipse">
+            <a:avLst/>
+          </a:prstGeom>
+          <a:gradFill>
+            <a:gsLst>
+              <a:gs pos="0">
+                <a:schemeClr val="accent3">
+                  <a:lumMod val="40000"/>
+                  <a:lumOff val="60000"/>
+                </a:schemeClr>
+              </a:gs>
+              <a:gs pos="46000">
+                <a:schemeClr val="accent3">
+                  <a:lumMod val="95000"/>
+                  <a:lumOff val="5000"/>
+                </a:schemeClr>
+              </a:gs>
+              <a:gs pos="100000">
+                <a:schemeClr val="accent3">
+                  <a:lumMod val="60000"/>
+                </a:schemeClr>
+              </a:gs>
+            </a:gsLst>
+            <a:path path="circle">
+              <a:fillToRect l="50000" t="130000" r="50000" b="-30000"/>
+            </a:path>
+          </a:gradFill>
+          <a:ln>
+            <a:solidFill>
+              <a:schemeClr val="tx1"/>
+            </a:solidFill>
+          </a:ln>
+        </p:spPr>
+        <p:style>
+          <a:lnRef idx="2">
+            <a:schemeClr val="accent1">
+              <a:shade val="50000"/>
+            </a:schemeClr>
+          </a:lnRef>
+          <a:fillRef idx="1">
+            <a:schemeClr val="accent1"/>
+          </a:fillRef>
+          <a:effectRef idx="0">
+            <a:schemeClr val="accent1"/>
+          </a:effectRef>
+          <a:fontRef idx="minor">
+            <a:schemeClr val="lt1"/>
+          </a:fontRef>
+        </p:style>
+        <p:txBody>
+          <a:bodyPr rtlCol="0" anchor="ctr"/>
+          <a:lstStyle/>
+          <a:p>
+            <a:pPr algn="ctr"/>
+            <a:endParaRPr lang="en-US" dirty="0"/>
+          </a:p>
+        </p:txBody>
+      </p:sp>
+      <p:sp>
+        <p:nvSpPr>
+          <p:cNvPr id="12" name="Arc 11">
+            <a:extLst>
+              <a:ext uri="{FF2B5EF4-FFF2-40B4-BE49-F238E27FC236}">
+                <a16:creationId xmlns:a16="http://schemas.microsoft.com/office/drawing/2014/main" id="{D28917E4-3F4F-420E-9444-1CF802C4467D}"/>
+              </a:ext>
+            </a:extLst>
+          </p:cNvPr>
+          <p:cNvSpPr/>
+          <p:nvPr/>
+        </p:nvSpPr>
+        <p:spPr>
+          <a:xfrm>
+            <a:off x="4998720" y="5377180"/>
+            <a:ext cx="847344" cy="665355"/>
+          </a:xfrm>
+          <a:prstGeom prst="arc">
+            <a:avLst>
+              <a:gd name="adj1" fmla="val 16200000"/>
+              <a:gd name="adj2" fmla="val 17946466"/>
+            </a:avLst>
+          </a:prstGeom>
+          <a:ln w="22225">
+            <a:solidFill>
+              <a:schemeClr val="tx1"/>
+            </a:solidFill>
+          </a:ln>
+        </p:spPr>
+        <p:style>
+          <a:lnRef idx="1">
+            <a:schemeClr val="accent1"/>
+          </a:lnRef>
+          <a:fillRef idx="0">
+            <a:schemeClr val="accent1"/>
+          </a:fillRef>
+          <a:effectRef idx="0">
+            <a:schemeClr val="accent1"/>
+          </a:effectRef>
+          <a:fontRef idx="minor">
+            <a:schemeClr val="tx1"/>
+          </a:fontRef>
+        </p:style>
+        <p:txBody>
+          <a:bodyPr rtlCol="0" anchor="ctr"/>
+          <a:lstStyle/>
+          <a:p>
+            <a:pPr algn="ctr"/>
+            <a:endParaRPr lang="en-US" dirty="0"/>
+          </a:p>
+        </p:txBody>
+      </p:sp>
+      <mc:AlternateContent xmlns:mc="http://schemas.openxmlformats.org/markup-compatibility/2006">
+        <mc:Choice xmlns:a14="http://schemas.microsoft.com/office/drawing/2010/main" Requires="a14">
+          <p:sp>
+            <p:nvSpPr>
+              <p:cNvPr id="13" name="TextBox 12">
+                <a:extLst>
+                  <a:ext uri="{FF2B5EF4-FFF2-40B4-BE49-F238E27FC236}">
+                    <a16:creationId xmlns:a16="http://schemas.microsoft.com/office/drawing/2014/main" id="{59FB015B-81B6-49E2-B036-6A7313221D29}"/>
+                  </a:ext>
+                </a:extLst>
+              </p:cNvPr>
+              <p:cNvSpPr txBox="1"/>
+              <p:nvPr/>
+            </p:nvSpPr>
+            <p:spPr>
+              <a:xfrm>
+                <a:off x="5449065" y="5038758"/>
+                <a:ext cx="197746" cy="276999"/>
+              </a:xfrm>
+              <a:prstGeom prst="rect">
+                <a:avLst/>
+              </a:prstGeom>
+              <a:noFill/>
+            </p:spPr>
+            <p:txBody>
+              <a:bodyPr wrap="none" lIns="0" tIns="0" rIns="0" bIns="0" rtlCol="0">
+                <a:spAutoFit/>
+              </a:bodyPr>
+              <a:lstStyle/>
+              <a:p>
+                <a14:m>
+                  <m:oMathPara xmlns:m="http://schemas.openxmlformats.org/officeDocument/2006/math">
+                    <m:oMathParaPr>
+                      <m:jc m:val="centerGroup"/>
+                    </m:oMathParaPr>
+                    <m:oMath xmlns:m="http://schemas.openxmlformats.org/officeDocument/2006/math">
+                      <m:r>
+                        <a:rPr lang="en-US" i="1" smtClean="0">
+                          <a:latin typeface="Cambria Math" panose="02040503050406030204" pitchFamily="18" charset="0"/>
+                          <a:ea typeface="Cambria Math" panose="02040503050406030204" pitchFamily="18" charset="0"/>
+                        </a:rPr>
+                        <m:t>𝛼</m:t>
+                      </m:r>
+                    </m:oMath>
+                  </m:oMathPara>
+                </a14:m>
+                <a:endParaRPr lang="en-US" dirty="0"/>
+              </a:p>
+            </p:txBody>
+          </p:sp>
+        </mc:Choice>
+        <mc:Fallback>
+          <p:sp>
+            <p:nvSpPr>
+              <p:cNvPr id="13" name="TextBox 12">
+                <a:extLst>
+                  <a:ext uri="{FF2B5EF4-FFF2-40B4-BE49-F238E27FC236}">
+                    <a16:creationId xmlns:a16="http://schemas.microsoft.com/office/drawing/2014/main" id="{59FB015B-81B6-49E2-B036-6A7313221D29}"/>
+                  </a:ext>
+                </a:extLst>
+              </p:cNvPr>
+              <p:cNvSpPr txBox="1">
+                <a:spLocks noRot="1" noChangeAspect="1" noMove="1" noResize="1" noEditPoints="1" noAdjustHandles="1" noChangeArrowheads="1" noChangeShapeType="1" noTextEdit="1"/>
+              </p:cNvSpPr>
+              <p:nvPr/>
+            </p:nvSpPr>
+            <p:spPr>
+              <a:xfrm>
+                <a:off x="5449065" y="5038758"/>
+                <a:ext cx="197746" cy="276999"/>
+              </a:xfrm>
+              <a:prstGeom prst="rect">
+                <a:avLst/>
+              </a:prstGeom>
+              <a:blipFill>
+                <a:blip r:embed="rId2"/>
+                <a:stretch>
+                  <a:fillRect l="-18750" r="-15625"/>
+                </a:stretch>
+              </a:blipFill>
+            </p:spPr>
+            <p:txBody>
+              <a:bodyPr/>
+              <a:lstStyle/>
+              <a:p>
+                <a:r>
+                  <a:rPr lang="en-US">
+                    <a:noFill/>
+                  </a:rPr>
+                  <a:t> </a:t>
+                </a:r>
+              </a:p>
+            </p:txBody>
+          </p:sp>
+        </mc:Fallback>
+      </mc:AlternateContent>
+      <p:sp>
+        <p:nvSpPr>
+          <p:cNvPr id="17" name="Oval 16">
+            <a:extLst>
+              <a:ext uri="{FF2B5EF4-FFF2-40B4-BE49-F238E27FC236}">
+                <a16:creationId xmlns:a16="http://schemas.microsoft.com/office/drawing/2014/main" id="{D37DFEEC-2C96-40FD-9CAF-4B48796EB866}"/>
+              </a:ext>
+            </a:extLst>
+          </p:cNvPr>
+          <p:cNvSpPr/>
+          <p:nvPr/>
+        </p:nvSpPr>
+        <p:spPr>
+          <a:xfrm>
+            <a:off x="4005522" y="2500635"/>
+            <a:ext cx="3084832" cy="713832"/>
+          </a:xfrm>
+          <a:prstGeom prst="ellipse">
+            <a:avLst/>
+          </a:prstGeom>
+          <a:gradFill>
+            <a:gsLst>
+              <a:gs pos="0">
+                <a:schemeClr val="accent3">
+                  <a:lumMod val="40000"/>
+                  <a:lumOff val="60000"/>
+                </a:schemeClr>
+              </a:gs>
+              <a:gs pos="46000">
+                <a:schemeClr val="accent3">
+                  <a:lumMod val="95000"/>
+                  <a:lumOff val="5000"/>
+                </a:schemeClr>
+              </a:gs>
+              <a:gs pos="100000">
+                <a:schemeClr val="accent3">
+                  <a:lumMod val="60000"/>
+                </a:schemeClr>
+              </a:gs>
+            </a:gsLst>
+            <a:path path="circle">
+              <a:fillToRect l="50000" t="130000" r="50000" b="-30000"/>
+            </a:path>
+          </a:gradFill>
+          <a:ln>
+            <a:solidFill>
+              <a:schemeClr val="tx1"/>
+            </a:solidFill>
+          </a:ln>
+        </p:spPr>
+        <p:style>
+          <a:lnRef idx="2">
+            <a:schemeClr val="accent1">
+              <a:shade val="50000"/>
+            </a:schemeClr>
+          </a:lnRef>
+          <a:fillRef idx="1">
+            <a:schemeClr val="accent1"/>
+          </a:fillRef>
+          <a:effectRef idx="0">
+            <a:schemeClr val="accent1"/>
+          </a:effectRef>
+          <a:fontRef idx="minor">
+            <a:schemeClr val="lt1"/>
+          </a:fontRef>
+        </p:style>
+        <p:txBody>
+          <a:bodyPr rtlCol="0" anchor="ctr"/>
+          <a:lstStyle/>
+          <a:p>
+            <a:pPr algn="ctr"/>
+            <a:endParaRPr lang="en-US" dirty="0"/>
+          </a:p>
+        </p:txBody>
+      </p:sp>
+      <p:cxnSp>
+        <p:nvCxnSpPr>
+          <p:cNvPr id="7" name="Straight Connector 6">
+            <a:extLst>
+              <a:ext uri="{FF2B5EF4-FFF2-40B4-BE49-F238E27FC236}">
+                <a16:creationId xmlns:a16="http://schemas.microsoft.com/office/drawing/2014/main" id="{CF3DE263-94E4-4D19-9CF9-D002AF360780}"/>
+              </a:ext>
+            </a:extLst>
+          </p:cNvPr>
+          <p:cNvCxnSpPr>
+            <a:cxnSpLocks/>
+          </p:cNvCxnSpPr>
+          <p:nvPr/>
+        </p:nvCxnSpPr>
+        <p:spPr>
+          <a:xfrm>
+            <a:off x="5547938" y="2763520"/>
+            <a:ext cx="1492993" cy="184818"/>
+          </a:xfrm>
+          <a:prstGeom prst="line">
+            <a:avLst/>
+          </a:prstGeom>
+          <a:ln w="19050">
+            <a:solidFill>
+              <a:schemeClr val="tx1"/>
+            </a:solidFill>
+          </a:ln>
+        </p:spPr>
+        <p:style>
+          <a:lnRef idx="1">
+            <a:schemeClr val="accent1"/>
+          </a:lnRef>
+          <a:fillRef idx="0">
+            <a:schemeClr val="accent1"/>
+          </a:fillRef>
+          <a:effectRef idx="0">
+            <a:schemeClr val="accent1"/>
+          </a:effectRef>
+          <a:fontRef idx="minor">
+            <a:schemeClr val="tx1"/>
+          </a:fontRef>
+        </p:style>
+      </p:cxnSp>
+      <p:cxnSp>
+        <p:nvCxnSpPr>
+          <p:cNvPr id="5" name="Straight Connector 4">
+            <a:extLst>
+              <a:ext uri="{FF2B5EF4-FFF2-40B4-BE49-F238E27FC236}">
+                <a16:creationId xmlns:a16="http://schemas.microsoft.com/office/drawing/2014/main" id="{6A2F2A0B-07B8-4B4D-9D56-85C750C9F634}"/>
+              </a:ext>
+            </a:extLst>
+          </p:cNvPr>
+          <p:cNvCxnSpPr>
+            <a:cxnSpLocks/>
+          </p:cNvCxnSpPr>
+          <p:nvPr/>
+        </p:nvCxnSpPr>
+        <p:spPr>
+          <a:xfrm flipH="1">
+            <a:off x="5413829" y="2763520"/>
+            <a:ext cx="126529" cy="2940593"/>
+          </a:xfrm>
+          <a:prstGeom prst="line">
+            <a:avLst/>
+          </a:prstGeom>
+          <a:ln w="19050">
+            <a:solidFill>
+              <a:schemeClr val="tx1"/>
+            </a:solidFill>
+            <a:prstDash val="sysDash"/>
+          </a:ln>
+        </p:spPr>
+        <p:style>
+          <a:lnRef idx="1">
+            <a:schemeClr val="accent1"/>
+          </a:lnRef>
+          <a:fillRef idx="0">
+            <a:schemeClr val="accent1"/>
+          </a:fillRef>
+          <a:effectRef idx="0">
+            <a:schemeClr val="accent1"/>
+          </a:effectRef>
+          <a:fontRef idx="minor">
+            <a:schemeClr val="tx1"/>
+          </a:fontRef>
+        </p:style>
+      </p:cxnSp>
+      <p:cxnSp>
+        <p:nvCxnSpPr>
+          <p:cNvPr id="22" name="Straight Connector 21">
+            <a:extLst>
+              <a:ext uri="{FF2B5EF4-FFF2-40B4-BE49-F238E27FC236}">
+                <a16:creationId xmlns:a16="http://schemas.microsoft.com/office/drawing/2014/main" id="{147DF0A1-52A7-4FC2-A9FE-662B9BAB1BA1}"/>
+              </a:ext>
+            </a:extLst>
+          </p:cNvPr>
+          <p:cNvCxnSpPr>
+            <a:cxnSpLocks/>
+            <a:stCxn id="2" idx="2"/>
+          </p:cNvCxnSpPr>
+          <p:nvPr/>
+        </p:nvCxnSpPr>
+        <p:spPr>
+          <a:xfrm flipV="1">
+            <a:off x="5413828" y="2948338"/>
+            <a:ext cx="1627103" cy="2755775"/>
+          </a:xfrm>
+          <a:prstGeom prst="line">
+            <a:avLst/>
+          </a:prstGeom>
+          <a:ln w="19050">
+            <a:solidFill>
+              <a:schemeClr val="tx1"/>
+            </a:solidFill>
+          </a:ln>
+        </p:spPr>
+        <p:style>
+          <a:lnRef idx="1">
+            <a:schemeClr val="accent1"/>
+          </a:lnRef>
+          <a:fillRef idx="0">
+            <a:schemeClr val="accent1"/>
+          </a:fillRef>
+          <a:effectRef idx="0">
+            <a:schemeClr val="accent1"/>
+          </a:effectRef>
+          <a:fontRef idx="minor">
+            <a:schemeClr val="tx1"/>
+          </a:fontRef>
+        </p:style>
+      </p:cxnSp>
+      <mc:AlternateContent xmlns:mc="http://schemas.openxmlformats.org/markup-compatibility/2006">
+        <mc:Choice xmlns:a14="http://schemas.microsoft.com/office/drawing/2010/main" Requires="a14">
+          <p:sp>
+            <p:nvSpPr>
+              <p:cNvPr id="37" name="TextBox 36">
+                <a:extLst>
+                  <a:ext uri="{FF2B5EF4-FFF2-40B4-BE49-F238E27FC236}">
+                    <a16:creationId xmlns:a16="http://schemas.microsoft.com/office/drawing/2014/main" id="{B481C3B8-DF4D-4BD0-9990-9D3380ADA764}"/>
+                  </a:ext>
+                </a:extLst>
+              </p:cNvPr>
+              <p:cNvSpPr txBox="1"/>
+              <p:nvPr/>
+            </p:nvSpPr>
+            <p:spPr>
+              <a:xfrm>
+                <a:off x="6298047" y="2578930"/>
+                <a:ext cx="456343" cy="276999"/>
+              </a:xfrm>
+              <a:prstGeom prst="rect">
+                <a:avLst/>
+              </a:prstGeom>
+              <a:noFill/>
+            </p:spPr>
+            <p:txBody>
+              <a:bodyPr wrap="none" lIns="0" tIns="0" rIns="0" bIns="0" rtlCol="0">
+                <a:spAutoFit/>
+              </a:bodyPr>
+              <a:lstStyle/>
+              <a:p>
+                <a14:m>
+                  <m:oMathPara xmlns:m="http://schemas.openxmlformats.org/officeDocument/2006/math">
+                    <m:oMathParaPr>
+                      <m:jc m:val="centerGroup"/>
+                    </m:oMathParaPr>
+                    <m:oMath xmlns:m="http://schemas.openxmlformats.org/officeDocument/2006/math">
+                      <m:r>
+                        <a:rPr lang="en-US" b="0" i="1" smtClean="0">
+                          <a:latin typeface="Cambria Math" panose="02040503050406030204" pitchFamily="18" charset="0"/>
+                        </a:rPr>
+                        <m:t>𝑟</m:t>
+                      </m:r>
+                      <m:r>
+                        <a:rPr lang="en-US" b="0" i="1" smtClean="0">
+                          <a:latin typeface="Cambria Math" panose="02040503050406030204" pitchFamily="18" charset="0"/>
+                        </a:rPr>
+                        <m:t>(</m:t>
+                      </m:r>
+                      <m:r>
+                        <a:rPr lang="en-US" b="0" i="1" smtClean="0">
+                          <a:latin typeface="Cambria Math" panose="02040503050406030204" pitchFamily="18" charset="0"/>
+                        </a:rPr>
+                        <m:t>𝑡</m:t>
+                      </m:r>
+                      <m:r>
+                        <a:rPr lang="en-US" b="0" i="1" smtClean="0">
+                          <a:latin typeface="Cambria Math" panose="02040503050406030204" pitchFamily="18" charset="0"/>
+                        </a:rPr>
+                        <m:t>)</m:t>
+                      </m:r>
+                    </m:oMath>
+                  </m:oMathPara>
+                </a14:m>
+                <a:endParaRPr lang="en-US" dirty="0"/>
+              </a:p>
+            </p:txBody>
+          </p:sp>
+        </mc:Choice>
+        <mc:Fallback>
+          <p:sp>
+            <p:nvSpPr>
+              <p:cNvPr id="37" name="TextBox 36">
+                <a:extLst>
+                  <a:ext uri="{FF2B5EF4-FFF2-40B4-BE49-F238E27FC236}">
+                    <a16:creationId xmlns:a16="http://schemas.microsoft.com/office/drawing/2014/main" id="{B481C3B8-DF4D-4BD0-9990-9D3380ADA764}"/>
+                  </a:ext>
+                </a:extLst>
+              </p:cNvPr>
+              <p:cNvSpPr txBox="1">
+                <a:spLocks noRot="1" noChangeAspect="1" noMove="1" noResize="1" noEditPoints="1" noAdjustHandles="1" noChangeArrowheads="1" noChangeShapeType="1" noTextEdit="1"/>
+              </p:cNvSpPr>
+              <p:nvPr/>
+            </p:nvSpPr>
+            <p:spPr>
+              <a:xfrm>
+                <a:off x="6298047" y="2578930"/>
+                <a:ext cx="456343" cy="276999"/>
+              </a:xfrm>
+              <a:prstGeom prst="rect">
+                <a:avLst/>
+              </a:prstGeom>
+              <a:blipFill>
+                <a:blip r:embed="rId3"/>
+                <a:stretch>
+                  <a:fillRect l="-6667" t="-2222" r="-18667" b="-35556"/>
+                </a:stretch>
+              </a:blipFill>
+            </p:spPr>
+            <p:txBody>
+              <a:bodyPr/>
+              <a:lstStyle/>
+              <a:p>
+                <a:r>
+                  <a:rPr lang="en-US">
+                    <a:noFill/>
+                  </a:rPr>
+                  <a:t> </a:t>
+                </a:r>
+              </a:p>
+            </p:txBody>
+          </p:sp>
+        </mc:Fallback>
+      </mc:AlternateContent>
+      <mc:AlternateContent xmlns:mc="http://schemas.openxmlformats.org/markup-compatibility/2006">
+        <mc:Choice xmlns:a14="http://schemas.microsoft.com/office/drawing/2010/main" Requires="a14">
+          <p:sp>
+            <p:nvSpPr>
+              <p:cNvPr id="38" name="TextBox 37">
+                <a:extLst>
+                  <a:ext uri="{FF2B5EF4-FFF2-40B4-BE49-F238E27FC236}">
+                    <a16:creationId xmlns:a16="http://schemas.microsoft.com/office/drawing/2014/main" id="{A6C9CF71-A0FD-4A8E-BD28-E8CA3408F0BD}"/>
+                  </a:ext>
+                </a:extLst>
+              </p:cNvPr>
+              <p:cNvSpPr txBox="1"/>
+              <p:nvPr/>
+            </p:nvSpPr>
+            <p:spPr>
+              <a:xfrm>
+                <a:off x="4963371" y="3987967"/>
+                <a:ext cx="504562" cy="369332"/>
+              </a:xfrm>
+              <a:prstGeom prst="rect">
+                <a:avLst/>
+              </a:prstGeom>
+              <a:noFill/>
+            </p:spPr>
+            <p:txBody>
+              <a:bodyPr wrap="none" lIns="0" tIns="0" rIns="0" bIns="0" rtlCol="0">
+                <a:spAutoFit/>
+              </a:bodyPr>
+              <a:lstStyle/>
+              <a:p>
+                <a14:m>
+                  <m:oMathPara xmlns:m="http://schemas.openxmlformats.org/officeDocument/2006/math">
+                    <m:oMathParaPr>
+                      <m:jc m:val="centerGroup"/>
+                    </m:oMathParaPr>
+                    <m:oMath xmlns:m="http://schemas.openxmlformats.org/officeDocument/2006/math">
+                      <m:sSub>
+                        <m:sSubPr>
+                          <m:ctrlPr>
+                            <a:rPr lang="en-US" sz="2400" i="1" smtClean="0">
+                              <a:latin typeface="Cambria Math" panose="02040503050406030204" pitchFamily="18" charset="0"/>
+                            </a:rPr>
+                          </m:ctrlPr>
+                        </m:sSubPr>
+                        <m:e>
+                          <m:r>
+                            <a:rPr lang="en-US" sz="2400" b="0" i="1" smtClean="0">
+                              <a:latin typeface="Cambria Math" panose="02040503050406030204" pitchFamily="18" charset="0"/>
+                            </a:rPr>
+                            <m:t>𝑣</m:t>
+                          </m:r>
+                        </m:e>
+                        <m:sub>
+                          <m:r>
+                            <a:rPr lang="en-US" sz="2400" b="0" i="1" smtClean="0">
+                              <a:latin typeface="Cambria Math" panose="02040503050406030204" pitchFamily="18" charset="0"/>
+                            </a:rPr>
+                            <m:t>0</m:t>
+                          </m:r>
+                        </m:sub>
+                      </m:sSub>
+                      <m:r>
+                        <a:rPr lang="en-US" sz="2400" b="0" i="1" smtClean="0">
+                          <a:latin typeface="Cambria Math" panose="02040503050406030204" pitchFamily="18" charset="0"/>
+                        </a:rPr>
+                        <m:t>𝑡</m:t>
+                      </m:r>
+                    </m:oMath>
+                  </m:oMathPara>
+                </a14:m>
+                <a:endParaRPr lang="en-US" sz="2400" dirty="0"/>
+              </a:p>
+            </p:txBody>
+          </p:sp>
+        </mc:Choice>
+        <mc:Fallback>
+          <p:sp>
+            <p:nvSpPr>
+              <p:cNvPr id="38" name="TextBox 37">
+                <a:extLst>
+                  <a:ext uri="{FF2B5EF4-FFF2-40B4-BE49-F238E27FC236}">
+                    <a16:creationId xmlns:a16="http://schemas.microsoft.com/office/drawing/2014/main" id="{A6C9CF71-A0FD-4A8E-BD28-E8CA3408F0BD}"/>
+                  </a:ext>
+                </a:extLst>
+              </p:cNvPr>
+              <p:cNvSpPr txBox="1">
+                <a:spLocks noRot="1" noChangeAspect="1" noMove="1" noResize="1" noEditPoints="1" noAdjustHandles="1" noChangeArrowheads="1" noChangeShapeType="1" noTextEdit="1"/>
+              </p:cNvSpPr>
+              <p:nvPr/>
+            </p:nvSpPr>
+            <p:spPr>
+              <a:xfrm>
+                <a:off x="4963371" y="3987967"/>
+                <a:ext cx="504562" cy="369332"/>
+              </a:xfrm>
+              <a:prstGeom prst="rect">
+                <a:avLst/>
+              </a:prstGeom>
+              <a:blipFill>
+                <a:blip r:embed="rId4"/>
+                <a:stretch>
+                  <a:fillRect l="-8434" r="-10843" b="-13115"/>
+                </a:stretch>
+              </a:blipFill>
+            </p:spPr>
+            <p:txBody>
+              <a:bodyPr/>
+              <a:lstStyle/>
+              <a:p>
+                <a:r>
+                  <a:rPr lang="en-US">
+                    <a:noFill/>
+                  </a:rPr>
+                  <a:t> </a:t>
+                </a:r>
+              </a:p>
+            </p:txBody>
+          </p:sp>
+        </mc:Fallback>
+      </mc:AlternateContent>
+    </p:spTree>
+    <p:extLst>
+      <p:ext uri="{BB962C8B-B14F-4D97-AF65-F5344CB8AC3E}">
+        <p14:creationId xmlns:p14="http://schemas.microsoft.com/office/powerpoint/2010/main" val="3718756436"/>
       </p:ext>
     </p:extLst>
   </p:cSld>

</xml_diff>

<commit_message>
Added 1.4.5&1.4.7+Some statements; Updated 1.4.6
</commit_message>
<xml_diff>
--- a/volunteer/Drawings.pptx
+++ b/volunteer/Drawings.pptx
@@ -21,6 +21,7 @@
     <p:sldId id="270" r:id="rId15"/>
     <p:sldId id="271" r:id="rId16"/>
     <p:sldId id="272" r:id="rId17"/>
+    <p:sldId id="273" r:id="rId18"/>
   </p:sldIdLst>
   <p:sldSz cx="12192000" cy="6858000"/>
   <p:notesSz cx="6858000" cy="9144000"/>
@@ -7452,8 +7453,8 @@
           </a:prstGeom>
         </p:spPr>
       </p:pic>
-      <mc:AlternateContent xmlns:mc="http://schemas.openxmlformats.org/markup-compatibility/2006">
-        <mc:Choice xmlns:a14="http://schemas.microsoft.com/office/drawing/2010/main" Requires="a14">
+      <mc:AlternateContent xmlns:mc="http://schemas.openxmlformats.org/markup-compatibility/2006" xmlns:a14="http://schemas.microsoft.com/office/drawing/2010/main">
+        <mc:Choice Requires="a14">
           <p:sp>
             <p:nvSpPr>
               <p:cNvPr id="9" name="TextBox 8">
@@ -7482,6 +7483,7 @@
               </a:bodyPr>
               <a:lstStyle/>
               <a:p>
+                <a:pPr/>
                 <a14:m>
                   <m:oMathPara xmlns:m="http://schemas.openxmlformats.org/officeDocument/2006/math">
                     <m:oMathParaPr>
@@ -7502,7 +7504,7 @@
             </p:txBody>
           </p:sp>
         </mc:Choice>
-        <mc:Fallback>
+        <mc:Fallback xmlns="">
           <p:sp>
             <p:nvSpPr>
               <p:cNvPr id="9" name="TextBox 8">
@@ -7595,8 +7597,8 @@
           </a:prstGeom>
         </p:spPr>
       </p:pic>
-      <mc:AlternateContent xmlns:mc="http://schemas.openxmlformats.org/markup-compatibility/2006">
-        <mc:Choice xmlns:a14="http://schemas.microsoft.com/office/drawing/2010/main" Requires="a14">
+      <mc:AlternateContent xmlns:mc="http://schemas.openxmlformats.org/markup-compatibility/2006" xmlns:a14="http://schemas.microsoft.com/office/drawing/2010/main">
+        <mc:Choice Requires="a14">
           <p:sp>
             <p:nvSpPr>
               <p:cNvPr id="15" name="TextBox 14">
@@ -7625,6 +7627,7 @@
               </a:bodyPr>
               <a:lstStyle/>
               <a:p>
+                <a:pPr/>
                 <a14:m>
                   <m:oMathPara xmlns:m="http://schemas.openxmlformats.org/officeDocument/2006/math">
                     <m:oMathParaPr>
@@ -7645,7 +7648,7 @@
             </p:txBody>
           </p:sp>
         </mc:Choice>
-        <mc:Fallback>
+        <mc:Fallback xmlns="">
           <p:sp>
             <p:nvSpPr>
               <p:cNvPr id="15" name="TextBox 14">
@@ -7799,8 +7802,8 @@
           </a:prstGeom>
         </p:spPr>
       </p:pic>
-      <mc:AlternateContent xmlns:mc="http://schemas.openxmlformats.org/markup-compatibility/2006">
-        <mc:Choice xmlns:a14="http://schemas.microsoft.com/office/drawing/2010/main" Requires="a14">
+      <mc:AlternateContent xmlns:mc="http://schemas.openxmlformats.org/markup-compatibility/2006" xmlns:a14="http://schemas.microsoft.com/office/drawing/2010/main">
+        <mc:Choice Requires="a14">
           <p:sp>
             <p:nvSpPr>
               <p:cNvPr id="4" name="TextBox 3">
@@ -7829,6 +7832,7 @@
               </a:bodyPr>
               <a:lstStyle/>
               <a:p>
+                <a:pPr/>
                 <a14:m>
                   <m:oMathPara xmlns:m="http://schemas.openxmlformats.org/officeDocument/2006/math">
                     <m:oMathParaPr>
@@ -7849,7 +7853,7 @@
             </p:txBody>
           </p:sp>
         </mc:Choice>
-        <mc:Fallback>
+        <mc:Fallback xmlns="">
           <p:sp>
             <p:nvSpPr>
               <p:cNvPr id="4" name="TextBox 3">
@@ -7894,8 +7898,8 @@
           </p:sp>
         </mc:Fallback>
       </mc:AlternateContent>
-      <mc:AlternateContent xmlns:mc="http://schemas.openxmlformats.org/markup-compatibility/2006">
-        <mc:Choice xmlns:a14="http://schemas.microsoft.com/office/drawing/2010/main" Requires="a14">
+      <mc:AlternateContent xmlns:mc="http://schemas.openxmlformats.org/markup-compatibility/2006" xmlns:a14="http://schemas.microsoft.com/office/drawing/2010/main">
+        <mc:Choice Requires="a14">
           <p:sp>
             <p:nvSpPr>
               <p:cNvPr id="5" name="TextBox 4">
@@ -7924,6 +7928,7 @@
               </a:bodyPr>
               <a:lstStyle/>
               <a:p>
+                <a:pPr/>
                 <a14:m>
                   <m:oMathPara xmlns:m="http://schemas.openxmlformats.org/officeDocument/2006/math">
                     <m:oMathParaPr>
@@ -7944,7 +7949,7 @@
             </p:txBody>
           </p:sp>
         </mc:Choice>
-        <mc:Fallback>
+        <mc:Fallback xmlns="">
           <p:sp>
             <p:nvSpPr>
               <p:cNvPr id="5" name="TextBox 4">
@@ -7989,8 +7994,8 @@
           </p:sp>
         </mc:Fallback>
       </mc:AlternateContent>
-      <mc:AlternateContent xmlns:mc="http://schemas.openxmlformats.org/markup-compatibility/2006">
-        <mc:Choice xmlns:a14="http://schemas.microsoft.com/office/drawing/2010/main" Requires="a14">
+      <mc:AlternateContent xmlns:mc="http://schemas.openxmlformats.org/markup-compatibility/2006" xmlns:a14="http://schemas.microsoft.com/office/drawing/2010/main">
+        <mc:Choice Requires="a14">
           <p:sp>
             <p:nvSpPr>
               <p:cNvPr id="6" name="TextBox 5">
@@ -8019,6 +8024,7 @@
               </a:bodyPr>
               <a:lstStyle/>
               <a:p>
+                <a:pPr/>
                 <a14:m>
                   <m:oMathPara xmlns:m="http://schemas.openxmlformats.org/officeDocument/2006/math">
                     <m:oMathParaPr>
@@ -8039,7 +8045,7 @@
             </p:txBody>
           </p:sp>
         </mc:Choice>
-        <mc:Fallback>
+        <mc:Fallback xmlns="">
           <p:sp>
             <p:nvSpPr>
               <p:cNvPr id="6" name="TextBox 5">
@@ -8084,8 +8090,8 @@
           </p:sp>
         </mc:Fallback>
       </mc:AlternateContent>
-      <mc:AlternateContent xmlns:mc="http://schemas.openxmlformats.org/markup-compatibility/2006">
-        <mc:Choice xmlns:a14="http://schemas.microsoft.com/office/drawing/2010/main" Requires="a14">
+      <mc:AlternateContent xmlns:mc="http://schemas.openxmlformats.org/markup-compatibility/2006" xmlns:a14="http://schemas.microsoft.com/office/drawing/2010/main">
+        <mc:Choice Requires="a14">
           <p:sp>
             <p:nvSpPr>
               <p:cNvPr id="7" name="TextBox 6">
@@ -8114,6 +8120,7 @@
               </a:bodyPr>
               <a:lstStyle/>
               <a:p>
+                <a:pPr/>
                 <a14:m>
                   <m:oMathPara xmlns:m="http://schemas.openxmlformats.org/officeDocument/2006/math">
                     <m:oMathParaPr>
@@ -8134,7 +8141,7 @@
             </p:txBody>
           </p:sp>
         </mc:Choice>
-        <mc:Fallback>
+        <mc:Fallback xmlns="">
           <p:sp>
             <p:nvSpPr>
               <p:cNvPr id="7" name="TextBox 6">
@@ -8505,8 +8512,8 @@
           </a:fontRef>
         </p:style>
       </p:cxnSp>
-      <mc:AlternateContent xmlns:mc="http://schemas.openxmlformats.org/markup-compatibility/2006">
-        <mc:Choice xmlns:a14="http://schemas.microsoft.com/office/drawing/2010/main" Requires="a14">
+      <mc:AlternateContent xmlns:mc="http://schemas.openxmlformats.org/markup-compatibility/2006" xmlns:a14="http://schemas.microsoft.com/office/drawing/2010/main">
+        <mc:Choice Requires="a14">
           <p:sp>
             <p:nvSpPr>
               <p:cNvPr id="9" name="TextBox 8">
@@ -8535,6 +8542,7 @@
               </a:bodyPr>
               <a:lstStyle/>
               <a:p>
+                <a:pPr/>
                 <a14:m>
                   <m:oMathPara xmlns:m="http://schemas.openxmlformats.org/officeDocument/2006/math">
                     <m:oMathParaPr>
@@ -8555,7 +8563,7 @@
             </p:txBody>
           </p:sp>
         </mc:Choice>
-        <mc:Fallback>
+        <mc:Fallback xmlns="">
           <p:sp>
             <p:nvSpPr>
               <p:cNvPr id="9" name="TextBox 8">
@@ -8688,8 +8696,8 @@
           </a:fontRef>
         </p:style>
       </p:cxnSp>
-      <mc:AlternateContent xmlns:mc="http://schemas.openxmlformats.org/markup-compatibility/2006">
-        <mc:Choice xmlns:a14="http://schemas.microsoft.com/office/drawing/2010/main" Requires="a14">
+      <mc:AlternateContent xmlns:mc="http://schemas.openxmlformats.org/markup-compatibility/2006" xmlns:a14="http://schemas.microsoft.com/office/drawing/2010/main">
+        <mc:Choice Requires="a14">
           <p:sp>
             <p:nvSpPr>
               <p:cNvPr id="12" name="TextBox 11">
@@ -8718,6 +8726,7 @@
               </a:bodyPr>
               <a:lstStyle/>
               <a:p>
+                <a:pPr/>
                 <a14:m>
                   <m:oMathPara xmlns:m="http://schemas.openxmlformats.org/officeDocument/2006/math">
                     <m:oMathParaPr>
@@ -8744,7 +8753,7 @@
             </p:txBody>
           </p:sp>
         </mc:Choice>
-        <mc:Fallback>
+        <mc:Fallback xmlns="">
           <p:sp>
             <p:nvSpPr>
               <p:cNvPr id="12" name="TextBox 11">
@@ -9006,8 +9015,8 @@
           </a:fontRef>
         </p:style>
       </p:cxnSp>
-      <mc:AlternateContent xmlns:mc="http://schemas.openxmlformats.org/markup-compatibility/2006">
-        <mc:Choice xmlns:a14="http://schemas.microsoft.com/office/drawing/2010/main" Requires="a14">
+      <mc:AlternateContent xmlns:mc="http://schemas.openxmlformats.org/markup-compatibility/2006" xmlns:a14="http://schemas.microsoft.com/office/drawing/2010/main">
+        <mc:Choice Requires="a14">
           <p:sp>
             <p:nvSpPr>
               <p:cNvPr id="27" name="TextBox 26">
@@ -9036,6 +9045,7 @@
               </a:bodyPr>
               <a:lstStyle/>
               <a:p>
+                <a:pPr/>
                 <a14:m>
                   <m:oMathPara xmlns:m="http://schemas.openxmlformats.org/officeDocument/2006/math">
                     <m:oMathParaPr>
@@ -9056,7 +9066,7 @@
             </p:txBody>
           </p:sp>
         </mc:Choice>
-        <mc:Fallback>
+        <mc:Fallback xmlns="">
           <p:sp>
             <p:nvSpPr>
               <p:cNvPr id="27" name="TextBox 26">
@@ -9146,8 +9156,8 @@
           </a:fontRef>
         </p:style>
       </p:cxnSp>
-      <mc:AlternateContent xmlns:mc="http://schemas.openxmlformats.org/markup-compatibility/2006">
-        <mc:Choice xmlns:a14="http://schemas.microsoft.com/office/drawing/2010/main" Requires="a14">
+      <mc:AlternateContent xmlns:mc="http://schemas.openxmlformats.org/markup-compatibility/2006" xmlns:a14="http://schemas.microsoft.com/office/drawing/2010/main">
+        <mc:Choice Requires="a14">
           <p:sp>
             <p:nvSpPr>
               <p:cNvPr id="31" name="TextBox 30">
@@ -9176,6 +9186,7 @@
               </a:bodyPr>
               <a:lstStyle/>
               <a:p>
+                <a:pPr/>
                 <a14:m>
                   <m:oMathPara xmlns:m="http://schemas.openxmlformats.org/officeDocument/2006/math">
                     <m:oMathParaPr>
@@ -9202,7 +9213,7 @@
             </p:txBody>
           </p:sp>
         </mc:Choice>
-        <mc:Fallback>
+        <mc:Fallback xmlns="">
           <p:sp>
             <p:nvSpPr>
               <p:cNvPr id="31" name="TextBox 30">
@@ -9378,8 +9389,8 @@
           </a:fontRef>
         </p:style>
       </p:cxnSp>
-      <mc:AlternateContent xmlns:mc="http://schemas.openxmlformats.org/markup-compatibility/2006">
-        <mc:Choice xmlns:a14="http://schemas.microsoft.com/office/drawing/2010/main" Requires="a14">
+      <mc:AlternateContent xmlns:mc="http://schemas.openxmlformats.org/markup-compatibility/2006" xmlns:a14="http://schemas.microsoft.com/office/drawing/2010/main">
+        <mc:Choice Requires="a14">
           <p:sp>
             <p:nvSpPr>
               <p:cNvPr id="39" name="TextBox 38">
@@ -9408,6 +9419,7 @@
               </a:bodyPr>
               <a:lstStyle/>
               <a:p>
+                <a:pPr/>
                 <a14:m>
                   <m:oMathPara xmlns:m="http://schemas.openxmlformats.org/officeDocument/2006/math">
                     <m:oMathParaPr>
@@ -9434,7 +9446,7 @@
             </p:txBody>
           </p:sp>
         </mc:Choice>
-        <mc:Fallback>
+        <mc:Fallback xmlns="">
           <p:sp>
             <p:nvSpPr>
               <p:cNvPr id="39" name="TextBox 38">
@@ -9483,6 +9495,1701 @@
     <p:extLst>
       <p:ext uri="{BB962C8B-B14F-4D97-AF65-F5344CB8AC3E}">
         <p14:creationId xmlns:p14="http://schemas.microsoft.com/office/powerpoint/2010/main" val="9767319"/>
+      </p:ext>
+    </p:extLst>
+  </p:cSld>
+  <p:clrMapOvr>
+    <a:masterClrMapping/>
+  </p:clrMapOvr>
+</p:sld>
+</file>
+
+<file path=ppt/slides/slide17.xml><?xml version="1.0" encoding="utf-8"?>
+<p:sld xmlns:a="http://schemas.openxmlformats.org/drawingml/2006/main" xmlns:r="http://schemas.openxmlformats.org/officeDocument/2006/relationships" xmlns:p="http://schemas.openxmlformats.org/presentationml/2006/main">
+  <p:cSld>
+    <p:spTree>
+      <p:nvGrpSpPr>
+        <p:cNvPr id="1" name=""/>
+        <p:cNvGrpSpPr/>
+        <p:nvPr/>
+      </p:nvGrpSpPr>
+      <p:grpSpPr>
+        <a:xfrm>
+          <a:off x="0" y="0"/>
+          <a:ext cx="0" cy="0"/>
+          <a:chOff x="0" y="0"/>
+          <a:chExt cx="0" cy="0"/>
+        </a:xfrm>
+      </p:grpSpPr>
+      <p:cxnSp>
+        <p:nvCxnSpPr>
+          <p:cNvPr id="2" name="Straight Arrow Connector 1">
+            <a:extLst>
+              <a:ext uri="{FF2B5EF4-FFF2-40B4-BE49-F238E27FC236}">
+                <a16:creationId xmlns:a16="http://schemas.microsoft.com/office/drawing/2014/main" id="{D4CE7AFD-3739-46FA-8D9A-AEDA2411BB99}"/>
+              </a:ext>
+            </a:extLst>
+          </p:cNvPr>
+          <p:cNvCxnSpPr>
+            <a:cxnSpLocks/>
+          </p:cNvCxnSpPr>
+          <p:nvPr/>
+        </p:nvCxnSpPr>
+        <p:spPr>
+          <a:xfrm flipV="1">
+            <a:off x="2580538" y="2937909"/>
+            <a:ext cx="1283110" cy="1"/>
+          </a:xfrm>
+          <a:prstGeom prst="straightConnector1">
+            <a:avLst/>
+          </a:prstGeom>
+          <a:ln w="34925">
+            <a:solidFill>
+              <a:schemeClr val="tx1"/>
+            </a:solidFill>
+            <a:prstDash val="sysDash"/>
+            <a:tailEnd type="stealth" w="lg" len="lg"/>
+          </a:ln>
+        </p:spPr>
+        <p:style>
+          <a:lnRef idx="1">
+            <a:schemeClr val="accent1"/>
+          </a:lnRef>
+          <a:fillRef idx="0">
+            <a:schemeClr val="accent1"/>
+          </a:fillRef>
+          <a:effectRef idx="0">
+            <a:schemeClr val="accent1"/>
+          </a:effectRef>
+          <a:fontRef idx="minor">
+            <a:schemeClr val="tx1"/>
+          </a:fontRef>
+        </p:style>
+      </p:cxnSp>
+      <mc:AlternateContent xmlns:mc="http://schemas.openxmlformats.org/markup-compatibility/2006">
+        <mc:Choice xmlns:a14="http://schemas.microsoft.com/office/drawing/2010/main" Requires="a14">
+          <p:sp>
+            <p:nvSpPr>
+              <p:cNvPr id="5" name="TextBox 4">
+                <a:extLst>
+                  <a:ext uri="{FF2B5EF4-FFF2-40B4-BE49-F238E27FC236}">
+                    <a16:creationId xmlns:a16="http://schemas.microsoft.com/office/drawing/2014/main" id="{810E8B15-5931-4EFF-B54A-40DDFF0DE4ED}"/>
+                  </a:ext>
+                </a:extLst>
+              </p:cNvPr>
+              <p:cNvSpPr txBox="1"/>
+              <p:nvPr/>
+            </p:nvSpPr>
+            <p:spPr>
+              <a:xfrm>
+                <a:off x="915872" y="2528940"/>
+                <a:ext cx="555537" cy="430887"/>
+              </a:xfrm>
+              <a:prstGeom prst="rect">
+                <a:avLst/>
+              </a:prstGeom>
+              <a:noFill/>
+            </p:spPr>
+            <p:txBody>
+              <a:bodyPr wrap="none" lIns="0" tIns="0" rIns="0" bIns="0" rtlCol="0">
+                <a:spAutoFit/>
+              </a:bodyPr>
+              <a:lstStyle/>
+              <a:p>
+                <a:pPr/>
+                <a14:m>
+                  <m:oMathPara xmlns:m="http://schemas.openxmlformats.org/officeDocument/2006/math">
+                    <m:oMathParaPr>
+                      <m:jc m:val="centerGroup"/>
+                    </m:oMathParaPr>
+                    <m:oMath xmlns:m="http://schemas.openxmlformats.org/officeDocument/2006/math">
+                      <m:r>
+                        <a:rPr lang="en-US" sz="2800" b="0" i="1" smtClean="0">
+                          <a:latin typeface="Cambria Math" panose="02040503050406030204" pitchFamily="18" charset="0"/>
+                        </a:rPr>
+                        <m:t>−</m:t>
+                      </m:r>
+                      <m:acc>
+                        <m:accPr>
+                          <m:chr m:val="⃗"/>
+                          <m:ctrlPr>
+                            <a:rPr lang="en-US" sz="2800" b="0" i="1" smtClean="0">
+                              <a:latin typeface="Cambria Math" panose="02040503050406030204" pitchFamily="18" charset="0"/>
+                            </a:rPr>
+                          </m:ctrlPr>
+                        </m:accPr>
+                        <m:e>
+                          <m:r>
+                            <a:rPr lang="en-US" sz="2800" b="0" i="1" smtClean="0">
+                              <a:latin typeface="Cambria Math" panose="02040503050406030204" pitchFamily="18" charset="0"/>
+                            </a:rPr>
+                            <m:t>𝑣</m:t>
+                          </m:r>
+                        </m:e>
+                      </m:acc>
+                    </m:oMath>
+                  </m:oMathPara>
+                </a14:m>
+                <a:endParaRPr lang="en-US" sz="2800" dirty="0"/>
+              </a:p>
+            </p:txBody>
+          </p:sp>
+        </mc:Choice>
+        <mc:Fallback>
+          <p:sp>
+            <p:nvSpPr>
+              <p:cNvPr id="5" name="TextBox 4">
+                <a:extLst>
+                  <a:ext uri="{FF2B5EF4-FFF2-40B4-BE49-F238E27FC236}">
+                    <a16:creationId xmlns:a16="http://schemas.microsoft.com/office/drawing/2014/main" id="{810E8B15-5931-4EFF-B54A-40DDFF0DE4ED}"/>
+                  </a:ext>
+                </a:extLst>
+              </p:cNvPr>
+              <p:cNvSpPr txBox="1">
+                <a:spLocks noRot="1" noChangeAspect="1" noMove="1" noResize="1" noEditPoints="1" noAdjustHandles="1" noChangeArrowheads="1" noChangeShapeType="1" noTextEdit="1"/>
+              </p:cNvSpPr>
+              <p:nvPr/>
+            </p:nvSpPr>
+            <p:spPr>
+              <a:xfrm>
+                <a:off x="915872" y="2528940"/>
+                <a:ext cx="555537" cy="430887"/>
+              </a:xfrm>
+              <a:prstGeom prst="rect">
+                <a:avLst/>
+              </a:prstGeom>
+              <a:blipFill>
+                <a:blip r:embed="rId2"/>
+                <a:stretch>
+                  <a:fillRect/>
+                </a:stretch>
+              </a:blipFill>
+            </p:spPr>
+            <p:txBody>
+              <a:bodyPr/>
+              <a:lstStyle/>
+              <a:p>
+                <a:r>
+                  <a:rPr lang="en-US">
+                    <a:noFill/>
+                  </a:rPr>
+                  <a:t> </a:t>
+                </a:r>
+              </a:p>
+            </p:txBody>
+          </p:sp>
+        </mc:Fallback>
+      </mc:AlternateContent>
+      <p:cxnSp>
+        <p:nvCxnSpPr>
+          <p:cNvPr id="7" name="Straight Arrow Connector 6">
+            <a:extLst>
+              <a:ext uri="{FF2B5EF4-FFF2-40B4-BE49-F238E27FC236}">
+                <a16:creationId xmlns:a16="http://schemas.microsoft.com/office/drawing/2014/main" id="{80E04FA6-0C65-4378-B836-77B5E50999D1}"/>
+              </a:ext>
+            </a:extLst>
+          </p:cNvPr>
+          <p:cNvCxnSpPr>
+            <a:cxnSpLocks/>
+          </p:cNvCxnSpPr>
+          <p:nvPr/>
+        </p:nvCxnSpPr>
+        <p:spPr>
+          <a:xfrm flipV="1">
+            <a:off x="2580538" y="1718013"/>
+            <a:ext cx="0" cy="1219897"/>
+          </a:xfrm>
+          <a:prstGeom prst="straightConnector1">
+            <a:avLst/>
+          </a:prstGeom>
+          <a:ln w="34925">
+            <a:solidFill>
+              <a:schemeClr val="tx1"/>
+            </a:solidFill>
+            <a:tailEnd type="stealth" w="lg" len="lg"/>
+          </a:ln>
+        </p:spPr>
+        <p:style>
+          <a:lnRef idx="1">
+            <a:schemeClr val="accent1"/>
+          </a:lnRef>
+          <a:fillRef idx="0">
+            <a:schemeClr val="accent1"/>
+          </a:fillRef>
+          <a:effectRef idx="0">
+            <a:schemeClr val="accent1"/>
+          </a:effectRef>
+          <a:fontRef idx="minor">
+            <a:schemeClr val="tx1"/>
+          </a:fontRef>
+        </p:style>
+      </p:cxnSp>
+      <p:cxnSp>
+        <p:nvCxnSpPr>
+          <p:cNvPr id="10" name="Straight Arrow Connector 9">
+            <a:extLst>
+              <a:ext uri="{FF2B5EF4-FFF2-40B4-BE49-F238E27FC236}">
+                <a16:creationId xmlns:a16="http://schemas.microsoft.com/office/drawing/2014/main" id="{5AE476C2-C6C1-4D7F-B303-FC9B5A569242}"/>
+              </a:ext>
+            </a:extLst>
+          </p:cNvPr>
+          <p:cNvCxnSpPr>
+            <a:cxnSpLocks/>
+          </p:cNvCxnSpPr>
+          <p:nvPr/>
+        </p:nvCxnSpPr>
+        <p:spPr>
+          <a:xfrm flipH="1">
+            <a:off x="1384737" y="2929229"/>
+            <a:ext cx="1195801" cy="8680"/>
+          </a:xfrm>
+          <a:prstGeom prst="straightConnector1">
+            <a:avLst/>
+          </a:prstGeom>
+          <a:ln w="34925">
+            <a:solidFill>
+              <a:schemeClr val="tx1"/>
+            </a:solidFill>
+            <a:tailEnd type="stealth" w="lg" len="lg"/>
+          </a:ln>
+        </p:spPr>
+        <p:style>
+          <a:lnRef idx="1">
+            <a:schemeClr val="accent1"/>
+          </a:lnRef>
+          <a:fillRef idx="0">
+            <a:schemeClr val="accent1"/>
+          </a:fillRef>
+          <a:effectRef idx="0">
+            <a:schemeClr val="accent1"/>
+          </a:effectRef>
+          <a:fontRef idx="minor">
+            <a:schemeClr val="tx1"/>
+          </a:fontRef>
+        </p:style>
+      </p:cxnSp>
+      <mc:AlternateContent xmlns:mc="http://schemas.openxmlformats.org/markup-compatibility/2006">
+        <mc:Choice xmlns:a14="http://schemas.microsoft.com/office/drawing/2010/main" Requires="a14">
+          <p:sp>
+            <p:nvSpPr>
+              <p:cNvPr id="12" name="TextBox 11">
+                <a:extLst>
+                  <a:ext uri="{FF2B5EF4-FFF2-40B4-BE49-F238E27FC236}">
+                    <a16:creationId xmlns:a16="http://schemas.microsoft.com/office/drawing/2014/main" id="{2E11D9EA-50E0-4F47-B9A0-E4F3213EFE29}"/>
+                  </a:ext>
+                </a:extLst>
+              </p:cNvPr>
+              <p:cNvSpPr txBox="1"/>
+              <p:nvPr/>
+            </p:nvSpPr>
+            <p:spPr>
+              <a:xfrm>
+                <a:off x="2113616" y="1502569"/>
+                <a:ext cx="555537" cy="430887"/>
+              </a:xfrm>
+              <a:prstGeom prst="rect">
+                <a:avLst/>
+              </a:prstGeom>
+              <a:noFill/>
+            </p:spPr>
+            <p:txBody>
+              <a:bodyPr wrap="square" lIns="0" tIns="0" rIns="0" bIns="0" rtlCol="0">
+                <a:spAutoFit/>
+              </a:bodyPr>
+              <a:lstStyle/>
+              <a:p>
+                <a:pPr/>
+                <a14:m>
+                  <m:oMathPara xmlns:m="http://schemas.openxmlformats.org/officeDocument/2006/math">
+                    <m:oMathParaPr>
+                      <m:jc m:val="centerGroup"/>
+                    </m:oMathParaPr>
+                    <m:oMath xmlns:m="http://schemas.openxmlformats.org/officeDocument/2006/math">
+                      <m:acc>
+                        <m:accPr>
+                          <m:chr m:val="⃗"/>
+                          <m:ctrlPr>
+                            <a:rPr lang="en-US" sz="2800" b="0" i="1" smtClean="0">
+                              <a:latin typeface="Cambria Math" panose="02040503050406030204" pitchFamily="18" charset="0"/>
+                            </a:rPr>
+                          </m:ctrlPr>
+                        </m:accPr>
+                        <m:e>
+                          <m:r>
+                            <a:rPr lang="en-US" sz="2800" b="0" i="1" smtClean="0">
+                              <a:latin typeface="Cambria Math" panose="02040503050406030204" pitchFamily="18" charset="0"/>
+                            </a:rPr>
+                            <m:t>𝑢</m:t>
+                          </m:r>
+                        </m:e>
+                      </m:acc>
+                    </m:oMath>
+                  </m:oMathPara>
+                </a14:m>
+                <a:endParaRPr lang="en-US" sz="2800" dirty="0"/>
+              </a:p>
+            </p:txBody>
+          </p:sp>
+        </mc:Choice>
+        <mc:Fallback>
+          <p:sp>
+            <p:nvSpPr>
+              <p:cNvPr id="12" name="TextBox 11">
+                <a:extLst>
+                  <a:ext uri="{FF2B5EF4-FFF2-40B4-BE49-F238E27FC236}">
+                    <a16:creationId xmlns:a16="http://schemas.microsoft.com/office/drawing/2014/main" id="{2E11D9EA-50E0-4F47-B9A0-E4F3213EFE29}"/>
+                  </a:ext>
+                </a:extLst>
+              </p:cNvPr>
+              <p:cNvSpPr txBox="1">
+                <a:spLocks noRot="1" noChangeAspect="1" noMove="1" noResize="1" noEditPoints="1" noAdjustHandles="1" noChangeArrowheads="1" noChangeShapeType="1" noTextEdit="1"/>
+              </p:cNvSpPr>
+              <p:nvPr/>
+            </p:nvSpPr>
+            <p:spPr>
+              <a:xfrm>
+                <a:off x="2113616" y="1502569"/>
+                <a:ext cx="555537" cy="430887"/>
+              </a:xfrm>
+              <a:prstGeom prst="rect">
+                <a:avLst/>
+              </a:prstGeom>
+              <a:blipFill>
+                <a:blip r:embed="rId3"/>
+                <a:stretch>
+                  <a:fillRect/>
+                </a:stretch>
+              </a:blipFill>
+            </p:spPr>
+            <p:txBody>
+              <a:bodyPr/>
+              <a:lstStyle/>
+              <a:p>
+                <a:r>
+                  <a:rPr lang="en-US">
+                    <a:noFill/>
+                  </a:rPr>
+                  <a:t> </a:t>
+                </a:r>
+              </a:p>
+            </p:txBody>
+          </p:sp>
+        </mc:Fallback>
+      </mc:AlternateContent>
+      <p:cxnSp>
+        <p:nvCxnSpPr>
+          <p:cNvPr id="13" name="Straight Arrow Connector 12">
+            <a:extLst>
+              <a:ext uri="{FF2B5EF4-FFF2-40B4-BE49-F238E27FC236}">
+                <a16:creationId xmlns:a16="http://schemas.microsoft.com/office/drawing/2014/main" id="{2E7CF694-4D82-4070-A12F-239E66A5EA67}"/>
+              </a:ext>
+            </a:extLst>
+          </p:cNvPr>
+          <p:cNvCxnSpPr>
+            <a:cxnSpLocks/>
+          </p:cNvCxnSpPr>
+          <p:nvPr/>
+        </p:nvCxnSpPr>
+        <p:spPr>
+          <a:xfrm flipH="1" flipV="1">
+            <a:off x="1427101" y="1929117"/>
+            <a:ext cx="1153436" cy="1000112"/>
+          </a:xfrm>
+          <a:prstGeom prst="straightConnector1">
+            <a:avLst/>
+          </a:prstGeom>
+          <a:ln w="34925">
+            <a:solidFill>
+              <a:schemeClr val="tx1"/>
+            </a:solidFill>
+            <a:tailEnd type="stealth" w="lg" len="lg"/>
+          </a:ln>
+        </p:spPr>
+        <p:style>
+          <a:lnRef idx="1">
+            <a:schemeClr val="accent1"/>
+          </a:lnRef>
+          <a:fillRef idx="0">
+            <a:schemeClr val="accent1"/>
+          </a:fillRef>
+          <a:effectRef idx="0">
+            <a:schemeClr val="accent1"/>
+          </a:effectRef>
+          <a:fontRef idx="minor">
+            <a:schemeClr val="tx1"/>
+          </a:fontRef>
+        </p:style>
+      </p:cxnSp>
+      <p:sp>
+        <p:nvSpPr>
+          <p:cNvPr id="16" name="Arc 15">
+            <a:extLst>
+              <a:ext uri="{FF2B5EF4-FFF2-40B4-BE49-F238E27FC236}">
+                <a16:creationId xmlns:a16="http://schemas.microsoft.com/office/drawing/2014/main" id="{5B4B39BB-AE7E-4F2B-B643-8A27D345F4A5}"/>
+              </a:ext>
+            </a:extLst>
+          </p:cNvPr>
+          <p:cNvSpPr/>
+          <p:nvPr/>
+        </p:nvSpPr>
+        <p:spPr>
+          <a:xfrm rot="16200000">
+            <a:off x="2356188" y="2834383"/>
+            <a:ext cx="203704" cy="189692"/>
+          </a:xfrm>
+          <a:prstGeom prst="arc">
+            <a:avLst>
+              <a:gd name="adj1" fmla="val 16200000"/>
+              <a:gd name="adj2" fmla="val 324231"/>
+            </a:avLst>
+          </a:prstGeom>
+          <a:ln w="15875">
+            <a:solidFill>
+              <a:schemeClr val="tx1"/>
+            </a:solidFill>
+          </a:ln>
+        </p:spPr>
+        <p:style>
+          <a:lnRef idx="1">
+            <a:schemeClr val="accent1"/>
+          </a:lnRef>
+          <a:fillRef idx="0">
+            <a:schemeClr val="accent1"/>
+          </a:fillRef>
+          <a:effectRef idx="0">
+            <a:schemeClr val="accent1"/>
+          </a:effectRef>
+          <a:fontRef idx="minor">
+            <a:schemeClr val="tx1"/>
+          </a:fontRef>
+        </p:style>
+        <p:txBody>
+          <a:bodyPr rtlCol="0" anchor="ctr"/>
+          <a:lstStyle/>
+          <a:p>
+            <a:pPr algn="ctr"/>
+            <a:endParaRPr lang="en-US" dirty="0"/>
+          </a:p>
+        </p:txBody>
+      </p:sp>
+      <mc:AlternateContent xmlns:mc="http://schemas.openxmlformats.org/markup-compatibility/2006">
+        <mc:Choice xmlns:a14="http://schemas.microsoft.com/office/drawing/2010/main" Requires="a14">
+          <p:sp>
+            <p:nvSpPr>
+              <p:cNvPr id="17" name="TextBox 16">
+                <a:extLst>
+                  <a:ext uri="{FF2B5EF4-FFF2-40B4-BE49-F238E27FC236}">
+                    <a16:creationId xmlns:a16="http://schemas.microsoft.com/office/drawing/2014/main" id="{E49B0955-5FDC-45CC-891F-ACB3B00DB1A0}"/>
+                  </a:ext>
+                </a:extLst>
+              </p:cNvPr>
+              <p:cNvSpPr txBox="1"/>
+              <p:nvPr/>
+            </p:nvSpPr>
+            <p:spPr>
+              <a:xfrm>
+                <a:off x="2137796" y="2660910"/>
+                <a:ext cx="197746" cy="276999"/>
+              </a:xfrm>
+              <a:prstGeom prst="rect">
+                <a:avLst/>
+              </a:prstGeom>
+              <a:noFill/>
+            </p:spPr>
+            <p:txBody>
+              <a:bodyPr wrap="none" lIns="0" tIns="0" rIns="0" bIns="0" rtlCol="0">
+                <a:spAutoFit/>
+              </a:bodyPr>
+              <a:lstStyle/>
+              <a:p>
+                <a:pPr/>
+                <a14:m>
+                  <m:oMathPara xmlns:m="http://schemas.openxmlformats.org/officeDocument/2006/math">
+                    <m:oMathParaPr>
+                      <m:jc m:val="centerGroup"/>
+                    </m:oMathParaPr>
+                    <m:oMath xmlns:m="http://schemas.openxmlformats.org/officeDocument/2006/math">
+                      <m:r>
+                        <a:rPr lang="en-US" i="1" smtClean="0">
+                          <a:latin typeface="Cambria Math" panose="02040503050406030204" pitchFamily="18" charset="0"/>
+                          <a:ea typeface="Cambria Math" panose="02040503050406030204" pitchFamily="18" charset="0"/>
+                        </a:rPr>
+                        <m:t>𝛼</m:t>
+                      </m:r>
+                    </m:oMath>
+                  </m:oMathPara>
+                </a14:m>
+                <a:endParaRPr lang="en-US" dirty="0"/>
+              </a:p>
+            </p:txBody>
+          </p:sp>
+        </mc:Choice>
+        <mc:Fallback>
+          <p:sp>
+            <p:nvSpPr>
+              <p:cNvPr id="17" name="TextBox 16">
+                <a:extLst>
+                  <a:ext uri="{FF2B5EF4-FFF2-40B4-BE49-F238E27FC236}">
+                    <a16:creationId xmlns:a16="http://schemas.microsoft.com/office/drawing/2014/main" id="{E49B0955-5FDC-45CC-891F-ACB3B00DB1A0}"/>
+                  </a:ext>
+                </a:extLst>
+              </p:cNvPr>
+              <p:cNvSpPr txBox="1">
+                <a:spLocks noRot="1" noChangeAspect="1" noMove="1" noResize="1" noEditPoints="1" noAdjustHandles="1" noChangeArrowheads="1" noChangeShapeType="1" noTextEdit="1"/>
+              </p:cNvSpPr>
+              <p:nvPr/>
+            </p:nvSpPr>
+            <p:spPr>
+              <a:xfrm>
+                <a:off x="2137796" y="2660910"/>
+                <a:ext cx="197746" cy="276999"/>
+              </a:xfrm>
+              <a:prstGeom prst="rect">
+                <a:avLst/>
+              </a:prstGeom>
+              <a:blipFill>
+                <a:blip r:embed="rId4"/>
+                <a:stretch>
+                  <a:fillRect l="-18750" r="-15625"/>
+                </a:stretch>
+              </a:blipFill>
+            </p:spPr>
+            <p:txBody>
+              <a:bodyPr/>
+              <a:lstStyle/>
+              <a:p>
+                <a:r>
+                  <a:rPr lang="en-US">
+                    <a:noFill/>
+                  </a:rPr>
+                  <a:t> </a:t>
+                </a:r>
+              </a:p>
+            </p:txBody>
+          </p:sp>
+        </mc:Fallback>
+      </mc:AlternateContent>
+      <mc:AlternateContent xmlns:mc="http://schemas.openxmlformats.org/markup-compatibility/2006">
+        <mc:Choice xmlns:a14="http://schemas.microsoft.com/office/drawing/2010/main" Requires="a14">
+          <p:sp>
+            <p:nvSpPr>
+              <p:cNvPr id="18" name="TextBox 17">
+                <a:extLst>
+                  <a:ext uri="{FF2B5EF4-FFF2-40B4-BE49-F238E27FC236}">
+                    <a16:creationId xmlns:a16="http://schemas.microsoft.com/office/drawing/2014/main" id="{4D5EBDCE-39F5-4EFF-9569-5E1E0DBE8594}"/>
+                  </a:ext>
+                </a:extLst>
+              </p:cNvPr>
+              <p:cNvSpPr txBox="1"/>
+              <p:nvPr/>
+            </p:nvSpPr>
+            <p:spPr>
+              <a:xfrm>
+                <a:off x="1205643" y="1633777"/>
+                <a:ext cx="449675" cy="276999"/>
+              </a:xfrm>
+              <a:prstGeom prst="rect">
+                <a:avLst/>
+              </a:prstGeom>
+              <a:noFill/>
+            </p:spPr>
+            <p:txBody>
+              <a:bodyPr wrap="none" lIns="0" tIns="0" rIns="0" bIns="0" rtlCol="0">
+                <a:spAutoFit/>
+              </a:bodyPr>
+              <a:lstStyle/>
+              <a:p>
+                <a:pPr/>
+                <a14:m>
+                  <m:oMathPara xmlns:m="http://schemas.openxmlformats.org/officeDocument/2006/math">
+                    <m:oMathParaPr>
+                      <m:jc m:val="centerGroup"/>
+                    </m:oMathParaPr>
+                    <m:oMath xmlns:m="http://schemas.openxmlformats.org/officeDocument/2006/math">
+                      <m:acc>
+                        <m:accPr>
+                          <m:chr m:val="⃗"/>
+                          <m:ctrlPr>
+                            <a:rPr lang="en-US" i="1" smtClean="0">
+                              <a:latin typeface="Cambria Math" panose="02040503050406030204" pitchFamily="18" charset="0"/>
+                            </a:rPr>
+                          </m:ctrlPr>
+                        </m:accPr>
+                        <m:e>
+                          <m:sSub>
+                            <m:sSubPr>
+                              <m:ctrlPr>
+                                <a:rPr lang="en-US" i="1" smtClean="0">
+                                  <a:latin typeface="Cambria Math" panose="02040503050406030204" pitchFamily="18" charset="0"/>
+                                </a:rPr>
+                              </m:ctrlPr>
+                            </m:sSubPr>
+                            <m:e>
+                              <m:r>
+                                <a:rPr lang="en-US" b="0" i="1" smtClean="0">
+                                  <a:latin typeface="Cambria Math" panose="02040503050406030204" pitchFamily="18" charset="0"/>
+                                </a:rPr>
+                                <m:t>𝑣</m:t>
+                              </m:r>
+                            </m:e>
+                            <m:sub>
+                              <m:r>
+                                <a:rPr lang="ru-RU" b="0" i="1" smtClean="0">
+                                  <a:latin typeface="Cambria Math" panose="02040503050406030204" pitchFamily="18" charset="0"/>
+                                </a:rPr>
+                                <m:t>отн</m:t>
+                              </m:r>
+                            </m:sub>
+                          </m:sSub>
+                        </m:e>
+                      </m:acc>
+                    </m:oMath>
+                  </m:oMathPara>
+                </a14:m>
+                <a:endParaRPr lang="en-US" dirty="0"/>
+              </a:p>
+            </p:txBody>
+          </p:sp>
+        </mc:Choice>
+        <mc:Fallback>
+          <p:sp>
+            <p:nvSpPr>
+              <p:cNvPr id="18" name="TextBox 17">
+                <a:extLst>
+                  <a:ext uri="{FF2B5EF4-FFF2-40B4-BE49-F238E27FC236}">
+                    <a16:creationId xmlns:a16="http://schemas.microsoft.com/office/drawing/2014/main" id="{4D5EBDCE-39F5-4EFF-9569-5E1E0DBE8594}"/>
+                  </a:ext>
+                </a:extLst>
+              </p:cNvPr>
+              <p:cNvSpPr txBox="1">
+                <a:spLocks noRot="1" noChangeAspect="1" noMove="1" noResize="1" noEditPoints="1" noAdjustHandles="1" noChangeArrowheads="1" noChangeShapeType="1" noTextEdit="1"/>
+              </p:cNvSpPr>
+              <p:nvPr/>
+            </p:nvSpPr>
+            <p:spPr>
+              <a:xfrm>
+                <a:off x="1205643" y="1633777"/>
+                <a:ext cx="449675" cy="276999"/>
+              </a:xfrm>
+              <a:prstGeom prst="rect">
+                <a:avLst/>
+              </a:prstGeom>
+              <a:blipFill>
+                <a:blip r:embed="rId5"/>
+                <a:stretch>
+                  <a:fillRect l="-6757" r="-1351" b="-11111"/>
+                </a:stretch>
+              </a:blipFill>
+            </p:spPr>
+            <p:txBody>
+              <a:bodyPr/>
+              <a:lstStyle/>
+              <a:p>
+                <a:r>
+                  <a:rPr lang="en-US">
+                    <a:noFill/>
+                  </a:rPr>
+                  <a:t> </a:t>
+                </a:r>
+              </a:p>
+            </p:txBody>
+          </p:sp>
+        </mc:Fallback>
+      </mc:AlternateContent>
+      <p:sp>
+        <p:nvSpPr>
+          <p:cNvPr id="11" name="Arc 10">
+            <a:extLst>
+              <a:ext uri="{FF2B5EF4-FFF2-40B4-BE49-F238E27FC236}">
+                <a16:creationId xmlns:a16="http://schemas.microsoft.com/office/drawing/2014/main" id="{0115AAB3-A1FD-47B5-B699-34FA05F409A0}"/>
+              </a:ext>
+            </a:extLst>
+          </p:cNvPr>
+          <p:cNvSpPr/>
+          <p:nvPr/>
+        </p:nvSpPr>
+        <p:spPr>
+          <a:xfrm rot="17882942">
+            <a:off x="2421132" y="2763898"/>
+            <a:ext cx="203704" cy="189692"/>
+          </a:xfrm>
+          <a:prstGeom prst="arc">
+            <a:avLst>
+              <a:gd name="adj1" fmla="val 16200000"/>
+              <a:gd name="adj2" fmla="val 324231"/>
+            </a:avLst>
+          </a:prstGeom>
+          <a:ln w="15875">
+            <a:solidFill>
+              <a:schemeClr val="tx1"/>
+            </a:solidFill>
+          </a:ln>
+        </p:spPr>
+        <p:style>
+          <a:lnRef idx="1">
+            <a:schemeClr val="accent1"/>
+          </a:lnRef>
+          <a:fillRef idx="0">
+            <a:schemeClr val="accent1"/>
+          </a:fillRef>
+          <a:effectRef idx="0">
+            <a:schemeClr val="accent1"/>
+          </a:effectRef>
+          <a:fontRef idx="minor">
+            <a:schemeClr val="tx1"/>
+          </a:fontRef>
+        </p:style>
+        <p:txBody>
+          <a:bodyPr rtlCol="0" anchor="ctr"/>
+          <a:lstStyle/>
+          <a:p>
+            <a:pPr algn="ctr"/>
+            <a:endParaRPr lang="en-US" dirty="0"/>
+          </a:p>
+        </p:txBody>
+      </p:sp>
+      <p:sp>
+        <p:nvSpPr>
+          <p:cNvPr id="14" name="Arc 13">
+            <a:extLst>
+              <a:ext uri="{FF2B5EF4-FFF2-40B4-BE49-F238E27FC236}">
+                <a16:creationId xmlns:a16="http://schemas.microsoft.com/office/drawing/2014/main" id="{1876BE3D-5289-409E-9C53-DBEB92649C64}"/>
+              </a:ext>
+            </a:extLst>
+          </p:cNvPr>
+          <p:cNvSpPr/>
+          <p:nvPr/>
+        </p:nvSpPr>
+        <p:spPr>
+          <a:xfrm rot="17882942">
+            <a:off x="2388228" y="2733257"/>
+            <a:ext cx="269511" cy="250972"/>
+          </a:xfrm>
+          <a:prstGeom prst="arc">
+            <a:avLst>
+              <a:gd name="adj1" fmla="val 16200000"/>
+              <a:gd name="adj2" fmla="val 225876"/>
+            </a:avLst>
+          </a:prstGeom>
+          <a:ln w="15875">
+            <a:solidFill>
+              <a:schemeClr val="tx1"/>
+            </a:solidFill>
+          </a:ln>
+        </p:spPr>
+        <p:style>
+          <a:lnRef idx="1">
+            <a:schemeClr val="accent1"/>
+          </a:lnRef>
+          <a:fillRef idx="0">
+            <a:schemeClr val="accent1"/>
+          </a:fillRef>
+          <a:effectRef idx="0">
+            <a:schemeClr val="accent1"/>
+          </a:effectRef>
+          <a:fontRef idx="minor">
+            <a:schemeClr val="tx1"/>
+          </a:fontRef>
+        </p:style>
+        <p:txBody>
+          <a:bodyPr rtlCol="0" anchor="ctr"/>
+          <a:lstStyle/>
+          <a:p>
+            <a:pPr algn="ctr"/>
+            <a:endParaRPr lang="en-US" dirty="0"/>
+          </a:p>
+        </p:txBody>
+      </p:sp>
+      <mc:AlternateContent xmlns:mc="http://schemas.openxmlformats.org/markup-compatibility/2006">
+        <mc:Choice xmlns:a14="http://schemas.microsoft.com/office/drawing/2010/main" Requires="a14">
+          <p:sp>
+            <p:nvSpPr>
+              <p:cNvPr id="15" name="TextBox 14">
+                <a:extLst>
+                  <a:ext uri="{FF2B5EF4-FFF2-40B4-BE49-F238E27FC236}">
+                    <a16:creationId xmlns:a16="http://schemas.microsoft.com/office/drawing/2014/main" id="{EE2760F3-B794-4A29-823E-3CECD14C9622}"/>
+                  </a:ext>
+                </a:extLst>
+              </p:cNvPr>
+              <p:cNvSpPr txBox="1"/>
+              <p:nvPr/>
+            </p:nvSpPr>
+            <p:spPr>
+              <a:xfrm>
+                <a:off x="2358677" y="2450887"/>
+                <a:ext cx="199349" cy="276999"/>
+              </a:xfrm>
+              <a:prstGeom prst="rect">
+                <a:avLst/>
+              </a:prstGeom>
+              <a:noFill/>
+            </p:spPr>
+            <p:txBody>
+              <a:bodyPr wrap="none" lIns="0" tIns="0" rIns="0" bIns="0" rtlCol="0">
+                <a:spAutoFit/>
+              </a:bodyPr>
+              <a:lstStyle/>
+              <a:p>
+                <a:pPr/>
+                <a14:m>
+                  <m:oMathPara xmlns:m="http://schemas.openxmlformats.org/officeDocument/2006/math">
+                    <m:oMathParaPr>
+                      <m:jc m:val="centerGroup"/>
+                    </m:oMathParaPr>
+                    <m:oMath xmlns:m="http://schemas.openxmlformats.org/officeDocument/2006/math">
+                      <m:r>
+                        <a:rPr lang="en-US" i="1" smtClean="0">
+                          <a:latin typeface="Cambria Math" panose="02040503050406030204" pitchFamily="18" charset="0"/>
+                          <a:ea typeface="Cambria Math" panose="02040503050406030204" pitchFamily="18" charset="0"/>
+                        </a:rPr>
+                        <m:t>𝛽</m:t>
+                      </m:r>
+                    </m:oMath>
+                  </m:oMathPara>
+                </a14:m>
+                <a:endParaRPr lang="en-US" dirty="0"/>
+              </a:p>
+            </p:txBody>
+          </p:sp>
+        </mc:Choice>
+        <mc:Fallback>
+          <p:sp>
+            <p:nvSpPr>
+              <p:cNvPr id="15" name="TextBox 14">
+                <a:extLst>
+                  <a:ext uri="{FF2B5EF4-FFF2-40B4-BE49-F238E27FC236}">
+                    <a16:creationId xmlns:a16="http://schemas.microsoft.com/office/drawing/2014/main" id="{EE2760F3-B794-4A29-823E-3CECD14C9622}"/>
+                  </a:ext>
+                </a:extLst>
+              </p:cNvPr>
+              <p:cNvSpPr txBox="1">
+                <a:spLocks noRot="1" noChangeAspect="1" noMove="1" noResize="1" noEditPoints="1" noAdjustHandles="1" noChangeArrowheads="1" noChangeShapeType="1" noTextEdit="1"/>
+              </p:cNvSpPr>
+              <p:nvPr/>
+            </p:nvSpPr>
+            <p:spPr>
+              <a:xfrm>
+                <a:off x="2358677" y="2450887"/>
+                <a:ext cx="199349" cy="276999"/>
+              </a:xfrm>
+              <a:prstGeom prst="rect">
+                <a:avLst/>
+              </a:prstGeom>
+              <a:blipFill>
+                <a:blip r:embed="rId6"/>
+                <a:stretch>
+                  <a:fillRect l="-42424" t="-2222" r="-36364" b="-35556"/>
+                </a:stretch>
+              </a:blipFill>
+            </p:spPr>
+            <p:txBody>
+              <a:bodyPr/>
+              <a:lstStyle/>
+              <a:p>
+                <a:r>
+                  <a:rPr lang="en-US">
+                    <a:noFill/>
+                  </a:rPr>
+                  <a:t> </a:t>
+                </a:r>
+              </a:p>
+            </p:txBody>
+          </p:sp>
+        </mc:Fallback>
+      </mc:AlternateContent>
+      <p:cxnSp>
+        <p:nvCxnSpPr>
+          <p:cNvPr id="19" name="Straight Arrow Connector 18">
+            <a:extLst>
+              <a:ext uri="{FF2B5EF4-FFF2-40B4-BE49-F238E27FC236}">
+                <a16:creationId xmlns:a16="http://schemas.microsoft.com/office/drawing/2014/main" id="{0F318E1E-A0BE-4B3A-BDDE-A5AE36D459F4}"/>
+              </a:ext>
+            </a:extLst>
+          </p:cNvPr>
+          <p:cNvCxnSpPr>
+            <a:cxnSpLocks/>
+          </p:cNvCxnSpPr>
+          <p:nvPr/>
+        </p:nvCxnSpPr>
+        <p:spPr>
+          <a:xfrm flipV="1">
+            <a:off x="8067555" y="1988820"/>
+            <a:ext cx="0" cy="2004061"/>
+          </a:xfrm>
+          <a:prstGeom prst="straightConnector1">
+            <a:avLst/>
+          </a:prstGeom>
+          <a:ln w="25400">
+            <a:solidFill>
+              <a:schemeClr val="tx1"/>
+            </a:solidFill>
+            <a:prstDash val="solid"/>
+            <a:tailEnd type="none" w="lg" len="lg"/>
+          </a:ln>
+        </p:spPr>
+        <p:style>
+          <a:lnRef idx="1">
+            <a:schemeClr val="accent1"/>
+          </a:lnRef>
+          <a:fillRef idx="0">
+            <a:schemeClr val="accent1"/>
+          </a:fillRef>
+          <a:effectRef idx="0">
+            <a:schemeClr val="accent1"/>
+          </a:effectRef>
+          <a:fontRef idx="minor">
+            <a:schemeClr val="tx1"/>
+          </a:fontRef>
+        </p:style>
+      </p:cxnSp>
+      <p:cxnSp>
+        <p:nvCxnSpPr>
+          <p:cNvPr id="20" name="Straight Arrow Connector 19">
+            <a:extLst>
+              <a:ext uri="{FF2B5EF4-FFF2-40B4-BE49-F238E27FC236}">
+                <a16:creationId xmlns:a16="http://schemas.microsoft.com/office/drawing/2014/main" id="{9F250C1A-A8A6-4465-AC98-E1E829E59735}"/>
+              </a:ext>
+            </a:extLst>
+          </p:cNvPr>
+          <p:cNvCxnSpPr>
+            <a:cxnSpLocks/>
+          </p:cNvCxnSpPr>
+          <p:nvPr/>
+        </p:nvCxnSpPr>
+        <p:spPr>
+          <a:xfrm flipH="1" flipV="1">
+            <a:off x="6914117" y="2660910"/>
+            <a:ext cx="1153436" cy="1000112"/>
+          </a:xfrm>
+          <a:prstGeom prst="straightConnector1">
+            <a:avLst/>
+          </a:prstGeom>
+          <a:ln w="34925">
+            <a:solidFill>
+              <a:schemeClr val="tx1"/>
+            </a:solidFill>
+            <a:tailEnd type="stealth" w="lg" len="lg"/>
+          </a:ln>
+        </p:spPr>
+        <p:style>
+          <a:lnRef idx="1">
+            <a:schemeClr val="accent1"/>
+          </a:lnRef>
+          <a:fillRef idx="0">
+            <a:schemeClr val="accent1"/>
+          </a:fillRef>
+          <a:effectRef idx="0">
+            <a:schemeClr val="accent1"/>
+          </a:effectRef>
+          <a:fontRef idx="minor">
+            <a:schemeClr val="tx1"/>
+          </a:fontRef>
+        </p:style>
+      </p:cxnSp>
+      <p:cxnSp>
+        <p:nvCxnSpPr>
+          <p:cNvPr id="28" name="Straight Arrow Connector 27">
+            <a:extLst>
+              <a:ext uri="{FF2B5EF4-FFF2-40B4-BE49-F238E27FC236}">
+                <a16:creationId xmlns:a16="http://schemas.microsoft.com/office/drawing/2014/main" id="{F4AE782C-3433-41B6-B8EB-E9974B150DDB}"/>
+              </a:ext>
+            </a:extLst>
+          </p:cNvPr>
+          <p:cNvCxnSpPr>
+            <a:cxnSpLocks/>
+          </p:cNvCxnSpPr>
+          <p:nvPr/>
+        </p:nvCxnSpPr>
+        <p:spPr>
+          <a:xfrm flipV="1">
+            <a:off x="8059677" y="2370732"/>
+            <a:ext cx="1285837" cy="1290291"/>
+          </a:xfrm>
+          <a:prstGeom prst="straightConnector1">
+            <a:avLst/>
+          </a:prstGeom>
+          <a:ln w="34925">
+            <a:solidFill>
+              <a:schemeClr val="tx1"/>
+            </a:solidFill>
+            <a:tailEnd type="stealth" w="lg" len="lg"/>
+          </a:ln>
+        </p:spPr>
+        <p:style>
+          <a:lnRef idx="1">
+            <a:schemeClr val="accent1"/>
+          </a:lnRef>
+          <a:fillRef idx="0">
+            <a:schemeClr val="accent1"/>
+          </a:fillRef>
+          <a:effectRef idx="0">
+            <a:schemeClr val="accent1"/>
+          </a:effectRef>
+          <a:fontRef idx="minor">
+            <a:schemeClr val="tx1"/>
+          </a:fontRef>
+        </p:style>
+      </p:cxnSp>
+      <mc:AlternateContent xmlns:mc="http://schemas.openxmlformats.org/markup-compatibility/2006">
+        <mc:Choice xmlns:a14="http://schemas.microsoft.com/office/drawing/2010/main" Requires="a14">
+          <p:sp>
+            <p:nvSpPr>
+              <p:cNvPr id="29" name="TextBox 28">
+                <a:extLst>
+                  <a:ext uri="{FF2B5EF4-FFF2-40B4-BE49-F238E27FC236}">
+                    <a16:creationId xmlns:a16="http://schemas.microsoft.com/office/drawing/2014/main" id="{6C0811B0-DFBE-405C-A944-B67231563D28}"/>
+                  </a:ext>
+                </a:extLst>
+              </p:cNvPr>
+              <p:cNvSpPr txBox="1"/>
+              <p:nvPr/>
+            </p:nvSpPr>
+            <p:spPr>
+              <a:xfrm>
+                <a:off x="6574166" y="2815637"/>
+                <a:ext cx="555537" cy="430887"/>
+              </a:xfrm>
+              <a:prstGeom prst="rect">
+                <a:avLst/>
+              </a:prstGeom>
+              <a:noFill/>
+            </p:spPr>
+            <p:txBody>
+              <a:bodyPr wrap="square" lIns="0" tIns="0" rIns="0" bIns="0" rtlCol="0">
+                <a:spAutoFit/>
+              </a:bodyPr>
+              <a:lstStyle/>
+              <a:p>
+                <a:pPr/>
+                <a14:m>
+                  <m:oMathPara xmlns:m="http://schemas.openxmlformats.org/officeDocument/2006/math">
+                    <m:oMathParaPr>
+                      <m:jc m:val="centerGroup"/>
+                    </m:oMathParaPr>
+                    <m:oMath xmlns:m="http://schemas.openxmlformats.org/officeDocument/2006/math">
+                      <m:acc>
+                        <m:accPr>
+                          <m:chr m:val="⃗"/>
+                          <m:ctrlPr>
+                            <a:rPr lang="en-US" sz="2800" b="0" i="1" smtClean="0">
+                              <a:latin typeface="Cambria Math" panose="02040503050406030204" pitchFamily="18" charset="0"/>
+                            </a:rPr>
+                          </m:ctrlPr>
+                        </m:accPr>
+                        <m:e>
+                          <m:r>
+                            <a:rPr lang="en-US" sz="2800" b="0" i="1" smtClean="0">
+                              <a:latin typeface="Cambria Math" panose="02040503050406030204" pitchFamily="18" charset="0"/>
+                            </a:rPr>
+                            <m:t>𝑣</m:t>
+                          </m:r>
+                        </m:e>
+                      </m:acc>
+                    </m:oMath>
+                  </m:oMathPara>
+                </a14:m>
+                <a:endParaRPr lang="en-US" sz="2800" dirty="0"/>
+              </a:p>
+            </p:txBody>
+          </p:sp>
+        </mc:Choice>
+        <mc:Fallback>
+          <p:sp>
+            <p:nvSpPr>
+              <p:cNvPr id="29" name="TextBox 28">
+                <a:extLst>
+                  <a:ext uri="{FF2B5EF4-FFF2-40B4-BE49-F238E27FC236}">
+                    <a16:creationId xmlns:a16="http://schemas.microsoft.com/office/drawing/2014/main" id="{6C0811B0-DFBE-405C-A944-B67231563D28}"/>
+                  </a:ext>
+                </a:extLst>
+              </p:cNvPr>
+              <p:cNvSpPr txBox="1">
+                <a:spLocks noRot="1" noChangeAspect="1" noMove="1" noResize="1" noEditPoints="1" noAdjustHandles="1" noChangeArrowheads="1" noChangeShapeType="1" noTextEdit="1"/>
+              </p:cNvSpPr>
+              <p:nvPr/>
+            </p:nvSpPr>
+            <p:spPr>
+              <a:xfrm>
+                <a:off x="6574166" y="2815637"/>
+                <a:ext cx="555537" cy="430887"/>
+              </a:xfrm>
+              <a:prstGeom prst="rect">
+                <a:avLst/>
+              </a:prstGeom>
+              <a:blipFill>
+                <a:blip r:embed="rId7"/>
+                <a:stretch>
+                  <a:fillRect/>
+                </a:stretch>
+              </a:blipFill>
+            </p:spPr>
+            <p:txBody>
+              <a:bodyPr/>
+              <a:lstStyle/>
+              <a:p>
+                <a:r>
+                  <a:rPr lang="en-US">
+                    <a:noFill/>
+                  </a:rPr>
+                  <a:t> </a:t>
+                </a:r>
+              </a:p>
+            </p:txBody>
+          </p:sp>
+        </mc:Fallback>
+      </mc:AlternateContent>
+      <p:sp>
+        <p:nvSpPr>
+          <p:cNvPr id="30" name="Arc 29">
+            <a:extLst>
+              <a:ext uri="{FF2B5EF4-FFF2-40B4-BE49-F238E27FC236}">
+                <a16:creationId xmlns:a16="http://schemas.microsoft.com/office/drawing/2014/main" id="{7E3EC4D9-B5D7-4609-AA8D-ECC40B9C29A6}"/>
+              </a:ext>
+            </a:extLst>
+          </p:cNvPr>
+          <p:cNvSpPr/>
+          <p:nvPr/>
+        </p:nvSpPr>
+        <p:spPr>
+          <a:xfrm rot="16821118">
+            <a:off x="7935718" y="3428368"/>
+            <a:ext cx="206077" cy="248672"/>
+          </a:xfrm>
+          <a:prstGeom prst="arc">
+            <a:avLst>
+              <a:gd name="adj1" fmla="val 16200000"/>
+              <a:gd name="adj2" fmla="val 324231"/>
+            </a:avLst>
+          </a:prstGeom>
+          <a:ln w="22225">
+            <a:solidFill>
+              <a:schemeClr val="tx1"/>
+            </a:solidFill>
+          </a:ln>
+        </p:spPr>
+        <p:style>
+          <a:lnRef idx="1">
+            <a:schemeClr val="accent1"/>
+          </a:lnRef>
+          <a:fillRef idx="0">
+            <a:schemeClr val="accent1"/>
+          </a:fillRef>
+          <a:effectRef idx="0">
+            <a:schemeClr val="accent1"/>
+          </a:effectRef>
+          <a:fontRef idx="minor">
+            <a:schemeClr val="tx1"/>
+          </a:fontRef>
+        </p:style>
+        <p:txBody>
+          <a:bodyPr rtlCol="0" anchor="ctr"/>
+          <a:lstStyle/>
+          <a:p>
+            <a:pPr algn="ctr"/>
+            <a:endParaRPr lang="en-US" dirty="0"/>
+          </a:p>
+        </p:txBody>
+      </p:sp>
+      <mc:AlternateContent xmlns:mc="http://schemas.openxmlformats.org/markup-compatibility/2006">
+        <mc:Choice xmlns:a14="http://schemas.microsoft.com/office/drawing/2010/main" Requires="a14">
+          <p:sp>
+            <p:nvSpPr>
+              <p:cNvPr id="31" name="TextBox 30">
+                <a:extLst>
+                  <a:ext uri="{FF2B5EF4-FFF2-40B4-BE49-F238E27FC236}">
+                    <a16:creationId xmlns:a16="http://schemas.microsoft.com/office/drawing/2014/main" id="{D1E96F18-FEDD-46F3-BA3C-D2CE2B2DB3F4}"/>
+                  </a:ext>
+                </a:extLst>
+              </p:cNvPr>
+              <p:cNvSpPr txBox="1"/>
+              <p:nvPr/>
+            </p:nvSpPr>
+            <p:spPr>
+              <a:xfrm>
+                <a:off x="7852124" y="3136615"/>
+                <a:ext cx="197746" cy="276999"/>
+              </a:xfrm>
+              <a:prstGeom prst="rect">
+                <a:avLst/>
+              </a:prstGeom>
+              <a:noFill/>
+            </p:spPr>
+            <p:txBody>
+              <a:bodyPr wrap="none" lIns="0" tIns="0" rIns="0" bIns="0" rtlCol="0">
+                <a:spAutoFit/>
+              </a:bodyPr>
+              <a:lstStyle/>
+              <a:p>
+                <a:pPr/>
+                <a14:m>
+                  <m:oMathPara xmlns:m="http://schemas.openxmlformats.org/officeDocument/2006/math">
+                    <m:oMathParaPr>
+                      <m:jc m:val="centerGroup"/>
+                    </m:oMathParaPr>
+                    <m:oMath xmlns:m="http://schemas.openxmlformats.org/officeDocument/2006/math">
+                      <m:r>
+                        <a:rPr lang="en-US" i="1" smtClean="0">
+                          <a:latin typeface="Cambria Math" panose="02040503050406030204" pitchFamily="18" charset="0"/>
+                          <a:ea typeface="Cambria Math" panose="02040503050406030204" pitchFamily="18" charset="0"/>
+                        </a:rPr>
+                        <m:t>𝛼</m:t>
+                      </m:r>
+                    </m:oMath>
+                  </m:oMathPara>
+                </a14:m>
+                <a:endParaRPr lang="en-US" dirty="0"/>
+              </a:p>
+            </p:txBody>
+          </p:sp>
+        </mc:Choice>
+        <mc:Fallback>
+          <p:sp>
+            <p:nvSpPr>
+              <p:cNvPr id="31" name="TextBox 30">
+                <a:extLst>
+                  <a:ext uri="{FF2B5EF4-FFF2-40B4-BE49-F238E27FC236}">
+                    <a16:creationId xmlns:a16="http://schemas.microsoft.com/office/drawing/2014/main" id="{D1E96F18-FEDD-46F3-BA3C-D2CE2B2DB3F4}"/>
+                  </a:ext>
+                </a:extLst>
+              </p:cNvPr>
+              <p:cNvSpPr txBox="1">
+                <a:spLocks noRot="1" noChangeAspect="1" noMove="1" noResize="1" noEditPoints="1" noAdjustHandles="1" noChangeArrowheads="1" noChangeShapeType="1" noTextEdit="1"/>
+              </p:cNvSpPr>
+              <p:nvPr/>
+            </p:nvSpPr>
+            <p:spPr>
+              <a:xfrm>
+                <a:off x="7852124" y="3136615"/>
+                <a:ext cx="197746" cy="276999"/>
+              </a:xfrm>
+              <a:prstGeom prst="rect">
+                <a:avLst/>
+              </a:prstGeom>
+              <a:blipFill>
+                <a:blip r:embed="rId8"/>
+                <a:stretch>
+                  <a:fillRect l="-18182" r="-12121"/>
+                </a:stretch>
+              </a:blipFill>
+            </p:spPr>
+            <p:txBody>
+              <a:bodyPr/>
+              <a:lstStyle/>
+              <a:p>
+                <a:r>
+                  <a:rPr lang="en-US">
+                    <a:noFill/>
+                  </a:rPr>
+                  <a:t> </a:t>
+                </a:r>
+              </a:p>
+            </p:txBody>
+          </p:sp>
+        </mc:Fallback>
+      </mc:AlternateContent>
+      <p:sp>
+        <p:nvSpPr>
+          <p:cNvPr id="32" name="Arc 31">
+            <a:extLst>
+              <a:ext uri="{FF2B5EF4-FFF2-40B4-BE49-F238E27FC236}">
+                <a16:creationId xmlns:a16="http://schemas.microsoft.com/office/drawing/2014/main" id="{EF609F8A-4B5E-4004-A2F2-BD7987032407}"/>
+              </a:ext>
+            </a:extLst>
+          </p:cNvPr>
+          <p:cNvSpPr/>
+          <p:nvPr/>
+        </p:nvSpPr>
+        <p:spPr>
+          <a:xfrm rot="19850479">
+            <a:off x="8016058" y="3478770"/>
+            <a:ext cx="203704" cy="189692"/>
+          </a:xfrm>
+          <a:prstGeom prst="arc">
+            <a:avLst>
+              <a:gd name="adj1" fmla="val 16200000"/>
+              <a:gd name="adj2" fmla="val 324231"/>
+            </a:avLst>
+          </a:prstGeom>
+          <a:ln w="15875">
+            <a:solidFill>
+              <a:schemeClr val="tx1"/>
+            </a:solidFill>
+          </a:ln>
+        </p:spPr>
+        <p:style>
+          <a:lnRef idx="1">
+            <a:schemeClr val="accent1"/>
+          </a:lnRef>
+          <a:fillRef idx="0">
+            <a:schemeClr val="accent1"/>
+          </a:fillRef>
+          <a:effectRef idx="0">
+            <a:schemeClr val="accent1"/>
+          </a:effectRef>
+          <a:fontRef idx="minor">
+            <a:schemeClr val="tx1"/>
+          </a:fontRef>
+        </p:style>
+        <p:txBody>
+          <a:bodyPr rtlCol="0" anchor="ctr"/>
+          <a:lstStyle/>
+          <a:p>
+            <a:pPr algn="ctr"/>
+            <a:endParaRPr lang="en-US" dirty="0"/>
+          </a:p>
+        </p:txBody>
+      </p:sp>
+      <p:sp>
+        <p:nvSpPr>
+          <p:cNvPr id="33" name="Arc 32">
+            <a:extLst>
+              <a:ext uri="{FF2B5EF4-FFF2-40B4-BE49-F238E27FC236}">
+                <a16:creationId xmlns:a16="http://schemas.microsoft.com/office/drawing/2014/main" id="{6D2530E8-B040-4562-9F18-18F02ECAC24C}"/>
+              </a:ext>
+            </a:extLst>
+          </p:cNvPr>
+          <p:cNvSpPr/>
+          <p:nvPr/>
+        </p:nvSpPr>
+        <p:spPr>
+          <a:xfrm rot="19850479">
+            <a:off x="7991250" y="3425269"/>
+            <a:ext cx="269511" cy="250972"/>
+          </a:xfrm>
+          <a:prstGeom prst="arc">
+            <a:avLst>
+              <a:gd name="adj1" fmla="val 16200000"/>
+              <a:gd name="adj2" fmla="val 225876"/>
+            </a:avLst>
+          </a:prstGeom>
+          <a:ln w="15875">
+            <a:solidFill>
+              <a:schemeClr val="tx1"/>
+            </a:solidFill>
+          </a:ln>
+        </p:spPr>
+        <p:style>
+          <a:lnRef idx="1">
+            <a:schemeClr val="accent1"/>
+          </a:lnRef>
+          <a:fillRef idx="0">
+            <a:schemeClr val="accent1"/>
+          </a:fillRef>
+          <a:effectRef idx="0">
+            <a:schemeClr val="accent1"/>
+          </a:effectRef>
+          <a:fontRef idx="minor">
+            <a:schemeClr val="tx1"/>
+          </a:fontRef>
+        </p:style>
+        <p:txBody>
+          <a:bodyPr rtlCol="0" anchor="ctr"/>
+          <a:lstStyle/>
+          <a:p>
+            <a:pPr algn="ctr"/>
+            <a:endParaRPr lang="en-US" dirty="0"/>
+          </a:p>
+        </p:txBody>
+      </p:sp>
+      <mc:AlternateContent xmlns:mc="http://schemas.openxmlformats.org/markup-compatibility/2006">
+        <mc:Choice xmlns:a14="http://schemas.microsoft.com/office/drawing/2010/main" Requires="a14">
+          <p:sp>
+            <p:nvSpPr>
+              <p:cNvPr id="34" name="TextBox 33">
+                <a:extLst>
+                  <a:ext uri="{FF2B5EF4-FFF2-40B4-BE49-F238E27FC236}">
+                    <a16:creationId xmlns:a16="http://schemas.microsoft.com/office/drawing/2014/main" id="{A41617AE-CA27-4842-92A8-BE353BECB513}"/>
+                  </a:ext>
+                </a:extLst>
+              </p:cNvPr>
+              <p:cNvSpPr txBox="1"/>
+              <p:nvPr/>
+            </p:nvSpPr>
+            <p:spPr>
+              <a:xfrm>
+                <a:off x="8131772" y="3130679"/>
+                <a:ext cx="199349" cy="276999"/>
+              </a:xfrm>
+              <a:prstGeom prst="rect">
+                <a:avLst/>
+              </a:prstGeom>
+              <a:noFill/>
+            </p:spPr>
+            <p:txBody>
+              <a:bodyPr wrap="none" lIns="0" tIns="0" rIns="0" bIns="0" rtlCol="0">
+                <a:spAutoFit/>
+              </a:bodyPr>
+              <a:lstStyle/>
+              <a:p>
+                <a:pPr/>
+                <a14:m>
+                  <m:oMathPara xmlns:m="http://schemas.openxmlformats.org/officeDocument/2006/math">
+                    <m:oMathParaPr>
+                      <m:jc m:val="centerGroup"/>
+                    </m:oMathParaPr>
+                    <m:oMath xmlns:m="http://schemas.openxmlformats.org/officeDocument/2006/math">
+                      <m:r>
+                        <a:rPr lang="en-US" i="1" smtClean="0">
+                          <a:latin typeface="Cambria Math" panose="02040503050406030204" pitchFamily="18" charset="0"/>
+                          <a:ea typeface="Cambria Math" panose="02040503050406030204" pitchFamily="18" charset="0"/>
+                        </a:rPr>
+                        <m:t>𝛽</m:t>
+                      </m:r>
+                    </m:oMath>
+                  </m:oMathPara>
+                </a14:m>
+                <a:endParaRPr lang="en-US" dirty="0"/>
+              </a:p>
+            </p:txBody>
+          </p:sp>
+        </mc:Choice>
+        <mc:Fallback>
+          <p:sp>
+            <p:nvSpPr>
+              <p:cNvPr id="34" name="TextBox 33">
+                <a:extLst>
+                  <a:ext uri="{FF2B5EF4-FFF2-40B4-BE49-F238E27FC236}">
+                    <a16:creationId xmlns:a16="http://schemas.microsoft.com/office/drawing/2014/main" id="{A41617AE-CA27-4842-92A8-BE353BECB513}"/>
+                  </a:ext>
+                </a:extLst>
+              </p:cNvPr>
+              <p:cNvSpPr txBox="1">
+                <a:spLocks noRot="1" noChangeAspect="1" noMove="1" noResize="1" noEditPoints="1" noAdjustHandles="1" noChangeArrowheads="1" noChangeShapeType="1" noTextEdit="1"/>
+              </p:cNvSpPr>
+              <p:nvPr/>
+            </p:nvSpPr>
+            <p:spPr>
+              <a:xfrm>
+                <a:off x="8131772" y="3130679"/>
+                <a:ext cx="199349" cy="276999"/>
+              </a:xfrm>
+              <a:prstGeom prst="rect">
+                <a:avLst/>
+              </a:prstGeom>
+              <a:blipFill>
+                <a:blip r:embed="rId9"/>
+                <a:stretch>
+                  <a:fillRect l="-42424" t="-4444" r="-36364" b="-35556"/>
+                </a:stretch>
+              </a:blipFill>
+            </p:spPr>
+            <p:txBody>
+              <a:bodyPr/>
+              <a:lstStyle/>
+              <a:p>
+                <a:r>
+                  <a:rPr lang="en-US">
+                    <a:noFill/>
+                  </a:rPr>
+                  <a:t> </a:t>
+                </a:r>
+              </a:p>
+            </p:txBody>
+          </p:sp>
+        </mc:Fallback>
+      </mc:AlternateContent>
+      <mc:AlternateContent xmlns:mc="http://schemas.openxmlformats.org/markup-compatibility/2006">
+        <mc:Choice xmlns:a14="http://schemas.microsoft.com/office/drawing/2010/main" Requires="a14">
+          <p:sp>
+            <p:nvSpPr>
+              <p:cNvPr id="36" name="TextBox 35">
+                <a:extLst>
+                  <a:ext uri="{FF2B5EF4-FFF2-40B4-BE49-F238E27FC236}">
+                    <a16:creationId xmlns:a16="http://schemas.microsoft.com/office/drawing/2014/main" id="{9B2E5550-0188-48A4-A325-DDB611D4C0C7}"/>
+                  </a:ext>
+                </a:extLst>
+              </p:cNvPr>
+              <p:cNvSpPr txBox="1"/>
+              <p:nvPr/>
+            </p:nvSpPr>
+            <p:spPr>
+              <a:xfrm>
+                <a:off x="9287593" y="2295207"/>
+                <a:ext cx="555537" cy="430887"/>
+              </a:xfrm>
+              <a:prstGeom prst="rect">
+                <a:avLst/>
+              </a:prstGeom>
+              <a:noFill/>
+            </p:spPr>
+            <p:txBody>
+              <a:bodyPr wrap="square" lIns="0" tIns="0" rIns="0" bIns="0" rtlCol="0">
+                <a:spAutoFit/>
+              </a:bodyPr>
+              <a:lstStyle/>
+              <a:p>
+                <a:pPr/>
+                <a14:m>
+                  <m:oMathPara xmlns:m="http://schemas.openxmlformats.org/officeDocument/2006/math">
+                    <m:oMathParaPr>
+                      <m:jc m:val="centerGroup"/>
+                    </m:oMathParaPr>
+                    <m:oMath xmlns:m="http://schemas.openxmlformats.org/officeDocument/2006/math">
+                      <m:acc>
+                        <m:accPr>
+                          <m:chr m:val="⃗"/>
+                          <m:ctrlPr>
+                            <a:rPr lang="en-US" sz="2800" b="0" i="1" smtClean="0">
+                              <a:latin typeface="Cambria Math" panose="02040503050406030204" pitchFamily="18" charset="0"/>
+                            </a:rPr>
+                          </m:ctrlPr>
+                        </m:accPr>
+                        <m:e>
+                          <m:r>
+                            <a:rPr lang="en-US" sz="2800" b="0" i="1" smtClean="0">
+                              <a:latin typeface="Cambria Math" panose="02040503050406030204" pitchFamily="18" charset="0"/>
+                            </a:rPr>
+                            <m:t>𝑢</m:t>
+                          </m:r>
+                        </m:e>
+                      </m:acc>
+                    </m:oMath>
+                  </m:oMathPara>
+                </a14:m>
+                <a:endParaRPr lang="en-US" sz="2800" dirty="0"/>
+              </a:p>
+            </p:txBody>
+          </p:sp>
+        </mc:Choice>
+        <mc:Fallback>
+          <p:sp>
+            <p:nvSpPr>
+              <p:cNvPr id="36" name="TextBox 35">
+                <a:extLst>
+                  <a:ext uri="{FF2B5EF4-FFF2-40B4-BE49-F238E27FC236}">
+                    <a16:creationId xmlns:a16="http://schemas.microsoft.com/office/drawing/2014/main" id="{9B2E5550-0188-48A4-A325-DDB611D4C0C7}"/>
+                  </a:ext>
+                </a:extLst>
+              </p:cNvPr>
+              <p:cNvSpPr txBox="1">
+                <a:spLocks noRot="1" noChangeAspect="1" noMove="1" noResize="1" noEditPoints="1" noAdjustHandles="1" noChangeArrowheads="1" noChangeShapeType="1" noTextEdit="1"/>
+              </p:cNvSpPr>
+              <p:nvPr/>
+            </p:nvSpPr>
+            <p:spPr>
+              <a:xfrm>
+                <a:off x="9287593" y="2295207"/>
+                <a:ext cx="555537" cy="430887"/>
+              </a:xfrm>
+              <a:prstGeom prst="rect">
+                <a:avLst/>
+              </a:prstGeom>
+              <a:blipFill>
+                <a:blip r:embed="rId10"/>
+                <a:stretch>
+                  <a:fillRect/>
+                </a:stretch>
+              </a:blipFill>
+            </p:spPr>
+            <p:txBody>
+              <a:bodyPr/>
+              <a:lstStyle/>
+              <a:p>
+                <a:r>
+                  <a:rPr lang="en-US">
+                    <a:noFill/>
+                  </a:rPr>
+                  <a:t> </a:t>
+                </a:r>
+              </a:p>
+            </p:txBody>
+          </p:sp>
+        </mc:Fallback>
+      </mc:AlternateContent>
+      <p:cxnSp>
+        <p:nvCxnSpPr>
+          <p:cNvPr id="40" name="Straight Arrow Connector 39">
+            <a:extLst>
+              <a:ext uri="{FF2B5EF4-FFF2-40B4-BE49-F238E27FC236}">
+                <a16:creationId xmlns:a16="http://schemas.microsoft.com/office/drawing/2014/main" id="{60A5255F-9E00-43EB-A68D-328991F52F77}"/>
+              </a:ext>
+            </a:extLst>
+          </p:cNvPr>
+          <p:cNvCxnSpPr>
+            <a:cxnSpLocks/>
+          </p:cNvCxnSpPr>
+          <p:nvPr/>
+        </p:nvCxnSpPr>
+        <p:spPr>
+          <a:xfrm flipH="1">
+            <a:off x="6914117" y="2660910"/>
+            <a:ext cx="1143010" cy="0"/>
+          </a:xfrm>
+          <a:prstGeom prst="straightConnector1">
+            <a:avLst/>
+          </a:prstGeom>
+          <a:ln w="25400">
+            <a:solidFill>
+              <a:schemeClr val="tx1"/>
+            </a:solidFill>
+            <a:prstDash val="dash"/>
+            <a:tailEnd type="none" w="lg" len="lg"/>
+          </a:ln>
+        </p:spPr>
+        <p:style>
+          <a:lnRef idx="1">
+            <a:schemeClr val="accent1"/>
+          </a:lnRef>
+          <a:fillRef idx="0">
+            <a:schemeClr val="accent1"/>
+          </a:fillRef>
+          <a:effectRef idx="0">
+            <a:schemeClr val="accent1"/>
+          </a:effectRef>
+          <a:fontRef idx="minor">
+            <a:schemeClr val="tx1"/>
+          </a:fontRef>
+        </p:style>
+      </p:cxnSp>
+      <p:cxnSp>
+        <p:nvCxnSpPr>
+          <p:cNvPr id="43" name="Straight Arrow Connector 42">
+            <a:extLst>
+              <a:ext uri="{FF2B5EF4-FFF2-40B4-BE49-F238E27FC236}">
+                <a16:creationId xmlns:a16="http://schemas.microsoft.com/office/drawing/2014/main" id="{C1372153-E289-45A7-A19D-71EE519E4ACD}"/>
+              </a:ext>
+            </a:extLst>
+          </p:cNvPr>
+          <p:cNvCxnSpPr>
+            <a:cxnSpLocks/>
+          </p:cNvCxnSpPr>
+          <p:nvPr/>
+        </p:nvCxnSpPr>
+        <p:spPr>
+          <a:xfrm flipH="1">
+            <a:off x="8067553" y="2338268"/>
+            <a:ext cx="1259327" cy="0"/>
+          </a:xfrm>
+          <a:prstGeom prst="straightConnector1">
+            <a:avLst/>
+          </a:prstGeom>
+          <a:ln w="25400">
+            <a:solidFill>
+              <a:schemeClr val="tx1"/>
+            </a:solidFill>
+            <a:prstDash val="dash"/>
+            <a:tailEnd type="none" w="lg" len="lg"/>
+          </a:ln>
+        </p:spPr>
+        <p:style>
+          <a:lnRef idx="1">
+            <a:schemeClr val="accent1"/>
+          </a:lnRef>
+          <a:fillRef idx="0">
+            <a:schemeClr val="accent1"/>
+          </a:fillRef>
+          <a:effectRef idx="0">
+            <a:schemeClr val="accent1"/>
+          </a:effectRef>
+          <a:fontRef idx="minor">
+            <a:schemeClr val="tx1"/>
+          </a:fontRef>
+        </p:style>
+      </p:cxnSp>
+    </p:spTree>
+    <p:extLst>
+      <p:ext uri="{BB962C8B-B14F-4D97-AF65-F5344CB8AC3E}">
+        <p14:creationId xmlns:p14="http://schemas.microsoft.com/office/powerpoint/2010/main" val="2860500913"/>
       </p:ext>
     </p:extLst>
   </p:cSld>

</xml_diff>

<commit_message>
Added 1.4.9 solution&Updated 1.4.8
</commit_message>
<xml_diff>
--- a/volunteer/Drawings.pptx
+++ b/volunteer/Drawings.pptx
@@ -9566,8 +9566,8 @@
           </a:fontRef>
         </p:style>
       </p:cxnSp>
-      <mc:AlternateContent xmlns:mc="http://schemas.openxmlformats.org/markup-compatibility/2006">
-        <mc:Choice xmlns:a14="http://schemas.microsoft.com/office/drawing/2010/main" Requires="a14">
+      <mc:AlternateContent xmlns:mc="http://schemas.openxmlformats.org/markup-compatibility/2006" xmlns:a14="http://schemas.microsoft.com/office/drawing/2010/main">
+        <mc:Choice Requires="a14">
           <p:sp>
             <p:nvSpPr>
               <p:cNvPr id="5" name="TextBox 4">
@@ -9635,7 +9635,7 @@
             </p:txBody>
           </p:sp>
         </mc:Choice>
-        <mc:Fallback>
+        <mc:Fallback xmlns="">
           <p:sp>
             <p:nvSpPr>
               <p:cNvPr id="5" name="TextBox 4">
@@ -9768,8 +9768,8 @@
           </a:fontRef>
         </p:style>
       </p:cxnSp>
-      <mc:AlternateContent xmlns:mc="http://schemas.openxmlformats.org/markup-compatibility/2006">
-        <mc:Choice xmlns:a14="http://schemas.microsoft.com/office/drawing/2010/main" Requires="a14">
+      <mc:AlternateContent xmlns:mc="http://schemas.openxmlformats.org/markup-compatibility/2006" xmlns:a14="http://schemas.microsoft.com/office/drawing/2010/main">
+        <mc:Choice Requires="a14">
           <p:sp>
             <p:nvSpPr>
               <p:cNvPr id="12" name="TextBox 11">
@@ -9831,7 +9831,7 @@
             </p:txBody>
           </p:sp>
         </mc:Choice>
-        <mc:Fallback>
+        <mc:Fallback xmlns="">
           <p:sp>
             <p:nvSpPr>
               <p:cNvPr id="12" name="TextBox 11">
@@ -9972,8 +9972,8 @@
           </a:p>
         </p:txBody>
       </p:sp>
-      <mc:AlternateContent xmlns:mc="http://schemas.openxmlformats.org/markup-compatibility/2006">
-        <mc:Choice xmlns:a14="http://schemas.microsoft.com/office/drawing/2010/main" Requires="a14">
+      <mc:AlternateContent xmlns:mc="http://schemas.openxmlformats.org/markup-compatibility/2006" xmlns:a14="http://schemas.microsoft.com/office/drawing/2010/main">
+        <mc:Choice Requires="a14">
           <p:sp>
             <p:nvSpPr>
               <p:cNvPr id="17" name="TextBox 16">
@@ -10024,7 +10024,7 @@
             </p:txBody>
           </p:sp>
         </mc:Choice>
-        <mc:Fallback>
+        <mc:Fallback xmlns="">
           <p:sp>
             <p:nvSpPr>
               <p:cNvPr id="17" name="TextBox 16">
@@ -10069,8 +10069,8 @@
           </p:sp>
         </mc:Fallback>
       </mc:AlternateContent>
-      <mc:AlternateContent xmlns:mc="http://schemas.openxmlformats.org/markup-compatibility/2006">
-        <mc:Choice xmlns:a14="http://schemas.microsoft.com/office/drawing/2010/main" Requires="a14">
+      <mc:AlternateContent xmlns:mc="http://schemas.openxmlformats.org/markup-compatibility/2006" xmlns:a14="http://schemas.microsoft.com/office/drawing/2010/main">
+        <mc:Choice Requires="a14">
           <p:sp>
             <p:nvSpPr>
               <p:cNvPr id="18" name="TextBox 17">
@@ -10151,7 +10151,7 @@
             </p:txBody>
           </p:sp>
         </mc:Choice>
-        <mc:Fallback>
+        <mc:Fallback xmlns="">
           <p:sp>
             <p:nvSpPr>
               <p:cNvPr id="18" name="TextBox 17">
@@ -10300,8 +10300,8 @@
           </a:p>
         </p:txBody>
       </p:sp>
-      <mc:AlternateContent xmlns:mc="http://schemas.openxmlformats.org/markup-compatibility/2006">
-        <mc:Choice xmlns:a14="http://schemas.microsoft.com/office/drawing/2010/main" Requires="a14">
+      <mc:AlternateContent xmlns:mc="http://schemas.openxmlformats.org/markup-compatibility/2006" xmlns:a14="http://schemas.microsoft.com/office/drawing/2010/main">
+        <mc:Choice Requires="a14">
           <p:sp>
             <p:nvSpPr>
               <p:cNvPr id="15" name="TextBox 14">
@@ -10352,7 +10352,7 @@
             </p:txBody>
           </p:sp>
         </mc:Choice>
-        <mc:Fallback>
+        <mc:Fallback xmlns="">
           <p:sp>
             <p:nvSpPr>
               <p:cNvPr id="15" name="TextBox 14">
@@ -10413,7 +10413,7 @@
         </p:nvCxnSpPr>
         <p:spPr>
           <a:xfrm flipV="1">
-            <a:off x="8067555" y="1988820"/>
+            <a:off x="7399898" y="883718"/>
             <a:ext cx="0" cy="2004061"/>
           </a:xfrm>
           <a:prstGeom prst="straightConnector1">
@@ -10458,7 +10458,7 @@
         </p:nvCxnSpPr>
         <p:spPr>
           <a:xfrm flipH="1" flipV="1">
-            <a:off x="6914117" y="2660910"/>
+            <a:off x="6246460" y="1555808"/>
             <a:ext cx="1153436" cy="1000112"/>
           </a:xfrm>
           <a:prstGeom prst="straightConnector1">
@@ -10502,7 +10502,7 @@
         </p:nvCxnSpPr>
         <p:spPr>
           <a:xfrm flipV="1">
-            <a:off x="8059677" y="2370732"/>
+            <a:off x="7392020" y="1265630"/>
             <a:ext cx="1285837" cy="1290291"/>
           </a:xfrm>
           <a:prstGeom prst="straightConnector1">
@@ -10546,7 +10546,7 @@
             </p:nvSpPr>
             <p:spPr>
               <a:xfrm>
-                <a:off x="6574166" y="2815637"/>
+                <a:off x="5906509" y="1710535"/>
                 <a:ext cx="555537" cy="430887"/>
               </a:xfrm>
               <a:prstGeom prst="rect">
@@ -10610,7 +10610,7 @@
             </p:nvSpPr>
             <p:spPr>
               <a:xfrm>
-                <a:off x="6574166" y="2815637"/>
+                <a:off x="5906509" y="1710535"/>
                 <a:ext cx="555537" cy="430887"/>
               </a:xfrm>
               <a:prstGeom prst="rect">
@@ -10652,7 +10652,7 @@
         </p:nvSpPr>
         <p:spPr>
           <a:xfrm rot="16821118">
-            <a:off x="7935718" y="3428368"/>
+            <a:off x="7268061" y="2323266"/>
             <a:ext cx="206077" cy="248672"/>
           </a:xfrm>
           <a:prstGeom prst="arc">
@@ -10706,7 +10706,7 @@
             </p:nvSpPr>
             <p:spPr>
               <a:xfrm>
-                <a:off x="7852124" y="3136615"/>
+                <a:off x="7184467" y="2031513"/>
                 <a:ext cx="197746" cy="276999"/>
               </a:xfrm>
               <a:prstGeom prst="rect">
@@ -10759,7 +10759,7 @@
             </p:nvSpPr>
             <p:spPr>
               <a:xfrm>
-                <a:off x="7852124" y="3136615"/>
+                <a:off x="7184467" y="2031513"/>
                 <a:ext cx="197746" cy="276999"/>
               </a:xfrm>
               <a:prstGeom prst="rect">
@@ -10768,7 +10768,7 @@
               <a:blipFill>
                 <a:blip r:embed="rId8"/>
                 <a:stretch>
-                  <a:fillRect l="-18182" r="-12121"/>
+                  <a:fillRect l="-18750" r="-15625"/>
                 </a:stretch>
               </a:blipFill>
             </p:spPr>
@@ -10801,7 +10801,7 @@
         </p:nvSpPr>
         <p:spPr>
           <a:xfrm rot="19850479">
-            <a:off x="8016058" y="3478770"/>
+            <a:off x="7348401" y="2373668"/>
             <a:ext cx="203704" cy="189692"/>
           </a:xfrm>
           <a:prstGeom prst="arc">
@@ -10853,7 +10853,7 @@
         </p:nvSpPr>
         <p:spPr>
           <a:xfrm rot="19850479">
-            <a:off x="7991250" y="3425269"/>
+            <a:off x="7323593" y="2320167"/>
             <a:ext cx="269511" cy="250972"/>
           </a:xfrm>
           <a:prstGeom prst="arc">
@@ -10907,7 +10907,7 @@
             </p:nvSpPr>
             <p:spPr>
               <a:xfrm>
-                <a:off x="8131772" y="3130679"/>
+                <a:off x="7464115" y="2025577"/>
                 <a:ext cx="199349" cy="276999"/>
               </a:xfrm>
               <a:prstGeom prst="rect">
@@ -10960,7 +10960,7 @@
             </p:nvSpPr>
             <p:spPr>
               <a:xfrm>
-                <a:off x="8131772" y="3130679"/>
+                <a:off x="7464115" y="2025577"/>
                 <a:ext cx="199349" cy="276999"/>
               </a:xfrm>
               <a:prstGeom prst="rect">
@@ -10969,7 +10969,7 @@
               <a:blipFill>
                 <a:blip r:embed="rId9"/>
                 <a:stretch>
-                  <a:fillRect l="-42424" t="-4444" r="-36364" b="-35556"/>
+                  <a:fillRect l="-42424" t="-2174" r="-36364" b="-32609"/>
                 </a:stretch>
               </a:blipFill>
             </p:spPr>
@@ -11004,7 +11004,7 @@
             </p:nvSpPr>
             <p:spPr>
               <a:xfrm>
-                <a:off x="9287593" y="2295207"/>
+                <a:off x="8619936" y="1190105"/>
                 <a:ext cx="555537" cy="430887"/>
               </a:xfrm>
               <a:prstGeom prst="rect">
@@ -11068,7 +11068,7 @@
             </p:nvSpPr>
             <p:spPr>
               <a:xfrm>
-                <a:off x="9287593" y="2295207"/>
+                <a:off x="8619936" y="1190105"/>
                 <a:ext cx="555537" cy="430887"/>
               </a:xfrm>
               <a:prstGeom prst="rect">
@@ -11112,7 +11112,7 @@
         </p:nvCxnSpPr>
         <p:spPr>
           <a:xfrm flipH="1">
-            <a:off x="6914117" y="2660910"/>
+            <a:off x="6246460" y="1555808"/>
             <a:ext cx="1143010" cy="0"/>
           </a:xfrm>
           <a:prstGeom prst="straightConnector1">
@@ -11157,7 +11157,7 @@
         </p:nvCxnSpPr>
         <p:spPr>
           <a:xfrm flipH="1">
-            <a:off x="8067553" y="2338268"/>
+            <a:off x="7399896" y="1233166"/>
             <a:ext cx="1259327" cy="0"/>
           </a:xfrm>
           <a:prstGeom prst="straightConnector1">
@@ -11186,6 +11186,2608 @@
           </a:fontRef>
         </p:style>
       </p:cxnSp>
+      <p:cxnSp>
+        <p:nvCxnSpPr>
+          <p:cNvPr id="26" name="Straight Arrow Connector 25">
+            <a:extLst>
+              <a:ext uri="{FF2B5EF4-FFF2-40B4-BE49-F238E27FC236}">
+                <a16:creationId xmlns:a16="http://schemas.microsoft.com/office/drawing/2014/main" id="{2E1C4B42-1587-4CF7-972D-6A1E9D9BDD27}"/>
+              </a:ext>
+            </a:extLst>
+          </p:cNvPr>
+          <p:cNvCxnSpPr>
+            <a:cxnSpLocks/>
+          </p:cNvCxnSpPr>
+          <p:nvPr/>
+        </p:nvCxnSpPr>
+        <p:spPr>
+          <a:xfrm flipH="1" flipV="1">
+            <a:off x="810366" y="5495809"/>
+            <a:ext cx="1187895" cy="1"/>
+          </a:xfrm>
+          <a:prstGeom prst="straightConnector1">
+            <a:avLst/>
+          </a:prstGeom>
+          <a:ln w="34925">
+            <a:solidFill>
+              <a:schemeClr val="accent6">
+                <a:lumMod val="75000"/>
+              </a:schemeClr>
+            </a:solidFill>
+            <a:prstDash val="dash"/>
+            <a:tailEnd type="stealth" w="lg" len="lg"/>
+          </a:ln>
+        </p:spPr>
+        <p:style>
+          <a:lnRef idx="1">
+            <a:schemeClr val="accent1"/>
+          </a:lnRef>
+          <a:fillRef idx="0">
+            <a:schemeClr val="accent1"/>
+          </a:fillRef>
+          <a:effectRef idx="0">
+            <a:schemeClr val="accent1"/>
+          </a:effectRef>
+          <a:fontRef idx="minor">
+            <a:schemeClr val="tx1"/>
+          </a:fontRef>
+        </p:style>
+      </p:cxnSp>
+      <p:cxnSp>
+        <p:nvCxnSpPr>
+          <p:cNvPr id="37" name="Straight Arrow Connector 36">
+            <a:extLst>
+              <a:ext uri="{FF2B5EF4-FFF2-40B4-BE49-F238E27FC236}">
+                <a16:creationId xmlns:a16="http://schemas.microsoft.com/office/drawing/2014/main" id="{B630102A-2F36-4DD0-ABF8-6EDD037540CB}"/>
+              </a:ext>
+            </a:extLst>
+          </p:cNvPr>
+          <p:cNvCxnSpPr>
+            <a:cxnSpLocks/>
+          </p:cNvCxnSpPr>
+          <p:nvPr/>
+        </p:nvCxnSpPr>
+        <p:spPr>
+          <a:xfrm flipV="1">
+            <a:off x="1998261" y="4493777"/>
+            <a:ext cx="0" cy="2004061"/>
+          </a:xfrm>
+          <a:prstGeom prst="straightConnector1">
+            <a:avLst/>
+          </a:prstGeom>
+          <a:ln w="25400">
+            <a:solidFill>
+              <a:schemeClr val="tx1"/>
+            </a:solidFill>
+            <a:prstDash val="solid"/>
+            <a:tailEnd type="none" w="lg" len="lg"/>
+          </a:ln>
+        </p:spPr>
+        <p:style>
+          <a:lnRef idx="1">
+            <a:schemeClr val="accent1"/>
+          </a:lnRef>
+          <a:fillRef idx="0">
+            <a:schemeClr val="accent1"/>
+          </a:fillRef>
+          <a:effectRef idx="0">
+            <a:schemeClr val="accent1"/>
+          </a:effectRef>
+          <a:fontRef idx="minor">
+            <a:schemeClr val="tx1"/>
+          </a:fontRef>
+        </p:style>
+      </p:cxnSp>
+      <mc:AlternateContent xmlns:mc="http://schemas.openxmlformats.org/markup-compatibility/2006">
+        <mc:Choice xmlns:a14="http://schemas.microsoft.com/office/drawing/2010/main" Requires="a14">
+          <p:sp>
+            <p:nvSpPr>
+              <p:cNvPr id="38" name="TextBox 37">
+                <a:extLst>
+                  <a:ext uri="{FF2B5EF4-FFF2-40B4-BE49-F238E27FC236}">
+                    <a16:creationId xmlns:a16="http://schemas.microsoft.com/office/drawing/2014/main" id="{207FE68F-6C51-4584-9BA3-29E4090AF79A}"/>
+                  </a:ext>
+                </a:extLst>
+              </p:cNvPr>
+              <p:cNvSpPr txBox="1"/>
+              <p:nvPr/>
+            </p:nvSpPr>
+            <p:spPr>
+              <a:xfrm>
+                <a:off x="796990" y="5565936"/>
+                <a:ext cx="555537" cy="430887"/>
+              </a:xfrm>
+              <a:prstGeom prst="rect">
+                <a:avLst/>
+              </a:prstGeom>
+              <a:noFill/>
+            </p:spPr>
+            <p:txBody>
+              <a:bodyPr wrap="square" lIns="0" tIns="0" rIns="0" bIns="0" rtlCol="0">
+                <a:spAutoFit/>
+              </a:bodyPr>
+              <a:lstStyle/>
+              <a:p>
+                <a:pPr/>
+                <a14:m>
+                  <m:oMathPara xmlns:m="http://schemas.openxmlformats.org/officeDocument/2006/math">
+                    <m:oMathParaPr>
+                      <m:jc m:val="centerGroup"/>
+                    </m:oMathParaPr>
+                    <m:oMath xmlns:m="http://schemas.openxmlformats.org/officeDocument/2006/math">
+                      <m:acc>
+                        <m:accPr>
+                          <m:chr m:val="⃗"/>
+                          <m:ctrlPr>
+                            <a:rPr lang="en-US" sz="2800" b="0" i="1" smtClean="0">
+                              <a:solidFill>
+                                <a:schemeClr val="accent6">
+                                  <a:lumMod val="75000"/>
+                                </a:schemeClr>
+                              </a:solidFill>
+                              <a:latin typeface="Cambria Math" panose="02040503050406030204" pitchFamily="18" charset="0"/>
+                            </a:rPr>
+                          </m:ctrlPr>
+                        </m:accPr>
+                        <m:e>
+                          <m:r>
+                            <a:rPr lang="en-US" sz="2800" b="0" i="1" smtClean="0">
+                              <a:solidFill>
+                                <a:schemeClr val="accent6">
+                                  <a:lumMod val="75000"/>
+                                </a:schemeClr>
+                              </a:solidFill>
+                              <a:latin typeface="Cambria Math" panose="02040503050406030204" pitchFamily="18" charset="0"/>
+                            </a:rPr>
+                            <m:t>𝑤</m:t>
+                          </m:r>
+                        </m:e>
+                      </m:acc>
+                    </m:oMath>
+                  </m:oMathPara>
+                </a14:m>
+                <a:endParaRPr lang="en-US" sz="2800" dirty="0">
+                  <a:solidFill>
+                    <a:schemeClr val="accent6">
+                      <a:lumMod val="75000"/>
+                    </a:schemeClr>
+                  </a:solidFill>
+                </a:endParaRPr>
+              </a:p>
+            </p:txBody>
+          </p:sp>
+        </mc:Choice>
+        <mc:Fallback>
+          <p:sp>
+            <p:nvSpPr>
+              <p:cNvPr id="38" name="TextBox 37">
+                <a:extLst>
+                  <a:ext uri="{FF2B5EF4-FFF2-40B4-BE49-F238E27FC236}">
+                    <a16:creationId xmlns:a16="http://schemas.microsoft.com/office/drawing/2014/main" id="{207FE68F-6C51-4584-9BA3-29E4090AF79A}"/>
+                  </a:ext>
+                </a:extLst>
+              </p:cNvPr>
+              <p:cNvSpPr txBox="1">
+                <a:spLocks noRot="1" noChangeAspect="1" noMove="1" noResize="1" noEditPoints="1" noAdjustHandles="1" noChangeArrowheads="1" noChangeShapeType="1" noTextEdit="1"/>
+              </p:cNvSpPr>
+              <p:nvPr/>
+            </p:nvSpPr>
+            <p:spPr>
+              <a:xfrm>
+                <a:off x="796990" y="5565936"/>
+                <a:ext cx="555537" cy="430887"/>
+              </a:xfrm>
+              <a:prstGeom prst="rect">
+                <a:avLst/>
+              </a:prstGeom>
+              <a:blipFill>
+                <a:blip r:embed="rId11"/>
+                <a:stretch>
+                  <a:fillRect/>
+                </a:stretch>
+              </a:blipFill>
+            </p:spPr>
+            <p:txBody>
+              <a:bodyPr/>
+              <a:lstStyle/>
+              <a:p>
+                <a:r>
+                  <a:rPr lang="en-US">
+                    <a:noFill/>
+                  </a:rPr>
+                  <a:t> </a:t>
+                </a:r>
+              </a:p>
+            </p:txBody>
+          </p:sp>
+        </mc:Fallback>
+      </mc:AlternateContent>
+      <p:sp>
+        <p:nvSpPr>
+          <p:cNvPr id="9" name="Oval 8">
+            <a:extLst>
+              <a:ext uri="{FF2B5EF4-FFF2-40B4-BE49-F238E27FC236}">
+                <a16:creationId xmlns:a16="http://schemas.microsoft.com/office/drawing/2014/main" id="{35182B4A-5C3F-47F8-9D3E-0FF358EE3782}"/>
+              </a:ext>
+            </a:extLst>
+          </p:cNvPr>
+          <p:cNvSpPr/>
+          <p:nvPr/>
+        </p:nvSpPr>
+        <p:spPr>
+          <a:xfrm>
+            <a:off x="995050" y="4581139"/>
+            <a:ext cx="219772" cy="209666"/>
+          </a:xfrm>
+          <a:prstGeom prst="ellipse">
+            <a:avLst/>
+          </a:prstGeom>
+          <a:gradFill flip="none" rotWithShape="1">
+            <a:gsLst>
+              <a:gs pos="0">
+                <a:schemeClr val="accent1">
+                  <a:lumMod val="89000"/>
+                </a:schemeClr>
+              </a:gs>
+              <a:gs pos="23000">
+                <a:schemeClr val="accent1">
+                  <a:lumMod val="89000"/>
+                </a:schemeClr>
+              </a:gs>
+              <a:gs pos="69000">
+                <a:schemeClr val="accent1">
+                  <a:lumMod val="75000"/>
+                </a:schemeClr>
+              </a:gs>
+              <a:gs pos="97000">
+                <a:schemeClr val="accent1">
+                  <a:lumMod val="70000"/>
+                </a:schemeClr>
+              </a:gs>
+            </a:gsLst>
+            <a:path path="circle">
+              <a:fillToRect l="50000" t="50000" r="50000" b="50000"/>
+            </a:path>
+            <a:tileRect/>
+          </a:gradFill>
+          <a:ln>
+            <a:noFill/>
+          </a:ln>
+        </p:spPr>
+        <p:style>
+          <a:lnRef idx="2">
+            <a:schemeClr val="accent1">
+              <a:shade val="50000"/>
+            </a:schemeClr>
+          </a:lnRef>
+          <a:fillRef idx="1">
+            <a:schemeClr val="accent1"/>
+          </a:fillRef>
+          <a:effectRef idx="0">
+            <a:schemeClr val="accent1"/>
+          </a:effectRef>
+          <a:fontRef idx="minor">
+            <a:schemeClr val="lt1"/>
+          </a:fontRef>
+        </p:style>
+        <p:txBody>
+          <a:bodyPr rtlCol="0" anchor="ctr"/>
+          <a:lstStyle/>
+          <a:p>
+            <a:pPr algn="ctr"/>
+            <a:endParaRPr lang="en-US"/>
+          </a:p>
+        </p:txBody>
+      </p:sp>
+      <p:sp>
+        <p:nvSpPr>
+          <p:cNvPr id="44" name="Arc 43">
+            <a:extLst>
+              <a:ext uri="{FF2B5EF4-FFF2-40B4-BE49-F238E27FC236}">
+                <a16:creationId xmlns:a16="http://schemas.microsoft.com/office/drawing/2014/main" id="{1D563204-2CE0-4DE5-8BA9-12C9A3B4BB4B}"/>
+              </a:ext>
+            </a:extLst>
+          </p:cNvPr>
+          <p:cNvSpPr/>
+          <p:nvPr/>
+        </p:nvSpPr>
+        <p:spPr>
+          <a:xfrm rot="14618095">
+            <a:off x="1705985" y="5254608"/>
+            <a:ext cx="241743" cy="324748"/>
+          </a:xfrm>
+          <a:prstGeom prst="arc">
+            <a:avLst>
+              <a:gd name="adj1" fmla="val 16200000"/>
+              <a:gd name="adj2" fmla="val 324231"/>
+            </a:avLst>
+          </a:prstGeom>
+          <a:ln w="22225">
+            <a:solidFill>
+              <a:schemeClr val="tx1"/>
+            </a:solidFill>
+          </a:ln>
+        </p:spPr>
+        <p:style>
+          <a:lnRef idx="1">
+            <a:schemeClr val="accent1"/>
+          </a:lnRef>
+          <a:fillRef idx="0">
+            <a:schemeClr val="accent1"/>
+          </a:fillRef>
+          <a:effectRef idx="0">
+            <a:schemeClr val="accent1"/>
+          </a:effectRef>
+          <a:fontRef idx="minor">
+            <a:schemeClr val="tx1"/>
+          </a:fontRef>
+        </p:style>
+        <p:txBody>
+          <a:bodyPr rtlCol="0" anchor="ctr"/>
+          <a:lstStyle/>
+          <a:p>
+            <a:pPr algn="ctr"/>
+            <a:endParaRPr lang="en-US" dirty="0"/>
+          </a:p>
+        </p:txBody>
+      </p:sp>
+      <mc:AlternateContent xmlns:mc="http://schemas.openxmlformats.org/markup-compatibility/2006">
+        <mc:Choice xmlns:a14="http://schemas.microsoft.com/office/drawing/2010/main" Requires="a14">
+          <p:sp>
+            <p:nvSpPr>
+              <p:cNvPr id="45" name="TextBox 44">
+                <a:extLst>
+                  <a:ext uri="{FF2B5EF4-FFF2-40B4-BE49-F238E27FC236}">
+                    <a16:creationId xmlns:a16="http://schemas.microsoft.com/office/drawing/2014/main" id="{4E7F1235-973E-4ED6-A6A2-A637645A8984}"/>
+                  </a:ext>
+                </a:extLst>
+              </p:cNvPr>
+              <p:cNvSpPr txBox="1"/>
+              <p:nvPr/>
+            </p:nvSpPr>
+            <p:spPr>
+              <a:xfrm>
+                <a:off x="1256588" y="5162307"/>
+                <a:ext cx="555537" cy="307777"/>
+              </a:xfrm>
+              <a:prstGeom prst="rect">
+                <a:avLst/>
+              </a:prstGeom>
+              <a:noFill/>
+            </p:spPr>
+            <p:txBody>
+              <a:bodyPr wrap="square" lIns="0" tIns="0" rIns="0" bIns="0" rtlCol="0">
+                <a:spAutoFit/>
+              </a:bodyPr>
+              <a:lstStyle/>
+              <a:p>
+                <a:pPr/>
+                <a14:m>
+                  <m:oMathPara xmlns:m="http://schemas.openxmlformats.org/officeDocument/2006/math">
+                    <m:oMathParaPr>
+                      <m:jc m:val="centerGroup"/>
+                    </m:oMathParaPr>
+                    <m:oMath xmlns:m="http://schemas.openxmlformats.org/officeDocument/2006/math">
+                      <m:r>
+                        <a:rPr lang="en-US" sz="2000" b="0" i="1" smtClean="0">
+                          <a:latin typeface="Cambria Math" panose="02040503050406030204" pitchFamily="18" charset="0"/>
+                          <a:ea typeface="Cambria Math" panose="02040503050406030204" pitchFamily="18" charset="0"/>
+                        </a:rPr>
+                        <m:t>𝛼</m:t>
+                      </m:r>
+                    </m:oMath>
+                  </m:oMathPara>
+                </a14:m>
+                <a:endParaRPr lang="en-US" sz="2800" dirty="0"/>
+              </a:p>
+            </p:txBody>
+          </p:sp>
+        </mc:Choice>
+        <mc:Fallback>
+          <p:sp>
+            <p:nvSpPr>
+              <p:cNvPr id="45" name="TextBox 44">
+                <a:extLst>
+                  <a:ext uri="{FF2B5EF4-FFF2-40B4-BE49-F238E27FC236}">
+                    <a16:creationId xmlns:a16="http://schemas.microsoft.com/office/drawing/2014/main" id="{4E7F1235-973E-4ED6-A6A2-A637645A8984}"/>
+                  </a:ext>
+                </a:extLst>
+              </p:cNvPr>
+              <p:cNvSpPr txBox="1">
+                <a:spLocks noRot="1" noChangeAspect="1" noMove="1" noResize="1" noEditPoints="1" noAdjustHandles="1" noChangeArrowheads="1" noChangeShapeType="1" noTextEdit="1"/>
+              </p:cNvSpPr>
+              <p:nvPr/>
+            </p:nvSpPr>
+            <p:spPr>
+              <a:xfrm>
+                <a:off x="1256588" y="5162307"/>
+                <a:ext cx="555537" cy="307777"/>
+              </a:xfrm>
+              <a:prstGeom prst="rect">
+                <a:avLst/>
+              </a:prstGeom>
+              <a:blipFill>
+                <a:blip r:embed="rId12"/>
+                <a:stretch>
+                  <a:fillRect/>
+                </a:stretch>
+              </a:blipFill>
+            </p:spPr>
+            <p:txBody>
+              <a:bodyPr/>
+              <a:lstStyle/>
+              <a:p>
+                <a:r>
+                  <a:rPr lang="en-US">
+                    <a:noFill/>
+                  </a:rPr>
+                  <a:t> </a:t>
+                </a:r>
+              </a:p>
+            </p:txBody>
+          </p:sp>
+        </mc:Fallback>
+      </mc:AlternateContent>
+      <p:cxnSp>
+        <p:nvCxnSpPr>
+          <p:cNvPr id="41" name="Straight Arrow Connector 40">
+            <a:extLst>
+              <a:ext uri="{FF2B5EF4-FFF2-40B4-BE49-F238E27FC236}">
+                <a16:creationId xmlns:a16="http://schemas.microsoft.com/office/drawing/2014/main" id="{5F4B7061-C117-4B90-A392-D421D2BA8305}"/>
+              </a:ext>
+            </a:extLst>
+          </p:cNvPr>
+          <p:cNvCxnSpPr>
+            <a:cxnSpLocks/>
+            <a:stCxn id="9" idx="5"/>
+          </p:cNvCxnSpPr>
+          <p:nvPr/>
+        </p:nvCxnSpPr>
+        <p:spPr>
+          <a:xfrm>
+            <a:off x="1182637" y="4760100"/>
+            <a:ext cx="815624" cy="735707"/>
+          </a:xfrm>
+          <a:prstGeom prst="straightConnector1">
+            <a:avLst/>
+          </a:prstGeom>
+          <a:ln w="34925">
+            <a:solidFill>
+              <a:schemeClr val="accent1">
+                <a:lumMod val="75000"/>
+              </a:schemeClr>
+            </a:solidFill>
+            <a:tailEnd type="stealth" w="lg" len="lg"/>
+          </a:ln>
+        </p:spPr>
+        <p:style>
+          <a:lnRef idx="1">
+            <a:schemeClr val="accent1"/>
+          </a:lnRef>
+          <a:fillRef idx="0">
+            <a:schemeClr val="accent1"/>
+          </a:fillRef>
+          <a:effectRef idx="0">
+            <a:schemeClr val="accent1"/>
+          </a:effectRef>
+          <a:fontRef idx="minor">
+            <a:schemeClr val="tx1"/>
+          </a:fontRef>
+        </p:style>
+      </p:cxnSp>
+      <mc:AlternateContent xmlns:mc="http://schemas.openxmlformats.org/markup-compatibility/2006">
+        <mc:Choice xmlns:a14="http://schemas.microsoft.com/office/drawing/2010/main" Requires="a14">
+          <p:sp>
+            <p:nvSpPr>
+              <p:cNvPr id="46" name="TextBox 45">
+                <a:extLst>
+                  <a:ext uri="{FF2B5EF4-FFF2-40B4-BE49-F238E27FC236}">
+                    <a16:creationId xmlns:a16="http://schemas.microsoft.com/office/drawing/2014/main" id="{04B3AEDF-DE8E-42F9-9627-BA79F22F4172}"/>
+                  </a:ext>
+                </a:extLst>
+              </p:cNvPr>
+              <p:cNvSpPr txBox="1"/>
+              <p:nvPr/>
+            </p:nvSpPr>
+            <p:spPr>
+              <a:xfrm>
+                <a:off x="1534346" y="4887586"/>
+                <a:ext cx="555537" cy="430887"/>
+              </a:xfrm>
+              <a:prstGeom prst="rect">
+                <a:avLst/>
+              </a:prstGeom>
+              <a:noFill/>
+            </p:spPr>
+            <p:txBody>
+              <a:bodyPr wrap="square" lIns="0" tIns="0" rIns="0" bIns="0" rtlCol="0">
+                <a:spAutoFit/>
+              </a:bodyPr>
+              <a:lstStyle/>
+              <a:p>
+                <a:pPr/>
+                <a14:m>
+                  <m:oMathPara xmlns:m="http://schemas.openxmlformats.org/officeDocument/2006/math">
+                    <m:oMathParaPr>
+                      <m:jc m:val="centerGroup"/>
+                    </m:oMathParaPr>
+                    <m:oMath xmlns:m="http://schemas.openxmlformats.org/officeDocument/2006/math">
+                      <m:acc>
+                        <m:accPr>
+                          <m:chr m:val="⃗"/>
+                          <m:ctrlPr>
+                            <a:rPr lang="en-US" sz="2800" b="0" i="1" smtClean="0">
+                              <a:solidFill>
+                                <a:schemeClr val="accent5">
+                                  <a:lumMod val="75000"/>
+                                </a:schemeClr>
+                              </a:solidFill>
+                              <a:latin typeface="Cambria Math" panose="02040503050406030204" pitchFamily="18" charset="0"/>
+                            </a:rPr>
+                          </m:ctrlPr>
+                        </m:accPr>
+                        <m:e>
+                          <m:r>
+                            <a:rPr lang="en-US" sz="2800" b="0" i="1" smtClean="0">
+                              <a:solidFill>
+                                <a:schemeClr val="accent5">
+                                  <a:lumMod val="75000"/>
+                                </a:schemeClr>
+                              </a:solidFill>
+                              <a:latin typeface="Cambria Math" panose="02040503050406030204" pitchFamily="18" charset="0"/>
+                            </a:rPr>
+                            <m:t>𝑣</m:t>
+                          </m:r>
+                        </m:e>
+                      </m:acc>
+                    </m:oMath>
+                  </m:oMathPara>
+                </a14:m>
+                <a:endParaRPr lang="en-US" sz="2800" dirty="0">
+                  <a:solidFill>
+                    <a:schemeClr val="accent5">
+                      <a:lumMod val="75000"/>
+                    </a:schemeClr>
+                  </a:solidFill>
+                </a:endParaRPr>
+              </a:p>
+            </p:txBody>
+          </p:sp>
+        </mc:Choice>
+        <mc:Fallback>
+          <p:sp>
+            <p:nvSpPr>
+              <p:cNvPr id="46" name="TextBox 45">
+                <a:extLst>
+                  <a:ext uri="{FF2B5EF4-FFF2-40B4-BE49-F238E27FC236}">
+                    <a16:creationId xmlns:a16="http://schemas.microsoft.com/office/drawing/2014/main" id="{04B3AEDF-DE8E-42F9-9627-BA79F22F4172}"/>
+                  </a:ext>
+                </a:extLst>
+              </p:cNvPr>
+              <p:cNvSpPr txBox="1">
+                <a:spLocks noRot="1" noChangeAspect="1" noMove="1" noResize="1" noEditPoints="1" noAdjustHandles="1" noChangeArrowheads="1" noChangeShapeType="1" noTextEdit="1"/>
+              </p:cNvSpPr>
+              <p:nvPr/>
+            </p:nvSpPr>
+            <p:spPr>
+              <a:xfrm>
+                <a:off x="1534346" y="4887586"/>
+                <a:ext cx="555537" cy="430887"/>
+              </a:xfrm>
+              <a:prstGeom prst="rect">
+                <a:avLst/>
+              </a:prstGeom>
+              <a:blipFill>
+                <a:blip r:embed="rId13"/>
+                <a:stretch>
+                  <a:fillRect/>
+                </a:stretch>
+              </a:blipFill>
+            </p:spPr>
+            <p:txBody>
+              <a:bodyPr/>
+              <a:lstStyle/>
+              <a:p>
+                <a:r>
+                  <a:rPr lang="en-US">
+                    <a:noFill/>
+                  </a:rPr>
+                  <a:t> </a:t>
+                </a:r>
+              </a:p>
+            </p:txBody>
+          </p:sp>
+        </mc:Fallback>
+      </mc:AlternateContent>
+      <p:cxnSp>
+        <p:nvCxnSpPr>
+          <p:cNvPr id="47" name="Straight Arrow Connector 46">
+            <a:extLst>
+              <a:ext uri="{FF2B5EF4-FFF2-40B4-BE49-F238E27FC236}">
+                <a16:creationId xmlns:a16="http://schemas.microsoft.com/office/drawing/2014/main" id="{1AC0BA2B-700E-4541-9242-0C2356DD2DC3}"/>
+              </a:ext>
+            </a:extLst>
+          </p:cNvPr>
+          <p:cNvCxnSpPr>
+            <a:cxnSpLocks/>
+          </p:cNvCxnSpPr>
+          <p:nvPr/>
+        </p:nvCxnSpPr>
+        <p:spPr>
+          <a:xfrm flipV="1">
+            <a:off x="1956052" y="5495807"/>
+            <a:ext cx="937671" cy="15759"/>
+          </a:xfrm>
+          <a:prstGeom prst="straightConnector1">
+            <a:avLst/>
+          </a:prstGeom>
+          <a:ln w="34925">
+            <a:solidFill>
+              <a:schemeClr val="accent6">
+                <a:lumMod val="75000"/>
+              </a:schemeClr>
+            </a:solidFill>
+            <a:tailEnd type="stealth" w="lg" len="lg"/>
+          </a:ln>
+        </p:spPr>
+        <p:style>
+          <a:lnRef idx="1">
+            <a:schemeClr val="accent1"/>
+          </a:lnRef>
+          <a:fillRef idx="0">
+            <a:schemeClr val="accent1"/>
+          </a:fillRef>
+          <a:effectRef idx="0">
+            <a:schemeClr val="accent1"/>
+          </a:effectRef>
+          <a:fontRef idx="minor">
+            <a:schemeClr val="tx1"/>
+          </a:fontRef>
+        </p:style>
+      </p:cxnSp>
+      <p:cxnSp>
+        <p:nvCxnSpPr>
+          <p:cNvPr id="48" name="Straight Arrow Connector 47">
+            <a:extLst>
+              <a:ext uri="{FF2B5EF4-FFF2-40B4-BE49-F238E27FC236}">
+                <a16:creationId xmlns:a16="http://schemas.microsoft.com/office/drawing/2014/main" id="{83784EB3-3E8D-4D40-B067-2956710220AF}"/>
+              </a:ext>
+            </a:extLst>
+          </p:cNvPr>
+          <p:cNvCxnSpPr>
+            <a:cxnSpLocks/>
+          </p:cNvCxnSpPr>
+          <p:nvPr/>
+        </p:nvCxnSpPr>
+        <p:spPr>
+          <a:xfrm flipV="1">
+            <a:off x="2869036" y="5480422"/>
+            <a:ext cx="937671" cy="15759"/>
+          </a:xfrm>
+          <a:prstGeom prst="straightConnector1">
+            <a:avLst/>
+          </a:prstGeom>
+          <a:ln w="34925">
+            <a:solidFill>
+              <a:schemeClr val="accent6">
+                <a:lumMod val="75000"/>
+              </a:schemeClr>
+            </a:solidFill>
+            <a:tailEnd type="stealth" w="lg" len="lg"/>
+          </a:ln>
+        </p:spPr>
+        <p:style>
+          <a:lnRef idx="1">
+            <a:schemeClr val="accent1"/>
+          </a:lnRef>
+          <a:fillRef idx="0">
+            <a:schemeClr val="accent1"/>
+          </a:fillRef>
+          <a:effectRef idx="0">
+            <a:schemeClr val="accent1"/>
+          </a:effectRef>
+          <a:fontRef idx="minor">
+            <a:schemeClr val="tx1"/>
+          </a:fontRef>
+        </p:style>
+      </p:cxnSp>
+      <mc:AlternateContent xmlns:mc="http://schemas.openxmlformats.org/markup-compatibility/2006">
+        <mc:Choice xmlns:a14="http://schemas.microsoft.com/office/drawing/2010/main" Requires="a14">
+          <p:sp>
+            <p:nvSpPr>
+              <p:cNvPr id="49" name="TextBox 48">
+                <a:extLst>
+                  <a:ext uri="{FF2B5EF4-FFF2-40B4-BE49-F238E27FC236}">
+                    <a16:creationId xmlns:a16="http://schemas.microsoft.com/office/drawing/2014/main" id="{CAE381DE-A534-4D05-913C-BFCD7B084BA4}"/>
+                  </a:ext>
+                </a:extLst>
+              </p:cNvPr>
+              <p:cNvSpPr txBox="1"/>
+              <p:nvPr/>
+            </p:nvSpPr>
+            <p:spPr>
+              <a:xfrm>
+                <a:off x="3027474" y="5580173"/>
+                <a:ext cx="937670" cy="430887"/>
+              </a:xfrm>
+              <a:prstGeom prst="rect">
+                <a:avLst/>
+              </a:prstGeom>
+              <a:noFill/>
+            </p:spPr>
+            <p:txBody>
+              <a:bodyPr wrap="square" lIns="0" tIns="0" rIns="0" bIns="0" rtlCol="0">
+                <a:spAutoFit/>
+              </a:bodyPr>
+              <a:lstStyle/>
+              <a:p>
+                <a:pPr/>
+                <a14:m>
+                  <m:oMathPara xmlns:m="http://schemas.openxmlformats.org/officeDocument/2006/math">
+                    <m:oMathParaPr>
+                      <m:jc m:val="centerGroup"/>
+                    </m:oMathParaPr>
+                    <m:oMath xmlns:m="http://schemas.openxmlformats.org/officeDocument/2006/math">
+                      <m:r>
+                        <a:rPr lang="en-US" sz="2800" b="0" i="1" smtClean="0">
+                          <a:solidFill>
+                            <a:schemeClr val="accent6">
+                              <a:lumMod val="75000"/>
+                            </a:schemeClr>
+                          </a:solidFill>
+                          <a:latin typeface="Cambria Math" panose="02040503050406030204" pitchFamily="18" charset="0"/>
+                        </a:rPr>
+                        <m:t>−2</m:t>
+                      </m:r>
+                      <m:acc>
+                        <m:accPr>
+                          <m:chr m:val="⃗"/>
+                          <m:ctrlPr>
+                            <a:rPr lang="en-US" sz="2800" b="0" i="1" smtClean="0">
+                              <a:solidFill>
+                                <a:schemeClr val="accent6">
+                                  <a:lumMod val="75000"/>
+                                </a:schemeClr>
+                              </a:solidFill>
+                              <a:latin typeface="Cambria Math" panose="02040503050406030204" pitchFamily="18" charset="0"/>
+                            </a:rPr>
+                          </m:ctrlPr>
+                        </m:accPr>
+                        <m:e>
+                          <m:r>
+                            <a:rPr lang="en-US" sz="2800" b="0" i="1" smtClean="0">
+                              <a:solidFill>
+                                <a:schemeClr val="accent6">
+                                  <a:lumMod val="75000"/>
+                                </a:schemeClr>
+                              </a:solidFill>
+                              <a:latin typeface="Cambria Math" panose="02040503050406030204" pitchFamily="18" charset="0"/>
+                            </a:rPr>
+                            <m:t>𝑤</m:t>
+                          </m:r>
+                        </m:e>
+                      </m:acc>
+                    </m:oMath>
+                  </m:oMathPara>
+                </a14:m>
+                <a:endParaRPr lang="en-US" sz="2800" dirty="0">
+                  <a:solidFill>
+                    <a:schemeClr val="accent6">
+                      <a:lumMod val="75000"/>
+                    </a:schemeClr>
+                  </a:solidFill>
+                </a:endParaRPr>
+              </a:p>
+            </p:txBody>
+          </p:sp>
+        </mc:Choice>
+        <mc:Fallback>
+          <p:sp>
+            <p:nvSpPr>
+              <p:cNvPr id="49" name="TextBox 48">
+                <a:extLst>
+                  <a:ext uri="{FF2B5EF4-FFF2-40B4-BE49-F238E27FC236}">
+                    <a16:creationId xmlns:a16="http://schemas.microsoft.com/office/drawing/2014/main" id="{CAE381DE-A534-4D05-913C-BFCD7B084BA4}"/>
+                  </a:ext>
+                </a:extLst>
+              </p:cNvPr>
+              <p:cNvSpPr txBox="1">
+                <a:spLocks noRot="1" noChangeAspect="1" noMove="1" noResize="1" noEditPoints="1" noAdjustHandles="1" noChangeArrowheads="1" noChangeShapeType="1" noTextEdit="1"/>
+              </p:cNvSpPr>
+              <p:nvPr/>
+            </p:nvSpPr>
+            <p:spPr>
+              <a:xfrm>
+                <a:off x="3027474" y="5580173"/>
+                <a:ext cx="937670" cy="430887"/>
+              </a:xfrm>
+              <a:prstGeom prst="rect">
+                <a:avLst/>
+              </a:prstGeom>
+              <a:blipFill>
+                <a:blip r:embed="rId14"/>
+                <a:stretch>
+                  <a:fillRect/>
+                </a:stretch>
+              </a:blipFill>
+            </p:spPr>
+            <p:txBody>
+              <a:bodyPr/>
+              <a:lstStyle/>
+              <a:p>
+                <a:r>
+                  <a:rPr lang="en-US">
+                    <a:noFill/>
+                  </a:rPr>
+                  <a:t> </a:t>
+                </a:r>
+              </a:p>
+            </p:txBody>
+          </p:sp>
+        </mc:Fallback>
+      </mc:AlternateContent>
+      <p:cxnSp>
+        <p:nvCxnSpPr>
+          <p:cNvPr id="51" name="Straight Arrow Connector 50">
+            <a:extLst>
+              <a:ext uri="{FF2B5EF4-FFF2-40B4-BE49-F238E27FC236}">
+                <a16:creationId xmlns:a16="http://schemas.microsoft.com/office/drawing/2014/main" id="{E85825C0-00AD-4D2D-A9E0-CACEF52F4C5E}"/>
+              </a:ext>
+            </a:extLst>
+          </p:cNvPr>
+          <p:cNvCxnSpPr>
+            <a:cxnSpLocks/>
+          </p:cNvCxnSpPr>
+          <p:nvPr/>
+        </p:nvCxnSpPr>
+        <p:spPr>
+          <a:xfrm>
+            <a:off x="1197877" y="4714380"/>
+            <a:ext cx="2558476" cy="751194"/>
+          </a:xfrm>
+          <a:prstGeom prst="straightConnector1">
+            <a:avLst/>
+          </a:prstGeom>
+          <a:ln w="34925">
+            <a:solidFill>
+              <a:schemeClr val="accent2">
+                <a:lumMod val="75000"/>
+              </a:schemeClr>
+            </a:solidFill>
+            <a:tailEnd type="stealth" w="lg" len="lg"/>
+          </a:ln>
+        </p:spPr>
+        <p:style>
+          <a:lnRef idx="1">
+            <a:schemeClr val="accent1"/>
+          </a:lnRef>
+          <a:fillRef idx="0">
+            <a:schemeClr val="accent1"/>
+          </a:fillRef>
+          <a:effectRef idx="0">
+            <a:schemeClr val="accent1"/>
+          </a:effectRef>
+          <a:fontRef idx="minor">
+            <a:schemeClr val="tx1"/>
+          </a:fontRef>
+        </p:style>
+      </p:cxnSp>
+      <p:cxnSp>
+        <p:nvCxnSpPr>
+          <p:cNvPr id="55" name="Straight Arrow Connector 54">
+            <a:extLst>
+              <a:ext uri="{FF2B5EF4-FFF2-40B4-BE49-F238E27FC236}">
+                <a16:creationId xmlns:a16="http://schemas.microsoft.com/office/drawing/2014/main" id="{E6F846A9-0100-4C43-B02C-F1CE92D2C818}"/>
+              </a:ext>
+            </a:extLst>
+          </p:cNvPr>
+          <p:cNvCxnSpPr>
+            <a:cxnSpLocks/>
+            <a:stCxn id="9" idx="4"/>
+          </p:cNvCxnSpPr>
+          <p:nvPr/>
+        </p:nvCxnSpPr>
+        <p:spPr>
+          <a:xfrm>
+            <a:off x="1104936" y="4790805"/>
+            <a:ext cx="7416" cy="689248"/>
+          </a:xfrm>
+          <a:prstGeom prst="straightConnector1">
+            <a:avLst/>
+          </a:prstGeom>
+          <a:ln w="12700">
+            <a:solidFill>
+              <a:schemeClr val="tx1"/>
+            </a:solidFill>
+            <a:prstDash val="dash"/>
+            <a:tailEnd type="none" w="lg" len="lg"/>
+          </a:ln>
+        </p:spPr>
+        <p:style>
+          <a:lnRef idx="1">
+            <a:schemeClr val="accent1"/>
+          </a:lnRef>
+          <a:fillRef idx="0">
+            <a:schemeClr val="accent1"/>
+          </a:fillRef>
+          <a:effectRef idx="0">
+            <a:schemeClr val="accent1"/>
+          </a:effectRef>
+          <a:fontRef idx="minor">
+            <a:schemeClr val="tx1"/>
+          </a:fontRef>
+        </p:style>
+      </p:cxnSp>
+      <mc:AlternateContent xmlns:mc="http://schemas.openxmlformats.org/markup-compatibility/2006">
+        <mc:Choice xmlns:a14="http://schemas.microsoft.com/office/drawing/2010/main" Requires="a14">
+          <p:sp>
+            <p:nvSpPr>
+              <p:cNvPr id="62" name="TextBox 61">
+                <a:extLst>
+                  <a:ext uri="{FF2B5EF4-FFF2-40B4-BE49-F238E27FC236}">
+                    <a16:creationId xmlns:a16="http://schemas.microsoft.com/office/drawing/2014/main" id="{582E6259-767F-4E51-90E9-D3A95E72AA36}"/>
+                  </a:ext>
+                </a:extLst>
+              </p:cNvPr>
+              <p:cNvSpPr txBox="1"/>
+              <p:nvPr/>
+            </p:nvSpPr>
+            <p:spPr>
+              <a:xfrm>
+                <a:off x="3294164" y="4912509"/>
+                <a:ext cx="555537" cy="430887"/>
+              </a:xfrm>
+              <a:prstGeom prst="rect">
+                <a:avLst/>
+              </a:prstGeom>
+              <a:noFill/>
+            </p:spPr>
+            <p:txBody>
+              <a:bodyPr wrap="square" lIns="0" tIns="0" rIns="0" bIns="0" rtlCol="0">
+                <a:spAutoFit/>
+              </a:bodyPr>
+              <a:lstStyle/>
+              <a:p>
+                <a:pPr/>
+                <a14:m>
+                  <m:oMathPara xmlns:m="http://schemas.openxmlformats.org/officeDocument/2006/math">
+                    <m:oMathParaPr>
+                      <m:jc m:val="centerGroup"/>
+                    </m:oMathParaPr>
+                    <m:oMath xmlns:m="http://schemas.openxmlformats.org/officeDocument/2006/math">
+                      <m:acc>
+                        <m:accPr>
+                          <m:chr m:val="⃗"/>
+                          <m:ctrlPr>
+                            <a:rPr lang="en-US" sz="2800" b="0" i="1" smtClean="0">
+                              <a:solidFill>
+                                <a:schemeClr val="accent2">
+                                  <a:lumMod val="75000"/>
+                                </a:schemeClr>
+                              </a:solidFill>
+                              <a:latin typeface="Cambria Math" panose="02040503050406030204" pitchFamily="18" charset="0"/>
+                            </a:rPr>
+                          </m:ctrlPr>
+                        </m:accPr>
+                        <m:e>
+                          <m:r>
+                            <a:rPr lang="en-US" sz="2800" b="0" i="1" smtClean="0">
+                              <a:solidFill>
+                                <a:schemeClr val="accent2">
+                                  <a:lumMod val="75000"/>
+                                </a:schemeClr>
+                              </a:solidFill>
+                              <a:latin typeface="Cambria Math" panose="02040503050406030204" pitchFamily="18" charset="0"/>
+                            </a:rPr>
+                            <m:t>𝑢</m:t>
+                          </m:r>
+                        </m:e>
+                      </m:acc>
+                    </m:oMath>
+                  </m:oMathPara>
+                </a14:m>
+                <a:endParaRPr lang="en-US" sz="2800" dirty="0">
+                  <a:solidFill>
+                    <a:schemeClr val="accent2">
+                      <a:lumMod val="75000"/>
+                    </a:schemeClr>
+                  </a:solidFill>
+                </a:endParaRPr>
+              </a:p>
+            </p:txBody>
+          </p:sp>
+        </mc:Choice>
+        <mc:Fallback>
+          <p:sp>
+            <p:nvSpPr>
+              <p:cNvPr id="62" name="TextBox 61">
+                <a:extLst>
+                  <a:ext uri="{FF2B5EF4-FFF2-40B4-BE49-F238E27FC236}">
+                    <a16:creationId xmlns:a16="http://schemas.microsoft.com/office/drawing/2014/main" id="{582E6259-767F-4E51-90E9-D3A95E72AA36}"/>
+                  </a:ext>
+                </a:extLst>
+              </p:cNvPr>
+              <p:cNvSpPr txBox="1">
+                <a:spLocks noRot="1" noChangeAspect="1" noMove="1" noResize="1" noEditPoints="1" noAdjustHandles="1" noChangeArrowheads="1" noChangeShapeType="1" noTextEdit="1"/>
+              </p:cNvSpPr>
+              <p:nvPr/>
+            </p:nvSpPr>
+            <p:spPr>
+              <a:xfrm>
+                <a:off x="3294164" y="4912509"/>
+                <a:ext cx="555537" cy="430887"/>
+              </a:xfrm>
+              <a:prstGeom prst="rect">
+                <a:avLst/>
+              </a:prstGeom>
+              <a:blipFill>
+                <a:blip r:embed="rId15"/>
+                <a:stretch>
+                  <a:fillRect/>
+                </a:stretch>
+              </a:blipFill>
+            </p:spPr>
+            <p:txBody>
+              <a:bodyPr/>
+              <a:lstStyle/>
+              <a:p>
+                <a:r>
+                  <a:rPr lang="en-US">
+                    <a:noFill/>
+                  </a:rPr>
+                  <a:t> </a:t>
+                </a:r>
+              </a:p>
+            </p:txBody>
+          </p:sp>
+        </mc:Fallback>
+      </mc:AlternateContent>
+      <p:cxnSp>
+        <p:nvCxnSpPr>
+          <p:cNvPr id="64" name="Straight Arrow Connector 63">
+            <a:extLst>
+              <a:ext uri="{FF2B5EF4-FFF2-40B4-BE49-F238E27FC236}">
+                <a16:creationId xmlns:a16="http://schemas.microsoft.com/office/drawing/2014/main" id="{ED5779F4-9F8C-4065-AA63-A8ADDB955BA0}"/>
+              </a:ext>
+            </a:extLst>
+          </p:cNvPr>
+          <p:cNvCxnSpPr>
+            <a:cxnSpLocks/>
+          </p:cNvCxnSpPr>
+          <p:nvPr/>
+        </p:nvCxnSpPr>
+        <p:spPr>
+          <a:xfrm flipV="1">
+            <a:off x="7368035" y="4424547"/>
+            <a:ext cx="0" cy="2004061"/>
+          </a:xfrm>
+          <a:prstGeom prst="straightConnector1">
+            <a:avLst/>
+          </a:prstGeom>
+          <a:ln w="25400">
+            <a:solidFill>
+              <a:schemeClr val="tx1"/>
+            </a:solidFill>
+            <a:prstDash val="solid"/>
+            <a:tailEnd type="none" w="lg" len="lg"/>
+          </a:ln>
+        </p:spPr>
+        <p:style>
+          <a:lnRef idx="1">
+            <a:schemeClr val="accent1"/>
+          </a:lnRef>
+          <a:fillRef idx="0">
+            <a:schemeClr val="accent1"/>
+          </a:fillRef>
+          <a:effectRef idx="0">
+            <a:schemeClr val="accent1"/>
+          </a:effectRef>
+          <a:fontRef idx="minor">
+            <a:schemeClr val="tx1"/>
+          </a:fontRef>
+        </p:style>
+      </p:cxnSp>
+      <mc:AlternateContent xmlns:mc="http://schemas.openxmlformats.org/markup-compatibility/2006">
+        <mc:Choice xmlns:a14="http://schemas.microsoft.com/office/drawing/2010/main" Requires="a14">
+          <p:sp>
+            <p:nvSpPr>
+              <p:cNvPr id="65" name="TextBox 64">
+                <a:extLst>
+                  <a:ext uri="{FF2B5EF4-FFF2-40B4-BE49-F238E27FC236}">
+                    <a16:creationId xmlns:a16="http://schemas.microsoft.com/office/drawing/2014/main" id="{2DC047DF-BD20-4C30-8995-EDC8DBD33315}"/>
+                  </a:ext>
+                </a:extLst>
+              </p:cNvPr>
+              <p:cNvSpPr txBox="1"/>
+              <p:nvPr/>
+            </p:nvSpPr>
+            <p:spPr>
+              <a:xfrm>
+                <a:off x="5954163" y="5703833"/>
+                <a:ext cx="555537" cy="430887"/>
+              </a:xfrm>
+              <a:prstGeom prst="rect">
+                <a:avLst/>
+              </a:prstGeom>
+              <a:noFill/>
+            </p:spPr>
+            <p:txBody>
+              <a:bodyPr wrap="square" lIns="0" tIns="0" rIns="0" bIns="0" rtlCol="0">
+                <a:spAutoFit/>
+              </a:bodyPr>
+              <a:lstStyle/>
+              <a:p>
+                <a:pPr/>
+                <a14:m>
+                  <m:oMathPara xmlns:m="http://schemas.openxmlformats.org/officeDocument/2006/math">
+                    <m:oMathParaPr>
+                      <m:jc m:val="centerGroup"/>
+                    </m:oMathParaPr>
+                    <m:oMath xmlns:m="http://schemas.openxmlformats.org/officeDocument/2006/math">
+                      <m:acc>
+                        <m:accPr>
+                          <m:chr m:val="⃗"/>
+                          <m:ctrlPr>
+                            <a:rPr lang="en-US" sz="2800" b="0" i="1" smtClean="0">
+                              <a:solidFill>
+                                <a:schemeClr val="accent6">
+                                  <a:lumMod val="75000"/>
+                                </a:schemeClr>
+                              </a:solidFill>
+                              <a:latin typeface="Cambria Math" panose="02040503050406030204" pitchFamily="18" charset="0"/>
+                            </a:rPr>
+                          </m:ctrlPr>
+                        </m:accPr>
+                        <m:e>
+                          <m:r>
+                            <a:rPr lang="en-US" sz="2800" b="0" i="1" smtClean="0">
+                              <a:solidFill>
+                                <a:schemeClr val="accent6">
+                                  <a:lumMod val="75000"/>
+                                </a:schemeClr>
+                              </a:solidFill>
+                              <a:latin typeface="Cambria Math" panose="02040503050406030204" pitchFamily="18" charset="0"/>
+                            </a:rPr>
+                            <m:t>𝑤</m:t>
+                          </m:r>
+                        </m:e>
+                      </m:acc>
+                    </m:oMath>
+                  </m:oMathPara>
+                </a14:m>
+                <a:endParaRPr lang="en-US" sz="2800" dirty="0">
+                  <a:solidFill>
+                    <a:schemeClr val="accent6">
+                      <a:lumMod val="75000"/>
+                    </a:schemeClr>
+                  </a:solidFill>
+                </a:endParaRPr>
+              </a:p>
+            </p:txBody>
+          </p:sp>
+        </mc:Choice>
+        <mc:Fallback>
+          <p:sp>
+            <p:nvSpPr>
+              <p:cNvPr id="65" name="TextBox 64">
+                <a:extLst>
+                  <a:ext uri="{FF2B5EF4-FFF2-40B4-BE49-F238E27FC236}">
+                    <a16:creationId xmlns:a16="http://schemas.microsoft.com/office/drawing/2014/main" id="{2DC047DF-BD20-4C30-8995-EDC8DBD33315}"/>
+                  </a:ext>
+                </a:extLst>
+              </p:cNvPr>
+              <p:cNvSpPr txBox="1">
+                <a:spLocks noRot="1" noChangeAspect="1" noMove="1" noResize="1" noEditPoints="1" noAdjustHandles="1" noChangeArrowheads="1" noChangeShapeType="1" noTextEdit="1"/>
+              </p:cNvSpPr>
+              <p:nvPr/>
+            </p:nvSpPr>
+            <p:spPr>
+              <a:xfrm>
+                <a:off x="5954163" y="5703833"/>
+                <a:ext cx="555537" cy="430887"/>
+              </a:xfrm>
+              <a:prstGeom prst="rect">
+                <a:avLst/>
+              </a:prstGeom>
+              <a:blipFill>
+                <a:blip r:embed="rId16"/>
+                <a:stretch>
+                  <a:fillRect/>
+                </a:stretch>
+              </a:blipFill>
+            </p:spPr>
+            <p:txBody>
+              <a:bodyPr/>
+              <a:lstStyle/>
+              <a:p>
+                <a:r>
+                  <a:rPr lang="en-US">
+                    <a:noFill/>
+                  </a:rPr>
+                  <a:t> </a:t>
+                </a:r>
+              </a:p>
+            </p:txBody>
+          </p:sp>
+        </mc:Fallback>
+      </mc:AlternateContent>
+      <p:sp>
+        <p:nvSpPr>
+          <p:cNvPr id="66" name="Oval 65">
+            <a:extLst>
+              <a:ext uri="{FF2B5EF4-FFF2-40B4-BE49-F238E27FC236}">
+                <a16:creationId xmlns:a16="http://schemas.microsoft.com/office/drawing/2014/main" id="{528A6CDD-E32A-4F8A-878C-10D26DA234CA}"/>
+              </a:ext>
+            </a:extLst>
+          </p:cNvPr>
+          <p:cNvSpPr/>
+          <p:nvPr/>
+        </p:nvSpPr>
+        <p:spPr>
+          <a:xfrm>
+            <a:off x="6364824" y="4511909"/>
+            <a:ext cx="219772" cy="209666"/>
+          </a:xfrm>
+          <a:prstGeom prst="ellipse">
+            <a:avLst/>
+          </a:prstGeom>
+          <a:gradFill flip="none" rotWithShape="1">
+            <a:gsLst>
+              <a:gs pos="0">
+                <a:schemeClr val="accent1">
+                  <a:lumMod val="89000"/>
+                </a:schemeClr>
+              </a:gs>
+              <a:gs pos="23000">
+                <a:schemeClr val="accent1">
+                  <a:lumMod val="89000"/>
+                </a:schemeClr>
+              </a:gs>
+              <a:gs pos="69000">
+                <a:schemeClr val="accent1">
+                  <a:lumMod val="75000"/>
+                </a:schemeClr>
+              </a:gs>
+              <a:gs pos="97000">
+                <a:schemeClr val="accent1">
+                  <a:lumMod val="70000"/>
+                </a:schemeClr>
+              </a:gs>
+            </a:gsLst>
+            <a:path path="circle">
+              <a:fillToRect l="50000" t="50000" r="50000" b="50000"/>
+            </a:path>
+            <a:tileRect/>
+          </a:gradFill>
+          <a:ln>
+            <a:noFill/>
+          </a:ln>
+        </p:spPr>
+        <p:style>
+          <a:lnRef idx="2">
+            <a:schemeClr val="accent1">
+              <a:shade val="50000"/>
+            </a:schemeClr>
+          </a:lnRef>
+          <a:fillRef idx="1">
+            <a:schemeClr val="accent1"/>
+          </a:fillRef>
+          <a:effectRef idx="0">
+            <a:schemeClr val="accent1"/>
+          </a:effectRef>
+          <a:fontRef idx="minor">
+            <a:schemeClr val="lt1"/>
+          </a:fontRef>
+        </p:style>
+        <p:txBody>
+          <a:bodyPr rtlCol="0" anchor="ctr"/>
+          <a:lstStyle/>
+          <a:p>
+            <a:pPr algn="ctr"/>
+            <a:endParaRPr lang="en-US"/>
+          </a:p>
+        </p:txBody>
+      </p:sp>
+      <p:sp>
+        <p:nvSpPr>
+          <p:cNvPr id="67" name="Arc 66">
+            <a:extLst>
+              <a:ext uri="{FF2B5EF4-FFF2-40B4-BE49-F238E27FC236}">
+                <a16:creationId xmlns:a16="http://schemas.microsoft.com/office/drawing/2014/main" id="{AF7DA814-EAB9-44C4-AFA1-337F4D46E1EB}"/>
+              </a:ext>
+            </a:extLst>
+          </p:cNvPr>
+          <p:cNvSpPr/>
+          <p:nvPr/>
+        </p:nvSpPr>
+        <p:spPr>
+          <a:xfrm rot="14618095">
+            <a:off x="7075759" y="5185378"/>
+            <a:ext cx="241743" cy="324748"/>
+          </a:xfrm>
+          <a:prstGeom prst="arc">
+            <a:avLst>
+              <a:gd name="adj1" fmla="val 16200000"/>
+              <a:gd name="adj2" fmla="val 324231"/>
+            </a:avLst>
+          </a:prstGeom>
+          <a:ln w="22225">
+            <a:solidFill>
+              <a:schemeClr val="tx1"/>
+            </a:solidFill>
+          </a:ln>
+        </p:spPr>
+        <p:style>
+          <a:lnRef idx="1">
+            <a:schemeClr val="accent1"/>
+          </a:lnRef>
+          <a:fillRef idx="0">
+            <a:schemeClr val="accent1"/>
+          </a:fillRef>
+          <a:effectRef idx="0">
+            <a:schemeClr val="accent1"/>
+          </a:effectRef>
+          <a:fontRef idx="minor">
+            <a:schemeClr val="tx1"/>
+          </a:fontRef>
+        </p:style>
+        <p:txBody>
+          <a:bodyPr rtlCol="0" anchor="ctr"/>
+          <a:lstStyle/>
+          <a:p>
+            <a:pPr algn="ctr"/>
+            <a:endParaRPr lang="en-US" dirty="0"/>
+          </a:p>
+        </p:txBody>
+      </p:sp>
+      <mc:AlternateContent xmlns:mc="http://schemas.openxmlformats.org/markup-compatibility/2006">
+        <mc:Choice xmlns:a14="http://schemas.microsoft.com/office/drawing/2010/main" Requires="a14">
+          <p:sp>
+            <p:nvSpPr>
+              <p:cNvPr id="68" name="TextBox 67">
+                <a:extLst>
+                  <a:ext uri="{FF2B5EF4-FFF2-40B4-BE49-F238E27FC236}">
+                    <a16:creationId xmlns:a16="http://schemas.microsoft.com/office/drawing/2014/main" id="{A12B14AF-7E8B-44CA-8BF9-5CC7D8D07B71}"/>
+                  </a:ext>
+                </a:extLst>
+              </p:cNvPr>
+              <p:cNvSpPr txBox="1"/>
+              <p:nvPr/>
+            </p:nvSpPr>
+            <p:spPr>
+              <a:xfrm>
+                <a:off x="6626362" y="5093077"/>
+                <a:ext cx="555537" cy="307777"/>
+              </a:xfrm>
+              <a:prstGeom prst="rect">
+                <a:avLst/>
+              </a:prstGeom>
+              <a:noFill/>
+            </p:spPr>
+            <p:txBody>
+              <a:bodyPr wrap="square" lIns="0" tIns="0" rIns="0" bIns="0" rtlCol="0">
+                <a:spAutoFit/>
+              </a:bodyPr>
+              <a:lstStyle/>
+              <a:p>
+                <a:pPr/>
+                <a14:m>
+                  <m:oMathPara xmlns:m="http://schemas.openxmlformats.org/officeDocument/2006/math">
+                    <m:oMathParaPr>
+                      <m:jc m:val="centerGroup"/>
+                    </m:oMathParaPr>
+                    <m:oMath xmlns:m="http://schemas.openxmlformats.org/officeDocument/2006/math">
+                      <m:r>
+                        <a:rPr lang="en-US" sz="2000" b="0" i="1" smtClean="0">
+                          <a:latin typeface="Cambria Math" panose="02040503050406030204" pitchFamily="18" charset="0"/>
+                          <a:ea typeface="Cambria Math" panose="02040503050406030204" pitchFamily="18" charset="0"/>
+                        </a:rPr>
+                        <m:t>𝛼</m:t>
+                      </m:r>
+                    </m:oMath>
+                  </m:oMathPara>
+                </a14:m>
+                <a:endParaRPr lang="en-US" sz="2800" dirty="0"/>
+              </a:p>
+            </p:txBody>
+          </p:sp>
+        </mc:Choice>
+        <mc:Fallback>
+          <p:sp>
+            <p:nvSpPr>
+              <p:cNvPr id="68" name="TextBox 67">
+                <a:extLst>
+                  <a:ext uri="{FF2B5EF4-FFF2-40B4-BE49-F238E27FC236}">
+                    <a16:creationId xmlns:a16="http://schemas.microsoft.com/office/drawing/2014/main" id="{A12B14AF-7E8B-44CA-8BF9-5CC7D8D07B71}"/>
+                  </a:ext>
+                </a:extLst>
+              </p:cNvPr>
+              <p:cNvSpPr txBox="1">
+                <a:spLocks noRot="1" noChangeAspect="1" noMove="1" noResize="1" noEditPoints="1" noAdjustHandles="1" noChangeArrowheads="1" noChangeShapeType="1" noTextEdit="1"/>
+              </p:cNvSpPr>
+              <p:nvPr/>
+            </p:nvSpPr>
+            <p:spPr>
+              <a:xfrm>
+                <a:off x="6626362" y="5093077"/>
+                <a:ext cx="555537" cy="307777"/>
+              </a:xfrm>
+              <a:prstGeom prst="rect">
+                <a:avLst/>
+              </a:prstGeom>
+              <a:blipFill>
+                <a:blip r:embed="rId17"/>
+                <a:stretch>
+                  <a:fillRect/>
+                </a:stretch>
+              </a:blipFill>
+            </p:spPr>
+            <p:txBody>
+              <a:bodyPr/>
+              <a:lstStyle/>
+              <a:p>
+                <a:r>
+                  <a:rPr lang="en-US">
+                    <a:noFill/>
+                  </a:rPr>
+                  <a:t> </a:t>
+                </a:r>
+              </a:p>
+            </p:txBody>
+          </p:sp>
+        </mc:Fallback>
+      </mc:AlternateContent>
+      <p:cxnSp>
+        <p:nvCxnSpPr>
+          <p:cNvPr id="69" name="Straight Arrow Connector 68">
+            <a:extLst>
+              <a:ext uri="{FF2B5EF4-FFF2-40B4-BE49-F238E27FC236}">
+                <a16:creationId xmlns:a16="http://schemas.microsoft.com/office/drawing/2014/main" id="{6AA31F5F-11C4-4624-AC61-2AF2FA58CC7A}"/>
+              </a:ext>
+            </a:extLst>
+          </p:cNvPr>
+          <p:cNvCxnSpPr>
+            <a:cxnSpLocks/>
+            <a:stCxn id="66" idx="5"/>
+          </p:cNvCxnSpPr>
+          <p:nvPr/>
+        </p:nvCxnSpPr>
+        <p:spPr>
+          <a:xfrm>
+            <a:off x="6552411" y="4690870"/>
+            <a:ext cx="815624" cy="735707"/>
+          </a:xfrm>
+          <a:prstGeom prst="straightConnector1">
+            <a:avLst/>
+          </a:prstGeom>
+          <a:ln w="34925">
+            <a:solidFill>
+              <a:schemeClr val="accent1">
+                <a:lumMod val="75000"/>
+              </a:schemeClr>
+            </a:solidFill>
+            <a:tailEnd type="stealth" w="lg" len="lg"/>
+          </a:ln>
+        </p:spPr>
+        <p:style>
+          <a:lnRef idx="1">
+            <a:schemeClr val="accent1"/>
+          </a:lnRef>
+          <a:fillRef idx="0">
+            <a:schemeClr val="accent1"/>
+          </a:fillRef>
+          <a:effectRef idx="0">
+            <a:schemeClr val="accent1"/>
+          </a:effectRef>
+          <a:fontRef idx="minor">
+            <a:schemeClr val="tx1"/>
+          </a:fontRef>
+        </p:style>
+      </p:cxnSp>
+      <mc:AlternateContent xmlns:mc="http://schemas.openxmlformats.org/markup-compatibility/2006">
+        <mc:Choice xmlns:a14="http://schemas.microsoft.com/office/drawing/2010/main" Requires="a14">
+          <p:sp>
+            <p:nvSpPr>
+              <p:cNvPr id="70" name="TextBox 69">
+                <a:extLst>
+                  <a:ext uri="{FF2B5EF4-FFF2-40B4-BE49-F238E27FC236}">
+                    <a16:creationId xmlns:a16="http://schemas.microsoft.com/office/drawing/2014/main" id="{26D2293B-37D1-421A-9B52-19DCC251F73B}"/>
+                  </a:ext>
+                </a:extLst>
+              </p:cNvPr>
+              <p:cNvSpPr txBox="1"/>
+              <p:nvPr/>
+            </p:nvSpPr>
+            <p:spPr>
+              <a:xfrm>
+                <a:off x="6904120" y="4818356"/>
+                <a:ext cx="555537" cy="430887"/>
+              </a:xfrm>
+              <a:prstGeom prst="rect">
+                <a:avLst/>
+              </a:prstGeom>
+              <a:noFill/>
+            </p:spPr>
+            <p:txBody>
+              <a:bodyPr wrap="square" lIns="0" tIns="0" rIns="0" bIns="0" rtlCol="0">
+                <a:spAutoFit/>
+              </a:bodyPr>
+              <a:lstStyle/>
+              <a:p>
+                <a:pPr/>
+                <a14:m>
+                  <m:oMathPara xmlns:m="http://schemas.openxmlformats.org/officeDocument/2006/math">
+                    <m:oMathParaPr>
+                      <m:jc m:val="centerGroup"/>
+                    </m:oMathParaPr>
+                    <m:oMath xmlns:m="http://schemas.openxmlformats.org/officeDocument/2006/math">
+                      <m:acc>
+                        <m:accPr>
+                          <m:chr m:val="⃗"/>
+                          <m:ctrlPr>
+                            <a:rPr lang="en-US" sz="2800" b="0" i="1" smtClean="0">
+                              <a:solidFill>
+                                <a:schemeClr val="accent5">
+                                  <a:lumMod val="75000"/>
+                                </a:schemeClr>
+                              </a:solidFill>
+                              <a:latin typeface="Cambria Math" panose="02040503050406030204" pitchFamily="18" charset="0"/>
+                            </a:rPr>
+                          </m:ctrlPr>
+                        </m:accPr>
+                        <m:e>
+                          <m:r>
+                            <a:rPr lang="en-US" sz="2800" b="0" i="1" smtClean="0">
+                              <a:solidFill>
+                                <a:schemeClr val="accent5">
+                                  <a:lumMod val="75000"/>
+                                </a:schemeClr>
+                              </a:solidFill>
+                              <a:latin typeface="Cambria Math" panose="02040503050406030204" pitchFamily="18" charset="0"/>
+                            </a:rPr>
+                            <m:t>𝑣</m:t>
+                          </m:r>
+                        </m:e>
+                      </m:acc>
+                    </m:oMath>
+                  </m:oMathPara>
+                </a14:m>
+                <a:endParaRPr lang="en-US" sz="2800" dirty="0">
+                  <a:solidFill>
+                    <a:schemeClr val="accent5">
+                      <a:lumMod val="75000"/>
+                    </a:schemeClr>
+                  </a:solidFill>
+                </a:endParaRPr>
+              </a:p>
+            </p:txBody>
+          </p:sp>
+        </mc:Choice>
+        <mc:Fallback>
+          <p:sp>
+            <p:nvSpPr>
+              <p:cNvPr id="70" name="TextBox 69">
+                <a:extLst>
+                  <a:ext uri="{FF2B5EF4-FFF2-40B4-BE49-F238E27FC236}">
+                    <a16:creationId xmlns:a16="http://schemas.microsoft.com/office/drawing/2014/main" id="{26D2293B-37D1-421A-9B52-19DCC251F73B}"/>
+                  </a:ext>
+                </a:extLst>
+              </p:cNvPr>
+              <p:cNvSpPr txBox="1">
+                <a:spLocks noRot="1" noChangeAspect="1" noMove="1" noResize="1" noEditPoints="1" noAdjustHandles="1" noChangeArrowheads="1" noChangeShapeType="1" noTextEdit="1"/>
+              </p:cNvSpPr>
+              <p:nvPr/>
+            </p:nvSpPr>
+            <p:spPr>
+              <a:xfrm>
+                <a:off x="6904120" y="4818356"/>
+                <a:ext cx="555537" cy="430887"/>
+              </a:xfrm>
+              <a:prstGeom prst="rect">
+                <a:avLst/>
+              </a:prstGeom>
+              <a:blipFill>
+                <a:blip r:embed="rId18"/>
+                <a:stretch>
+                  <a:fillRect/>
+                </a:stretch>
+              </a:blipFill>
+            </p:spPr>
+            <p:txBody>
+              <a:bodyPr/>
+              <a:lstStyle/>
+              <a:p>
+                <a:r>
+                  <a:rPr lang="en-US">
+                    <a:noFill/>
+                  </a:rPr>
+                  <a:t> </a:t>
+                </a:r>
+              </a:p>
+            </p:txBody>
+          </p:sp>
+        </mc:Fallback>
+      </mc:AlternateContent>
+      <mc:AlternateContent xmlns:mc="http://schemas.openxmlformats.org/markup-compatibility/2006">
+        <mc:Choice xmlns:a14="http://schemas.microsoft.com/office/drawing/2010/main" Requires="a14">
+          <p:sp>
+            <p:nvSpPr>
+              <p:cNvPr id="73" name="TextBox 72">
+                <a:extLst>
+                  <a:ext uri="{FF2B5EF4-FFF2-40B4-BE49-F238E27FC236}">
+                    <a16:creationId xmlns:a16="http://schemas.microsoft.com/office/drawing/2014/main" id="{0773E8B8-B977-4231-A99F-B607C05BBDA0}"/>
+                  </a:ext>
+                </a:extLst>
+              </p:cNvPr>
+              <p:cNvSpPr txBox="1"/>
+              <p:nvPr/>
+            </p:nvSpPr>
+            <p:spPr>
+              <a:xfrm>
+                <a:off x="8202549" y="4538634"/>
+                <a:ext cx="937670" cy="307777"/>
+              </a:xfrm>
+              <a:prstGeom prst="rect">
+                <a:avLst/>
+              </a:prstGeom>
+              <a:noFill/>
+            </p:spPr>
+            <p:txBody>
+              <a:bodyPr wrap="square" lIns="0" tIns="0" rIns="0" bIns="0" rtlCol="0">
+                <a:spAutoFit/>
+              </a:bodyPr>
+              <a:lstStyle/>
+              <a:p>
+                <a:pPr/>
+                <a14:m>
+                  <m:oMathPara xmlns:m="http://schemas.openxmlformats.org/officeDocument/2006/math">
+                    <m:oMathParaPr>
+                      <m:jc m:val="centerGroup"/>
+                    </m:oMathParaPr>
+                    <m:oMath xmlns:m="http://schemas.openxmlformats.org/officeDocument/2006/math">
+                      <m:r>
+                        <a:rPr lang="en-US" sz="2000" b="0" i="1" smtClean="0">
+                          <a:solidFill>
+                            <a:schemeClr val="accent6">
+                              <a:lumMod val="75000"/>
+                            </a:schemeClr>
+                          </a:solidFill>
+                          <a:latin typeface="Cambria Math" panose="02040503050406030204" pitchFamily="18" charset="0"/>
+                        </a:rPr>
+                        <m:t>−2</m:t>
+                      </m:r>
+                      <m:acc>
+                        <m:accPr>
+                          <m:chr m:val="⃗"/>
+                          <m:ctrlPr>
+                            <a:rPr lang="en-US" sz="2000" b="0" i="1" smtClean="0">
+                              <a:solidFill>
+                                <a:schemeClr val="accent6">
+                                  <a:lumMod val="75000"/>
+                                </a:schemeClr>
+                              </a:solidFill>
+                              <a:latin typeface="Cambria Math" panose="02040503050406030204" pitchFamily="18" charset="0"/>
+                            </a:rPr>
+                          </m:ctrlPr>
+                        </m:accPr>
+                        <m:e>
+                          <m:r>
+                            <a:rPr lang="en-US" sz="2000" b="0" i="1" smtClean="0">
+                              <a:solidFill>
+                                <a:schemeClr val="accent6">
+                                  <a:lumMod val="75000"/>
+                                </a:schemeClr>
+                              </a:solidFill>
+                              <a:latin typeface="Cambria Math" panose="02040503050406030204" pitchFamily="18" charset="0"/>
+                            </a:rPr>
+                            <m:t>𝑤</m:t>
+                          </m:r>
+                        </m:e>
+                      </m:acc>
+                    </m:oMath>
+                  </m:oMathPara>
+                </a14:m>
+                <a:endParaRPr lang="en-US" sz="2000" dirty="0">
+                  <a:solidFill>
+                    <a:schemeClr val="accent6">
+                      <a:lumMod val="75000"/>
+                    </a:schemeClr>
+                  </a:solidFill>
+                </a:endParaRPr>
+              </a:p>
+            </p:txBody>
+          </p:sp>
+        </mc:Choice>
+        <mc:Fallback>
+          <p:sp>
+            <p:nvSpPr>
+              <p:cNvPr id="73" name="TextBox 72">
+                <a:extLst>
+                  <a:ext uri="{FF2B5EF4-FFF2-40B4-BE49-F238E27FC236}">
+                    <a16:creationId xmlns:a16="http://schemas.microsoft.com/office/drawing/2014/main" id="{0773E8B8-B977-4231-A99F-B607C05BBDA0}"/>
+                  </a:ext>
+                </a:extLst>
+              </p:cNvPr>
+              <p:cNvSpPr txBox="1">
+                <a:spLocks noRot="1" noChangeAspect="1" noMove="1" noResize="1" noEditPoints="1" noAdjustHandles="1" noChangeArrowheads="1" noChangeShapeType="1" noTextEdit="1"/>
+              </p:cNvSpPr>
+              <p:nvPr/>
+            </p:nvSpPr>
+            <p:spPr>
+              <a:xfrm>
+                <a:off x="8202549" y="4538634"/>
+                <a:ext cx="937670" cy="307777"/>
+              </a:xfrm>
+              <a:prstGeom prst="rect">
+                <a:avLst/>
+              </a:prstGeom>
+              <a:blipFill>
+                <a:blip r:embed="rId19"/>
+                <a:stretch>
+                  <a:fillRect b="-6000"/>
+                </a:stretch>
+              </a:blipFill>
+            </p:spPr>
+            <p:txBody>
+              <a:bodyPr/>
+              <a:lstStyle/>
+              <a:p>
+                <a:r>
+                  <a:rPr lang="en-US">
+                    <a:noFill/>
+                  </a:rPr>
+                  <a:t> </a:t>
+                </a:r>
+              </a:p>
+            </p:txBody>
+          </p:sp>
+        </mc:Fallback>
+      </mc:AlternateContent>
+      <p:cxnSp>
+        <p:nvCxnSpPr>
+          <p:cNvPr id="75" name="Straight Arrow Connector 74">
+            <a:extLst>
+              <a:ext uri="{FF2B5EF4-FFF2-40B4-BE49-F238E27FC236}">
+                <a16:creationId xmlns:a16="http://schemas.microsoft.com/office/drawing/2014/main" id="{95622C96-F5CA-46C9-9B35-603FF5BAB231}"/>
+              </a:ext>
+            </a:extLst>
+          </p:cNvPr>
+          <p:cNvCxnSpPr>
+            <a:cxnSpLocks/>
+            <a:stCxn id="66" idx="4"/>
+          </p:cNvCxnSpPr>
+          <p:nvPr/>
+        </p:nvCxnSpPr>
+        <p:spPr>
+          <a:xfrm>
+            <a:off x="6474710" y="4721575"/>
+            <a:ext cx="25877" cy="758478"/>
+          </a:xfrm>
+          <a:prstGeom prst="straightConnector1">
+            <a:avLst/>
+          </a:prstGeom>
+          <a:ln w="12700">
+            <a:solidFill>
+              <a:schemeClr val="tx1"/>
+            </a:solidFill>
+            <a:prstDash val="dash"/>
+            <a:tailEnd type="none" w="lg" len="lg"/>
+          </a:ln>
+        </p:spPr>
+        <p:style>
+          <a:lnRef idx="1">
+            <a:schemeClr val="accent1"/>
+          </a:lnRef>
+          <a:fillRef idx="0">
+            <a:schemeClr val="accent1"/>
+          </a:fillRef>
+          <a:effectRef idx="0">
+            <a:schemeClr val="accent1"/>
+          </a:effectRef>
+          <a:fontRef idx="minor">
+            <a:schemeClr val="tx1"/>
+          </a:fontRef>
+        </p:style>
+      </p:cxnSp>
+      <mc:AlternateContent xmlns:mc="http://schemas.openxmlformats.org/markup-compatibility/2006">
+        <mc:Choice xmlns:a14="http://schemas.microsoft.com/office/drawing/2010/main" Requires="a14">
+          <p:sp>
+            <p:nvSpPr>
+              <p:cNvPr id="76" name="TextBox 75">
+                <a:extLst>
+                  <a:ext uri="{FF2B5EF4-FFF2-40B4-BE49-F238E27FC236}">
+                    <a16:creationId xmlns:a16="http://schemas.microsoft.com/office/drawing/2014/main" id="{4C92D2AA-6AB3-49AB-BAE3-537E18089759}"/>
+                  </a:ext>
+                </a:extLst>
+              </p:cNvPr>
+              <p:cNvSpPr txBox="1"/>
+              <p:nvPr/>
+            </p:nvSpPr>
+            <p:spPr>
+              <a:xfrm>
+                <a:off x="7751790" y="4060506"/>
+                <a:ext cx="555537" cy="430887"/>
+              </a:xfrm>
+              <a:prstGeom prst="rect">
+                <a:avLst/>
+              </a:prstGeom>
+              <a:noFill/>
+            </p:spPr>
+            <p:txBody>
+              <a:bodyPr wrap="square" lIns="0" tIns="0" rIns="0" bIns="0" rtlCol="0">
+                <a:spAutoFit/>
+              </a:bodyPr>
+              <a:lstStyle/>
+              <a:p>
+                <a:pPr/>
+                <a14:m>
+                  <m:oMathPara xmlns:m="http://schemas.openxmlformats.org/officeDocument/2006/math">
+                    <m:oMathParaPr>
+                      <m:jc m:val="centerGroup"/>
+                    </m:oMathParaPr>
+                    <m:oMath xmlns:m="http://schemas.openxmlformats.org/officeDocument/2006/math">
+                      <m:acc>
+                        <m:accPr>
+                          <m:chr m:val="⃗"/>
+                          <m:ctrlPr>
+                            <a:rPr lang="en-US" sz="2800" b="0" i="1" smtClean="0">
+                              <a:solidFill>
+                                <a:schemeClr val="accent2">
+                                  <a:lumMod val="75000"/>
+                                </a:schemeClr>
+                              </a:solidFill>
+                              <a:latin typeface="Cambria Math" panose="02040503050406030204" pitchFamily="18" charset="0"/>
+                            </a:rPr>
+                          </m:ctrlPr>
+                        </m:accPr>
+                        <m:e>
+                          <m:r>
+                            <a:rPr lang="en-US" sz="2800" b="0" i="1" smtClean="0">
+                              <a:solidFill>
+                                <a:schemeClr val="accent2">
+                                  <a:lumMod val="75000"/>
+                                </a:schemeClr>
+                              </a:solidFill>
+                              <a:latin typeface="Cambria Math" panose="02040503050406030204" pitchFamily="18" charset="0"/>
+                            </a:rPr>
+                            <m:t>𝑢</m:t>
+                          </m:r>
+                        </m:e>
+                      </m:acc>
+                    </m:oMath>
+                  </m:oMathPara>
+                </a14:m>
+                <a:endParaRPr lang="en-US" sz="2800" dirty="0">
+                  <a:solidFill>
+                    <a:schemeClr val="accent2">
+                      <a:lumMod val="75000"/>
+                    </a:schemeClr>
+                  </a:solidFill>
+                </a:endParaRPr>
+              </a:p>
+            </p:txBody>
+          </p:sp>
+        </mc:Choice>
+        <mc:Fallback>
+          <p:sp>
+            <p:nvSpPr>
+              <p:cNvPr id="76" name="TextBox 75">
+                <a:extLst>
+                  <a:ext uri="{FF2B5EF4-FFF2-40B4-BE49-F238E27FC236}">
+                    <a16:creationId xmlns:a16="http://schemas.microsoft.com/office/drawing/2014/main" id="{4C92D2AA-6AB3-49AB-BAE3-537E18089759}"/>
+                  </a:ext>
+                </a:extLst>
+              </p:cNvPr>
+              <p:cNvSpPr txBox="1">
+                <a:spLocks noRot="1" noChangeAspect="1" noMove="1" noResize="1" noEditPoints="1" noAdjustHandles="1" noChangeArrowheads="1" noChangeShapeType="1" noTextEdit="1"/>
+              </p:cNvSpPr>
+              <p:nvPr/>
+            </p:nvSpPr>
+            <p:spPr>
+              <a:xfrm>
+                <a:off x="7751790" y="4060506"/>
+                <a:ext cx="555537" cy="430887"/>
+              </a:xfrm>
+              <a:prstGeom prst="rect">
+                <a:avLst/>
+              </a:prstGeom>
+              <a:blipFill>
+                <a:blip r:embed="rId20"/>
+                <a:stretch>
+                  <a:fillRect/>
+                </a:stretch>
+              </a:blipFill>
+            </p:spPr>
+            <p:txBody>
+              <a:bodyPr/>
+              <a:lstStyle/>
+              <a:p>
+                <a:r>
+                  <a:rPr lang="en-US">
+                    <a:noFill/>
+                  </a:rPr>
+                  <a:t> </a:t>
+                </a:r>
+              </a:p>
+            </p:txBody>
+          </p:sp>
+        </mc:Fallback>
+      </mc:AlternateContent>
+      <mc:AlternateContent xmlns:mc="http://schemas.openxmlformats.org/markup-compatibility/2006">
+        <mc:Choice xmlns:a14="http://schemas.microsoft.com/office/drawing/2010/main" Requires="a14">
+          <p:sp>
+            <p:nvSpPr>
+              <p:cNvPr id="83" name="TextBox 82">
+                <a:extLst>
+                  <a:ext uri="{FF2B5EF4-FFF2-40B4-BE49-F238E27FC236}">
+                    <a16:creationId xmlns:a16="http://schemas.microsoft.com/office/drawing/2014/main" id="{00F08431-2411-43C1-AD1D-13EB8C6B13B9}"/>
+                  </a:ext>
+                </a:extLst>
+              </p:cNvPr>
+              <p:cNvSpPr txBox="1"/>
+              <p:nvPr/>
+            </p:nvSpPr>
+            <p:spPr>
+              <a:xfrm>
+                <a:off x="6769446" y="5426834"/>
+                <a:ext cx="224443" cy="276999"/>
+              </a:xfrm>
+              <a:prstGeom prst="rect">
+                <a:avLst/>
+              </a:prstGeom>
+              <a:noFill/>
+            </p:spPr>
+            <p:txBody>
+              <a:bodyPr wrap="square" lIns="0" tIns="0" rIns="0" bIns="0" rtlCol="0">
+                <a:spAutoFit/>
+              </a:bodyPr>
+              <a:lstStyle/>
+              <a:p>
+                <a:pPr/>
+                <a14:m>
+                  <m:oMathPara xmlns:m="http://schemas.openxmlformats.org/officeDocument/2006/math">
+                    <m:oMathParaPr>
+                      <m:jc m:val="centerGroup"/>
+                    </m:oMathParaPr>
+                    <m:oMath xmlns:m="http://schemas.openxmlformats.org/officeDocument/2006/math">
+                      <m:r>
+                        <a:rPr lang="en-US" b="0" i="1" smtClean="0">
+                          <a:latin typeface="Cambria Math" panose="02040503050406030204" pitchFamily="18" charset="0"/>
+                          <a:ea typeface="Cambria Math" panose="02040503050406030204" pitchFamily="18" charset="0"/>
+                        </a:rPr>
+                        <m:t>𝛽</m:t>
+                      </m:r>
+                    </m:oMath>
+                  </m:oMathPara>
+                </a14:m>
+                <a:endParaRPr lang="en-US" sz="2400" dirty="0"/>
+              </a:p>
+            </p:txBody>
+          </p:sp>
+        </mc:Choice>
+        <mc:Fallback>
+          <p:sp>
+            <p:nvSpPr>
+              <p:cNvPr id="83" name="TextBox 82">
+                <a:extLst>
+                  <a:ext uri="{FF2B5EF4-FFF2-40B4-BE49-F238E27FC236}">
+                    <a16:creationId xmlns:a16="http://schemas.microsoft.com/office/drawing/2014/main" id="{00F08431-2411-43C1-AD1D-13EB8C6B13B9}"/>
+                  </a:ext>
+                </a:extLst>
+              </p:cNvPr>
+              <p:cNvSpPr txBox="1">
+                <a:spLocks noRot="1" noChangeAspect="1" noMove="1" noResize="1" noEditPoints="1" noAdjustHandles="1" noChangeArrowheads="1" noChangeShapeType="1" noTextEdit="1"/>
+              </p:cNvSpPr>
+              <p:nvPr/>
+            </p:nvSpPr>
+            <p:spPr>
+              <a:xfrm>
+                <a:off x="6769446" y="5426834"/>
+                <a:ext cx="224443" cy="276999"/>
+              </a:xfrm>
+              <a:prstGeom prst="rect">
+                <a:avLst/>
+              </a:prstGeom>
+              <a:blipFill>
+                <a:blip r:embed="rId21"/>
+                <a:stretch>
+                  <a:fillRect l="-32432" t="-2174" r="-27027" b="-32609"/>
+                </a:stretch>
+              </a:blipFill>
+            </p:spPr>
+            <p:txBody>
+              <a:bodyPr/>
+              <a:lstStyle/>
+              <a:p>
+                <a:r>
+                  <a:rPr lang="en-US">
+                    <a:noFill/>
+                  </a:rPr>
+                  <a:t> </a:t>
+                </a:r>
+              </a:p>
+            </p:txBody>
+          </p:sp>
+        </mc:Fallback>
+      </mc:AlternateContent>
+      <p:cxnSp>
+        <p:nvCxnSpPr>
+          <p:cNvPr id="63" name="Straight Arrow Connector 62">
+            <a:extLst>
+              <a:ext uri="{FF2B5EF4-FFF2-40B4-BE49-F238E27FC236}">
+                <a16:creationId xmlns:a16="http://schemas.microsoft.com/office/drawing/2014/main" id="{0EF46B77-7273-4AE5-86F9-2796E1B23E40}"/>
+              </a:ext>
+            </a:extLst>
+          </p:cNvPr>
+          <p:cNvCxnSpPr>
+            <a:cxnSpLocks/>
+          </p:cNvCxnSpPr>
+          <p:nvPr/>
+        </p:nvCxnSpPr>
+        <p:spPr>
+          <a:xfrm flipH="1">
+            <a:off x="6364824" y="5423566"/>
+            <a:ext cx="1021430" cy="731396"/>
+          </a:xfrm>
+          <a:prstGeom prst="straightConnector1">
+            <a:avLst/>
+          </a:prstGeom>
+          <a:ln w="34925">
+            <a:solidFill>
+              <a:schemeClr val="accent6">
+                <a:lumMod val="75000"/>
+              </a:schemeClr>
+            </a:solidFill>
+            <a:prstDash val="dash"/>
+            <a:tailEnd type="stealth" w="lg" len="lg"/>
+          </a:ln>
+        </p:spPr>
+        <p:style>
+          <a:lnRef idx="1">
+            <a:schemeClr val="accent1"/>
+          </a:lnRef>
+          <a:fillRef idx="0">
+            <a:schemeClr val="accent1"/>
+          </a:fillRef>
+          <a:effectRef idx="0">
+            <a:schemeClr val="accent1"/>
+          </a:effectRef>
+          <a:fontRef idx="minor">
+            <a:schemeClr val="tx1"/>
+          </a:fontRef>
+        </p:style>
+      </p:cxnSp>
+      <p:cxnSp>
+        <p:nvCxnSpPr>
+          <p:cNvPr id="78" name="Straight Arrow Connector 77">
+            <a:extLst>
+              <a:ext uri="{FF2B5EF4-FFF2-40B4-BE49-F238E27FC236}">
+                <a16:creationId xmlns:a16="http://schemas.microsoft.com/office/drawing/2014/main" id="{11E5F553-ABD6-4191-9D51-6D91B0B3E1E4}"/>
+              </a:ext>
+            </a:extLst>
+          </p:cNvPr>
+          <p:cNvCxnSpPr>
+            <a:cxnSpLocks/>
+          </p:cNvCxnSpPr>
+          <p:nvPr/>
+        </p:nvCxnSpPr>
+        <p:spPr>
+          <a:xfrm flipV="1">
+            <a:off x="5945107" y="5367694"/>
+            <a:ext cx="2833133" cy="104605"/>
+          </a:xfrm>
+          <a:prstGeom prst="straightConnector1">
+            <a:avLst/>
+          </a:prstGeom>
+          <a:ln w="12700">
+            <a:solidFill>
+              <a:schemeClr val="tx1"/>
+            </a:solidFill>
+            <a:prstDash val="dash"/>
+            <a:tailEnd type="none" w="lg" len="lg"/>
+          </a:ln>
+        </p:spPr>
+        <p:style>
+          <a:lnRef idx="1">
+            <a:schemeClr val="accent1"/>
+          </a:lnRef>
+          <a:fillRef idx="0">
+            <a:schemeClr val="accent1"/>
+          </a:fillRef>
+          <a:effectRef idx="0">
+            <a:schemeClr val="accent1"/>
+          </a:effectRef>
+          <a:fontRef idx="minor">
+            <a:schemeClr val="tx1"/>
+          </a:fontRef>
+        </p:style>
+      </p:cxnSp>
+      <p:grpSp>
+        <p:nvGrpSpPr>
+          <p:cNvPr id="98" name="Group 97">
+            <a:extLst>
+              <a:ext uri="{FF2B5EF4-FFF2-40B4-BE49-F238E27FC236}">
+                <a16:creationId xmlns:a16="http://schemas.microsoft.com/office/drawing/2014/main" id="{11511F2A-E4D4-44CA-9DF1-BFD853BA82EE}"/>
+              </a:ext>
+            </a:extLst>
+          </p:cNvPr>
+          <p:cNvGrpSpPr/>
+          <p:nvPr/>
+        </p:nvGrpSpPr>
+        <p:grpSpPr>
+          <a:xfrm>
+            <a:off x="7002398" y="5378791"/>
+            <a:ext cx="296544" cy="285563"/>
+            <a:chOff x="7002398" y="5378791"/>
+            <a:chExt cx="296544" cy="285563"/>
+          </a:xfrm>
+        </p:grpSpPr>
+        <p:sp>
+          <p:nvSpPr>
+            <p:cNvPr id="82" name="Arc 81">
+              <a:extLst>
+                <a:ext uri="{FF2B5EF4-FFF2-40B4-BE49-F238E27FC236}">
+                  <a16:creationId xmlns:a16="http://schemas.microsoft.com/office/drawing/2014/main" id="{E995E486-2853-4E31-B56B-11C4B1DDF5CA}"/>
+                </a:ext>
+              </a:extLst>
+            </p:cNvPr>
+            <p:cNvSpPr/>
+            <p:nvPr/>
+          </p:nvSpPr>
+          <p:spPr>
+            <a:xfrm rot="12945588">
+              <a:off x="7094473" y="5378791"/>
+              <a:ext cx="204014" cy="233383"/>
+            </a:xfrm>
+            <a:prstGeom prst="arc">
+              <a:avLst>
+                <a:gd name="adj1" fmla="val 16200000"/>
+                <a:gd name="adj2" fmla="val 324231"/>
+              </a:avLst>
+            </a:prstGeom>
+            <a:ln w="22225">
+              <a:solidFill>
+                <a:schemeClr val="tx1"/>
+              </a:solidFill>
+            </a:ln>
+          </p:spPr>
+          <p:style>
+            <a:lnRef idx="1">
+              <a:schemeClr val="accent1"/>
+            </a:lnRef>
+            <a:fillRef idx="0">
+              <a:schemeClr val="accent1"/>
+            </a:fillRef>
+            <a:effectRef idx="0">
+              <a:schemeClr val="accent1"/>
+            </a:effectRef>
+            <a:fontRef idx="minor">
+              <a:schemeClr val="tx1"/>
+            </a:fontRef>
+          </p:style>
+          <p:txBody>
+            <a:bodyPr rtlCol="0" anchor="ctr"/>
+            <a:lstStyle/>
+            <a:p>
+              <a:pPr algn="ctr"/>
+              <a:endParaRPr lang="en-US" dirty="0"/>
+            </a:p>
+          </p:txBody>
+        </p:sp>
+        <p:sp>
+          <p:nvSpPr>
+            <p:cNvPr id="87" name="Arc 86">
+              <a:extLst>
+                <a:ext uri="{FF2B5EF4-FFF2-40B4-BE49-F238E27FC236}">
+                  <a16:creationId xmlns:a16="http://schemas.microsoft.com/office/drawing/2014/main" id="{DAB786F0-0610-4C3F-AD36-ADAE928D72F2}"/>
+                </a:ext>
+              </a:extLst>
+            </p:cNvPr>
+            <p:cNvSpPr/>
+            <p:nvPr/>
+          </p:nvSpPr>
+          <p:spPr>
+            <a:xfrm rot="12945588">
+              <a:off x="7002398" y="5403213"/>
+              <a:ext cx="296544" cy="261141"/>
+            </a:xfrm>
+            <a:prstGeom prst="arc">
+              <a:avLst>
+                <a:gd name="adj1" fmla="val 16200000"/>
+                <a:gd name="adj2" fmla="val 324231"/>
+              </a:avLst>
+            </a:prstGeom>
+            <a:ln w="22225">
+              <a:solidFill>
+                <a:schemeClr val="tx1"/>
+              </a:solidFill>
+            </a:ln>
+          </p:spPr>
+          <p:style>
+            <a:lnRef idx="1">
+              <a:schemeClr val="accent1"/>
+            </a:lnRef>
+            <a:fillRef idx="0">
+              <a:schemeClr val="accent1"/>
+            </a:fillRef>
+            <a:effectRef idx="0">
+              <a:schemeClr val="accent1"/>
+            </a:effectRef>
+            <a:fontRef idx="minor">
+              <a:schemeClr val="tx1"/>
+            </a:fontRef>
+          </p:style>
+          <p:txBody>
+            <a:bodyPr rtlCol="0" anchor="ctr"/>
+            <a:lstStyle/>
+            <a:p>
+              <a:pPr algn="ctr"/>
+              <a:endParaRPr lang="en-US" dirty="0"/>
+            </a:p>
+          </p:txBody>
+        </p:sp>
+      </p:grpSp>
+      <p:cxnSp>
+        <p:nvCxnSpPr>
+          <p:cNvPr id="91" name="Straight Arrow Connector 90">
+            <a:extLst>
+              <a:ext uri="{FF2B5EF4-FFF2-40B4-BE49-F238E27FC236}">
+                <a16:creationId xmlns:a16="http://schemas.microsoft.com/office/drawing/2014/main" id="{C714A5FD-9752-48BD-9B0A-E0213884038B}"/>
+              </a:ext>
+            </a:extLst>
+          </p:cNvPr>
+          <p:cNvCxnSpPr>
+            <a:cxnSpLocks/>
+          </p:cNvCxnSpPr>
+          <p:nvPr/>
+        </p:nvCxnSpPr>
+        <p:spPr>
+          <a:xfrm flipV="1">
+            <a:off x="7995924" y="4379089"/>
+            <a:ext cx="667732" cy="547754"/>
+          </a:xfrm>
+          <a:prstGeom prst="straightConnector1">
+            <a:avLst/>
+          </a:prstGeom>
+          <a:ln w="34925">
+            <a:solidFill>
+              <a:schemeClr val="accent6">
+                <a:lumMod val="75000"/>
+              </a:schemeClr>
+            </a:solidFill>
+            <a:tailEnd type="stealth" w="lg" len="lg"/>
+          </a:ln>
+        </p:spPr>
+        <p:style>
+          <a:lnRef idx="1">
+            <a:schemeClr val="accent1"/>
+          </a:lnRef>
+          <a:fillRef idx="0">
+            <a:schemeClr val="accent1"/>
+          </a:fillRef>
+          <a:effectRef idx="0">
+            <a:schemeClr val="accent1"/>
+          </a:effectRef>
+          <a:fontRef idx="minor">
+            <a:schemeClr val="tx1"/>
+          </a:fontRef>
+        </p:style>
+      </p:cxnSp>
+      <p:cxnSp>
+        <p:nvCxnSpPr>
+          <p:cNvPr id="74" name="Straight Arrow Connector 73">
+            <a:extLst>
+              <a:ext uri="{FF2B5EF4-FFF2-40B4-BE49-F238E27FC236}">
+                <a16:creationId xmlns:a16="http://schemas.microsoft.com/office/drawing/2014/main" id="{57DF44CB-9B80-4057-9230-52DF408D1734}"/>
+              </a:ext>
+            </a:extLst>
+          </p:cNvPr>
+          <p:cNvCxnSpPr>
+            <a:cxnSpLocks/>
+            <a:stCxn id="66" idx="6"/>
+          </p:cNvCxnSpPr>
+          <p:nvPr/>
+        </p:nvCxnSpPr>
+        <p:spPr>
+          <a:xfrm flipV="1">
+            <a:off x="6584596" y="4429898"/>
+            <a:ext cx="2059228" cy="186844"/>
+          </a:xfrm>
+          <a:prstGeom prst="straightConnector1">
+            <a:avLst/>
+          </a:prstGeom>
+          <a:ln w="34925">
+            <a:solidFill>
+              <a:schemeClr val="accent2">
+                <a:lumMod val="75000"/>
+              </a:schemeClr>
+            </a:solidFill>
+            <a:tailEnd type="stealth" w="lg" len="lg"/>
+          </a:ln>
+        </p:spPr>
+        <p:style>
+          <a:lnRef idx="1">
+            <a:schemeClr val="accent1"/>
+          </a:lnRef>
+          <a:fillRef idx="0">
+            <a:schemeClr val="accent1"/>
+          </a:fillRef>
+          <a:effectRef idx="0">
+            <a:schemeClr val="accent1"/>
+          </a:effectRef>
+          <a:fontRef idx="minor">
+            <a:schemeClr val="tx1"/>
+          </a:fontRef>
+        </p:style>
+      </p:cxnSp>
+      <p:grpSp>
+        <p:nvGrpSpPr>
+          <p:cNvPr id="99" name="Group 98">
+            <a:extLst>
+              <a:ext uri="{FF2B5EF4-FFF2-40B4-BE49-F238E27FC236}">
+                <a16:creationId xmlns:a16="http://schemas.microsoft.com/office/drawing/2014/main" id="{BD53C6C9-94A4-44F4-BA45-5B88F69CC7C7}"/>
+              </a:ext>
+            </a:extLst>
+          </p:cNvPr>
+          <p:cNvGrpSpPr/>
+          <p:nvPr/>
+        </p:nvGrpSpPr>
+        <p:grpSpPr>
+          <a:xfrm rot="10588887">
+            <a:off x="7428587" y="5199487"/>
+            <a:ext cx="296544" cy="265989"/>
+            <a:chOff x="7002398" y="5378791"/>
+            <a:chExt cx="296544" cy="285563"/>
+          </a:xfrm>
+        </p:grpSpPr>
+        <p:sp>
+          <p:nvSpPr>
+            <p:cNvPr id="100" name="Arc 99">
+              <a:extLst>
+                <a:ext uri="{FF2B5EF4-FFF2-40B4-BE49-F238E27FC236}">
+                  <a16:creationId xmlns:a16="http://schemas.microsoft.com/office/drawing/2014/main" id="{1BD071DA-8CD2-429B-84C1-C97B95C31972}"/>
+                </a:ext>
+              </a:extLst>
+            </p:cNvPr>
+            <p:cNvSpPr/>
+            <p:nvPr/>
+          </p:nvSpPr>
+          <p:spPr>
+            <a:xfrm rot="12945588">
+              <a:off x="7094473" y="5378791"/>
+              <a:ext cx="204014" cy="233383"/>
+            </a:xfrm>
+            <a:prstGeom prst="arc">
+              <a:avLst>
+                <a:gd name="adj1" fmla="val 16200000"/>
+                <a:gd name="adj2" fmla="val 324231"/>
+              </a:avLst>
+            </a:prstGeom>
+            <a:ln w="22225">
+              <a:solidFill>
+                <a:schemeClr val="tx1"/>
+              </a:solidFill>
+            </a:ln>
+          </p:spPr>
+          <p:style>
+            <a:lnRef idx="1">
+              <a:schemeClr val="accent1"/>
+            </a:lnRef>
+            <a:fillRef idx="0">
+              <a:schemeClr val="accent1"/>
+            </a:fillRef>
+            <a:effectRef idx="0">
+              <a:schemeClr val="accent1"/>
+            </a:effectRef>
+            <a:fontRef idx="minor">
+              <a:schemeClr val="tx1"/>
+            </a:fontRef>
+          </p:style>
+          <p:txBody>
+            <a:bodyPr rtlCol="0" anchor="ctr"/>
+            <a:lstStyle/>
+            <a:p>
+              <a:pPr algn="ctr"/>
+              <a:endParaRPr lang="en-US" dirty="0"/>
+            </a:p>
+          </p:txBody>
+        </p:sp>
+        <p:sp>
+          <p:nvSpPr>
+            <p:cNvPr id="101" name="Arc 100">
+              <a:extLst>
+                <a:ext uri="{FF2B5EF4-FFF2-40B4-BE49-F238E27FC236}">
+                  <a16:creationId xmlns:a16="http://schemas.microsoft.com/office/drawing/2014/main" id="{B2D7AA8F-619D-428A-AEA6-1D6A3E49C552}"/>
+                </a:ext>
+              </a:extLst>
+            </p:cNvPr>
+            <p:cNvSpPr/>
+            <p:nvPr/>
+          </p:nvSpPr>
+          <p:spPr>
+            <a:xfrm rot="12945588">
+              <a:off x="7002398" y="5403213"/>
+              <a:ext cx="296544" cy="261141"/>
+            </a:xfrm>
+            <a:prstGeom prst="arc">
+              <a:avLst>
+                <a:gd name="adj1" fmla="val 16200000"/>
+                <a:gd name="adj2" fmla="val 324231"/>
+              </a:avLst>
+            </a:prstGeom>
+            <a:ln w="22225">
+              <a:solidFill>
+                <a:schemeClr val="tx1"/>
+              </a:solidFill>
+            </a:ln>
+          </p:spPr>
+          <p:style>
+            <a:lnRef idx="1">
+              <a:schemeClr val="accent1"/>
+            </a:lnRef>
+            <a:fillRef idx="0">
+              <a:schemeClr val="accent1"/>
+            </a:fillRef>
+            <a:effectRef idx="0">
+              <a:schemeClr val="accent1"/>
+            </a:effectRef>
+            <a:fontRef idx="minor">
+              <a:schemeClr val="tx1"/>
+            </a:fontRef>
+          </p:style>
+          <p:txBody>
+            <a:bodyPr rtlCol="0" anchor="ctr"/>
+            <a:lstStyle/>
+            <a:p>
+              <a:pPr algn="ctr"/>
+              <a:endParaRPr lang="en-US" dirty="0"/>
+            </a:p>
+          </p:txBody>
+        </p:sp>
+      </p:grpSp>
+      <p:cxnSp>
+        <p:nvCxnSpPr>
+          <p:cNvPr id="71" name="Straight Arrow Connector 70">
+            <a:extLst>
+              <a:ext uri="{FF2B5EF4-FFF2-40B4-BE49-F238E27FC236}">
+                <a16:creationId xmlns:a16="http://schemas.microsoft.com/office/drawing/2014/main" id="{54D4AD83-CF8F-4015-A38A-206B65836E0C}"/>
+              </a:ext>
+            </a:extLst>
+          </p:cNvPr>
+          <p:cNvCxnSpPr>
+            <a:cxnSpLocks/>
+          </p:cNvCxnSpPr>
+          <p:nvPr/>
+        </p:nvCxnSpPr>
+        <p:spPr>
+          <a:xfrm flipV="1">
+            <a:off x="7377575" y="4886135"/>
+            <a:ext cx="667732" cy="547754"/>
+          </a:xfrm>
+          <a:prstGeom prst="straightConnector1">
+            <a:avLst/>
+          </a:prstGeom>
+          <a:ln w="34925">
+            <a:solidFill>
+              <a:schemeClr val="accent6">
+                <a:lumMod val="75000"/>
+              </a:schemeClr>
+            </a:solidFill>
+            <a:tailEnd type="stealth" w="lg" len="lg"/>
+          </a:ln>
+        </p:spPr>
+        <p:style>
+          <a:lnRef idx="1">
+            <a:schemeClr val="accent1"/>
+          </a:lnRef>
+          <a:fillRef idx="0">
+            <a:schemeClr val="accent1"/>
+          </a:fillRef>
+          <a:effectRef idx="0">
+            <a:schemeClr val="accent1"/>
+          </a:effectRef>
+          <a:fontRef idx="minor">
+            <a:schemeClr val="tx1"/>
+          </a:fontRef>
+        </p:style>
+      </p:cxnSp>
+      <mc:AlternateContent xmlns:mc="http://schemas.openxmlformats.org/markup-compatibility/2006">
+        <mc:Choice xmlns:a14="http://schemas.microsoft.com/office/drawing/2010/main" Requires="a14">
+          <p:sp>
+            <p:nvSpPr>
+              <p:cNvPr id="102" name="TextBox 101">
+                <a:extLst>
+                  <a:ext uri="{FF2B5EF4-FFF2-40B4-BE49-F238E27FC236}">
+                    <a16:creationId xmlns:a16="http://schemas.microsoft.com/office/drawing/2014/main" id="{2771EE74-C476-466F-915D-121E827B25D4}"/>
+                  </a:ext>
+                </a:extLst>
+              </p:cNvPr>
+              <p:cNvSpPr txBox="1"/>
+              <p:nvPr/>
+            </p:nvSpPr>
+            <p:spPr>
+              <a:xfrm>
+                <a:off x="7750705" y="5104598"/>
+                <a:ext cx="224443" cy="276999"/>
+              </a:xfrm>
+              <a:prstGeom prst="rect">
+                <a:avLst/>
+              </a:prstGeom>
+              <a:noFill/>
+            </p:spPr>
+            <p:txBody>
+              <a:bodyPr wrap="square" lIns="0" tIns="0" rIns="0" bIns="0" rtlCol="0">
+                <a:spAutoFit/>
+              </a:bodyPr>
+              <a:lstStyle/>
+              <a:p>
+                <a:pPr/>
+                <a14:m>
+                  <m:oMathPara xmlns:m="http://schemas.openxmlformats.org/officeDocument/2006/math">
+                    <m:oMathParaPr>
+                      <m:jc m:val="centerGroup"/>
+                    </m:oMathParaPr>
+                    <m:oMath xmlns:m="http://schemas.openxmlformats.org/officeDocument/2006/math">
+                      <m:r>
+                        <a:rPr lang="en-US" b="0" i="1" smtClean="0">
+                          <a:latin typeface="Cambria Math" panose="02040503050406030204" pitchFamily="18" charset="0"/>
+                          <a:ea typeface="Cambria Math" panose="02040503050406030204" pitchFamily="18" charset="0"/>
+                        </a:rPr>
+                        <m:t>𝛽</m:t>
+                      </m:r>
+                    </m:oMath>
+                  </m:oMathPara>
+                </a14:m>
+                <a:endParaRPr lang="en-US" sz="2400" dirty="0"/>
+              </a:p>
+            </p:txBody>
+          </p:sp>
+        </mc:Choice>
+        <mc:Fallback>
+          <p:sp>
+            <p:nvSpPr>
+              <p:cNvPr id="102" name="TextBox 101">
+                <a:extLst>
+                  <a:ext uri="{FF2B5EF4-FFF2-40B4-BE49-F238E27FC236}">
+                    <a16:creationId xmlns:a16="http://schemas.microsoft.com/office/drawing/2014/main" id="{2771EE74-C476-466F-915D-121E827B25D4}"/>
+                  </a:ext>
+                </a:extLst>
+              </p:cNvPr>
+              <p:cNvSpPr txBox="1">
+                <a:spLocks noRot="1" noChangeAspect="1" noMove="1" noResize="1" noEditPoints="1" noAdjustHandles="1" noChangeArrowheads="1" noChangeShapeType="1" noTextEdit="1"/>
+              </p:cNvSpPr>
+              <p:nvPr/>
+            </p:nvSpPr>
+            <p:spPr>
+              <a:xfrm>
+                <a:off x="7750705" y="5104598"/>
+                <a:ext cx="224443" cy="276999"/>
+              </a:xfrm>
+              <a:prstGeom prst="rect">
+                <a:avLst/>
+              </a:prstGeom>
+              <a:blipFill>
+                <a:blip r:embed="rId22"/>
+                <a:stretch>
+                  <a:fillRect l="-32432" t="-2174" r="-27027" b="-32609"/>
+                </a:stretch>
+              </a:blipFill>
+            </p:spPr>
+            <p:txBody>
+              <a:bodyPr/>
+              <a:lstStyle/>
+              <a:p>
+                <a:r>
+                  <a:rPr lang="en-US">
+                    <a:noFill/>
+                  </a:rPr>
+                  <a:t> </a:t>
+                </a:r>
+              </a:p>
+            </p:txBody>
+          </p:sp>
+        </mc:Fallback>
+      </mc:AlternateContent>
     </p:spTree>
     <p:extLst>
       <p:ext uri="{BB962C8B-B14F-4D97-AF65-F5344CB8AC3E}">

</xml_diff>

<commit_message>
Added 1.5.17; Updated 1.5.15-16
</commit_message>
<xml_diff>
--- a/volunteer/Drawings.pptx
+++ b/volunteer/Drawings.pptx
@@ -16,6 +16,7 @@
     <p:sldId id="273" r:id="rId10"/>
     <p:sldId id="274" r:id="rId11"/>
     <p:sldId id="275" r:id="rId12"/>
+    <p:sldId id="276" r:id="rId13"/>
   </p:sldIdLst>
   <p:sldSz cx="12192000" cy="6858000"/>
   <p:notesSz cx="6858000" cy="9144000"/>
@@ -11954,8 +11955,8 @@
           </a:p>
         </p:txBody>
       </p:sp>
-      <mc:AlternateContent xmlns:mc="http://schemas.openxmlformats.org/markup-compatibility/2006">
-        <mc:Choice xmlns:a14="http://schemas.microsoft.com/office/drawing/2010/main" Requires="a14">
+      <mc:AlternateContent xmlns:mc="http://schemas.openxmlformats.org/markup-compatibility/2006" xmlns:a14="http://schemas.microsoft.com/office/drawing/2010/main">
+        <mc:Choice Requires="a14">
           <p:sp>
             <p:nvSpPr>
               <p:cNvPr id="6" name="TextBox 5">
@@ -11984,6 +11985,7 @@
               </a:bodyPr>
               <a:lstStyle/>
               <a:p>
+                <a:pPr/>
                 <a14:m>
                   <m:oMathPara xmlns:m="http://schemas.openxmlformats.org/officeDocument/2006/math">
                     <m:oMathParaPr>
@@ -12016,7 +12018,7 @@
             </p:txBody>
           </p:sp>
         </mc:Choice>
-        <mc:Fallback>
+        <mc:Fallback xmlns="">
           <p:sp>
             <p:nvSpPr>
               <p:cNvPr id="6" name="TextBox 5">
@@ -12061,8 +12063,8 @@
           </p:sp>
         </mc:Fallback>
       </mc:AlternateContent>
-      <mc:AlternateContent xmlns:mc="http://schemas.openxmlformats.org/markup-compatibility/2006">
-        <mc:Choice xmlns:a14="http://schemas.microsoft.com/office/drawing/2010/main" Requires="a14">
+      <mc:AlternateContent xmlns:mc="http://schemas.openxmlformats.org/markup-compatibility/2006" xmlns:a14="http://schemas.microsoft.com/office/drawing/2010/main">
+        <mc:Choice Requires="a14">
           <p:sp>
             <p:nvSpPr>
               <p:cNvPr id="38" name="TextBox 37">
@@ -12091,6 +12093,7 @@
               </a:bodyPr>
               <a:lstStyle/>
               <a:p>
+                <a:pPr/>
                 <a14:m>
                   <m:oMathPara xmlns:m="http://schemas.openxmlformats.org/officeDocument/2006/math">
                     <m:oMathParaPr>
@@ -12111,7 +12114,7 @@
             </p:txBody>
           </p:sp>
         </mc:Choice>
-        <mc:Fallback>
+        <mc:Fallback xmlns="">
           <p:sp>
             <p:nvSpPr>
               <p:cNvPr id="38" name="TextBox 37">
@@ -12156,8 +12159,8 @@
           </p:sp>
         </mc:Fallback>
       </mc:AlternateContent>
-      <mc:AlternateContent xmlns:mc="http://schemas.openxmlformats.org/markup-compatibility/2006">
-        <mc:Choice xmlns:a14="http://schemas.microsoft.com/office/drawing/2010/main" Requires="a14">
+      <mc:AlternateContent xmlns:mc="http://schemas.openxmlformats.org/markup-compatibility/2006" xmlns:a14="http://schemas.microsoft.com/office/drawing/2010/main">
+        <mc:Choice Requires="a14">
           <p:sp>
             <p:nvSpPr>
               <p:cNvPr id="39" name="TextBox 38">
@@ -12186,6 +12189,7 @@
               </a:bodyPr>
               <a:lstStyle/>
               <a:p>
+                <a:pPr/>
                 <a14:m>
                   <m:oMathPara xmlns:m="http://schemas.openxmlformats.org/officeDocument/2006/math">
                     <m:oMathParaPr>
@@ -12206,7 +12210,7 @@
             </p:txBody>
           </p:sp>
         </mc:Choice>
-        <mc:Fallback>
+        <mc:Fallback xmlns="">
           <p:sp>
             <p:nvSpPr>
               <p:cNvPr id="39" name="TextBox 38">
@@ -12251,8 +12255,8 @@
           </p:sp>
         </mc:Fallback>
       </mc:AlternateContent>
-      <mc:AlternateContent xmlns:mc="http://schemas.openxmlformats.org/markup-compatibility/2006">
-        <mc:Choice xmlns:a14="http://schemas.microsoft.com/office/drawing/2010/main" Requires="a14">
+      <mc:AlternateContent xmlns:mc="http://schemas.openxmlformats.org/markup-compatibility/2006" xmlns:a14="http://schemas.microsoft.com/office/drawing/2010/main">
+        <mc:Choice Requires="a14">
           <p:sp>
             <p:nvSpPr>
               <p:cNvPr id="41" name="TextBox 40">
@@ -12281,6 +12285,7 @@
               </a:bodyPr>
               <a:lstStyle/>
               <a:p>
+                <a:pPr/>
                 <a14:m>
                   <m:oMathPara xmlns:m="http://schemas.openxmlformats.org/officeDocument/2006/math">
                     <m:oMathParaPr>
@@ -12320,7 +12325,7 @@
             </p:txBody>
           </p:sp>
         </mc:Choice>
-        <mc:Fallback>
+        <mc:Fallback xmlns="">
           <p:sp>
             <p:nvSpPr>
               <p:cNvPr id="41" name="TextBox 40">
@@ -12369,6 +12374,1661 @@
     <p:extLst>
       <p:ext uri="{BB962C8B-B14F-4D97-AF65-F5344CB8AC3E}">
         <p14:creationId xmlns:p14="http://schemas.microsoft.com/office/powerpoint/2010/main" val="3968569689"/>
+      </p:ext>
+    </p:extLst>
+  </p:cSld>
+  <p:clrMapOvr>
+    <a:masterClrMapping/>
+  </p:clrMapOvr>
+</p:sld>
+</file>
+
+<file path=ppt/slides/slide12.xml><?xml version="1.0" encoding="utf-8"?>
+<p:sld xmlns:a="http://schemas.openxmlformats.org/drawingml/2006/main" xmlns:r="http://schemas.openxmlformats.org/officeDocument/2006/relationships" xmlns:p="http://schemas.openxmlformats.org/presentationml/2006/main">
+  <p:cSld>
+    <p:spTree>
+      <p:nvGrpSpPr>
+        <p:cNvPr id="1" name=""/>
+        <p:cNvGrpSpPr/>
+        <p:nvPr/>
+      </p:nvGrpSpPr>
+      <p:grpSpPr>
+        <a:xfrm>
+          <a:off x="0" y="0"/>
+          <a:ext cx="0" cy="0"/>
+          <a:chOff x="0" y="0"/>
+          <a:chExt cx="0" cy="0"/>
+        </a:xfrm>
+      </p:grpSpPr>
+      <p:cxnSp>
+        <p:nvCxnSpPr>
+          <p:cNvPr id="27" name="Straight Arrow Connector 26">
+            <a:extLst>
+              <a:ext uri="{FF2B5EF4-FFF2-40B4-BE49-F238E27FC236}">
+                <a16:creationId xmlns:a16="http://schemas.microsoft.com/office/drawing/2014/main" id="{5E52C26E-FC58-41B6-9995-D64C040D8D71}"/>
+              </a:ext>
+            </a:extLst>
+          </p:cNvPr>
+          <p:cNvCxnSpPr>
+            <a:cxnSpLocks/>
+          </p:cNvCxnSpPr>
+          <p:nvPr/>
+        </p:nvCxnSpPr>
+        <p:spPr>
+          <a:xfrm>
+            <a:off x="4224566" y="2823837"/>
+            <a:ext cx="0" cy="711843"/>
+          </a:xfrm>
+          <a:prstGeom prst="straightConnector1">
+            <a:avLst/>
+          </a:prstGeom>
+          <a:ln w="34925">
+            <a:solidFill>
+              <a:schemeClr val="tx1"/>
+            </a:solidFill>
+            <a:tailEnd type="stealth" w="lg" len="lg"/>
+          </a:ln>
+        </p:spPr>
+        <p:style>
+          <a:lnRef idx="1">
+            <a:schemeClr val="accent1"/>
+          </a:lnRef>
+          <a:fillRef idx="0">
+            <a:schemeClr val="accent1"/>
+          </a:fillRef>
+          <a:effectRef idx="0">
+            <a:schemeClr val="accent1"/>
+          </a:effectRef>
+          <a:fontRef idx="minor">
+            <a:schemeClr val="tx1"/>
+          </a:fontRef>
+        </p:style>
+      </p:cxnSp>
+      <p:cxnSp>
+        <p:nvCxnSpPr>
+          <p:cNvPr id="7" name="Straight Connector 6">
+            <a:extLst>
+              <a:ext uri="{FF2B5EF4-FFF2-40B4-BE49-F238E27FC236}">
+                <a16:creationId xmlns:a16="http://schemas.microsoft.com/office/drawing/2014/main" id="{54AD3868-E823-4B6D-8536-BF86E8F26EB1}"/>
+              </a:ext>
+            </a:extLst>
+          </p:cNvPr>
+          <p:cNvCxnSpPr/>
+          <p:nvPr/>
+        </p:nvCxnSpPr>
+        <p:spPr>
+          <a:xfrm>
+            <a:off x="2615686" y="1921012"/>
+            <a:ext cx="1608881" cy="902825"/>
+          </a:xfrm>
+          <a:prstGeom prst="line">
+            <a:avLst/>
+          </a:prstGeom>
+          <a:ln w="34925">
+            <a:solidFill>
+              <a:schemeClr val="tx1"/>
+            </a:solidFill>
+          </a:ln>
+        </p:spPr>
+        <p:style>
+          <a:lnRef idx="1">
+            <a:schemeClr val="accent1"/>
+          </a:lnRef>
+          <a:fillRef idx="0">
+            <a:schemeClr val="accent1"/>
+          </a:fillRef>
+          <a:effectRef idx="0">
+            <a:schemeClr val="accent1"/>
+          </a:effectRef>
+          <a:fontRef idx="minor">
+            <a:schemeClr val="tx1"/>
+          </a:fontRef>
+        </p:style>
+      </p:cxnSp>
+      <p:cxnSp>
+        <p:nvCxnSpPr>
+          <p:cNvPr id="8" name="Straight Connector 7">
+            <a:extLst>
+              <a:ext uri="{FF2B5EF4-FFF2-40B4-BE49-F238E27FC236}">
+                <a16:creationId xmlns:a16="http://schemas.microsoft.com/office/drawing/2014/main" id="{271DD1E7-AEBF-4623-A099-7760DBFBDF88}"/>
+              </a:ext>
+            </a:extLst>
+          </p:cNvPr>
+          <p:cNvCxnSpPr>
+            <a:cxnSpLocks/>
+          </p:cNvCxnSpPr>
+          <p:nvPr/>
+        </p:nvCxnSpPr>
+        <p:spPr>
+          <a:xfrm flipH="1">
+            <a:off x="4270248" y="2005584"/>
+            <a:ext cx="1505713" cy="818253"/>
+          </a:xfrm>
+          <a:prstGeom prst="line">
+            <a:avLst/>
+          </a:prstGeom>
+          <a:ln w="34925">
+            <a:solidFill>
+              <a:schemeClr val="tx1"/>
+            </a:solidFill>
+          </a:ln>
+        </p:spPr>
+        <p:style>
+          <a:lnRef idx="1">
+            <a:schemeClr val="accent1"/>
+          </a:lnRef>
+          <a:fillRef idx="0">
+            <a:schemeClr val="accent1"/>
+          </a:fillRef>
+          <a:effectRef idx="0">
+            <a:schemeClr val="accent1"/>
+          </a:effectRef>
+          <a:fontRef idx="minor">
+            <a:schemeClr val="tx1"/>
+          </a:fontRef>
+        </p:style>
+      </p:cxnSp>
+      <p:cxnSp>
+        <p:nvCxnSpPr>
+          <p:cNvPr id="12" name="Straight Arrow Connector 11">
+            <a:extLst>
+              <a:ext uri="{FF2B5EF4-FFF2-40B4-BE49-F238E27FC236}">
+                <a16:creationId xmlns:a16="http://schemas.microsoft.com/office/drawing/2014/main" id="{B07A83C6-FB93-4486-809D-71EBF93B3F13}"/>
+              </a:ext>
+            </a:extLst>
+          </p:cNvPr>
+          <p:cNvCxnSpPr>
+            <a:cxnSpLocks/>
+          </p:cNvCxnSpPr>
+          <p:nvPr/>
+        </p:nvCxnSpPr>
+        <p:spPr>
+          <a:xfrm>
+            <a:off x="5866763" y="2079056"/>
+            <a:ext cx="0" cy="1248426"/>
+          </a:xfrm>
+          <a:prstGeom prst="straightConnector1">
+            <a:avLst/>
+          </a:prstGeom>
+          <a:ln w="34925">
+            <a:solidFill>
+              <a:schemeClr val="tx1"/>
+            </a:solidFill>
+            <a:tailEnd type="stealth" w="lg" len="lg"/>
+          </a:ln>
+        </p:spPr>
+        <p:style>
+          <a:lnRef idx="1">
+            <a:schemeClr val="accent1"/>
+          </a:lnRef>
+          <a:fillRef idx="0">
+            <a:schemeClr val="accent1"/>
+          </a:fillRef>
+          <a:effectRef idx="0">
+            <a:schemeClr val="accent1"/>
+          </a:effectRef>
+          <a:fontRef idx="minor">
+            <a:schemeClr val="tx1"/>
+          </a:fontRef>
+        </p:style>
+      </p:cxnSp>
+      <p:sp>
+        <p:nvSpPr>
+          <p:cNvPr id="19" name="Oval 18">
+            <a:extLst>
+              <a:ext uri="{FF2B5EF4-FFF2-40B4-BE49-F238E27FC236}">
+                <a16:creationId xmlns:a16="http://schemas.microsoft.com/office/drawing/2014/main" id="{6C5411A5-A0A0-43F6-AFA0-27C46D691334}"/>
+              </a:ext>
+            </a:extLst>
+          </p:cNvPr>
+          <p:cNvSpPr/>
+          <p:nvPr/>
+        </p:nvSpPr>
+        <p:spPr>
+          <a:xfrm>
+            <a:off x="4122788" y="2703269"/>
+            <a:ext cx="203557" cy="201704"/>
+          </a:xfrm>
+          <a:prstGeom prst="ellipse">
+            <a:avLst/>
+          </a:prstGeom>
+          <a:gradFill flip="none" rotWithShape="1">
+            <a:gsLst>
+              <a:gs pos="0">
+                <a:schemeClr val="accent3">
+                  <a:lumMod val="40000"/>
+                  <a:lumOff val="60000"/>
+                </a:schemeClr>
+              </a:gs>
+              <a:gs pos="46000">
+                <a:schemeClr val="accent3">
+                  <a:lumMod val="95000"/>
+                  <a:lumOff val="5000"/>
+                </a:schemeClr>
+              </a:gs>
+              <a:gs pos="100000">
+                <a:schemeClr val="accent3">
+                  <a:lumMod val="60000"/>
+                </a:schemeClr>
+              </a:gs>
+            </a:gsLst>
+            <a:path path="circle">
+              <a:fillToRect l="50000" t="130000" r="50000" b="-30000"/>
+            </a:path>
+            <a:tileRect/>
+          </a:gradFill>
+          <a:ln>
+            <a:noFill/>
+          </a:ln>
+        </p:spPr>
+        <p:style>
+          <a:lnRef idx="2">
+            <a:schemeClr val="accent1">
+              <a:shade val="50000"/>
+            </a:schemeClr>
+          </a:lnRef>
+          <a:fillRef idx="1">
+            <a:schemeClr val="accent1"/>
+          </a:fillRef>
+          <a:effectRef idx="0">
+            <a:schemeClr val="accent1"/>
+          </a:effectRef>
+          <a:fontRef idx="minor">
+            <a:schemeClr val="lt1"/>
+          </a:fontRef>
+        </p:style>
+        <p:txBody>
+          <a:bodyPr rtlCol="0" anchor="ctr"/>
+          <a:lstStyle/>
+          <a:p>
+            <a:pPr algn="ctr"/>
+            <a:endParaRPr lang="en-US"/>
+          </a:p>
+        </p:txBody>
+      </p:sp>
+      <p:sp>
+        <p:nvSpPr>
+          <p:cNvPr id="20" name="Oval 19">
+            <a:extLst>
+              <a:ext uri="{FF2B5EF4-FFF2-40B4-BE49-F238E27FC236}">
+                <a16:creationId xmlns:a16="http://schemas.microsoft.com/office/drawing/2014/main" id="{CEA5E80A-B944-432C-B4F1-5E2FC651F7E6}"/>
+              </a:ext>
+            </a:extLst>
+          </p:cNvPr>
+          <p:cNvSpPr/>
+          <p:nvPr/>
+        </p:nvSpPr>
+        <p:spPr>
+          <a:xfrm>
+            <a:off x="2570005" y="1825842"/>
+            <a:ext cx="200627" cy="198802"/>
+          </a:xfrm>
+          <a:prstGeom prst="ellipse">
+            <a:avLst/>
+          </a:prstGeom>
+          <a:gradFill flip="none" rotWithShape="1">
+            <a:gsLst>
+              <a:gs pos="0">
+                <a:schemeClr val="accent3">
+                  <a:lumMod val="40000"/>
+                  <a:lumOff val="60000"/>
+                </a:schemeClr>
+              </a:gs>
+              <a:gs pos="46000">
+                <a:schemeClr val="accent3">
+                  <a:lumMod val="95000"/>
+                  <a:lumOff val="5000"/>
+                </a:schemeClr>
+              </a:gs>
+              <a:gs pos="100000">
+                <a:schemeClr val="accent3">
+                  <a:lumMod val="60000"/>
+                </a:schemeClr>
+              </a:gs>
+            </a:gsLst>
+            <a:path path="circle">
+              <a:fillToRect l="50000" t="130000" r="50000" b="-30000"/>
+            </a:path>
+            <a:tileRect/>
+          </a:gradFill>
+          <a:ln>
+            <a:noFill/>
+          </a:ln>
+        </p:spPr>
+        <p:style>
+          <a:lnRef idx="2">
+            <a:schemeClr val="accent1">
+              <a:shade val="50000"/>
+            </a:schemeClr>
+          </a:lnRef>
+          <a:fillRef idx="1">
+            <a:schemeClr val="accent1"/>
+          </a:fillRef>
+          <a:effectRef idx="0">
+            <a:schemeClr val="accent1"/>
+          </a:effectRef>
+          <a:fontRef idx="minor">
+            <a:schemeClr val="lt1"/>
+          </a:fontRef>
+        </p:style>
+        <p:txBody>
+          <a:bodyPr rtlCol="0" anchor="ctr"/>
+          <a:lstStyle/>
+          <a:p>
+            <a:pPr algn="ctr"/>
+            <a:endParaRPr lang="en-US"/>
+          </a:p>
+        </p:txBody>
+      </p:sp>
+      <p:sp>
+        <p:nvSpPr>
+          <p:cNvPr id="21" name="Oval 20">
+            <a:extLst>
+              <a:ext uri="{FF2B5EF4-FFF2-40B4-BE49-F238E27FC236}">
+                <a16:creationId xmlns:a16="http://schemas.microsoft.com/office/drawing/2014/main" id="{64D62DBC-8A4A-4FDF-A242-0A7CF56B1AC7}"/>
+              </a:ext>
+            </a:extLst>
+          </p:cNvPr>
+          <p:cNvSpPr/>
+          <p:nvPr/>
+        </p:nvSpPr>
+        <p:spPr>
+          <a:xfrm>
+            <a:off x="5759631" y="1899426"/>
+            <a:ext cx="214265" cy="212315"/>
+          </a:xfrm>
+          <a:prstGeom prst="ellipse">
+            <a:avLst/>
+          </a:prstGeom>
+          <a:gradFill flip="none" rotWithShape="1">
+            <a:gsLst>
+              <a:gs pos="0">
+                <a:schemeClr val="accent3">
+                  <a:lumMod val="40000"/>
+                  <a:lumOff val="60000"/>
+                </a:schemeClr>
+              </a:gs>
+              <a:gs pos="46000">
+                <a:schemeClr val="accent3">
+                  <a:lumMod val="95000"/>
+                  <a:lumOff val="5000"/>
+                </a:schemeClr>
+              </a:gs>
+              <a:gs pos="100000">
+                <a:schemeClr val="accent3">
+                  <a:lumMod val="60000"/>
+                </a:schemeClr>
+              </a:gs>
+            </a:gsLst>
+            <a:path path="circle">
+              <a:fillToRect l="50000" t="130000" r="50000" b="-30000"/>
+            </a:path>
+            <a:tileRect/>
+          </a:gradFill>
+          <a:ln>
+            <a:noFill/>
+          </a:ln>
+        </p:spPr>
+        <p:style>
+          <a:lnRef idx="2">
+            <a:schemeClr val="accent1">
+              <a:shade val="50000"/>
+            </a:schemeClr>
+          </a:lnRef>
+          <a:fillRef idx="1">
+            <a:schemeClr val="accent1"/>
+          </a:fillRef>
+          <a:effectRef idx="0">
+            <a:schemeClr val="accent1"/>
+          </a:effectRef>
+          <a:fontRef idx="minor">
+            <a:schemeClr val="lt1"/>
+          </a:fontRef>
+        </p:style>
+        <p:txBody>
+          <a:bodyPr rtlCol="0" anchor="ctr"/>
+          <a:lstStyle/>
+          <a:p>
+            <a:pPr algn="ctr"/>
+            <a:endParaRPr lang="en-US"/>
+          </a:p>
+        </p:txBody>
+      </p:sp>
+      <mc:AlternateContent xmlns:mc="http://schemas.openxmlformats.org/markup-compatibility/2006">
+        <mc:Choice xmlns:a14="http://schemas.microsoft.com/office/drawing/2010/main" Requires="a14">
+          <p:sp>
+            <p:nvSpPr>
+              <p:cNvPr id="30" name="TextBox 29">
+                <a:extLst>
+                  <a:ext uri="{FF2B5EF4-FFF2-40B4-BE49-F238E27FC236}">
+                    <a16:creationId xmlns:a16="http://schemas.microsoft.com/office/drawing/2014/main" id="{ED7798D2-8B24-41BA-A76C-80295B760838}"/>
+                  </a:ext>
+                </a:extLst>
+              </p:cNvPr>
+              <p:cNvSpPr txBox="1"/>
+              <p:nvPr/>
+            </p:nvSpPr>
+            <p:spPr>
+              <a:xfrm>
+                <a:off x="5957566" y="2850688"/>
+                <a:ext cx="303545" cy="276999"/>
+              </a:xfrm>
+              <a:prstGeom prst="rect">
+                <a:avLst/>
+              </a:prstGeom>
+              <a:noFill/>
+            </p:spPr>
+            <p:txBody>
+              <a:bodyPr wrap="none" lIns="0" tIns="0" rIns="0" bIns="0" rtlCol="0">
+                <a:spAutoFit/>
+              </a:bodyPr>
+              <a:lstStyle/>
+              <a:p>
+                <a14:m>
+                  <m:oMathPara xmlns:m="http://schemas.openxmlformats.org/officeDocument/2006/math">
+                    <m:oMathParaPr>
+                      <m:jc m:val="centerGroup"/>
+                    </m:oMathParaPr>
+                    <m:oMath xmlns:m="http://schemas.openxmlformats.org/officeDocument/2006/math">
+                      <m:sSub>
+                        <m:sSubPr>
+                          <m:ctrlPr>
+                            <a:rPr lang="en-US" i="1" smtClean="0">
+                              <a:latin typeface="Cambria Math" panose="02040503050406030204" pitchFamily="18" charset="0"/>
+                            </a:rPr>
+                          </m:ctrlPr>
+                        </m:sSubPr>
+                        <m:e>
+                          <m:r>
+                            <a:rPr lang="en-US" b="0" i="1" smtClean="0">
+                              <a:latin typeface="Cambria Math" panose="02040503050406030204" pitchFamily="18" charset="0"/>
+                            </a:rPr>
+                            <m:t>𝑣</m:t>
+                          </m:r>
+                        </m:e>
+                        <m:sub>
+                          <m:r>
+                            <a:rPr lang="en-US" b="0" i="1" smtClean="0">
+                              <a:latin typeface="Cambria Math" panose="02040503050406030204" pitchFamily="18" charset="0"/>
+                            </a:rPr>
+                            <m:t>𝐵</m:t>
+                          </m:r>
+                        </m:sub>
+                      </m:sSub>
+                    </m:oMath>
+                  </m:oMathPara>
+                </a14:m>
+                <a:endParaRPr lang="en-US" dirty="0"/>
+              </a:p>
+            </p:txBody>
+          </p:sp>
+        </mc:Choice>
+        <mc:Fallback>
+          <p:sp>
+            <p:nvSpPr>
+              <p:cNvPr id="30" name="TextBox 29">
+                <a:extLst>
+                  <a:ext uri="{FF2B5EF4-FFF2-40B4-BE49-F238E27FC236}">
+                    <a16:creationId xmlns:a16="http://schemas.microsoft.com/office/drawing/2014/main" id="{ED7798D2-8B24-41BA-A76C-80295B760838}"/>
+                  </a:ext>
+                </a:extLst>
+              </p:cNvPr>
+              <p:cNvSpPr txBox="1">
+                <a:spLocks noRot="1" noChangeAspect="1" noMove="1" noResize="1" noEditPoints="1" noAdjustHandles="1" noChangeArrowheads="1" noChangeShapeType="1" noTextEdit="1"/>
+              </p:cNvSpPr>
+              <p:nvPr/>
+            </p:nvSpPr>
+            <p:spPr>
+              <a:xfrm>
+                <a:off x="5957566" y="2850688"/>
+                <a:ext cx="303545" cy="276999"/>
+              </a:xfrm>
+              <a:prstGeom prst="rect">
+                <a:avLst/>
+              </a:prstGeom>
+              <a:blipFill>
+                <a:blip r:embed="rId2"/>
+                <a:stretch>
+                  <a:fillRect l="-10000" r="-8000" b="-15556"/>
+                </a:stretch>
+              </a:blipFill>
+            </p:spPr>
+            <p:txBody>
+              <a:bodyPr/>
+              <a:lstStyle/>
+              <a:p>
+                <a:r>
+                  <a:rPr lang="en-US">
+                    <a:noFill/>
+                  </a:rPr>
+                  <a:t> </a:t>
+                </a:r>
+              </a:p>
+            </p:txBody>
+          </p:sp>
+        </mc:Fallback>
+      </mc:AlternateContent>
+      <mc:AlternateContent xmlns:mc="http://schemas.openxmlformats.org/markup-compatibility/2006">
+        <mc:Choice xmlns:a14="http://schemas.microsoft.com/office/drawing/2010/main" Requires="a14">
+          <p:sp>
+            <p:nvSpPr>
+              <p:cNvPr id="31" name="TextBox 30">
+                <a:extLst>
+                  <a:ext uri="{FF2B5EF4-FFF2-40B4-BE49-F238E27FC236}">
+                    <a16:creationId xmlns:a16="http://schemas.microsoft.com/office/drawing/2014/main" id="{99BA21B6-6686-45CB-818F-98F0BB18CE77}"/>
+                  </a:ext>
+                </a:extLst>
+              </p:cNvPr>
+              <p:cNvSpPr txBox="1"/>
+              <p:nvPr/>
+            </p:nvSpPr>
+            <p:spPr>
+              <a:xfrm>
+                <a:off x="4270248" y="3322320"/>
+                <a:ext cx="287643" cy="276999"/>
+              </a:xfrm>
+              <a:prstGeom prst="rect">
+                <a:avLst/>
+              </a:prstGeom>
+              <a:noFill/>
+            </p:spPr>
+            <p:txBody>
+              <a:bodyPr wrap="none" lIns="0" tIns="0" rIns="0" bIns="0" rtlCol="0">
+                <a:spAutoFit/>
+              </a:bodyPr>
+              <a:lstStyle/>
+              <a:p>
+                <a14:m>
+                  <m:oMathPara xmlns:m="http://schemas.openxmlformats.org/officeDocument/2006/math">
+                    <m:oMathParaPr>
+                      <m:jc m:val="centerGroup"/>
+                    </m:oMathParaPr>
+                    <m:oMath xmlns:m="http://schemas.openxmlformats.org/officeDocument/2006/math">
+                      <m:sSub>
+                        <m:sSubPr>
+                          <m:ctrlPr>
+                            <a:rPr lang="en-US" i="1" smtClean="0">
+                              <a:latin typeface="Cambria Math" panose="02040503050406030204" pitchFamily="18" charset="0"/>
+                            </a:rPr>
+                          </m:ctrlPr>
+                        </m:sSubPr>
+                        <m:e>
+                          <m:r>
+                            <a:rPr lang="en-US" b="0" i="1" smtClean="0">
+                              <a:latin typeface="Cambria Math" panose="02040503050406030204" pitchFamily="18" charset="0"/>
+                            </a:rPr>
+                            <m:t>𝑣</m:t>
+                          </m:r>
+                        </m:e>
+                        <m:sub>
+                          <m:r>
+                            <a:rPr lang="en-US" b="0" i="1" smtClean="0">
+                              <a:latin typeface="Cambria Math" panose="02040503050406030204" pitchFamily="18" charset="0"/>
+                            </a:rPr>
+                            <m:t>𝐴</m:t>
+                          </m:r>
+                        </m:sub>
+                      </m:sSub>
+                    </m:oMath>
+                  </m:oMathPara>
+                </a14:m>
+                <a:endParaRPr lang="en-US" dirty="0"/>
+              </a:p>
+            </p:txBody>
+          </p:sp>
+        </mc:Choice>
+        <mc:Fallback>
+          <p:sp>
+            <p:nvSpPr>
+              <p:cNvPr id="31" name="TextBox 30">
+                <a:extLst>
+                  <a:ext uri="{FF2B5EF4-FFF2-40B4-BE49-F238E27FC236}">
+                    <a16:creationId xmlns:a16="http://schemas.microsoft.com/office/drawing/2014/main" id="{99BA21B6-6686-45CB-818F-98F0BB18CE77}"/>
+                  </a:ext>
+                </a:extLst>
+              </p:cNvPr>
+              <p:cNvSpPr txBox="1">
+                <a:spLocks noRot="1" noChangeAspect="1" noMove="1" noResize="1" noEditPoints="1" noAdjustHandles="1" noChangeArrowheads="1" noChangeShapeType="1" noTextEdit="1"/>
+              </p:cNvSpPr>
+              <p:nvPr/>
+            </p:nvSpPr>
+            <p:spPr>
+              <a:xfrm>
+                <a:off x="4270248" y="3322320"/>
+                <a:ext cx="287643" cy="276999"/>
+              </a:xfrm>
+              <a:prstGeom prst="rect">
+                <a:avLst/>
+              </a:prstGeom>
+              <a:blipFill>
+                <a:blip r:embed="rId3"/>
+                <a:stretch>
+                  <a:fillRect l="-10638" r="-8511" b="-15556"/>
+                </a:stretch>
+              </a:blipFill>
+            </p:spPr>
+            <p:txBody>
+              <a:bodyPr/>
+              <a:lstStyle/>
+              <a:p>
+                <a:r>
+                  <a:rPr lang="en-US">
+                    <a:noFill/>
+                  </a:rPr>
+                  <a:t> </a:t>
+                </a:r>
+              </a:p>
+            </p:txBody>
+          </p:sp>
+        </mc:Fallback>
+      </mc:AlternateContent>
+      <p:cxnSp>
+        <p:nvCxnSpPr>
+          <p:cNvPr id="32" name="Straight Arrow Connector 31">
+            <a:extLst>
+              <a:ext uri="{FF2B5EF4-FFF2-40B4-BE49-F238E27FC236}">
+                <a16:creationId xmlns:a16="http://schemas.microsoft.com/office/drawing/2014/main" id="{B981D47B-09AD-4999-A322-F46794E1A358}"/>
+              </a:ext>
+            </a:extLst>
+          </p:cNvPr>
+          <p:cNvCxnSpPr>
+            <a:cxnSpLocks/>
+            <a:stCxn id="20" idx="6"/>
+            <a:endCxn id="21" idx="1"/>
+          </p:cNvCxnSpPr>
+          <p:nvPr/>
+        </p:nvCxnSpPr>
+        <p:spPr>
+          <a:xfrm>
+            <a:off x="2770632" y="1925243"/>
+            <a:ext cx="3020377" cy="5276"/>
+          </a:xfrm>
+          <a:prstGeom prst="straightConnector1">
+            <a:avLst/>
+          </a:prstGeom>
+          <a:ln w="34925">
+            <a:solidFill>
+              <a:schemeClr val="tx1"/>
+            </a:solidFill>
+            <a:headEnd type="stealth" w="lg" len="lg"/>
+            <a:tailEnd type="stealth" w="lg" len="lg"/>
+          </a:ln>
+        </p:spPr>
+        <p:style>
+          <a:lnRef idx="1">
+            <a:schemeClr val="accent1"/>
+          </a:lnRef>
+          <a:fillRef idx="0">
+            <a:schemeClr val="accent1"/>
+          </a:fillRef>
+          <a:effectRef idx="0">
+            <a:schemeClr val="accent1"/>
+          </a:effectRef>
+          <a:fontRef idx="minor">
+            <a:schemeClr val="tx1"/>
+          </a:fontRef>
+        </p:style>
+      </p:cxnSp>
+      <p:cxnSp>
+        <p:nvCxnSpPr>
+          <p:cNvPr id="34" name="Straight Arrow Connector 33">
+            <a:extLst>
+              <a:ext uri="{FF2B5EF4-FFF2-40B4-BE49-F238E27FC236}">
+                <a16:creationId xmlns:a16="http://schemas.microsoft.com/office/drawing/2014/main" id="{C8174835-D0C4-4B51-A940-37E315BA85FC}"/>
+              </a:ext>
+            </a:extLst>
+          </p:cNvPr>
+          <p:cNvCxnSpPr>
+            <a:cxnSpLocks/>
+            <a:stCxn id="19" idx="0"/>
+          </p:cNvCxnSpPr>
+          <p:nvPr/>
+        </p:nvCxnSpPr>
+        <p:spPr>
+          <a:xfrm flipH="1" flipV="1">
+            <a:off x="4224566" y="1944125"/>
+            <a:ext cx="1" cy="759144"/>
+          </a:xfrm>
+          <a:prstGeom prst="straightConnector1">
+            <a:avLst/>
+          </a:prstGeom>
+          <a:ln w="34925">
+            <a:solidFill>
+              <a:schemeClr val="tx1"/>
+            </a:solidFill>
+            <a:headEnd type="stealth" w="lg" len="lg"/>
+            <a:tailEnd type="stealth" w="lg" len="lg"/>
+          </a:ln>
+        </p:spPr>
+        <p:style>
+          <a:lnRef idx="1">
+            <a:schemeClr val="accent1"/>
+          </a:lnRef>
+          <a:fillRef idx="0">
+            <a:schemeClr val="accent1"/>
+          </a:fillRef>
+          <a:effectRef idx="0">
+            <a:schemeClr val="accent1"/>
+          </a:effectRef>
+          <a:fontRef idx="minor">
+            <a:schemeClr val="tx1"/>
+          </a:fontRef>
+        </p:style>
+      </p:cxnSp>
+      <mc:AlternateContent xmlns:mc="http://schemas.openxmlformats.org/markup-compatibility/2006">
+        <mc:Choice xmlns:a14="http://schemas.microsoft.com/office/drawing/2010/main" Requires="a14">
+          <p:sp>
+            <p:nvSpPr>
+              <p:cNvPr id="37" name="TextBox 36">
+                <a:extLst>
+                  <a:ext uri="{FF2B5EF4-FFF2-40B4-BE49-F238E27FC236}">
+                    <a16:creationId xmlns:a16="http://schemas.microsoft.com/office/drawing/2014/main" id="{23EDD540-5B01-4995-AAB5-459FF04A09CA}"/>
+                  </a:ext>
+                </a:extLst>
+              </p:cNvPr>
+              <p:cNvSpPr txBox="1"/>
+              <p:nvPr/>
+            </p:nvSpPr>
+            <p:spPr>
+              <a:xfrm>
+                <a:off x="3962726" y="2228178"/>
+                <a:ext cx="183320" cy="276999"/>
+              </a:xfrm>
+              <a:prstGeom prst="rect">
+                <a:avLst/>
+              </a:prstGeom>
+              <a:noFill/>
+            </p:spPr>
+            <p:txBody>
+              <a:bodyPr wrap="none" lIns="0" tIns="0" rIns="0" bIns="0" rtlCol="0">
+                <a:spAutoFit/>
+              </a:bodyPr>
+              <a:lstStyle/>
+              <a:p>
+                <a14:m>
+                  <m:oMathPara xmlns:m="http://schemas.openxmlformats.org/officeDocument/2006/math">
+                    <m:oMathParaPr>
+                      <m:jc m:val="centerGroup"/>
+                    </m:oMathParaPr>
+                    <m:oMath xmlns:m="http://schemas.openxmlformats.org/officeDocument/2006/math">
+                      <m:r>
+                        <a:rPr lang="en-US" b="0" i="1" smtClean="0">
+                          <a:latin typeface="Cambria Math" panose="02040503050406030204" pitchFamily="18" charset="0"/>
+                        </a:rPr>
+                        <m:t>𝑥</m:t>
+                      </m:r>
+                    </m:oMath>
+                  </m:oMathPara>
+                </a14:m>
+                <a:endParaRPr lang="en-US" dirty="0"/>
+              </a:p>
+            </p:txBody>
+          </p:sp>
+        </mc:Choice>
+        <mc:Fallback>
+          <p:sp>
+            <p:nvSpPr>
+              <p:cNvPr id="37" name="TextBox 36">
+                <a:extLst>
+                  <a:ext uri="{FF2B5EF4-FFF2-40B4-BE49-F238E27FC236}">
+                    <a16:creationId xmlns:a16="http://schemas.microsoft.com/office/drawing/2014/main" id="{23EDD540-5B01-4995-AAB5-459FF04A09CA}"/>
+                  </a:ext>
+                </a:extLst>
+              </p:cNvPr>
+              <p:cNvSpPr txBox="1">
+                <a:spLocks noRot="1" noChangeAspect="1" noMove="1" noResize="1" noEditPoints="1" noAdjustHandles="1" noChangeArrowheads="1" noChangeShapeType="1" noTextEdit="1"/>
+              </p:cNvSpPr>
+              <p:nvPr/>
+            </p:nvSpPr>
+            <p:spPr>
+              <a:xfrm>
+                <a:off x="3962726" y="2228178"/>
+                <a:ext cx="183320" cy="276999"/>
+              </a:xfrm>
+              <a:prstGeom prst="rect">
+                <a:avLst/>
+              </a:prstGeom>
+              <a:blipFill>
+                <a:blip r:embed="rId4"/>
+                <a:stretch>
+                  <a:fillRect l="-20000" r="-13333"/>
+                </a:stretch>
+              </a:blipFill>
+            </p:spPr>
+            <p:txBody>
+              <a:bodyPr/>
+              <a:lstStyle/>
+              <a:p>
+                <a:r>
+                  <a:rPr lang="en-US">
+                    <a:noFill/>
+                  </a:rPr>
+                  <a:t> </a:t>
+                </a:r>
+              </a:p>
+            </p:txBody>
+          </p:sp>
+        </mc:Fallback>
+      </mc:AlternateContent>
+      <mc:AlternateContent xmlns:mc="http://schemas.openxmlformats.org/markup-compatibility/2006">
+        <mc:Choice xmlns:a14="http://schemas.microsoft.com/office/drawing/2010/main" Requires="a14">
+          <p:sp>
+            <p:nvSpPr>
+              <p:cNvPr id="38" name="TextBox 37">
+                <a:extLst>
+                  <a:ext uri="{FF2B5EF4-FFF2-40B4-BE49-F238E27FC236}">
+                    <a16:creationId xmlns:a16="http://schemas.microsoft.com/office/drawing/2014/main" id="{6D353D6C-4D5B-4A58-B4C7-F64F7E9EA677}"/>
+                  </a:ext>
+                </a:extLst>
+              </p:cNvPr>
+              <p:cNvSpPr txBox="1"/>
+              <p:nvPr/>
+            </p:nvSpPr>
+            <p:spPr>
+              <a:xfrm>
+                <a:off x="3736243" y="1653083"/>
+                <a:ext cx="181075" cy="276999"/>
+              </a:xfrm>
+              <a:prstGeom prst="rect">
+                <a:avLst/>
+              </a:prstGeom>
+              <a:noFill/>
+            </p:spPr>
+            <p:txBody>
+              <a:bodyPr wrap="none" lIns="0" tIns="0" rIns="0" bIns="0" rtlCol="0">
+                <a:spAutoFit/>
+              </a:bodyPr>
+              <a:lstStyle/>
+              <a:p>
+                <a14:m>
+                  <m:oMathPara xmlns:m="http://schemas.openxmlformats.org/officeDocument/2006/math">
+                    <m:oMathParaPr>
+                      <m:jc m:val="centerGroup"/>
+                    </m:oMathParaPr>
+                    <m:oMath xmlns:m="http://schemas.openxmlformats.org/officeDocument/2006/math">
+                      <m:r>
+                        <a:rPr lang="en-US" b="0" i="1" smtClean="0">
+                          <a:latin typeface="Cambria Math" panose="02040503050406030204" pitchFamily="18" charset="0"/>
+                        </a:rPr>
+                        <m:t>𝐿</m:t>
+                      </m:r>
+                    </m:oMath>
+                  </m:oMathPara>
+                </a14:m>
+                <a:endParaRPr lang="en-US" dirty="0"/>
+              </a:p>
+            </p:txBody>
+          </p:sp>
+        </mc:Choice>
+        <mc:Fallback>
+          <p:sp>
+            <p:nvSpPr>
+              <p:cNvPr id="38" name="TextBox 37">
+                <a:extLst>
+                  <a:ext uri="{FF2B5EF4-FFF2-40B4-BE49-F238E27FC236}">
+                    <a16:creationId xmlns:a16="http://schemas.microsoft.com/office/drawing/2014/main" id="{6D353D6C-4D5B-4A58-B4C7-F64F7E9EA677}"/>
+                  </a:ext>
+                </a:extLst>
+              </p:cNvPr>
+              <p:cNvSpPr txBox="1">
+                <a:spLocks noRot="1" noChangeAspect="1" noMove="1" noResize="1" noEditPoints="1" noAdjustHandles="1" noChangeArrowheads="1" noChangeShapeType="1" noTextEdit="1"/>
+              </p:cNvSpPr>
+              <p:nvPr/>
+            </p:nvSpPr>
+            <p:spPr>
+              <a:xfrm>
+                <a:off x="3736243" y="1653083"/>
+                <a:ext cx="181075" cy="276999"/>
+              </a:xfrm>
+              <a:prstGeom prst="rect">
+                <a:avLst/>
+              </a:prstGeom>
+              <a:blipFill>
+                <a:blip r:embed="rId5"/>
+                <a:stretch>
+                  <a:fillRect l="-33333" r="-23333" b="-6522"/>
+                </a:stretch>
+              </a:blipFill>
+            </p:spPr>
+            <p:txBody>
+              <a:bodyPr/>
+              <a:lstStyle/>
+              <a:p>
+                <a:r>
+                  <a:rPr lang="en-US">
+                    <a:noFill/>
+                  </a:rPr>
+                  <a:t> </a:t>
+                </a:r>
+              </a:p>
+            </p:txBody>
+          </p:sp>
+        </mc:Fallback>
+      </mc:AlternateContent>
+      <mc:AlternateContent xmlns:mc="http://schemas.openxmlformats.org/markup-compatibility/2006">
+        <mc:Choice xmlns:a14="http://schemas.microsoft.com/office/drawing/2010/main" Requires="a14">
+          <p:sp>
+            <p:nvSpPr>
+              <p:cNvPr id="39" name="TextBox 38">
+                <a:extLst>
+                  <a:ext uri="{FF2B5EF4-FFF2-40B4-BE49-F238E27FC236}">
+                    <a16:creationId xmlns:a16="http://schemas.microsoft.com/office/drawing/2014/main" id="{129630E4-657C-4B39-A76E-F69956CE8049}"/>
+                  </a:ext>
+                </a:extLst>
+              </p:cNvPr>
+              <p:cNvSpPr txBox="1"/>
+              <p:nvPr/>
+            </p:nvSpPr>
+            <p:spPr>
+              <a:xfrm>
+                <a:off x="3291277" y="2642008"/>
+                <a:ext cx="545599" cy="276999"/>
+              </a:xfrm>
+              <a:prstGeom prst="rect">
+                <a:avLst/>
+              </a:prstGeom>
+              <a:noFill/>
+            </p:spPr>
+            <p:txBody>
+              <a:bodyPr wrap="none" lIns="0" tIns="0" rIns="0" bIns="0" rtlCol="0">
+                <a:spAutoFit/>
+              </a:bodyPr>
+              <a:lstStyle/>
+              <a:p>
+                <a14:m>
+                  <m:oMathPara xmlns:m="http://schemas.openxmlformats.org/officeDocument/2006/math">
+                    <m:oMathParaPr>
+                      <m:jc m:val="centerGroup"/>
+                    </m:oMathParaPr>
+                    <m:oMath xmlns:m="http://schemas.openxmlformats.org/officeDocument/2006/math">
+                      <m:sSub>
+                        <m:sSubPr>
+                          <m:ctrlPr>
+                            <a:rPr lang="en-US" i="1" smtClean="0">
+                              <a:latin typeface="Cambria Math" panose="02040503050406030204" pitchFamily="18" charset="0"/>
+                            </a:rPr>
+                          </m:ctrlPr>
+                        </m:sSubPr>
+                        <m:e>
+                          <m:r>
+                            <a:rPr lang="en-US" i="1">
+                              <a:latin typeface="Cambria Math" panose="02040503050406030204" pitchFamily="18" charset="0"/>
+                            </a:rPr>
+                            <m:t>𝑣</m:t>
+                          </m:r>
+                        </m:e>
+                        <m:sub>
+                          <m:r>
+                            <a:rPr lang="en-US" i="1">
+                              <a:latin typeface="Cambria Math" panose="02040503050406030204" pitchFamily="18" charset="0"/>
+                            </a:rPr>
+                            <m:t>𝐵</m:t>
+                          </m:r>
+                        </m:sub>
+                      </m:sSub>
+                      <m:r>
+                        <a:rPr lang="en-US" b="0" i="1" smtClean="0">
+                          <a:latin typeface="Cambria Math" panose="02040503050406030204" pitchFamily="18" charset="0"/>
+                        </a:rPr>
+                        <m:t>/2</m:t>
+                      </m:r>
+                    </m:oMath>
+                  </m:oMathPara>
+                </a14:m>
+                <a:endParaRPr lang="en-US" dirty="0"/>
+              </a:p>
+            </p:txBody>
+          </p:sp>
+        </mc:Choice>
+        <mc:Fallback>
+          <p:sp>
+            <p:nvSpPr>
+              <p:cNvPr id="39" name="TextBox 38">
+                <a:extLst>
+                  <a:ext uri="{FF2B5EF4-FFF2-40B4-BE49-F238E27FC236}">
+                    <a16:creationId xmlns:a16="http://schemas.microsoft.com/office/drawing/2014/main" id="{129630E4-657C-4B39-A76E-F69956CE8049}"/>
+                  </a:ext>
+                </a:extLst>
+              </p:cNvPr>
+              <p:cNvSpPr txBox="1">
+                <a:spLocks noRot="1" noChangeAspect="1" noMove="1" noResize="1" noEditPoints="1" noAdjustHandles="1" noChangeArrowheads="1" noChangeShapeType="1" noTextEdit="1"/>
+              </p:cNvSpPr>
+              <p:nvPr/>
+            </p:nvSpPr>
+            <p:spPr>
+              <a:xfrm>
+                <a:off x="3291277" y="2642008"/>
+                <a:ext cx="545599" cy="276999"/>
+              </a:xfrm>
+              <a:prstGeom prst="rect">
+                <a:avLst/>
+              </a:prstGeom>
+              <a:blipFill>
+                <a:blip r:embed="rId6"/>
+                <a:stretch>
+                  <a:fillRect l="-5618" t="-2174" r="-11236" b="-32609"/>
+                </a:stretch>
+              </a:blipFill>
+            </p:spPr>
+            <p:txBody>
+              <a:bodyPr/>
+              <a:lstStyle/>
+              <a:p>
+                <a:r>
+                  <a:rPr lang="en-US">
+                    <a:noFill/>
+                  </a:rPr>
+                  <a:t> </a:t>
+                </a:r>
+              </a:p>
+            </p:txBody>
+          </p:sp>
+        </mc:Fallback>
+      </mc:AlternateContent>
+      <mc:AlternateContent xmlns:mc="http://schemas.openxmlformats.org/markup-compatibility/2006">
+        <mc:Choice xmlns:a14="http://schemas.microsoft.com/office/drawing/2010/main" Requires="a14">
+          <p:sp>
+            <p:nvSpPr>
+              <p:cNvPr id="40" name="TextBox 39">
+                <a:extLst>
+                  <a:ext uri="{FF2B5EF4-FFF2-40B4-BE49-F238E27FC236}">
+                    <a16:creationId xmlns:a16="http://schemas.microsoft.com/office/drawing/2014/main" id="{7288FDB7-CDD0-479A-8A16-0A7874935A86}"/>
+                  </a:ext>
+                </a:extLst>
+              </p:cNvPr>
+              <p:cNvSpPr txBox="1"/>
+              <p:nvPr/>
+            </p:nvSpPr>
+            <p:spPr>
+              <a:xfrm>
+                <a:off x="4630375" y="2556696"/>
+                <a:ext cx="545599" cy="276999"/>
+              </a:xfrm>
+              <a:prstGeom prst="rect">
+                <a:avLst/>
+              </a:prstGeom>
+              <a:noFill/>
+            </p:spPr>
+            <p:txBody>
+              <a:bodyPr wrap="none" lIns="0" tIns="0" rIns="0" bIns="0" rtlCol="0">
+                <a:spAutoFit/>
+              </a:bodyPr>
+              <a:lstStyle/>
+              <a:p>
+                <a14:m>
+                  <m:oMathPara xmlns:m="http://schemas.openxmlformats.org/officeDocument/2006/math">
+                    <m:oMathParaPr>
+                      <m:jc m:val="centerGroup"/>
+                    </m:oMathParaPr>
+                    <m:oMath xmlns:m="http://schemas.openxmlformats.org/officeDocument/2006/math">
+                      <m:sSub>
+                        <m:sSubPr>
+                          <m:ctrlPr>
+                            <a:rPr lang="en-US" i="1" smtClean="0">
+                              <a:latin typeface="Cambria Math" panose="02040503050406030204" pitchFamily="18" charset="0"/>
+                            </a:rPr>
+                          </m:ctrlPr>
+                        </m:sSubPr>
+                        <m:e>
+                          <m:r>
+                            <a:rPr lang="en-US" i="1">
+                              <a:latin typeface="Cambria Math" panose="02040503050406030204" pitchFamily="18" charset="0"/>
+                            </a:rPr>
+                            <m:t>𝑣</m:t>
+                          </m:r>
+                        </m:e>
+                        <m:sub>
+                          <m:r>
+                            <a:rPr lang="en-US" i="1">
+                              <a:latin typeface="Cambria Math" panose="02040503050406030204" pitchFamily="18" charset="0"/>
+                            </a:rPr>
+                            <m:t>𝐵</m:t>
+                          </m:r>
+                        </m:sub>
+                      </m:sSub>
+                      <m:r>
+                        <a:rPr lang="en-US" b="0" i="1" smtClean="0">
+                          <a:latin typeface="Cambria Math" panose="02040503050406030204" pitchFamily="18" charset="0"/>
+                        </a:rPr>
+                        <m:t>/2</m:t>
+                      </m:r>
+                    </m:oMath>
+                  </m:oMathPara>
+                </a14:m>
+                <a:endParaRPr lang="en-US" dirty="0"/>
+              </a:p>
+            </p:txBody>
+          </p:sp>
+        </mc:Choice>
+        <mc:Fallback>
+          <p:sp>
+            <p:nvSpPr>
+              <p:cNvPr id="40" name="TextBox 39">
+                <a:extLst>
+                  <a:ext uri="{FF2B5EF4-FFF2-40B4-BE49-F238E27FC236}">
+                    <a16:creationId xmlns:a16="http://schemas.microsoft.com/office/drawing/2014/main" id="{7288FDB7-CDD0-479A-8A16-0A7874935A86}"/>
+                  </a:ext>
+                </a:extLst>
+              </p:cNvPr>
+              <p:cNvSpPr txBox="1">
+                <a:spLocks noRot="1" noChangeAspect="1" noMove="1" noResize="1" noEditPoints="1" noAdjustHandles="1" noChangeArrowheads="1" noChangeShapeType="1" noTextEdit="1"/>
+              </p:cNvSpPr>
+              <p:nvPr/>
+            </p:nvSpPr>
+            <p:spPr>
+              <a:xfrm>
+                <a:off x="4630375" y="2556696"/>
+                <a:ext cx="545599" cy="276999"/>
+              </a:xfrm>
+              <a:prstGeom prst="rect">
+                <a:avLst/>
+              </a:prstGeom>
+              <a:blipFill>
+                <a:blip r:embed="rId7"/>
+                <a:stretch>
+                  <a:fillRect l="-5618" t="-2174" r="-11236" b="-32609"/>
+                </a:stretch>
+              </a:blipFill>
+            </p:spPr>
+            <p:txBody>
+              <a:bodyPr/>
+              <a:lstStyle/>
+              <a:p>
+                <a:r>
+                  <a:rPr lang="en-US">
+                    <a:noFill/>
+                  </a:rPr>
+                  <a:t> </a:t>
+                </a:r>
+              </a:p>
+            </p:txBody>
+          </p:sp>
+        </mc:Fallback>
+      </mc:AlternateContent>
+      <p:cxnSp>
+        <p:nvCxnSpPr>
+          <p:cNvPr id="41" name="Straight Arrow Connector 40">
+            <a:extLst>
+              <a:ext uri="{FF2B5EF4-FFF2-40B4-BE49-F238E27FC236}">
+                <a16:creationId xmlns:a16="http://schemas.microsoft.com/office/drawing/2014/main" id="{AF34DC03-A364-4476-8B3D-C18D44223C5A}"/>
+              </a:ext>
+            </a:extLst>
+          </p:cNvPr>
+          <p:cNvCxnSpPr>
+            <a:cxnSpLocks/>
+            <a:stCxn id="19" idx="6"/>
+          </p:cNvCxnSpPr>
+          <p:nvPr/>
+        </p:nvCxnSpPr>
+        <p:spPr>
+          <a:xfrm flipV="1">
+            <a:off x="4326345" y="2473701"/>
+            <a:ext cx="563717" cy="330420"/>
+          </a:xfrm>
+          <a:prstGeom prst="straightConnector1">
+            <a:avLst/>
+          </a:prstGeom>
+          <a:ln w="34925">
+            <a:solidFill>
+              <a:schemeClr val="tx1"/>
+            </a:solidFill>
+            <a:tailEnd type="stealth" w="lg" len="lg"/>
+          </a:ln>
+        </p:spPr>
+        <p:style>
+          <a:lnRef idx="1">
+            <a:schemeClr val="accent1"/>
+          </a:lnRef>
+          <a:fillRef idx="0">
+            <a:schemeClr val="accent1"/>
+          </a:fillRef>
+          <a:effectRef idx="0">
+            <a:schemeClr val="accent1"/>
+          </a:effectRef>
+          <a:fontRef idx="minor">
+            <a:schemeClr val="tx1"/>
+          </a:fontRef>
+        </p:style>
+      </p:cxnSp>
+      <p:cxnSp>
+        <p:nvCxnSpPr>
+          <p:cNvPr id="44" name="Straight Arrow Connector 43">
+            <a:extLst>
+              <a:ext uri="{FF2B5EF4-FFF2-40B4-BE49-F238E27FC236}">
+                <a16:creationId xmlns:a16="http://schemas.microsoft.com/office/drawing/2014/main" id="{144FD3A9-DFE5-4BB7-AA3F-23D5392EE996}"/>
+              </a:ext>
+            </a:extLst>
+          </p:cNvPr>
+          <p:cNvCxnSpPr>
+            <a:cxnSpLocks/>
+          </p:cNvCxnSpPr>
+          <p:nvPr/>
+        </p:nvCxnSpPr>
+        <p:spPr>
+          <a:xfrm>
+            <a:off x="3476713" y="2397979"/>
+            <a:ext cx="486013" cy="297216"/>
+          </a:xfrm>
+          <a:prstGeom prst="straightConnector1">
+            <a:avLst/>
+          </a:prstGeom>
+          <a:ln w="34925">
+            <a:solidFill>
+              <a:schemeClr val="tx1"/>
+            </a:solidFill>
+            <a:tailEnd type="stealth" w="lg" len="lg"/>
+          </a:ln>
+        </p:spPr>
+        <p:style>
+          <a:lnRef idx="1">
+            <a:schemeClr val="accent1"/>
+          </a:lnRef>
+          <a:fillRef idx="0">
+            <a:schemeClr val="accent1"/>
+          </a:fillRef>
+          <a:effectRef idx="0">
+            <a:schemeClr val="accent1"/>
+          </a:effectRef>
+          <a:fontRef idx="minor">
+            <a:schemeClr val="tx1"/>
+          </a:fontRef>
+        </p:style>
+      </p:cxnSp>
+      <p:pic>
+        <p:nvPicPr>
+          <p:cNvPr id="54" name="Picture 53">
+            <a:extLst>
+              <a:ext uri="{FF2B5EF4-FFF2-40B4-BE49-F238E27FC236}">
+                <a16:creationId xmlns:a16="http://schemas.microsoft.com/office/drawing/2014/main" id="{F945FB62-2D00-4B94-B052-50FE200B3BB7}"/>
+              </a:ext>
+            </a:extLst>
+          </p:cNvPr>
+          <p:cNvPicPr>
+            <a:picLocks noChangeAspect="1"/>
+          </p:cNvPicPr>
+          <p:nvPr/>
+        </p:nvPicPr>
+        <p:blipFill>
+          <a:blip r:embed="rId8"/>
+          <a:stretch>
+            <a:fillRect/>
+          </a:stretch>
+        </p:blipFill>
+        <p:spPr>
+          <a:xfrm>
+            <a:off x="7055992" y="3640603"/>
+            <a:ext cx="2956816" cy="2286198"/>
+          </a:xfrm>
+          <a:prstGeom prst="rect">
+            <a:avLst/>
+          </a:prstGeom>
+        </p:spPr>
+      </p:pic>
+      <p:cxnSp>
+        <p:nvCxnSpPr>
+          <p:cNvPr id="55" name="Straight Arrow Connector 54">
+            <a:extLst>
+              <a:ext uri="{FF2B5EF4-FFF2-40B4-BE49-F238E27FC236}">
+                <a16:creationId xmlns:a16="http://schemas.microsoft.com/office/drawing/2014/main" id="{4819B2F1-C399-47DF-8041-E123DB9D36E1}"/>
+              </a:ext>
+            </a:extLst>
+          </p:cNvPr>
+          <p:cNvCxnSpPr>
+            <a:cxnSpLocks/>
+          </p:cNvCxnSpPr>
+          <p:nvPr/>
+        </p:nvCxnSpPr>
+        <p:spPr>
+          <a:xfrm flipH="1" flipV="1">
+            <a:off x="8430768" y="5633363"/>
+            <a:ext cx="810768" cy="24164"/>
+          </a:xfrm>
+          <a:prstGeom prst="straightConnector1">
+            <a:avLst/>
+          </a:prstGeom>
+          <a:ln w="34925">
+            <a:solidFill>
+              <a:srgbClr val="FF0000"/>
+            </a:solidFill>
+            <a:tailEnd type="stealth" w="lg" len="lg"/>
+          </a:ln>
+        </p:spPr>
+        <p:style>
+          <a:lnRef idx="1">
+            <a:schemeClr val="accent1"/>
+          </a:lnRef>
+          <a:fillRef idx="0">
+            <a:schemeClr val="accent1"/>
+          </a:fillRef>
+          <a:effectRef idx="0">
+            <a:schemeClr val="accent1"/>
+          </a:effectRef>
+          <a:fontRef idx="minor">
+            <a:schemeClr val="tx1"/>
+          </a:fontRef>
+        </p:style>
+      </p:cxnSp>
+      <mc:AlternateContent xmlns:mc="http://schemas.openxmlformats.org/markup-compatibility/2006">
+        <mc:Choice xmlns:a14="http://schemas.microsoft.com/office/drawing/2010/main" Requires="a14">
+          <p:sp>
+            <p:nvSpPr>
+              <p:cNvPr id="56" name="TextBox 55">
+                <a:extLst>
+                  <a:ext uri="{FF2B5EF4-FFF2-40B4-BE49-F238E27FC236}">
+                    <a16:creationId xmlns:a16="http://schemas.microsoft.com/office/drawing/2014/main" id="{8325262D-AF76-45DD-8C91-CAD9E70C7F33}"/>
+                  </a:ext>
+                </a:extLst>
+              </p:cNvPr>
+              <p:cNvSpPr txBox="1"/>
+              <p:nvPr/>
+            </p:nvSpPr>
+            <p:spPr>
+              <a:xfrm>
+                <a:off x="8534400" y="5289088"/>
+                <a:ext cx="287643" cy="276999"/>
+              </a:xfrm>
+              <a:prstGeom prst="rect">
+                <a:avLst/>
+              </a:prstGeom>
+              <a:noFill/>
+            </p:spPr>
+            <p:txBody>
+              <a:bodyPr wrap="square" lIns="0" tIns="0" rIns="0" bIns="0" rtlCol="0">
+                <a:spAutoFit/>
+              </a:bodyPr>
+              <a:lstStyle/>
+              <a:p>
+                <a14:m>
+                  <m:oMathPara xmlns:m="http://schemas.openxmlformats.org/officeDocument/2006/math">
+                    <m:oMathParaPr>
+                      <m:jc m:val="centerGroup"/>
+                    </m:oMathParaPr>
+                    <m:oMath xmlns:m="http://schemas.openxmlformats.org/officeDocument/2006/math">
+                      <m:sSub>
+                        <m:sSubPr>
+                          <m:ctrlPr>
+                            <a:rPr lang="en-US" i="1" smtClean="0">
+                              <a:solidFill>
+                                <a:srgbClr val="FF0000"/>
+                              </a:solidFill>
+                              <a:latin typeface="Cambria Math" panose="02040503050406030204" pitchFamily="18" charset="0"/>
+                            </a:rPr>
+                          </m:ctrlPr>
+                        </m:sSubPr>
+                        <m:e>
+                          <m:r>
+                            <a:rPr lang="en-US" b="0" i="1" smtClean="0">
+                              <a:solidFill>
+                                <a:srgbClr val="FF0000"/>
+                              </a:solidFill>
+                              <a:latin typeface="Cambria Math" panose="02040503050406030204" pitchFamily="18" charset="0"/>
+                            </a:rPr>
+                            <m:t>𝑣</m:t>
+                          </m:r>
+                        </m:e>
+                        <m:sub>
+                          <m:r>
+                            <a:rPr lang="en-US" b="0" i="1" smtClean="0">
+                              <a:solidFill>
+                                <a:srgbClr val="FF0000"/>
+                              </a:solidFill>
+                              <a:latin typeface="Cambria Math" panose="02040503050406030204" pitchFamily="18" charset="0"/>
+                            </a:rPr>
+                            <m:t>𝐴</m:t>
+                          </m:r>
+                        </m:sub>
+                      </m:sSub>
+                    </m:oMath>
+                  </m:oMathPara>
+                </a14:m>
+                <a:endParaRPr lang="en-US" dirty="0">
+                  <a:solidFill>
+                    <a:srgbClr val="FF0000"/>
+                  </a:solidFill>
+                </a:endParaRPr>
+              </a:p>
+            </p:txBody>
+          </p:sp>
+        </mc:Choice>
+        <mc:Fallback>
+          <p:sp>
+            <p:nvSpPr>
+              <p:cNvPr id="56" name="TextBox 55">
+                <a:extLst>
+                  <a:ext uri="{FF2B5EF4-FFF2-40B4-BE49-F238E27FC236}">
+                    <a16:creationId xmlns:a16="http://schemas.microsoft.com/office/drawing/2014/main" id="{8325262D-AF76-45DD-8C91-CAD9E70C7F33}"/>
+                  </a:ext>
+                </a:extLst>
+              </p:cNvPr>
+              <p:cNvSpPr txBox="1">
+                <a:spLocks noRot="1" noChangeAspect="1" noMove="1" noResize="1" noEditPoints="1" noAdjustHandles="1" noChangeArrowheads="1" noChangeShapeType="1" noTextEdit="1"/>
+              </p:cNvSpPr>
+              <p:nvPr/>
+            </p:nvSpPr>
+            <p:spPr>
+              <a:xfrm>
+                <a:off x="8534400" y="5289088"/>
+                <a:ext cx="287643" cy="276999"/>
+              </a:xfrm>
+              <a:prstGeom prst="rect">
+                <a:avLst/>
+              </a:prstGeom>
+              <a:blipFill>
+                <a:blip r:embed="rId9"/>
+                <a:stretch>
+                  <a:fillRect l="-10638" r="-8511" b="-15556"/>
+                </a:stretch>
+              </a:blipFill>
+            </p:spPr>
+            <p:txBody>
+              <a:bodyPr/>
+              <a:lstStyle/>
+              <a:p>
+                <a:r>
+                  <a:rPr lang="en-US">
+                    <a:noFill/>
+                  </a:rPr>
+                  <a:t> </a:t>
+                </a:r>
+              </a:p>
+            </p:txBody>
+          </p:sp>
+        </mc:Fallback>
+      </mc:AlternateContent>
+      <mc:AlternateContent xmlns:mc="http://schemas.openxmlformats.org/markup-compatibility/2006">
+        <mc:Choice xmlns:a14="http://schemas.microsoft.com/office/drawing/2010/main" Requires="a14">
+          <p:sp>
+            <p:nvSpPr>
+              <p:cNvPr id="60" name="TextBox 59">
+                <a:extLst>
+                  <a:ext uri="{FF2B5EF4-FFF2-40B4-BE49-F238E27FC236}">
+                    <a16:creationId xmlns:a16="http://schemas.microsoft.com/office/drawing/2014/main" id="{92A330D2-802F-4058-BB59-C87AC13F0DC8}"/>
+                  </a:ext>
+                </a:extLst>
+              </p:cNvPr>
+              <p:cNvSpPr txBox="1"/>
+              <p:nvPr/>
+            </p:nvSpPr>
+            <p:spPr>
+              <a:xfrm>
+                <a:off x="8147357" y="5289088"/>
+                <a:ext cx="283411" cy="430887"/>
+              </a:xfrm>
+              <a:prstGeom prst="rect">
+                <a:avLst/>
+              </a:prstGeom>
+              <a:noFill/>
+            </p:spPr>
+            <p:txBody>
+              <a:bodyPr wrap="none" lIns="0" tIns="0" rIns="0" bIns="0" rtlCol="0">
+                <a:spAutoFit/>
+              </a:bodyPr>
+              <a:lstStyle/>
+              <a:p>
+                <a14:m>
+                  <m:oMathPara xmlns:m="http://schemas.openxmlformats.org/officeDocument/2006/math">
+                    <m:oMathParaPr>
+                      <m:jc m:val="centerGroup"/>
+                    </m:oMathParaPr>
+                    <m:oMath xmlns:m="http://schemas.openxmlformats.org/officeDocument/2006/math">
+                      <m:r>
+                        <a:rPr lang="en-US" sz="2800" b="0" i="1" smtClean="0">
+                          <a:latin typeface="Cambria Math" panose="02040503050406030204" pitchFamily="18" charset="0"/>
+                        </a:rPr>
+                        <m:t>𝑥</m:t>
+                      </m:r>
+                    </m:oMath>
+                  </m:oMathPara>
+                </a14:m>
+                <a:endParaRPr lang="en-US" sz="2800" dirty="0"/>
+              </a:p>
+            </p:txBody>
+          </p:sp>
+        </mc:Choice>
+        <mc:Fallback>
+          <p:sp>
+            <p:nvSpPr>
+              <p:cNvPr id="60" name="TextBox 59">
+                <a:extLst>
+                  <a:ext uri="{FF2B5EF4-FFF2-40B4-BE49-F238E27FC236}">
+                    <a16:creationId xmlns:a16="http://schemas.microsoft.com/office/drawing/2014/main" id="{92A330D2-802F-4058-BB59-C87AC13F0DC8}"/>
+                  </a:ext>
+                </a:extLst>
+              </p:cNvPr>
+              <p:cNvSpPr txBox="1">
+                <a:spLocks noRot="1" noChangeAspect="1" noMove="1" noResize="1" noEditPoints="1" noAdjustHandles="1" noChangeArrowheads="1" noChangeShapeType="1" noTextEdit="1"/>
+              </p:cNvSpPr>
+              <p:nvPr/>
+            </p:nvSpPr>
+            <p:spPr>
+              <a:xfrm>
+                <a:off x="8147357" y="5289088"/>
+                <a:ext cx="283411" cy="430887"/>
+              </a:xfrm>
+              <a:prstGeom prst="rect">
+                <a:avLst/>
+              </a:prstGeom>
+              <a:blipFill>
+                <a:blip r:embed="rId10"/>
+                <a:stretch>
+                  <a:fillRect/>
+                </a:stretch>
+              </a:blipFill>
+            </p:spPr>
+            <p:txBody>
+              <a:bodyPr/>
+              <a:lstStyle/>
+              <a:p>
+                <a:r>
+                  <a:rPr lang="en-US">
+                    <a:noFill/>
+                  </a:rPr>
+                  <a:t> </a:t>
+                </a:r>
+              </a:p>
+            </p:txBody>
+          </p:sp>
+        </mc:Fallback>
+      </mc:AlternateContent>
+      <mc:AlternateContent xmlns:mc="http://schemas.openxmlformats.org/markup-compatibility/2006">
+        <mc:Choice xmlns:a14="http://schemas.microsoft.com/office/drawing/2010/main" Requires="a14">
+          <p:sp>
+            <p:nvSpPr>
+              <p:cNvPr id="61" name="TextBox 60">
+                <a:extLst>
+                  <a:ext uri="{FF2B5EF4-FFF2-40B4-BE49-F238E27FC236}">
+                    <a16:creationId xmlns:a16="http://schemas.microsoft.com/office/drawing/2014/main" id="{95B382AE-D047-4CFE-9F75-F38466E37F19}"/>
+                  </a:ext>
+                </a:extLst>
+              </p:cNvPr>
+              <p:cNvSpPr txBox="1"/>
+              <p:nvPr/>
+            </p:nvSpPr>
+            <p:spPr>
+              <a:xfrm>
+                <a:off x="7392977" y="4775598"/>
+                <a:ext cx="288284" cy="430887"/>
+              </a:xfrm>
+              <a:prstGeom prst="rect">
+                <a:avLst/>
+              </a:prstGeom>
+              <a:noFill/>
+            </p:spPr>
+            <p:txBody>
+              <a:bodyPr wrap="none" lIns="0" tIns="0" rIns="0" bIns="0" rtlCol="0">
+                <a:spAutoFit/>
+              </a:bodyPr>
+              <a:lstStyle/>
+              <a:p>
+                <a14:m>
+                  <m:oMathPara xmlns:m="http://schemas.openxmlformats.org/officeDocument/2006/math">
+                    <m:oMathParaPr>
+                      <m:jc m:val="centerGroup"/>
+                    </m:oMathParaPr>
+                    <m:oMath xmlns:m="http://schemas.openxmlformats.org/officeDocument/2006/math">
+                      <m:r>
+                        <a:rPr lang="en-US" sz="2800" b="0" i="1" smtClean="0">
+                          <a:latin typeface="Cambria Math" panose="02040503050406030204" pitchFamily="18" charset="0"/>
+                        </a:rPr>
+                        <m:t>𝑦</m:t>
+                      </m:r>
+                    </m:oMath>
+                  </m:oMathPara>
+                </a14:m>
+                <a:endParaRPr lang="en-US" sz="2800" dirty="0"/>
+              </a:p>
+            </p:txBody>
+          </p:sp>
+        </mc:Choice>
+        <mc:Fallback>
+          <p:sp>
+            <p:nvSpPr>
+              <p:cNvPr id="61" name="TextBox 60">
+                <a:extLst>
+                  <a:ext uri="{FF2B5EF4-FFF2-40B4-BE49-F238E27FC236}">
+                    <a16:creationId xmlns:a16="http://schemas.microsoft.com/office/drawing/2014/main" id="{95B382AE-D047-4CFE-9F75-F38466E37F19}"/>
+                  </a:ext>
+                </a:extLst>
+              </p:cNvPr>
+              <p:cNvSpPr txBox="1">
+                <a:spLocks noRot="1" noChangeAspect="1" noMove="1" noResize="1" noEditPoints="1" noAdjustHandles="1" noChangeArrowheads="1" noChangeShapeType="1" noTextEdit="1"/>
+              </p:cNvSpPr>
+              <p:nvPr/>
+            </p:nvSpPr>
+            <p:spPr>
+              <a:xfrm>
+                <a:off x="7392977" y="4775598"/>
+                <a:ext cx="288284" cy="430887"/>
+              </a:xfrm>
+              <a:prstGeom prst="rect">
+                <a:avLst/>
+              </a:prstGeom>
+              <a:blipFill>
+                <a:blip r:embed="rId11"/>
+                <a:stretch>
+                  <a:fillRect/>
+                </a:stretch>
+              </a:blipFill>
+            </p:spPr>
+            <p:txBody>
+              <a:bodyPr/>
+              <a:lstStyle/>
+              <a:p>
+                <a:r>
+                  <a:rPr lang="en-US">
+                    <a:noFill/>
+                  </a:rPr>
+                  <a:t> </a:t>
+                </a:r>
+              </a:p>
+            </p:txBody>
+          </p:sp>
+        </mc:Fallback>
+      </mc:AlternateContent>
+    </p:spTree>
+    <p:extLst>
+      <p:ext uri="{BB962C8B-B14F-4D97-AF65-F5344CB8AC3E}">
+        <p14:creationId xmlns:p14="http://schemas.microsoft.com/office/powerpoint/2010/main" val="1797459676"/>
       </p:ext>
     </p:extLst>
   </p:cSld>

</xml_diff>

<commit_message>
Added 1.5.20& Updated centering of 1.1.1-1.1.10
</commit_message>
<xml_diff>
--- a/volunteer/Drawings.pptx
+++ b/volunteer/Drawings.pptx
@@ -12400,6 +12400,63 @@
           <a:chExt cx="0" cy="0"/>
         </a:xfrm>
       </p:grpSpPr>
+      <p:sp>
+        <p:nvSpPr>
+          <p:cNvPr id="68" name="Oval 67">
+            <a:extLst>
+              <a:ext uri="{FF2B5EF4-FFF2-40B4-BE49-F238E27FC236}">
+                <a16:creationId xmlns:a16="http://schemas.microsoft.com/office/drawing/2014/main" id="{D36BB41C-A327-43FF-B080-8EF6DF91E368}"/>
+              </a:ext>
+            </a:extLst>
+          </p:cNvPr>
+          <p:cNvSpPr/>
+          <p:nvPr/>
+        </p:nvSpPr>
+        <p:spPr>
+          <a:xfrm>
+            <a:off x="5818080" y="2875061"/>
+            <a:ext cx="2103120" cy="2103120"/>
+          </a:xfrm>
+          <a:prstGeom prst="ellipse">
+            <a:avLst/>
+          </a:prstGeom>
+          <a:solidFill>
+            <a:schemeClr val="accent1">
+              <a:lumMod val="75000"/>
+              <a:alpha val="58000"/>
+            </a:schemeClr>
+          </a:solidFill>
+          <a:ln w="47625">
+            <a:solidFill>
+              <a:schemeClr val="tx1"/>
+            </a:solidFill>
+          </a:ln>
+        </p:spPr>
+        <p:style>
+          <a:lnRef idx="2">
+            <a:schemeClr val="accent1">
+              <a:shade val="50000"/>
+            </a:schemeClr>
+          </a:lnRef>
+          <a:fillRef idx="1">
+            <a:schemeClr val="accent1"/>
+          </a:fillRef>
+          <a:effectRef idx="0">
+            <a:schemeClr val="accent1"/>
+          </a:effectRef>
+          <a:fontRef idx="minor">
+            <a:schemeClr val="lt1"/>
+          </a:fontRef>
+        </p:style>
+        <p:txBody>
+          <a:bodyPr rtlCol="0" anchor="ctr"/>
+          <a:lstStyle/>
+          <a:p>
+            <a:pPr algn="ctr"/>
+            <a:endParaRPr lang="en-US" dirty="0"/>
+          </a:p>
+        </p:txBody>
+      </p:sp>
       <p:grpSp>
         <p:nvGrpSpPr>
           <p:cNvPr id="85" name="Group 84">
@@ -12814,8 +12871,8 @@
             </a:p>
           </p:txBody>
         </p:sp>
-        <mc:AlternateContent xmlns:mc="http://schemas.openxmlformats.org/markup-compatibility/2006">
-          <mc:Choice xmlns:a14="http://schemas.microsoft.com/office/drawing/2010/main" Requires="a14">
+        <mc:AlternateContent xmlns:mc="http://schemas.openxmlformats.org/markup-compatibility/2006" xmlns:a14="http://schemas.microsoft.com/office/drawing/2010/main">
+          <mc:Choice Requires="a14">
             <p:sp>
               <p:nvSpPr>
                 <p:cNvPr id="30" name="TextBox 29">
@@ -12884,7 +12941,7 @@
               </p:txBody>
             </p:sp>
           </mc:Choice>
-          <mc:Fallback>
+          <mc:Fallback xmlns="">
             <p:sp>
               <p:nvSpPr>
                 <p:cNvPr id="30" name="TextBox 29">
@@ -12929,8 +12986,8 @@
             </p:sp>
           </mc:Fallback>
         </mc:AlternateContent>
-        <mc:AlternateContent xmlns:mc="http://schemas.openxmlformats.org/markup-compatibility/2006">
-          <mc:Choice xmlns:a14="http://schemas.microsoft.com/office/drawing/2010/main" Requires="a14">
+        <mc:AlternateContent xmlns:mc="http://schemas.openxmlformats.org/markup-compatibility/2006" xmlns:a14="http://schemas.microsoft.com/office/drawing/2010/main">
+          <mc:Choice Requires="a14">
             <p:sp>
               <p:nvSpPr>
                 <p:cNvPr id="31" name="TextBox 30">
@@ -12999,7 +13056,7 @@
               </p:txBody>
             </p:sp>
           </mc:Choice>
-          <mc:Fallback>
+          <mc:Fallback xmlns="">
             <p:sp>
               <p:nvSpPr>
                 <p:cNvPr id="31" name="TextBox 30">
@@ -13137,8 +13194,8 @@
             </a:fontRef>
           </p:style>
         </p:cxnSp>
-        <mc:AlternateContent xmlns:mc="http://schemas.openxmlformats.org/markup-compatibility/2006">
-          <mc:Choice xmlns:a14="http://schemas.microsoft.com/office/drawing/2010/main" Requires="a14">
+        <mc:AlternateContent xmlns:mc="http://schemas.openxmlformats.org/markup-compatibility/2006" xmlns:a14="http://schemas.microsoft.com/office/drawing/2010/main">
+          <mc:Choice Requires="a14">
             <p:sp>
               <p:nvSpPr>
                 <p:cNvPr id="37" name="TextBox 36">
@@ -13188,7 +13245,7 @@
               </p:txBody>
             </p:sp>
           </mc:Choice>
-          <mc:Fallback>
+          <mc:Fallback xmlns="">
             <p:sp>
               <p:nvSpPr>
                 <p:cNvPr id="37" name="TextBox 36">
@@ -13233,8 +13290,8 @@
             </p:sp>
           </mc:Fallback>
         </mc:AlternateContent>
-        <mc:AlternateContent xmlns:mc="http://schemas.openxmlformats.org/markup-compatibility/2006">
-          <mc:Choice xmlns:a14="http://schemas.microsoft.com/office/drawing/2010/main" Requires="a14">
+        <mc:AlternateContent xmlns:mc="http://schemas.openxmlformats.org/markup-compatibility/2006" xmlns:a14="http://schemas.microsoft.com/office/drawing/2010/main">
+          <mc:Choice Requires="a14">
             <p:sp>
               <p:nvSpPr>
                 <p:cNvPr id="38" name="TextBox 37">
@@ -13284,7 +13341,7 @@
               </p:txBody>
             </p:sp>
           </mc:Choice>
-          <mc:Fallback>
+          <mc:Fallback xmlns="">
             <p:sp>
               <p:nvSpPr>
                 <p:cNvPr id="38" name="TextBox 37">
@@ -13329,8 +13386,8 @@
             </p:sp>
           </mc:Fallback>
         </mc:AlternateContent>
-        <mc:AlternateContent xmlns:mc="http://schemas.openxmlformats.org/markup-compatibility/2006">
-          <mc:Choice xmlns:a14="http://schemas.microsoft.com/office/drawing/2010/main" Requires="a14">
+        <mc:AlternateContent xmlns:mc="http://schemas.openxmlformats.org/markup-compatibility/2006" xmlns:a14="http://schemas.microsoft.com/office/drawing/2010/main">
+          <mc:Choice Requires="a14">
             <p:sp>
               <p:nvSpPr>
                 <p:cNvPr id="39" name="TextBox 38">
@@ -13405,7 +13462,7 @@
               </p:txBody>
             </p:sp>
           </mc:Choice>
-          <mc:Fallback>
+          <mc:Fallback xmlns="">
             <p:sp>
               <p:nvSpPr>
                 <p:cNvPr id="39" name="TextBox 38">
@@ -13450,8 +13507,8 @@
             </p:sp>
           </mc:Fallback>
         </mc:AlternateContent>
-        <mc:AlternateContent xmlns:mc="http://schemas.openxmlformats.org/markup-compatibility/2006">
-          <mc:Choice xmlns:a14="http://schemas.microsoft.com/office/drawing/2010/main" Requires="a14">
+        <mc:AlternateContent xmlns:mc="http://schemas.openxmlformats.org/markup-compatibility/2006" xmlns:a14="http://schemas.microsoft.com/office/drawing/2010/main">
+          <mc:Choice Requires="a14">
             <p:sp>
               <p:nvSpPr>
                 <p:cNvPr id="40" name="TextBox 39">
@@ -13526,7 +13583,7 @@
               </p:txBody>
             </p:sp>
           </mc:Choice>
-          <mc:Fallback>
+          <mc:Fallback xmlns="">
             <p:sp>
               <p:nvSpPr>
                 <p:cNvPr id="40" name="TextBox 39">
@@ -13755,8 +13812,8 @@
             </a:fontRef>
           </p:style>
         </p:cxnSp>
-        <mc:AlternateContent xmlns:mc="http://schemas.openxmlformats.org/markup-compatibility/2006">
-          <mc:Choice xmlns:a14="http://schemas.microsoft.com/office/drawing/2010/main" Requires="a14">
+        <mc:AlternateContent xmlns:mc="http://schemas.openxmlformats.org/markup-compatibility/2006" xmlns:a14="http://schemas.microsoft.com/office/drawing/2010/main">
+          <mc:Choice Requires="a14">
             <p:sp>
               <p:nvSpPr>
                 <p:cNvPr id="56" name="TextBox 55">
@@ -13838,7 +13895,7 @@
               </p:txBody>
             </p:sp>
           </mc:Choice>
-          <mc:Fallback>
+          <mc:Fallback xmlns="">
             <p:sp>
               <p:nvSpPr>
                 <p:cNvPr id="56" name="TextBox 55">
@@ -13883,8 +13940,8 @@
             </p:sp>
           </mc:Fallback>
         </mc:AlternateContent>
-        <mc:AlternateContent xmlns:mc="http://schemas.openxmlformats.org/markup-compatibility/2006">
-          <mc:Choice xmlns:a14="http://schemas.microsoft.com/office/drawing/2010/main" Requires="a14">
+        <mc:AlternateContent xmlns:mc="http://schemas.openxmlformats.org/markup-compatibility/2006" xmlns:a14="http://schemas.microsoft.com/office/drawing/2010/main">
+          <mc:Choice Requires="a14">
             <p:sp>
               <p:nvSpPr>
                 <p:cNvPr id="60" name="TextBox 59">
@@ -13934,7 +13991,7 @@
               </p:txBody>
             </p:sp>
           </mc:Choice>
-          <mc:Fallback>
+          <mc:Fallback xmlns="">
             <p:sp>
               <p:nvSpPr>
                 <p:cNvPr id="60" name="TextBox 59">
@@ -13979,8 +14036,8 @@
             </p:sp>
           </mc:Fallback>
         </mc:AlternateContent>
-        <mc:AlternateContent xmlns:mc="http://schemas.openxmlformats.org/markup-compatibility/2006">
-          <mc:Choice xmlns:a14="http://schemas.microsoft.com/office/drawing/2010/main" Requires="a14">
+        <mc:AlternateContent xmlns:mc="http://schemas.openxmlformats.org/markup-compatibility/2006" xmlns:a14="http://schemas.microsoft.com/office/drawing/2010/main">
+          <mc:Choice Requires="a14">
             <p:sp>
               <p:nvSpPr>
                 <p:cNvPr id="61" name="TextBox 60">
@@ -14030,7 +14087,7 @@
               </p:txBody>
             </p:sp>
           </mc:Choice>
-          <mc:Fallback>
+          <mc:Fallback xmlns="">
             <p:sp>
               <p:nvSpPr>
                 <p:cNvPr id="61" name="TextBox 60">
@@ -14415,8 +14472,8 @@
             </a:p>
           </p:txBody>
         </p:sp>
-        <mc:AlternateContent xmlns:mc="http://schemas.openxmlformats.org/markup-compatibility/2006">
-          <mc:Choice xmlns:a14="http://schemas.microsoft.com/office/drawing/2010/main" Requires="a14">
+        <mc:AlternateContent xmlns:mc="http://schemas.openxmlformats.org/markup-compatibility/2006" xmlns:a14="http://schemas.microsoft.com/office/drawing/2010/main">
+          <mc:Choice Requires="a14">
             <p:sp>
               <p:nvSpPr>
                 <p:cNvPr id="46" name="TextBox 45">
@@ -14474,7 +14531,7 @@
               </p:txBody>
             </p:sp>
           </mc:Choice>
-          <mc:Fallback>
+          <mc:Fallback xmlns="">
             <p:sp>
               <p:nvSpPr>
                 <p:cNvPr id="46" name="TextBox 45">
@@ -14571,8 +14628,8 @@
             </a:p>
           </p:txBody>
         </p:sp>
-        <mc:AlternateContent xmlns:mc="http://schemas.openxmlformats.org/markup-compatibility/2006">
-          <mc:Choice xmlns:a14="http://schemas.microsoft.com/office/drawing/2010/main" Requires="a14">
+        <mc:AlternateContent xmlns:mc="http://schemas.openxmlformats.org/markup-compatibility/2006" xmlns:a14="http://schemas.microsoft.com/office/drawing/2010/main">
+          <mc:Choice Requires="a14">
             <p:sp>
               <p:nvSpPr>
                 <p:cNvPr id="50" name="TextBox 49">
@@ -14630,7 +14687,7 @@
               </p:txBody>
             </p:sp>
           </mc:Choice>
-          <mc:Fallback>
+          <mc:Fallback xmlns="">
             <p:sp>
               <p:nvSpPr>
                 <p:cNvPr id="50" name="TextBox 49">
@@ -14675,8 +14732,8 @@
             </p:sp>
           </mc:Fallback>
         </mc:AlternateContent>
-        <mc:AlternateContent xmlns:mc="http://schemas.openxmlformats.org/markup-compatibility/2006">
-          <mc:Choice xmlns:a14="http://schemas.microsoft.com/office/drawing/2010/main" Requires="a14">
+        <mc:AlternateContent xmlns:mc="http://schemas.openxmlformats.org/markup-compatibility/2006" xmlns:a14="http://schemas.microsoft.com/office/drawing/2010/main">
+          <mc:Choice Requires="a14">
             <p:sp>
               <p:nvSpPr>
                 <p:cNvPr id="16" name="TextBox 15">
@@ -14726,7 +14783,7 @@
               </p:txBody>
             </p:sp>
           </mc:Choice>
-          <mc:Fallback>
+          <mc:Fallback xmlns="">
             <p:sp>
               <p:nvSpPr>
                 <p:cNvPr id="16" name="TextBox 15">
@@ -14771,8 +14828,8 @@
             </p:sp>
           </mc:Fallback>
         </mc:AlternateContent>
-        <mc:AlternateContent xmlns:mc="http://schemas.openxmlformats.org/markup-compatibility/2006">
-          <mc:Choice xmlns:a14="http://schemas.microsoft.com/office/drawing/2010/main" Requires="a14">
+        <mc:AlternateContent xmlns:mc="http://schemas.openxmlformats.org/markup-compatibility/2006" xmlns:a14="http://schemas.microsoft.com/office/drawing/2010/main">
+          <mc:Choice Requires="a14">
             <p:sp>
               <p:nvSpPr>
                 <p:cNvPr id="51" name="TextBox 50">
@@ -14822,7 +14879,7 @@
               </p:txBody>
             </p:sp>
           </mc:Choice>
-          <mc:Fallback>
+          <mc:Fallback xmlns="">
             <p:sp>
               <p:nvSpPr>
                 <p:cNvPr id="51" name="TextBox 50">
@@ -14867,8 +14924,8 @@
             </p:sp>
           </mc:Fallback>
         </mc:AlternateContent>
-        <mc:AlternateContent xmlns:mc="http://schemas.openxmlformats.org/markup-compatibility/2006">
-          <mc:Choice xmlns:a14="http://schemas.microsoft.com/office/drawing/2010/main" Requires="a14">
+        <mc:AlternateContent xmlns:mc="http://schemas.openxmlformats.org/markup-compatibility/2006" xmlns:a14="http://schemas.microsoft.com/office/drawing/2010/main">
+          <mc:Choice Requires="a14">
             <p:sp>
               <p:nvSpPr>
                 <p:cNvPr id="52" name="TextBox 51">
@@ -14918,7 +14975,7 @@
               </p:txBody>
             </p:sp>
           </mc:Choice>
-          <mc:Fallback>
+          <mc:Fallback xmlns="">
             <p:sp>
               <p:nvSpPr>
                 <p:cNvPr id="52" name="TextBox 51">
@@ -14963,8 +15020,8 @@
             </p:sp>
           </mc:Fallback>
         </mc:AlternateContent>
-        <mc:AlternateContent xmlns:mc="http://schemas.openxmlformats.org/markup-compatibility/2006">
-          <mc:Choice xmlns:a14="http://schemas.microsoft.com/office/drawing/2010/main" Requires="a14">
+        <mc:AlternateContent xmlns:mc="http://schemas.openxmlformats.org/markup-compatibility/2006" xmlns:a14="http://schemas.microsoft.com/office/drawing/2010/main">
+          <mc:Choice Requires="a14">
             <p:sp>
               <p:nvSpPr>
                 <p:cNvPr id="53" name="TextBox 52">
@@ -15014,7 +15071,7 @@
               </p:txBody>
             </p:sp>
           </mc:Choice>
-          <mc:Fallback>
+          <mc:Fallback xmlns="">
             <p:sp>
               <p:nvSpPr>
                 <p:cNvPr id="53" name="TextBox 52">
@@ -15059,8 +15116,8 @@
             </p:sp>
           </mc:Fallback>
         </mc:AlternateContent>
-        <mc:AlternateContent xmlns:mc="http://schemas.openxmlformats.org/markup-compatibility/2006">
-          <mc:Choice xmlns:a14="http://schemas.microsoft.com/office/drawing/2010/main" Requires="a14">
+        <mc:AlternateContent xmlns:mc="http://schemas.openxmlformats.org/markup-compatibility/2006" xmlns:a14="http://schemas.microsoft.com/office/drawing/2010/main">
+          <mc:Choice Requires="a14">
             <p:sp>
               <p:nvSpPr>
                 <p:cNvPr id="57" name="TextBox 56">
@@ -15110,7 +15167,7 @@
               </p:txBody>
             </p:sp>
           </mc:Choice>
-          <mc:Fallback>
+          <mc:Fallback xmlns="">
             <p:sp>
               <p:nvSpPr>
                 <p:cNvPr id="57" name="TextBox 56">
@@ -15155,8 +15212,8 @@
             </p:sp>
           </mc:Fallback>
         </mc:AlternateContent>
-        <mc:AlternateContent xmlns:mc="http://schemas.openxmlformats.org/markup-compatibility/2006">
-          <mc:Choice xmlns:a14="http://schemas.microsoft.com/office/drawing/2010/main" Requires="a14">
+        <mc:AlternateContent xmlns:mc="http://schemas.openxmlformats.org/markup-compatibility/2006" xmlns:a14="http://schemas.microsoft.com/office/drawing/2010/main">
+          <mc:Choice Requires="a14">
             <p:sp>
               <p:nvSpPr>
                 <p:cNvPr id="58" name="TextBox 57">
@@ -15206,7 +15263,7 @@
               </p:txBody>
             </p:sp>
           </mc:Choice>
-          <mc:Fallback>
+          <mc:Fallback xmlns="">
             <p:sp>
               <p:nvSpPr>
                 <p:cNvPr id="58" name="TextBox 57">
@@ -15836,8 +15893,8 @@
             </a:p>
           </p:txBody>
         </p:sp>
-        <mc:AlternateContent xmlns:mc="http://schemas.openxmlformats.org/markup-compatibility/2006">
-          <mc:Choice xmlns:a14="http://schemas.microsoft.com/office/drawing/2010/main" Requires="a14">
+        <mc:AlternateContent xmlns:mc="http://schemas.openxmlformats.org/markup-compatibility/2006" xmlns:a14="http://schemas.microsoft.com/office/drawing/2010/main">
+          <mc:Choice Requires="a14">
             <p:sp>
               <p:nvSpPr>
                 <p:cNvPr id="75" name="TextBox 74">
@@ -15888,7 +15945,7 @@
               </p:txBody>
             </p:sp>
           </mc:Choice>
-          <mc:Fallback>
+          <mc:Fallback xmlns="">
             <p:sp>
               <p:nvSpPr>
                 <p:cNvPr id="75" name="TextBox 74">
@@ -15985,8 +16042,8 @@
             </a:p>
           </p:txBody>
         </p:sp>
-        <mc:AlternateContent xmlns:mc="http://schemas.openxmlformats.org/markup-compatibility/2006">
-          <mc:Choice xmlns:a14="http://schemas.microsoft.com/office/drawing/2010/main" Requires="a14">
+        <mc:AlternateContent xmlns:mc="http://schemas.openxmlformats.org/markup-compatibility/2006" xmlns:a14="http://schemas.microsoft.com/office/drawing/2010/main">
+          <mc:Choice Requires="a14">
             <p:sp>
               <p:nvSpPr>
                 <p:cNvPr id="77" name="TextBox 76">
@@ -16037,7 +16094,7 @@
               </p:txBody>
             </p:sp>
           </mc:Choice>
-          <mc:Fallback>
+          <mc:Fallback xmlns="">
             <p:sp>
               <p:nvSpPr>
                 <p:cNvPr id="77" name="TextBox 76">
@@ -16082,8 +16139,8 @@
             </p:sp>
           </mc:Fallback>
         </mc:AlternateContent>
-        <mc:AlternateContent xmlns:mc="http://schemas.openxmlformats.org/markup-compatibility/2006">
-          <mc:Choice xmlns:a14="http://schemas.microsoft.com/office/drawing/2010/main" Requires="a14">
+        <mc:AlternateContent xmlns:mc="http://schemas.openxmlformats.org/markup-compatibility/2006" xmlns:a14="http://schemas.microsoft.com/office/drawing/2010/main">
+          <mc:Choice Requires="a14">
             <p:sp>
               <p:nvSpPr>
                 <p:cNvPr id="78" name="TextBox 77">
@@ -16133,7 +16190,7 @@
               </p:txBody>
             </p:sp>
           </mc:Choice>
-          <mc:Fallback>
+          <mc:Fallback xmlns="">
             <p:sp>
               <p:nvSpPr>
                 <p:cNvPr id="78" name="TextBox 77">
@@ -16178,8 +16235,8 @@
             </p:sp>
           </mc:Fallback>
         </mc:AlternateContent>
-        <mc:AlternateContent xmlns:mc="http://schemas.openxmlformats.org/markup-compatibility/2006">
-          <mc:Choice xmlns:a14="http://schemas.microsoft.com/office/drawing/2010/main" Requires="a14">
+        <mc:AlternateContent xmlns:mc="http://schemas.openxmlformats.org/markup-compatibility/2006" xmlns:a14="http://schemas.microsoft.com/office/drawing/2010/main">
+          <mc:Choice Requires="a14">
             <p:sp>
               <p:nvSpPr>
                 <p:cNvPr id="79" name="TextBox 78">
@@ -16229,7 +16286,7 @@
               </p:txBody>
             </p:sp>
           </mc:Choice>
-          <mc:Fallback>
+          <mc:Fallback xmlns="">
             <p:sp>
               <p:nvSpPr>
                 <p:cNvPr id="79" name="TextBox 78">
@@ -16274,8 +16331,8 @@
             </p:sp>
           </mc:Fallback>
         </mc:AlternateContent>
-        <mc:AlternateContent xmlns:mc="http://schemas.openxmlformats.org/markup-compatibility/2006">
-          <mc:Choice xmlns:a14="http://schemas.microsoft.com/office/drawing/2010/main" Requires="a14">
+        <mc:AlternateContent xmlns:mc="http://schemas.openxmlformats.org/markup-compatibility/2006" xmlns:a14="http://schemas.microsoft.com/office/drawing/2010/main">
+          <mc:Choice Requires="a14">
             <p:sp>
               <p:nvSpPr>
                 <p:cNvPr id="80" name="TextBox 79">
@@ -16325,7 +16382,7 @@
               </p:txBody>
             </p:sp>
           </mc:Choice>
-          <mc:Fallback>
+          <mc:Fallback xmlns="">
             <p:sp>
               <p:nvSpPr>
                 <p:cNvPr id="80" name="TextBox 79">
@@ -16370,8 +16427,8 @@
             </p:sp>
           </mc:Fallback>
         </mc:AlternateContent>
-        <mc:AlternateContent xmlns:mc="http://schemas.openxmlformats.org/markup-compatibility/2006">
-          <mc:Choice xmlns:a14="http://schemas.microsoft.com/office/drawing/2010/main" Requires="a14">
+        <mc:AlternateContent xmlns:mc="http://schemas.openxmlformats.org/markup-compatibility/2006" xmlns:a14="http://schemas.microsoft.com/office/drawing/2010/main">
+          <mc:Choice Requires="a14">
             <p:sp>
               <p:nvSpPr>
                 <p:cNvPr id="81" name="TextBox 80">
@@ -16421,7 +16478,7 @@
               </p:txBody>
             </p:sp>
           </mc:Choice>
-          <mc:Fallback>
+          <mc:Fallback xmlns="">
             <p:sp>
               <p:nvSpPr>
                 <p:cNvPr id="81" name="TextBox 80">
@@ -16466,8 +16523,8 @@
             </p:sp>
           </mc:Fallback>
         </mc:AlternateContent>
-        <mc:AlternateContent xmlns:mc="http://schemas.openxmlformats.org/markup-compatibility/2006">
-          <mc:Choice xmlns:a14="http://schemas.microsoft.com/office/drawing/2010/main" Requires="a14">
+        <mc:AlternateContent xmlns:mc="http://schemas.openxmlformats.org/markup-compatibility/2006" xmlns:a14="http://schemas.microsoft.com/office/drawing/2010/main">
+          <mc:Choice Requires="a14">
             <p:sp>
               <p:nvSpPr>
                 <p:cNvPr id="86" name="TextBox 85">
@@ -16539,7 +16596,7 @@
               </p:txBody>
             </p:sp>
           </mc:Choice>
-          <mc:Fallback>
+          <mc:Fallback xmlns="">
             <p:sp>
               <p:nvSpPr>
                 <p:cNvPr id="86" name="TextBox 85">
@@ -16584,8 +16641,8 @@
             </p:sp>
           </mc:Fallback>
         </mc:AlternateContent>
-        <mc:AlternateContent xmlns:mc="http://schemas.openxmlformats.org/markup-compatibility/2006">
-          <mc:Choice xmlns:a14="http://schemas.microsoft.com/office/drawing/2010/main" Requires="a14">
+        <mc:AlternateContent xmlns:mc="http://schemas.openxmlformats.org/markup-compatibility/2006" xmlns:a14="http://schemas.microsoft.com/office/drawing/2010/main">
+          <mc:Choice Requires="a14">
             <p:sp>
               <p:nvSpPr>
                 <p:cNvPr id="87" name="TextBox 86">
@@ -16657,7 +16714,7 @@
               </p:txBody>
             </p:sp>
           </mc:Choice>
-          <mc:Fallback>
+          <mc:Fallback xmlns="">
             <p:sp>
               <p:nvSpPr>
                 <p:cNvPr id="87" name="TextBox 86">
@@ -16703,6 +16760,1096 @@
           </mc:Fallback>
         </mc:AlternateContent>
       </p:grpSp>
+      <p:sp>
+        <p:nvSpPr>
+          <p:cNvPr id="2" name="Oval 1">
+            <a:extLst>
+              <a:ext uri="{FF2B5EF4-FFF2-40B4-BE49-F238E27FC236}">
+                <a16:creationId xmlns:a16="http://schemas.microsoft.com/office/drawing/2014/main" id="{2201B416-E303-40F3-A1CC-94187E924450}"/>
+              </a:ext>
+            </a:extLst>
+          </p:cNvPr>
+          <p:cNvSpPr/>
+          <p:nvPr/>
+        </p:nvSpPr>
+        <p:spPr>
+          <a:xfrm>
+            <a:off x="6396357" y="3436400"/>
+            <a:ext cx="914400" cy="914400"/>
+          </a:xfrm>
+          <a:prstGeom prst="ellipse">
+            <a:avLst/>
+          </a:prstGeom>
+          <a:solidFill>
+            <a:schemeClr val="bg1">
+              <a:lumMod val="95000"/>
+            </a:schemeClr>
+          </a:solidFill>
+          <a:ln w="25400">
+            <a:solidFill>
+              <a:schemeClr val="tx1"/>
+            </a:solidFill>
+          </a:ln>
+        </p:spPr>
+        <p:style>
+          <a:lnRef idx="2">
+            <a:schemeClr val="accent1">
+              <a:shade val="50000"/>
+            </a:schemeClr>
+          </a:lnRef>
+          <a:fillRef idx="1">
+            <a:schemeClr val="accent1"/>
+          </a:fillRef>
+          <a:effectRef idx="0">
+            <a:schemeClr val="accent1"/>
+          </a:effectRef>
+          <a:fontRef idx="minor">
+            <a:schemeClr val="lt1"/>
+          </a:fontRef>
+        </p:style>
+        <p:txBody>
+          <a:bodyPr rtlCol="0" anchor="ctr"/>
+          <a:lstStyle/>
+          <a:p>
+            <a:pPr algn="ctr"/>
+            <a:endParaRPr lang="en-US"/>
+          </a:p>
+        </p:txBody>
+      </p:sp>
+      <p:cxnSp>
+        <p:nvCxnSpPr>
+          <p:cNvPr id="69" name="Straight Arrow Connector 68">
+            <a:extLst>
+              <a:ext uri="{FF2B5EF4-FFF2-40B4-BE49-F238E27FC236}">
+                <a16:creationId xmlns:a16="http://schemas.microsoft.com/office/drawing/2014/main" id="{DC146B36-BFAC-46A6-8819-0B9BF9A19278}"/>
+              </a:ext>
+            </a:extLst>
+          </p:cNvPr>
+          <p:cNvCxnSpPr>
+            <a:cxnSpLocks/>
+          </p:cNvCxnSpPr>
+          <p:nvPr/>
+        </p:nvCxnSpPr>
+        <p:spPr>
+          <a:xfrm flipH="1">
+            <a:off x="6879427" y="3926621"/>
+            <a:ext cx="446158" cy="0"/>
+          </a:xfrm>
+          <a:prstGeom prst="straightConnector1">
+            <a:avLst/>
+          </a:prstGeom>
+          <a:ln w="25400">
+            <a:solidFill>
+              <a:schemeClr val="tx1"/>
+            </a:solidFill>
+            <a:headEnd type="stealth" w="lg" len="lg"/>
+            <a:tailEnd type="stealth" w="lg" len="lg"/>
+          </a:ln>
+        </p:spPr>
+        <p:style>
+          <a:lnRef idx="1">
+            <a:schemeClr val="accent1"/>
+          </a:lnRef>
+          <a:fillRef idx="0">
+            <a:schemeClr val="accent1"/>
+          </a:fillRef>
+          <a:effectRef idx="0">
+            <a:schemeClr val="accent1"/>
+          </a:effectRef>
+          <a:fontRef idx="minor">
+            <a:schemeClr val="tx1"/>
+          </a:fontRef>
+        </p:style>
+      </p:cxnSp>
+      <p:cxnSp>
+        <p:nvCxnSpPr>
+          <p:cNvPr id="70" name="Straight Connector 69">
+            <a:extLst>
+              <a:ext uri="{FF2B5EF4-FFF2-40B4-BE49-F238E27FC236}">
+                <a16:creationId xmlns:a16="http://schemas.microsoft.com/office/drawing/2014/main" id="{AE0DD116-582D-4E65-9398-9847F6D2AE9F}"/>
+              </a:ext>
+            </a:extLst>
+          </p:cNvPr>
+          <p:cNvCxnSpPr>
+            <a:cxnSpLocks/>
+            <a:endCxn id="2" idx="4"/>
+          </p:cNvCxnSpPr>
+          <p:nvPr/>
+        </p:nvCxnSpPr>
+        <p:spPr>
+          <a:xfrm flipH="1">
+            <a:off x="6853557" y="2375754"/>
+            <a:ext cx="25870" cy="1975046"/>
+          </a:xfrm>
+          <a:prstGeom prst="line">
+            <a:avLst/>
+          </a:prstGeom>
+          <a:ln w="31750">
+            <a:solidFill>
+              <a:schemeClr val="tx1"/>
+            </a:solidFill>
+          </a:ln>
+        </p:spPr>
+        <p:style>
+          <a:lnRef idx="1">
+            <a:schemeClr val="accent1"/>
+          </a:lnRef>
+          <a:fillRef idx="0">
+            <a:schemeClr val="accent1"/>
+          </a:fillRef>
+          <a:effectRef idx="0">
+            <a:schemeClr val="accent1"/>
+          </a:effectRef>
+          <a:fontRef idx="minor">
+            <a:schemeClr val="tx1"/>
+          </a:fontRef>
+        </p:style>
+      </p:cxnSp>
+      <p:cxnSp>
+        <p:nvCxnSpPr>
+          <p:cNvPr id="82" name="Straight Connector 81">
+            <a:extLst>
+              <a:ext uri="{FF2B5EF4-FFF2-40B4-BE49-F238E27FC236}">
+                <a16:creationId xmlns:a16="http://schemas.microsoft.com/office/drawing/2014/main" id="{22746A1C-9805-4B4D-B58F-DB4F61E7911D}"/>
+              </a:ext>
+            </a:extLst>
+          </p:cNvPr>
+          <p:cNvCxnSpPr>
+            <a:cxnSpLocks/>
+          </p:cNvCxnSpPr>
+          <p:nvPr/>
+        </p:nvCxnSpPr>
+        <p:spPr>
+          <a:xfrm>
+            <a:off x="7964066" y="2375754"/>
+            <a:ext cx="0" cy="1617157"/>
+          </a:xfrm>
+          <a:prstGeom prst="line">
+            <a:avLst/>
+          </a:prstGeom>
+          <a:ln w="31750">
+            <a:solidFill>
+              <a:schemeClr val="tx1"/>
+            </a:solidFill>
+          </a:ln>
+        </p:spPr>
+        <p:style>
+          <a:lnRef idx="1">
+            <a:schemeClr val="accent1"/>
+          </a:lnRef>
+          <a:fillRef idx="0">
+            <a:schemeClr val="accent1"/>
+          </a:fillRef>
+          <a:effectRef idx="0">
+            <a:schemeClr val="accent1"/>
+          </a:effectRef>
+          <a:fontRef idx="minor">
+            <a:schemeClr val="tx1"/>
+          </a:fontRef>
+        </p:style>
+      </p:cxnSp>
+      <p:cxnSp>
+        <p:nvCxnSpPr>
+          <p:cNvPr id="88" name="Straight Arrow Connector 87">
+            <a:extLst>
+              <a:ext uri="{FF2B5EF4-FFF2-40B4-BE49-F238E27FC236}">
+                <a16:creationId xmlns:a16="http://schemas.microsoft.com/office/drawing/2014/main" id="{4F53B432-5CFD-46F4-B2A5-8F09CF9A4418}"/>
+              </a:ext>
+            </a:extLst>
+          </p:cNvPr>
+          <p:cNvCxnSpPr>
+            <a:cxnSpLocks/>
+          </p:cNvCxnSpPr>
+          <p:nvPr/>
+        </p:nvCxnSpPr>
+        <p:spPr>
+          <a:xfrm flipH="1">
+            <a:off x="6882483" y="2602350"/>
+            <a:ext cx="1081583" cy="0"/>
+          </a:xfrm>
+          <a:prstGeom prst="straightConnector1">
+            <a:avLst/>
+          </a:prstGeom>
+          <a:ln w="25400">
+            <a:solidFill>
+              <a:schemeClr val="tx1"/>
+            </a:solidFill>
+            <a:headEnd type="stealth" w="lg" len="lg"/>
+            <a:tailEnd type="stealth" w="lg" len="lg"/>
+          </a:ln>
+        </p:spPr>
+        <p:style>
+          <a:lnRef idx="1">
+            <a:schemeClr val="accent1"/>
+          </a:lnRef>
+          <a:fillRef idx="0">
+            <a:schemeClr val="accent1"/>
+          </a:fillRef>
+          <a:effectRef idx="0">
+            <a:schemeClr val="accent1"/>
+          </a:effectRef>
+          <a:fontRef idx="minor">
+            <a:schemeClr val="tx1"/>
+          </a:fontRef>
+        </p:style>
+      </p:cxnSp>
+      <mc:AlternateContent xmlns:mc="http://schemas.openxmlformats.org/markup-compatibility/2006">
+        <mc:Choice xmlns:a14="http://schemas.microsoft.com/office/drawing/2010/main" Requires="a14">
+          <p:sp>
+            <p:nvSpPr>
+              <p:cNvPr id="14" name="TextBox 13">
+                <a:extLst>
+                  <a:ext uri="{FF2B5EF4-FFF2-40B4-BE49-F238E27FC236}">
+                    <a16:creationId xmlns:a16="http://schemas.microsoft.com/office/drawing/2014/main" id="{F987CCB6-4AF3-4104-B720-4CFE4310A76F}"/>
+                  </a:ext>
+                </a:extLst>
+              </p:cNvPr>
+              <p:cNvSpPr txBox="1"/>
+              <p:nvPr/>
+            </p:nvSpPr>
+            <p:spPr>
+              <a:xfrm>
+                <a:off x="7371987" y="2602350"/>
+                <a:ext cx="321498" cy="430887"/>
+              </a:xfrm>
+              <a:prstGeom prst="rect">
+                <a:avLst/>
+              </a:prstGeom>
+              <a:noFill/>
+            </p:spPr>
+            <p:txBody>
+              <a:bodyPr wrap="none" lIns="0" tIns="0" rIns="0" bIns="0" rtlCol="0">
+                <a:spAutoFit/>
+              </a:bodyPr>
+              <a:lstStyle/>
+              <a:p>
+                <a14:m>
+                  <m:oMathPara xmlns:m="http://schemas.openxmlformats.org/officeDocument/2006/math">
+                    <m:oMathParaPr>
+                      <m:jc m:val="centerGroup"/>
+                    </m:oMathParaPr>
+                    <m:oMath xmlns:m="http://schemas.openxmlformats.org/officeDocument/2006/math">
+                      <m:r>
+                        <a:rPr lang="en-US" sz="2800" b="0" i="1" smtClean="0">
+                          <a:latin typeface="Cambria Math" panose="02040503050406030204" pitchFamily="18" charset="0"/>
+                        </a:rPr>
+                        <m:t>𝑅</m:t>
+                      </m:r>
+                    </m:oMath>
+                  </m:oMathPara>
+                </a14:m>
+                <a:endParaRPr lang="en-US" sz="2800" dirty="0"/>
+              </a:p>
+            </p:txBody>
+          </p:sp>
+        </mc:Choice>
+        <mc:Fallback>
+          <p:sp>
+            <p:nvSpPr>
+              <p:cNvPr id="14" name="TextBox 13">
+                <a:extLst>
+                  <a:ext uri="{FF2B5EF4-FFF2-40B4-BE49-F238E27FC236}">
+                    <a16:creationId xmlns:a16="http://schemas.microsoft.com/office/drawing/2014/main" id="{F987CCB6-4AF3-4104-B720-4CFE4310A76F}"/>
+                  </a:ext>
+                </a:extLst>
+              </p:cNvPr>
+              <p:cNvSpPr txBox="1">
+                <a:spLocks noRot="1" noChangeAspect="1" noMove="1" noResize="1" noEditPoints="1" noAdjustHandles="1" noChangeArrowheads="1" noChangeShapeType="1" noTextEdit="1"/>
+              </p:cNvSpPr>
+              <p:nvPr/>
+            </p:nvSpPr>
+            <p:spPr>
+              <a:xfrm>
+                <a:off x="7371987" y="2602350"/>
+                <a:ext cx="321498" cy="430887"/>
+              </a:xfrm>
+              <a:prstGeom prst="rect">
+                <a:avLst/>
+              </a:prstGeom>
+              <a:blipFill>
+                <a:blip r:embed="rId28"/>
+                <a:stretch>
+                  <a:fillRect/>
+                </a:stretch>
+              </a:blipFill>
+            </p:spPr>
+            <p:txBody>
+              <a:bodyPr/>
+              <a:lstStyle/>
+              <a:p>
+                <a:r>
+                  <a:rPr lang="en-US">
+                    <a:noFill/>
+                  </a:rPr>
+                  <a:t> </a:t>
+                </a:r>
+              </a:p>
+            </p:txBody>
+          </p:sp>
+        </mc:Fallback>
+      </mc:AlternateContent>
+      <mc:AlternateContent xmlns:mc="http://schemas.openxmlformats.org/markup-compatibility/2006">
+        <mc:Choice xmlns:a14="http://schemas.microsoft.com/office/drawing/2010/main" Requires="a14">
+          <p:sp>
+            <p:nvSpPr>
+              <p:cNvPr id="89" name="TextBox 88">
+                <a:extLst>
+                  <a:ext uri="{FF2B5EF4-FFF2-40B4-BE49-F238E27FC236}">
+                    <a16:creationId xmlns:a16="http://schemas.microsoft.com/office/drawing/2014/main" id="{B3288966-FDAB-4ABD-9308-C7D332C2287D}"/>
+                  </a:ext>
+                </a:extLst>
+              </p:cNvPr>
+              <p:cNvSpPr txBox="1"/>
+              <p:nvPr/>
+            </p:nvSpPr>
+            <p:spPr>
+              <a:xfrm>
+                <a:off x="6990381" y="3535312"/>
+                <a:ext cx="261161" cy="430887"/>
+              </a:xfrm>
+              <a:prstGeom prst="rect">
+                <a:avLst/>
+              </a:prstGeom>
+              <a:noFill/>
+            </p:spPr>
+            <p:txBody>
+              <a:bodyPr wrap="none" lIns="0" tIns="0" rIns="0" bIns="0" rtlCol="0">
+                <a:spAutoFit/>
+              </a:bodyPr>
+              <a:lstStyle/>
+              <a:p>
+                <a14:m>
+                  <m:oMathPara xmlns:m="http://schemas.openxmlformats.org/officeDocument/2006/math">
+                    <m:oMathParaPr>
+                      <m:jc m:val="centerGroup"/>
+                    </m:oMathParaPr>
+                    <m:oMath xmlns:m="http://schemas.openxmlformats.org/officeDocument/2006/math">
+                      <m:r>
+                        <a:rPr lang="en-US" sz="2800" b="0" i="1" smtClean="0">
+                          <a:latin typeface="Cambria Math" panose="02040503050406030204" pitchFamily="18" charset="0"/>
+                        </a:rPr>
+                        <m:t>𝑟</m:t>
+                      </m:r>
+                    </m:oMath>
+                  </m:oMathPara>
+                </a14:m>
+                <a:endParaRPr lang="en-US" sz="2800" dirty="0"/>
+              </a:p>
+            </p:txBody>
+          </p:sp>
+        </mc:Choice>
+        <mc:Fallback>
+          <p:sp>
+            <p:nvSpPr>
+              <p:cNvPr id="89" name="TextBox 88">
+                <a:extLst>
+                  <a:ext uri="{FF2B5EF4-FFF2-40B4-BE49-F238E27FC236}">
+                    <a16:creationId xmlns:a16="http://schemas.microsoft.com/office/drawing/2014/main" id="{B3288966-FDAB-4ABD-9308-C7D332C2287D}"/>
+                  </a:ext>
+                </a:extLst>
+              </p:cNvPr>
+              <p:cNvSpPr txBox="1">
+                <a:spLocks noRot="1" noChangeAspect="1" noMove="1" noResize="1" noEditPoints="1" noAdjustHandles="1" noChangeArrowheads="1" noChangeShapeType="1" noTextEdit="1"/>
+              </p:cNvSpPr>
+              <p:nvPr/>
+            </p:nvSpPr>
+            <p:spPr>
+              <a:xfrm>
+                <a:off x="6990381" y="3535312"/>
+                <a:ext cx="261161" cy="430887"/>
+              </a:xfrm>
+              <a:prstGeom prst="rect">
+                <a:avLst/>
+              </a:prstGeom>
+              <a:blipFill>
+                <a:blip r:embed="rId29"/>
+                <a:stretch>
+                  <a:fillRect/>
+                </a:stretch>
+              </a:blipFill>
+            </p:spPr>
+            <p:txBody>
+              <a:bodyPr/>
+              <a:lstStyle/>
+              <a:p>
+                <a:r>
+                  <a:rPr lang="en-US">
+                    <a:noFill/>
+                  </a:rPr>
+                  <a:t> </a:t>
+                </a:r>
+              </a:p>
+            </p:txBody>
+          </p:sp>
+        </mc:Fallback>
+      </mc:AlternateContent>
+      <p:cxnSp>
+        <p:nvCxnSpPr>
+          <p:cNvPr id="91" name="Straight Connector 90">
+            <a:extLst>
+              <a:ext uri="{FF2B5EF4-FFF2-40B4-BE49-F238E27FC236}">
+                <a16:creationId xmlns:a16="http://schemas.microsoft.com/office/drawing/2014/main" id="{91E2EB83-DF9E-4EF1-B5EE-9680EFCAD318}"/>
+              </a:ext>
+            </a:extLst>
+          </p:cNvPr>
+          <p:cNvCxnSpPr>
+            <a:cxnSpLocks/>
+          </p:cNvCxnSpPr>
+          <p:nvPr/>
+        </p:nvCxnSpPr>
+        <p:spPr>
+          <a:xfrm>
+            <a:off x="6396357" y="3921375"/>
+            <a:ext cx="929228" cy="5246"/>
+          </a:xfrm>
+          <a:prstGeom prst="line">
+            <a:avLst/>
+          </a:prstGeom>
+          <a:ln w="12700">
+            <a:solidFill>
+              <a:schemeClr val="tx1"/>
+            </a:solidFill>
+          </a:ln>
+        </p:spPr>
+        <p:style>
+          <a:lnRef idx="1">
+            <a:schemeClr val="accent1"/>
+          </a:lnRef>
+          <a:fillRef idx="0">
+            <a:schemeClr val="accent1"/>
+          </a:fillRef>
+          <a:effectRef idx="0">
+            <a:schemeClr val="accent1"/>
+          </a:effectRef>
+          <a:fontRef idx="minor">
+            <a:schemeClr val="tx1"/>
+          </a:fontRef>
+        </p:style>
+      </p:cxnSp>
+      <p:sp>
+        <p:nvSpPr>
+          <p:cNvPr id="92" name="Oval 91">
+            <a:extLst>
+              <a:ext uri="{FF2B5EF4-FFF2-40B4-BE49-F238E27FC236}">
+                <a16:creationId xmlns:a16="http://schemas.microsoft.com/office/drawing/2014/main" id="{826BD8D1-E526-413E-850B-C91C4143E77A}"/>
+              </a:ext>
+            </a:extLst>
+          </p:cNvPr>
+          <p:cNvSpPr/>
+          <p:nvPr/>
+        </p:nvSpPr>
+        <p:spPr>
+          <a:xfrm>
+            <a:off x="6350637" y="3383807"/>
+            <a:ext cx="1005840" cy="1005840"/>
+          </a:xfrm>
+          <a:prstGeom prst="ellipse">
+            <a:avLst/>
+          </a:prstGeom>
+          <a:noFill/>
+          <a:ln w="3175">
+            <a:solidFill>
+              <a:schemeClr val="tx1"/>
+            </a:solidFill>
+          </a:ln>
+        </p:spPr>
+        <p:style>
+          <a:lnRef idx="2">
+            <a:schemeClr val="accent1">
+              <a:shade val="50000"/>
+            </a:schemeClr>
+          </a:lnRef>
+          <a:fillRef idx="1">
+            <a:schemeClr val="accent1"/>
+          </a:fillRef>
+          <a:effectRef idx="0">
+            <a:schemeClr val="accent1"/>
+          </a:effectRef>
+          <a:fontRef idx="minor">
+            <a:schemeClr val="lt1"/>
+          </a:fontRef>
+        </p:style>
+        <p:txBody>
+          <a:bodyPr rtlCol="0" anchor="ctr"/>
+          <a:lstStyle/>
+          <a:p>
+            <a:pPr algn="ctr"/>
+            <a:endParaRPr lang="en-US" dirty="0"/>
+          </a:p>
+        </p:txBody>
+      </p:sp>
+      <p:sp>
+        <p:nvSpPr>
+          <p:cNvPr id="93" name="Oval 92">
+            <a:extLst>
+              <a:ext uri="{FF2B5EF4-FFF2-40B4-BE49-F238E27FC236}">
+                <a16:creationId xmlns:a16="http://schemas.microsoft.com/office/drawing/2014/main" id="{D13F812D-48B3-4EED-BAB2-D41025317F3D}"/>
+              </a:ext>
+            </a:extLst>
+          </p:cNvPr>
+          <p:cNvSpPr/>
+          <p:nvPr/>
+        </p:nvSpPr>
+        <p:spPr>
+          <a:xfrm>
+            <a:off x="6304917" y="3344960"/>
+            <a:ext cx="1097280" cy="1097280"/>
+          </a:xfrm>
+          <a:prstGeom prst="ellipse">
+            <a:avLst/>
+          </a:prstGeom>
+          <a:noFill/>
+          <a:ln w="3175">
+            <a:solidFill>
+              <a:schemeClr val="tx1"/>
+            </a:solidFill>
+          </a:ln>
+        </p:spPr>
+        <p:style>
+          <a:lnRef idx="2">
+            <a:schemeClr val="accent1">
+              <a:shade val="50000"/>
+            </a:schemeClr>
+          </a:lnRef>
+          <a:fillRef idx="1">
+            <a:schemeClr val="accent1"/>
+          </a:fillRef>
+          <a:effectRef idx="0">
+            <a:schemeClr val="accent1"/>
+          </a:effectRef>
+          <a:fontRef idx="minor">
+            <a:schemeClr val="lt1"/>
+          </a:fontRef>
+        </p:style>
+        <p:txBody>
+          <a:bodyPr rtlCol="0" anchor="ctr"/>
+          <a:lstStyle/>
+          <a:p>
+            <a:pPr algn="ctr"/>
+            <a:endParaRPr lang="en-US" dirty="0"/>
+          </a:p>
+        </p:txBody>
+      </p:sp>
+      <p:sp>
+        <p:nvSpPr>
+          <p:cNvPr id="94" name="Oval 93">
+            <a:extLst>
+              <a:ext uri="{FF2B5EF4-FFF2-40B4-BE49-F238E27FC236}">
+                <a16:creationId xmlns:a16="http://schemas.microsoft.com/office/drawing/2014/main" id="{E5D0449A-4450-4D6D-BA9F-6FFDCD374DB2}"/>
+              </a:ext>
+            </a:extLst>
+          </p:cNvPr>
+          <p:cNvSpPr/>
+          <p:nvPr/>
+        </p:nvSpPr>
+        <p:spPr>
+          <a:xfrm>
+            <a:off x="6266611" y="3299240"/>
+            <a:ext cx="1188720" cy="1188720"/>
+          </a:xfrm>
+          <a:prstGeom prst="ellipse">
+            <a:avLst/>
+          </a:prstGeom>
+          <a:noFill/>
+          <a:ln w="3175">
+            <a:solidFill>
+              <a:schemeClr val="tx1"/>
+            </a:solidFill>
+          </a:ln>
+        </p:spPr>
+        <p:style>
+          <a:lnRef idx="2">
+            <a:schemeClr val="accent1">
+              <a:shade val="50000"/>
+            </a:schemeClr>
+          </a:lnRef>
+          <a:fillRef idx="1">
+            <a:schemeClr val="accent1"/>
+          </a:fillRef>
+          <a:effectRef idx="0">
+            <a:schemeClr val="accent1"/>
+          </a:effectRef>
+          <a:fontRef idx="minor">
+            <a:schemeClr val="lt1"/>
+          </a:fontRef>
+        </p:style>
+        <p:txBody>
+          <a:bodyPr rtlCol="0" anchor="ctr"/>
+          <a:lstStyle/>
+          <a:p>
+            <a:pPr algn="ctr"/>
+            <a:endParaRPr lang="en-US" dirty="0"/>
+          </a:p>
+        </p:txBody>
+      </p:sp>
+      <p:sp>
+        <p:nvSpPr>
+          <p:cNvPr id="95" name="Oval 94">
+            <a:extLst>
+              <a:ext uri="{FF2B5EF4-FFF2-40B4-BE49-F238E27FC236}">
+                <a16:creationId xmlns:a16="http://schemas.microsoft.com/office/drawing/2014/main" id="{D8239F45-AC5A-4AA7-9FE0-FDD051C93569}"/>
+              </a:ext>
+            </a:extLst>
+          </p:cNvPr>
+          <p:cNvSpPr/>
+          <p:nvPr/>
+        </p:nvSpPr>
+        <p:spPr>
+          <a:xfrm>
+            <a:off x="6213477" y="3253520"/>
+            <a:ext cx="1280160" cy="1280160"/>
+          </a:xfrm>
+          <a:prstGeom prst="ellipse">
+            <a:avLst/>
+          </a:prstGeom>
+          <a:noFill/>
+          <a:ln w="3175">
+            <a:solidFill>
+              <a:schemeClr val="tx1"/>
+            </a:solidFill>
+          </a:ln>
+        </p:spPr>
+        <p:style>
+          <a:lnRef idx="2">
+            <a:schemeClr val="accent1">
+              <a:shade val="50000"/>
+            </a:schemeClr>
+          </a:lnRef>
+          <a:fillRef idx="1">
+            <a:schemeClr val="accent1"/>
+          </a:fillRef>
+          <a:effectRef idx="0">
+            <a:schemeClr val="accent1"/>
+          </a:effectRef>
+          <a:fontRef idx="minor">
+            <a:schemeClr val="lt1"/>
+          </a:fontRef>
+        </p:style>
+        <p:txBody>
+          <a:bodyPr rtlCol="0" anchor="ctr"/>
+          <a:lstStyle/>
+          <a:p>
+            <a:pPr algn="ctr"/>
+            <a:endParaRPr lang="en-US" dirty="0"/>
+          </a:p>
+        </p:txBody>
+      </p:sp>
+      <p:sp>
+        <p:nvSpPr>
+          <p:cNvPr id="96" name="Oval 95">
+            <a:extLst>
+              <a:ext uri="{FF2B5EF4-FFF2-40B4-BE49-F238E27FC236}">
+                <a16:creationId xmlns:a16="http://schemas.microsoft.com/office/drawing/2014/main" id="{9C8BAA64-C24F-474B-AA5B-0E3EF99CFC9E}"/>
+              </a:ext>
+            </a:extLst>
+          </p:cNvPr>
+          <p:cNvSpPr/>
+          <p:nvPr/>
+        </p:nvSpPr>
+        <p:spPr>
+          <a:xfrm>
+            <a:off x="6167757" y="3207800"/>
+            <a:ext cx="1371600" cy="1371600"/>
+          </a:xfrm>
+          <a:prstGeom prst="ellipse">
+            <a:avLst/>
+          </a:prstGeom>
+          <a:noFill/>
+          <a:ln w="3175">
+            <a:solidFill>
+              <a:schemeClr val="tx1"/>
+            </a:solidFill>
+          </a:ln>
+        </p:spPr>
+        <p:style>
+          <a:lnRef idx="2">
+            <a:schemeClr val="accent1">
+              <a:shade val="50000"/>
+            </a:schemeClr>
+          </a:lnRef>
+          <a:fillRef idx="1">
+            <a:schemeClr val="accent1"/>
+          </a:fillRef>
+          <a:effectRef idx="0">
+            <a:schemeClr val="accent1"/>
+          </a:effectRef>
+          <a:fontRef idx="minor">
+            <a:schemeClr val="lt1"/>
+          </a:fontRef>
+        </p:style>
+        <p:txBody>
+          <a:bodyPr rtlCol="0" anchor="ctr"/>
+          <a:lstStyle/>
+          <a:p>
+            <a:pPr algn="ctr"/>
+            <a:endParaRPr lang="en-US" dirty="0"/>
+          </a:p>
+        </p:txBody>
+      </p:sp>
+      <p:sp>
+        <p:nvSpPr>
+          <p:cNvPr id="97" name="Oval 96">
+            <a:extLst>
+              <a:ext uri="{FF2B5EF4-FFF2-40B4-BE49-F238E27FC236}">
+                <a16:creationId xmlns:a16="http://schemas.microsoft.com/office/drawing/2014/main" id="{E1637195-240A-4569-8B6E-BBB0932F81E7}"/>
+              </a:ext>
+            </a:extLst>
+          </p:cNvPr>
+          <p:cNvSpPr/>
+          <p:nvPr/>
+        </p:nvSpPr>
+        <p:spPr>
+          <a:xfrm>
+            <a:off x="6129451" y="3173670"/>
+            <a:ext cx="1463040" cy="1463040"/>
+          </a:xfrm>
+          <a:prstGeom prst="ellipse">
+            <a:avLst/>
+          </a:prstGeom>
+          <a:noFill/>
+          <a:ln w="3175">
+            <a:solidFill>
+              <a:schemeClr val="tx1"/>
+            </a:solidFill>
+          </a:ln>
+        </p:spPr>
+        <p:style>
+          <a:lnRef idx="2">
+            <a:schemeClr val="accent1">
+              <a:shade val="50000"/>
+            </a:schemeClr>
+          </a:lnRef>
+          <a:fillRef idx="1">
+            <a:schemeClr val="accent1"/>
+          </a:fillRef>
+          <a:effectRef idx="0">
+            <a:schemeClr val="accent1"/>
+          </a:effectRef>
+          <a:fontRef idx="minor">
+            <a:schemeClr val="lt1"/>
+          </a:fontRef>
+        </p:style>
+        <p:txBody>
+          <a:bodyPr rtlCol="0" anchor="ctr"/>
+          <a:lstStyle/>
+          <a:p>
+            <a:pPr algn="ctr"/>
+            <a:endParaRPr lang="en-US" dirty="0"/>
+          </a:p>
+        </p:txBody>
+      </p:sp>
+      <p:sp>
+        <p:nvSpPr>
+          <p:cNvPr id="98" name="Oval 97">
+            <a:extLst>
+              <a:ext uri="{FF2B5EF4-FFF2-40B4-BE49-F238E27FC236}">
+                <a16:creationId xmlns:a16="http://schemas.microsoft.com/office/drawing/2014/main" id="{ACFC443D-BAF0-4B19-ABD6-4133DF4E0787}"/>
+              </a:ext>
+            </a:extLst>
+          </p:cNvPr>
+          <p:cNvSpPr/>
+          <p:nvPr/>
+        </p:nvSpPr>
+        <p:spPr>
+          <a:xfrm>
+            <a:off x="6083731" y="3134887"/>
+            <a:ext cx="1554480" cy="1554480"/>
+          </a:xfrm>
+          <a:prstGeom prst="ellipse">
+            <a:avLst/>
+          </a:prstGeom>
+          <a:noFill/>
+          <a:ln w="3175">
+            <a:solidFill>
+              <a:schemeClr val="tx1"/>
+            </a:solidFill>
+          </a:ln>
+        </p:spPr>
+        <p:style>
+          <a:lnRef idx="2">
+            <a:schemeClr val="accent1">
+              <a:shade val="50000"/>
+            </a:schemeClr>
+          </a:lnRef>
+          <a:fillRef idx="1">
+            <a:schemeClr val="accent1"/>
+          </a:fillRef>
+          <a:effectRef idx="0">
+            <a:schemeClr val="accent1"/>
+          </a:effectRef>
+          <a:fontRef idx="minor">
+            <a:schemeClr val="lt1"/>
+          </a:fontRef>
+        </p:style>
+        <p:txBody>
+          <a:bodyPr rtlCol="0" anchor="ctr"/>
+          <a:lstStyle/>
+          <a:p>
+            <a:pPr algn="ctr"/>
+            <a:endParaRPr lang="en-US" dirty="0"/>
+          </a:p>
+        </p:txBody>
+      </p:sp>
+      <p:sp>
+        <p:nvSpPr>
+          <p:cNvPr id="99" name="Oval 98">
+            <a:extLst>
+              <a:ext uri="{FF2B5EF4-FFF2-40B4-BE49-F238E27FC236}">
+                <a16:creationId xmlns:a16="http://schemas.microsoft.com/office/drawing/2014/main" id="{F990C5B8-5350-4448-9C38-0E1CCFF194BE}"/>
+              </a:ext>
+            </a:extLst>
+          </p:cNvPr>
+          <p:cNvSpPr/>
+          <p:nvPr/>
+        </p:nvSpPr>
+        <p:spPr>
+          <a:xfrm>
+            <a:off x="6038011" y="3079298"/>
+            <a:ext cx="1645920" cy="1645920"/>
+          </a:xfrm>
+          <a:prstGeom prst="ellipse">
+            <a:avLst/>
+          </a:prstGeom>
+          <a:noFill/>
+          <a:ln w="3175">
+            <a:solidFill>
+              <a:schemeClr val="tx1"/>
+            </a:solidFill>
+          </a:ln>
+        </p:spPr>
+        <p:style>
+          <a:lnRef idx="2">
+            <a:schemeClr val="accent1">
+              <a:shade val="50000"/>
+            </a:schemeClr>
+          </a:lnRef>
+          <a:fillRef idx="1">
+            <a:schemeClr val="accent1"/>
+          </a:fillRef>
+          <a:effectRef idx="0">
+            <a:schemeClr val="accent1"/>
+          </a:effectRef>
+          <a:fontRef idx="minor">
+            <a:schemeClr val="lt1"/>
+          </a:fontRef>
+        </p:style>
+        <p:txBody>
+          <a:bodyPr rtlCol="0" anchor="ctr"/>
+          <a:lstStyle/>
+          <a:p>
+            <a:pPr algn="ctr"/>
+            <a:endParaRPr lang="en-US" dirty="0"/>
+          </a:p>
+        </p:txBody>
+      </p:sp>
+      <p:sp>
+        <p:nvSpPr>
+          <p:cNvPr id="101" name="Oval 100">
+            <a:extLst>
+              <a:ext uri="{FF2B5EF4-FFF2-40B4-BE49-F238E27FC236}">
+                <a16:creationId xmlns:a16="http://schemas.microsoft.com/office/drawing/2014/main" id="{854417B7-0360-49B1-A579-B88A67999A15}"/>
+              </a:ext>
+            </a:extLst>
+          </p:cNvPr>
+          <p:cNvSpPr/>
+          <p:nvPr/>
+        </p:nvSpPr>
+        <p:spPr>
+          <a:xfrm>
+            <a:off x="5987088" y="3043447"/>
+            <a:ext cx="1737360" cy="1737360"/>
+          </a:xfrm>
+          <a:prstGeom prst="ellipse">
+            <a:avLst/>
+          </a:prstGeom>
+          <a:noFill/>
+          <a:ln w="3175">
+            <a:solidFill>
+              <a:schemeClr val="tx1"/>
+            </a:solidFill>
+          </a:ln>
+        </p:spPr>
+        <p:style>
+          <a:lnRef idx="2">
+            <a:schemeClr val="accent1">
+              <a:shade val="50000"/>
+            </a:schemeClr>
+          </a:lnRef>
+          <a:fillRef idx="1">
+            <a:schemeClr val="accent1"/>
+          </a:fillRef>
+          <a:effectRef idx="0">
+            <a:schemeClr val="accent1"/>
+          </a:effectRef>
+          <a:fontRef idx="minor">
+            <a:schemeClr val="lt1"/>
+          </a:fontRef>
+        </p:style>
+        <p:txBody>
+          <a:bodyPr rtlCol="0" anchor="ctr"/>
+          <a:lstStyle/>
+          <a:p>
+            <a:pPr algn="ctr"/>
+            <a:endParaRPr lang="en-US" dirty="0"/>
+          </a:p>
+        </p:txBody>
+      </p:sp>
+      <p:sp>
+        <p:nvSpPr>
+          <p:cNvPr id="102" name="Oval 101">
+            <a:extLst>
+              <a:ext uri="{FF2B5EF4-FFF2-40B4-BE49-F238E27FC236}">
+                <a16:creationId xmlns:a16="http://schemas.microsoft.com/office/drawing/2014/main" id="{6D089FBC-79D6-4D2F-82C1-03C1AFE44BC1}"/>
+              </a:ext>
+            </a:extLst>
+          </p:cNvPr>
+          <p:cNvSpPr/>
+          <p:nvPr/>
+        </p:nvSpPr>
+        <p:spPr>
+          <a:xfrm>
+            <a:off x="5934979" y="3012221"/>
+            <a:ext cx="1828800" cy="1828800"/>
+          </a:xfrm>
+          <a:prstGeom prst="ellipse">
+            <a:avLst/>
+          </a:prstGeom>
+          <a:noFill/>
+          <a:ln w="3175">
+            <a:solidFill>
+              <a:schemeClr val="tx1"/>
+            </a:solidFill>
+          </a:ln>
+        </p:spPr>
+        <p:style>
+          <a:lnRef idx="2">
+            <a:schemeClr val="accent1">
+              <a:shade val="50000"/>
+            </a:schemeClr>
+          </a:lnRef>
+          <a:fillRef idx="1">
+            <a:schemeClr val="accent1"/>
+          </a:fillRef>
+          <a:effectRef idx="0">
+            <a:schemeClr val="accent1"/>
+          </a:effectRef>
+          <a:fontRef idx="minor">
+            <a:schemeClr val="lt1"/>
+          </a:fontRef>
+        </p:style>
+        <p:txBody>
+          <a:bodyPr rtlCol="0" anchor="ctr"/>
+          <a:lstStyle/>
+          <a:p>
+            <a:pPr algn="ctr"/>
+            <a:endParaRPr lang="en-US" dirty="0"/>
+          </a:p>
+        </p:txBody>
+      </p:sp>
+      <p:sp>
+        <p:nvSpPr>
+          <p:cNvPr id="103" name="Oval 102">
+            <a:extLst>
+              <a:ext uri="{FF2B5EF4-FFF2-40B4-BE49-F238E27FC236}">
+                <a16:creationId xmlns:a16="http://schemas.microsoft.com/office/drawing/2014/main" id="{284E37CF-7FB6-43D2-903D-FF6155BAE6C9}"/>
+              </a:ext>
+            </a:extLst>
+          </p:cNvPr>
+          <p:cNvSpPr/>
+          <p:nvPr/>
+        </p:nvSpPr>
+        <p:spPr>
+          <a:xfrm>
+            <a:off x="5895648" y="2966501"/>
+            <a:ext cx="1920240" cy="1920240"/>
+          </a:xfrm>
+          <a:prstGeom prst="ellipse">
+            <a:avLst/>
+          </a:prstGeom>
+          <a:noFill/>
+          <a:ln w="3175">
+            <a:solidFill>
+              <a:schemeClr val="tx1"/>
+            </a:solidFill>
+          </a:ln>
+        </p:spPr>
+        <p:style>
+          <a:lnRef idx="2">
+            <a:schemeClr val="accent1">
+              <a:shade val="50000"/>
+            </a:schemeClr>
+          </a:lnRef>
+          <a:fillRef idx="1">
+            <a:schemeClr val="accent1"/>
+          </a:fillRef>
+          <a:effectRef idx="0">
+            <a:schemeClr val="accent1"/>
+          </a:effectRef>
+          <a:fontRef idx="minor">
+            <a:schemeClr val="lt1"/>
+          </a:fontRef>
+        </p:style>
+        <p:txBody>
+          <a:bodyPr rtlCol="0" anchor="ctr"/>
+          <a:lstStyle/>
+          <a:p>
+            <a:pPr algn="ctr"/>
+            <a:endParaRPr lang="en-US" dirty="0"/>
+          </a:p>
+        </p:txBody>
+      </p:sp>
+      <p:sp>
+        <p:nvSpPr>
+          <p:cNvPr id="104" name="Oval 103">
+            <a:extLst>
+              <a:ext uri="{FF2B5EF4-FFF2-40B4-BE49-F238E27FC236}">
+                <a16:creationId xmlns:a16="http://schemas.microsoft.com/office/drawing/2014/main" id="{D0E292A5-B5E1-4F1B-9669-66519B2DE8AD}"/>
+              </a:ext>
+            </a:extLst>
+          </p:cNvPr>
+          <p:cNvSpPr/>
+          <p:nvPr/>
+        </p:nvSpPr>
+        <p:spPr>
+          <a:xfrm>
+            <a:off x="5842380" y="2920781"/>
+            <a:ext cx="2011680" cy="2011680"/>
+          </a:xfrm>
+          <a:prstGeom prst="ellipse">
+            <a:avLst/>
+          </a:prstGeom>
+          <a:noFill/>
+          <a:ln w="3175">
+            <a:solidFill>
+              <a:schemeClr val="tx1"/>
+            </a:solidFill>
+          </a:ln>
+        </p:spPr>
+        <p:style>
+          <a:lnRef idx="2">
+            <a:schemeClr val="accent1">
+              <a:shade val="50000"/>
+            </a:schemeClr>
+          </a:lnRef>
+          <a:fillRef idx="1">
+            <a:schemeClr val="accent1"/>
+          </a:fillRef>
+          <a:effectRef idx="0">
+            <a:schemeClr val="accent1"/>
+          </a:effectRef>
+          <a:fontRef idx="minor">
+            <a:schemeClr val="lt1"/>
+          </a:fontRef>
+        </p:style>
+        <p:txBody>
+          <a:bodyPr rtlCol="0" anchor="ctr"/>
+          <a:lstStyle/>
+          <a:p>
+            <a:pPr algn="ctr"/>
+            <a:endParaRPr lang="en-US" dirty="0"/>
+          </a:p>
+        </p:txBody>
+      </p:sp>
     </p:spTree>
     <p:extLst>
       <p:ext uri="{BB962C8B-B14F-4D97-AF65-F5344CB8AC3E}">

</xml_diff>

<commit_message>
Added 2.1.11; Updated 2.1.1-2.1.10,2.1.12-13
</commit_message>
<xml_diff>
--- a/volunteer/Drawings.pptx
+++ b/volunteer/Drawings.pptx
@@ -17,6 +17,8 @@
     <p:sldId id="274" r:id="rId11"/>
     <p:sldId id="275" r:id="rId12"/>
     <p:sldId id="276" r:id="rId13"/>
+    <p:sldId id="277" r:id="rId14"/>
+    <p:sldId id="278" r:id="rId15"/>
   </p:sldIdLst>
   <p:sldSz cx="12192000" cy="6858000"/>
   <p:notesSz cx="6858000" cy="9144000"/>
@@ -12400,63 +12402,6 @@
           <a:chExt cx="0" cy="0"/>
         </a:xfrm>
       </p:grpSpPr>
-      <p:sp>
-        <p:nvSpPr>
-          <p:cNvPr id="68" name="Oval 67">
-            <a:extLst>
-              <a:ext uri="{FF2B5EF4-FFF2-40B4-BE49-F238E27FC236}">
-                <a16:creationId xmlns:a16="http://schemas.microsoft.com/office/drawing/2014/main" id="{D36BB41C-A327-43FF-B080-8EF6DF91E368}"/>
-              </a:ext>
-            </a:extLst>
-          </p:cNvPr>
-          <p:cNvSpPr/>
-          <p:nvPr/>
-        </p:nvSpPr>
-        <p:spPr>
-          <a:xfrm>
-            <a:off x="5818080" y="2875061"/>
-            <a:ext cx="2103120" cy="2103120"/>
-          </a:xfrm>
-          <a:prstGeom prst="ellipse">
-            <a:avLst/>
-          </a:prstGeom>
-          <a:solidFill>
-            <a:schemeClr val="accent1">
-              <a:lumMod val="75000"/>
-              <a:alpha val="58000"/>
-            </a:schemeClr>
-          </a:solidFill>
-          <a:ln w="47625">
-            <a:solidFill>
-              <a:schemeClr val="tx1"/>
-            </a:solidFill>
-          </a:ln>
-        </p:spPr>
-        <p:style>
-          <a:lnRef idx="2">
-            <a:schemeClr val="accent1">
-              <a:shade val="50000"/>
-            </a:schemeClr>
-          </a:lnRef>
-          <a:fillRef idx="1">
-            <a:schemeClr val="accent1"/>
-          </a:fillRef>
-          <a:effectRef idx="0">
-            <a:schemeClr val="accent1"/>
-          </a:effectRef>
-          <a:fontRef idx="minor">
-            <a:schemeClr val="lt1"/>
-          </a:fontRef>
-        </p:style>
-        <p:txBody>
-          <a:bodyPr rtlCol="0" anchor="ctr"/>
-          <a:lstStyle/>
-          <a:p>
-            <a:pPr algn="ctr"/>
-            <a:endParaRPr lang="en-US" dirty="0"/>
-          </a:p>
-        </p:txBody>
-      </p:sp>
       <p:grpSp>
         <p:nvGrpSpPr>
           <p:cNvPr id="85" name="Group 84">
@@ -16760,157 +16705,2499 @@
           </mc:Fallback>
         </mc:AlternateContent>
       </p:grpSp>
-      <p:sp>
-        <p:nvSpPr>
-          <p:cNvPr id="2" name="Oval 1">
+      <p:grpSp>
+        <p:nvGrpSpPr>
+          <p:cNvPr id="4" name="Group 3">
             <a:extLst>
               <a:ext uri="{FF2B5EF4-FFF2-40B4-BE49-F238E27FC236}">
-                <a16:creationId xmlns:a16="http://schemas.microsoft.com/office/drawing/2014/main" id="{2201B416-E303-40F3-A1CC-94187E924450}"/>
+                <a16:creationId xmlns:a16="http://schemas.microsoft.com/office/drawing/2014/main" id="{02D4827E-6803-4EF5-B800-F8A1F1C7BA4C}"/>
               </a:ext>
             </a:extLst>
           </p:cNvPr>
-          <p:cNvSpPr/>
+          <p:cNvGrpSpPr/>
           <p:nvPr/>
-        </p:nvSpPr>
-        <p:spPr>
+        </p:nvGrpSpPr>
+        <p:grpSpPr>
           <a:xfrm>
-            <a:off x="6396357" y="3436400"/>
-            <a:ext cx="914400" cy="914400"/>
+            <a:off x="7447355" y="4174793"/>
+            <a:ext cx="2145986" cy="2602427"/>
+            <a:chOff x="5818080" y="2375754"/>
+            <a:chExt cx="2145986" cy="2602427"/>
           </a:xfrm>
-          <a:prstGeom prst="ellipse">
-            <a:avLst/>
-          </a:prstGeom>
-          <a:solidFill>
-            <a:schemeClr val="bg1">
-              <a:lumMod val="95000"/>
-            </a:schemeClr>
-          </a:solidFill>
-          <a:ln w="25400">
+        </p:grpSpPr>
+        <p:sp>
+          <p:nvSpPr>
+            <p:cNvPr id="68" name="Oval 67">
+              <a:extLst>
+                <a:ext uri="{FF2B5EF4-FFF2-40B4-BE49-F238E27FC236}">
+                  <a16:creationId xmlns:a16="http://schemas.microsoft.com/office/drawing/2014/main" id="{D36BB41C-A327-43FF-B080-8EF6DF91E368}"/>
+                </a:ext>
+              </a:extLst>
+            </p:cNvPr>
+            <p:cNvSpPr/>
+            <p:nvPr/>
+          </p:nvSpPr>
+          <p:spPr>
+            <a:xfrm>
+              <a:off x="5818080" y="2875061"/>
+              <a:ext cx="2103120" cy="2103120"/>
+            </a:xfrm>
+            <a:prstGeom prst="ellipse">
+              <a:avLst/>
+            </a:prstGeom>
             <a:solidFill>
+              <a:schemeClr val="accent1">
+                <a:lumMod val="75000"/>
+                <a:alpha val="58000"/>
+              </a:schemeClr>
+            </a:solidFill>
+            <a:ln w="47625">
+              <a:solidFill>
+                <a:schemeClr val="tx1"/>
+              </a:solidFill>
+            </a:ln>
+          </p:spPr>
+          <p:style>
+            <a:lnRef idx="2">
+              <a:schemeClr val="accent1">
+                <a:shade val="50000"/>
+              </a:schemeClr>
+            </a:lnRef>
+            <a:fillRef idx="1">
+              <a:schemeClr val="accent1"/>
+            </a:fillRef>
+            <a:effectRef idx="0">
+              <a:schemeClr val="accent1"/>
+            </a:effectRef>
+            <a:fontRef idx="minor">
+              <a:schemeClr val="lt1"/>
+            </a:fontRef>
+          </p:style>
+          <p:txBody>
+            <a:bodyPr rtlCol="0" anchor="ctr"/>
+            <a:lstStyle/>
+            <a:p>
+              <a:pPr algn="ctr"/>
+              <a:endParaRPr lang="en-US" dirty="0"/>
+            </a:p>
+          </p:txBody>
+        </p:sp>
+        <p:sp>
+          <p:nvSpPr>
+            <p:cNvPr id="2" name="Oval 1">
+              <a:extLst>
+                <a:ext uri="{FF2B5EF4-FFF2-40B4-BE49-F238E27FC236}">
+                  <a16:creationId xmlns:a16="http://schemas.microsoft.com/office/drawing/2014/main" id="{2201B416-E303-40F3-A1CC-94187E924450}"/>
+                </a:ext>
+              </a:extLst>
+            </p:cNvPr>
+            <p:cNvSpPr/>
+            <p:nvPr/>
+          </p:nvSpPr>
+          <p:spPr>
+            <a:xfrm>
+              <a:off x="6396357" y="3436400"/>
+              <a:ext cx="914400" cy="914400"/>
+            </a:xfrm>
+            <a:prstGeom prst="ellipse">
+              <a:avLst/>
+            </a:prstGeom>
+            <a:solidFill>
+              <a:schemeClr val="bg1">
+                <a:lumMod val="95000"/>
+              </a:schemeClr>
+            </a:solidFill>
+            <a:ln w="25400">
+              <a:solidFill>
+                <a:schemeClr val="tx1"/>
+              </a:solidFill>
+            </a:ln>
+          </p:spPr>
+          <p:style>
+            <a:lnRef idx="2">
+              <a:schemeClr val="accent1">
+                <a:shade val="50000"/>
+              </a:schemeClr>
+            </a:lnRef>
+            <a:fillRef idx="1">
+              <a:schemeClr val="accent1"/>
+            </a:fillRef>
+            <a:effectRef idx="0">
+              <a:schemeClr val="accent1"/>
+            </a:effectRef>
+            <a:fontRef idx="minor">
+              <a:schemeClr val="lt1"/>
+            </a:fontRef>
+          </p:style>
+          <p:txBody>
+            <a:bodyPr rtlCol="0" anchor="ctr"/>
+            <a:lstStyle/>
+            <a:p>
+              <a:pPr algn="ctr"/>
+              <a:endParaRPr lang="en-US"/>
+            </a:p>
+          </p:txBody>
+        </p:sp>
+        <p:cxnSp>
+          <p:nvCxnSpPr>
+            <p:cNvPr id="69" name="Straight Arrow Connector 68">
+              <a:extLst>
+                <a:ext uri="{FF2B5EF4-FFF2-40B4-BE49-F238E27FC236}">
+                  <a16:creationId xmlns:a16="http://schemas.microsoft.com/office/drawing/2014/main" id="{DC146B36-BFAC-46A6-8819-0B9BF9A19278}"/>
+                </a:ext>
+              </a:extLst>
+            </p:cNvPr>
+            <p:cNvCxnSpPr>
+              <a:cxnSpLocks/>
+            </p:cNvCxnSpPr>
+            <p:nvPr/>
+          </p:nvCxnSpPr>
+          <p:spPr>
+            <a:xfrm flipH="1">
+              <a:off x="6879427" y="3926621"/>
+              <a:ext cx="446158" cy="0"/>
+            </a:xfrm>
+            <a:prstGeom prst="straightConnector1">
+              <a:avLst/>
+            </a:prstGeom>
+            <a:ln w="25400">
+              <a:solidFill>
+                <a:schemeClr val="tx1"/>
+              </a:solidFill>
+              <a:headEnd type="stealth" w="lg" len="lg"/>
+              <a:tailEnd type="stealth" w="lg" len="lg"/>
+            </a:ln>
+          </p:spPr>
+          <p:style>
+            <a:lnRef idx="1">
+              <a:schemeClr val="accent1"/>
+            </a:lnRef>
+            <a:fillRef idx="0">
+              <a:schemeClr val="accent1"/>
+            </a:fillRef>
+            <a:effectRef idx="0">
+              <a:schemeClr val="accent1"/>
+            </a:effectRef>
+            <a:fontRef idx="minor">
               <a:schemeClr val="tx1"/>
-            </a:solidFill>
-          </a:ln>
-        </p:spPr>
-        <p:style>
-          <a:lnRef idx="2">
-            <a:schemeClr val="accent1">
-              <a:shade val="50000"/>
-            </a:schemeClr>
-          </a:lnRef>
-          <a:fillRef idx="1">
-            <a:schemeClr val="accent1"/>
-          </a:fillRef>
-          <a:effectRef idx="0">
-            <a:schemeClr val="accent1"/>
-          </a:effectRef>
-          <a:fontRef idx="minor">
-            <a:schemeClr val="lt1"/>
-          </a:fontRef>
-        </p:style>
-        <p:txBody>
-          <a:bodyPr rtlCol="0" anchor="ctr"/>
-          <a:lstStyle/>
-          <a:p>
-            <a:pPr algn="ctr"/>
-            <a:endParaRPr lang="en-US"/>
-          </a:p>
-        </p:txBody>
-      </p:sp>
-      <p:cxnSp>
-        <p:nvCxnSpPr>
-          <p:cNvPr id="69" name="Straight Arrow Connector 68">
+            </a:fontRef>
+          </p:style>
+        </p:cxnSp>
+        <p:cxnSp>
+          <p:nvCxnSpPr>
+            <p:cNvPr id="70" name="Straight Connector 69">
+              <a:extLst>
+                <a:ext uri="{FF2B5EF4-FFF2-40B4-BE49-F238E27FC236}">
+                  <a16:creationId xmlns:a16="http://schemas.microsoft.com/office/drawing/2014/main" id="{AE0DD116-582D-4E65-9398-9847F6D2AE9F}"/>
+                </a:ext>
+              </a:extLst>
+            </p:cNvPr>
+            <p:cNvCxnSpPr>
+              <a:cxnSpLocks/>
+              <a:endCxn id="2" idx="4"/>
+            </p:cNvCxnSpPr>
+            <p:nvPr/>
+          </p:nvCxnSpPr>
+          <p:spPr>
+            <a:xfrm flipH="1">
+              <a:off x="6853557" y="2375754"/>
+              <a:ext cx="25870" cy="1975046"/>
+            </a:xfrm>
+            <a:prstGeom prst="line">
+              <a:avLst/>
+            </a:prstGeom>
+            <a:ln w="31750">
+              <a:solidFill>
+                <a:schemeClr val="tx1"/>
+              </a:solidFill>
+            </a:ln>
+          </p:spPr>
+          <p:style>
+            <a:lnRef idx="1">
+              <a:schemeClr val="accent1"/>
+            </a:lnRef>
+            <a:fillRef idx="0">
+              <a:schemeClr val="accent1"/>
+            </a:fillRef>
+            <a:effectRef idx="0">
+              <a:schemeClr val="accent1"/>
+            </a:effectRef>
+            <a:fontRef idx="minor">
+              <a:schemeClr val="tx1"/>
+            </a:fontRef>
+          </p:style>
+        </p:cxnSp>
+        <p:cxnSp>
+          <p:nvCxnSpPr>
+            <p:cNvPr id="82" name="Straight Connector 81">
+              <a:extLst>
+                <a:ext uri="{FF2B5EF4-FFF2-40B4-BE49-F238E27FC236}">
+                  <a16:creationId xmlns:a16="http://schemas.microsoft.com/office/drawing/2014/main" id="{22746A1C-9805-4B4D-B58F-DB4F61E7911D}"/>
+                </a:ext>
+              </a:extLst>
+            </p:cNvPr>
+            <p:cNvCxnSpPr>
+              <a:cxnSpLocks/>
+            </p:cNvCxnSpPr>
+            <p:nvPr/>
+          </p:nvCxnSpPr>
+          <p:spPr>
+            <a:xfrm>
+              <a:off x="7964066" y="2375754"/>
+              <a:ext cx="0" cy="1617157"/>
+            </a:xfrm>
+            <a:prstGeom prst="line">
+              <a:avLst/>
+            </a:prstGeom>
+            <a:ln w="31750">
+              <a:solidFill>
+                <a:schemeClr val="tx1"/>
+              </a:solidFill>
+            </a:ln>
+          </p:spPr>
+          <p:style>
+            <a:lnRef idx="1">
+              <a:schemeClr val="accent1"/>
+            </a:lnRef>
+            <a:fillRef idx="0">
+              <a:schemeClr val="accent1"/>
+            </a:fillRef>
+            <a:effectRef idx="0">
+              <a:schemeClr val="accent1"/>
+            </a:effectRef>
+            <a:fontRef idx="minor">
+              <a:schemeClr val="tx1"/>
+            </a:fontRef>
+          </p:style>
+        </p:cxnSp>
+        <p:cxnSp>
+          <p:nvCxnSpPr>
+            <p:cNvPr id="88" name="Straight Arrow Connector 87">
+              <a:extLst>
+                <a:ext uri="{FF2B5EF4-FFF2-40B4-BE49-F238E27FC236}">
+                  <a16:creationId xmlns:a16="http://schemas.microsoft.com/office/drawing/2014/main" id="{4F53B432-5CFD-46F4-B2A5-8F09CF9A4418}"/>
+                </a:ext>
+              </a:extLst>
+            </p:cNvPr>
+            <p:cNvCxnSpPr>
+              <a:cxnSpLocks/>
+            </p:cNvCxnSpPr>
+            <p:nvPr/>
+          </p:nvCxnSpPr>
+          <p:spPr>
+            <a:xfrm flipH="1">
+              <a:off x="6882483" y="2602350"/>
+              <a:ext cx="1081583" cy="0"/>
+            </a:xfrm>
+            <a:prstGeom prst="straightConnector1">
+              <a:avLst/>
+            </a:prstGeom>
+            <a:ln w="25400">
+              <a:solidFill>
+                <a:schemeClr val="tx1"/>
+              </a:solidFill>
+              <a:headEnd type="stealth" w="lg" len="lg"/>
+              <a:tailEnd type="stealth" w="lg" len="lg"/>
+            </a:ln>
+          </p:spPr>
+          <p:style>
+            <a:lnRef idx="1">
+              <a:schemeClr val="accent1"/>
+            </a:lnRef>
+            <a:fillRef idx="0">
+              <a:schemeClr val="accent1"/>
+            </a:fillRef>
+            <a:effectRef idx="0">
+              <a:schemeClr val="accent1"/>
+            </a:effectRef>
+            <a:fontRef idx="minor">
+              <a:schemeClr val="tx1"/>
+            </a:fontRef>
+          </p:style>
+        </p:cxnSp>
+        <mc:AlternateContent xmlns:mc="http://schemas.openxmlformats.org/markup-compatibility/2006" xmlns:a14="http://schemas.microsoft.com/office/drawing/2010/main">
+          <mc:Choice Requires="a14">
+            <p:sp>
+              <p:nvSpPr>
+                <p:cNvPr id="14" name="TextBox 13">
+                  <a:extLst>
+                    <a:ext uri="{FF2B5EF4-FFF2-40B4-BE49-F238E27FC236}">
+                      <a16:creationId xmlns:a16="http://schemas.microsoft.com/office/drawing/2014/main" id="{F987CCB6-4AF3-4104-B720-4CFE4310A76F}"/>
+                    </a:ext>
+                  </a:extLst>
+                </p:cNvPr>
+                <p:cNvSpPr txBox="1"/>
+                <p:nvPr/>
+              </p:nvSpPr>
+              <p:spPr>
+                <a:xfrm>
+                  <a:off x="7371987" y="2602350"/>
+                  <a:ext cx="321498" cy="430887"/>
+                </a:xfrm>
+                <a:prstGeom prst="rect">
+                  <a:avLst/>
+                </a:prstGeom>
+                <a:noFill/>
+              </p:spPr>
+              <p:txBody>
+                <a:bodyPr wrap="none" lIns="0" tIns="0" rIns="0" bIns="0" rtlCol="0">
+                  <a:spAutoFit/>
+                </a:bodyPr>
+                <a:lstStyle/>
+                <a:p>
+                  <a:pPr/>
+                  <a14:m>
+                    <m:oMathPara xmlns:m="http://schemas.openxmlformats.org/officeDocument/2006/math">
+                      <m:oMathParaPr>
+                        <m:jc m:val="centerGroup"/>
+                      </m:oMathParaPr>
+                      <m:oMath xmlns:m="http://schemas.openxmlformats.org/officeDocument/2006/math">
+                        <m:r>
+                          <a:rPr lang="en-US" sz="2800" b="0" i="1" smtClean="0">
+                            <a:latin typeface="Cambria Math" panose="02040503050406030204" pitchFamily="18" charset="0"/>
+                          </a:rPr>
+                          <m:t>𝑅</m:t>
+                        </m:r>
+                      </m:oMath>
+                    </m:oMathPara>
+                  </a14:m>
+                  <a:endParaRPr lang="en-US" sz="2800" dirty="0"/>
+                </a:p>
+              </p:txBody>
+            </p:sp>
+          </mc:Choice>
+          <mc:Fallback xmlns="">
+            <p:sp>
+              <p:nvSpPr>
+                <p:cNvPr id="14" name="TextBox 13">
+                  <a:extLst>
+                    <a:ext uri="{FF2B5EF4-FFF2-40B4-BE49-F238E27FC236}">
+                      <a16:creationId xmlns:a16="http://schemas.microsoft.com/office/drawing/2014/main" id="{F987CCB6-4AF3-4104-B720-4CFE4310A76F}"/>
+                    </a:ext>
+                  </a:extLst>
+                </p:cNvPr>
+                <p:cNvSpPr txBox="1">
+                  <a:spLocks noRot="1" noChangeAspect="1" noMove="1" noResize="1" noEditPoints="1" noAdjustHandles="1" noChangeArrowheads="1" noChangeShapeType="1" noTextEdit="1"/>
+                </p:cNvSpPr>
+                <p:nvPr/>
+              </p:nvSpPr>
+              <p:spPr>
+                <a:xfrm>
+                  <a:off x="7371987" y="2602350"/>
+                  <a:ext cx="321498" cy="430887"/>
+                </a:xfrm>
+                <a:prstGeom prst="rect">
+                  <a:avLst/>
+                </a:prstGeom>
+                <a:blipFill>
+                  <a:blip r:embed="rId28"/>
+                  <a:stretch>
+                    <a:fillRect/>
+                  </a:stretch>
+                </a:blipFill>
+              </p:spPr>
+              <p:txBody>
+                <a:bodyPr/>
+                <a:lstStyle/>
+                <a:p>
+                  <a:r>
+                    <a:rPr lang="en-US">
+                      <a:noFill/>
+                    </a:rPr>
+                    <a:t> </a:t>
+                  </a:r>
+                </a:p>
+              </p:txBody>
+            </p:sp>
+          </mc:Fallback>
+        </mc:AlternateContent>
+        <mc:AlternateContent xmlns:mc="http://schemas.openxmlformats.org/markup-compatibility/2006" xmlns:a14="http://schemas.microsoft.com/office/drawing/2010/main">
+          <mc:Choice Requires="a14">
+            <p:sp>
+              <p:nvSpPr>
+                <p:cNvPr id="89" name="TextBox 88">
+                  <a:extLst>
+                    <a:ext uri="{FF2B5EF4-FFF2-40B4-BE49-F238E27FC236}">
+                      <a16:creationId xmlns:a16="http://schemas.microsoft.com/office/drawing/2014/main" id="{B3288966-FDAB-4ABD-9308-C7D332C2287D}"/>
+                    </a:ext>
+                  </a:extLst>
+                </p:cNvPr>
+                <p:cNvSpPr txBox="1"/>
+                <p:nvPr/>
+              </p:nvSpPr>
+              <p:spPr>
+                <a:xfrm>
+                  <a:off x="6990381" y="3535312"/>
+                  <a:ext cx="261161" cy="430887"/>
+                </a:xfrm>
+                <a:prstGeom prst="rect">
+                  <a:avLst/>
+                </a:prstGeom>
+                <a:noFill/>
+              </p:spPr>
+              <p:txBody>
+                <a:bodyPr wrap="none" lIns="0" tIns="0" rIns="0" bIns="0" rtlCol="0">
+                  <a:spAutoFit/>
+                </a:bodyPr>
+                <a:lstStyle/>
+                <a:p>
+                  <a:pPr/>
+                  <a14:m>
+                    <m:oMathPara xmlns:m="http://schemas.openxmlformats.org/officeDocument/2006/math">
+                      <m:oMathParaPr>
+                        <m:jc m:val="centerGroup"/>
+                      </m:oMathParaPr>
+                      <m:oMath xmlns:m="http://schemas.openxmlformats.org/officeDocument/2006/math">
+                        <m:r>
+                          <a:rPr lang="en-US" sz="2800" b="0" i="1" smtClean="0">
+                            <a:latin typeface="Cambria Math" panose="02040503050406030204" pitchFamily="18" charset="0"/>
+                          </a:rPr>
+                          <m:t>𝑟</m:t>
+                        </m:r>
+                      </m:oMath>
+                    </m:oMathPara>
+                  </a14:m>
+                  <a:endParaRPr lang="en-US" sz="2800" dirty="0"/>
+                </a:p>
+              </p:txBody>
+            </p:sp>
+          </mc:Choice>
+          <mc:Fallback xmlns="">
+            <p:sp>
+              <p:nvSpPr>
+                <p:cNvPr id="89" name="TextBox 88">
+                  <a:extLst>
+                    <a:ext uri="{FF2B5EF4-FFF2-40B4-BE49-F238E27FC236}">
+                      <a16:creationId xmlns:a16="http://schemas.microsoft.com/office/drawing/2014/main" id="{B3288966-FDAB-4ABD-9308-C7D332C2287D}"/>
+                    </a:ext>
+                  </a:extLst>
+                </p:cNvPr>
+                <p:cNvSpPr txBox="1">
+                  <a:spLocks noRot="1" noChangeAspect="1" noMove="1" noResize="1" noEditPoints="1" noAdjustHandles="1" noChangeArrowheads="1" noChangeShapeType="1" noTextEdit="1"/>
+                </p:cNvSpPr>
+                <p:nvPr/>
+              </p:nvSpPr>
+              <p:spPr>
+                <a:xfrm>
+                  <a:off x="6990381" y="3535312"/>
+                  <a:ext cx="261161" cy="430887"/>
+                </a:xfrm>
+                <a:prstGeom prst="rect">
+                  <a:avLst/>
+                </a:prstGeom>
+                <a:blipFill>
+                  <a:blip r:embed="rId29"/>
+                  <a:stretch>
+                    <a:fillRect/>
+                  </a:stretch>
+                </a:blipFill>
+              </p:spPr>
+              <p:txBody>
+                <a:bodyPr/>
+                <a:lstStyle/>
+                <a:p>
+                  <a:r>
+                    <a:rPr lang="en-US">
+                      <a:noFill/>
+                    </a:rPr>
+                    <a:t> </a:t>
+                  </a:r>
+                </a:p>
+              </p:txBody>
+            </p:sp>
+          </mc:Fallback>
+        </mc:AlternateContent>
+        <p:cxnSp>
+          <p:nvCxnSpPr>
+            <p:cNvPr id="91" name="Straight Connector 90">
+              <a:extLst>
+                <a:ext uri="{FF2B5EF4-FFF2-40B4-BE49-F238E27FC236}">
+                  <a16:creationId xmlns:a16="http://schemas.microsoft.com/office/drawing/2014/main" id="{91E2EB83-DF9E-4EF1-B5EE-9680EFCAD318}"/>
+                </a:ext>
+              </a:extLst>
+            </p:cNvPr>
+            <p:cNvCxnSpPr>
+              <a:cxnSpLocks/>
+            </p:cNvCxnSpPr>
+            <p:nvPr/>
+          </p:nvCxnSpPr>
+          <p:spPr>
+            <a:xfrm>
+              <a:off x="6396357" y="3921375"/>
+              <a:ext cx="929228" cy="5246"/>
+            </a:xfrm>
+            <a:prstGeom prst="line">
+              <a:avLst/>
+            </a:prstGeom>
+            <a:ln w="12700">
+              <a:solidFill>
+                <a:schemeClr val="tx1"/>
+              </a:solidFill>
+            </a:ln>
+          </p:spPr>
+          <p:style>
+            <a:lnRef idx="1">
+              <a:schemeClr val="accent1"/>
+            </a:lnRef>
+            <a:fillRef idx="0">
+              <a:schemeClr val="accent1"/>
+            </a:fillRef>
+            <a:effectRef idx="0">
+              <a:schemeClr val="accent1"/>
+            </a:effectRef>
+            <a:fontRef idx="minor">
+              <a:schemeClr val="tx1"/>
+            </a:fontRef>
+          </p:style>
+        </p:cxnSp>
+        <p:sp>
+          <p:nvSpPr>
+            <p:cNvPr id="92" name="Oval 91">
+              <a:extLst>
+                <a:ext uri="{FF2B5EF4-FFF2-40B4-BE49-F238E27FC236}">
+                  <a16:creationId xmlns:a16="http://schemas.microsoft.com/office/drawing/2014/main" id="{826BD8D1-E526-413E-850B-C91C4143E77A}"/>
+                </a:ext>
+              </a:extLst>
+            </p:cNvPr>
+            <p:cNvSpPr/>
+            <p:nvPr/>
+          </p:nvSpPr>
+          <p:spPr>
+            <a:xfrm>
+              <a:off x="6350637" y="3383807"/>
+              <a:ext cx="1005840" cy="1005840"/>
+            </a:xfrm>
+            <a:prstGeom prst="ellipse">
+              <a:avLst/>
+            </a:prstGeom>
+            <a:noFill/>
+            <a:ln w="3175">
+              <a:solidFill>
+                <a:schemeClr val="tx1"/>
+              </a:solidFill>
+            </a:ln>
+          </p:spPr>
+          <p:style>
+            <a:lnRef idx="2">
+              <a:schemeClr val="accent1">
+                <a:shade val="50000"/>
+              </a:schemeClr>
+            </a:lnRef>
+            <a:fillRef idx="1">
+              <a:schemeClr val="accent1"/>
+            </a:fillRef>
+            <a:effectRef idx="0">
+              <a:schemeClr val="accent1"/>
+            </a:effectRef>
+            <a:fontRef idx="minor">
+              <a:schemeClr val="lt1"/>
+            </a:fontRef>
+          </p:style>
+          <p:txBody>
+            <a:bodyPr rtlCol="0" anchor="ctr"/>
+            <a:lstStyle/>
+            <a:p>
+              <a:pPr algn="ctr"/>
+              <a:endParaRPr lang="en-US" dirty="0"/>
+            </a:p>
+          </p:txBody>
+        </p:sp>
+        <p:sp>
+          <p:nvSpPr>
+            <p:cNvPr id="93" name="Oval 92">
+              <a:extLst>
+                <a:ext uri="{FF2B5EF4-FFF2-40B4-BE49-F238E27FC236}">
+                  <a16:creationId xmlns:a16="http://schemas.microsoft.com/office/drawing/2014/main" id="{D13F812D-48B3-4EED-BAB2-D41025317F3D}"/>
+                </a:ext>
+              </a:extLst>
+            </p:cNvPr>
+            <p:cNvSpPr/>
+            <p:nvPr/>
+          </p:nvSpPr>
+          <p:spPr>
+            <a:xfrm>
+              <a:off x="6304917" y="3344960"/>
+              <a:ext cx="1097280" cy="1097280"/>
+            </a:xfrm>
+            <a:prstGeom prst="ellipse">
+              <a:avLst/>
+            </a:prstGeom>
+            <a:noFill/>
+            <a:ln w="3175">
+              <a:solidFill>
+                <a:schemeClr val="tx1"/>
+              </a:solidFill>
+            </a:ln>
+          </p:spPr>
+          <p:style>
+            <a:lnRef idx="2">
+              <a:schemeClr val="accent1">
+                <a:shade val="50000"/>
+              </a:schemeClr>
+            </a:lnRef>
+            <a:fillRef idx="1">
+              <a:schemeClr val="accent1"/>
+            </a:fillRef>
+            <a:effectRef idx="0">
+              <a:schemeClr val="accent1"/>
+            </a:effectRef>
+            <a:fontRef idx="minor">
+              <a:schemeClr val="lt1"/>
+            </a:fontRef>
+          </p:style>
+          <p:txBody>
+            <a:bodyPr rtlCol="0" anchor="ctr"/>
+            <a:lstStyle/>
+            <a:p>
+              <a:pPr algn="ctr"/>
+              <a:endParaRPr lang="en-US" dirty="0"/>
+            </a:p>
+          </p:txBody>
+        </p:sp>
+        <p:sp>
+          <p:nvSpPr>
+            <p:cNvPr id="94" name="Oval 93">
+              <a:extLst>
+                <a:ext uri="{FF2B5EF4-FFF2-40B4-BE49-F238E27FC236}">
+                  <a16:creationId xmlns:a16="http://schemas.microsoft.com/office/drawing/2014/main" id="{E5D0449A-4450-4D6D-BA9F-6FFDCD374DB2}"/>
+                </a:ext>
+              </a:extLst>
+            </p:cNvPr>
+            <p:cNvSpPr/>
+            <p:nvPr/>
+          </p:nvSpPr>
+          <p:spPr>
+            <a:xfrm>
+              <a:off x="6266611" y="3299240"/>
+              <a:ext cx="1188720" cy="1188720"/>
+            </a:xfrm>
+            <a:prstGeom prst="ellipse">
+              <a:avLst/>
+            </a:prstGeom>
+            <a:noFill/>
+            <a:ln w="3175">
+              <a:solidFill>
+                <a:schemeClr val="tx1"/>
+              </a:solidFill>
+            </a:ln>
+          </p:spPr>
+          <p:style>
+            <a:lnRef idx="2">
+              <a:schemeClr val="accent1">
+                <a:shade val="50000"/>
+              </a:schemeClr>
+            </a:lnRef>
+            <a:fillRef idx="1">
+              <a:schemeClr val="accent1"/>
+            </a:fillRef>
+            <a:effectRef idx="0">
+              <a:schemeClr val="accent1"/>
+            </a:effectRef>
+            <a:fontRef idx="minor">
+              <a:schemeClr val="lt1"/>
+            </a:fontRef>
+          </p:style>
+          <p:txBody>
+            <a:bodyPr rtlCol="0" anchor="ctr"/>
+            <a:lstStyle/>
+            <a:p>
+              <a:pPr algn="ctr"/>
+              <a:endParaRPr lang="en-US" dirty="0"/>
+            </a:p>
+          </p:txBody>
+        </p:sp>
+        <p:sp>
+          <p:nvSpPr>
+            <p:cNvPr id="95" name="Oval 94">
+              <a:extLst>
+                <a:ext uri="{FF2B5EF4-FFF2-40B4-BE49-F238E27FC236}">
+                  <a16:creationId xmlns:a16="http://schemas.microsoft.com/office/drawing/2014/main" id="{D8239F45-AC5A-4AA7-9FE0-FDD051C93569}"/>
+                </a:ext>
+              </a:extLst>
+            </p:cNvPr>
+            <p:cNvSpPr/>
+            <p:nvPr/>
+          </p:nvSpPr>
+          <p:spPr>
+            <a:xfrm>
+              <a:off x="6213477" y="3253520"/>
+              <a:ext cx="1280160" cy="1280160"/>
+            </a:xfrm>
+            <a:prstGeom prst="ellipse">
+              <a:avLst/>
+            </a:prstGeom>
+            <a:noFill/>
+            <a:ln w="3175">
+              <a:solidFill>
+                <a:schemeClr val="tx1"/>
+              </a:solidFill>
+            </a:ln>
+          </p:spPr>
+          <p:style>
+            <a:lnRef idx="2">
+              <a:schemeClr val="accent1">
+                <a:shade val="50000"/>
+              </a:schemeClr>
+            </a:lnRef>
+            <a:fillRef idx="1">
+              <a:schemeClr val="accent1"/>
+            </a:fillRef>
+            <a:effectRef idx="0">
+              <a:schemeClr val="accent1"/>
+            </a:effectRef>
+            <a:fontRef idx="minor">
+              <a:schemeClr val="lt1"/>
+            </a:fontRef>
+          </p:style>
+          <p:txBody>
+            <a:bodyPr rtlCol="0" anchor="ctr"/>
+            <a:lstStyle/>
+            <a:p>
+              <a:pPr algn="ctr"/>
+              <a:endParaRPr lang="en-US" dirty="0"/>
+            </a:p>
+          </p:txBody>
+        </p:sp>
+        <p:sp>
+          <p:nvSpPr>
+            <p:cNvPr id="96" name="Oval 95">
+              <a:extLst>
+                <a:ext uri="{FF2B5EF4-FFF2-40B4-BE49-F238E27FC236}">
+                  <a16:creationId xmlns:a16="http://schemas.microsoft.com/office/drawing/2014/main" id="{9C8BAA64-C24F-474B-AA5B-0E3EF99CFC9E}"/>
+                </a:ext>
+              </a:extLst>
+            </p:cNvPr>
+            <p:cNvSpPr/>
+            <p:nvPr/>
+          </p:nvSpPr>
+          <p:spPr>
+            <a:xfrm>
+              <a:off x="6167757" y="3207800"/>
+              <a:ext cx="1371600" cy="1371600"/>
+            </a:xfrm>
+            <a:prstGeom prst="ellipse">
+              <a:avLst/>
+            </a:prstGeom>
+            <a:noFill/>
+            <a:ln w="3175">
+              <a:solidFill>
+                <a:schemeClr val="tx1"/>
+              </a:solidFill>
+            </a:ln>
+          </p:spPr>
+          <p:style>
+            <a:lnRef idx="2">
+              <a:schemeClr val="accent1">
+                <a:shade val="50000"/>
+              </a:schemeClr>
+            </a:lnRef>
+            <a:fillRef idx="1">
+              <a:schemeClr val="accent1"/>
+            </a:fillRef>
+            <a:effectRef idx="0">
+              <a:schemeClr val="accent1"/>
+            </a:effectRef>
+            <a:fontRef idx="minor">
+              <a:schemeClr val="lt1"/>
+            </a:fontRef>
+          </p:style>
+          <p:txBody>
+            <a:bodyPr rtlCol="0" anchor="ctr"/>
+            <a:lstStyle/>
+            <a:p>
+              <a:pPr algn="ctr"/>
+              <a:endParaRPr lang="en-US" dirty="0"/>
+            </a:p>
+          </p:txBody>
+        </p:sp>
+        <p:sp>
+          <p:nvSpPr>
+            <p:cNvPr id="97" name="Oval 96">
+              <a:extLst>
+                <a:ext uri="{FF2B5EF4-FFF2-40B4-BE49-F238E27FC236}">
+                  <a16:creationId xmlns:a16="http://schemas.microsoft.com/office/drawing/2014/main" id="{E1637195-240A-4569-8B6E-BBB0932F81E7}"/>
+                </a:ext>
+              </a:extLst>
+            </p:cNvPr>
+            <p:cNvSpPr/>
+            <p:nvPr/>
+          </p:nvSpPr>
+          <p:spPr>
+            <a:xfrm>
+              <a:off x="6129451" y="3173670"/>
+              <a:ext cx="1463040" cy="1463040"/>
+            </a:xfrm>
+            <a:prstGeom prst="ellipse">
+              <a:avLst/>
+            </a:prstGeom>
+            <a:noFill/>
+            <a:ln w="3175">
+              <a:solidFill>
+                <a:schemeClr val="tx1"/>
+              </a:solidFill>
+            </a:ln>
+          </p:spPr>
+          <p:style>
+            <a:lnRef idx="2">
+              <a:schemeClr val="accent1">
+                <a:shade val="50000"/>
+              </a:schemeClr>
+            </a:lnRef>
+            <a:fillRef idx="1">
+              <a:schemeClr val="accent1"/>
+            </a:fillRef>
+            <a:effectRef idx="0">
+              <a:schemeClr val="accent1"/>
+            </a:effectRef>
+            <a:fontRef idx="minor">
+              <a:schemeClr val="lt1"/>
+            </a:fontRef>
+          </p:style>
+          <p:txBody>
+            <a:bodyPr rtlCol="0" anchor="ctr"/>
+            <a:lstStyle/>
+            <a:p>
+              <a:pPr algn="ctr"/>
+              <a:endParaRPr lang="en-US" dirty="0"/>
+            </a:p>
+          </p:txBody>
+        </p:sp>
+        <p:sp>
+          <p:nvSpPr>
+            <p:cNvPr id="98" name="Oval 97">
+              <a:extLst>
+                <a:ext uri="{FF2B5EF4-FFF2-40B4-BE49-F238E27FC236}">
+                  <a16:creationId xmlns:a16="http://schemas.microsoft.com/office/drawing/2014/main" id="{ACFC443D-BAF0-4B19-ABD6-4133DF4E0787}"/>
+                </a:ext>
+              </a:extLst>
+            </p:cNvPr>
+            <p:cNvSpPr/>
+            <p:nvPr/>
+          </p:nvSpPr>
+          <p:spPr>
+            <a:xfrm>
+              <a:off x="6083731" y="3134887"/>
+              <a:ext cx="1554480" cy="1554480"/>
+            </a:xfrm>
+            <a:prstGeom prst="ellipse">
+              <a:avLst/>
+            </a:prstGeom>
+            <a:noFill/>
+            <a:ln w="3175">
+              <a:solidFill>
+                <a:schemeClr val="tx1"/>
+              </a:solidFill>
+            </a:ln>
+          </p:spPr>
+          <p:style>
+            <a:lnRef idx="2">
+              <a:schemeClr val="accent1">
+                <a:shade val="50000"/>
+              </a:schemeClr>
+            </a:lnRef>
+            <a:fillRef idx="1">
+              <a:schemeClr val="accent1"/>
+            </a:fillRef>
+            <a:effectRef idx="0">
+              <a:schemeClr val="accent1"/>
+            </a:effectRef>
+            <a:fontRef idx="minor">
+              <a:schemeClr val="lt1"/>
+            </a:fontRef>
+          </p:style>
+          <p:txBody>
+            <a:bodyPr rtlCol="0" anchor="ctr"/>
+            <a:lstStyle/>
+            <a:p>
+              <a:pPr algn="ctr"/>
+              <a:endParaRPr lang="en-US" dirty="0"/>
+            </a:p>
+          </p:txBody>
+        </p:sp>
+        <p:sp>
+          <p:nvSpPr>
+            <p:cNvPr id="99" name="Oval 98">
+              <a:extLst>
+                <a:ext uri="{FF2B5EF4-FFF2-40B4-BE49-F238E27FC236}">
+                  <a16:creationId xmlns:a16="http://schemas.microsoft.com/office/drawing/2014/main" id="{F990C5B8-5350-4448-9C38-0E1CCFF194BE}"/>
+                </a:ext>
+              </a:extLst>
+            </p:cNvPr>
+            <p:cNvSpPr/>
+            <p:nvPr/>
+          </p:nvSpPr>
+          <p:spPr>
+            <a:xfrm>
+              <a:off x="6038011" y="3079298"/>
+              <a:ext cx="1645920" cy="1645920"/>
+            </a:xfrm>
+            <a:prstGeom prst="ellipse">
+              <a:avLst/>
+            </a:prstGeom>
+            <a:noFill/>
+            <a:ln w="3175">
+              <a:solidFill>
+                <a:schemeClr val="tx1"/>
+              </a:solidFill>
+            </a:ln>
+          </p:spPr>
+          <p:style>
+            <a:lnRef idx="2">
+              <a:schemeClr val="accent1">
+                <a:shade val="50000"/>
+              </a:schemeClr>
+            </a:lnRef>
+            <a:fillRef idx="1">
+              <a:schemeClr val="accent1"/>
+            </a:fillRef>
+            <a:effectRef idx="0">
+              <a:schemeClr val="accent1"/>
+            </a:effectRef>
+            <a:fontRef idx="minor">
+              <a:schemeClr val="lt1"/>
+            </a:fontRef>
+          </p:style>
+          <p:txBody>
+            <a:bodyPr rtlCol="0" anchor="ctr"/>
+            <a:lstStyle/>
+            <a:p>
+              <a:pPr algn="ctr"/>
+              <a:endParaRPr lang="en-US" dirty="0"/>
+            </a:p>
+          </p:txBody>
+        </p:sp>
+        <p:sp>
+          <p:nvSpPr>
+            <p:cNvPr id="101" name="Oval 100">
+              <a:extLst>
+                <a:ext uri="{FF2B5EF4-FFF2-40B4-BE49-F238E27FC236}">
+                  <a16:creationId xmlns:a16="http://schemas.microsoft.com/office/drawing/2014/main" id="{854417B7-0360-49B1-A579-B88A67999A15}"/>
+                </a:ext>
+              </a:extLst>
+            </p:cNvPr>
+            <p:cNvSpPr/>
+            <p:nvPr/>
+          </p:nvSpPr>
+          <p:spPr>
+            <a:xfrm>
+              <a:off x="5987088" y="3043447"/>
+              <a:ext cx="1737360" cy="1737360"/>
+            </a:xfrm>
+            <a:prstGeom prst="ellipse">
+              <a:avLst/>
+            </a:prstGeom>
+            <a:noFill/>
+            <a:ln w="3175">
+              <a:solidFill>
+                <a:schemeClr val="tx1"/>
+              </a:solidFill>
+            </a:ln>
+          </p:spPr>
+          <p:style>
+            <a:lnRef idx="2">
+              <a:schemeClr val="accent1">
+                <a:shade val="50000"/>
+              </a:schemeClr>
+            </a:lnRef>
+            <a:fillRef idx="1">
+              <a:schemeClr val="accent1"/>
+            </a:fillRef>
+            <a:effectRef idx="0">
+              <a:schemeClr val="accent1"/>
+            </a:effectRef>
+            <a:fontRef idx="minor">
+              <a:schemeClr val="lt1"/>
+            </a:fontRef>
+          </p:style>
+          <p:txBody>
+            <a:bodyPr rtlCol="0" anchor="ctr"/>
+            <a:lstStyle/>
+            <a:p>
+              <a:pPr algn="ctr"/>
+              <a:endParaRPr lang="en-US" dirty="0"/>
+            </a:p>
+          </p:txBody>
+        </p:sp>
+        <p:sp>
+          <p:nvSpPr>
+            <p:cNvPr id="102" name="Oval 101">
+              <a:extLst>
+                <a:ext uri="{FF2B5EF4-FFF2-40B4-BE49-F238E27FC236}">
+                  <a16:creationId xmlns:a16="http://schemas.microsoft.com/office/drawing/2014/main" id="{6D089FBC-79D6-4D2F-82C1-03C1AFE44BC1}"/>
+                </a:ext>
+              </a:extLst>
+            </p:cNvPr>
+            <p:cNvSpPr/>
+            <p:nvPr/>
+          </p:nvSpPr>
+          <p:spPr>
+            <a:xfrm>
+              <a:off x="5934979" y="3012221"/>
+              <a:ext cx="1828800" cy="1828800"/>
+            </a:xfrm>
+            <a:prstGeom prst="ellipse">
+              <a:avLst/>
+            </a:prstGeom>
+            <a:noFill/>
+            <a:ln w="3175">
+              <a:solidFill>
+                <a:schemeClr val="tx1"/>
+              </a:solidFill>
+            </a:ln>
+          </p:spPr>
+          <p:style>
+            <a:lnRef idx="2">
+              <a:schemeClr val="accent1">
+                <a:shade val="50000"/>
+              </a:schemeClr>
+            </a:lnRef>
+            <a:fillRef idx="1">
+              <a:schemeClr val="accent1"/>
+            </a:fillRef>
+            <a:effectRef idx="0">
+              <a:schemeClr val="accent1"/>
+            </a:effectRef>
+            <a:fontRef idx="minor">
+              <a:schemeClr val="lt1"/>
+            </a:fontRef>
+          </p:style>
+          <p:txBody>
+            <a:bodyPr rtlCol="0" anchor="ctr"/>
+            <a:lstStyle/>
+            <a:p>
+              <a:pPr algn="ctr"/>
+              <a:endParaRPr lang="en-US" dirty="0"/>
+            </a:p>
+          </p:txBody>
+        </p:sp>
+        <p:sp>
+          <p:nvSpPr>
+            <p:cNvPr id="103" name="Oval 102">
+              <a:extLst>
+                <a:ext uri="{FF2B5EF4-FFF2-40B4-BE49-F238E27FC236}">
+                  <a16:creationId xmlns:a16="http://schemas.microsoft.com/office/drawing/2014/main" id="{284E37CF-7FB6-43D2-903D-FF6155BAE6C9}"/>
+                </a:ext>
+              </a:extLst>
+            </p:cNvPr>
+            <p:cNvSpPr/>
+            <p:nvPr/>
+          </p:nvSpPr>
+          <p:spPr>
+            <a:xfrm>
+              <a:off x="5895648" y="2966501"/>
+              <a:ext cx="1920240" cy="1920240"/>
+            </a:xfrm>
+            <a:prstGeom prst="ellipse">
+              <a:avLst/>
+            </a:prstGeom>
+            <a:noFill/>
+            <a:ln w="3175">
+              <a:solidFill>
+                <a:schemeClr val="tx1"/>
+              </a:solidFill>
+            </a:ln>
+          </p:spPr>
+          <p:style>
+            <a:lnRef idx="2">
+              <a:schemeClr val="accent1">
+                <a:shade val="50000"/>
+              </a:schemeClr>
+            </a:lnRef>
+            <a:fillRef idx="1">
+              <a:schemeClr val="accent1"/>
+            </a:fillRef>
+            <a:effectRef idx="0">
+              <a:schemeClr val="accent1"/>
+            </a:effectRef>
+            <a:fontRef idx="minor">
+              <a:schemeClr val="lt1"/>
+            </a:fontRef>
+          </p:style>
+          <p:txBody>
+            <a:bodyPr rtlCol="0" anchor="ctr"/>
+            <a:lstStyle/>
+            <a:p>
+              <a:pPr algn="ctr"/>
+              <a:endParaRPr lang="en-US" dirty="0"/>
+            </a:p>
+          </p:txBody>
+        </p:sp>
+        <p:sp>
+          <p:nvSpPr>
+            <p:cNvPr id="104" name="Oval 103">
+              <a:extLst>
+                <a:ext uri="{FF2B5EF4-FFF2-40B4-BE49-F238E27FC236}">
+                  <a16:creationId xmlns:a16="http://schemas.microsoft.com/office/drawing/2014/main" id="{D0E292A5-B5E1-4F1B-9669-66519B2DE8AD}"/>
+                </a:ext>
+              </a:extLst>
+            </p:cNvPr>
+            <p:cNvSpPr/>
+            <p:nvPr/>
+          </p:nvSpPr>
+          <p:spPr>
+            <a:xfrm>
+              <a:off x="5842380" y="2920781"/>
+              <a:ext cx="2011680" cy="2011680"/>
+            </a:xfrm>
+            <a:prstGeom prst="ellipse">
+              <a:avLst/>
+            </a:prstGeom>
+            <a:noFill/>
+            <a:ln w="3175">
+              <a:solidFill>
+                <a:schemeClr val="tx1"/>
+              </a:solidFill>
+            </a:ln>
+          </p:spPr>
+          <p:style>
+            <a:lnRef idx="2">
+              <a:schemeClr val="accent1">
+                <a:shade val="50000"/>
+              </a:schemeClr>
+            </a:lnRef>
+            <a:fillRef idx="1">
+              <a:schemeClr val="accent1"/>
+            </a:fillRef>
+            <a:effectRef idx="0">
+              <a:schemeClr val="accent1"/>
+            </a:effectRef>
+            <a:fontRef idx="minor">
+              <a:schemeClr val="lt1"/>
+            </a:fontRef>
+          </p:style>
+          <p:txBody>
+            <a:bodyPr rtlCol="0" anchor="ctr"/>
+            <a:lstStyle/>
+            <a:p>
+              <a:pPr algn="ctr"/>
+              <a:endParaRPr lang="en-US" dirty="0"/>
+            </a:p>
+          </p:txBody>
+        </p:sp>
+      </p:grpSp>
+    </p:spTree>
+    <p:extLst>
+      <p:ext uri="{BB962C8B-B14F-4D97-AF65-F5344CB8AC3E}">
+        <p14:creationId xmlns:p14="http://schemas.microsoft.com/office/powerpoint/2010/main" val="1797459676"/>
+      </p:ext>
+    </p:extLst>
+  </p:cSld>
+  <p:clrMapOvr>
+    <a:masterClrMapping/>
+  </p:clrMapOvr>
+</p:sld>
+</file>
+
+<file path=ppt/slides/slide13.xml><?xml version="1.0" encoding="utf-8"?>
+<p:sld xmlns:a="http://schemas.openxmlformats.org/drawingml/2006/main" xmlns:r="http://schemas.openxmlformats.org/officeDocument/2006/relationships" xmlns:p="http://schemas.openxmlformats.org/presentationml/2006/main">
+  <p:cSld>
+    <p:spTree>
+      <p:nvGrpSpPr>
+        <p:cNvPr id="1" name=""/>
+        <p:cNvGrpSpPr/>
+        <p:nvPr/>
+      </p:nvGrpSpPr>
+      <p:grpSpPr>
+        <a:xfrm>
+          <a:off x="0" y="0"/>
+          <a:ext cx="0" cy="0"/>
+          <a:chOff x="0" y="0"/>
+          <a:chExt cx="0" cy="0"/>
+        </a:xfrm>
+      </p:grpSpPr>
+      <p:grpSp>
+        <p:nvGrpSpPr>
+          <p:cNvPr id="9" name="Group 8">
             <a:extLst>
               <a:ext uri="{FF2B5EF4-FFF2-40B4-BE49-F238E27FC236}">
-                <a16:creationId xmlns:a16="http://schemas.microsoft.com/office/drawing/2014/main" id="{DC146B36-BFAC-46A6-8819-0B9BF9A19278}"/>
+                <a16:creationId xmlns:a16="http://schemas.microsoft.com/office/drawing/2014/main" id="{AAB2E7B9-FACB-4F34-9BC4-8A9E1E14031E}"/>
               </a:ext>
             </a:extLst>
           </p:cNvPr>
-          <p:cNvCxnSpPr>
-            <a:cxnSpLocks/>
-          </p:cNvCxnSpPr>
+          <p:cNvGrpSpPr/>
           <p:nvPr/>
-        </p:nvCxnSpPr>
-        <p:spPr>
-          <a:xfrm flipH="1">
-            <a:off x="6879427" y="3926621"/>
-            <a:ext cx="446158" cy="0"/>
+        </p:nvGrpSpPr>
+        <p:grpSpPr>
+          <a:xfrm>
+            <a:off x="7121153" y="-249399"/>
+            <a:ext cx="4918842" cy="1222989"/>
+            <a:chOff x="5555244" y="389298"/>
+            <a:chExt cx="4918842" cy="1222989"/>
           </a:xfrm>
-          <a:prstGeom prst="straightConnector1">
-            <a:avLst/>
-          </a:prstGeom>
-          <a:ln w="25400">
+        </p:grpSpPr>
+        <p:sp>
+          <p:nvSpPr>
+            <p:cNvPr id="3" name="Cylinder 2">
+              <a:extLst>
+                <a:ext uri="{FF2B5EF4-FFF2-40B4-BE49-F238E27FC236}">
+                  <a16:creationId xmlns:a16="http://schemas.microsoft.com/office/drawing/2014/main" id="{D95A2A74-60F4-4231-BF75-4AE58C55E3B1}"/>
+                </a:ext>
+              </a:extLst>
+            </p:cNvPr>
+            <p:cNvSpPr/>
+            <p:nvPr/>
+          </p:nvSpPr>
+          <p:spPr>
+            <a:xfrm rot="5400000">
+              <a:off x="7719061" y="-1142737"/>
+              <a:ext cx="591207" cy="4918842"/>
+            </a:xfrm>
+            <a:prstGeom prst="can">
+              <a:avLst/>
+            </a:prstGeom>
+            <a:gradFill flip="none" rotWithShape="1">
+              <a:gsLst>
+                <a:gs pos="0">
+                  <a:schemeClr val="accent5">
+                    <a:lumMod val="89000"/>
+                  </a:schemeClr>
+                </a:gs>
+                <a:gs pos="22000">
+                  <a:schemeClr val="accent5">
+                    <a:lumMod val="89000"/>
+                  </a:schemeClr>
+                </a:gs>
+                <a:gs pos="74000">
+                  <a:schemeClr val="accent5">
+                    <a:lumMod val="75000"/>
+                  </a:schemeClr>
+                </a:gs>
+                <a:gs pos="97000">
+                  <a:schemeClr val="accent5">
+                    <a:lumMod val="70000"/>
+                  </a:schemeClr>
+                </a:gs>
+              </a:gsLst>
+              <a:path path="circle">
+                <a:fillToRect l="50000" t="50000" r="50000" b="50000"/>
+              </a:path>
+              <a:tileRect/>
+            </a:gradFill>
+            <a:ln>
+              <a:solidFill>
+                <a:schemeClr val="tx1"/>
+              </a:solidFill>
+            </a:ln>
+          </p:spPr>
+          <p:style>
+            <a:lnRef idx="2">
+              <a:schemeClr val="accent1">
+                <a:shade val="50000"/>
+              </a:schemeClr>
+            </a:lnRef>
+            <a:fillRef idx="1">
+              <a:schemeClr val="accent1"/>
+            </a:fillRef>
+            <a:effectRef idx="0">
+              <a:schemeClr val="accent1"/>
+            </a:effectRef>
+            <a:fontRef idx="minor">
+              <a:schemeClr val="lt1"/>
+            </a:fontRef>
+          </p:style>
+          <p:txBody>
+            <a:bodyPr rtlCol="0" anchor="ctr"/>
+            <a:lstStyle/>
+            <a:p>
+              <a:pPr algn="ctr"/>
+              <a:endParaRPr lang="en-US"/>
+            </a:p>
+          </p:txBody>
+        </p:sp>
+        <p:sp>
+          <p:nvSpPr>
+            <p:cNvPr id="4" name="Cylinder 3">
+              <a:extLst>
+                <a:ext uri="{FF2B5EF4-FFF2-40B4-BE49-F238E27FC236}">
+                  <a16:creationId xmlns:a16="http://schemas.microsoft.com/office/drawing/2014/main" id="{3778860F-C6AD-4F93-81E8-ED92764B414F}"/>
+                </a:ext>
+              </a:extLst>
+            </p:cNvPr>
+            <p:cNvSpPr/>
+            <p:nvPr/>
+          </p:nvSpPr>
+          <p:spPr>
+            <a:xfrm rot="5400000">
+              <a:off x="8023073" y="755169"/>
+              <a:ext cx="591207" cy="1123030"/>
+            </a:xfrm>
+            <a:prstGeom prst="can">
+              <a:avLst/>
+            </a:prstGeom>
             <a:solidFill>
+              <a:schemeClr val="bg2">
+                <a:lumMod val="90000"/>
+                <a:alpha val="29000"/>
+              </a:schemeClr>
+            </a:solidFill>
+            <a:ln w="34925">
+              <a:solidFill>
+                <a:schemeClr val="tx1">
+                  <a:alpha val="98000"/>
+                </a:schemeClr>
+              </a:solidFill>
+              <a:prstDash val="dash"/>
+            </a:ln>
+          </p:spPr>
+          <p:style>
+            <a:lnRef idx="2">
+              <a:schemeClr val="accent1">
+                <a:shade val="50000"/>
+              </a:schemeClr>
+            </a:lnRef>
+            <a:fillRef idx="1">
+              <a:schemeClr val="accent1"/>
+            </a:fillRef>
+            <a:effectRef idx="0">
+              <a:schemeClr val="accent1"/>
+            </a:effectRef>
+            <a:fontRef idx="minor">
+              <a:schemeClr val="lt1"/>
+            </a:fontRef>
+          </p:style>
+          <p:txBody>
+            <a:bodyPr rtlCol="0" anchor="ctr"/>
+            <a:lstStyle/>
+            <a:p>
+              <a:pPr algn="ctr"/>
+              <a:endParaRPr lang="en-US"/>
+            </a:p>
+          </p:txBody>
+        </p:sp>
+        <mc:AlternateContent xmlns:mc="http://schemas.openxmlformats.org/markup-compatibility/2006" xmlns:a14="http://schemas.microsoft.com/office/drawing/2010/main">
+          <mc:Choice Requires="a14">
+            <p:sp>
+              <p:nvSpPr>
+                <p:cNvPr id="5" name="TextBox 4">
+                  <a:extLst>
+                    <a:ext uri="{FF2B5EF4-FFF2-40B4-BE49-F238E27FC236}">
+                      <a16:creationId xmlns:a16="http://schemas.microsoft.com/office/drawing/2014/main" id="{58820029-EC4B-4DB5-97A7-B9E4569E88A1}"/>
+                    </a:ext>
+                  </a:extLst>
+                </p:cNvPr>
+                <p:cNvSpPr txBox="1"/>
+                <p:nvPr/>
+              </p:nvSpPr>
+              <p:spPr>
+                <a:xfrm>
+                  <a:off x="8126732" y="1178184"/>
+                  <a:ext cx="383888" cy="276999"/>
+                </a:xfrm>
+                <a:prstGeom prst="rect">
+                  <a:avLst/>
+                </a:prstGeom>
+                <a:noFill/>
+              </p:spPr>
+              <p:txBody>
+                <a:bodyPr wrap="none" lIns="0" tIns="0" rIns="0" bIns="0" rtlCol="0">
+                  <a:spAutoFit/>
+                </a:bodyPr>
+                <a:lstStyle/>
+                <a:p>
+                  <a:pPr/>
+                  <a14:m>
+                    <m:oMathPara xmlns:m="http://schemas.openxmlformats.org/officeDocument/2006/math">
+                      <m:oMathParaPr>
+                        <m:jc m:val="centerGroup"/>
+                      </m:oMathParaPr>
+                      <m:oMath xmlns:m="http://schemas.openxmlformats.org/officeDocument/2006/math">
+                        <m:r>
+                          <a:rPr lang="en-US" b="0" i="1" smtClean="0">
+                            <a:latin typeface="Cambria Math" panose="02040503050406030204" pitchFamily="18" charset="0"/>
+                          </a:rPr>
+                          <m:t>𝑑𝑚</m:t>
+                        </m:r>
+                      </m:oMath>
+                    </m:oMathPara>
+                  </a14:m>
+                  <a:endParaRPr lang="en-US" dirty="0"/>
+                </a:p>
+              </p:txBody>
+            </p:sp>
+          </mc:Choice>
+          <mc:Fallback xmlns="">
+            <p:sp>
+              <p:nvSpPr>
+                <p:cNvPr id="5" name="TextBox 4">
+                  <a:extLst>
+                    <a:ext uri="{FF2B5EF4-FFF2-40B4-BE49-F238E27FC236}">
+                      <a16:creationId xmlns:a16="http://schemas.microsoft.com/office/drawing/2014/main" id="{58820029-EC4B-4DB5-97A7-B9E4569E88A1}"/>
+                    </a:ext>
+                  </a:extLst>
+                </p:cNvPr>
+                <p:cNvSpPr txBox="1">
+                  <a:spLocks noRot="1" noChangeAspect="1" noMove="1" noResize="1" noEditPoints="1" noAdjustHandles="1" noChangeArrowheads="1" noChangeShapeType="1" noTextEdit="1"/>
+                </p:cNvSpPr>
+                <p:nvPr/>
+              </p:nvSpPr>
+              <p:spPr>
+                <a:xfrm>
+                  <a:off x="8126732" y="1178184"/>
+                  <a:ext cx="383888" cy="276999"/>
+                </a:xfrm>
+                <a:prstGeom prst="rect">
+                  <a:avLst/>
+                </a:prstGeom>
+                <a:blipFill>
+                  <a:blip r:embed="rId2"/>
+                  <a:stretch>
+                    <a:fillRect l="-15873" r="-14286" b="-6522"/>
+                  </a:stretch>
+                </a:blipFill>
+              </p:spPr>
+              <p:txBody>
+                <a:bodyPr/>
+                <a:lstStyle/>
+                <a:p>
+                  <a:r>
+                    <a:rPr lang="en-US">
+                      <a:noFill/>
+                    </a:rPr>
+                    <a:t> </a:t>
+                  </a:r>
+                </a:p>
+              </p:txBody>
+            </p:sp>
+          </mc:Fallback>
+        </mc:AlternateContent>
+        <p:sp>
+          <p:nvSpPr>
+            <p:cNvPr id="6" name="Left Brace 5">
+              <a:extLst>
+                <a:ext uri="{FF2B5EF4-FFF2-40B4-BE49-F238E27FC236}">
+                  <a16:creationId xmlns:a16="http://schemas.microsoft.com/office/drawing/2014/main" id="{0F2ED4DB-E6AB-472E-B253-F2577859B302}"/>
+                </a:ext>
+              </a:extLst>
+            </p:cNvPr>
+            <p:cNvSpPr/>
+            <p:nvPr/>
+          </p:nvSpPr>
+          <p:spPr>
+            <a:xfrm rot="5400000">
+              <a:off x="8218980" y="416599"/>
+              <a:ext cx="199391" cy="1011267"/>
+            </a:xfrm>
+            <a:prstGeom prst="leftBrace">
+              <a:avLst>
+                <a:gd name="adj1" fmla="val 56103"/>
+                <a:gd name="adj2" fmla="val 48493"/>
+              </a:avLst>
+            </a:prstGeom>
+            <a:ln w="28575">
+              <a:solidFill>
+                <a:schemeClr val="tx1"/>
+              </a:solidFill>
+            </a:ln>
+          </p:spPr>
+          <p:style>
+            <a:lnRef idx="1">
+              <a:schemeClr val="accent1"/>
+            </a:lnRef>
+            <a:fillRef idx="0">
+              <a:schemeClr val="accent1"/>
+            </a:fillRef>
+            <a:effectRef idx="0">
+              <a:schemeClr val="accent1"/>
+            </a:effectRef>
+            <a:fontRef idx="minor">
               <a:schemeClr val="tx1"/>
-            </a:solidFill>
-            <a:headEnd type="stealth" w="lg" len="lg"/>
-            <a:tailEnd type="stealth" w="lg" len="lg"/>
-          </a:ln>
-        </p:spPr>
-        <p:style>
-          <a:lnRef idx="1">
-            <a:schemeClr val="accent1"/>
-          </a:lnRef>
-          <a:fillRef idx="0">
-            <a:schemeClr val="accent1"/>
-          </a:fillRef>
-          <a:effectRef idx="0">
-            <a:schemeClr val="accent1"/>
-          </a:effectRef>
-          <a:fontRef idx="minor">
-            <a:schemeClr val="tx1"/>
-          </a:fontRef>
-        </p:style>
-      </p:cxnSp>
-      <p:cxnSp>
-        <p:nvCxnSpPr>
-          <p:cNvPr id="70" name="Straight Connector 69">
+            </a:fontRef>
+          </p:style>
+          <p:txBody>
+            <a:bodyPr rtlCol="0" anchor="ctr"/>
+            <a:lstStyle/>
+            <a:p>
+              <a:pPr algn="ctr"/>
+              <a:endParaRPr lang="en-US"/>
+            </a:p>
+          </p:txBody>
+        </p:sp>
+        <mc:AlternateContent xmlns:mc="http://schemas.openxmlformats.org/markup-compatibility/2006" xmlns:a14="http://schemas.microsoft.com/office/drawing/2010/main">
+          <mc:Choice Requires="a14">
+            <p:sp>
+              <p:nvSpPr>
+                <p:cNvPr id="7" name="TextBox 6">
+                  <a:extLst>
+                    <a:ext uri="{FF2B5EF4-FFF2-40B4-BE49-F238E27FC236}">
+                      <a16:creationId xmlns:a16="http://schemas.microsoft.com/office/drawing/2014/main" id="{4E7E515C-EF54-40AD-BEFA-5FDBA3D15A56}"/>
+                    </a:ext>
+                  </a:extLst>
+                </p:cNvPr>
+                <p:cNvSpPr txBox="1"/>
+                <p:nvPr/>
+              </p:nvSpPr>
+              <p:spPr>
+                <a:xfrm>
+                  <a:off x="8194251" y="467410"/>
+                  <a:ext cx="316369" cy="276999"/>
+                </a:xfrm>
+                <a:prstGeom prst="rect">
+                  <a:avLst/>
+                </a:prstGeom>
+                <a:noFill/>
+              </p:spPr>
+              <p:txBody>
+                <a:bodyPr wrap="none" lIns="0" tIns="0" rIns="0" bIns="0" rtlCol="0">
+                  <a:spAutoFit/>
+                </a:bodyPr>
+                <a:lstStyle/>
+                <a:p>
+                  <a:pPr/>
+                  <a14:m>
+                    <m:oMathPara xmlns:m="http://schemas.openxmlformats.org/officeDocument/2006/math">
+                      <m:oMathParaPr>
+                        <m:jc m:val="centerGroup"/>
+                      </m:oMathParaPr>
+                      <m:oMath xmlns:m="http://schemas.openxmlformats.org/officeDocument/2006/math">
+                        <m:r>
+                          <a:rPr lang="en-US" b="0" i="1" smtClean="0">
+                            <a:latin typeface="Cambria Math" panose="02040503050406030204" pitchFamily="18" charset="0"/>
+                          </a:rPr>
+                          <m:t>𝑑𝑥</m:t>
+                        </m:r>
+                      </m:oMath>
+                    </m:oMathPara>
+                  </a14:m>
+                  <a:endParaRPr lang="en-US" dirty="0"/>
+                </a:p>
+              </p:txBody>
+            </p:sp>
+          </mc:Choice>
+          <mc:Fallback xmlns="">
+            <p:sp>
+              <p:nvSpPr>
+                <p:cNvPr id="7" name="TextBox 6">
+                  <a:extLst>
+                    <a:ext uri="{FF2B5EF4-FFF2-40B4-BE49-F238E27FC236}">
+                      <a16:creationId xmlns:a16="http://schemas.microsoft.com/office/drawing/2014/main" id="{4E7E515C-EF54-40AD-BEFA-5FDBA3D15A56}"/>
+                    </a:ext>
+                  </a:extLst>
+                </p:cNvPr>
+                <p:cNvSpPr txBox="1">
+                  <a:spLocks noRot="1" noChangeAspect="1" noMove="1" noResize="1" noEditPoints="1" noAdjustHandles="1" noChangeArrowheads="1" noChangeShapeType="1" noTextEdit="1"/>
+                </p:cNvSpPr>
+                <p:nvPr/>
+              </p:nvSpPr>
+              <p:spPr>
+                <a:xfrm>
+                  <a:off x="8194251" y="467410"/>
+                  <a:ext cx="316369" cy="276999"/>
+                </a:xfrm>
+                <a:prstGeom prst="rect">
+                  <a:avLst/>
+                </a:prstGeom>
+                <a:blipFill>
+                  <a:blip r:embed="rId3"/>
+                  <a:stretch>
+                    <a:fillRect l="-17308" r="-17308" b="-8889"/>
+                  </a:stretch>
+                </a:blipFill>
+              </p:spPr>
+              <p:txBody>
+                <a:bodyPr/>
+                <a:lstStyle/>
+                <a:p>
+                  <a:r>
+                    <a:rPr lang="en-US">
+                      <a:noFill/>
+                    </a:rPr>
+                    <a:t> </a:t>
+                  </a:r>
+                </a:p>
+              </p:txBody>
+            </p:sp>
+          </mc:Fallback>
+        </mc:AlternateContent>
+        <p:cxnSp>
+          <p:nvCxnSpPr>
+            <p:cNvPr id="8" name="Straight Arrow Connector 7">
+              <a:extLst>
+                <a:ext uri="{FF2B5EF4-FFF2-40B4-BE49-F238E27FC236}">
+                  <a16:creationId xmlns:a16="http://schemas.microsoft.com/office/drawing/2014/main" id="{85BA1BBA-C8B0-4805-9B73-A410929BE109}"/>
+                </a:ext>
+              </a:extLst>
+            </p:cNvPr>
+            <p:cNvCxnSpPr>
+              <a:cxnSpLocks/>
+            </p:cNvCxnSpPr>
+            <p:nvPr/>
+          </p:nvCxnSpPr>
+          <p:spPr>
+            <a:xfrm>
+              <a:off x="8805897" y="1316683"/>
+              <a:ext cx="503840" cy="0"/>
+            </a:xfrm>
+            <a:prstGeom prst="straightConnector1">
+              <a:avLst/>
+            </a:prstGeom>
+            <a:ln w="25400">
+              <a:solidFill>
+                <a:schemeClr val="tx1"/>
+              </a:solidFill>
+              <a:headEnd type="none" w="lg" len="lg"/>
+              <a:tailEnd type="stealth" w="lg" len="lg"/>
+            </a:ln>
+          </p:spPr>
+          <p:style>
+            <a:lnRef idx="1">
+              <a:schemeClr val="accent1"/>
+            </a:lnRef>
+            <a:fillRef idx="0">
+              <a:schemeClr val="accent1"/>
+            </a:fillRef>
+            <a:effectRef idx="0">
+              <a:schemeClr val="accent1"/>
+            </a:effectRef>
+            <a:fontRef idx="minor">
+              <a:schemeClr val="tx1"/>
+            </a:fontRef>
+          </p:style>
+        </p:cxnSp>
+        <p:cxnSp>
+          <p:nvCxnSpPr>
+            <p:cNvPr id="12" name="Straight Arrow Connector 11">
+              <a:extLst>
+                <a:ext uri="{FF2B5EF4-FFF2-40B4-BE49-F238E27FC236}">
+                  <a16:creationId xmlns:a16="http://schemas.microsoft.com/office/drawing/2014/main" id="{A10EDC5A-4CBF-4C78-9E24-F67557D044E8}"/>
+                </a:ext>
+              </a:extLst>
+            </p:cNvPr>
+            <p:cNvCxnSpPr>
+              <a:cxnSpLocks/>
+              <a:stCxn id="4" idx="3"/>
+            </p:cNvCxnSpPr>
+            <p:nvPr/>
+          </p:nvCxnSpPr>
+          <p:spPr>
+            <a:xfrm flipH="1" flipV="1">
+              <a:off x="7212003" y="1316683"/>
+              <a:ext cx="545159" cy="2"/>
+            </a:xfrm>
+            <a:prstGeom prst="straightConnector1">
+              <a:avLst/>
+            </a:prstGeom>
+            <a:ln w="22225">
+              <a:solidFill>
+                <a:schemeClr val="tx1"/>
+              </a:solidFill>
+              <a:headEnd type="none" w="lg" len="lg"/>
+              <a:tailEnd type="stealth" w="lg" len="lg"/>
+            </a:ln>
+          </p:spPr>
+          <p:style>
+            <a:lnRef idx="1">
+              <a:schemeClr val="accent1"/>
+            </a:lnRef>
+            <a:fillRef idx="0">
+              <a:schemeClr val="accent1"/>
+            </a:fillRef>
+            <a:effectRef idx="0">
+              <a:schemeClr val="accent1"/>
+            </a:effectRef>
+            <a:fontRef idx="minor">
+              <a:schemeClr val="tx1"/>
+            </a:fontRef>
+          </p:style>
+        </p:cxnSp>
+        <mc:AlternateContent xmlns:mc="http://schemas.openxmlformats.org/markup-compatibility/2006" xmlns:a14="http://schemas.microsoft.com/office/drawing/2010/main">
+          <mc:Choice Requires="a14">
+            <p:sp>
+              <p:nvSpPr>
+                <p:cNvPr id="16" name="TextBox 15">
+                  <a:extLst>
+                    <a:ext uri="{FF2B5EF4-FFF2-40B4-BE49-F238E27FC236}">
+                      <a16:creationId xmlns:a16="http://schemas.microsoft.com/office/drawing/2014/main" id="{E90341FD-1CB1-4836-B283-9BEC03C436E9}"/>
+                    </a:ext>
+                  </a:extLst>
+                </p:cNvPr>
+                <p:cNvSpPr txBox="1"/>
+                <p:nvPr/>
+              </p:nvSpPr>
+              <p:spPr>
+                <a:xfrm>
+                  <a:off x="8932087" y="1345870"/>
+                  <a:ext cx="825418" cy="241605"/>
+                </a:xfrm>
+                <a:prstGeom prst="rect">
+                  <a:avLst/>
+                </a:prstGeom>
+                <a:noFill/>
+              </p:spPr>
+              <p:txBody>
+                <a:bodyPr wrap="none" lIns="0" tIns="0" rIns="0" bIns="0" rtlCol="0">
+                  <a:spAutoFit/>
+                </a:bodyPr>
+                <a:lstStyle/>
+                <a:p>
+                  <a:pPr/>
+                  <a14:m>
+                    <m:oMathPara xmlns:m="http://schemas.openxmlformats.org/officeDocument/2006/math">
+                      <m:oMathParaPr>
+                        <m:jc m:val="centerGroup"/>
+                      </m:oMathParaPr>
+                      <m:oMath xmlns:m="http://schemas.openxmlformats.org/officeDocument/2006/math">
+                        <m:acc>
+                          <m:accPr>
+                            <m:chr m:val="⃗"/>
+                            <m:ctrlPr>
+                              <a:rPr lang="en-US" sz="1400" i="1" smtClean="0">
+                                <a:latin typeface="Cambria Math" panose="02040503050406030204" pitchFamily="18" charset="0"/>
+                              </a:rPr>
+                            </m:ctrlPr>
+                          </m:accPr>
+                          <m:e>
+                            <m:r>
+                              <a:rPr lang="en-US" sz="1400" b="0" i="1" smtClean="0">
+                                <a:latin typeface="Cambria Math" panose="02040503050406030204" pitchFamily="18" charset="0"/>
+                              </a:rPr>
+                              <m:t>𝐹</m:t>
+                            </m:r>
+                          </m:e>
+                        </m:acc>
+                        <m:r>
+                          <a:rPr lang="en-US" sz="1400" b="0" i="1" smtClean="0">
+                            <a:latin typeface="Cambria Math" panose="02040503050406030204" pitchFamily="18" charset="0"/>
+                          </a:rPr>
+                          <m:t>(</m:t>
+                        </m:r>
+                        <m:r>
+                          <a:rPr lang="en-US" sz="1400" b="0" i="1" smtClean="0">
+                            <a:latin typeface="Cambria Math" panose="02040503050406030204" pitchFamily="18" charset="0"/>
+                          </a:rPr>
+                          <m:t>𝑥</m:t>
+                        </m:r>
+                        <m:r>
+                          <a:rPr lang="en-US" sz="1400" b="0" i="1" smtClean="0">
+                            <a:latin typeface="Cambria Math" panose="02040503050406030204" pitchFamily="18" charset="0"/>
+                          </a:rPr>
+                          <m:t>+</m:t>
+                        </m:r>
+                        <m:r>
+                          <a:rPr lang="en-US" sz="1400" b="0" i="1" smtClean="0">
+                            <a:latin typeface="Cambria Math" panose="02040503050406030204" pitchFamily="18" charset="0"/>
+                          </a:rPr>
+                          <m:t>𝑑𝑥</m:t>
+                        </m:r>
+                        <m:r>
+                          <a:rPr lang="en-US" sz="1400" b="0" i="1" smtClean="0">
+                            <a:latin typeface="Cambria Math" panose="02040503050406030204" pitchFamily="18" charset="0"/>
+                          </a:rPr>
+                          <m:t>)</m:t>
+                        </m:r>
+                      </m:oMath>
+                    </m:oMathPara>
+                  </a14:m>
+                  <a:endParaRPr lang="en-US" sz="1400" dirty="0"/>
+                </a:p>
+              </p:txBody>
+            </p:sp>
+          </mc:Choice>
+          <mc:Fallback xmlns="">
+            <p:sp>
+              <p:nvSpPr>
+                <p:cNvPr id="16" name="TextBox 15">
+                  <a:extLst>
+                    <a:ext uri="{FF2B5EF4-FFF2-40B4-BE49-F238E27FC236}">
+                      <a16:creationId xmlns:a16="http://schemas.microsoft.com/office/drawing/2014/main" id="{E90341FD-1CB1-4836-B283-9BEC03C436E9}"/>
+                    </a:ext>
+                  </a:extLst>
+                </p:cNvPr>
+                <p:cNvSpPr txBox="1">
+                  <a:spLocks noRot="1" noChangeAspect="1" noMove="1" noResize="1" noEditPoints="1" noAdjustHandles="1" noChangeArrowheads="1" noChangeShapeType="1" noTextEdit="1"/>
+                </p:cNvSpPr>
+                <p:nvPr/>
+              </p:nvSpPr>
+              <p:spPr>
+                <a:xfrm>
+                  <a:off x="8932087" y="1345870"/>
+                  <a:ext cx="825418" cy="241605"/>
+                </a:xfrm>
+                <a:prstGeom prst="rect">
+                  <a:avLst/>
+                </a:prstGeom>
+                <a:blipFill>
+                  <a:blip r:embed="rId4"/>
+                  <a:stretch>
+                    <a:fillRect l="-4412" t="-32500" r="-6618" b="-30000"/>
+                  </a:stretch>
+                </a:blipFill>
+              </p:spPr>
+              <p:txBody>
+                <a:bodyPr/>
+                <a:lstStyle/>
+                <a:p>
+                  <a:r>
+                    <a:rPr lang="en-US">
+                      <a:noFill/>
+                    </a:rPr>
+                    <a:t> </a:t>
+                  </a:r>
+                </a:p>
+              </p:txBody>
+            </p:sp>
+          </mc:Fallback>
+        </mc:AlternateContent>
+        <mc:AlternateContent xmlns:mc="http://schemas.openxmlformats.org/markup-compatibility/2006" xmlns:a14="http://schemas.microsoft.com/office/drawing/2010/main">
+          <mc:Choice Requires="a14">
+            <p:sp>
+              <p:nvSpPr>
+                <p:cNvPr id="17" name="TextBox 16">
+                  <a:extLst>
+                    <a:ext uri="{FF2B5EF4-FFF2-40B4-BE49-F238E27FC236}">
+                      <a16:creationId xmlns:a16="http://schemas.microsoft.com/office/drawing/2014/main" id="{F5EF2155-6432-417A-A5AE-10BF7EDC50E7}"/>
+                    </a:ext>
+                  </a:extLst>
+                </p:cNvPr>
+                <p:cNvSpPr txBox="1"/>
+                <p:nvPr/>
+              </p:nvSpPr>
+              <p:spPr>
+                <a:xfrm>
+                  <a:off x="7323762" y="1334380"/>
+                  <a:ext cx="405176" cy="241605"/>
+                </a:xfrm>
+                <a:prstGeom prst="rect">
+                  <a:avLst/>
+                </a:prstGeom>
+                <a:noFill/>
+              </p:spPr>
+              <p:txBody>
+                <a:bodyPr wrap="none" lIns="0" tIns="0" rIns="0" bIns="0" rtlCol="0">
+                  <a:spAutoFit/>
+                </a:bodyPr>
+                <a:lstStyle/>
+                <a:p>
+                  <a:pPr/>
+                  <a14:m>
+                    <m:oMathPara xmlns:m="http://schemas.openxmlformats.org/officeDocument/2006/math">
+                      <m:oMathParaPr>
+                        <m:jc m:val="centerGroup"/>
+                      </m:oMathParaPr>
+                      <m:oMath xmlns:m="http://schemas.openxmlformats.org/officeDocument/2006/math">
+                        <m:acc>
+                          <m:accPr>
+                            <m:chr m:val="⃗"/>
+                            <m:ctrlPr>
+                              <a:rPr lang="en-US" sz="1400" i="1" smtClean="0">
+                                <a:latin typeface="Cambria Math" panose="02040503050406030204" pitchFamily="18" charset="0"/>
+                              </a:rPr>
+                            </m:ctrlPr>
+                          </m:accPr>
+                          <m:e>
+                            <m:r>
+                              <a:rPr lang="en-US" sz="1400" b="0" i="1" smtClean="0">
+                                <a:latin typeface="Cambria Math" panose="02040503050406030204" pitchFamily="18" charset="0"/>
+                              </a:rPr>
+                              <m:t>𝐹</m:t>
+                            </m:r>
+                          </m:e>
+                        </m:acc>
+                        <m:r>
+                          <a:rPr lang="en-US" sz="1400" b="0" i="1" smtClean="0">
+                            <a:latin typeface="Cambria Math" panose="02040503050406030204" pitchFamily="18" charset="0"/>
+                          </a:rPr>
+                          <m:t>(</m:t>
+                        </m:r>
+                        <m:r>
+                          <a:rPr lang="en-US" sz="1400" b="0" i="1" smtClean="0">
+                            <a:latin typeface="Cambria Math" panose="02040503050406030204" pitchFamily="18" charset="0"/>
+                          </a:rPr>
+                          <m:t>𝑥</m:t>
+                        </m:r>
+                        <m:r>
+                          <a:rPr lang="en-US" sz="1400" b="0" i="1" smtClean="0">
+                            <a:latin typeface="Cambria Math" panose="02040503050406030204" pitchFamily="18" charset="0"/>
+                          </a:rPr>
+                          <m:t>)</m:t>
+                        </m:r>
+                      </m:oMath>
+                    </m:oMathPara>
+                  </a14:m>
+                  <a:endParaRPr lang="en-US" sz="1400" dirty="0"/>
+                </a:p>
+              </p:txBody>
+            </p:sp>
+          </mc:Choice>
+          <mc:Fallback xmlns="">
+            <p:sp>
+              <p:nvSpPr>
+                <p:cNvPr id="17" name="TextBox 16">
+                  <a:extLst>
+                    <a:ext uri="{FF2B5EF4-FFF2-40B4-BE49-F238E27FC236}">
+                      <a16:creationId xmlns:a16="http://schemas.microsoft.com/office/drawing/2014/main" id="{F5EF2155-6432-417A-A5AE-10BF7EDC50E7}"/>
+                    </a:ext>
+                  </a:extLst>
+                </p:cNvPr>
+                <p:cNvSpPr txBox="1">
+                  <a:spLocks noRot="1" noChangeAspect="1" noMove="1" noResize="1" noEditPoints="1" noAdjustHandles="1" noChangeArrowheads="1" noChangeShapeType="1" noTextEdit="1"/>
+                </p:cNvSpPr>
+                <p:nvPr/>
+              </p:nvSpPr>
+              <p:spPr>
+                <a:xfrm>
+                  <a:off x="7323762" y="1334380"/>
+                  <a:ext cx="405176" cy="241605"/>
+                </a:xfrm>
+                <a:prstGeom prst="rect">
+                  <a:avLst/>
+                </a:prstGeom>
+                <a:blipFill>
+                  <a:blip r:embed="rId5"/>
+                  <a:stretch>
+                    <a:fillRect l="-8955" t="-32500" r="-14925" b="-30000"/>
+                  </a:stretch>
+                </a:blipFill>
+              </p:spPr>
+              <p:txBody>
+                <a:bodyPr/>
+                <a:lstStyle/>
+                <a:p>
+                  <a:r>
+                    <a:rPr lang="en-US">
+                      <a:noFill/>
+                    </a:rPr>
+                    <a:t> </a:t>
+                  </a:r>
+                </a:p>
+              </p:txBody>
+            </p:sp>
+          </mc:Fallback>
+        </mc:AlternateContent>
+        <p:cxnSp>
+          <p:nvCxnSpPr>
+            <p:cNvPr id="18" name="Straight Arrow Connector 17">
+              <a:extLst>
+                <a:ext uri="{FF2B5EF4-FFF2-40B4-BE49-F238E27FC236}">
+                  <a16:creationId xmlns:a16="http://schemas.microsoft.com/office/drawing/2014/main" id="{17AA8970-4066-4258-9A0D-06DB725E9E82}"/>
+                </a:ext>
+              </a:extLst>
+            </p:cNvPr>
+            <p:cNvCxnSpPr>
+              <a:cxnSpLocks/>
+            </p:cNvCxnSpPr>
+            <p:nvPr/>
+          </p:nvCxnSpPr>
+          <p:spPr>
+            <a:xfrm>
+              <a:off x="5666457" y="822537"/>
+              <a:ext cx="1338865" cy="0"/>
+            </a:xfrm>
+            <a:prstGeom prst="straightConnector1">
+              <a:avLst/>
+            </a:prstGeom>
+            <a:ln w="25400">
+              <a:solidFill>
+                <a:schemeClr val="tx1"/>
+              </a:solidFill>
+              <a:headEnd type="none" w="lg" len="lg"/>
+              <a:tailEnd type="stealth" w="lg" len="lg"/>
+            </a:ln>
+          </p:spPr>
+          <p:style>
+            <a:lnRef idx="1">
+              <a:schemeClr val="accent1"/>
+            </a:lnRef>
+            <a:fillRef idx="0">
+              <a:schemeClr val="accent1"/>
+            </a:fillRef>
+            <a:effectRef idx="0">
+              <a:schemeClr val="accent1"/>
+            </a:effectRef>
+            <a:fontRef idx="minor">
+              <a:schemeClr val="tx1"/>
+            </a:fontRef>
+          </p:style>
+        </p:cxnSp>
+        <mc:AlternateContent xmlns:mc="http://schemas.openxmlformats.org/markup-compatibility/2006" xmlns:a14="http://schemas.microsoft.com/office/drawing/2010/main">
+          <mc:Choice Requires="a14">
+            <p:sp>
+              <p:nvSpPr>
+                <p:cNvPr id="20" name="TextBox 19">
+                  <a:extLst>
+                    <a:ext uri="{FF2B5EF4-FFF2-40B4-BE49-F238E27FC236}">
+                      <a16:creationId xmlns:a16="http://schemas.microsoft.com/office/drawing/2014/main" id="{681F1BA2-B3D8-4048-8393-DA3B5A9F077C}"/>
+                    </a:ext>
+                  </a:extLst>
+                </p:cNvPr>
+                <p:cNvSpPr txBox="1"/>
+                <p:nvPr/>
+              </p:nvSpPr>
+              <p:spPr>
+                <a:xfrm>
+                  <a:off x="6777792" y="389298"/>
+                  <a:ext cx="241733" cy="369332"/>
+                </a:xfrm>
+                <a:prstGeom prst="rect">
+                  <a:avLst/>
+                </a:prstGeom>
+                <a:noFill/>
+              </p:spPr>
+              <p:txBody>
+                <a:bodyPr wrap="none" lIns="0" tIns="0" rIns="0" bIns="0" rtlCol="0">
+                  <a:spAutoFit/>
+                </a:bodyPr>
+                <a:lstStyle/>
+                <a:p>
+                  <a:pPr/>
+                  <a14:m>
+                    <m:oMathPara xmlns:m="http://schemas.openxmlformats.org/officeDocument/2006/math">
+                      <m:oMathParaPr>
+                        <m:jc m:val="centerGroup"/>
+                      </m:oMathParaPr>
+                      <m:oMath xmlns:m="http://schemas.openxmlformats.org/officeDocument/2006/math">
+                        <m:r>
+                          <a:rPr lang="en-US" sz="2400" b="0" i="1" smtClean="0">
+                            <a:latin typeface="Cambria Math" panose="02040503050406030204" pitchFamily="18" charset="0"/>
+                          </a:rPr>
+                          <m:t>𝑥</m:t>
+                        </m:r>
+                      </m:oMath>
+                    </m:oMathPara>
+                  </a14:m>
+                  <a:endParaRPr lang="en-US" sz="2800" dirty="0"/>
+                </a:p>
+              </p:txBody>
+            </p:sp>
+          </mc:Choice>
+          <mc:Fallback xmlns="">
+            <p:sp>
+              <p:nvSpPr>
+                <p:cNvPr id="20" name="TextBox 19">
+                  <a:extLst>
+                    <a:ext uri="{FF2B5EF4-FFF2-40B4-BE49-F238E27FC236}">
+                      <a16:creationId xmlns:a16="http://schemas.microsoft.com/office/drawing/2014/main" id="{681F1BA2-B3D8-4048-8393-DA3B5A9F077C}"/>
+                    </a:ext>
+                  </a:extLst>
+                </p:cNvPr>
+                <p:cNvSpPr txBox="1">
+                  <a:spLocks noRot="1" noChangeAspect="1" noMove="1" noResize="1" noEditPoints="1" noAdjustHandles="1" noChangeArrowheads="1" noChangeShapeType="1" noTextEdit="1"/>
+                </p:cNvSpPr>
+                <p:nvPr/>
+              </p:nvSpPr>
+              <p:spPr>
+                <a:xfrm>
+                  <a:off x="6777792" y="389298"/>
+                  <a:ext cx="241733" cy="369332"/>
+                </a:xfrm>
+                <a:prstGeom prst="rect">
+                  <a:avLst/>
+                </a:prstGeom>
+                <a:blipFill>
+                  <a:blip r:embed="rId6"/>
+                  <a:stretch>
+                    <a:fillRect l="-17949" r="-15385"/>
+                  </a:stretch>
+                </a:blipFill>
+              </p:spPr>
+              <p:txBody>
+                <a:bodyPr/>
+                <a:lstStyle/>
+                <a:p>
+                  <a:r>
+                    <a:rPr lang="en-US">
+                      <a:noFill/>
+                    </a:rPr>
+                    <a:t> </a:t>
+                  </a:r>
+                </a:p>
+              </p:txBody>
+            </p:sp>
+          </mc:Fallback>
+        </mc:AlternateContent>
+      </p:grpSp>
+      <p:grpSp>
+        <p:nvGrpSpPr>
+          <p:cNvPr id="2" name="Group 1">
             <a:extLst>
               <a:ext uri="{FF2B5EF4-FFF2-40B4-BE49-F238E27FC236}">
-                <a16:creationId xmlns:a16="http://schemas.microsoft.com/office/drawing/2014/main" id="{AE0DD116-582D-4E65-9398-9847F6D2AE9F}"/>
+                <a16:creationId xmlns:a16="http://schemas.microsoft.com/office/drawing/2014/main" id="{3FEF8FCF-66F6-467C-AB66-EB914A2C94A5}"/>
               </a:ext>
             </a:extLst>
           </p:cNvPr>
-          <p:cNvCxnSpPr>
-            <a:cxnSpLocks/>
-            <a:endCxn id="2" idx="4"/>
-          </p:cNvCxnSpPr>
+          <p:cNvGrpSpPr/>
           <p:nvPr/>
-        </p:nvCxnSpPr>
+        </p:nvGrpSpPr>
+        <p:grpSpPr>
+          <a:xfrm>
+            <a:off x="346489" y="223774"/>
+            <a:ext cx="5269042" cy="966797"/>
+            <a:chOff x="3241579" y="3253501"/>
+            <a:chExt cx="5269042" cy="966797"/>
+          </a:xfrm>
+        </p:grpSpPr>
+        <p:pic>
+          <p:nvPicPr>
+            <p:cNvPr id="40" name="Picture 39">
+              <a:extLst>
+                <a:ext uri="{FF2B5EF4-FFF2-40B4-BE49-F238E27FC236}">
+                  <a16:creationId xmlns:a16="http://schemas.microsoft.com/office/drawing/2014/main" id="{6007A998-F6E2-43E1-827F-2A2D6D996293}"/>
+                </a:ext>
+              </a:extLst>
+            </p:cNvPr>
+            <p:cNvPicPr>
+              <a:picLocks noChangeAspect="1"/>
+            </p:cNvPicPr>
+            <p:nvPr/>
+          </p:nvPicPr>
+          <p:blipFill>
+            <a:blip r:embed="rId7"/>
+            <a:stretch>
+              <a:fillRect/>
+            </a:stretch>
+          </p:blipFill>
+          <p:spPr>
+            <a:xfrm>
+              <a:off x="3241579" y="3253501"/>
+              <a:ext cx="5269042" cy="966797"/>
+            </a:xfrm>
+            <a:prstGeom prst="rect">
+              <a:avLst/>
+            </a:prstGeom>
+          </p:spPr>
+        </p:pic>
+        <mc:AlternateContent xmlns:mc="http://schemas.openxmlformats.org/markup-compatibility/2006" xmlns:a14="http://schemas.microsoft.com/office/drawing/2010/main">
+          <mc:Choice Requires="a14">
+            <p:sp>
+              <p:nvSpPr>
+                <p:cNvPr id="25" name="TextBox 24">
+                  <a:extLst>
+                    <a:ext uri="{FF2B5EF4-FFF2-40B4-BE49-F238E27FC236}">
+                      <a16:creationId xmlns:a16="http://schemas.microsoft.com/office/drawing/2014/main" id="{2FF32E20-2310-4AB7-A689-088DD5E1E13F}"/>
+                    </a:ext>
+                  </a:extLst>
+                </p:cNvPr>
+                <p:cNvSpPr txBox="1"/>
+                <p:nvPr/>
+              </p:nvSpPr>
+              <p:spPr>
+                <a:xfrm>
+                  <a:off x="5570249" y="3426301"/>
+                  <a:ext cx="195823" cy="310598"/>
+                </a:xfrm>
+                <a:prstGeom prst="rect">
+                  <a:avLst/>
+                </a:prstGeom>
+                <a:noFill/>
+              </p:spPr>
+              <p:txBody>
+                <a:bodyPr wrap="none" lIns="0" tIns="0" rIns="0" bIns="0" rtlCol="0">
+                  <a:spAutoFit/>
+                </a:bodyPr>
+                <a:lstStyle/>
+                <a:p>
+                  <a:pPr/>
+                  <a14:m>
+                    <m:oMathPara xmlns:m="http://schemas.openxmlformats.org/officeDocument/2006/math">
+                      <m:oMathParaPr>
+                        <m:jc m:val="centerGroup"/>
+                      </m:oMathParaPr>
+                      <m:oMath xmlns:m="http://schemas.openxmlformats.org/officeDocument/2006/math">
+                        <m:acc>
+                          <m:accPr>
+                            <m:chr m:val="⃗"/>
+                            <m:ctrlPr>
+                              <a:rPr lang="en-US" i="1" smtClean="0">
+                                <a:latin typeface="Cambria Math" panose="02040503050406030204" pitchFamily="18" charset="0"/>
+                              </a:rPr>
+                            </m:ctrlPr>
+                          </m:accPr>
+                          <m:e>
+                            <m:r>
+                              <a:rPr lang="en-US" b="0" i="1" smtClean="0">
+                                <a:latin typeface="Cambria Math" panose="02040503050406030204" pitchFamily="18" charset="0"/>
+                              </a:rPr>
+                              <m:t>𝑇</m:t>
+                            </m:r>
+                          </m:e>
+                        </m:acc>
+                      </m:oMath>
+                    </m:oMathPara>
+                  </a14:m>
+                  <a:endParaRPr lang="en-US" dirty="0"/>
+                </a:p>
+              </p:txBody>
+            </p:sp>
+          </mc:Choice>
+          <mc:Fallback xmlns="">
+            <p:sp>
+              <p:nvSpPr>
+                <p:cNvPr id="25" name="TextBox 24">
+                  <a:extLst>
+                    <a:ext uri="{FF2B5EF4-FFF2-40B4-BE49-F238E27FC236}">
+                      <a16:creationId xmlns:a16="http://schemas.microsoft.com/office/drawing/2014/main" id="{2FF32E20-2310-4AB7-A689-088DD5E1E13F}"/>
+                    </a:ext>
+                  </a:extLst>
+                </p:cNvPr>
+                <p:cNvSpPr txBox="1">
+                  <a:spLocks noRot="1" noChangeAspect="1" noMove="1" noResize="1" noEditPoints="1" noAdjustHandles="1" noChangeArrowheads="1" noChangeShapeType="1" noTextEdit="1"/>
+                </p:cNvSpPr>
+                <p:nvPr/>
+              </p:nvSpPr>
+              <p:spPr>
+                <a:xfrm>
+                  <a:off x="5570249" y="3426301"/>
+                  <a:ext cx="195823" cy="310598"/>
+                </a:xfrm>
+                <a:prstGeom prst="rect">
+                  <a:avLst/>
+                </a:prstGeom>
+                <a:blipFill>
+                  <a:blip r:embed="rId8"/>
+                  <a:stretch>
+                    <a:fillRect l="-31250" r="-25000" b="-7843"/>
+                  </a:stretch>
+                </a:blipFill>
+              </p:spPr>
+              <p:txBody>
+                <a:bodyPr/>
+                <a:lstStyle/>
+                <a:p>
+                  <a:r>
+                    <a:rPr lang="en-US">
+                      <a:noFill/>
+                    </a:rPr>
+                    <a:t> </a:t>
+                  </a:r>
+                </a:p>
+              </p:txBody>
+            </p:sp>
+          </mc:Fallback>
+        </mc:AlternateContent>
+        <p:cxnSp>
+          <p:nvCxnSpPr>
+            <p:cNvPr id="28" name="Straight Arrow Connector 27">
+              <a:extLst>
+                <a:ext uri="{FF2B5EF4-FFF2-40B4-BE49-F238E27FC236}">
+                  <a16:creationId xmlns:a16="http://schemas.microsoft.com/office/drawing/2014/main" id="{D4B148AB-425D-4368-8477-8D3FCFE9B8A2}"/>
+                </a:ext>
+              </a:extLst>
+            </p:cNvPr>
+            <p:cNvCxnSpPr>
+              <a:cxnSpLocks/>
+            </p:cNvCxnSpPr>
+            <p:nvPr/>
+          </p:nvCxnSpPr>
+          <p:spPr>
+            <a:xfrm>
+              <a:off x="5295027" y="3758609"/>
+              <a:ext cx="471045" cy="0"/>
+            </a:xfrm>
+            <a:prstGeom prst="straightConnector1">
+              <a:avLst/>
+            </a:prstGeom>
+            <a:ln w="38100">
+              <a:solidFill>
+                <a:srgbClr val="FFC000"/>
+              </a:solidFill>
+              <a:headEnd type="none" w="lg" len="lg"/>
+              <a:tailEnd type="stealth" w="med" len="lg"/>
+            </a:ln>
+          </p:spPr>
+          <p:style>
+            <a:lnRef idx="1">
+              <a:schemeClr val="accent1"/>
+            </a:lnRef>
+            <a:fillRef idx="0">
+              <a:schemeClr val="accent1"/>
+            </a:fillRef>
+            <a:effectRef idx="0">
+              <a:schemeClr val="accent1"/>
+            </a:effectRef>
+            <a:fontRef idx="minor">
+              <a:schemeClr val="tx1"/>
+            </a:fontRef>
+          </p:style>
+        </p:cxnSp>
+        <p:cxnSp>
+          <p:nvCxnSpPr>
+            <p:cNvPr id="43" name="Straight Arrow Connector 42">
+              <a:extLst>
+                <a:ext uri="{FF2B5EF4-FFF2-40B4-BE49-F238E27FC236}">
+                  <a16:creationId xmlns:a16="http://schemas.microsoft.com/office/drawing/2014/main" id="{591C0C5A-04C7-4409-8595-166A72161432}"/>
+                </a:ext>
+              </a:extLst>
+            </p:cNvPr>
+            <p:cNvCxnSpPr>
+              <a:cxnSpLocks/>
+            </p:cNvCxnSpPr>
+            <p:nvPr/>
+          </p:nvCxnSpPr>
+          <p:spPr>
+            <a:xfrm flipH="1">
+              <a:off x="6175248" y="3758609"/>
+              <a:ext cx="490278" cy="0"/>
+            </a:xfrm>
+            <a:prstGeom prst="straightConnector1">
+              <a:avLst/>
+            </a:prstGeom>
+            <a:ln w="38100">
+              <a:solidFill>
+                <a:srgbClr val="FFC000"/>
+              </a:solidFill>
+              <a:headEnd type="none" w="lg" len="lg"/>
+              <a:tailEnd type="stealth" w="med" len="lg"/>
+            </a:ln>
+          </p:spPr>
+          <p:style>
+            <a:lnRef idx="1">
+              <a:schemeClr val="accent1"/>
+            </a:lnRef>
+            <a:fillRef idx="0">
+              <a:schemeClr val="accent1"/>
+            </a:fillRef>
+            <a:effectRef idx="0">
+              <a:schemeClr val="accent1"/>
+            </a:effectRef>
+            <a:fontRef idx="minor">
+              <a:schemeClr val="tx1"/>
+            </a:fontRef>
+          </p:style>
+        </p:cxnSp>
+        <mc:AlternateContent xmlns:mc="http://schemas.openxmlformats.org/markup-compatibility/2006" xmlns:a14="http://schemas.microsoft.com/office/drawing/2010/main">
+          <mc:Choice Requires="a14">
+            <p:sp>
+              <p:nvSpPr>
+                <p:cNvPr id="46" name="TextBox 45">
+                  <a:extLst>
+                    <a:ext uri="{FF2B5EF4-FFF2-40B4-BE49-F238E27FC236}">
+                      <a16:creationId xmlns:a16="http://schemas.microsoft.com/office/drawing/2014/main" id="{9D10BE00-941F-4C2A-A3A2-98D803056D54}"/>
+                    </a:ext>
+                  </a:extLst>
+                </p:cNvPr>
+                <p:cNvSpPr txBox="1"/>
+                <p:nvPr/>
+              </p:nvSpPr>
+              <p:spPr>
+                <a:xfrm>
+                  <a:off x="6184192" y="3426301"/>
+                  <a:ext cx="195823" cy="310598"/>
+                </a:xfrm>
+                <a:prstGeom prst="rect">
+                  <a:avLst/>
+                </a:prstGeom>
+                <a:noFill/>
+              </p:spPr>
+              <p:txBody>
+                <a:bodyPr wrap="none" lIns="0" tIns="0" rIns="0" bIns="0" rtlCol="0">
+                  <a:spAutoFit/>
+                </a:bodyPr>
+                <a:lstStyle/>
+                <a:p>
+                  <a:pPr/>
+                  <a14:m>
+                    <m:oMathPara xmlns:m="http://schemas.openxmlformats.org/officeDocument/2006/math">
+                      <m:oMathParaPr>
+                        <m:jc m:val="centerGroup"/>
+                      </m:oMathParaPr>
+                      <m:oMath xmlns:m="http://schemas.openxmlformats.org/officeDocument/2006/math">
+                        <m:acc>
+                          <m:accPr>
+                            <m:chr m:val="⃗"/>
+                            <m:ctrlPr>
+                              <a:rPr lang="en-US" i="1" smtClean="0">
+                                <a:latin typeface="Cambria Math" panose="02040503050406030204" pitchFamily="18" charset="0"/>
+                              </a:rPr>
+                            </m:ctrlPr>
+                          </m:accPr>
+                          <m:e>
+                            <m:r>
+                              <a:rPr lang="en-US" b="0" i="1" smtClean="0">
+                                <a:latin typeface="Cambria Math" panose="02040503050406030204" pitchFamily="18" charset="0"/>
+                              </a:rPr>
+                              <m:t>𝑇</m:t>
+                            </m:r>
+                          </m:e>
+                        </m:acc>
+                      </m:oMath>
+                    </m:oMathPara>
+                  </a14:m>
+                  <a:endParaRPr lang="en-US" dirty="0"/>
+                </a:p>
+              </p:txBody>
+            </p:sp>
+          </mc:Choice>
+          <mc:Fallback xmlns="">
+            <p:sp>
+              <p:nvSpPr>
+                <p:cNvPr id="46" name="TextBox 45">
+                  <a:extLst>
+                    <a:ext uri="{FF2B5EF4-FFF2-40B4-BE49-F238E27FC236}">
+                      <a16:creationId xmlns:a16="http://schemas.microsoft.com/office/drawing/2014/main" id="{9D10BE00-941F-4C2A-A3A2-98D803056D54}"/>
+                    </a:ext>
+                  </a:extLst>
+                </p:cNvPr>
+                <p:cNvSpPr txBox="1">
+                  <a:spLocks noRot="1" noChangeAspect="1" noMove="1" noResize="1" noEditPoints="1" noAdjustHandles="1" noChangeArrowheads="1" noChangeShapeType="1" noTextEdit="1"/>
+                </p:cNvSpPr>
+                <p:nvPr/>
+              </p:nvSpPr>
+              <p:spPr>
+                <a:xfrm>
+                  <a:off x="6184192" y="3426301"/>
+                  <a:ext cx="195823" cy="310598"/>
+                </a:xfrm>
+                <a:prstGeom prst="rect">
+                  <a:avLst/>
+                </a:prstGeom>
+                <a:blipFill>
+                  <a:blip r:embed="rId9"/>
+                  <a:stretch>
+                    <a:fillRect l="-31250" r="-25000" b="-7843"/>
+                  </a:stretch>
+                </a:blipFill>
+              </p:spPr>
+              <p:txBody>
+                <a:bodyPr/>
+                <a:lstStyle/>
+                <a:p>
+                  <a:r>
+                    <a:rPr lang="en-US">
+                      <a:noFill/>
+                    </a:rPr>
+                    <a:t> </a:t>
+                  </a:r>
+                </a:p>
+              </p:txBody>
+            </p:sp>
+          </mc:Fallback>
+        </mc:AlternateContent>
+      </p:grpSp>
+      <p:pic>
+        <p:nvPicPr>
+          <p:cNvPr id="13" name="Picture 12">
+            <a:extLst>
+              <a:ext uri="{FF2B5EF4-FFF2-40B4-BE49-F238E27FC236}">
+                <a16:creationId xmlns:a16="http://schemas.microsoft.com/office/drawing/2014/main" id="{4D610867-6B52-4121-BC51-47BE6402A18C}"/>
+              </a:ext>
+            </a:extLst>
+          </p:cNvPr>
+          <p:cNvPicPr>
+            <a:picLocks noChangeAspect="1"/>
+          </p:cNvPicPr>
+          <p:nvPr/>
+        </p:nvPicPr>
+        <p:blipFill>
+          <a:blip r:embed="rId10"/>
+          <a:stretch>
+            <a:fillRect/>
+          </a:stretch>
+        </p:blipFill>
         <p:spPr>
-          <a:xfrm flipH="1">
-            <a:off x="6853557" y="2375754"/>
-            <a:ext cx="25870" cy="1975046"/>
+          <a:xfrm>
+            <a:off x="3034536" y="3266250"/>
+            <a:ext cx="5743376" cy="1173714"/>
           </a:xfrm>
-          <a:prstGeom prst="line">
+          <a:prstGeom prst="rect">
             <a:avLst/>
           </a:prstGeom>
-          <a:ln w="31750">
-            <a:solidFill>
-              <a:schemeClr val="tx1"/>
-            </a:solidFill>
-          </a:ln>
         </p:spPr>
-        <p:style>
-          <a:lnRef idx="1">
-            <a:schemeClr val="accent1"/>
-          </a:lnRef>
-          <a:fillRef idx="0">
-            <a:schemeClr val="accent1"/>
-          </a:fillRef>
-          <a:effectRef idx="0">
-            <a:schemeClr val="accent1"/>
-          </a:effectRef>
-          <a:fontRef idx="minor">
-            <a:schemeClr val="tx1"/>
-          </a:fontRef>
-        </p:style>
-      </p:cxnSp>
+      </p:pic>
       <p:cxnSp>
         <p:nvCxnSpPr>
-          <p:cNvPr id="82" name="Straight Connector 81">
+          <p:cNvPr id="23" name="Straight Arrow Connector 22">
             <a:extLst>
               <a:ext uri="{FF2B5EF4-FFF2-40B4-BE49-F238E27FC236}">
-                <a16:creationId xmlns:a16="http://schemas.microsoft.com/office/drawing/2014/main" id="{22746A1C-9805-4B4D-B58F-DB4F61E7911D}"/>
+                <a16:creationId xmlns:a16="http://schemas.microsoft.com/office/drawing/2014/main" id="{C9DF68D1-1959-403A-8C47-D3F4BD0B77A5}"/>
               </a:ext>
             </a:extLst>
           </p:cNvPr>
@@ -16921,16 +19208,18 @@
         </p:nvCxnSpPr>
         <p:spPr>
           <a:xfrm>
-            <a:off x="7964066" y="2375754"/>
-            <a:ext cx="0" cy="1617157"/>
+            <a:off x="4354445" y="3726107"/>
+            <a:ext cx="725554" cy="0"/>
           </a:xfrm>
-          <a:prstGeom prst="line">
+          <a:prstGeom prst="straightConnector1">
             <a:avLst/>
           </a:prstGeom>
-          <a:ln w="31750">
+          <a:ln w="38100">
             <a:solidFill>
-              <a:schemeClr val="tx1"/>
+              <a:srgbClr val="FF0000"/>
             </a:solidFill>
+            <a:headEnd type="none" w="lg" len="lg"/>
+            <a:tailEnd type="stealth" w="lg" len="lg"/>
           </a:ln>
         </p:spPr>
         <p:style>
@@ -16948,59 +19237,14 @@
           </a:fontRef>
         </p:style>
       </p:cxnSp>
-      <p:cxnSp>
-        <p:nvCxnSpPr>
-          <p:cNvPr id="88" name="Straight Arrow Connector 87">
-            <a:extLst>
-              <a:ext uri="{FF2B5EF4-FFF2-40B4-BE49-F238E27FC236}">
-                <a16:creationId xmlns:a16="http://schemas.microsoft.com/office/drawing/2014/main" id="{4F53B432-5CFD-46F4-B2A5-8F09CF9A4418}"/>
-              </a:ext>
-            </a:extLst>
-          </p:cNvPr>
-          <p:cNvCxnSpPr>
-            <a:cxnSpLocks/>
-          </p:cNvCxnSpPr>
-          <p:nvPr/>
-        </p:nvCxnSpPr>
-        <p:spPr>
-          <a:xfrm flipH="1">
-            <a:off x="6882483" y="2602350"/>
-            <a:ext cx="1081583" cy="0"/>
-          </a:xfrm>
-          <a:prstGeom prst="straightConnector1">
-            <a:avLst/>
-          </a:prstGeom>
-          <a:ln w="25400">
-            <a:solidFill>
-              <a:schemeClr val="tx1"/>
-            </a:solidFill>
-            <a:headEnd type="stealth" w="lg" len="lg"/>
-            <a:tailEnd type="stealth" w="lg" len="lg"/>
-          </a:ln>
-        </p:spPr>
-        <p:style>
-          <a:lnRef idx="1">
-            <a:schemeClr val="accent1"/>
-          </a:lnRef>
-          <a:fillRef idx="0">
-            <a:schemeClr val="accent1"/>
-          </a:fillRef>
-          <a:effectRef idx="0">
-            <a:schemeClr val="accent1"/>
-          </a:effectRef>
-          <a:fontRef idx="minor">
-            <a:schemeClr val="tx1"/>
-          </a:fontRef>
-        </p:style>
-      </p:cxnSp>
-      <mc:AlternateContent xmlns:mc="http://schemas.openxmlformats.org/markup-compatibility/2006">
-        <mc:Choice xmlns:a14="http://schemas.microsoft.com/office/drawing/2010/main" Requires="a14">
+      <mc:AlternateContent xmlns:mc="http://schemas.openxmlformats.org/markup-compatibility/2006" xmlns:a14="http://schemas.microsoft.com/office/drawing/2010/main">
+        <mc:Choice Requires="a14">
           <p:sp>
             <p:nvSpPr>
-              <p:cNvPr id="14" name="TextBox 13">
+              <p:cNvPr id="24" name="TextBox 23">
                 <a:extLst>
                   <a:ext uri="{FF2B5EF4-FFF2-40B4-BE49-F238E27FC236}">
-                    <a16:creationId xmlns:a16="http://schemas.microsoft.com/office/drawing/2014/main" id="{F987CCB6-4AF3-4104-B720-4CFE4310A76F}"/>
+                    <a16:creationId xmlns:a16="http://schemas.microsoft.com/office/drawing/2014/main" id="{2642B877-FF51-4C9C-974F-AB8B243EF2DA}"/>
                   </a:ext>
                 </a:extLst>
               </p:cNvPr>
@@ -17009,8 +19253,8 @@
             </p:nvSpPr>
             <p:spPr>
               <a:xfrm>
-                <a:off x="7371987" y="2602350"/>
-                <a:ext cx="321498" cy="430887"/>
+                <a:off x="4811464" y="3266250"/>
+                <a:ext cx="268535" cy="414088"/>
               </a:xfrm>
               <a:prstGeom prst="rect">
                 <a:avLst/>
@@ -17023,33 +19267,56 @@
               </a:bodyPr>
               <a:lstStyle/>
               <a:p>
+                <a:pPr/>
                 <a14:m>
                   <m:oMathPara xmlns:m="http://schemas.openxmlformats.org/officeDocument/2006/math">
                     <m:oMathParaPr>
                       <m:jc m:val="centerGroup"/>
                     </m:oMathParaPr>
                     <m:oMath xmlns:m="http://schemas.openxmlformats.org/officeDocument/2006/math">
-                      <m:r>
-                        <a:rPr lang="en-US" sz="2800" b="0" i="1" smtClean="0">
-                          <a:latin typeface="Cambria Math" panose="02040503050406030204" pitchFamily="18" charset="0"/>
-                        </a:rPr>
-                        <m:t>𝑅</m:t>
-                      </m:r>
+                      <m:acc>
+                        <m:accPr>
+                          <m:chr m:val="⃗"/>
+                          <m:ctrlPr>
+                            <a:rPr lang="en-US" sz="2400" i="1" smtClean="0">
+                              <a:solidFill>
+                                <a:srgbClr val="FF0000"/>
+                              </a:solidFill>
+                              <a:latin typeface="Cambria Math" panose="02040503050406030204" pitchFamily="18" charset="0"/>
+                            </a:rPr>
+                          </m:ctrlPr>
+                        </m:accPr>
+                        <m:e>
+                          <m:r>
+                            <a:rPr lang="en-US" sz="2400" b="0" i="1" smtClean="0">
+                              <a:solidFill>
+                                <a:srgbClr val="FF0000"/>
+                              </a:solidFill>
+                              <a:latin typeface="Cambria Math" panose="02040503050406030204" pitchFamily="18" charset="0"/>
+                            </a:rPr>
+                            <m:t>𝐹</m:t>
+                          </m:r>
+                        </m:e>
+                      </m:acc>
                     </m:oMath>
                   </m:oMathPara>
                 </a14:m>
-                <a:endParaRPr lang="en-US" sz="2800" dirty="0"/>
+                <a:endParaRPr lang="en-US" sz="2400" dirty="0">
+                  <a:solidFill>
+                    <a:srgbClr val="FF0000"/>
+                  </a:solidFill>
+                </a:endParaRPr>
               </a:p>
             </p:txBody>
           </p:sp>
         </mc:Choice>
-        <mc:Fallback>
+        <mc:Fallback xmlns="">
           <p:sp>
             <p:nvSpPr>
-              <p:cNvPr id="14" name="TextBox 13">
+              <p:cNvPr id="24" name="TextBox 23">
                 <a:extLst>
                   <a:ext uri="{FF2B5EF4-FFF2-40B4-BE49-F238E27FC236}">
-                    <a16:creationId xmlns:a16="http://schemas.microsoft.com/office/drawing/2014/main" id="{F987CCB6-4AF3-4104-B720-4CFE4310A76F}"/>
+                    <a16:creationId xmlns:a16="http://schemas.microsoft.com/office/drawing/2014/main" id="{2642B877-FF51-4C9C-974F-AB8B243EF2DA}"/>
                   </a:ext>
                 </a:extLst>
               </p:cNvPr>
@@ -17060,109 +19327,14 @@
             </p:nvSpPr>
             <p:spPr>
               <a:xfrm>
-                <a:off x="7371987" y="2602350"/>
-                <a:ext cx="321498" cy="430887"/>
+                <a:off x="4811464" y="3266250"/>
+                <a:ext cx="268535" cy="414088"/>
               </a:xfrm>
               <a:prstGeom prst="rect">
                 <a:avLst/>
               </a:prstGeom>
               <a:blipFill>
-                <a:blip r:embed="rId28"/>
-                <a:stretch>
-                  <a:fillRect/>
-                </a:stretch>
-              </a:blipFill>
-            </p:spPr>
-            <p:txBody>
-              <a:bodyPr/>
-              <a:lstStyle/>
-              <a:p>
-                <a:r>
-                  <a:rPr lang="en-US">
-                    <a:noFill/>
-                  </a:rPr>
-                  <a:t> </a:t>
-                </a:r>
-              </a:p>
-            </p:txBody>
-          </p:sp>
-        </mc:Fallback>
-      </mc:AlternateContent>
-      <mc:AlternateContent xmlns:mc="http://schemas.openxmlformats.org/markup-compatibility/2006">
-        <mc:Choice xmlns:a14="http://schemas.microsoft.com/office/drawing/2010/main" Requires="a14">
-          <p:sp>
-            <p:nvSpPr>
-              <p:cNvPr id="89" name="TextBox 88">
-                <a:extLst>
-                  <a:ext uri="{FF2B5EF4-FFF2-40B4-BE49-F238E27FC236}">
-                    <a16:creationId xmlns:a16="http://schemas.microsoft.com/office/drawing/2014/main" id="{B3288966-FDAB-4ABD-9308-C7D332C2287D}"/>
-                  </a:ext>
-                </a:extLst>
-              </p:cNvPr>
-              <p:cNvSpPr txBox="1"/>
-              <p:nvPr/>
-            </p:nvSpPr>
-            <p:spPr>
-              <a:xfrm>
-                <a:off x="6990381" y="3535312"/>
-                <a:ext cx="261161" cy="430887"/>
-              </a:xfrm>
-              <a:prstGeom prst="rect">
-                <a:avLst/>
-              </a:prstGeom>
-              <a:noFill/>
-            </p:spPr>
-            <p:txBody>
-              <a:bodyPr wrap="none" lIns="0" tIns="0" rIns="0" bIns="0" rtlCol="0">
-                <a:spAutoFit/>
-              </a:bodyPr>
-              <a:lstStyle/>
-              <a:p>
-                <a14:m>
-                  <m:oMathPara xmlns:m="http://schemas.openxmlformats.org/officeDocument/2006/math">
-                    <m:oMathParaPr>
-                      <m:jc m:val="centerGroup"/>
-                    </m:oMathParaPr>
-                    <m:oMath xmlns:m="http://schemas.openxmlformats.org/officeDocument/2006/math">
-                      <m:r>
-                        <a:rPr lang="en-US" sz="2800" b="0" i="1" smtClean="0">
-                          <a:latin typeface="Cambria Math" panose="02040503050406030204" pitchFamily="18" charset="0"/>
-                        </a:rPr>
-                        <m:t>𝑟</m:t>
-                      </m:r>
-                    </m:oMath>
-                  </m:oMathPara>
-                </a14:m>
-                <a:endParaRPr lang="en-US" sz="2800" dirty="0"/>
-              </a:p>
-            </p:txBody>
-          </p:sp>
-        </mc:Choice>
-        <mc:Fallback>
-          <p:sp>
-            <p:nvSpPr>
-              <p:cNvPr id="89" name="TextBox 88">
-                <a:extLst>
-                  <a:ext uri="{FF2B5EF4-FFF2-40B4-BE49-F238E27FC236}">
-                    <a16:creationId xmlns:a16="http://schemas.microsoft.com/office/drawing/2014/main" id="{B3288966-FDAB-4ABD-9308-C7D332C2287D}"/>
-                  </a:ext>
-                </a:extLst>
-              </p:cNvPr>
-              <p:cNvSpPr txBox="1">
-                <a:spLocks noRot="1" noChangeAspect="1" noMove="1" noResize="1" noEditPoints="1" noAdjustHandles="1" noChangeArrowheads="1" noChangeShapeType="1" noTextEdit="1"/>
-              </p:cNvSpPr>
-              <p:nvPr/>
-            </p:nvSpPr>
-            <p:spPr>
-              <a:xfrm>
-                <a:off x="6990381" y="3535312"/>
-                <a:ext cx="261161" cy="430887"/>
-              </a:xfrm>
-              <a:prstGeom prst="rect">
-                <a:avLst/>
-              </a:prstGeom>
-              <a:blipFill>
-                <a:blip r:embed="rId29"/>
+                <a:blip r:embed="rId11"/>
                 <a:stretch>
                   <a:fillRect/>
                 </a:stretch>
@@ -17185,10 +19357,10 @@
       </mc:AlternateContent>
       <p:cxnSp>
         <p:nvCxnSpPr>
-          <p:cNvPr id="91" name="Straight Connector 90">
+          <p:cNvPr id="29" name="Straight Arrow Connector 28">
             <a:extLst>
               <a:ext uri="{FF2B5EF4-FFF2-40B4-BE49-F238E27FC236}">
-                <a16:creationId xmlns:a16="http://schemas.microsoft.com/office/drawing/2014/main" id="{91E2EB83-DF9E-4EF1-B5EE-9680EFCAD318}"/>
+                <a16:creationId xmlns:a16="http://schemas.microsoft.com/office/drawing/2014/main" id="{B5C04DF9-E80C-4B49-B881-888A3CD288AD}"/>
               </a:ext>
             </a:extLst>
           </p:cNvPr>
@@ -17198,17 +19370,19 @@
           <p:nvPr/>
         </p:nvCxnSpPr>
         <p:spPr>
-          <a:xfrm>
-            <a:off x="6396357" y="3921375"/>
-            <a:ext cx="929228" cy="5246"/>
+          <a:xfrm flipH="1">
+            <a:off x="6895453" y="3830125"/>
+            <a:ext cx="673825" cy="0"/>
           </a:xfrm>
-          <a:prstGeom prst="line">
+          <a:prstGeom prst="straightConnector1">
             <a:avLst/>
           </a:prstGeom>
-          <a:ln w="12700">
+          <a:ln w="38100">
             <a:solidFill>
-              <a:schemeClr val="tx1"/>
+              <a:srgbClr val="FF0000"/>
             </a:solidFill>
+            <a:headEnd type="none" w="lg" len="lg"/>
+            <a:tailEnd type="stealth" w="lg" len="lg"/>
           </a:ln>
         </p:spPr>
         <p:style>
@@ -17226,634 +19400,885 @@
           </a:fontRef>
         </p:style>
       </p:cxnSp>
-      <p:sp>
-        <p:nvSpPr>
-          <p:cNvPr id="92" name="Oval 91">
+      <mc:AlternateContent xmlns:mc="http://schemas.openxmlformats.org/markup-compatibility/2006" xmlns:a14="http://schemas.microsoft.com/office/drawing/2010/main">
+        <mc:Choice Requires="a14">
+          <p:sp>
+            <p:nvSpPr>
+              <p:cNvPr id="30" name="TextBox 29">
+                <a:extLst>
+                  <a:ext uri="{FF2B5EF4-FFF2-40B4-BE49-F238E27FC236}">
+                    <a16:creationId xmlns:a16="http://schemas.microsoft.com/office/drawing/2014/main" id="{D774C0E2-1624-4FD7-8FA5-466F515F6B54}"/>
+                  </a:ext>
+                </a:extLst>
+              </p:cNvPr>
+              <p:cNvSpPr txBox="1"/>
+              <p:nvPr/>
+            </p:nvSpPr>
+            <p:spPr>
+              <a:xfrm>
+                <a:off x="6986884" y="3312019"/>
+                <a:ext cx="268535" cy="414088"/>
+              </a:xfrm>
+              <a:prstGeom prst="rect">
+                <a:avLst/>
+              </a:prstGeom>
+              <a:noFill/>
+            </p:spPr>
+            <p:txBody>
+              <a:bodyPr wrap="none" lIns="0" tIns="0" rIns="0" bIns="0" rtlCol="0">
+                <a:spAutoFit/>
+              </a:bodyPr>
+              <a:lstStyle/>
+              <a:p>
+                <a:pPr/>
+                <a14:m>
+                  <m:oMathPara xmlns:m="http://schemas.openxmlformats.org/officeDocument/2006/math">
+                    <m:oMathParaPr>
+                      <m:jc m:val="centerGroup"/>
+                    </m:oMathParaPr>
+                    <m:oMath xmlns:m="http://schemas.openxmlformats.org/officeDocument/2006/math">
+                      <m:acc>
+                        <m:accPr>
+                          <m:chr m:val="⃗"/>
+                          <m:ctrlPr>
+                            <a:rPr lang="en-US" sz="2400" i="1" smtClean="0">
+                              <a:solidFill>
+                                <a:srgbClr val="FF0000"/>
+                              </a:solidFill>
+                              <a:latin typeface="Cambria Math" panose="02040503050406030204" pitchFamily="18" charset="0"/>
+                            </a:rPr>
+                          </m:ctrlPr>
+                        </m:accPr>
+                        <m:e>
+                          <m:r>
+                            <a:rPr lang="en-US" sz="2400" b="0" i="1" smtClean="0">
+                              <a:solidFill>
+                                <a:srgbClr val="FF0000"/>
+                              </a:solidFill>
+                              <a:latin typeface="Cambria Math" panose="02040503050406030204" pitchFamily="18" charset="0"/>
+                            </a:rPr>
+                            <m:t>𝐹</m:t>
+                          </m:r>
+                        </m:e>
+                      </m:acc>
+                    </m:oMath>
+                  </m:oMathPara>
+                </a14:m>
+                <a:endParaRPr lang="en-US" sz="2400" dirty="0">
+                  <a:solidFill>
+                    <a:srgbClr val="FF0000"/>
+                  </a:solidFill>
+                </a:endParaRPr>
+              </a:p>
+            </p:txBody>
+          </p:sp>
+        </mc:Choice>
+        <mc:Fallback xmlns="">
+          <p:sp>
+            <p:nvSpPr>
+              <p:cNvPr id="30" name="TextBox 29">
+                <a:extLst>
+                  <a:ext uri="{FF2B5EF4-FFF2-40B4-BE49-F238E27FC236}">
+                    <a16:creationId xmlns:a16="http://schemas.microsoft.com/office/drawing/2014/main" id="{D774C0E2-1624-4FD7-8FA5-466F515F6B54}"/>
+                  </a:ext>
+                </a:extLst>
+              </p:cNvPr>
+              <p:cNvSpPr txBox="1">
+                <a:spLocks noRot="1" noChangeAspect="1" noMove="1" noResize="1" noEditPoints="1" noAdjustHandles="1" noChangeArrowheads="1" noChangeShapeType="1" noTextEdit="1"/>
+              </p:cNvSpPr>
+              <p:nvPr/>
+            </p:nvSpPr>
+            <p:spPr>
+              <a:xfrm>
+                <a:off x="6986884" y="3312019"/>
+                <a:ext cx="268535" cy="414088"/>
+              </a:xfrm>
+              <a:prstGeom prst="rect">
+                <a:avLst/>
+              </a:prstGeom>
+              <a:blipFill>
+                <a:blip r:embed="rId12"/>
+                <a:stretch>
+                  <a:fillRect/>
+                </a:stretch>
+              </a:blipFill>
+            </p:spPr>
+            <p:txBody>
+              <a:bodyPr/>
+              <a:lstStyle/>
+              <a:p>
+                <a:r>
+                  <a:rPr lang="en-US">
+                    <a:noFill/>
+                  </a:rPr>
+                  <a:t> </a:t>
+                </a:r>
+              </a:p>
+            </p:txBody>
+          </p:sp>
+        </mc:Fallback>
+      </mc:AlternateContent>
+      <mc:AlternateContent xmlns:mc="http://schemas.openxmlformats.org/markup-compatibility/2006" xmlns:a14="http://schemas.microsoft.com/office/drawing/2010/main">
+        <mc:Choice Requires="a14">
+          <p:sp>
+            <p:nvSpPr>
+              <p:cNvPr id="22" name="TextBox 21">
+                <a:extLst>
+                  <a:ext uri="{FF2B5EF4-FFF2-40B4-BE49-F238E27FC236}">
+                    <a16:creationId xmlns:a16="http://schemas.microsoft.com/office/drawing/2014/main" id="{B73425F5-BA1A-455C-A59D-09AD19EAC358}"/>
+                  </a:ext>
+                </a:extLst>
+              </p:cNvPr>
+              <p:cNvSpPr txBox="1"/>
+              <p:nvPr/>
+            </p:nvSpPr>
+            <p:spPr>
+              <a:xfrm>
+                <a:off x="6850148" y="4143846"/>
+                <a:ext cx="542008" cy="430887"/>
+              </a:xfrm>
+              <a:prstGeom prst="rect">
+                <a:avLst/>
+              </a:prstGeom>
+              <a:noFill/>
+            </p:spPr>
+            <p:txBody>
+              <a:bodyPr wrap="none" lIns="0" tIns="0" rIns="0" bIns="0" rtlCol="0">
+                <a:spAutoFit/>
+              </a:bodyPr>
+              <a:lstStyle/>
+              <a:p>
+                <a:pPr/>
+                <a14:m>
+                  <m:oMathPara xmlns:m="http://schemas.openxmlformats.org/officeDocument/2006/math">
+                    <m:oMathParaPr>
+                      <m:jc m:val="centerGroup"/>
+                    </m:oMathParaPr>
+                    <m:oMath xmlns:m="http://schemas.openxmlformats.org/officeDocument/2006/math">
+                      <m:sSub>
+                        <m:sSubPr>
+                          <m:ctrlPr>
+                            <a:rPr lang="en-US" sz="2800" i="1" smtClean="0">
+                              <a:latin typeface="Cambria Math" panose="02040503050406030204" pitchFamily="18" charset="0"/>
+                            </a:rPr>
+                          </m:ctrlPr>
+                        </m:sSubPr>
+                        <m:e>
+                          <m:r>
+                            <a:rPr lang="en-US" sz="2800" b="0" i="1" smtClean="0">
+                              <a:latin typeface="Cambria Math" panose="02040503050406030204" pitchFamily="18" charset="0"/>
+                            </a:rPr>
+                            <m:t>𝑚</m:t>
+                          </m:r>
+                        </m:e>
+                        <m:sub>
+                          <m:r>
+                            <a:rPr lang="en-US" sz="2800" b="0" i="1" smtClean="0">
+                              <a:latin typeface="Cambria Math" panose="02040503050406030204" pitchFamily="18" charset="0"/>
+                            </a:rPr>
+                            <m:t>1</m:t>
+                          </m:r>
+                        </m:sub>
+                      </m:sSub>
+                    </m:oMath>
+                  </m:oMathPara>
+                </a14:m>
+                <a:endParaRPr lang="en-US" sz="2800" dirty="0"/>
+              </a:p>
+            </p:txBody>
+          </p:sp>
+        </mc:Choice>
+        <mc:Fallback xmlns="">
+          <p:sp>
+            <p:nvSpPr>
+              <p:cNvPr id="22" name="TextBox 21">
+                <a:extLst>
+                  <a:ext uri="{FF2B5EF4-FFF2-40B4-BE49-F238E27FC236}">
+                    <a16:creationId xmlns:a16="http://schemas.microsoft.com/office/drawing/2014/main" id="{B73425F5-BA1A-455C-A59D-09AD19EAC358}"/>
+                  </a:ext>
+                </a:extLst>
+              </p:cNvPr>
+              <p:cNvSpPr txBox="1">
+                <a:spLocks noRot="1" noChangeAspect="1" noMove="1" noResize="1" noEditPoints="1" noAdjustHandles="1" noChangeArrowheads="1" noChangeShapeType="1" noTextEdit="1"/>
+              </p:cNvSpPr>
+              <p:nvPr/>
+            </p:nvSpPr>
+            <p:spPr>
+              <a:xfrm>
+                <a:off x="6850148" y="4143846"/>
+                <a:ext cx="542008" cy="430887"/>
+              </a:xfrm>
+              <a:prstGeom prst="rect">
+                <a:avLst/>
+              </a:prstGeom>
+              <a:blipFill>
+                <a:blip r:embed="rId13"/>
+                <a:stretch>
+                  <a:fillRect/>
+                </a:stretch>
+              </a:blipFill>
+            </p:spPr>
+            <p:txBody>
+              <a:bodyPr/>
+              <a:lstStyle/>
+              <a:p>
+                <a:r>
+                  <a:rPr lang="en-US">
+                    <a:noFill/>
+                  </a:rPr>
+                  <a:t> </a:t>
+                </a:r>
+              </a:p>
+            </p:txBody>
+          </p:sp>
+        </mc:Fallback>
+      </mc:AlternateContent>
+      <mc:AlternateContent xmlns:mc="http://schemas.openxmlformats.org/markup-compatibility/2006" xmlns:a14="http://schemas.microsoft.com/office/drawing/2010/main">
+        <mc:Choice Requires="a14">
+          <p:sp>
+            <p:nvSpPr>
+              <p:cNvPr id="32" name="TextBox 31">
+                <a:extLst>
+                  <a:ext uri="{FF2B5EF4-FFF2-40B4-BE49-F238E27FC236}">
+                    <a16:creationId xmlns:a16="http://schemas.microsoft.com/office/drawing/2014/main" id="{577AC25B-59C8-4A73-8F0F-D145B2953EE5}"/>
+                  </a:ext>
+                </a:extLst>
+              </p:cNvPr>
+              <p:cNvSpPr txBox="1"/>
+              <p:nvPr/>
+            </p:nvSpPr>
+            <p:spPr>
+              <a:xfrm>
+                <a:off x="4670591" y="4180123"/>
+                <a:ext cx="550279" cy="430887"/>
+              </a:xfrm>
+              <a:prstGeom prst="rect">
+                <a:avLst/>
+              </a:prstGeom>
+              <a:noFill/>
+            </p:spPr>
+            <p:txBody>
+              <a:bodyPr wrap="none" lIns="0" tIns="0" rIns="0" bIns="0" rtlCol="0">
+                <a:spAutoFit/>
+              </a:bodyPr>
+              <a:lstStyle/>
+              <a:p>
+                <a:pPr/>
+                <a14:m>
+                  <m:oMathPara xmlns:m="http://schemas.openxmlformats.org/officeDocument/2006/math">
+                    <m:oMathParaPr>
+                      <m:jc m:val="centerGroup"/>
+                    </m:oMathParaPr>
+                    <m:oMath xmlns:m="http://schemas.openxmlformats.org/officeDocument/2006/math">
+                      <m:sSub>
+                        <m:sSubPr>
+                          <m:ctrlPr>
+                            <a:rPr lang="en-US" sz="2800" i="1" smtClean="0">
+                              <a:latin typeface="Cambria Math" panose="02040503050406030204" pitchFamily="18" charset="0"/>
+                            </a:rPr>
+                          </m:ctrlPr>
+                        </m:sSubPr>
+                        <m:e>
+                          <m:r>
+                            <a:rPr lang="en-US" sz="2800" b="0" i="1" smtClean="0">
+                              <a:latin typeface="Cambria Math" panose="02040503050406030204" pitchFamily="18" charset="0"/>
+                            </a:rPr>
+                            <m:t>𝑚</m:t>
+                          </m:r>
+                        </m:e>
+                        <m:sub>
+                          <m:r>
+                            <a:rPr lang="en-US" sz="2800" b="0" i="1" smtClean="0">
+                              <a:latin typeface="Cambria Math" panose="02040503050406030204" pitchFamily="18" charset="0"/>
+                            </a:rPr>
+                            <m:t>2</m:t>
+                          </m:r>
+                        </m:sub>
+                      </m:sSub>
+                    </m:oMath>
+                  </m:oMathPara>
+                </a14:m>
+                <a:endParaRPr lang="en-US" sz="2800" dirty="0"/>
+              </a:p>
+            </p:txBody>
+          </p:sp>
+        </mc:Choice>
+        <mc:Fallback xmlns="">
+          <p:sp>
+            <p:nvSpPr>
+              <p:cNvPr id="32" name="TextBox 31">
+                <a:extLst>
+                  <a:ext uri="{FF2B5EF4-FFF2-40B4-BE49-F238E27FC236}">
+                    <a16:creationId xmlns:a16="http://schemas.microsoft.com/office/drawing/2014/main" id="{577AC25B-59C8-4A73-8F0F-D145B2953EE5}"/>
+                  </a:ext>
+                </a:extLst>
+              </p:cNvPr>
+              <p:cNvSpPr txBox="1">
+                <a:spLocks noRot="1" noChangeAspect="1" noMove="1" noResize="1" noEditPoints="1" noAdjustHandles="1" noChangeArrowheads="1" noChangeShapeType="1" noTextEdit="1"/>
+              </p:cNvSpPr>
+              <p:nvPr/>
+            </p:nvSpPr>
+            <p:spPr>
+              <a:xfrm>
+                <a:off x="4670591" y="4180123"/>
+                <a:ext cx="550279" cy="430887"/>
+              </a:xfrm>
+              <a:prstGeom prst="rect">
+                <a:avLst/>
+              </a:prstGeom>
+              <a:blipFill>
+                <a:blip r:embed="rId14"/>
+                <a:stretch>
+                  <a:fillRect/>
+                </a:stretch>
+              </a:blipFill>
+            </p:spPr>
+            <p:txBody>
+              <a:bodyPr/>
+              <a:lstStyle/>
+              <a:p>
+                <a:r>
+                  <a:rPr lang="en-US">
+                    <a:noFill/>
+                  </a:rPr>
+                  <a:t> </a:t>
+                </a:r>
+              </a:p>
+            </p:txBody>
+          </p:sp>
+        </mc:Fallback>
+      </mc:AlternateContent>
+      <p:cxnSp>
+        <p:nvCxnSpPr>
+          <p:cNvPr id="33" name="Straight Arrow Connector 32">
             <a:extLst>
               <a:ext uri="{FF2B5EF4-FFF2-40B4-BE49-F238E27FC236}">
-                <a16:creationId xmlns:a16="http://schemas.microsoft.com/office/drawing/2014/main" id="{826BD8D1-E526-413E-850B-C91C4143E77A}"/>
+                <a16:creationId xmlns:a16="http://schemas.microsoft.com/office/drawing/2014/main" id="{F48E5046-F370-4292-89A1-9A132D455E35}"/>
               </a:ext>
             </a:extLst>
           </p:cNvPr>
-          <p:cNvSpPr/>
+          <p:cNvCxnSpPr>
+            <a:cxnSpLocks/>
+          </p:cNvCxnSpPr>
           <p:nvPr/>
-        </p:nvSpPr>
+        </p:nvCxnSpPr>
         <p:spPr>
-          <a:xfrm>
-            <a:off x="6350637" y="3383807"/>
-            <a:ext cx="1005840" cy="1005840"/>
+          <a:xfrm flipH="1">
+            <a:off x="3574285" y="3211181"/>
+            <a:ext cx="2192612" cy="0"/>
           </a:xfrm>
-          <a:prstGeom prst="ellipse">
+          <a:prstGeom prst="straightConnector1">
             <a:avLst/>
           </a:prstGeom>
-          <a:noFill/>
-          <a:ln w="3175">
+          <a:ln w="25400">
             <a:solidFill>
               <a:schemeClr val="tx1"/>
             </a:solidFill>
+            <a:headEnd type="none" w="lg" len="lg"/>
+            <a:tailEnd type="stealth" w="lg" len="lg"/>
           </a:ln>
         </p:spPr>
         <p:style>
-          <a:lnRef idx="2">
-            <a:schemeClr val="accent1">
-              <a:shade val="50000"/>
-            </a:schemeClr>
+          <a:lnRef idx="1">
+            <a:schemeClr val="accent1"/>
           </a:lnRef>
-          <a:fillRef idx="1">
+          <a:fillRef idx="0">
             <a:schemeClr val="accent1"/>
           </a:fillRef>
           <a:effectRef idx="0">
             <a:schemeClr val="accent1"/>
           </a:effectRef>
           <a:fontRef idx="minor">
-            <a:schemeClr val="lt1"/>
+            <a:schemeClr val="tx1"/>
           </a:fontRef>
         </p:style>
-        <p:txBody>
-          <a:bodyPr rtlCol="0" anchor="ctr"/>
-          <a:lstStyle/>
-          <a:p>
-            <a:pPr algn="ctr"/>
-            <a:endParaRPr lang="en-US" dirty="0"/>
-          </a:p>
-        </p:txBody>
-      </p:sp>
-      <p:sp>
-        <p:nvSpPr>
-          <p:cNvPr id="93" name="Oval 92">
+      </p:cxnSp>
+      <mc:AlternateContent xmlns:mc="http://schemas.openxmlformats.org/markup-compatibility/2006" xmlns:a14="http://schemas.microsoft.com/office/drawing/2010/main">
+        <mc:Choice Requires="a14">
+          <p:sp>
+            <p:nvSpPr>
+              <p:cNvPr id="34" name="TextBox 33">
+                <a:extLst>
+                  <a:ext uri="{FF2B5EF4-FFF2-40B4-BE49-F238E27FC236}">
+                    <a16:creationId xmlns:a16="http://schemas.microsoft.com/office/drawing/2014/main" id="{64D59028-D5C9-4101-9B23-D0A5CAD4A5E7}"/>
+                  </a:ext>
+                </a:extLst>
+              </p:cNvPr>
+              <p:cNvSpPr txBox="1"/>
+              <p:nvPr/>
+            </p:nvSpPr>
+            <p:spPr>
+              <a:xfrm>
+                <a:off x="3685089" y="2845977"/>
+                <a:ext cx="241733" cy="369332"/>
+              </a:xfrm>
+              <a:prstGeom prst="rect">
+                <a:avLst/>
+              </a:prstGeom>
+              <a:noFill/>
+            </p:spPr>
+            <p:txBody>
+              <a:bodyPr wrap="none" lIns="0" tIns="0" rIns="0" bIns="0" rtlCol="0">
+                <a:spAutoFit/>
+              </a:bodyPr>
+              <a:lstStyle/>
+              <a:p>
+                <a:pPr/>
+                <a14:m>
+                  <m:oMathPara xmlns:m="http://schemas.openxmlformats.org/officeDocument/2006/math">
+                    <m:oMathParaPr>
+                      <m:jc m:val="centerGroup"/>
+                    </m:oMathParaPr>
+                    <m:oMath xmlns:m="http://schemas.openxmlformats.org/officeDocument/2006/math">
+                      <m:r>
+                        <a:rPr lang="en-US" sz="2400" b="0" i="1" smtClean="0">
+                          <a:latin typeface="Cambria Math" panose="02040503050406030204" pitchFamily="18" charset="0"/>
+                        </a:rPr>
+                        <m:t>𝑥</m:t>
+                      </m:r>
+                    </m:oMath>
+                  </m:oMathPara>
+                </a14:m>
+                <a:endParaRPr lang="en-US" sz="2800" dirty="0"/>
+              </a:p>
+            </p:txBody>
+          </p:sp>
+        </mc:Choice>
+        <mc:Fallback xmlns="">
+          <p:sp>
+            <p:nvSpPr>
+              <p:cNvPr id="34" name="TextBox 33">
+                <a:extLst>
+                  <a:ext uri="{FF2B5EF4-FFF2-40B4-BE49-F238E27FC236}">
+                    <a16:creationId xmlns:a16="http://schemas.microsoft.com/office/drawing/2014/main" id="{64D59028-D5C9-4101-9B23-D0A5CAD4A5E7}"/>
+                  </a:ext>
+                </a:extLst>
+              </p:cNvPr>
+              <p:cNvSpPr txBox="1">
+                <a:spLocks noRot="1" noChangeAspect="1" noMove="1" noResize="1" noEditPoints="1" noAdjustHandles="1" noChangeArrowheads="1" noChangeShapeType="1" noTextEdit="1"/>
+              </p:cNvSpPr>
+              <p:nvPr/>
+            </p:nvSpPr>
+            <p:spPr>
+              <a:xfrm>
+                <a:off x="3685089" y="2845977"/>
+                <a:ext cx="241733" cy="369332"/>
+              </a:xfrm>
+              <a:prstGeom prst="rect">
+                <a:avLst/>
+              </a:prstGeom>
+              <a:blipFill>
+                <a:blip r:embed="rId15"/>
+                <a:stretch>
+                  <a:fillRect l="-17949" r="-15385"/>
+                </a:stretch>
+              </a:blipFill>
+            </p:spPr>
+            <p:txBody>
+              <a:bodyPr/>
+              <a:lstStyle/>
+              <a:p>
+                <a:r>
+                  <a:rPr lang="en-US">
+                    <a:noFill/>
+                  </a:rPr>
+                  <a:t> </a:t>
+                </a:r>
+              </a:p>
+            </p:txBody>
+          </p:sp>
+        </mc:Fallback>
+      </mc:AlternateContent>
+    </p:spTree>
+    <p:extLst>
+      <p:ext uri="{BB962C8B-B14F-4D97-AF65-F5344CB8AC3E}">
+        <p14:creationId xmlns:p14="http://schemas.microsoft.com/office/powerpoint/2010/main" val="2796915417"/>
+      </p:ext>
+    </p:extLst>
+  </p:cSld>
+  <p:clrMapOvr>
+    <a:masterClrMapping/>
+  </p:clrMapOvr>
+</p:sld>
+</file>
+
+<file path=ppt/slides/slide14.xml><?xml version="1.0" encoding="utf-8"?>
+<p:sld xmlns:a="http://schemas.openxmlformats.org/drawingml/2006/main" xmlns:r="http://schemas.openxmlformats.org/officeDocument/2006/relationships" xmlns:p="http://schemas.openxmlformats.org/presentationml/2006/main">
+  <p:cSld>
+    <p:spTree>
+      <p:nvGrpSpPr>
+        <p:cNvPr id="1" name=""/>
+        <p:cNvGrpSpPr/>
+        <p:nvPr/>
+      </p:nvGrpSpPr>
+      <p:grpSpPr>
+        <a:xfrm>
+          <a:off x="0" y="0"/>
+          <a:ext cx="0" cy="0"/>
+          <a:chOff x="0" y="0"/>
+          <a:chExt cx="0" cy="0"/>
+        </a:xfrm>
+      </p:grpSpPr>
+      <p:pic>
+        <p:nvPicPr>
+          <p:cNvPr id="4" name="Picture 3">
             <a:extLst>
               <a:ext uri="{FF2B5EF4-FFF2-40B4-BE49-F238E27FC236}">
-                <a16:creationId xmlns:a16="http://schemas.microsoft.com/office/drawing/2014/main" id="{D13F812D-48B3-4EED-BAB2-D41025317F3D}"/>
+                <a16:creationId xmlns:a16="http://schemas.microsoft.com/office/drawing/2014/main" id="{67C355E4-4476-4AB0-B697-42858782803D}"/>
               </a:ext>
             </a:extLst>
           </p:cNvPr>
-          <p:cNvSpPr/>
+          <p:cNvPicPr>
+            <a:picLocks noChangeAspect="1"/>
+          </p:cNvPicPr>
           <p:nvPr/>
-        </p:nvSpPr>
+        </p:nvPicPr>
+        <p:blipFill>
+          <a:blip r:embed="rId2"/>
+          <a:stretch>
+            <a:fillRect/>
+          </a:stretch>
+        </p:blipFill>
         <p:spPr>
           <a:xfrm>
-            <a:off x="6304917" y="3344960"/>
-            <a:ext cx="1097280" cy="1097280"/>
+            <a:off x="4233862" y="1361155"/>
+            <a:ext cx="2356124" cy="3670344"/>
           </a:xfrm>
-          <a:prstGeom prst="ellipse">
+          <a:prstGeom prst="rect">
             <a:avLst/>
           </a:prstGeom>
-          <a:noFill/>
-          <a:ln w="3175">
+        </p:spPr>
+      </p:pic>
+      <p:cxnSp>
+        <p:nvCxnSpPr>
+          <p:cNvPr id="5" name="Straight Arrow Connector 4">
+            <a:extLst>
+              <a:ext uri="{FF2B5EF4-FFF2-40B4-BE49-F238E27FC236}">
+                <a16:creationId xmlns:a16="http://schemas.microsoft.com/office/drawing/2014/main" id="{13DABAA0-591F-4A45-8A94-7C83B424FCE8}"/>
+              </a:ext>
+            </a:extLst>
+          </p:cNvPr>
+          <p:cNvCxnSpPr>
+            <a:cxnSpLocks/>
+          </p:cNvCxnSpPr>
+          <p:nvPr/>
+        </p:nvCxnSpPr>
+        <p:spPr>
+          <a:xfrm flipV="1">
+            <a:off x="6173514" y="3014790"/>
+            <a:ext cx="0" cy="688683"/>
+          </a:xfrm>
+          <a:prstGeom prst="straightConnector1">
+            <a:avLst/>
+          </a:prstGeom>
+          <a:ln w="47625">
             <a:solidFill>
-              <a:schemeClr val="tx1"/>
+              <a:srgbClr val="FF0000"/>
             </a:solidFill>
+            <a:headEnd type="none" w="lg" len="lg"/>
+            <a:tailEnd type="stealth" w="lg" len="lg"/>
           </a:ln>
         </p:spPr>
         <p:style>
-          <a:lnRef idx="2">
-            <a:schemeClr val="accent1">
-              <a:shade val="50000"/>
-            </a:schemeClr>
+          <a:lnRef idx="1">
+            <a:schemeClr val="accent1"/>
           </a:lnRef>
-          <a:fillRef idx="1">
+          <a:fillRef idx="0">
             <a:schemeClr val="accent1"/>
           </a:fillRef>
           <a:effectRef idx="0">
             <a:schemeClr val="accent1"/>
           </a:effectRef>
           <a:fontRef idx="minor">
-            <a:schemeClr val="lt1"/>
+            <a:schemeClr val="tx1"/>
           </a:fontRef>
         </p:style>
-        <p:txBody>
-          <a:bodyPr rtlCol="0" anchor="ctr"/>
-          <a:lstStyle/>
-          <a:p>
-            <a:pPr algn="ctr"/>
-            <a:endParaRPr lang="en-US" dirty="0"/>
-          </a:p>
-        </p:txBody>
-      </p:sp>
-      <p:sp>
-        <p:nvSpPr>
-          <p:cNvPr id="94" name="Oval 93">
+      </p:cxnSp>
+      <mc:AlternateContent xmlns:mc="http://schemas.openxmlformats.org/markup-compatibility/2006">
+        <mc:Choice xmlns:a14="http://schemas.microsoft.com/office/drawing/2010/main" Requires="a14">
+          <p:sp>
+            <p:nvSpPr>
+              <p:cNvPr id="6" name="TextBox 5">
+                <a:extLst>
+                  <a:ext uri="{FF2B5EF4-FFF2-40B4-BE49-F238E27FC236}">
+                    <a16:creationId xmlns:a16="http://schemas.microsoft.com/office/drawing/2014/main" id="{CACA1CEF-BBE0-4EB4-B9C4-1FFD0446259E}"/>
+                  </a:ext>
+                </a:extLst>
+              </p:cNvPr>
+              <p:cNvSpPr txBox="1"/>
+              <p:nvPr/>
+            </p:nvSpPr>
+            <p:spPr>
+              <a:xfrm>
+                <a:off x="4887664" y="3049218"/>
+                <a:ext cx="258404" cy="414088"/>
+              </a:xfrm>
+              <a:prstGeom prst="rect">
+                <a:avLst/>
+              </a:prstGeom>
+              <a:noFill/>
+            </p:spPr>
+            <p:txBody>
+              <a:bodyPr wrap="none" lIns="0" tIns="0" rIns="0" bIns="0" rtlCol="0">
+                <a:spAutoFit/>
+              </a:bodyPr>
+              <a:lstStyle/>
+              <a:p>
+                <a:pPr/>
+                <a14:m>
+                  <m:oMathPara xmlns:m="http://schemas.openxmlformats.org/officeDocument/2006/math">
+                    <m:oMathParaPr>
+                      <m:jc m:val="centerGroup"/>
+                    </m:oMathParaPr>
+                    <m:oMath xmlns:m="http://schemas.openxmlformats.org/officeDocument/2006/math">
+                      <m:acc>
+                        <m:accPr>
+                          <m:chr m:val="⃗"/>
+                          <m:ctrlPr>
+                            <a:rPr lang="en-US" sz="2400" i="1" smtClean="0">
+                              <a:solidFill>
+                                <a:srgbClr val="FF0000"/>
+                              </a:solidFill>
+                              <a:latin typeface="Cambria Math" panose="02040503050406030204" pitchFamily="18" charset="0"/>
+                            </a:rPr>
+                          </m:ctrlPr>
+                        </m:accPr>
+                        <m:e>
+                          <m:r>
+                            <a:rPr lang="en-US" sz="2400" b="0" i="1" smtClean="0">
+                              <a:solidFill>
+                                <a:srgbClr val="FF0000"/>
+                              </a:solidFill>
+                              <a:latin typeface="Cambria Math" panose="02040503050406030204" pitchFamily="18" charset="0"/>
+                            </a:rPr>
+                            <m:t>𝑇</m:t>
+                          </m:r>
+                        </m:e>
+                      </m:acc>
+                    </m:oMath>
+                  </m:oMathPara>
+                </a14:m>
+                <a:endParaRPr lang="en-US" sz="2400" dirty="0">
+                  <a:solidFill>
+                    <a:srgbClr val="FF0000"/>
+                  </a:solidFill>
+                </a:endParaRPr>
+              </a:p>
+            </p:txBody>
+          </p:sp>
+        </mc:Choice>
+        <mc:Fallback>
+          <p:sp>
+            <p:nvSpPr>
+              <p:cNvPr id="6" name="TextBox 5">
+                <a:extLst>
+                  <a:ext uri="{FF2B5EF4-FFF2-40B4-BE49-F238E27FC236}">
+                    <a16:creationId xmlns:a16="http://schemas.microsoft.com/office/drawing/2014/main" id="{CACA1CEF-BBE0-4EB4-B9C4-1FFD0446259E}"/>
+                  </a:ext>
+                </a:extLst>
+              </p:cNvPr>
+              <p:cNvSpPr txBox="1">
+                <a:spLocks noRot="1" noChangeAspect="1" noMove="1" noResize="1" noEditPoints="1" noAdjustHandles="1" noChangeArrowheads="1" noChangeShapeType="1" noTextEdit="1"/>
+              </p:cNvSpPr>
+              <p:nvPr/>
+            </p:nvSpPr>
+            <p:spPr>
+              <a:xfrm>
+                <a:off x="4887664" y="3049218"/>
+                <a:ext cx="258404" cy="414088"/>
+              </a:xfrm>
+              <a:prstGeom prst="rect">
+                <a:avLst/>
+              </a:prstGeom>
+              <a:blipFill>
+                <a:blip r:embed="rId3"/>
+                <a:stretch>
+                  <a:fillRect/>
+                </a:stretch>
+              </a:blipFill>
+            </p:spPr>
+            <p:txBody>
+              <a:bodyPr/>
+              <a:lstStyle/>
+              <a:p>
+                <a:r>
+                  <a:rPr lang="en-US">
+                    <a:noFill/>
+                  </a:rPr>
+                  <a:t> </a:t>
+                </a:r>
+              </a:p>
+            </p:txBody>
+          </p:sp>
+        </mc:Fallback>
+      </mc:AlternateContent>
+      <p:cxnSp>
+        <p:nvCxnSpPr>
+          <p:cNvPr id="10" name="Straight Arrow Connector 9">
             <a:extLst>
               <a:ext uri="{FF2B5EF4-FFF2-40B4-BE49-F238E27FC236}">
-                <a16:creationId xmlns:a16="http://schemas.microsoft.com/office/drawing/2014/main" id="{E5D0449A-4450-4D6D-BA9F-6FFDCD374DB2}"/>
+                <a16:creationId xmlns:a16="http://schemas.microsoft.com/office/drawing/2014/main" id="{368D6F64-5A4B-455C-84C3-C3735E53FF52}"/>
               </a:ext>
             </a:extLst>
           </p:cNvPr>
-          <p:cNvSpPr/>
+          <p:cNvCxnSpPr>
+            <a:cxnSpLocks/>
+          </p:cNvCxnSpPr>
           <p:nvPr/>
-        </p:nvSpPr>
+        </p:nvCxnSpPr>
         <p:spPr>
-          <a:xfrm>
-            <a:off x="6266611" y="3299240"/>
-            <a:ext cx="1188720" cy="1188720"/>
+          <a:xfrm flipV="1">
+            <a:off x="5228634" y="3014790"/>
+            <a:ext cx="0" cy="482944"/>
           </a:xfrm>
-          <a:prstGeom prst="ellipse">
+          <a:prstGeom prst="straightConnector1">
             <a:avLst/>
           </a:prstGeom>
-          <a:noFill/>
-          <a:ln w="3175">
+          <a:ln w="47625">
             <a:solidFill>
-              <a:schemeClr val="tx1"/>
+              <a:srgbClr val="FF0000"/>
             </a:solidFill>
+            <a:headEnd type="none" w="lg" len="lg"/>
+            <a:tailEnd type="stealth" w="lg" len="lg"/>
           </a:ln>
         </p:spPr>
         <p:style>
-          <a:lnRef idx="2">
-            <a:schemeClr val="accent1">
-              <a:shade val="50000"/>
-            </a:schemeClr>
+          <a:lnRef idx="1">
+            <a:schemeClr val="accent1"/>
           </a:lnRef>
-          <a:fillRef idx="1">
+          <a:fillRef idx="0">
             <a:schemeClr val="accent1"/>
           </a:fillRef>
           <a:effectRef idx="0">
             <a:schemeClr val="accent1"/>
           </a:effectRef>
           <a:fontRef idx="minor">
-            <a:schemeClr val="lt1"/>
+            <a:schemeClr val="tx1"/>
           </a:fontRef>
         </p:style>
-        <p:txBody>
-          <a:bodyPr rtlCol="0" anchor="ctr"/>
-          <a:lstStyle/>
-          <a:p>
-            <a:pPr algn="ctr"/>
-            <a:endParaRPr lang="en-US" dirty="0"/>
-          </a:p>
-        </p:txBody>
-      </p:sp>
-      <p:sp>
-        <p:nvSpPr>
-          <p:cNvPr id="95" name="Oval 94">
-            <a:extLst>
-              <a:ext uri="{FF2B5EF4-FFF2-40B4-BE49-F238E27FC236}">
-                <a16:creationId xmlns:a16="http://schemas.microsoft.com/office/drawing/2014/main" id="{D8239F45-AC5A-4AA7-9FE0-FDD051C93569}"/>
-              </a:ext>
-            </a:extLst>
-          </p:cNvPr>
-          <p:cNvSpPr/>
-          <p:nvPr/>
-        </p:nvSpPr>
-        <p:spPr>
-          <a:xfrm>
-            <a:off x="6213477" y="3253520"/>
-            <a:ext cx="1280160" cy="1280160"/>
-          </a:xfrm>
-          <a:prstGeom prst="ellipse">
-            <a:avLst/>
-          </a:prstGeom>
-          <a:noFill/>
-          <a:ln w="3175">
-            <a:solidFill>
-              <a:schemeClr val="tx1"/>
-            </a:solidFill>
-          </a:ln>
-        </p:spPr>
-        <p:style>
-          <a:lnRef idx="2">
-            <a:schemeClr val="accent1">
-              <a:shade val="50000"/>
-            </a:schemeClr>
-          </a:lnRef>
-          <a:fillRef idx="1">
-            <a:schemeClr val="accent1"/>
-          </a:fillRef>
-          <a:effectRef idx="0">
-            <a:schemeClr val="accent1"/>
-          </a:effectRef>
-          <a:fontRef idx="minor">
-            <a:schemeClr val="lt1"/>
-          </a:fontRef>
-        </p:style>
-        <p:txBody>
-          <a:bodyPr rtlCol="0" anchor="ctr"/>
-          <a:lstStyle/>
-          <a:p>
-            <a:pPr algn="ctr"/>
-            <a:endParaRPr lang="en-US" dirty="0"/>
-          </a:p>
-        </p:txBody>
-      </p:sp>
-      <p:sp>
-        <p:nvSpPr>
-          <p:cNvPr id="96" name="Oval 95">
-            <a:extLst>
-              <a:ext uri="{FF2B5EF4-FFF2-40B4-BE49-F238E27FC236}">
-                <a16:creationId xmlns:a16="http://schemas.microsoft.com/office/drawing/2014/main" id="{9C8BAA64-C24F-474B-AA5B-0E3EF99CFC9E}"/>
-              </a:ext>
-            </a:extLst>
-          </p:cNvPr>
-          <p:cNvSpPr/>
-          <p:nvPr/>
-        </p:nvSpPr>
-        <p:spPr>
-          <a:xfrm>
-            <a:off x="6167757" y="3207800"/>
-            <a:ext cx="1371600" cy="1371600"/>
-          </a:xfrm>
-          <a:prstGeom prst="ellipse">
-            <a:avLst/>
-          </a:prstGeom>
-          <a:noFill/>
-          <a:ln w="3175">
-            <a:solidFill>
-              <a:schemeClr val="tx1"/>
-            </a:solidFill>
-          </a:ln>
-        </p:spPr>
-        <p:style>
-          <a:lnRef idx="2">
-            <a:schemeClr val="accent1">
-              <a:shade val="50000"/>
-            </a:schemeClr>
-          </a:lnRef>
-          <a:fillRef idx="1">
-            <a:schemeClr val="accent1"/>
-          </a:fillRef>
-          <a:effectRef idx="0">
-            <a:schemeClr val="accent1"/>
-          </a:effectRef>
-          <a:fontRef idx="minor">
-            <a:schemeClr val="lt1"/>
-          </a:fontRef>
-        </p:style>
-        <p:txBody>
-          <a:bodyPr rtlCol="0" anchor="ctr"/>
-          <a:lstStyle/>
-          <a:p>
-            <a:pPr algn="ctr"/>
-            <a:endParaRPr lang="en-US" dirty="0"/>
-          </a:p>
-        </p:txBody>
-      </p:sp>
-      <p:sp>
-        <p:nvSpPr>
-          <p:cNvPr id="97" name="Oval 96">
-            <a:extLst>
-              <a:ext uri="{FF2B5EF4-FFF2-40B4-BE49-F238E27FC236}">
-                <a16:creationId xmlns:a16="http://schemas.microsoft.com/office/drawing/2014/main" id="{E1637195-240A-4569-8B6E-BBB0932F81E7}"/>
-              </a:ext>
-            </a:extLst>
-          </p:cNvPr>
-          <p:cNvSpPr/>
-          <p:nvPr/>
-        </p:nvSpPr>
-        <p:spPr>
-          <a:xfrm>
-            <a:off x="6129451" y="3173670"/>
-            <a:ext cx="1463040" cy="1463040"/>
-          </a:xfrm>
-          <a:prstGeom prst="ellipse">
-            <a:avLst/>
-          </a:prstGeom>
-          <a:noFill/>
-          <a:ln w="3175">
-            <a:solidFill>
-              <a:schemeClr val="tx1"/>
-            </a:solidFill>
-          </a:ln>
-        </p:spPr>
-        <p:style>
-          <a:lnRef idx="2">
-            <a:schemeClr val="accent1">
-              <a:shade val="50000"/>
-            </a:schemeClr>
-          </a:lnRef>
-          <a:fillRef idx="1">
-            <a:schemeClr val="accent1"/>
-          </a:fillRef>
-          <a:effectRef idx="0">
-            <a:schemeClr val="accent1"/>
-          </a:effectRef>
-          <a:fontRef idx="minor">
-            <a:schemeClr val="lt1"/>
-          </a:fontRef>
-        </p:style>
-        <p:txBody>
-          <a:bodyPr rtlCol="0" anchor="ctr"/>
-          <a:lstStyle/>
-          <a:p>
-            <a:pPr algn="ctr"/>
-            <a:endParaRPr lang="en-US" dirty="0"/>
-          </a:p>
-        </p:txBody>
-      </p:sp>
-      <p:sp>
-        <p:nvSpPr>
-          <p:cNvPr id="98" name="Oval 97">
-            <a:extLst>
-              <a:ext uri="{FF2B5EF4-FFF2-40B4-BE49-F238E27FC236}">
-                <a16:creationId xmlns:a16="http://schemas.microsoft.com/office/drawing/2014/main" id="{ACFC443D-BAF0-4B19-ABD6-4133DF4E0787}"/>
-              </a:ext>
-            </a:extLst>
-          </p:cNvPr>
-          <p:cNvSpPr/>
-          <p:nvPr/>
-        </p:nvSpPr>
-        <p:spPr>
-          <a:xfrm>
-            <a:off x="6083731" y="3134887"/>
-            <a:ext cx="1554480" cy="1554480"/>
-          </a:xfrm>
-          <a:prstGeom prst="ellipse">
-            <a:avLst/>
-          </a:prstGeom>
-          <a:noFill/>
-          <a:ln w="3175">
-            <a:solidFill>
-              <a:schemeClr val="tx1"/>
-            </a:solidFill>
-          </a:ln>
-        </p:spPr>
-        <p:style>
-          <a:lnRef idx="2">
-            <a:schemeClr val="accent1">
-              <a:shade val="50000"/>
-            </a:schemeClr>
-          </a:lnRef>
-          <a:fillRef idx="1">
-            <a:schemeClr val="accent1"/>
-          </a:fillRef>
-          <a:effectRef idx="0">
-            <a:schemeClr val="accent1"/>
-          </a:effectRef>
-          <a:fontRef idx="minor">
-            <a:schemeClr val="lt1"/>
-          </a:fontRef>
-        </p:style>
-        <p:txBody>
-          <a:bodyPr rtlCol="0" anchor="ctr"/>
-          <a:lstStyle/>
-          <a:p>
-            <a:pPr algn="ctr"/>
-            <a:endParaRPr lang="en-US" dirty="0"/>
-          </a:p>
-        </p:txBody>
-      </p:sp>
-      <p:sp>
-        <p:nvSpPr>
-          <p:cNvPr id="99" name="Oval 98">
-            <a:extLst>
-              <a:ext uri="{FF2B5EF4-FFF2-40B4-BE49-F238E27FC236}">
-                <a16:creationId xmlns:a16="http://schemas.microsoft.com/office/drawing/2014/main" id="{F990C5B8-5350-4448-9C38-0E1CCFF194BE}"/>
-              </a:ext>
-            </a:extLst>
-          </p:cNvPr>
-          <p:cNvSpPr/>
-          <p:nvPr/>
-        </p:nvSpPr>
-        <p:spPr>
-          <a:xfrm>
-            <a:off x="6038011" y="3079298"/>
-            <a:ext cx="1645920" cy="1645920"/>
-          </a:xfrm>
-          <a:prstGeom prst="ellipse">
-            <a:avLst/>
-          </a:prstGeom>
-          <a:noFill/>
-          <a:ln w="3175">
-            <a:solidFill>
-              <a:schemeClr val="tx1"/>
-            </a:solidFill>
-          </a:ln>
-        </p:spPr>
-        <p:style>
-          <a:lnRef idx="2">
-            <a:schemeClr val="accent1">
-              <a:shade val="50000"/>
-            </a:schemeClr>
-          </a:lnRef>
-          <a:fillRef idx="1">
-            <a:schemeClr val="accent1"/>
-          </a:fillRef>
-          <a:effectRef idx="0">
-            <a:schemeClr val="accent1"/>
-          </a:effectRef>
-          <a:fontRef idx="minor">
-            <a:schemeClr val="lt1"/>
-          </a:fontRef>
-        </p:style>
-        <p:txBody>
-          <a:bodyPr rtlCol="0" anchor="ctr"/>
-          <a:lstStyle/>
-          <a:p>
-            <a:pPr algn="ctr"/>
-            <a:endParaRPr lang="en-US" dirty="0"/>
-          </a:p>
-        </p:txBody>
-      </p:sp>
-      <p:sp>
-        <p:nvSpPr>
-          <p:cNvPr id="101" name="Oval 100">
-            <a:extLst>
-              <a:ext uri="{FF2B5EF4-FFF2-40B4-BE49-F238E27FC236}">
-                <a16:creationId xmlns:a16="http://schemas.microsoft.com/office/drawing/2014/main" id="{854417B7-0360-49B1-A579-B88A67999A15}"/>
-              </a:ext>
-            </a:extLst>
-          </p:cNvPr>
-          <p:cNvSpPr/>
-          <p:nvPr/>
-        </p:nvSpPr>
-        <p:spPr>
-          <a:xfrm>
-            <a:off x="5987088" y="3043447"/>
-            <a:ext cx="1737360" cy="1737360"/>
-          </a:xfrm>
-          <a:prstGeom prst="ellipse">
-            <a:avLst/>
-          </a:prstGeom>
-          <a:noFill/>
-          <a:ln w="3175">
-            <a:solidFill>
-              <a:schemeClr val="tx1"/>
-            </a:solidFill>
-          </a:ln>
-        </p:spPr>
-        <p:style>
-          <a:lnRef idx="2">
-            <a:schemeClr val="accent1">
-              <a:shade val="50000"/>
-            </a:schemeClr>
-          </a:lnRef>
-          <a:fillRef idx="1">
-            <a:schemeClr val="accent1"/>
-          </a:fillRef>
-          <a:effectRef idx="0">
-            <a:schemeClr val="accent1"/>
-          </a:effectRef>
-          <a:fontRef idx="minor">
-            <a:schemeClr val="lt1"/>
-          </a:fontRef>
-        </p:style>
-        <p:txBody>
-          <a:bodyPr rtlCol="0" anchor="ctr"/>
-          <a:lstStyle/>
-          <a:p>
-            <a:pPr algn="ctr"/>
-            <a:endParaRPr lang="en-US" dirty="0"/>
-          </a:p>
-        </p:txBody>
-      </p:sp>
-      <p:sp>
-        <p:nvSpPr>
-          <p:cNvPr id="102" name="Oval 101">
-            <a:extLst>
-              <a:ext uri="{FF2B5EF4-FFF2-40B4-BE49-F238E27FC236}">
-                <a16:creationId xmlns:a16="http://schemas.microsoft.com/office/drawing/2014/main" id="{6D089FBC-79D6-4D2F-82C1-03C1AFE44BC1}"/>
-              </a:ext>
-            </a:extLst>
-          </p:cNvPr>
-          <p:cNvSpPr/>
-          <p:nvPr/>
-        </p:nvSpPr>
-        <p:spPr>
-          <a:xfrm>
-            <a:off x="5934979" y="3012221"/>
-            <a:ext cx="1828800" cy="1828800"/>
-          </a:xfrm>
-          <a:prstGeom prst="ellipse">
-            <a:avLst/>
-          </a:prstGeom>
-          <a:noFill/>
-          <a:ln w="3175">
-            <a:solidFill>
-              <a:schemeClr val="tx1"/>
-            </a:solidFill>
-          </a:ln>
-        </p:spPr>
-        <p:style>
-          <a:lnRef idx="2">
-            <a:schemeClr val="accent1">
-              <a:shade val="50000"/>
-            </a:schemeClr>
-          </a:lnRef>
-          <a:fillRef idx="1">
-            <a:schemeClr val="accent1"/>
-          </a:fillRef>
-          <a:effectRef idx="0">
-            <a:schemeClr val="accent1"/>
-          </a:effectRef>
-          <a:fontRef idx="minor">
-            <a:schemeClr val="lt1"/>
-          </a:fontRef>
-        </p:style>
-        <p:txBody>
-          <a:bodyPr rtlCol="0" anchor="ctr"/>
-          <a:lstStyle/>
-          <a:p>
-            <a:pPr algn="ctr"/>
-            <a:endParaRPr lang="en-US" dirty="0"/>
-          </a:p>
-        </p:txBody>
-      </p:sp>
-      <p:sp>
-        <p:nvSpPr>
-          <p:cNvPr id="103" name="Oval 102">
-            <a:extLst>
-              <a:ext uri="{FF2B5EF4-FFF2-40B4-BE49-F238E27FC236}">
-                <a16:creationId xmlns:a16="http://schemas.microsoft.com/office/drawing/2014/main" id="{284E37CF-7FB6-43D2-903D-FF6155BAE6C9}"/>
-              </a:ext>
-            </a:extLst>
-          </p:cNvPr>
-          <p:cNvSpPr/>
-          <p:nvPr/>
-        </p:nvSpPr>
-        <p:spPr>
-          <a:xfrm>
-            <a:off x="5895648" y="2966501"/>
-            <a:ext cx="1920240" cy="1920240"/>
-          </a:xfrm>
-          <a:prstGeom prst="ellipse">
-            <a:avLst/>
-          </a:prstGeom>
-          <a:noFill/>
-          <a:ln w="3175">
-            <a:solidFill>
-              <a:schemeClr val="tx1"/>
-            </a:solidFill>
-          </a:ln>
-        </p:spPr>
-        <p:style>
-          <a:lnRef idx="2">
-            <a:schemeClr val="accent1">
-              <a:shade val="50000"/>
-            </a:schemeClr>
-          </a:lnRef>
-          <a:fillRef idx="1">
-            <a:schemeClr val="accent1"/>
-          </a:fillRef>
-          <a:effectRef idx="0">
-            <a:schemeClr val="accent1"/>
-          </a:effectRef>
-          <a:fontRef idx="minor">
-            <a:schemeClr val="lt1"/>
-          </a:fontRef>
-        </p:style>
-        <p:txBody>
-          <a:bodyPr rtlCol="0" anchor="ctr"/>
-          <a:lstStyle/>
-          <a:p>
-            <a:pPr algn="ctr"/>
-            <a:endParaRPr lang="en-US" dirty="0"/>
-          </a:p>
-        </p:txBody>
-      </p:sp>
-      <p:sp>
-        <p:nvSpPr>
-          <p:cNvPr id="104" name="Oval 103">
-            <a:extLst>
-              <a:ext uri="{FF2B5EF4-FFF2-40B4-BE49-F238E27FC236}">
-                <a16:creationId xmlns:a16="http://schemas.microsoft.com/office/drawing/2014/main" id="{D0E292A5-B5E1-4F1B-9669-66519B2DE8AD}"/>
-              </a:ext>
-            </a:extLst>
-          </p:cNvPr>
-          <p:cNvSpPr/>
-          <p:nvPr/>
-        </p:nvSpPr>
-        <p:spPr>
-          <a:xfrm>
-            <a:off x="5842380" y="2920781"/>
-            <a:ext cx="2011680" cy="2011680"/>
-          </a:xfrm>
-          <a:prstGeom prst="ellipse">
-            <a:avLst/>
-          </a:prstGeom>
-          <a:noFill/>
-          <a:ln w="3175">
-            <a:solidFill>
-              <a:schemeClr val="tx1"/>
-            </a:solidFill>
-          </a:ln>
-        </p:spPr>
-        <p:style>
-          <a:lnRef idx="2">
-            <a:schemeClr val="accent1">
-              <a:shade val="50000"/>
-            </a:schemeClr>
-          </a:lnRef>
-          <a:fillRef idx="1">
-            <a:schemeClr val="accent1"/>
-          </a:fillRef>
-          <a:effectRef idx="0">
-            <a:schemeClr val="accent1"/>
-          </a:effectRef>
-          <a:fontRef idx="minor">
-            <a:schemeClr val="lt1"/>
-          </a:fontRef>
-        </p:style>
-        <p:txBody>
-          <a:bodyPr rtlCol="0" anchor="ctr"/>
-          <a:lstStyle/>
-          <a:p>
-            <a:pPr algn="ctr"/>
-            <a:endParaRPr lang="en-US" dirty="0"/>
-          </a:p>
-        </p:txBody>
-      </p:sp>
+      </p:cxnSp>
+      <mc:AlternateContent xmlns:mc="http://schemas.openxmlformats.org/markup-compatibility/2006">
+        <mc:Choice xmlns:a14="http://schemas.microsoft.com/office/drawing/2010/main" Requires="a14">
+          <p:sp>
+            <p:nvSpPr>
+              <p:cNvPr id="12" name="TextBox 11">
+                <a:extLst>
+                  <a:ext uri="{FF2B5EF4-FFF2-40B4-BE49-F238E27FC236}">
+                    <a16:creationId xmlns:a16="http://schemas.microsoft.com/office/drawing/2014/main" id="{C015034D-C475-437E-8DEE-3C88450C8CD5}"/>
+                  </a:ext>
+                </a:extLst>
+              </p:cNvPr>
+              <p:cNvSpPr txBox="1"/>
+              <p:nvPr/>
+            </p:nvSpPr>
+            <p:spPr>
+              <a:xfrm>
+                <a:off x="6331582" y="3196327"/>
+                <a:ext cx="258404" cy="414088"/>
+              </a:xfrm>
+              <a:prstGeom prst="rect">
+                <a:avLst/>
+              </a:prstGeom>
+              <a:noFill/>
+            </p:spPr>
+            <p:txBody>
+              <a:bodyPr wrap="none" lIns="0" tIns="0" rIns="0" bIns="0" rtlCol="0">
+                <a:spAutoFit/>
+              </a:bodyPr>
+              <a:lstStyle/>
+              <a:p>
+                <a:pPr/>
+                <a14:m>
+                  <m:oMathPara xmlns:m="http://schemas.openxmlformats.org/officeDocument/2006/math">
+                    <m:oMathParaPr>
+                      <m:jc m:val="centerGroup"/>
+                    </m:oMathParaPr>
+                    <m:oMath xmlns:m="http://schemas.openxmlformats.org/officeDocument/2006/math">
+                      <m:acc>
+                        <m:accPr>
+                          <m:chr m:val="⃗"/>
+                          <m:ctrlPr>
+                            <a:rPr lang="en-US" sz="2400" i="1" smtClean="0">
+                              <a:solidFill>
+                                <a:srgbClr val="FF0000"/>
+                              </a:solidFill>
+                              <a:latin typeface="Cambria Math" panose="02040503050406030204" pitchFamily="18" charset="0"/>
+                            </a:rPr>
+                          </m:ctrlPr>
+                        </m:accPr>
+                        <m:e>
+                          <m:r>
+                            <a:rPr lang="en-US" sz="2400" b="0" i="1" smtClean="0">
+                              <a:solidFill>
+                                <a:srgbClr val="FF0000"/>
+                              </a:solidFill>
+                              <a:latin typeface="Cambria Math" panose="02040503050406030204" pitchFamily="18" charset="0"/>
+                            </a:rPr>
+                            <m:t>𝑇</m:t>
+                          </m:r>
+                        </m:e>
+                      </m:acc>
+                    </m:oMath>
+                  </m:oMathPara>
+                </a14:m>
+                <a:endParaRPr lang="en-US" sz="2400" dirty="0">
+                  <a:solidFill>
+                    <a:srgbClr val="FF0000"/>
+                  </a:solidFill>
+                </a:endParaRPr>
+              </a:p>
+            </p:txBody>
+          </p:sp>
+        </mc:Choice>
+        <mc:Fallback>
+          <p:sp>
+            <p:nvSpPr>
+              <p:cNvPr id="12" name="TextBox 11">
+                <a:extLst>
+                  <a:ext uri="{FF2B5EF4-FFF2-40B4-BE49-F238E27FC236}">
+                    <a16:creationId xmlns:a16="http://schemas.microsoft.com/office/drawing/2014/main" id="{C015034D-C475-437E-8DEE-3C88450C8CD5}"/>
+                  </a:ext>
+                </a:extLst>
+              </p:cNvPr>
+              <p:cNvSpPr txBox="1">
+                <a:spLocks noRot="1" noChangeAspect="1" noMove="1" noResize="1" noEditPoints="1" noAdjustHandles="1" noChangeArrowheads="1" noChangeShapeType="1" noTextEdit="1"/>
+              </p:cNvSpPr>
+              <p:nvPr/>
+            </p:nvSpPr>
+            <p:spPr>
+              <a:xfrm>
+                <a:off x="6331582" y="3196327"/>
+                <a:ext cx="258404" cy="414088"/>
+              </a:xfrm>
+              <a:prstGeom prst="rect">
+                <a:avLst/>
+              </a:prstGeom>
+              <a:blipFill>
+                <a:blip r:embed="rId4"/>
+                <a:stretch>
+                  <a:fillRect/>
+                </a:stretch>
+              </a:blipFill>
+            </p:spPr>
+            <p:txBody>
+              <a:bodyPr/>
+              <a:lstStyle/>
+              <a:p>
+                <a:r>
+                  <a:rPr lang="en-US">
+                    <a:noFill/>
+                  </a:rPr>
+                  <a:t> </a:t>
+                </a:r>
+              </a:p>
+            </p:txBody>
+          </p:sp>
+        </mc:Fallback>
+      </mc:AlternateContent>
     </p:spTree>
     <p:extLst>
       <p:ext uri="{BB962C8B-B14F-4D97-AF65-F5344CB8AC3E}">
-        <p14:creationId xmlns:p14="http://schemas.microsoft.com/office/powerpoint/2010/main" val="1797459676"/>
+        <p14:creationId xmlns:p14="http://schemas.microsoft.com/office/powerpoint/2010/main" val="1212671765"/>
       </p:ext>
     </p:extLst>
   </p:cSld>

</xml_diff>

<commit_message>
Added 2.1.64; Updated 2.1.60-2.1.67
</commit_message>
<xml_diff>
--- a/volunteer/Drawings.pptx
+++ b/volunteer/Drawings.pptx
@@ -5,7 +5,7 @@
     <p:sldMasterId id="2147483648" r:id="rId1"/>
   </p:sldMasterIdLst>
   <p:notesMasterIdLst>
-    <p:notesMasterId r:id="rId20"/>
+    <p:notesMasterId r:id="rId22"/>
   </p:notesMasterIdLst>
   <p:sldIdLst>
     <p:sldId id="257" r:id="rId2"/>
@@ -26,6 +26,8 @@
     <p:sldId id="280" r:id="rId17"/>
     <p:sldId id="281" r:id="rId18"/>
     <p:sldId id="282" r:id="rId19"/>
+    <p:sldId id="283" r:id="rId20"/>
+    <p:sldId id="284" r:id="rId21"/>
   </p:sldIdLst>
   <p:sldSz cx="12192000" cy="6858000"/>
   <p:notesSz cx="6858000" cy="9144000"/>
@@ -226,7 +228,7 @@
           <a:p>
             <a:fld id="{E97AC224-DDFD-4843-A1F8-E420074F16B8}" type="datetimeFigureOut">
               <a:rPr lang="en-US" smtClean="0"/>
-              <a:t>6/26/2024</a:t>
+              <a:t>6/27/2024</a:t>
             </a:fld>
             <a:endParaRPr lang="en-US"/>
           </a:p>
@@ -724,7 +726,7 @@
           <a:p>
             <a:fld id="{F0249701-11FC-451D-B9AC-2A68C1C5D58E}" type="datetimeFigureOut">
               <a:rPr lang="en-US" smtClean="0"/>
-              <a:t>6/26/2024</a:t>
+              <a:t>6/27/2024</a:t>
             </a:fld>
             <a:endParaRPr lang="en-US"/>
           </a:p>
@@ -922,7 +924,7 @@
           <a:p>
             <a:fld id="{F0249701-11FC-451D-B9AC-2A68C1C5D58E}" type="datetimeFigureOut">
               <a:rPr lang="en-US" smtClean="0"/>
-              <a:t>6/26/2024</a:t>
+              <a:t>6/27/2024</a:t>
             </a:fld>
             <a:endParaRPr lang="en-US"/>
           </a:p>
@@ -1130,7 +1132,7 @@
           <a:p>
             <a:fld id="{F0249701-11FC-451D-B9AC-2A68C1C5D58E}" type="datetimeFigureOut">
               <a:rPr lang="en-US" smtClean="0"/>
-              <a:t>6/26/2024</a:t>
+              <a:t>6/27/2024</a:t>
             </a:fld>
             <a:endParaRPr lang="en-US"/>
           </a:p>
@@ -1328,7 +1330,7 @@
           <a:p>
             <a:fld id="{F0249701-11FC-451D-B9AC-2A68C1C5D58E}" type="datetimeFigureOut">
               <a:rPr lang="en-US" smtClean="0"/>
-              <a:t>6/26/2024</a:t>
+              <a:t>6/27/2024</a:t>
             </a:fld>
             <a:endParaRPr lang="en-US"/>
           </a:p>
@@ -1603,7 +1605,7 @@
           <a:p>
             <a:fld id="{F0249701-11FC-451D-B9AC-2A68C1C5D58E}" type="datetimeFigureOut">
               <a:rPr lang="en-US" smtClean="0"/>
-              <a:t>6/26/2024</a:t>
+              <a:t>6/27/2024</a:t>
             </a:fld>
             <a:endParaRPr lang="en-US"/>
           </a:p>
@@ -1868,7 +1870,7 @@
           <a:p>
             <a:fld id="{F0249701-11FC-451D-B9AC-2A68C1C5D58E}" type="datetimeFigureOut">
               <a:rPr lang="en-US" smtClean="0"/>
-              <a:t>6/26/2024</a:t>
+              <a:t>6/27/2024</a:t>
             </a:fld>
             <a:endParaRPr lang="en-US"/>
           </a:p>
@@ -2280,7 +2282,7 @@
           <a:p>
             <a:fld id="{F0249701-11FC-451D-B9AC-2A68C1C5D58E}" type="datetimeFigureOut">
               <a:rPr lang="en-US" smtClean="0"/>
-              <a:t>6/26/2024</a:t>
+              <a:t>6/27/2024</a:t>
             </a:fld>
             <a:endParaRPr lang="en-US"/>
           </a:p>
@@ -2421,7 +2423,7 @@
           <a:p>
             <a:fld id="{F0249701-11FC-451D-B9AC-2A68C1C5D58E}" type="datetimeFigureOut">
               <a:rPr lang="en-US" smtClean="0"/>
-              <a:t>6/26/2024</a:t>
+              <a:t>6/27/2024</a:t>
             </a:fld>
             <a:endParaRPr lang="en-US"/>
           </a:p>
@@ -2534,7 +2536,7 @@
           <a:p>
             <a:fld id="{F0249701-11FC-451D-B9AC-2A68C1C5D58E}" type="datetimeFigureOut">
               <a:rPr lang="en-US" smtClean="0"/>
-              <a:t>6/26/2024</a:t>
+              <a:t>6/27/2024</a:t>
             </a:fld>
             <a:endParaRPr lang="en-US"/>
           </a:p>
@@ -2845,7 +2847,7 @@
           <a:p>
             <a:fld id="{F0249701-11FC-451D-B9AC-2A68C1C5D58E}" type="datetimeFigureOut">
               <a:rPr lang="en-US" smtClean="0"/>
-              <a:t>6/26/2024</a:t>
+              <a:t>6/27/2024</a:t>
             </a:fld>
             <a:endParaRPr lang="en-US"/>
           </a:p>
@@ -3133,7 +3135,7 @@
           <a:p>
             <a:fld id="{F0249701-11FC-451D-B9AC-2A68C1C5D58E}" type="datetimeFigureOut">
               <a:rPr lang="en-US" smtClean="0"/>
-              <a:t>6/26/2024</a:t>
+              <a:t>6/27/2024</a:t>
             </a:fld>
             <a:endParaRPr lang="en-US"/>
           </a:p>
@@ -3374,7 +3376,7 @@
           <a:p>
             <a:fld id="{F0249701-11FC-451D-B9AC-2A68C1C5D58E}" type="datetimeFigureOut">
               <a:rPr lang="en-US" smtClean="0"/>
-              <a:t>6/26/2024</a:t>
+              <a:t>6/27/2024</a:t>
             </a:fld>
             <a:endParaRPr lang="en-US"/>
           </a:p>
@@ -28980,8 +28982,8 @@
           </a:p>
         </p:txBody>
       </p:sp>
-      <mc:AlternateContent xmlns:mc="http://schemas.openxmlformats.org/markup-compatibility/2006">
-        <mc:Choice xmlns:a14="http://schemas.microsoft.com/office/drawing/2010/main" Requires="a14">
+      <mc:AlternateContent xmlns:mc="http://schemas.openxmlformats.org/markup-compatibility/2006" xmlns:a14="http://schemas.microsoft.com/office/drawing/2010/main">
+        <mc:Choice Requires="a14">
           <p:sp>
             <p:nvSpPr>
               <p:cNvPr id="25" name="TextBox 24">
@@ -29032,7 +29034,7 @@
             </p:txBody>
           </p:sp>
         </mc:Choice>
-        <mc:Fallback>
+        <mc:Fallback xmlns="">
           <p:sp>
             <p:nvSpPr>
               <p:cNvPr id="25" name="TextBox 24">
@@ -29123,8 +29125,8 @@
           </a:fontRef>
         </p:style>
       </p:cxnSp>
-      <mc:AlternateContent xmlns:mc="http://schemas.openxmlformats.org/markup-compatibility/2006">
-        <mc:Choice xmlns:a14="http://schemas.microsoft.com/office/drawing/2010/main" Requires="a14">
+      <mc:AlternateContent xmlns:mc="http://schemas.openxmlformats.org/markup-compatibility/2006" xmlns:a14="http://schemas.microsoft.com/office/drawing/2010/main">
+        <mc:Choice Requires="a14">
           <p:sp>
             <p:nvSpPr>
               <p:cNvPr id="29" name="TextBox 28">
@@ -29192,7 +29194,7 @@
             </p:txBody>
           </p:sp>
         </mc:Choice>
-        <mc:Fallback>
+        <mc:Fallback xmlns="">
           <p:sp>
             <p:nvSpPr>
               <p:cNvPr id="29" name="TextBox 28">
@@ -29329,8 +29331,8 @@
           </a:fontRef>
         </p:style>
       </p:cxnSp>
-      <mc:AlternateContent xmlns:mc="http://schemas.openxmlformats.org/markup-compatibility/2006">
-        <mc:Choice xmlns:a14="http://schemas.microsoft.com/office/drawing/2010/main" Requires="a14">
+      <mc:AlternateContent xmlns:mc="http://schemas.openxmlformats.org/markup-compatibility/2006" xmlns:a14="http://schemas.microsoft.com/office/drawing/2010/main">
+        <mc:Choice Requires="a14">
           <p:sp>
             <p:nvSpPr>
               <p:cNvPr id="37" name="TextBox 36">
@@ -29380,7 +29382,7 @@
             </p:txBody>
           </p:sp>
         </mc:Choice>
-        <mc:Fallback>
+        <mc:Fallback xmlns="">
           <p:sp>
             <p:nvSpPr>
               <p:cNvPr id="37" name="TextBox 36">
@@ -29425,8 +29427,8 @@
           </p:sp>
         </mc:Fallback>
       </mc:AlternateContent>
-      <mc:AlternateContent xmlns:mc="http://schemas.openxmlformats.org/markup-compatibility/2006">
-        <mc:Choice xmlns:a14="http://schemas.microsoft.com/office/drawing/2010/main" Requires="a14">
+      <mc:AlternateContent xmlns:mc="http://schemas.openxmlformats.org/markup-compatibility/2006" xmlns:a14="http://schemas.microsoft.com/office/drawing/2010/main">
+        <mc:Choice Requires="a14">
           <p:sp>
             <p:nvSpPr>
               <p:cNvPr id="38" name="TextBox 37">
@@ -29476,7 +29478,7 @@
             </p:txBody>
           </p:sp>
         </mc:Choice>
-        <mc:Fallback>
+        <mc:Fallback xmlns="">
           <p:sp>
             <p:nvSpPr>
               <p:cNvPr id="38" name="TextBox 37">
@@ -29722,8 +29724,8 @@
           </a:fontRef>
         </p:style>
       </p:cxnSp>
-      <mc:AlternateContent xmlns:mc="http://schemas.openxmlformats.org/markup-compatibility/2006">
-        <mc:Choice xmlns:a14="http://schemas.microsoft.com/office/drawing/2010/main" Requires="a14">
+      <mc:AlternateContent xmlns:mc="http://schemas.openxmlformats.org/markup-compatibility/2006" xmlns:a14="http://schemas.microsoft.com/office/drawing/2010/main">
+        <mc:Choice Requires="a14">
           <p:sp>
             <p:nvSpPr>
               <p:cNvPr id="45" name="TextBox 44">
@@ -29810,7 +29812,7 @@
             </p:txBody>
           </p:sp>
         </mc:Choice>
-        <mc:Fallback>
+        <mc:Fallback xmlns="">
           <p:sp>
             <p:nvSpPr>
               <p:cNvPr id="45" name="TextBox 44">
@@ -29901,8 +29903,8 @@
           </a:fontRef>
         </p:style>
       </p:cxnSp>
-      <mc:AlternateContent xmlns:mc="http://schemas.openxmlformats.org/markup-compatibility/2006">
-        <mc:Choice xmlns:a14="http://schemas.microsoft.com/office/drawing/2010/main" Requires="a14">
+      <mc:AlternateContent xmlns:mc="http://schemas.openxmlformats.org/markup-compatibility/2006" xmlns:a14="http://schemas.microsoft.com/office/drawing/2010/main">
+        <mc:Choice Requires="a14">
           <p:sp>
             <p:nvSpPr>
               <p:cNvPr id="52" name="TextBox 51">
@@ -29964,7 +29966,7 @@
             </p:txBody>
           </p:sp>
         </mc:Choice>
-        <mc:Fallback>
+        <mc:Fallback xmlns="">
           <p:sp>
             <p:nvSpPr>
               <p:cNvPr id="52" name="TextBox 51">
@@ -30177,8 +30179,8 @@
           </a:fontRef>
         </p:style>
       </p:cxnSp>
-      <mc:AlternateContent xmlns:mc="http://schemas.openxmlformats.org/markup-compatibility/2006">
-        <mc:Choice xmlns:a14="http://schemas.microsoft.com/office/drawing/2010/main" Requires="a14">
+      <mc:AlternateContent xmlns:mc="http://schemas.openxmlformats.org/markup-compatibility/2006" xmlns:a14="http://schemas.microsoft.com/office/drawing/2010/main">
+        <mc:Choice Requires="a14">
           <p:sp>
             <p:nvSpPr>
               <p:cNvPr id="59" name="TextBox 58">
@@ -30228,7 +30230,7 @@
             </p:txBody>
           </p:sp>
         </mc:Choice>
-        <mc:Fallback>
+        <mc:Fallback xmlns="">
           <p:sp>
             <p:nvSpPr>
               <p:cNvPr id="59" name="TextBox 58">
@@ -30273,8 +30275,8 @@
           </p:sp>
         </mc:Fallback>
       </mc:AlternateContent>
-      <mc:AlternateContent xmlns:mc="http://schemas.openxmlformats.org/markup-compatibility/2006">
-        <mc:Choice xmlns:a14="http://schemas.microsoft.com/office/drawing/2010/main" Requires="a14">
+      <mc:AlternateContent xmlns:mc="http://schemas.openxmlformats.org/markup-compatibility/2006" xmlns:a14="http://schemas.microsoft.com/office/drawing/2010/main">
+        <mc:Choice Requires="a14">
           <p:sp>
             <p:nvSpPr>
               <p:cNvPr id="61" name="TextBox 60">
@@ -30324,7 +30326,7 @@
             </p:txBody>
           </p:sp>
         </mc:Choice>
-        <mc:Fallback>
+        <mc:Fallback xmlns="">
           <p:sp>
             <p:nvSpPr>
               <p:cNvPr id="61" name="TextBox 60">
@@ -30369,8 +30371,8 @@
           </p:sp>
         </mc:Fallback>
       </mc:AlternateContent>
-      <mc:AlternateContent xmlns:mc="http://schemas.openxmlformats.org/markup-compatibility/2006">
-        <mc:Choice xmlns:a14="http://schemas.microsoft.com/office/drawing/2010/main" Requires="a14">
+      <mc:AlternateContent xmlns:mc="http://schemas.openxmlformats.org/markup-compatibility/2006" xmlns:a14="http://schemas.microsoft.com/office/drawing/2010/main">
+        <mc:Choice Requires="a14">
           <p:sp>
             <p:nvSpPr>
               <p:cNvPr id="62" name="TextBox 61">
@@ -30399,6 +30401,7 @@
               </a:bodyPr>
               <a:lstStyle/>
               <a:p>
+                <a:pPr/>
                 <a14:m>
                   <m:oMathPara xmlns:m="http://schemas.openxmlformats.org/officeDocument/2006/math">
                     <m:oMathParaPr>
@@ -30438,7 +30441,7 @@
             </p:txBody>
           </p:sp>
         </mc:Choice>
-        <mc:Fallback>
+        <mc:Fallback xmlns="">
           <p:sp>
             <p:nvSpPr>
               <p:cNvPr id="62" name="TextBox 61">
@@ -30483,8 +30486,8 @@
           </p:sp>
         </mc:Fallback>
       </mc:AlternateContent>
-      <mc:AlternateContent xmlns:mc="http://schemas.openxmlformats.org/markup-compatibility/2006">
-        <mc:Choice xmlns:a14="http://schemas.microsoft.com/office/drawing/2010/main" Requires="a14">
+      <mc:AlternateContent xmlns:mc="http://schemas.openxmlformats.org/markup-compatibility/2006" xmlns:a14="http://schemas.microsoft.com/office/drawing/2010/main">
+        <mc:Choice Requires="a14">
           <p:sp>
             <p:nvSpPr>
               <p:cNvPr id="63" name="TextBox 62">
@@ -30513,6 +30516,7 @@
               </a:bodyPr>
               <a:lstStyle/>
               <a:p>
+                <a:pPr/>
                 <a14:m>
                   <m:oMathPara xmlns:m="http://schemas.openxmlformats.org/officeDocument/2006/math">
                     <m:oMathParaPr>
@@ -30552,7 +30556,7 @@
             </p:txBody>
           </p:sp>
         </mc:Choice>
-        <mc:Fallback>
+        <mc:Fallback xmlns="">
           <p:sp>
             <p:nvSpPr>
               <p:cNvPr id="63" name="TextBox 62">
@@ -30650,8 +30654,8 @@
           </a:p>
         </p:txBody>
       </p:sp>
-      <mc:AlternateContent xmlns:mc="http://schemas.openxmlformats.org/markup-compatibility/2006">
-        <mc:Choice xmlns:a14="http://schemas.microsoft.com/office/drawing/2010/main" Requires="a14">
+      <mc:AlternateContent xmlns:mc="http://schemas.openxmlformats.org/markup-compatibility/2006" xmlns:a14="http://schemas.microsoft.com/office/drawing/2010/main">
+        <mc:Choice Requires="a14">
           <p:sp>
             <p:nvSpPr>
               <p:cNvPr id="65" name="TextBox 64">
@@ -30702,7 +30706,7 @@
             </p:txBody>
           </p:sp>
         </mc:Choice>
-        <mc:Fallback>
+        <mc:Fallback xmlns="">
           <p:sp>
             <p:nvSpPr>
               <p:cNvPr id="65" name="TextBox 64">
@@ -30792,8 +30796,8 @@
           </a:fontRef>
         </p:style>
       </p:cxnSp>
-      <mc:AlternateContent xmlns:mc="http://schemas.openxmlformats.org/markup-compatibility/2006">
-        <mc:Choice xmlns:a14="http://schemas.microsoft.com/office/drawing/2010/main" Requires="a14">
+      <mc:AlternateContent xmlns:mc="http://schemas.openxmlformats.org/markup-compatibility/2006" xmlns:a14="http://schemas.microsoft.com/office/drawing/2010/main">
+        <mc:Choice Requires="a14">
           <p:sp>
             <p:nvSpPr>
               <p:cNvPr id="67" name="TextBox 66">
@@ -30855,7 +30859,7 @@
             </p:txBody>
           </p:sp>
         </mc:Choice>
-        <mc:Fallback>
+        <mc:Fallback xmlns="">
           <p:sp>
             <p:nvSpPr>
               <p:cNvPr id="67" name="TextBox 66">
@@ -30900,8 +30904,8 @@
           </p:sp>
         </mc:Fallback>
       </mc:AlternateContent>
-      <mc:AlternateContent xmlns:mc="http://schemas.openxmlformats.org/markup-compatibility/2006">
-        <mc:Choice xmlns:a14="http://schemas.microsoft.com/office/drawing/2010/main" Requires="a14">
+      <mc:AlternateContent xmlns:mc="http://schemas.openxmlformats.org/markup-compatibility/2006" xmlns:a14="http://schemas.microsoft.com/office/drawing/2010/main">
+        <mc:Choice Requires="a14">
           <p:sp>
             <p:nvSpPr>
               <p:cNvPr id="68" name="TextBox 67">
@@ -30969,7 +30973,7 @@
             </p:txBody>
           </p:sp>
         </mc:Choice>
-        <mc:Fallback>
+        <mc:Fallback xmlns="">
           <p:sp>
             <p:nvSpPr>
               <p:cNvPr id="68" name="TextBox 67">
@@ -31104,8 +31108,8 @@
           </a:fontRef>
         </p:style>
       </p:cxnSp>
-      <mc:AlternateContent xmlns:mc="http://schemas.openxmlformats.org/markup-compatibility/2006">
-        <mc:Choice xmlns:a14="http://schemas.microsoft.com/office/drawing/2010/main" Requires="a14">
+      <mc:AlternateContent xmlns:mc="http://schemas.openxmlformats.org/markup-compatibility/2006" xmlns:a14="http://schemas.microsoft.com/office/drawing/2010/main">
+        <mc:Choice Requires="a14">
           <p:sp>
             <p:nvSpPr>
               <p:cNvPr id="71" name="TextBox 70">
@@ -31192,7 +31196,7 @@
             </p:txBody>
           </p:sp>
         </mc:Choice>
-        <mc:Fallback>
+        <mc:Fallback xmlns="">
           <p:sp>
             <p:nvSpPr>
               <p:cNvPr id="71" name="TextBox 70">
@@ -31319,8 +31323,8 @@
           </a:p>
         </p:txBody>
       </p:sp>
-      <mc:AlternateContent xmlns:mc="http://schemas.openxmlformats.org/markup-compatibility/2006">
-        <mc:Choice xmlns:a14="http://schemas.microsoft.com/office/drawing/2010/main" Requires="a14">
+      <mc:AlternateContent xmlns:mc="http://schemas.openxmlformats.org/markup-compatibility/2006" xmlns:a14="http://schemas.microsoft.com/office/drawing/2010/main">
+        <mc:Choice Requires="a14">
           <p:sp>
             <p:nvSpPr>
               <p:cNvPr id="38" name="TextBox 37">
@@ -31371,7 +31375,7 @@
             </p:txBody>
           </p:sp>
         </mc:Choice>
-        <mc:Fallback>
+        <mc:Fallback xmlns="">
           <p:sp>
             <p:nvSpPr>
               <p:cNvPr id="38" name="TextBox 37">
@@ -32619,8 +32623,8 @@
           </a:fontRef>
         </p:style>
       </p:cxnSp>
-      <mc:AlternateContent xmlns:mc="http://schemas.openxmlformats.org/markup-compatibility/2006">
-        <mc:Choice xmlns:a14="http://schemas.microsoft.com/office/drawing/2010/main" Requires="a14">
+      <mc:AlternateContent xmlns:mc="http://schemas.openxmlformats.org/markup-compatibility/2006" xmlns:a14="http://schemas.microsoft.com/office/drawing/2010/main">
+        <mc:Choice Requires="a14">
           <p:sp>
             <p:nvSpPr>
               <p:cNvPr id="48" name="TextBox 47">
@@ -32701,7 +32705,7 @@
             </p:txBody>
           </p:sp>
         </mc:Choice>
-        <mc:Fallback>
+        <mc:Fallback xmlns="">
           <p:sp>
             <p:nvSpPr>
               <p:cNvPr id="48" name="TextBox 47">
@@ -32746,8 +32750,8 @@
           </p:sp>
         </mc:Fallback>
       </mc:AlternateContent>
-      <mc:AlternateContent xmlns:mc="http://schemas.openxmlformats.org/markup-compatibility/2006">
-        <mc:Choice xmlns:a14="http://schemas.microsoft.com/office/drawing/2010/main" Requires="a14">
+      <mc:AlternateContent xmlns:mc="http://schemas.openxmlformats.org/markup-compatibility/2006" xmlns:a14="http://schemas.microsoft.com/office/drawing/2010/main">
+        <mc:Choice Requires="a14">
           <p:sp>
             <p:nvSpPr>
               <p:cNvPr id="52" name="TextBox 51">
@@ -32828,7 +32832,7 @@
             </p:txBody>
           </p:sp>
         </mc:Choice>
-        <mc:Fallback>
+        <mc:Fallback xmlns="">
           <p:sp>
             <p:nvSpPr>
               <p:cNvPr id="52" name="TextBox 51">
@@ -32922,6 +32926,3561 @@
     <p:extLst>
       <p:ext uri="{BB962C8B-B14F-4D97-AF65-F5344CB8AC3E}">
         <p14:creationId xmlns:p14="http://schemas.microsoft.com/office/powerpoint/2010/main" val="2319220008"/>
+      </p:ext>
+    </p:extLst>
+  </p:cSld>
+  <p:clrMapOvr>
+    <a:masterClrMapping/>
+  </p:clrMapOvr>
+</p:sld>
+</file>
+
+<file path=ppt/slides/slide19.xml><?xml version="1.0" encoding="utf-8"?>
+<p:sld xmlns:a="http://schemas.openxmlformats.org/drawingml/2006/main" xmlns:r="http://schemas.openxmlformats.org/officeDocument/2006/relationships" xmlns:p="http://schemas.openxmlformats.org/presentationml/2006/main">
+  <p:cSld>
+    <p:spTree>
+      <p:nvGrpSpPr>
+        <p:cNvPr id="1" name=""/>
+        <p:cNvGrpSpPr/>
+        <p:nvPr/>
+      </p:nvGrpSpPr>
+      <p:grpSpPr>
+        <a:xfrm>
+          <a:off x="0" y="0"/>
+          <a:ext cx="0" cy="0"/>
+          <a:chOff x="0" y="0"/>
+          <a:chExt cx="0" cy="0"/>
+        </a:xfrm>
+      </p:grpSpPr>
+      <p:sp>
+        <p:nvSpPr>
+          <p:cNvPr id="2" name="Oval 1">
+            <a:extLst>
+              <a:ext uri="{FF2B5EF4-FFF2-40B4-BE49-F238E27FC236}">
+                <a16:creationId xmlns:a16="http://schemas.microsoft.com/office/drawing/2014/main" id="{CA8C684D-F6C3-4054-8C88-F54100A9DFD7}"/>
+              </a:ext>
+            </a:extLst>
+          </p:cNvPr>
+          <p:cNvSpPr/>
+          <p:nvPr/>
+        </p:nvSpPr>
+        <p:spPr>
+          <a:xfrm>
+            <a:off x="470359" y="1737218"/>
+            <a:ext cx="3716500" cy="3716500"/>
+          </a:xfrm>
+          <a:prstGeom prst="ellipse">
+            <a:avLst/>
+          </a:prstGeom>
+          <a:noFill/>
+          <a:ln w="22225">
+            <a:solidFill>
+              <a:schemeClr val="tx1"/>
+            </a:solidFill>
+          </a:ln>
+        </p:spPr>
+        <p:style>
+          <a:lnRef idx="2">
+            <a:schemeClr val="accent1">
+              <a:shade val="50000"/>
+            </a:schemeClr>
+          </a:lnRef>
+          <a:fillRef idx="1">
+            <a:schemeClr val="accent1"/>
+          </a:fillRef>
+          <a:effectRef idx="0">
+            <a:schemeClr val="accent1"/>
+          </a:effectRef>
+          <a:fontRef idx="minor">
+            <a:schemeClr val="lt1"/>
+          </a:fontRef>
+        </p:style>
+        <p:txBody>
+          <a:bodyPr rtlCol="0" anchor="ctr"/>
+          <a:lstStyle/>
+          <a:p>
+            <a:pPr algn="ctr"/>
+            <a:endParaRPr lang="en-US"/>
+          </a:p>
+        </p:txBody>
+      </p:sp>
+      <p:cxnSp>
+        <p:nvCxnSpPr>
+          <p:cNvPr id="5" name="Straight Arrow Connector 4">
+            <a:extLst>
+              <a:ext uri="{FF2B5EF4-FFF2-40B4-BE49-F238E27FC236}">
+                <a16:creationId xmlns:a16="http://schemas.microsoft.com/office/drawing/2014/main" id="{97CB1484-8FF2-4EEC-8226-24C35980D2BD}"/>
+              </a:ext>
+            </a:extLst>
+          </p:cNvPr>
+          <p:cNvCxnSpPr>
+            <a:cxnSpLocks/>
+          </p:cNvCxnSpPr>
+          <p:nvPr/>
+        </p:nvCxnSpPr>
+        <p:spPr>
+          <a:xfrm flipV="1">
+            <a:off x="2328608" y="1841718"/>
+            <a:ext cx="587113" cy="1759744"/>
+          </a:xfrm>
+          <a:prstGeom prst="straightConnector1">
+            <a:avLst/>
+          </a:prstGeom>
+          <a:ln w="12700">
+            <a:solidFill>
+              <a:schemeClr val="tx1"/>
+            </a:solidFill>
+            <a:prstDash val="solid"/>
+            <a:headEnd type="none" w="lg" len="lg"/>
+            <a:tailEnd type="none" w="lg" len="lg"/>
+          </a:ln>
+        </p:spPr>
+        <p:style>
+          <a:lnRef idx="1">
+            <a:schemeClr val="accent1"/>
+          </a:lnRef>
+          <a:fillRef idx="0">
+            <a:schemeClr val="accent1"/>
+          </a:fillRef>
+          <a:effectRef idx="0">
+            <a:schemeClr val="accent1"/>
+          </a:effectRef>
+          <a:fontRef idx="minor">
+            <a:schemeClr val="tx1"/>
+          </a:fontRef>
+        </p:style>
+      </p:cxnSp>
+      <p:sp>
+        <p:nvSpPr>
+          <p:cNvPr id="7" name="Oval 6">
+            <a:extLst>
+              <a:ext uri="{FF2B5EF4-FFF2-40B4-BE49-F238E27FC236}">
+                <a16:creationId xmlns:a16="http://schemas.microsoft.com/office/drawing/2014/main" id="{89133622-ADC8-43BA-AAEA-9C1000DD106D}"/>
+              </a:ext>
+            </a:extLst>
+          </p:cNvPr>
+          <p:cNvSpPr/>
+          <p:nvPr/>
+        </p:nvSpPr>
+        <p:spPr>
+          <a:xfrm flipH="1">
+            <a:off x="2290097" y="3556955"/>
+            <a:ext cx="77023" cy="77023"/>
+          </a:xfrm>
+          <a:prstGeom prst="ellipse">
+            <a:avLst/>
+          </a:prstGeom>
+          <a:solidFill>
+            <a:schemeClr val="tx1"/>
+          </a:solidFill>
+          <a:ln w="28575">
+            <a:solidFill>
+              <a:schemeClr val="tx1"/>
+            </a:solidFill>
+          </a:ln>
+        </p:spPr>
+        <p:style>
+          <a:lnRef idx="2">
+            <a:schemeClr val="accent1">
+              <a:shade val="50000"/>
+            </a:schemeClr>
+          </a:lnRef>
+          <a:fillRef idx="1">
+            <a:schemeClr val="accent1"/>
+          </a:fillRef>
+          <a:effectRef idx="0">
+            <a:schemeClr val="accent1"/>
+          </a:effectRef>
+          <a:fontRef idx="minor">
+            <a:schemeClr val="lt1"/>
+          </a:fontRef>
+        </p:style>
+        <p:txBody>
+          <a:bodyPr rtlCol="0" anchor="ctr"/>
+          <a:lstStyle/>
+          <a:p>
+            <a:pPr algn="ctr"/>
+            <a:endParaRPr lang="en-US"/>
+          </a:p>
+        </p:txBody>
+      </p:sp>
+      <p:cxnSp>
+        <p:nvCxnSpPr>
+          <p:cNvPr id="13" name="Straight Arrow Connector 12">
+            <a:extLst>
+              <a:ext uri="{FF2B5EF4-FFF2-40B4-BE49-F238E27FC236}">
+                <a16:creationId xmlns:a16="http://schemas.microsoft.com/office/drawing/2014/main" id="{624DEC34-17FA-4D63-B9B0-DCADFAB9E60D}"/>
+              </a:ext>
+            </a:extLst>
+          </p:cNvPr>
+          <p:cNvCxnSpPr>
+            <a:cxnSpLocks/>
+          </p:cNvCxnSpPr>
+          <p:nvPr/>
+        </p:nvCxnSpPr>
+        <p:spPr>
+          <a:xfrm flipH="1" flipV="1">
+            <a:off x="1736301" y="1856219"/>
+            <a:ext cx="599722" cy="1745242"/>
+          </a:xfrm>
+          <a:prstGeom prst="straightConnector1">
+            <a:avLst/>
+          </a:prstGeom>
+          <a:ln w="12700">
+            <a:solidFill>
+              <a:schemeClr val="tx1"/>
+            </a:solidFill>
+            <a:prstDash val="solid"/>
+            <a:headEnd type="none" w="lg" len="lg"/>
+            <a:tailEnd type="none" w="lg" len="lg"/>
+          </a:ln>
+        </p:spPr>
+        <p:style>
+          <a:lnRef idx="1">
+            <a:schemeClr val="accent1"/>
+          </a:lnRef>
+          <a:fillRef idx="0">
+            <a:schemeClr val="accent1"/>
+          </a:fillRef>
+          <a:effectRef idx="0">
+            <a:schemeClr val="accent1"/>
+          </a:effectRef>
+          <a:fontRef idx="minor">
+            <a:schemeClr val="tx1"/>
+          </a:fontRef>
+        </p:style>
+      </p:cxnSp>
+      <p:cxnSp>
+        <p:nvCxnSpPr>
+          <p:cNvPr id="19" name="Straight Arrow Connector 18">
+            <a:extLst>
+              <a:ext uri="{FF2B5EF4-FFF2-40B4-BE49-F238E27FC236}">
+                <a16:creationId xmlns:a16="http://schemas.microsoft.com/office/drawing/2014/main" id="{1C0822AC-9883-41A8-9643-78D1BAFCF2DE}"/>
+              </a:ext>
+            </a:extLst>
+          </p:cNvPr>
+          <p:cNvCxnSpPr>
+            <a:cxnSpLocks/>
+            <a:stCxn id="7" idx="4"/>
+          </p:cNvCxnSpPr>
+          <p:nvPr/>
+        </p:nvCxnSpPr>
+        <p:spPr>
+          <a:xfrm flipV="1">
+            <a:off x="2328608" y="1262265"/>
+            <a:ext cx="0" cy="2371713"/>
+          </a:xfrm>
+          <a:prstGeom prst="straightConnector1">
+            <a:avLst/>
+          </a:prstGeom>
+          <a:ln w="12700">
+            <a:solidFill>
+              <a:schemeClr val="tx1"/>
+            </a:solidFill>
+            <a:prstDash val="dash"/>
+            <a:headEnd type="none" w="lg" len="lg"/>
+            <a:tailEnd type="none" w="lg" len="lg"/>
+          </a:ln>
+        </p:spPr>
+        <p:style>
+          <a:lnRef idx="1">
+            <a:schemeClr val="accent1"/>
+          </a:lnRef>
+          <a:fillRef idx="0">
+            <a:schemeClr val="accent1"/>
+          </a:fillRef>
+          <a:effectRef idx="0">
+            <a:schemeClr val="accent1"/>
+          </a:effectRef>
+          <a:fontRef idx="minor">
+            <a:schemeClr val="tx1"/>
+          </a:fontRef>
+        </p:style>
+      </p:cxnSp>
+      <p:sp>
+        <p:nvSpPr>
+          <p:cNvPr id="23" name="Arc 22">
+            <a:extLst>
+              <a:ext uri="{FF2B5EF4-FFF2-40B4-BE49-F238E27FC236}">
+                <a16:creationId xmlns:a16="http://schemas.microsoft.com/office/drawing/2014/main" id="{93F12D62-2B6E-4E48-8385-A3A42590541B}"/>
+              </a:ext>
+            </a:extLst>
+          </p:cNvPr>
+          <p:cNvSpPr/>
+          <p:nvPr/>
+        </p:nvSpPr>
+        <p:spPr>
+          <a:xfrm rot="17718152">
+            <a:off x="2194268" y="3176167"/>
+            <a:ext cx="172098" cy="172350"/>
+          </a:xfrm>
+          <a:prstGeom prst="arc">
+            <a:avLst>
+              <a:gd name="adj1" fmla="val 16775587"/>
+              <a:gd name="adj2" fmla="val 725428"/>
+            </a:avLst>
+          </a:prstGeom>
+          <a:ln w="9525">
+            <a:solidFill>
+              <a:schemeClr val="tx1"/>
+            </a:solidFill>
+          </a:ln>
+        </p:spPr>
+        <p:style>
+          <a:lnRef idx="1">
+            <a:schemeClr val="accent1"/>
+          </a:lnRef>
+          <a:fillRef idx="0">
+            <a:schemeClr val="accent1"/>
+          </a:fillRef>
+          <a:effectRef idx="0">
+            <a:schemeClr val="accent1"/>
+          </a:effectRef>
+          <a:fontRef idx="minor">
+            <a:schemeClr val="tx1"/>
+          </a:fontRef>
+        </p:style>
+        <p:txBody>
+          <a:bodyPr rtlCol="0" anchor="ctr"/>
+          <a:lstStyle/>
+          <a:p>
+            <a:pPr algn="ctr"/>
+            <a:endParaRPr lang="en-US" dirty="0"/>
+          </a:p>
+        </p:txBody>
+      </p:sp>
+      <p:sp>
+        <p:nvSpPr>
+          <p:cNvPr id="25" name="Arc 24">
+            <a:extLst>
+              <a:ext uri="{FF2B5EF4-FFF2-40B4-BE49-F238E27FC236}">
+                <a16:creationId xmlns:a16="http://schemas.microsoft.com/office/drawing/2014/main" id="{DC23E343-6D4B-4ABD-85C1-582C9EF758A7}"/>
+              </a:ext>
+            </a:extLst>
+          </p:cNvPr>
+          <p:cNvSpPr/>
+          <p:nvPr/>
+        </p:nvSpPr>
+        <p:spPr>
+          <a:xfrm rot="19749576">
+            <a:off x="2279462" y="3188948"/>
+            <a:ext cx="172098" cy="172350"/>
+          </a:xfrm>
+          <a:prstGeom prst="arc">
+            <a:avLst>
+              <a:gd name="adj1" fmla="val 16775587"/>
+              <a:gd name="adj2" fmla="val 725428"/>
+            </a:avLst>
+          </a:prstGeom>
+          <a:ln w="9525">
+            <a:solidFill>
+              <a:schemeClr val="tx1"/>
+            </a:solidFill>
+          </a:ln>
+        </p:spPr>
+        <p:style>
+          <a:lnRef idx="1">
+            <a:schemeClr val="accent1"/>
+          </a:lnRef>
+          <a:fillRef idx="0">
+            <a:schemeClr val="accent1"/>
+          </a:fillRef>
+          <a:effectRef idx="0">
+            <a:schemeClr val="accent1"/>
+          </a:effectRef>
+          <a:fontRef idx="minor">
+            <a:schemeClr val="tx1"/>
+          </a:fontRef>
+        </p:style>
+        <p:txBody>
+          <a:bodyPr rtlCol="0" anchor="ctr"/>
+          <a:lstStyle/>
+          <a:p>
+            <a:pPr algn="ctr"/>
+            <a:endParaRPr lang="en-US" dirty="0"/>
+          </a:p>
+        </p:txBody>
+      </p:sp>
+      <mc:AlternateContent xmlns:mc="http://schemas.openxmlformats.org/markup-compatibility/2006">
+        <mc:Choice xmlns:a14="http://schemas.microsoft.com/office/drawing/2010/main" Requires="a14">
+          <p:sp>
+            <p:nvSpPr>
+              <p:cNvPr id="26" name="TextBox 25">
+                <a:extLst>
+                  <a:ext uri="{FF2B5EF4-FFF2-40B4-BE49-F238E27FC236}">
+                    <a16:creationId xmlns:a16="http://schemas.microsoft.com/office/drawing/2014/main" id="{609E1FD7-9BF7-4D48-9497-F27AB64BBF96}"/>
+                  </a:ext>
+                </a:extLst>
+              </p:cNvPr>
+              <p:cNvSpPr txBox="1"/>
+              <p:nvPr/>
+            </p:nvSpPr>
+            <p:spPr>
+              <a:xfrm>
+                <a:off x="1874964" y="2912477"/>
+                <a:ext cx="771340" cy="246221"/>
+              </a:xfrm>
+              <a:prstGeom prst="rect">
+                <a:avLst/>
+              </a:prstGeom>
+              <a:noFill/>
+            </p:spPr>
+            <p:txBody>
+              <a:bodyPr wrap="square" lIns="0" tIns="0" rIns="0" bIns="0" rtlCol="0">
+                <a:spAutoFit/>
+              </a:bodyPr>
+              <a:lstStyle/>
+              <a:p>
+                <a:pPr/>
+                <a14:m>
+                  <m:oMathPara xmlns:m="http://schemas.openxmlformats.org/officeDocument/2006/math">
+                    <m:oMathParaPr>
+                      <m:jc m:val="centerGroup"/>
+                    </m:oMathParaPr>
+                    <m:oMath xmlns:m="http://schemas.openxmlformats.org/officeDocument/2006/math">
+                      <m:r>
+                        <a:rPr lang="en-US" sz="1600" i="1" smtClean="0">
+                          <a:latin typeface="Cambria Math" panose="02040503050406030204" pitchFamily="18" charset="0"/>
+                          <a:ea typeface="Cambria Math" panose="02040503050406030204" pitchFamily="18" charset="0"/>
+                        </a:rPr>
+                        <m:t>𝛼</m:t>
+                      </m:r>
+                    </m:oMath>
+                  </m:oMathPara>
+                </a14:m>
+                <a:endParaRPr lang="en-US" sz="1600" dirty="0"/>
+              </a:p>
+            </p:txBody>
+          </p:sp>
+        </mc:Choice>
+        <mc:Fallback>
+          <p:sp>
+            <p:nvSpPr>
+              <p:cNvPr id="26" name="TextBox 25">
+                <a:extLst>
+                  <a:ext uri="{FF2B5EF4-FFF2-40B4-BE49-F238E27FC236}">
+                    <a16:creationId xmlns:a16="http://schemas.microsoft.com/office/drawing/2014/main" id="{609E1FD7-9BF7-4D48-9497-F27AB64BBF96}"/>
+                  </a:ext>
+                </a:extLst>
+              </p:cNvPr>
+              <p:cNvSpPr txBox="1">
+                <a:spLocks noRot="1" noChangeAspect="1" noMove="1" noResize="1" noEditPoints="1" noAdjustHandles="1" noChangeArrowheads="1" noChangeShapeType="1" noTextEdit="1"/>
+              </p:cNvSpPr>
+              <p:nvPr/>
+            </p:nvSpPr>
+            <p:spPr>
+              <a:xfrm>
+                <a:off x="1874964" y="2912477"/>
+                <a:ext cx="771340" cy="246221"/>
+              </a:xfrm>
+              <a:prstGeom prst="rect">
+                <a:avLst/>
+              </a:prstGeom>
+              <a:blipFill>
+                <a:blip r:embed="rId2"/>
+                <a:stretch>
+                  <a:fillRect/>
+                </a:stretch>
+              </a:blipFill>
+            </p:spPr>
+            <p:txBody>
+              <a:bodyPr/>
+              <a:lstStyle/>
+              <a:p>
+                <a:r>
+                  <a:rPr lang="en-US">
+                    <a:noFill/>
+                  </a:rPr>
+                  <a:t> </a:t>
+                </a:r>
+              </a:p>
+            </p:txBody>
+          </p:sp>
+        </mc:Fallback>
+      </mc:AlternateContent>
+      <p:sp>
+        <p:nvSpPr>
+          <p:cNvPr id="36" name="Arc 35">
+            <a:extLst>
+              <a:ext uri="{FF2B5EF4-FFF2-40B4-BE49-F238E27FC236}">
+                <a16:creationId xmlns:a16="http://schemas.microsoft.com/office/drawing/2014/main" id="{3CD25767-7BC7-482E-A372-D20CD4F184C9}"/>
+              </a:ext>
+            </a:extLst>
+          </p:cNvPr>
+          <p:cNvSpPr/>
+          <p:nvPr/>
+        </p:nvSpPr>
+        <p:spPr>
+          <a:xfrm rot="21155610">
+            <a:off x="178841" y="1764078"/>
+            <a:ext cx="4014987" cy="3034566"/>
+          </a:xfrm>
+          <a:prstGeom prst="arc">
+            <a:avLst>
+              <a:gd name="adj1" fmla="val 15579640"/>
+              <a:gd name="adj2" fmla="val 18298122"/>
+            </a:avLst>
+          </a:prstGeom>
+          <a:ln w="34925">
+            <a:solidFill>
+              <a:srgbClr val="0070C0"/>
+            </a:solidFill>
+          </a:ln>
+        </p:spPr>
+        <p:style>
+          <a:lnRef idx="1">
+            <a:schemeClr val="accent1"/>
+          </a:lnRef>
+          <a:fillRef idx="0">
+            <a:schemeClr val="accent1"/>
+          </a:fillRef>
+          <a:effectRef idx="0">
+            <a:schemeClr val="accent1"/>
+          </a:effectRef>
+          <a:fontRef idx="minor">
+            <a:schemeClr val="tx1"/>
+          </a:fontRef>
+        </p:style>
+        <p:txBody>
+          <a:bodyPr rtlCol="0" anchor="ctr"/>
+          <a:lstStyle/>
+          <a:p>
+            <a:pPr algn="ctr"/>
+            <a:endParaRPr lang="en-US"/>
+          </a:p>
+        </p:txBody>
+      </p:sp>
+      <p:cxnSp>
+        <p:nvCxnSpPr>
+          <p:cNvPr id="37" name="Straight Arrow Connector 36">
+            <a:extLst>
+              <a:ext uri="{FF2B5EF4-FFF2-40B4-BE49-F238E27FC236}">
+                <a16:creationId xmlns:a16="http://schemas.microsoft.com/office/drawing/2014/main" id="{129FEB5E-7006-4A7C-9549-C9DABCBAB5F7}"/>
+              </a:ext>
+            </a:extLst>
+          </p:cNvPr>
+          <p:cNvCxnSpPr>
+            <a:cxnSpLocks/>
+          </p:cNvCxnSpPr>
+          <p:nvPr/>
+        </p:nvCxnSpPr>
+        <p:spPr>
+          <a:xfrm flipH="1" flipV="1">
+            <a:off x="2325839" y="1558114"/>
+            <a:ext cx="1985958" cy="895864"/>
+          </a:xfrm>
+          <a:prstGeom prst="straightConnector1">
+            <a:avLst/>
+          </a:prstGeom>
+          <a:ln w="15875">
+            <a:solidFill>
+              <a:schemeClr val="tx1"/>
+            </a:solidFill>
+            <a:prstDash val="solid"/>
+            <a:headEnd type="none" w="lg" len="lg"/>
+            <a:tailEnd type="none" w="lg" len="lg"/>
+          </a:ln>
+        </p:spPr>
+        <p:style>
+          <a:lnRef idx="1">
+            <a:schemeClr val="accent1"/>
+          </a:lnRef>
+          <a:fillRef idx="0">
+            <a:schemeClr val="accent1"/>
+          </a:fillRef>
+          <a:effectRef idx="0">
+            <a:schemeClr val="accent1"/>
+          </a:effectRef>
+          <a:fontRef idx="minor">
+            <a:schemeClr val="tx1"/>
+          </a:fontRef>
+        </p:style>
+      </p:cxnSp>
+      <p:cxnSp>
+        <p:nvCxnSpPr>
+          <p:cNvPr id="42" name="Straight Arrow Connector 41">
+            <a:extLst>
+              <a:ext uri="{FF2B5EF4-FFF2-40B4-BE49-F238E27FC236}">
+                <a16:creationId xmlns:a16="http://schemas.microsoft.com/office/drawing/2014/main" id="{3628D306-96C9-40B4-A5CE-588BC6B8B364}"/>
+              </a:ext>
+            </a:extLst>
+          </p:cNvPr>
+          <p:cNvCxnSpPr>
+            <a:cxnSpLocks/>
+          </p:cNvCxnSpPr>
+          <p:nvPr/>
+        </p:nvCxnSpPr>
+        <p:spPr>
+          <a:xfrm flipH="1">
+            <a:off x="284550" y="1567466"/>
+            <a:ext cx="2051473" cy="891762"/>
+          </a:xfrm>
+          <a:prstGeom prst="straightConnector1">
+            <a:avLst/>
+          </a:prstGeom>
+          <a:ln w="15875">
+            <a:solidFill>
+              <a:schemeClr val="tx1"/>
+            </a:solidFill>
+            <a:prstDash val="solid"/>
+            <a:headEnd type="none" w="lg" len="lg"/>
+            <a:tailEnd type="none" w="lg" len="lg"/>
+          </a:ln>
+        </p:spPr>
+        <p:style>
+          <a:lnRef idx="1">
+            <a:schemeClr val="accent1"/>
+          </a:lnRef>
+          <a:fillRef idx="0">
+            <a:schemeClr val="accent1"/>
+          </a:fillRef>
+          <a:effectRef idx="0">
+            <a:schemeClr val="accent1"/>
+          </a:effectRef>
+          <a:fontRef idx="minor">
+            <a:schemeClr val="tx1"/>
+          </a:fontRef>
+        </p:style>
+      </p:cxnSp>
+      <p:cxnSp>
+        <p:nvCxnSpPr>
+          <p:cNvPr id="53" name="Straight Arrow Connector 52">
+            <a:extLst>
+              <a:ext uri="{FF2B5EF4-FFF2-40B4-BE49-F238E27FC236}">
+                <a16:creationId xmlns:a16="http://schemas.microsoft.com/office/drawing/2014/main" id="{7EB51A3A-A198-4D84-A061-C8D7543F24FF}"/>
+              </a:ext>
+            </a:extLst>
+          </p:cNvPr>
+          <p:cNvCxnSpPr>
+            <a:cxnSpLocks/>
+          </p:cNvCxnSpPr>
+          <p:nvPr/>
+        </p:nvCxnSpPr>
+        <p:spPr>
+          <a:xfrm flipH="1">
+            <a:off x="292625" y="2459228"/>
+            <a:ext cx="4019172" cy="0"/>
+          </a:xfrm>
+          <a:prstGeom prst="straightConnector1">
+            <a:avLst/>
+          </a:prstGeom>
+          <a:ln w="15875">
+            <a:solidFill>
+              <a:schemeClr val="tx1"/>
+            </a:solidFill>
+            <a:prstDash val="solid"/>
+            <a:headEnd type="none" w="lg" len="lg"/>
+            <a:tailEnd type="none" w="lg" len="lg"/>
+          </a:ln>
+        </p:spPr>
+        <p:style>
+          <a:lnRef idx="1">
+            <a:schemeClr val="accent1"/>
+          </a:lnRef>
+          <a:fillRef idx="0">
+            <a:schemeClr val="accent1"/>
+          </a:fillRef>
+          <a:effectRef idx="0">
+            <a:schemeClr val="accent1"/>
+          </a:effectRef>
+          <a:fontRef idx="minor">
+            <a:schemeClr val="tx1"/>
+          </a:fontRef>
+        </p:style>
+      </p:cxnSp>
+      <mc:AlternateContent xmlns:mc="http://schemas.openxmlformats.org/markup-compatibility/2006">
+        <mc:Choice xmlns:a14="http://schemas.microsoft.com/office/drawing/2010/main" Requires="a14">
+          <p:sp>
+            <p:nvSpPr>
+              <p:cNvPr id="63" name="TextBox 62">
+                <a:extLst>
+                  <a:ext uri="{FF2B5EF4-FFF2-40B4-BE49-F238E27FC236}">
+                    <a16:creationId xmlns:a16="http://schemas.microsoft.com/office/drawing/2014/main" id="{5C39ECE1-744B-44D2-BAA8-9FEBD1BA23C9}"/>
+                  </a:ext>
+                </a:extLst>
+              </p:cNvPr>
+              <p:cNvSpPr txBox="1"/>
+              <p:nvPr/>
+            </p:nvSpPr>
+            <p:spPr>
+              <a:xfrm>
+                <a:off x="2042016" y="2923223"/>
+                <a:ext cx="771340" cy="246221"/>
+              </a:xfrm>
+              <a:prstGeom prst="rect">
+                <a:avLst/>
+              </a:prstGeom>
+              <a:noFill/>
+            </p:spPr>
+            <p:txBody>
+              <a:bodyPr wrap="square" lIns="0" tIns="0" rIns="0" bIns="0" rtlCol="0">
+                <a:spAutoFit/>
+              </a:bodyPr>
+              <a:lstStyle/>
+              <a:p>
+                <a:pPr/>
+                <a14:m>
+                  <m:oMathPara xmlns:m="http://schemas.openxmlformats.org/officeDocument/2006/math">
+                    <m:oMathParaPr>
+                      <m:jc m:val="centerGroup"/>
+                    </m:oMathParaPr>
+                    <m:oMath xmlns:m="http://schemas.openxmlformats.org/officeDocument/2006/math">
+                      <m:r>
+                        <a:rPr lang="en-US" sz="1600" i="1" smtClean="0">
+                          <a:latin typeface="Cambria Math" panose="02040503050406030204" pitchFamily="18" charset="0"/>
+                          <a:ea typeface="Cambria Math" panose="02040503050406030204" pitchFamily="18" charset="0"/>
+                        </a:rPr>
+                        <m:t>𝛼</m:t>
+                      </m:r>
+                    </m:oMath>
+                  </m:oMathPara>
+                </a14:m>
+                <a:endParaRPr lang="en-US" sz="1600" dirty="0"/>
+              </a:p>
+            </p:txBody>
+          </p:sp>
+        </mc:Choice>
+        <mc:Fallback>
+          <p:sp>
+            <p:nvSpPr>
+              <p:cNvPr id="63" name="TextBox 62">
+                <a:extLst>
+                  <a:ext uri="{FF2B5EF4-FFF2-40B4-BE49-F238E27FC236}">
+                    <a16:creationId xmlns:a16="http://schemas.microsoft.com/office/drawing/2014/main" id="{5C39ECE1-744B-44D2-BAA8-9FEBD1BA23C9}"/>
+                  </a:ext>
+                </a:extLst>
+              </p:cNvPr>
+              <p:cNvSpPr txBox="1">
+                <a:spLocks noRot="1" noChangeAspect="1" noMove="1" noResize="1" noEditPoints="1" noAdjustHandles="1" noChangeArrowheads="1" noChangeShapeType="1" noTextEdit="1"/>
+              </p:cNvSpPr>
+              <p:nvPr/>
+            </p:nvSpPr>
+            <p:spPr>
+              <a:xfrm>
+                <a:off x="2042016" y="2923223"/>
+                <a:ext cx="771340" cy="246221"/>
+              </a:xfrm>
+              <a:prstGeom prst="rect">
+                <a:avLst/>
+              </a:prstGeom>
+              <a:blipFill>
+                <a:blip r:embed="rId3"/>
+                <a:stretch>
+                  <a:fillRect/>
+                </a:stretch>
+              </a:blipFill>
+            </p:spPr>
+            <p:txBody>
+              <a:bodyPr/>
+              <a:lstStyle/>
+              <a:p>
+                <a:r>
+                  <a:rPr lang="en-US">
+                    <a:noFill/>
+                  </a:rPr>
+                  <a:t> </a:t>
+                </a:r>
+              </a:p>
+            </p:txBody>
+          </p:sp>
+        </mc:Fallback>
+      </mc:AlternateContent>
+      <p:sp>
+        <p:nvSpPr>
+          <p:cNvPr id="64" name="Arc 63">
+            <a:extLst>
+              <a:ext uri="{FF2B5EF4-FFF2-40B4-BE49-F238E27FC236}">
+                <a16:creationId xmlns:a16="http://schemas.microsoft.com/office/drawing/2014/main" id="{7BBEA237-DA33-4417-8A8D-3747D1BEDA14}"/>
+              </a:ext>
+            </a:extLst>
+          </p:cNvPr>
+          <p:cNvSpPr/>
+          <p:nvPr/>
+        </p:nvSpPr>
+        <p:spPr>
+          <a:xfrm rot="1047168">
+            <a:off x="476784" y="2303559"/>
+            <a:ext cx="190427" cy="218057"/>
+          </a:xfrm>
+          <a:prstGeom prst="arc">
+            <a:avLst>
+              <a:gd name="adj1" fmla="val 16775587"/>
+              <a:gd name="adj2" fmla="val 725428"/>
+            </a:avLst>
+          </a:prstGeom>
+          <a:ln w="15875">
+            <a:solidFill>
+              <a:schemeClr val="tx1"/>
+            </a:solidFill>
+          </a:ln>
+        </p:spPr>
+        <p:style>
+          <a:lnRef idx="1">
+            <a:schemeClr val="accent1"/>
+          </a:lnRef>
+          <a:fillRef idx="0">
+            <a:schemeClr val="accent1"/>
+          </a:fillRef>
+          <a:effectRef idx="0">
+            <a:schemeClr val="accent1"/>
+          </a:effectRef>
+          <a:fontRef idx="minor">
+            <a:schemeClr val="tx1"/>
+          </a:fontRef>
+        </p:style>
+        <p:txBody>
+          <a:bodyPr rtlCol="0" anchor="ctr"/>
+          <a:lstStyle/>
+          <a:p>
+            <a:pPr algn="ctr"/>
+            <a:endParaRPr lang="en-US" dirty="0"/>
+          </a:p>
+        </p:txBody>
+      </p:sp>
+      <mc:AlternateContent xmlns:mc="http://schemas.openxmlformats.org/markup-compatibility/2006">
+        <mc:Choice xmlns:a14="http://schemas.microsoft.com/office/drawing/2010/main" Requires="a14">
+          <p:sp>
+            <p:nvSpPr>
+              <p:cNvPr id="65" name="TextBox 64">
+                <a:extLst>
+                  <a:ext uri="{FF2B5EF4-FFF2-40B4-BE49-F238E27FC236}">
+                    <a16:creationId xmlns:a16="http://schemas.microsoft.com/office/drawing/2014/main" id="{E7F3C2BD-1EE0-49BE-BCDB-3F88A8AA2334}"/>
+                  </a:ext>
+                </a:extLst>
+              </p:cNvPr>
+              <p:cNvSpPr txBox="1"/>
+              <p:nvPr/>
+            </p:nvSpPr>
+            <p:spPr>
+              <a:xfrm>
+                <a:off x="702941" y="2208273"/>
+                <a:ext cx="236120" cy="246221"/>
+              </a:xfrm>
+              <a:prstGeom prst="rect">
+                <a:avLst/>
+              </a:prstGeom>
+              <a:noFill/>
+            </p:spPr>
+            <p:txBody>
+              <a:bodyPr wrap="square" lIns="0" tIns="0" rIns="0" bIns="0" rtlCol="0">
+                <a:spAutoFit/>
+              </a:bodyPr>
+              <a:lstStyle/>
+              <a:p>
+                <a:pPr/>
+                <a14:m>
+                  <m:oMathPara xmlns:m="http://schemas.openxmlformats.org/officeDocument/2006/math">
+                    <m:oMathParaPr>
+                      <m:jc m:val="centerGroup"/>
+                    </m:oMathParaPr>
+                    <m:oMath xmlns:m="http://schemas.openxmlformats.org/officeDocument/2006/math">
+                      <m:r>
+                        <a:rPr lang="en-US" sz="1600" i="1" smtClean="0">
+                          <a:latin typeface="Cambria Math" panose="02040503050406030204" pitchFamily="18" charset="0"/>
+                          <a:ea typeface="Cambria Math" panose="02040503050406030204" pitchFamily="18" charset="0"/>
+                        </a:rPr>
+                        <m:t>𝛼</m:t>
+                      </m:r>
+                    </m:oMath>
+                  </m:oMathPara>
+                </a14:m>
+                <a:endParaRPr lang="en-US" sz="1600" dirty="0"/>
+              </a:p>
+            </p:txBody>
+          </p:sp>
+        </mc:Choice>
+        <mc:Fallback>
+          <p:sp>
+            <p:nvSpPr>
+              <p:cNvPr id="65" name="TextBox 64">
+                <a:extLst>
+                  <a:ext uri="{FF2B5EF4-FFF2-40B4-BE49-F238E27FC236}">
+                    <a16:creationId xmlns:a16="http://schemas.microsoft.com/office/drawing/2014/main" id="{E7F3C2BD-1EE0-49BE-BCDB-3F88A8AA2334}"/>
+                  </a:ext>
+                </a:extLst>
+              </p:cNvPr>
+              <p:cNvSpPr txBox="1">
+                <a:spLocks noRot="1" noChangeAspect="1" noMove="1" noResize="1" noEditPoints="1" noAdjustHandles="1" noChangeArrowheads="1" noChangeShapeType="1" noTextEdit="1"/>
+              </p:cNvSpPr>
+              <p:nvPr/>
+            </p:nvSpPr>
+            <p:spPr>
+              <a:xfrm>
+                <a:off x="702941" y="2208273"/>
+                <a:ext cx="236120" cy="246221"/>
+              </a:xfrm>
+              <a:prstGeom prst="rect">
+                <a:avLst/>
+              </a:prstGeom>
+              <a:blipFill>
+                <a:blip r:embed="rId4"/>
+                <a:stretch>
+                  <a:fillRect/>
+                </a:stretch>
+              </a:blipFill>
+            </p:spPr>
+            <p:txBody>
+              <a:bodyPr/>
+              <a:lstStyle/>
+              <a:p>
+                <a:r>
+                  <a:rPr lang="en-US">
+                    <a:noFill/>
+                  </a:rPr>
+                  <a:t> </a:t>
+                </a:r>
+              </a:p>
+            </p:txBody>
+          </p:sp>
+        </mc:Fallback>
+      </mc:AlternateContent>
+      <p:sp>
+        <p:nvSpPr>
+          <p:cNvPr id="66" name="Arc 65">
+            <a:extLst>
+              <a:ext uri="{FF2B5EF4-FFF2-40B4-BE49-F238E27FC236}">
+                <a16:creationId xmlns:a16="http://schemas.microsoft.com/office/drawing/2014/main" id="{EF980A7C-3965-44EC-8016-7424067C681C}"/>
+              </a:ext>
+            </a:extLst>
+          </p:cNvPr>
+          <p:cNvSpPr/>
+          <p:nvPr/>
+        </p:nvSpPr>
+        <p:spPr>
+          <a:xfrm rot="14618917">
+            <a:off x="3990195" y="2325492"/>
+            <a:ext cx="190427" cy="218057"/>
+          </a:xfrm>
+          <a:prstGeom prst="arc">
+            <a:avLst>
+              <a:gd name="adj1" fmla="val 16775587"/>
+              <a:gd name="adj2" fmla="val 725428"/>
+            </a:avLst>
+          </a:prstGeom>
+          <a:ln w="15875">
+            <a:solidFill>
+              <a:schemeClr val="tx1"/>
+            </a:solidFill>
+          </a:ln>
+        </p:spPr>
+        <p:style>
+          <a:lnRef idx="1">
+            <a:schemeClr val="accent1"/>
+          </a:lnRef>
+          <a:fillRef idx="0">
+            <a:schemeClr val="accent1"/>
+          </a:fillRef>
+          <a:effectRef idx="0">
+            <a:schemeClr val="accent1"/>
+          </a:effectRef>
+          <a:fontRef idx="minor">
+            <a:schemeClr val="tx1"/>
+          </a:fontRef>
+        </p:style>
+        <p:txBody>
+          <a:bodyPr rtlCol="0" anchor="ctr"/>
+          <a:lstStyle/>
+          <a:p>
+            <a:pPr algn="ctr"/>
+            <a:endParaRPr lang="en-US" dirty="0"/>
+          </a:p>
+        </p:txBody>
+      </p:sp>
+      <mc:AlternateContent xmlns:mc="http://schemas.openxmlformats.org/markup-compatibility/2006">
+        <mc:Choice xmlns:a14="http://schemas.microsoft.com/office/drawing/2010/main" Requires="a14">
+          <p:sp>
+            <p:nvSpPr>
+              <p:cNvPr id="67" name="TextBox 66">
+                <a:extLst>
+                  <a:ext uri="{FF2B5EF4-FFF2-40B4-BE49-F238E27FC236}">
+                    <a16:creationId xmlns:a16="http://schemas.microsoft.com/office/drawing/2014/main" id="{158BDBD7-5F12-4838-B4C4-FEC808F4EC33}"/>
+                  </a:ext>
+                </a:extLst>
+              </p:cNvPr>
+              <p:cNvSpPr txBox="1"/>
+              <p:nvPr/>
+            </p:nvSpPr>
+            <p:spPr>
+              <a:xfrm>
+                <a:off x="3789255" y="2226382"/>
+                <a:ext cx="236120" cy="246221"/>
+              </a:xfrm>
+              <a:prstGeom prst="rect">
+                <a:avLst/>
+              </a:prstGeom>
+              <a:noFill/>
+            </p:spPr>
+            <p:txBody>
+              <a:bodyPr wrap="square" lIns="0" tIns="0" rIns="0" bIns="0" rtlCol="0">
+                <a:spAutoFit/>
+              </a:bodyPr>
+              <a:lstStyle/>
+              <a:p>
+                <a:pPr/>
+                <a14:m>
+                  <m:oMathPara xmlns:m="http://schemas.openxmlformats.org/officeDocument/2006/math">
+                    <m:oMathParaPr>
+                      <m:jc m:val="centerGroup"/>
+                    </m:oMathParaPr>
+                    <m:oMath xmlns:m="http://schemas.openxmlformats.org/officeDocument/2006/math">
+                      <m:r>
+                        <a:rPr lang="en-US" sz="1600" i="1" smtClean="0">
+                          <a:latin typeface="Cambria Math" panose="02040503050406030204" pitchFamily="18" charset="0"/>
+                          <a:ea typeface="Cambria Math" panose="02040503050406030204" pitchFamily="18" charset="0"/>
+                        </a:rPr>
+                        <m:t>𝛼</m:t>
+                      </m:r>
+                    </m:oMath>
+                  </m:oMathPara>
+                </a14:m>
+                <a:endParaRPr lang="en-US" sz="1600" dirty="0"/>
+              </a:p>
+            </p:txBody>
+          </p:sp>
+        </mc:Choice>
+        <mc:Fallback>
+          <p:sp>
+            <p:nvSpPr>
+              <p:cNvPr id="67" name="TextBox 66">
+                <a:extLst>
+                  <a:ext uri="{FF2B5EF4-FFF2-40B4-BE49-F238E27FC236}">
+                    <a16:creationId xmlns:a16="http://schemas.microsoft.com/office/drawing/2014/main" id="{158BDBD7-5F12-4838-B4C4-FEC808F4EC33}"/>
+                  </a:ext>
+                </a:extLst>
+              </p:cNvPr>
+              <p:cNvSpPr txBox="1">
+                <a:spLocks noRot="1" noChangeAspect="1" noMove="1" noResize="1" noEditPoints="1" noAdjustHandles="1" noChangeArrowheads="1" noChangeShapeType="1" noTextEdit="1"/>
+              </p:cNvSpPr>
+              <p:nvPr/>
+            </p:nvSpPr>
+            <p:spPr>
+              <a:xfrm>
+                <a:off x="3789255" y="2226382"/>
+                <a:ext cx="236120" cy="246221"/>
+              </a:xfrm>
+              <a:prstGeom prst="rect">
+                <a:avLst/>
+              </a:prstGeom>
+              <a:blipFill>
+                <a:blip r:embed="rId5"/>
+                <a:stretch>
+                  <a:fillRect/>
+                </a:stretch>
+              </a:blipFill>
+            </p:spPr>
+            <p:txBody>
+              <a:bodyPr/>
+              <a:lstStyle/>
+              <a:p>
+                <a:r>
+                  <a:rPr lang="en-US">
+                    <a:noFill/>
+                  </a:rPr>
+                  <a:t> </a:t>
+                </a:r>
+              </a:p>
+            </p:txBody>
+          </p:sp>
+        </mc:Fallback>
+      </mc:AlternateContent>
+      <p:cxnSp>
+        <p:nvCxnSpPr>
+          <p:cNvPr id="32" name="Straight Arrow Connector 31">
+            <a:extLst>
+              <a:ext uri="{FF2B5EF4-FFF2-40B4-BE49-F238E27FC236}">
+                <a16:creationId xmlns:a16="http://schemas.microsoft.com/office/drawing/2014/main" id="{4D6F18CD-1746-4FBD-AB3D-074CDF816982}"/>
+              </a:ext>
+            </a:extLst>
+          </p:cNvPr>
+          <p:cNvCxnSpPr>
+            <a:cxnSpLocks/>
+          </p:cNvCxnSpPr>
+          <p:nvPr/>
+        </p:nvCxnSpPr>
+        <p:spPr>
+          <a:xfrm>
+            <a:off x="2932149" y="1828989"/>
+            <a:ext cx="460150" cy="212194"/>
+          </a:xfrm>
+          <a:prstGeom prst="straightConnector1">
+            <a:avLst/>
+          </a:prstGeom>
+          <a:ln w="31750">
+            <a:solidFill>
+              <a:srgbClr val="FF0000"/>
+            </a:solidFill>
+            <a:headEnd type="none" w="lg" len="lg"/>
+            <a:tailEnd type="stealth" w="lg" len="lg"/>
+          </a:ln>
+        </p:spPr>
+        <p:style>
+          <a:lnRef idx="1">
+            <a:schemeClr val="accent1"/>
+          </a:lnRef>
+          <a:fillRef idx="0">
+            <a:schemeClr val="accent1"/>
+          </a:fillRef>
+          <a:effectRef idx="0">
+            <a:schemeClr val="accent1"/>
+          </a:effectRef>
+          <a:fontRef idx="minor">
+            <a:schemeClr val="tx1"/>
+          </a:fontRef>
+        </p:style>
+      </p:cxnSp>
+      <mc:AlternateContent xmlns:mc="http://schemas.openxmlformats.org/markup-compatibility/2006">
+        <mc:Choice xmlns:a14="http://schemas.microsoft.com/office/drawing/2010/main" Requires="a14">
+          <p:sp>
+            <p:nvSpPr>
+              <p:cNvPr id="35" name="TextBox 34">
+                <a:extLst>
+                  <a:ext uri="{FF2B5EF4-FFF2-40B4-BE49-F238E27FC236}">
+                    <a16:creationId xmlns:a16="http://schemas.microsoft.com/office/drawing/2014/main" id="{FC370935-ED89-4CC4-98B1-16EC8D7BFF02}"/>
+                  </a:ext>
+                </a:extLst>
+              </p:cNvPr>
+              <p:cNvSpPr txBox="1"/>
+              <p:nvPr/>
+            </p:nvSpPr>
+            <p:spPr>
+              <a:xfrm>
+                <a:off x="3321857" y="1558114"/>
+                <a:ext cx="354071" cy="414088"/>
+              </a:xfrm>
+              <a:prstGeom prst="rect">
+                <a:avLst/>
+              </a:prstGeom>
+              <a:noFill/>
+            </p:spPr>
+            <p:txBody>
+              <a:bodyPr wrap="square" lIns="0" tIns="0" rIns="0" bIns="0" rtlCol="0">
+                <a:spAutoFit/>
+              </a:bodyPr>
+              <a:lstStyle/>
+              <a:p>
+                <a:pPr/>
+                <a14:m>
+                  <m:oMathPara xmlns:m="http://schemas.openxmlformats.org/officeDocument/2006/math">
+                    <m:oMathParaPr>
+                      <m:jc m:val="centerGroup"/>
+                    </m:oMathParaPr>
+                    <m:oMath xmlns:m="http://schemas.openxmlformats.org/officeDocument/2006/math">
+                      <m:acc>
+                        <m:accPr>
+                          <m:chr m:val="⃗"/>
+                          <m:ctrlPr>
+                            <a:rPr lang="en-US" sz="2400" i="1" smtClean="0">
+                              <a:solidFill>
+                                <a:srgbClr val="FF0000"/>
+                              </a:solidFill>
+                              <a:latin typeface="Cambria Math" panose="02040503050406030204" pitchFamily="18" charset="0"/>
+                            </a:rPr>
+                          </m:ctrlPr>
+                        </m:accPr>
+                        <m:e>
+                          <m:sSub>
+                            <m:sSubPr>
+                              <m:ctrlPr>
+                                <a:rPr lang="en-US" sz="2400" i="1" smtClean="0">
+                                  <a:solidFill>
+                                    <a:srgbClr val="FF0000"/>
+                                  </a:solidFill>
+                                  <a:latin typeface="Cambria Math" panose="02040503050406030204" pitchFamily="18" charset="0"/>
+                                </a:rPr>
+                              </m:ctrlPr>
+                            </m:sSubPr>
+                            <m:e>
+                              <m:r>
+                                <a:rPr lang="en-US" sz="2400" b="0" i="1" smtClean="0">
+                                  <a:solidFill>
+                                    <a:srgbClr val="FF0000"/>
+                                  </a:solidFill>
+                                  <a:latin typeface="Cambria Math" panose="02040503050406030204" pitchFamily="18" charset="0"/>
+                                </a:rPr>
+                                <m:t>𝑇</m:t>
+                              </m:r>
+                            </m:e>
+                            <m:sub>
+                              <m:r>
+                                <a:rPr lang="en-US" sz="2400" b="0" i="1" smtClean="0">
+                                  <a:solidFill>
+                                    <a:srgbClr val="FF0000"/>
+                                  </a:solidFill>
+                                  <a:latin typeface="Cambria Math" panose="02040503050406030204" pitchFamily="18" charset="0"/>
+                                </a:rPr>
+                                <m:t>2</m:t>
+                              </m:r>
+                            </m:sub>
+                          </m:sSub>
+                        </m:e>
+                      </m:acc>
+                    </m:oMath>
+                  </m:oMathPara>
+                </a14:m>
+                <a:endParaRPr lang="en-US" sz="2400" dirty="0">
+                  <a:solidFill>
+                    <a:srgbClr val="FF0000"/>
+                  </a:solidFill>
+                </a:endParaRPr>
+              </a:p>
+            </p:txBody>
+          </p:sp>
+        </mc:Choice>
+        <mc:Fallback>
+          <p:sp>
+            <p:nvSpPr>
+              <p:cNvPr id="35" name="TextBox 34">
+                <a:extLst>
+                  <a:ext uri="{FF2B5EF4-FFF2-40B4-BE49-F238E27FC236}">
+                    <a16:creationId xmlns:a16="http://schemas.microsoft.com/office/drawing/2014/main" id="{FC370935-ED89-4CC4-98B1-16EC8D7BFF02}"/>
+                  </a:ext>
+                </a:extLst>
+              </p:cNvPr>
+              <p:cNvSpPr txBox="1">
+                <a:spLocks noRot="1" noChangeAspect="1" noMove="1" noResize="1" noEditPoints="1" noAdjustHandles="1" noChangeArrowheads="1" noChangeShapeType="1" noTextEdit="1"/>
+              </p:cNvSpPr>
+              <p:nvPr/>
+            </p:nvSpPr>
+            <p:spPr>
+              <a:xfrm>
+                <a:off x="3321857" y="1558114"/>
+                <a:ext cx="354071" cy="414088"/>
+              </a:xfrm>
+              <a:prstGeom prst="rect">
+                <a:avLst/>
+              </a:prstGeom>
+              <a:blipFill>
+                <a:blip r:embed="rId6"/>
+                <a:stretch>
+                  <a:fillRect/>
+                </a:stretch>
+              </a:blipFill>
+            </p:spPr>
+            <p:txBody>
+              <a:bodyPr/>
+              <a:lstStyle/>
+              <a:p>
+                <a:r>
+                  <a:rPr lang="en-US">
+                    <a:noFill/>
+                  </a:rPr>
+                  <a:t> </a:t>
+                </a:r>
+              </a:p>
+            </p:txBody>
+          </p:sp>
+        </mc:Fallback>
+      </mc:AlternateContent>
+      <mc:AlternateContent xmlns:mc="http://schemas.openxmlformats.org/markup-compatibility/2006">
+        <mc:Choice xmlns:a14="http://schemas.microsoft.com/office/drawing/2010/main" Requires="a14">
+          <p:sp>
+            <p:nvSpPr>
+              <p:cNvPr id="9" name="TextBox 8">
+                <a:extLst>
+                  <a:ext uri="{FF2B5EF4-FFF2-40B4-BE49-F238E27FC236}">
+                    <a16:creationId xmlns:a16="http://schemas.microsoft.com/office/drawing/2014/main" id="{29CDD353-A8AC-4ACB-A040-80FEE786D062}"/>
+                  </a:ext>
+                </a:extLst>
+              </p:cNvPr>
+              <p:cNvSpPr txBox="1"/>
+              <p:nvPr/>
+            </p:nvSpPr>
+            <p:spPr>
+              <a:xfrm>
+                <a:off x="1118387" y="1530174"/>
+                <a:ext cx="354071" cy="414088"/>
+              </a:xfrm>
+              <a:prstGeom prst="rect">
+                <a:avLst/>
+              </a:prstGeom>
+              <a:noFill/>
+            </p:spPr>
+            <p:txBody>
+              <a:bodyPr wrap="square" lIns="0" tIns="0" rIns="0" bIns="0" rtlCol="0">
+                <a:spAutoFit/>
+              </a:bodyPr>
+              <a:lstStyle/>
+              <a:p>
+                <a:pPr/>
+                <a14:m>
+                  <m:oMathPara xmlns:m="http://schemas.openxmlformats.org/officeDocument/2006/math">
+                    <m:oMathParaPr>
+                      <m:jc m:val="centerGroup"/>
+                    </m:oMathParaPr>
+                    <m:oMath xmlns:m="http://schemas.openxmlformats.org/officeDocument/2006/math">
+                      <m:acc>
+                        <m:accPr>
+                          <m:chr m:val="⃗"/>
+                          <m:ctrlPr>
+                            <a:rPr lang="en-US" sz="2400" i="1" smtClean="0">
+                              <a:solidFill>
+                                <a:srgbClr val="FF0000"/>
+                              </a:solidFill>
+                              <a:latin typeface="Cambria Math" panose="02040503050406030204" pitchFamily="18" charset="0"/>
+                            </a:rPr>
+                          </m:ctrlPr>
+                        </m:accPr>
+                        <m:e>
+                          <m:sSub>
+                            <m:sSubPr>
+                              <m:ctrlPr>
+                                <a:rPr lang="en-US" sz="2400" i="1" smtClean="0">
+                                  <a:solidFill>
+                                    <a:srgbClr val="FF0000"/>
+                                  </a:solidFill>
+                                  <a:latin typeface="Cambria Math" panose="02040503050406030204" pitchFamily="18" charset="0"/>
+                                </a:rPr>
+                              </m:ctrlPr>
+                            </m:sSubPr>
+                            <m:e>
+                              <m:r>
+                                <a:rPr lang="en-US" sz="2400" b="0" i="1" smtClean="0">
+                                  <a:solidFill>
+                                    <a:srgbClr val="FF0000"/>
+                                  </a:solidFill>
+                                  <a:latin typeface="Cambria Math" panose="02040503050406030204" pitchFamily="18" charset="0"/>
+                                </a:rPr>
+                                <m:t>𝑇</m:t>
+                              </m:r>
+                            </m:e>
+                            <m:sub>
+                              <m:r>
+                                <a:rPr lang="en-US" sz="2400" b="0" i="1" smtClean="0">
+                                  <a:solidFill>
+                                    <a:srgbClr val="FF0000"/>
+                                  </a:solidFill>
+                                  <a:latin typeface="Cambria Math" panose="02040503050406030204" pitchFamily="18" charset="0"/>
+                                </a:rPr>
+                                <m:t>1</m:t>
+                              </m:r>
+                            </m:sub>
+                          </m:sSub>
+                        </m:e>
+                      </m:acc>
+                    </m:oMath>
+                  </m:oMathPara>
+                </a14:m>
+                <a:endParaRPr lang="en-US" sz="2400" dirty="0">
+                  <a:solidFill>
+                    <a:srgbClr val="FF0000"/>
+                  </a:solidFill>
+                </a:endParaRPr>
+              </a:p>
+            </p:txBody>
+          </p:sp>
+        </mc:Choice>
+        <mc:Fallback>
+          <p:sp>
+            <p:nvSpPr>
+              <p:cNvPr id="9" name="TextBox 8">
+                <a:extLst>
+                  <a:ext uri="{FF2B5EF4-FFF2-40B4-BE49-F238E27FC236}">
+                    <a16:creationId xmlns:a16="http://schemas.microsoft.com/office/drawing/2014/main" id="{29CDD353-A8AC-4ACB-A040-80FEE786D062}"/>
+                  </a:ext>
+                </a:extLst>
+              </p:cNvPr>
+              <p:cNvSpPr txBox="1">
+                <a:spLocks noRot="1" noChangeAspect="1" noMove="1" noResize="1" noEditPoints="1" noAdjustHandles="1" noChangeArrowheads="1" noChangeShapeType="1" noTextEdit="1"/>
+              </p:cNvSpPr>
+              <p:nvPr/>
+            </p:nvSpPr>
+            <p:spPr>
+              <a:xfrm>
+                <a:off x="1118387" y="1530174"/>
+                <a:ext cx="354071" cy="414088"/>
+              </a:xfrm>
+              <a:prstGeom prst="rect">
+                <a:avLst/>
+              </a:prstGeom>
+              <a:blipFill>
+                <a:blip r:embed="rId7"/>
+                <a:stretch>
+                  <a:fillRect/>
+                </a:stretch>
+              </a:blipFill>
+            </p:spPr>
+            <p:txBody>
+              <a:bodyPr/>
+              <a:lstStyle/>
+              <a:p>
+                <a:r>
+                  <a:rPr lang="en-US">
+                    <a:noFill/>
+                  </a:rPr>
+                  <a:t> </a:t>
+                </a:r>
+              </a:p>
+            </p:txBody>
+          </p:sp>
+        </mc:Fallback>
+      </mc:AlternateContent>
+      <p:cxnSp>
+        <p:nvCxnSpPr>
+          <p:cNvPr id="28" name="Straight Arrow Connector 27">
+            <a:extLst>
+              <a:ext uri="{FF2B5EF4-FFF2-40B4-BE49-F238E27FC236}">
+                <a16:creationId xmlns:a16="http://schemas.microsoft.com/office/drawing/2014/main" id="{A84297B7-B626-4C53-97FF-2061B534FFE2}"/>
+              </a:ext>
+            </a:extLst>
+          </p:cNvPr>
+          <p:cNvCxnSpPr>
+            <a:cxnSpLocks/>
+          </p:cNvCxnSpPr>
+          <p:nvPr/>
+        </p:nvCxnSpPr>
+        <p:spPr>
+          <a:xfrm flipH="1">
+            <a:off x="1218542" y="1828989"/>
+            <a:ext cx="510346" cy="234038"/>
+          </a:xfrm>
+          <a:prstGeom prst="straightConnector1">
+            <a:avLst/>
+          </a:prstGeom>
+          <a:ln w="31750">
+            <a:solidFill>
+              <a:srgbClr val="FF0000"/>
+            </a:solidFill>
+            <a:headEnd type="none" w="lg" len="lg"/>
+            <a:tailEnd type="stealth" w="lg" len="lg"/>
+          </a:ln>
+        </p:spPr>
+        <p:style>
+          <a:lnRef idx="1">
+            <a:schemeClr val="accent1"/>
+          </a:lnRef>
+          <a:fillRef idx="0">
+            <a:schemeClr val="accent1"/>
+          </a:fillRef>
+          <a:effectRef idx="0">
+            <a:schemeClr val="accent1"/>
+          </a:effectRef>
+          <a:fontRef idx="minor">
+            <a:schemeClr val="tx1"/>
+          </a:fontRef>
+        </p:style>
+      </p:cxnSp>
+      <p:cxnSp>
+        <p:nvCxnSpPr>
+          <p:cNvPr id="68" name="Straight Arrow Connector 67">
+            <a:extLst>
+              <a:ext uri="{FF2B5EF4-FFF2-40B4-BE49-F238E27FC236}">
+                <a16:creationId xmlns:a16="http://schemas.microsoft.com/office/drawing/2014/main" id="{13315CBD-9060-4570-9409-E3BCF71DC16A}"/>
+              </a:ext>
+            </a:extLst>
+          </p:cNvPr>
+          <p:cNvCxnSpPr>
+            <a:cxnSpLocks/>
+          </p:cNvCxnSpPr>
+          <p:nvPr/>
+        </p:nvCxnSpPr>
+        <p:spPr>
+          <a:xfrm>
+            <a:off x="2331378" y="1768444"/>
+            <a:ext cx="0" cy="511577"/>
+          </a:xfrm>
+          <a:prstGeom prst="straightConnector1">
+            <a:avLst/>
+          </a:prstGeom>
+          <a:ln w="31750">
+            <a:solidFill>
+              <a:srgbClr val="7030A0"/>
+            </a:solidFill>
+            <a:headEnd type="none" w="lg" len="lg"/>
+            <a:tailEnd type="stealth" w="lg" len="lg"/>
+          </a:ln>
+        </p:spPr>
+        <p:style>
+          <a:lnRef idx="1">
+            <a:schemeClr val="accent1"/>
+          </a:lnRef>
+          <a:fillRef idx="0">
+            <a:schemeClr val="accent1"/>
+          </a:fillRef>
+          <a:effectRef idx="0">
+            <a:schemeClr val="accent1"/>
+          </a:effectRef>
+          <a:fontRef idx="minor">
+            <a:schemeClr val="tx1"/>
+          </a:fontRef>
+        </p:style>
+      </p:cxnSp>
+      <mc:AlternateContent xmlns:mc="http://schemas.openxmlformats.org/markup-compatibility/2006">
+        <mc:Choice xmlns:a14="http://schemas.microsoft.com/office/drawing/2010/main" Requires="a14">
+          <p:sp>
+            <p:nvSpPr>
+              <p:cNvPr id="71" name="TextBox 70">
+                <a:extLst>
+                  <a:ext uri="{FF2B5EF4-FFF2-40B4-BE49-F238E27FC236}">
+                    <a16:creationId xmlns:a16="http://schemas.microsoft.com/office/drawing/2014/main" id="{6762B14A-D31C-4ED4-90CE-60C8CF7160E6}"/>
+                  </a:ext>
+                </a:extLst>
+              </p:cNvPr>
+              <p:cNvSpPr txBox="1"/>
+              <p:nvPr/>
+            </p:nvSpPr>
+            <p:spPr>
+              <a:xfrm>
+                <a:off x="2325014" y="1941735"/>
+                <a:ext cx="354071" cy="310598"/>
+              </a:xfrm>
+              <a:prstGeom prst="rect">
+                <a:avLst/>
+              </a:prstGeom>
+              <a:noFill/>
+            </p:spPr>
+            <p:txBody>
+              <a:bodyPr wrap="square" lIns="0" tIns="0" rIns="0" bIns="0" rtlCol="0">
+                <a:spAutoFit/>
+              </a:bodyPr>
+              <a:lstStyle/>
+              <a:p>
+                <a:pPr/>
+                <a14:m>
+                  <m:oMathPara xmlns:m="http://schemas.openxmlformats.org/officeDocument/2006/math">
+                    <m:oMathParaPr>
+                      <m:jc m:val="centerGroup"/>
+                    </m:oMathParaPr>
+                    <m:oMath xmlns:m="http://schemas.openxmlformats.org/officeDocument/2006/math">
+                      <m:acc>
+                        <m:accPr>
+                          <m:chr m:val="⃗"/>
+                          <m:ctrlPr>
+                            <a:rPr lang="en-US" i="1" smtClean="0">
+                              <a:solidFill>
+                                <a:srgbClr val="7030A0"/>
+                              </a:solidFill>
+                              <a:latin typeface="Cambria Math" panose="02040503050406030204" pitchFamily="18" charset="0"/>
+                            </a:rPr>
+                          </m:ctrlPr>
+                        </m:accPr>
+                        <m:e>
+                          <m:sSub>
+                            <m:sSubPr>
+                              <m:ctrlPr>
+                                <a:rPr lang="en-US" i="1" smtClean="0">
+                                  <a:solidFill>
+                                    <a:srgbClr val="7030A0"/>
+                                  </a:solidFill>
+                                  <a:latin typeface="Cambria Math" panose="02040503050406030204" pitchFamily="18" charset="0"/>
+                                </a:rPr>
+                              </m:ctrlPr>
+                            </m:sSubPr>
+                            <m:e>
+                              <m:r>
+                                <a:rPr lang="en-US" b="0" i="1" smtClean="0">
+                                  <a:solidFill>
+                                    <a:srgbClr val="7030A0"/>
+                                  </a:solidFill>
+                                  <a:latin typeface="Cambria Math" panose="02040503050406030204" pitchFamily="18" charset="0"/>
+                                </a:rPr>
+                                <m:t>𝑇</m:t>
+                              </m:r>
+                            </m:e>
+                            <m:sub>
+                              <m:r>
+                                <a:rPr lang="ru-RU" b="0" i="1" smtClean="0">
+                                  <a:solidFill>
+                                    <a:srgbClr val="7030A0"/>
+                                  </a:solidFill>
+                                  <a:latin typeface="Cambria Math" panose="02040503050406030204" pitchFamily="18" charset="0"/>
+                                </a:rPr>
+                                <m:t>н</m:t>
+                              </m:r>
+                            </m:sub>
+                          </m:sSub>
+                        </m:e>
+                      </m:acc>
+                    </m:oMath>
+                  </m:oMathPara>
+                </a14:m>
+                <a:endParaRPr lang="en-US" dirty="0">
+                  <a:solidFill>
+                    <a:srgbClr val="7030A0"/>
+                  </a:solidFill>
+                </a:endParaRPr>
+              </a:p>
+            </p:txBody>
+          </p:sp>
+        </mc:Choice>
+        <mc:Fallback>
+          <p:sp>
+            <p:nvSpPr>
+              <p:cNvPr id="71" name="TextBox 70">
+                <a:extLst>
+                  <a:ext uri="{FF2B5EF4-FFF2-40B4-BE49-F238E27FC236}">
+                    <a16:creationId xmlns:a16="http://schemas.microsoft.com/office/drawing/2014/main" id="{6762B14A-D31C-4ED4-90CE-60C8CF7160E6}"/>
+                  </a:ext>
+                </a:extLst>
+              </p:cNvPr>
+              <p:cNvSpPr txBox="1">
+                <a:spLocks noRot="1" noChangeAspect="1" noMove="1" noResize="1" noEditPoints="1" noAdjustHandles="1" noChangeArrowheads="1" noChangeShapeType="1" noTextEdit="1"/>
+              </p:cNvSpPr>
+              <p:nvPr/>
+            </p:nvSpPr>
+            <p:spPr>
+              <a:xfrm>
+                <a:off x="2325014" y="1941735"/>
+                <a:ext cx="354071" cy="310598"/>
+              </a:xfrm>
+              <a:prstGeom prst="rect">
+                <a:avLst/>
+              </a:prstGeom>
+              <a:blipFill>
+                <a:blip r:embed="rId8"/>
+                <a:stretch>
+                  <a:fillRect l="-1724" b="-12000"/>
+                </a:stretch>
+              </a:blipFill>
+            </p:spPr>
+            <p:txBody>
+              <a:bodyPr/>
+              <a:lstStyle/>
+              <a:p>
+                <a:r>
+                  <a:rPr lang="en-US">
+                    <a:noFill/>
+                  </a:rPr>
+                  <a:t> </a:t>
+                </a:r>
+              </a:p>
+            </p:txBody>
+          </p:sp>
+        </mc:Fallback>
+      </mc:AlternateContent>
+      <mc:AlternateContent xmlns:mc="http://schemas.openxmlformats.org/markup-compatibility/2006">
+        <mc:Choice xmlns:a14="http://schemas.microsoft.com/office/drawing/2010/main" Requires="a14">
+          <p:sp>
+            <p:nvSpPr>
+              <p:cNvPr id="72" name="TextBox 71">
+                <a:extLst>
+                  <a:ext uri="{FF2B5EF4-FFF2-40B4-BE49-F238E27FC236}">
+                    <a16:creationId xmlns:a16="http://schemas.microsoft.com/office/drawing/2014/main" id="{2A351364-719F-47DD-B219-15024EF01A0D}"/>
+                  </a:ext>
+                </a:extLst>
+              </p:cNvPr>
+              <p:cNvSpPr txBox="1"/>
+              <p:nvPr/>
+            </p:nvSpPr>
+            <p:spPr>
+              <a:xfrm>
+                <a:off x="4458882" y="3339191"/>
+                <a:ext cx="267203" cy="372516"/>
+              </a:xfrm>
+              <a:prstGeom prst="rect">
+                <a:avLst/>
+              </a:prstGeom>
+              <a:noFill/>
+            </p:spPr>
+            <p:txBody>
+              <a:bodyPr wrap="square" lIns="0" tIns="0" rIns="0" bIns="0" rtlCol="0">
+                <a:spAutoFit/>
+              </a:bodyPr>
+              <a:lstStyle/>
+              <a:p>
+                <a:pPr/>
+                <a14:m>
+                  <m:oMathPara xmlns:m="http://schemas.openxmlformats.org/officeDocument/2006/math">
+                    <m:oMathParaPr>
+                      <m:jc m:val="centerGroup"/>
+                    </m:oMathParaPr>
+                    <m:oMath xmlns:m="http://schemas.openxmlformats.org/officeDocument/2006/math">
+                      <m:r>
+                        <a:rPr lang="en-US" sz="2400" i="1" smtClean="0">
+                          <a:latin typeface="Cambria Math" panose="02040503050406030204" pitchFamily="18" charset="0"/>
+                          <a:ea typeface="Cambria Math" panose="02040503050406030204" pitchFamily="18" charset="0"/>
+                        </a:rPr>
+                        <m:t>𝜔</m:t>
+                      </m:r>
+                    </m:oMath>
+                  </m:oMathPara>
+                </a14:m>
+                <a:endParaRPr lang="en-US" sz="2400" dirty="0"/>
+              </a:p>
+            </p:txBody>
+          </p:sp>
+        </mc:Choice>
+        <mc:Fallback>
+          <p:sp>
+            <p:nvSpPr>
+              <p:cNvPr id="72" name="TextBox 71">
+                <a:extLst>
+                  <a:ext uri="{FF2B5EF4-FFF2-40B4-BE49-F238E27FC236}">
+                    <a16:creationId xmlns:a16="http://schemas.microsoft.com/office/drawing/2014/main" id="{2A351364-719F-47DD-B219-15024EF01A0D}"/>
+                  </a:ext>
+                </a:extLst>
+              </p:cNvPr>
+              <p:cNvSpPr txBox="1">
+                <a:spLocks noRot="1" noChangeAspect="1" noMove="1" noResize="1" noEditPoints="1" noAdjustHandles="1" noChangeArrowheads="1" noChangeShapeType="1" noTextEdit="1"/>
+              </p:cNvSpPr>
+              <p:nvPr/>
+            </p:nvSpPr>
+            <p:spPr>
+              <a:xfrm>
+                <a:off x="4458882" y="3339191"/>
+                <a:ext cx="267203" cy="372516"/>
+              </a:xfrm>
+              <a:prstGeom prst="rect">
+                <a:avLst/>
+              </a:prstGeom>
+              <a:blipFill>
+                <a:blip r:embed="rId9"/>
+                <a:stretch>
+                  <a:fillRect l="-20455" r="-18182"/>
+                </a:stretch>
+              </a:blipFill>
+            </p:spPr>
+            <p:txBody>
+              <a:bodyPr/>
+              <a:lstStyle/>
+              <a:p>
+                <a:r>
+                  <a:rPr lang="en-US">
+                    <a:noFill/>
+                  </a:rPr>
+                  <a:t> </a:t>
+                </a:r>
+              </a:p>
+            </p:txBody>
+          </p:sp>
+        </mc:Fallback>
+      </mc:AlternateContent>
+      <p:sp>
+        <p:nvSpPr>
+          <p:cNvPr id="74" name="Arc 73">
+            <a:extLst>
+              <a:ext uri="{FF2B5EF4-FFF2-40B4-BE49-F238E27FC236}">
+                <a16:creationId xmlns:a16="http://schemas.microsoft.com/office/drawing/2014/main" id="{D42545B4-CEEA-4EC9-BC95-891E2483AF91}"/>
+              </a:ext>
+            </a:extLst>
+          </p:cNvPr>
+          <p:cNvSpPr/>
+          <p:nvPr/>
+        </p:nvSpPr>
+        <p:spPr>
+          <a:xfrm rot="5400000">
+            <a:off x="866274" y="2008166"/>
+            <a:ext cx="4014987" cy="3034566"/>
+          </a:xfrm>
+          <a:prstGeom prst="arc">
+            <a:avLst>
+              <a:gd name="adj1" fmla="val 15579640"/>
+              <a:gd name="adj2" fmla="val 17224375"/>
+            </a:avLst>
+          </a:prstGeom>
+          <a:ln w="34925">
+            <a:solidFill>
+              <a:schemeClr val="tx1"/>
+            </a:solidFill>
+            <a:headEnd type="stealth" w="lg" len="lg"/>
+            <a:tailEnd type="none"/>
+          </a:ln>
+        </p:spPr>
+        <p:style>
+          <a:lnRef idx="1">
+            <a:schemeClr val="accent1"/>
+          </a:lnRef>
+          <a:fillRef idx="0">
+            <a:schemeClr val="accent1"/>
+          </a:fillRef>
+          <a:effectRef idx="0">
+            <a:schemeClr val="accent1"/>
+          </a:effectRef>
+          <a:fontRef idx="minor">
+            <a:schemeClr val="tx1"/>
+          </a:fontRef>
+        </p:style>
+        <p:txBody>
+          <a:bodyPr rtlCol="0" anchor="ctr"/>
+          <a:lstStyle/>
+          <a:p>
+            <a:pPr algn="ctr"/>
+            <a:endParaRPr lang="en-US"/>
+          </a:p>
+        </p:txBody>
+      </p:sp>
+      <p:cxnSp>
+        <p:nvCxnSpPr>
+          <p:cNvPr id="76" name="Straight Arrow Connector 75">
+            <a:extLst>
+              <a:ext uri="{FF2B5EF4-FFF2-40B4-BE49-F238E27FC236}">
+                <a16:creationId xmlns:a16="http://schemas.microsoft.com/office/drawing/2014/main" id="{8DC97D3C-0BFA-46BC-AA10-1E295FB3E644}"/>
+              </a:ext>
+            </a:extLst>
+          </p:cNvPr>
+          <p:cNvCxnSpPr>
+            <a:cxnSpLocks/>
+          </p:cNvCxnSpPr>
+          <p:nvPr/>
+        </p:nvCxnSpPr>
+        <p:spPr>
+          <a:xfrm flipH="1">
+            <a:off x="7769858" y="3211073"/>
+            <a:ext cx="4324777" cy="1900102"/>
+          </a:xfrm>
+          <a:prstGeom prst="straightConnector1">
+            <a:avLst/>
+          </a:prstGeom>
+          <a:ln w="19050">
+            <a:solidFill>
+              <a:schemeClr val="tx1"/>
+            </a:solidFill>
+            <a:prstDash val="solid"/>
+            <a:headEnd type="none" w="lg" len="lg"/>
+            <a:tailEnd type="none" w="lg" len="lg"/>
+          </a:ln>
+        </p:spPr>
+        <p:style>
+          <a:lnRef idx="1">
+            <a:schemeClr val="accent1"/>
+          </a:lnRef>
+          <a:fillRef idx="0">
+            <a:schemeClr val="accent1"/>
+          </a:fillRef>
+          <a:effectRef idx="0">
+            <a:schemeClr val="accent1"/>
+          </a:effectRef>
+          <a:fontRef idx="minor">
+            <a:schemeClr val="tx1"/>
+          </a:fontRef>
+        </p:style>
+      </p:cxnSp>
+      <p:pic>
+        <p:nvPicPr>
+          <p:cNvPr id="77" name="Picture 76">
+            <a:extLst>
+              <a:ext uri="{FF2B5EF4-FFF2-40B4-BE49-F238E27FC236}">
+                <a16:creationId xmlns:a16="http://schemas.microsoft.com/office/drawing/2014/main" id="{7E7320D6-E560-4E12-B4D8-7F8A93EAD68E}"/>
+              </a:ext>
+            </a:extLst>
+          </p:cNvPr>
+          <p:cNvPicPr>
+            <a:picLocks noChangeAspect="1"/>
+          </p:cNvPicPr>
+          <p:nvPr/>
+        </p:nvPicPr>
+        <p:blipFill>
+          <a:blip r:embed="rId10">
+            <a:extLst>
+              <a:ext uri="{28A0092B-C50C-407E-A947-70E740481C1C}">
+                <a14:useLocalDpi xmlns:a14="http://schemas.microsoft.com/office/drawing/2010/main" val="0"/>
+              </a:ext>
+            </a:extLst>
+          </a:blip>
+          <a:stretch>
+            <a:fillRect/>
+          </a:stretch>
+        </p:blipFill>
+        <p:spPr>
+          <a:xfrm>
+            <a:off x="6283380" y="871537"/>
+            <a:ext cx="4690078" cy="4570965"/>
+          </a:xfrm>
+          <a:prstGeom prst="rect">
+            <a:avLst/>
+          </a:prstGeom>
+        </p:spPr>
+      </p:pic>
+      <p:cxnSp>
+        <p:nvCxnSpPr>
+          <p:cNvPr id="78" name="Straight Arrow Connector 77">
+            <a:extLst>
+              <a:ext uri="{FF2B5EF4-FFF2-40B4-BE49-F238E27FC236}">
+                <a16:creationId xmlns:a16="http://schemas.microsoft.com/office/drawing/2014/main" id="{09C5CCB0-CB13-4F84-A0DF-5409BC98D1F5}"/>
+              </a:ext>
+            </a:extLst>
+          </p:cNvPr>
+          <p:cNvCxnSpPr>
+            <a:cxnSpLocks/>
+          </p:cNvCxnSpPr>
+          <p:nvPr/>
+        </p:nvCxnSpPr>
+        <p:spPr>
+          <a:xfrm>
+            <a:off x="8119899" y="3541619"/>
+            <a:ext cx="2270234" cy="429448"/>
+          </a:xfrm>
+          <a:prstGeom prst="straightConnector1">
+            <a:avLst/>
+          </a:prstGeom>
+          <a:ln w="28575">
+            <a:solidFill>
+              <a:schemeClr val="tx1"/>
+            </a:solidFill>
+            <a:prstDash val="solid"/>
+            <a:headEnd type="none" w="lg" len="lg"/>
+            <a:tailEnd type="none" w="lg" len="lg"/>
+          </a:ln>
+        </p:spPr>
+        <p:style>
+          <a:lnRef idx="1">
+            <a:schemeClr val="accent1"/>
+          </a:lnRef>
+          <a:fillRef idx="0">
+            <a:schemeClr val="accent1"/>
+          </a:fillRef>
+          <a:effectRef idx="0">
+            <a:schemeClr val="accent1"/>
+          </a:effectRef>
+          <a:fontRef idx="minor">
+            <a:schemeClr val="tx1"/>
+          </a:fontRef>
+        </p:style>
+      </p:cxnSp>
+      <p:cxnSp>
+        <p:nvCxnSpPr>
+          <p:cNvPr id="79" name="Straight Arrow Connector 78">
+            <a:extLst>
+              <a:ext uri="{FF2B5EF4-FFF2-40B4-BE49-F238E27FC236}">
+                <a16:creationId xmlns:a16="http://schemas.microsoft.com/office/drawing/2014/main" id="{4A903267-C968-4D37-9577-69C631963D19}"/>
+              </a:ext>
+            </a:extLst>
+          </p:cNvPr>
+          <p:cNvCxnSpPr>
+            <a:cxnSpLocks/>
+            <a:stCxn id="82" idx="2"/>
+          </p:cNvCxnSpPr>
+          <p:nvPr/>
+        </p:nvCxnSpPr>
+        <p:spPr>
+          <a:xfrm flipH="1" flipV="1">
+            <a:off x="8505535" y="3334735"/>
+            <a:ext cx="745307" cy="1050868"/>
+          </a:xfrm>
+          <a:prstGeom prst="straightConnector1">
+            <a:avLst/>
+          </a:prstGeom>
+          <a:ln w="28575">
+            <a:solidFill>
+              <a:schemeClr val="tx1"/>
+            </a:solidFill>
+            <a:prstDash val="solid"/>
+            <a:headEnd type="none" w="lg" len="lg"/>
+            <a:tailEnd type="none" w="lg" len="lg"/>
+          </a:ln>
+        </p:spPr>
+        <p:style>
+          <a:lnRef idx="1">
+            <a:schemeClr val="accent1"/>
+          </a:lnRef>
+          <a:fillRef idx="0">
+            <a:schemeClr val="accent1"/>
+          </a:fillRef>
+          <a:effectRef idx="0">
+            <a:schemeClr val="accent1"/>
+          </a:effectRef>
+          <a:fontRef idx="minor">
+            <a:schemeClr val="tx1"/>
+          </a:fontRef>
+        </p:style>
+      </p:cxnSp>
+      <p:cxnSp>
+        <p:nvCxnSpPr>
+          <p:cNvPr id="80" name="Straight Arrow Connector 79">
+            <a:extLst>
+              <a:ext uri="{FF2B5EF4-FFF2-40B4-BE49-F238E27FC236}">
+                <a16:creationId xmlns:a16="http://schemas.microsoft.com/office/drawing/2014/main" id="{C17E8E07-EA83-4B03-839A-CA86DF04C017}"/>
+              </a:ext>
+            </a:extLst>
+          </p:cNvPr>
+          <p:cNvCxnSpPr>
+            <a:cxnSpLocks/>
+          </p:cNvCxnSpPr>
+          <p:nvPr/>
+        </p:nvCxnSpPr>
+        <p:spPr>
+          <a:xfrm flipH="1" flipV="1">
+            <a:off x="8119900" y="3334735"/>
+            <a:ext cx="2270233" cy="1245476"/>
+          </a:xfrm>
+          <a:prstGeom prst="straightConnector1">
+            <a:avLst/>
+          </a:prstGeom>
+          <a:ln w="25400">
+            <a:solidFill>
+              <a:schemeClr val="tx1"/>
+            </a:solidFill>
+            <a:prstDash val="dash"/>
+            <a:headEnd type="none" w="lg" len="lg"/>
+            <a:tailEnd type="none" w="lg" len="lg"/>
+          </a:ln>
+        </p:spPr>
+        <p:style>
+          <a:lnRef idx="1">
+            <a:schemeClr val="accent1"/>
+          </a:lnRef>
+          <a:fillRef idx="0">
+            <a:schemeClr val="accent1"/>
+          </a:fillRef>
+          <a:effectRef idx="0">
+            <a:schemeClr val="accent1"/>
+          </a:effectRef>
+          <a:fontRef idx="minor">
+            <a:schemeClr val="tx1"/>
+          </a:fontRef>
+        </p:style>
+      </p:cxnSp>
+      <mc:AlternateContent xmlns:mc="http://schemas.openxmlformats.org/markup-compatibility/2006">
+        <mc:Choice xmlns:a14="http://schemas.microsoft.com/office/drawing/2010/main" Requires="a14">
+          <p:sp>
+            <p:nvSpPr>
+              <p:cNvPr id="81" name="TextBox 80">
+                <a:extLst>
+                  <a:ext uri="{FF2B5EF4-FFF2-40B4-BE49-F238E27FC236}">
+                    <a16:creationId xmlns:a16="http://schemas.microsoft.com/office/drawing/2014/main" id="{5D8ED357-2A55-4942-87AD-03185D0D1EC8}"/>
+                  </a:ext>
+                </a:extLst>
+              </p:cNvPr>
+              <p:cNvSpPr txBox="1"/>
+              <p:nvPr/>
+            </p:nvSpPr>
+            <p:spPr>
+              <a:xfrm>
+                <a:off x="11143786" y="2752331"/>
+                <a:ext cx="354071" cy="483146"/>
+              </a:xfrm>
+              <a:prstGeom prst="rect">
+                <a:avLst/>
+              </a:prstGeom>
+              <a:noFill/>
+            </p:spPr>
+            <p:txBody>
+              <a:bodyPr wrap="square" lIns="0" tIns="0" rIns="0" bIns="0" rtlCol="0">
+                <a:spAutoFit/>
+              </a:bodyPr>
+              <a:lstStyle/>
+              <a:p>
+                <a:pPr/>
+                <a14:m>
+                  <m:oMathPara xmlns:m="http://schemas.openxmlformats.org/officeDocument/2006/math">
+                    <m:oMathParaPr>
+                      <m:jc m:val="centerGroup"/>
+                    </m:oMathParaPr>
+                    <m:oMath xmlns:m="http://schemas.openxmlformats.org/officeDocument/2006/math">
+                      <m:acc>
+                        <m:accPr>
+                          <m:chr m:val="⃗"/>
+                          <m:ctrlPr>
+                            <a:rPr lang="en-US" sz="2800" i="1" smtClean="0">
+                              <a:solidFill>
+                                <a:srgbClr val="FF0000"/>
+                              </a:solidFill>
+                              <a:latin typeface="Cambria Math" panose="02040503050406030204" pitchFamily="18" charset="0"/>
+                            </a:rPr>
+                          </m:ctrlPr>
+                        </m:accPr>
+                        <m:e>
+                          <m:sSub>
+                            <m:sSubPr>
+                              <m:ctrlPr>
+                                <a:rPr lang="en-US" sz="2800" i="1" smtClean="0">
+                                  <a:solidFill>
+                                    <a:srgbClr val="FF0000"/>
+                                  </a:solidFill>
+                                  <a:latin typeface="Cambria Math" panose="02040503050406030204" pitchFamily="18" charset="0"/>
+                                </a:rPr>
+                              </m:ctrlPr>
+                            </m:sSubPr>
+                            <m:e>
+                              <m:r>
+                                <a:rPr lang="en-US" sz="2800" b="0" i="1" smtClean="0">
+                                  <a:solidFill>
+                                    <a:srgbClr val="FF0000"/>
+                                  </a:solidFill>
+                                  <a:latin typeface="Cambria Math" panose="02040503050406030204" pitchFamily="18" charset="0"/>
+                                </a:rPr>
+                                <m:t>𝑇</m:t>
+                              </m:r>
+                            </m:e>
+                            <m:sub>
+                              <m:r>
+                                <a:rPr lang="en-US" sz="2800" b="0" i="1" smtClean="0">
+                                  <a:solidFill>
+                                    <a:srgbClr val="FF0000"/>
+                                  </a:solidFill>
+                                  <a:latin typeface="Cambria Math" panose="02040503050406030204" pitchFamily="18" charset="0"/>
+                                </a:rPr>
+                                <m:t>2</m:t>
+                              </m:r>
+                            </m:sub>
+                          </m:sSub>
+                        </m:e>
+                      </m:acc>
+                    </m:oMath>
+                  </m:oMathPara>
+                </a14:m>
+                <a:endParaRPr lang="en-US" sz="2800" dirty="0">
+                  <a:solidFill>
+                    <a:srgbClr val="FF0000"/>
+                  </a:solidFill>
+                </a:endParaRPr>
+              </a:p>
+            </p:txBody>
+          </p:sp>
+        </mc:Choice>
+        <mc:Fallback>
+          <p:sp>
+            <p:nvSpPr>
+              <p:cNvPr id="81" name="TextBox 80">
+                <a:extLst>
+                  <a:ext uri="{FF2B5EF4-FFF2-40B4-BE49-F238E27FC236}">
+                    <a16:creationId xmlns:a16="http://schemas.microsoft.com/office/drawing/2014/main" id="{5D8ED357-2A55-4942-87AD-03185D0D1EC8}"/>
+                  </a:ext>
+                </a:extLst>
+              </p:cNvPr>
+              <p:cNvSpPr txBox="1">
+                <a:spLocks noRot="1" noChangeAspect="1" noMove="1" noResize="1" noEditPoints="1" noAdjustHandles="1" noChangeArrowheads="1" noChangeShapeType="1" noTextEdit="1"/>
+              </p:cNvSpPr>
+              <p:nvPr/>
+            </p:nvSpPr>
+            <p:spPr>
+              <a:xfrm>
+                <a:off x="11143786" y="2752331"/>
+                <a:ext cx="354071" cy="483146"/>
+              </a:xfrm>
+              <a:prstGeom prst="rect">
+                <a:avLst/>
+              </a:prstGeom>
+              <a:blipFill>
+                <a:blip r:embed="rId11"/>
+                <a:stretch>
+                  <a:fillRect/>
+                </a:stretch>
+              </a:blipFill>
+            </p:spPr>
+            <p:txBody>
+              <a:bodyPr/>
+              <a:lstStyle/>
+              <a:p>
+                <a:r>
+                  <a:rPr lang="en-US">
+                    <a:noFill/>
+                  </a:rPr>
+                  <a:t> </a:t>
+                </a:r>
+              </a:p>
+            </p:txBody>
+          </p:sp>
+        </mc:Fallback>
+      </mc:AlternateContent>
+      <p:sp>
+        <p:nvSpPr>
+          <p:cNvPr id="82" name="Arc 81">
+            <a:extLst>
+              <a:ext uri="{FF2B5EF4-FFF2-40B4-BE49-F238E27FC236}">
+                <a16:creationId xmlns:a16="http://schemas.microsoft.com/office/drawing/2014/main" id="{CB6A0770-EB99-4C8A-9A21-8D78E6A55F3E}"/>
+              </a:ext>
+            </a:extLst>
+          </p:cNvPr>
+          <p:cNvSpPr/>
+          <p:nvPr/>
+        </p:nvSpPr>
+        <p:spPr>
+          <a:xfrm rot="8931537">
+            <a:off x="7352621" y="1235048"/>
+            <a:ext cx="4014987" cy="3034566"/>
+          </a:xfrm>
+          <a:prstGeom prst="arc">
+            <a:avLst>
+              <a:gd name="adj1" fmla="val 15579640"/>
+              <a:gd name="adj2" fmla="val 18298122"/>
+            </a:avLst>
+          </a:prstGeom>
+          <a:ln w="79375">
+            <a:solidFill>
+              <a:srgbClr val="0070C0"/>
+            </a:solidFill>
+          </a:ln>
+        </p:spPr>
+        <p:style>
+          <a:lnRef idx="1">
+            <a:schemeClr val="accent1"/>
+          </a:lnRef>
+          <a:fillRef idx="0">
+            <a:schemeClr val="accent1"/>
+          </a:fillRef>
+          <a:effectRef idx="0">
+            <a:schemeClr val="accent1"/>
+          </a:effectRef>
+          <a:fontRef idx="minor">
+            <a:schemeClr val="tx1"/>
+          </a:fontRef>
+        </p:style>
+        <p:txBody>
+          <a:bodyPr rtlCol="0" anchor="ctr"/>
+          <a:lstStyle/>
+          <a:p>
+            <a:pPr algn="ctr"/>
+            <a:endParaRPr lang="en-US"/>
+          </a:p>
+        </p:txBody>
+      </p:sp>
+      <p:cxnSp>
+        <p:nvCxnSpPr>
+          <p:cNvPr id="83" name="Straight Arrow Connector 82">
+            <a:extLst>
+              <a:ext uri="{FF2B5EF4-FFF2-40B4-BE49-F238E27FC236}">
+                <a16:creationId xmlns:a16="http://schemas.microsoft.com/office/drawing/2014/main" id="{17E89D11-CE6E-4F50-9526-493EF68791DC}"/>
+              </a:ext>
+            </a:extLst>
+          </p:cNvPr>
+          <p:cNvCxnSpPr>
+            <a:cxnSpLocks/>
+          </p:cNvCxnSpPr>
+          <p:nvPr/>
+        </p:nvCxnSpPr>
+        <p:spPr>
+          <a:xfrm flipV="1">
+            <a:off x="10319761" y="2667606"/>
+            <a:ext cx="797688" cy="1259388"/>
+          </a:xfrm>
+          <a:prstGeom prst="straightConnector1">
+            <a:avLst/>
+          </a:prstGeom>
+          <a:ln w="38100">
+            <a:solidFill>
+              <a:srgbClr val="FF0000"/>
+            </a:solidFill>
+            <a:headEnd type="none" w="lg" len="lg"/>
+            <a:tailEnd type="stealth" w="lg" len="lg"/>
+          </a:ln>
+        </p:spPr>
+        <p:style>
+          <a:lnRef idx="1">
+            <a:schemeClr val="accent1"/>
+          </a:lnRef>
+          <a:fillRef idx="0">
+            <a:schemeClr val="accent1"/>
+          </a:fillRef>
+          <a:effectRef idx="0">
+            <a:schemeClr val="accent1"/>
+          </a:effectRef>
+          <a:fontRef idx="minor">
+            <a:schemeClr val="tx1"/>
+          </a:fontRef>
+        </p:style>
+      </p:cxnSp>
+      <p:cxnSp>
+        <p:nvCxnSpPr>
+          <p:cNvPr id="84" name="Straight Arrow Connector 83">
+            <a:extLst>
+              <a:ext uri="{FF2B5EF4-FFF2-40B4-BE49-F238E27FC236}">
+                <a16:creationId xmlns:a16="http://schemas.microsoft.com/office/drawing/2014/main" id="{8C925807-416C-469E-90E8-C138229BC002}"/>
+              </a:ext>
+            </a:extLst>
+          </p:cNvPr>
+          <p:cNvCxnSpPr>
+            <a:cxnSpLocks/>
+          </p:cNvCxnSpPr>
+          <p:nvPr/>
+        </p:nvCxnSpPr>
+        <p:spPr>
+          <a:xfrm flipH="1" flipV="1">
+            <a:off x="7970200" y="4134871"/>
+            <a:ext cx="1312992" cy="281536"/>
+          </a:xfrm>
+          <a:prstGeom prst="straightConnector1">
+            <a:avLst/>
+          </a:prstGeom>
+          <a:ln w="38100">
+            <a:solidFill>
+              <a:srgbClr val="FF0000"/>
+            </a:solidFill>
+            <a:headEnd type="none" w="lg" len="lg"/>
+            <a:tailEnd type="stealth" w="lg" len="lg"/>
+          </a:ln>
+        </p:spPr>
+        <p:style>
+          <a:lnRef idx="1">
+            <a:schemeClr val="accent1"/>
+          </a:lnRef>
+          <a:fillRef idx="0">
+            <a:schemeClr val="accent1"/>
+          </a:fillRef>
+          <a:effectRef idx="0">
+            <a:schemeClr val="accent1"/>
+          </a:effectRef>
+          <a:fontRef idx="minor">
+            <a:schemeClr val="tx1"/>
+          </a:fontRef>
+        </p:style>
+      </p:cxnSp>
+      <p:cxnSp>
+        <p:nvCxnSpPr>
+          <p:cNvPr id="85" name="Straight Arrow Connector 84">
+            <a:extLst>
+              <a:ext uri="{FF2B5EF4-FFF2-40B4-BE49-F238E27FC236}">
+                <a16:creationId xmlns:a16="http://schemas.microsoft.com/office/drawing/2014/main" id="{44B9C7FF-B32F-4F30-8026-6E0C1AF96A7F}"/>
+              </a:ext>
+            </a:extLst>
+          </p:cNvPr>
+          <p:cNvCxnSpPr>
+            <a:cxnSpLocks/>
+          </p:cNvCxnSpPr>
+          <p:nvPr/>
+        </p:nvCxnSpPr>
+        <p:spPr>
+          <a:xfrm>
+            <a:off x="9808878" y="4261493"/>
+            <a:ext cx="1499810" cy="827645"/>
+          </a:xfrm>
+          <a:prstGeom prst="straightConnector1">
+            <a:avLst/>
+          </a:prstGeom>
+          <a:ln w="38100">
+            <a:solidFill>
+              <a:srgbClr val="FF0000"/>
+            </a:solidFill>
+            <a:headEnd type="none" w="lg" len="lg"/>
+            <a:tailEnd type="stealth" w="lg" len="lg"/>
+          </a:ln>
+        </p:spPr>
+        <p:style>
+          <a:lnRef idx="1">
+            <a:schemeClr val="accent1"/>
+          </a:lnRef>
+          <a:fillRef idx="0">
+            <a:schemeClr val="accent1"/>
+          </a:fillRef>
+          <a:effectRef idx="0">
+            <a:schemeClr val="accent1"/>
+          </a:effectRef>
+          <a:fontRef idx="minor">
+            <a:schemeClr val="tx1"/>
+          </a:fontRef>
+        </p:style>
+      </p:cxnSp>
+      <p:cxnSp>
+        <p:nvCxnSpPr>
+          <p:cNvPr id="86" name="Straight Arrow Connector 85">
+            <a:extLst>
+              <a:ext uri="{FF2B5EF4-FFF2-40B4-BE49-F238E27FC236}">
+                <a16:creationId xmlns:a16="http://schemas.microsoft.com/office/drawing/2014/main" id="{663FA9E1-1757-4CC6-9C38-BDBDAD5E5C6B}"/>
+              </a:ext>
+            </a:extLst>
+          </p:cNvPr>
+          <p:cNvCxnSpPr>
+            <a:cxnSpLocks/>
+          </p:cNvCxnSpPr>
+          <p:nvPr/>
+        </p:nvCxnSpPr>
+        <p:spPr>
+          <a:xfrm>
+            <a:off x="9808878" y="4275639"/>
+            <a:ext cx="0" cy="1166863"/>
+          </a:xfrm>
+          <a:prstGeom prst="straightConnector1">
+            <a:avLst/>
+          </a:prstGeom>
+          <a:ln w="38100">
+            <a:solidFill>
+              <a:srgbClr val="FF0000"/>
+            </a:solidFill>
+            <a:headEnd type="none" w="lg" len="lg"/>
+            <a:tailEnd type="stealth" w="lg" len="lg"/>
+          </a:ln>
+        </p:spPr>
+        <p:style>
+          <a:lnRef idx="1">
+            <a:schemeClr val="accent1"/>
+          </a:lnRef>
+          <a:fillRef idx="0">
+            <a:schemeClr val="accent1"/>
+          </a:fillRef>
+          <a:effectRef idx="0">
+            <a:schemeClr val="accent1"/>
+          </a:effectRef>
+          <a:fontRef idx="minor">
+            <a:schemeClr val="tx1"/>
+          </a:fontRef>
+        </p:style>
+      </p:cxnSp>
+      <mc:AlternateContent xmlns:mc="http://schemas.openxmlformats.org/markup-compatibility/2006">
+        <mc:Choice xmlns:a14="http://schemas.microsoft.com/office/drawing/2010/main" Requires="a14">
+          <p:sp>
+            <p:nvSpPr>
+              <p:cNvPr id="87" name="TextBox 86">
+                <a:extLst>
+                  <a:ext uri="{FF2B5EF4-FFF2-40B4-BE49-F238E27FC236}">
+                    <a16:creationId xmlns:a16="http://schemas.microsoft.com/office/drawing/2014/main" id="{BA1EE225-4F31-4BFA-82ED-48CBA531992B}"/>
+                  </a:ext>
+                </a:extLst>
+              </p:cNvPr>
+              <p:cNvSpPr txBox="1"/>
+              <p:nvPr/>
+            </p:nvSpPr>
+            <p:spPr>
+              <a:xfrm>
+                <a:off x="8146217" y="3640207"/>
+                <a:ext cx="354071" cy="483146"/>
+              </a:xfrm>
+              <a:prstGeom prst="rect">
+                <a:avLst/>
+              </a:prstGeom>
+              <a:noFill/>
+            </p:spPr>
+            <p:txBody>
+              <a:bodyPr wrap="square" lIns="0" tIns="0" rIns="0" bIns="0" rtlCol="0">
+                <a:spAutoFit/>
+              </a:bodyPr>
+              <a:lstStyle/>
+              <a:p>
+                <a:pPr/>
+                <a14:m>
+                  <m:oMathPara xmlns:m="http://schemas.openxmlformats.org/officeDocument/2006/math">
+                    <m:oMathParaPr>
+                      <m:jc m:val="centerGroup"/>
+                    </m:oMathParaPr>
+                    <m:oMath xmlns:m="http://schemas.openxmlformats.org/officeDocument/2006/math">
+                      <m:acc>
+                        <m:accPr>
+                          <m:chr m:val="⃗"/>
+                          <m:ctrlPr>
+                            <a:rPr lang="en-US" sz="2800" i="1" smtClean="0">
+                              <a:solidFill>
+                                <a:srgbClr val="FF0000"/>
+                              </a:solidFill>
+                              <a:latin typeface="Cambria Math" panose="02040503050406030204" pitchFamily="18" charset="0"/>
+                            </a:rPr>
+                          </m:ctrlPr>
+                        </m:accPr>
+                        <m:e>
+                          <m:sSub>
+                            <m:sSubPr>
+                              <m:ctrlPr>
+                                <a:rPr lang="en-US" sz="2800" i="1" smtClean="0">
+                                  <a:solidFill>
+                                    <a:srgbClr val="FF0000"/>
+                                  </a:solidFill>
+                                  <a:latin typeface="Cambria Math" panose="02040503050406030204" pitchFamily="18" charset="0"/>
+                                </a:rPr>
+                              </m:ctrlPr>
+                            </m:sSubPr>
+                            <m:e>
+                              <m:r>
+                                <a:rPr lang="en-US" sz="2800" b="0" i="1" smtClean="0">
+                                  <a:solidFill>
+                                    <a:srgbClr val="FF0000"/>
+                                  </a:solidFill>
+                                  <a:latin typeface="Cambria Math" panose="02040503050406030204" pitchFamily="18" charset="0"/>
+                                </a:rPr>
+                                <m:t>𝑇</m:t>
+                              </m:r>
+                            </m:e>
+                            <m:sub>
+                              <m:r>
+                                <a:rPr lang="en-US" sz="2800" b="0" i="1" smtClean="0">
+                                  <a:solidFill>
+                                    <a:srgbClr val="FF0000"/>
+                                  </a:solidFill>
+                                  <a:latin typeface="Cambria Math" panose="02040503050406030204" pitchFamily="18" charset="0"/>
+                                </a:rPr>
+                                <m:t>1</m:t>
+                              </m:r>
+                            </m:sub>
+                          </m:sSub>
+                        </m:e>
+                      </m:acc>
+                    </m:oMath>
+                  </m:oMathPara>
+                </a14:m>
+                <a:endParaRPr lang="en-US" sz="2400" dirty="0">
+                  <a:solidFill>
+                    <a:srgbClr val="FF0000"/>
+                  </a:solidFill>
+                </a:endParaRPr>
+              </a:p>
+            </p:txBody>
+          </p:sp>
+        </mc:Choice>
+        <mc:Fallback>
+          <p:sp>
+            <p:nvSpPr>
+              <p:cNvPr id="87" name="TextBox 86">
+                <a:extLst>
+                  <a:ext uri="{FF2B5EF4-FFF2-40B4-BE49-F238E27FC236}">
+                    <a16:creationId xmlns:a16="http://schemas.microsoft.com/office/drawing/2014/main" id="{BA1EE225-4F31-4BFA-82ED-48CBA531992B}"/>
+                  </a:ext>
+                </a:extLst>
+              </p:cNvPr>
+              <p:cNvSpPr txBox="1">
+                <a:spLocks noRot="1" noChangeAspect="1" noMove="1" noResize="1" noEditPoints="1" noAdjustHandles="1" noChangeArrowheads="1" noChangeShapeType="1" noTextEdit="1"/>
+              </p:cNvSpPr>
+              <p:nvPr/>
+            </p:nvSpPr>
+            <p:spPr>
+              <a:xfrm>
+                <a:off x="8146217" y="3640207"/>
+                <a:ext cx="354071" cy="483146"/>
+              </a:xfrm>
+              <a:prstGeom prst="rect">
+                <a:avLst/>
+              </a:prstGeom>
+              <a:blipFill>
+                <a:blip r:embed="rId12"/>
+                <a:stretch>
+                  <a:fillRect/>
+                </a:stretch>
+              </a:blipFill>
+            </p:spPr>
+            <p:txBody>
+              <a:bodyPr/>
+              <a:lstStyle/>
+              <a:p>
+                <a:r>
+                  <a:rPr lang="en-US">
+                    <a:noFill/>
+                  </a:rPr>
+                  <a:t> </a:t>
+                </a:r>
+              </a:p>
+            </p:txBody>
+          </p:sp>
+        </mc:Fallback>
+      </mc:AlternateContent>
+      <mc:AlternateContent xmlns:mc="http://schemas.openxmlformats.org/markup-compatibility/2006">
+        <mc:Choice xmlns:a14="http://schemas.microsoft.com/office/drawing/2010/main" Requires="a14">
+          <p:sp>
+            <p:nvSpPr>
+              <p:cNvPr id="88" name="TextBox 87">
+                <a:extLst>
+                  <a:ext uri="{FF2B5EF4-FFF2-40B4-BE49-F238E27FC236}">
+                    <a16:creationId xmlns:a16="http://schemas.microsoft.com/office/drawing/2014/main" id="{281D8C96-306F-4BF4-9B87-3D1AA4EC6C5F}"/>
+                  </a:ext>
+                </a:extLst>
+              </p:cNvPr>
+              <p:cNvSpPr txBox="1"/>
+              <p:nvPr/>
+            </p:nvSpPr>
+            <p:spPr>
+              <a:xfrm>
+                <a:off x="9871334" y="5286056"/>
+                <a:ext cx="896853" cy="434470"/>
+              </a:xfrm>
+              <a:prstGeom prst="rect">
+                <a:avLst/>
+              </a:prstGeom>
+              <a:noFill/>
+            </p:spPr>
+            <p:txBody>
+              <a:bodyPr wrap="square" lIns="0" tIns="0" rIns="0" bIns="0" rtlCol="0">
+                <a:spAutoFit/>
+              </a:bodyPr>
+              <a:lstStyle/>
+              <a:p>
+                <a:pPr/>
+                <a14:m>
+                  <m:oMathPara xmlns:m="http://schemas.openxmlformats.org/officeDocument/2006/math">
+                    <m:oMathParaPr>
+                      <m:jc m:val="centerGroup"/>
+                    </m:oMathParaPr>
+                    <m:oMath xmlns:m="http://schemas.openxmlformats.org/officeDocument/2006/math">
+                      <m:r>
+                        <a:rPr lang="en-US" sz="2800" b="0" i="1" smtClean="0">
+                          <a:solidFill>
+                            <a:srgbClr val="FF0000"/>
+                          </a:solidFill>
+                          <a:latin typeface="Cambria Math" panose="02040503050406030204" pitchFamily="18" charset="0"/>
+                        </a:rPr>
+                        <m:t>𝑑𝑚</m:t>
+                      </m:r>
+                      <m:acc>
+                        <m:accPr>
+                          <m:chr m:val="⃗"/>
+                          <m:ctrlPr>
+                            <a:rPr lang="en-US" sz="2800" i="1" smtClean="0">
+                              <a:solidFill>
+                                <a:srgbClr val="FF0000"/>
+                              </a:solidFill>
+                              <a:latin typeface="Cambria Math" panose="02040503050406030204" pitchFamily="18" charset="0"/>
+                            </a:rPr>
+                          </m:ctrlPr>
+                        </m:accPr>
+                        <m:e>
+                          <m:r>
+                            <a:rPr lang="en-US" sz="2800" b="0" i="1" smtClean="0">
+                              <a:solidFill>
+                                <a:srgbClr val="FF0000"/>
+                              </a:solidFill>
+                              <a:latin typeface="Cambria Math" panose="02040503050406030204" pitchFamily="18" charset="0"/>
+                            </a:rPr>
+                            <m:t>𝑔</m:t>
+                          </m:r>
+                        </m:e>
+                      </m:acc>
+                    </m:oMath>
+                  </m:oMathPara>
+                </a14:m>
+                <a:endParaRPr lang="en-US" sz="2800" dirty="0">
+                  <a:solidFill>
+                    <a:srgbClr val="FF0000"/>
+                  </a:solidFill>
+                </a:endParaRPr>
+              </a:p>
+            </p:txBody>
+          </p:sp>
+        </mc:Choice>
+        <mc:Fallback>
+          <p:sp>
+            <p:nvSpPr>
+              <p:cNvPr id="88" name="TextBox 87">
+                <a:extLst>
+                  <a:ext uri="{FF2B5EF4-FFF2-40B4-BE49-F238E27FC236}">
+                    <a16:creationId xmlns:a16="http://schemas.microsoft.com/office/drawing/2014/main" id="{281D8C96-306F-4BF4-9B87-3D1AA4EC6C5F}"/>
+                  </a:ext>
+                </a:extLst>
+              </p:cNvPr>
+              <p:cNvSpPr txBox="1">
+                <a:spLocks noRot="1" noChangeAspect="1" noMove="1" noResize="1" noEditPoints="1" noAdjustHandles="1" noChangeArrowheads="1" noChangeShapeType="1" noTextEdit="1"/>
+              </p:cNvSpPr>
+              <p:nvPr/>
+            </p:nvSpPr>
+            <p:spPr>
+              <a:xfrm>
+                <a:off x="9871334" y="5286056"/>
+                <a:ext cx="896853" cy="434470"/>
+              </a:xfrm>
+              <a:prstGeom prst="rect">
+                <a:avLst/>
+              </a:prstGeom>
+              <a:blipFill>
+                <a:blip r:embed="rId13"/>
+                <a:stretch>
+                  <a:fillRect/>
+                </a:stretch>
+              </a:blipFill>
+            </p:spPr>
+            <p:txBody>
+              <a:bodyPr/>
+              <a:lstStyle/>
+              <a:p>
+                <a:r>
+                  <a:rPr lang="en-US">
+                    <a:noFill/>
+                  </a:rPr>
+                  <a:t> </a:t>
+                </a:r>
+              </a:p>
+            </p:txBody>
+          </p:sp>
+        </mc:Fallback>
+      </mc:AlternateContent>
+      <p:cxnSp>
+        <p:nvCxnSpPr>
+          <p:cNvPr id="89" name="Straight Arrow Connector 88">
+            <a:extLst>
+              <a:ext uri="{FF2B5EF4-FFF2-40B4-BE49-F238E27FC236}">
+                <a16:creationId xmlns:a16="http://schemas.microsoft.com/office/drawing/2014/main" id="{A4598318-6BF8-4A73-A58C-B6C580BFB00D}"/>
+              </a:ext>
+            </a:extLst>
+          </p:cNvPr>
+          <p:cNvCxnSpPr>
+            <a:cxnSpLocks/>
+          </p:cNvCxnSpPr>
+          <p:nvPr/>
+        </p:nvCxnSpPr>
+        <p:spPr>
+          <a:xfrm flipV="1">
+            <a:off x="9808878" y="2286350"/>
+            <a:ext cx="0" cy="1975143"/>
+          </a:xfrm>
+          <a:prstGeom prst="straightConnector1">
+            <a:avLst/>
+          </a:prstGeom>
+          <a:ln w="38100">
+            <a:solidFill>
+              <a:srgbClr val="FF0000"/>
+            </a:solidFill>
+            <a:headEnd type="none" w="lg" len="lg"/>
+            <a:tailEnd type="stealth" w="lg" len="lg"/>
+          </a:ln>
+        </p:spPr>
+        <p:style>
+          <a:lnRef idx="1">
+            <a:schemeClr val="accent1"/>
+          </a:lnRef>
+          <a:fillRef idx="0">
+            <a:schemeClr val="accent1"/>
+          </a:fillRef>
+          <a:effectRef idx="0">
+            <a:schemeClr val="accent1"/>
+          </a:effectRef>
+          <a:fontRef idx="minor">
+            <a:schemeClr val="tx1"/>
+          </a:fontRef>
+        </p:style>
+      </p:cxnSp>
+      <mc:AlternateContent xmlns:mc="http://schemas.openxmlformats.org/markup-compatibility/2006">
+        <mc:Choice xmlns:a14="http://schemas.microsoft.com/office/drawing/2010/main" Requires="a14">
+          <p:sp>
+            <p:nvSpPr>
+              <p:cNvPr id="90" name="TextBox 89">
+                <a:extLst>
+                  <a:ext uri="{FF2B5EF4-FFF2-40B4-BE49-F238E27FC236}">
+                    <a16:creationId xmlns:a16="http://schemas.microsoft.com/office/drawing/2014/main" id="{46927714-6765-43AF-9DF4-C54222EEB8B5}"/>
+                  </a:ext>
+                </a:extLst>
+              </p:cNvPr>
+              <p:cNvSpPr txBox="1"/>
+              <p:nvPr/>
+            </p:nvSpPr>
+            <p:spPr>
+              <a:xfrm>
+                <a:off x="9955522" y="2027662"/>
+                <a:ext cx="354071" cy="531749"/>
+              </a:xfrm>
+              <a:prstGeom prst="rect">
+                <a:avLst/>
+              </a:prstGeom>
+              <a:noFill/>
+            </p:spPr>
+            <p:txBody>
+              <a:bodyPr wrap="square" lIns="0" tIns="0" rIns="0" bIns="0" rtlCol="0">
+                <a:spAutoFit/>
+              </a:bodyPr>
+              <a:lstStyle/>
+              <a:p>
+                <a:pPr/>
+                <a14:m>
+                  <m:oMathPara xmlns:m="http://schemas.openxmlformats.org/officeDocument/2006/math">
+                    <m:oMathParaPr>
+                      <m:jc m:val="centerGroup"/>
+                    </m:oMathParaPr>
+                    <m:oMath xmlns:m="http://schemas.openxmlformats.org/officeDocument/2006/math">
+                      <m:acc>
+                        <m:accPr>
+                          <m:chr m:val="⃗"/>
+                          <m:ctrlPr>
+                            <a:rPr lang="en-US" sz="2800" i="1" smtClean="0">
+                              <a:solidFill>
+                                <a:srgbClr val="FF0000"/>
+                              </a:solidFill>
+                              <a:latin typeface="Cambria Math" panose="02040503050406030204" pitchFamily="18" charset="0"/>
+                            </a:rPr>
+                          </m:ctrlPr>
+                        </m:accPr>
+                        <m:e>
+                          <m:sSub>
+                            <m:sSubPr>
+                              <m:ctrlPr>
+                                <a:rPr lang="en-US" sz="2800" i="1" smtClean="0">
+                                  <a:solidFill>
+                                    <a:srgbClr val="FF0000"/>
+                                  </a:solidFill>
+                                  <a:latin typeface="Cambria Math" panose="02040503050406030204" pitchFamily="18" charset="0"/>
+                                </a:rPr>
+                              </m:ctrlPr>
+                            </m:sSubPr>
+                            <m:e>
+                              <m:r>
+                                <a:rPr lang="en-US" sz="2800" b="0" i="1" smtClean="0">
+                                  <a:solidFill>
+                                    <a:srgbClr val="FF0000"/>
+                                  </a:solidFill>
+                                  <a:latin typeface="Cambria Math" panose="02040503050406030204" pitchFamily="18" charset="0"/>
+                                </a:rPr>
+                                <m:t>𝐹</m:t>
+                              </m:r>
+                            </m:e>
+                            <m:sub>
+                              <m:r>
+                                <a:rPr lang="ru-RU" sz="2800" b="0" i="1" smtClean="0">
+                                  <a:solidFill>
+                                    <a:srgbClr val="FF0000"/>
+                                  </a:solidFill>
+                                  <a:latin typeface="Cambria Math" panose="02040503050406030204" pitchFamily="18" charset="0"/>
+                                </a:rPr>
+                                <m:t>тр</m:t>
+                              </m:r>
+                            </m:sub>
+                          </m:sSub>
+                        </m:e>
+                      </m:acc>
+                    </m:oMath>
+                  </m:oMathPara>
+                </a14:m>
+                <a:endParaRPr lang="en-US" sz="2800" dirty="0">
+                  <a:solidFill>
+                    <a:srgbClr val="FF0000"/>
+                  </a:solidFill>
+                </a:endParaRPr>
+              </a:p>
+            </p:txBody>
+          </p:sp>
+        </mc:Choice>
+        <mc:Fallback>
+          <p:sp>
+            <p:nvSpPr>
+              <p:cNvPr id="90" name="TextBox 89">
+                <a:extLst>
+                  <a:ext uri="{FF2B5EF4-FFF2-40B4-BE49-F238E27FC236}">
+                    <a16:creationId xmlns:a16="http://schemas.microsoft.com/office/drawing/2014/main" id="{46927714-6765-43AF-9DF4-C54222EEB8B5}"/>
+                  </a:ext>
+                </a:extLst>
+              </p:cNvPr>
+              <p:cNvSpPr txBox="1">
+                <a:spLocks noRot="1" noChangeAspect="1" noMove="1" noResize="1" noEditPoints="1" noAdjustHandles="1" noChangeArrowheads="1" noChangeShapeType="1" noTextEdit="1"/>
+              </p:cNvSpPr>
+              <p:nvPr/>
+            </p:nvSpPr>
+            <p:spPr>
+              <a:xfrm>
+                <a:off x="9955522" y="2027662"/>
+                <a:ext cx="354071" cy="531749"/>
+              </a:xfrm>
+              <a:prstGeom prst="rect">
+                <a:avLst/>
+              </a:prstGeom>
+              <a:blipFill>
+                <a:blip r:embed="rId14"/>
+                <a:stretch>
+                  <a:fillRect r="-25862"/>
+                </a:stretch>
+              </a:blipFill>
+            </p:spPr>
+            <p:txBody>
+              <a:bodyPr/>
+              <a:lstStyle/>
+              <a:p>
+                <a:r>
+                  <a:rPr lang="en-US">
+                    <a:noFill/>
+                  </a:rPr>
+                  <a:t> </a:t>
+                </a:r>
+              </a:p>
+            </p:txBody>
+          </p:sp>
+        </mc:Fallback>
+      </mc:AlternateContent>
+      <mc:AlternateContent xmlns:mc="http://schemas.openxmlformats.org/markup-compatibility/2006">
+        <mc:Choice xmlns:a14="http://schemas.microsoft.com/office/drawing/2010/main" Requires="a14">
+          <p:sp>
+            <p:nvSpPr>
+              <p:cNvPr id="91" name="TextBox 90">
+                <a:extLst>
+                  <a:ext uri="{FF2B5EF4-FFF2-40B4-BE49-F238E27FC236}">
+                    <a16:creationId xmlns:a16="http://schemas.microsoft.com/office/drawing/2014/main" id="{ADC184C6-6248-4D0C-A38A-558A4A0A573C}"/>
+                  </a:ext>
+                </a:extLst>
+              </p:cNvPr>
+              <p:cNvSpPr txBox="1"/>
+              <p:nvPr/>
+            </p:nvSpPr>
+            <p:spPr>
+              <a:xfrm>
+                <a:off x="11029282" y="4499591"/>
+                <a:ext cx="896853" cy="552331"/>
+              </a:xfrm>
+              <a:prstGeom prst="rect">
+                <a:avLst/>
+              </a:prstGeom>
+              <a:noFill/>
+            </p:spPr>
+            <p:txBody>
+              <a:bodyPr wrap="square" lIns="0" tIns="0" rIns="0" bIns="0" rtlCol="0">
+                <a:spAutoFit/>
+              </a:bodyPr>
+              <a:lstStyle/>
+              <a:p>
+                <a:pPr/>
+                <a14:m>
+                  <m:oMathPara xmlns:m="http://schemas.openxmlformats.org/officeDocument/2006/math">
+                    <m:oMathParaPr>
+                      <m:jc m:val="centerGroup"/>
+                    </m:oMathParaPr>
+                    <m:oMath xmlns:m="http://schemas.openxmlformats.org/officeDocument/2006/math">
+                      <m:acc>
+                        <m:accPr>
+                          <m:chr m:val="⃗"/>
+                          <m:ctrlPr>
+                            <a:rPr lang="en-US" sz="3200" i="1" smtClean="0">
+                              <a:solidFill>
+                                <a:srgbClr val="FF0000"/>
+                              </a:solidFill>
+                              <a:latin typeface="Cambria Math" panose="02040503050406030204" pitchFamily="18" charset="0"/>
+                            </a:rPr>
+                          </m:ctrlPr>
+                        </m:accPr>
+                        <m:e>
+                          <m:r>
+                            <a:rPr lang="en-US" sz="3200" b="0" i="1" smtClean="0">
+                              <a:solidFill>
+                                <a:srgbClr val="FF0000"/>
+                              </a:solidFill>
+                              <a:latin typeface="Cambria Math" panose="02040503050406030204" pitchFamily="18" charset="0"/>
+                            </a:rPr>
+                            <m:t>𝑁</m:t>
+                          </m:r>
+                        </m:e>
+                      </m:acc>
+                    </m:oMath>
+                  </m:oMathPara>
+                </a14:m>
+                <a:endParaRPr lang="en-US" sz="3200" dirty="0">
+                  <a:solidFill>
+                    <a:srgbClr val="FF0000"/>
+                  </a:solidFill>
+                </a:endParaRPr>
+              </a:p>
+            </p:txBody>
+          </p:sp>
+        </mc:Choice>
+        <mc:Fallback>
+          <p:sp>
+            <p:nvSpPr>
+              <p:cNvPr id="91" name="TextBox 90">
+                <a:extLst>
+                  <a:ext uri="{FF2B5EF4-FFF2-40B4-BE49-F238E27FC236}">
+                    <a16:creationId xmlns:a16="http://schemas.microsoft.com/office/drawing/2014/main" id="{ADC184C6-6248-4D0C-A38A-558A4A0A573C}"/>
+                  </a:ext>
+                </a:extLst>
+              </p:cNvPr>
+              <p:cNvSpPr txBox="1">
+                <a:spLocks noRot="1" noChangeAspect="1" noMove="1" noResize="1" noEditPoints="1" noAdjustHandles="1" noChangeArrowheads="1" noChangeShapeType="1" noTextEdit="1"/>
+              </p:cNvSpPr>
+              <p:nvPr/>
+            </p:nvSpPr>
+            <p:spPr>
+              <a:xfrm>
+                <a:off x="11029282" y="4499591"/>
+                <a:ext cx="896853" cy="552331"/>
+              </a:xfrm>
+              <a:prstGeom prst="rect">
+                <a:avLst/>
+              </a:prstGeom>
+              <a:blipFill>
+                <a:blip r:embed="rId15"/>
+                <a:stretch>
+                  <a:fillRect/>
+                </a:stretch>
+              </a:blipFill>
+            </p:spPr>
+            <p:txBody>
+              <a:bodyPr/>
+              <a:lstStyle/>
+              <a:p>
+                <a:r>
+                  <a:rPr lang="en-US">
+                    <a:noFill/>
+                  </a:rPr>
+                  <a:t> </a:t>
+                </a:r>
+              </a:p>
+            </p:txBody>
+          </p:sp>
+        </mc:Fallback>
+      </mc:AlternateContent>
+      <p:sp>
+        <p:nvSpPr>
+          <p:cNvPr id="92" name="Arc 91">
+            <a:extLst>
+              <a:ext uri="{FF2B5EF4-FFF2-40B4-BE49-F238E27FC236}">
+                <a16:creationId xmlns:a16="http://schemas.microsoft.com/office/drawing/2014/main" id="{D0A3B173-348D-4517-852F-8A449B834F6C}"/>
+              </a:ext>
+            </a:extLst>
+          </p:cNvPr>
+          <p:cNvSpPr/>
+          <p:nvPr/>
+        </p:nvSpPr>
+        <p:spPr>
+          <a:xfrm rot="1126336">
+            <a:off x="10272506" y="3595635"/>
+            <a:ext cx="388842" cy="321414"/>
+          </a:xfrm>
+          <a:prstGeom prst="arc">
+            <a:avLst>
+              <a:gd name="adj1" fmla="val 16775587"/>
+              <a:gd name="adj2" fmla="val 725428"/>
+            </a:avLst>
+          </a:prstGeom>
+          <a:ln w="25400">
+            <a:solidFill>
+              <a:schemeClr val="tx1"/>
+            </a:solidFill>
+          </a:ln>
+        </p:spPr>
+        <p:style>
+          <a:lnRef idx="1">
+            <a:schemeClr val="accent1"/>
+          </a:lnRef>
+          <a:fillRef idx="0">
+            <a:schemeClr val="accent1"/>
+          </a:fillRef>
+          <a:effectRef idx="0">
+            <a:schemeClr val="accent1"/>
+          </a:effectRef>
+          <a:fontRef idx="minor">
+            <a:schemeClr val="tx1"/>
+          </a:fontRef>
+        </p:style>
+        <p:txBody>
+          <a:bodyPr rtlCol="0" anchor="ctr"/>
+          <a:lstStyle/>
+          <a:p>
+            <a:pPr algn="ctr"/>
+            <a:endParaRPr lang="en-US" dirty="0"/>
+          </a:p>
+        </p:txBody>
+      </p:sp>
+      <mc:AlternateContent xmlns:mc="http://schemas.openxmlformats.org/markup-compatibility/2006">
+        <mc:Choice xmlns:a14="http://schemas.microsoft.com/office/drawing/2010/main" Requires="a14">
+          <p:sp>
+            <p:nvSpPr>
+              <p:cNvPr id="93" name="TextBox 92">
+                <a:extLst>
+                  <a:ext uri="{FF2B5EF4-FFF2-40B4-BE49-F238E27FC236}">
+                    <a16:creationId xmlns:a16="http://schemas.microsoft.com/office/drawing/2014/main" id="{B95EA5B0-74F8-402C-98AD-EE2C3B3FBB22}"/>
+                  </a:ext>
+                </a:extLst>
+              </p:cNvPr>
+              <p:cNvSpPr txBox="1"/>
+              <p:nvPr/>
+            </p:nvSpPr>
+            <p:spPr>
+              <a:xfrm>
+                <a:off x="10567585" y="3370238"/>
+                <a:ext cx="353020" cy="369332"/>
+              </a:xfrm>
+              <a:prstGeom prst="rect">
+                <a:avLst/>
+              </a:prstGeom>
+              <a:noFill/>
+            </p:spPr>
+            <p:txBody>
+              <a:bodyPr wrap="square" lIns="0" tIns="0" rIns="0" bIns="0" rtlCol="0">
+                <a:spAutoFit/>
+              </a:bodyPr>
+              <a:lstStyle/>
+              <a:p>
+                <a:pPr/>
+                <a14:m>
+                  <m:oMathPara xmlns:m="http://schemas.openxmlformats.org/officeDocument/2006/math">
+                    <m:oMathParaPr>
+                      <m:jc m:val="centerGroup"/>
+                    </m:oMathParaPr>
+                    <m:oMath xmlns:m="http://schemas.openxmlformats.org/officeDocument/2006/math">
+                      <m:r>
+                        <a:rPr lang="en-US" sz="2400" i="1" smtClean="0">
+                          <a:latin typeface="Cambria Math" panose="02040503050406030204" pitchFamily="18" charset="0"/>
+                          <a:ea typeface="Cambria Math" panose="02040503050406030204" pitchFamily="18" charset="0"/>
+                        </a:rPr>
+                        <m:t>𝛼</m:t>
+                      </m:r>
+                    </m:oMath>
+                  </m:oMathPara>
+                </a14:m>
+                <a:endParaRPr lang="en-US" sz="2400" dirty="0"/>
+              </a:p>
+            </p:txBody>
+          </p:sp>
+        </mc:Choice>
+        <mc:Fallback>
+          <p:sp>
+            <p:nvSpPr>
+              <p:cNvPr id="93" name="TextBox 92">
+                <a:extLst>
+                  <a:ext uri="{FF2B5EF4-FFF2-40B4-BE49-F238E27FC236}">
+                    <a16:creationId xmlns:a16="http://schemas.microsoft.com/office/drawing/2014/main" id="{B95EA5B0-74F8-402C-98AD-EE2C3B3FBB22}"/>
+                  </a:ext>
+                </a:extLst>
+              </p:cNvPr>
+              <p:cNvSpPr txBox="1">
+                <a:spLocks noRot="1" noChangeAspect="1" noMove="1" noResize="1" noEditPoints="1" noAdjustHandles="1" noChangeArrowheads="1" noChangeShapeType="1" noTextEdit="1"/>
+              </p:cNvSpPr>
+              <p:nvPr/>
+            </p:nvSpPr>
+            <p:spPr>
+              <a:xfrm>
+                <a:off x="10567585" y="3370238"/>
+                <a:ext cx="353020" cy="369332"/>
+              </a:xfrm>
+              <a:prstGeom prst="rect">
+                <a:avLst/>
+              </a:prstGeom>
+              <a:blipFill>
+                <a:blip r:embed="rId16"/>
+                <a:stretch>
+                  <a:fillRect/>
+                </a:stretch>
+              </a:blipFill>
+            </p:spPr>
+            <p:txBody>
+              <a:bodyPr/>
+              <a:lstStyle/>
+              <a:p>
+                <a:r>
+                  <a:rPr lang="en-US">
+                    <a:noFill/>
+                  </a:rPr>
+                  <a:t> </a:t>
+                </a:r>
+              </a:p>
+            </p:txBody>
+          </p:sp>
+        </mc:Fallback>
+      </mc:AlternateContent>
+      <p:sp>
+        <p:nvSpPr>
+          <p:cNvPr id="94" name="Arc 93">
+            <a:extLst>
+              <a:ext uri="{FF2B5EF4-FFF2-40B4-BE49-F238E27FC236}">
+                <a16:creationId xmlns:a16="http://schemas.microsoft.com/office/drawing/2014/main" id="{2B83ED2B-250F-446F-AA0F-13B3AA0AD4DE}"/>
+              </a:ext>
+            </a:extLst>
+          </p:cNvPr>
+          <p:cNvSpPr/>
+          <p:nvPr/>
+        </p:nvSpPr>
+        <p:spPr>
+          <a:xfrm rot="12633177">
+            <a:off x="8513613" y="4139405"/>
+            <a:ext cx="595357" cy="676642"/>
+          </a:xfrm>
+          <a:prstGeom prst="arc">
+            <a:avLst>
+              <a:gd name="adj1" fmla="val 16775587"/>
+              <a:gd name="adj2" fmla="val 725428"/>
+            </a:avLst>
+          </a:prstGeom>
+          <a:ln w="25400">
+            <a:solidFill>
+              <a:schemeClr val="tx1"/>
+            </a:solidFill>
+          </a:ln>
+          <a:effectLst/>
+        </p:spPr>
+        <p:style>
+          <a:lnRef idx="1">
+            <a:schemeClr val="accent1"/>
+          </a:lnRef>
+          <a:fillRef idx="0">
+            <a:schemeClr val="accent1"/>
+          </a:fillRef>
+          <a:effectRef idx="0">
+            <a:schemeClr val="accent1"/>
+          </a:effectRef>
+          <a:fontRef idx="minor">
+            <a:schemeClr val="tx1"/>
+          </a:fontRef>
+        </p:style>
+        <p:txBody>
+          <a:bodyPr rtlCol="0" anchor="ctr"/>
+          <a:lstStyle/>
+          <a:p>
+            <a:pPr algn="ctr"/>
+            <a:endParaRPr lang="en-US" dirty="0"/>
+          </a:p>
+        </p:txBody>
+      </p:sp>
+      <mc:AlternateContent xmlns:mc="http://schemas.openxmlformats.org/markup-compatibility/2006">
+        <mc:Choice xmlns:a14="http://schemas.microsoft.com/office/drawing/2010/main" Requires="a14">
+          <p:sp>
+            <p:nvSpPr>
+              <p:cNvPr id="95" name="TextBox 94">
+                <a:extLst>
+                  <a:ext uri="{FF2B5EF4-FFF2-40B4-BE49-F238E27FC236}">
+                    <a16:creationId xmlns:a16="http://schemas.microsoft.com/office/drawing/2014/main" id="{EEE3C5E6-DE9B-4146-A138-E910DDCE7134}"/>
+                  </a:ext>
+                </a:extLst>
+              </p:cNvPr>
+              <p:cNvSpPr txBox="1"/>
+              <p:nvPr/>
+            </p:nvSpPr>
+            <p:spPr>
+              <a:xfrm>
+                <a:off x="7922210" y="4285083"/>
+                <a:ext cx="771340" cy="430887"/>
+              </a:xfrm>
+              <a:prstGeom prst="rect">
+                <a:avLst/>
+              </a:prstGeom>
+              <a:noFill/>
+              <a:effectLst>
+                <a:outerShdw blurRad="50800" dist="38100" dir="2700000" algn="tl" rotWithShape="0">
+                  <a:schemeClr val="bg1"/>
+                </a:outerShdw>
+              </a:effectLst>
+            </p:spPr>
+            <p:txBody>
+              <a:bodyPr wrap="square" lIns="0" tIns="0" rIns="0" bIns="0" rtlCol="0">
+                <a:spAutoFit/>
+              </a:bodyPr>
+              <a:lstStyle/>
+              <a:p>
+                <a:pPr/>
+                <a14:m>
+                  <m:oMathPara xmlns:m="http://schemas.openxmlformats.org/officeDocument/2006/math">
+                    <m:oMathParaPr>
+                      <m:jc m:val="centerGroup"/>
+                    </m:oMathParaPr>
+                    <m:oMath xmlns:m="http://schemas.openxmlformats.org/officeDocument/2006/math">
+                      <m:r>
+                        <a:rPr lang="en-US" sz="2800" i="1" smtClean="0">
+                          <a:latin typeface="Cambria Math" panose="02040503050406030204" pitchFamily="18" charset="0"/>
+                          <a:ea typeface="Cambria Math" panose="02040503050406030204" pitchFamily="18" charset="0"/>
+                        </a:rPr>
+                        <m:t>𝛼</m:t>
+                      </m:r>
+                    </m:oMath>
+                  </m:oMathPara>
+                </a14:m>
+                <a:endParaRPr lang="en-US" sz="2800" dirty="0"/>
+              </a:p>
+            </p:txBody>
+          </p:sp>
+        </mc:Choice>
+        <mc:Fallback>
+          <p:sp>
+            <p:nvSpPr>
+              <p:cNvPr id="95" name="TextBox 94">
+                <a:extLst>
+                  <a:ext uri="{FF2B5EF4-FFF2-40B4-BE49-F238E27FC236}">
+                    <a16:creationId xmlns:a16="http://schemas.microsoft.com/office/drawing/2014/main" id="{EEE3C5E6-DE9B-4146-A138-E910DDCE7134}"/>
+                  </a:ext>
+                </a:extLst>
+              </p:cNvPr>
+              <p:cNvSpPr txBox="1">
+                <a:spLocks noRot="1" noChangeAspect="1" noMove="1" noResize="1" noEditPoints="1" noAdjustHandles="1" noChangeArrowheads="1" noChangeShapeType="1" noTextEdit="1"/>
+              </p:cNvSpPr>
+              <p:nvPr/>
+            </p:nvSpPr>
+            <p:spPr>
+              <a:xfrm>
+                <a:off x="7922210" y="4285083"/>
+                <a:ext cx="771340" cy="430887"/>
+              </a:xfrm>
+              <a:prstGeom prst="rect">
+                <a:avLst/>
+              </a:prstGeom>
+              <a:blipFill>
+                <a:blip r:embed="rId17"/>
+                <a:stretch>
+                  <a:fillRect/>
+                </a:stretch>
+              </a:blipFill>
+              <a:effectLst>
+                <a:outerShdw blurRad="50800" dist="38100" dir="2700000" algn="tl" rotWithShape="0">
+                  <a:schemeClr val="bg1"/>
+                </a:outerShdw>
+              </a:effectLst>
+            </p:spPr>
+            <p:txBody>
+              <a:bodyPr/>
+              <a:lstStyle/>
+              <a:p>
+                <a:r>
+                  <a:rPr lang="en-US">
+                    <a:noFill/>
+                  </a:rPr>
+                  <a:t> </a:t>
+                </a:r>
+              </a:p>
+            </p:txBody>
+          </p:sp>
+        </mc:Fallback>
+      </mc:AlternateContent>
+      <p:sp>
+        <p:nvSpPr>
+          <p:cNvPr id="96" name="Arc 95">
+            <a:extLst>
+              <a:ext uri="{FF2B5EF4-FFF2-40B4-BE49-F238E27FC236}">
+                <a16:creationId xmlns:a16="http://schemas.microsoft.com/office/drawing/2014/main" id="{4E66EA93-4411-4BB5-8FDB-4EE39DD2A17E}"/>
+              </a:ext>
+            </a:extLst>
+          </p:cNvPr>
+          <p:cNvSpPr/>
+          <p:nvPr/>
+        </p:nvSpPr>
+        <p:spPr>
+          <a:xfrm rot="4716584">
+            <a:off x="8982226" y="3677479"/>
+            <a:ext cx="188069" cy="196749"/>
+          </a:xfrm>
+          <a:prstGeom prst="arc">
+            <a:avLst>
+              <a:gd name="adj1" fmla="val 15248527"/>
+              <a:gd name="adj2" fmla="val 725428"/>
+            </a:avLst>
+          </a:prstGeom>
+          <a:ln w="25400">
+            <a:solidFill>
+              <a:schemeClr val="tx1"/>
+            </a:solidFill>
+          </a:ln>
+        </p:spPr>
+        <p:style>
+          <a:lnRef idx="1">
+            <a:schemeClr val="accent1"/>
+          </a:lnRef>
+          <a:fillRef idx="0">
+            <a:schemeClr val="accent1"/>
+          </a:fillRef>
+          <a:effectRef idx="0">
+            <a:schemeClr val="accent1"/>
+          </a:effectRef>
+          <a:fontRef idx="minor">
+            <a:schemeClr val="tx1"/>
+          </a:fontRef>
+        </p:style>
+        <p:txBody>
+          <a:bodyPr rtlCol="0" anchor="ctr"/>
+          <a:lstStyle/>
+          <a:p>
+            <a:pPr algn="ctr"/>
+            <a:endParaRPr lang="en-US" dirty="0"/>
+          </a:p>
+        </p:txBody>
+      </p:sp>
+      <p:sp>
+        <p:nvSpPr>
+          <p:cNvPr id="97" name="Arc 96">
+            <a:extLst>
+              <a:ext uri="{FF2B5EF4-FFF2-40B4-BE49-F238E27FC236}">
+                <a16:creationId xmlns:a16="http://schemas.microsoft.com/office/drawing/2014/main" id="{7F8C01F1-E1FB-41BD-9AA9-8B91D1FC3F27}"/>
+              </a:ext>
+            </a:extLst>
+          </p:cNvPr>
+          <p:cNvSpPr/>
+          <p:nvPr/>
+        </p:nvSpPr>
+        <p:spPr>
+          <a:xfrm rot="5129969">
+            <a:off x="8880350" y="3785566"/>
+            <a:ext cx="188069" cy="196749"/>
+          </a:xfrm>
+          <a:prstGeom prst="arc">
+            <a:avLst>
+              <a:gd name="adj1" fmla="val 15248527"/>
+              <a:gd name="adj2" fmla="val 725428"/>
+            </a:avLst>
+          </a:prstGeom>
+          <a:ln w="25400">
+            <a:solidFill>
+              <a:schemeClr val="tx1"/>
+            </a:solidFill>
+          </a:ln>
+        </p:spPr>
+        <p:style>
+          <a:lnRef idx="1">
+            <a:schemeClr val="accent1"/>
+          </a:lnRef>
+          <a:fillRef idx="0">
+            <a:schemeClr val="accent1"/>
+          </a:fillRef>
+          <a:effectRef idx="0">
+            <a:schemeClr val="accent1"/>
+          </a:effectRef>
+          <a:fontRef idx="minor">
+            <a:schemeClr val="tx1"/>
+          </a:fontRef>
+        </p:style>
+        <p:txBody>
+          <a:bodyPr rtlCol="0" anchor="ctr"/>
+          <a:lstStyle/>
+          <a:p>
+            <a:pPr algn="ctr"/>
+            <a:endParaRPr lang="en-US" dirty="0"/>
+          </a:p>
+        </p:txBody>
+      </p:sp>
+      <mc:AlternateContent xmlns:mc="http://schemas.openxmlformats.org/markup-compatibility/2006">
+        <mc:Choice xmlns:a14="http://schemas.microsoft.com/office/drawing/2010/main" Requires="a14">
+          <p:sp>
+            <p:nvSpPr>
+              <p:cNvPr id="98" name="TextBox 97">
+                <a:extLst>
+                  <a:ext uri="{FF2B5EF4-FFF2-40B4-BE49-F238E27FC236}">
+                    <a16:creationId xmlns:a16="http://schemas.microsoft.com/office/drawing/2014/main" id="{12B26FBD-37EA-495C-B64C-340A64E8784C}"/>
+                  </a:ext>
+                </a:extLst>
+              </p:cNvPr>
+              <p:cNvSpPr txBox="1"/>
+              <p:nvPr/>
+            </p:nvSpPr>
+            <p:spPr>
+              <a:xfrm>
+                <a:off x="8941124" y="3833751"/>
+                <a:ext cx="353020" cy="307777"/>
+              </a:xfrm>
+              <a:prstGeom prst="rect">
+                <a:avLst/>
+              </a:prstGeom>
+              <a:noFill/>
+            </p:spPr>
+            <p:txBody>
+              <a:bodyPr wrap="square" lIns="0" tIns="0" rIns="0" bIns="0" rtlCol="0">
+                <a:spAutoFit/>
+              </a:bodyPr>
+              <a:lstStyle/>
+              <a:p>
+                <a:pPr/>
+                <a14:m>
+                  <m:oMathPara xmlns:m="http://schemas.openxmlformats.org/officeDocument/2006/math">
+                    <m:oMathParaPr>
+                      <m:jc m:val="centerGroup"/>
+                    </m:oMathParaPr>
+                    <m:oMath xmlns:m="http://schemas.openxmlformats.org/officeDocument/2006/math">
+                      <m:r>
+                        <a:rPr lang="en-US" sz="2000" i="1" smtClean="0">
+                          <a:latin typeface="Cambria Math" panose="02040503050406030204" pitchFamily="18" charset="0"/>
+                          <a:ea typeface="Cambria Math" panose="02040503050406030204" pitchFamily="18" charset="0"/>
+                        </a:rPr>
+                        <m:t>𝛼</m:t>
+                      </m:r>
+                    </m:oMath>
+                  </m:oMathPara>
+                </a14:m>
+                <a:endParaRPr lang="en-US" sz="2000" dirty="0"/>
+              </a:p>
+            </p:txBody>
+          </p:sp>
+        </mc:Choice>
+        <mc:Fallback>
+          <p:sp>
+            <p:nvSpPr>
+              <p:cNvPr id="98" name="TextBox 97">
+                <a:extLst>
+                  <a:ext uri="{FF2B5EF4-FFF2-40B4-BE49-F238E27FC236}">
+                    <a16:creationId xmlns:a16="http://schemas.microsoft.com/office/drawing/2014/main" id="{12B26FBD-37EA-495C-B64C-340A64E8784C}"/>
+                  </a:ext>
+                </a:extLst>
+              </p:cNvPr>
+              <p:cNvSpPr txBox="1">
+                <a:spLocks noRot="1" noChangeAspect="1" noMove="1" noResize="1" noEditPoints="1" noAdjustHandles="1" noChangeArrowheads="1" noChangeShapeType="1" noTextEdit="1"/>
+              </p:cNvSpPr>
+              <p:nvPr/>
+            </p:nvSpPr>
+            <p:spPr>
+              <a:xfrm>
+                <a:off x="8941124" y="3833751"/>
+                <a:ext cx="353020" cy="307777"/>
+              </a:xfrm>
+              <a:prstGeom prst="rect">
+                <a:avLst/>
+              </a:prstGeom>
+              <a:blipFill>
+                <a:blip r:embed="rId18"/>
+                <a:stretch>
+                  <a:fillRect/>
+                </a:stretch>
+              </a:blipFill>
+            </p:spPr>
+            <p:txBody>
+              <a:bodyPr/>
+              <a:lstStyle/>
+              <a:p>
+                <a:r>
+                  <a:rPr lang="en-US">
+                    <a:noFill/>
+                  </a:rPr>
+                  <a:t> </a:t>
+                </a:r>
+              </a:p>
+            </p:txBody>
+          </p:sp>
+        </mc:Fallback>
+      </mc:AlternateContent>
+      <mc:AlternateContent xmlns:mc="http://schemas.openxmlformats.org/markup-compatibility/2006">
+        <mc:Choice xmlns:a14="http://schemas.microsoft.com/office/drawing/2010/main" Requires="a14">
+          <p:sp>
+            <p:nvSpPr>
+              <p:cNvPr id="99" name="TextBox 98">
+                <a:extLst>
+                  <a:ext uri="{FF2B5EF4-FFF2-40B4-BE49-F238E27FC236}">
+                    <a16:creationId xmlns:a16="http://schemas.microsoft.com/office/drawing/2014/main" id="{7EC8A275-F88E-4F2B-B529-6BA6047003CA}"/>
+                  </a:ext>
+                </a:extLst>
+              </p:cNvPr>
+              <p:cNvSpPr txBox="1"/>
+              <p:nvPr/>
+            </p:nvSpPr>
+            <p:spPr>
+              <a:xfrm>
+                <a:off x="9081740" y="3674308"/>
+                <a:ext cx="353020" cy="307777"/>
+              </a:xfrm>
+              <a:prstGeom prst="rect">
+                <a:avLst/>
+              </a:prstGeom>
+              <a:noFill/>
+            </p:spPr>
+            <p:txBody>
+              <a:bodyPr wrap="square" lIns="0" tIns="0" rIns="0" bIns="0" rtlCol="0">
+                <a:spAutoFit/>
+              </a:bodyPr>
+              <a:lstStyle/>
+              <a:p>
+                <a:pPr/>
+                <a14:m>
+                  <m:oMathPara xmlns:m="http://schemas.openxmlformats.org/officeDocument/2006/math">
+                    <m:oMathParaPr>
+                      <m:jc m:val="centerGroup"/>
+                    </m:oMathParaPr>
+                    <m:oMath xmlns:m="http://schemas.openxmlformats.org/officeDocument/2006/math">
+                      <m:r>
+                        <a:rPr lang="en-US" sz="2000" i="1" smtClean="0">
+                          <a:latin typeface="Cambria Math" panose="02040503050406030204" pitchFamily="18" charset="0"/>
+                          <a:ea typeface="Cambria Math" panose="02040503050406030204" pitchFamily="18" charset="0"/>
+                        </a:rPr>
+                        <m:t>𝛼</m:t>
+                      </m:r>
+                    </m:oMath>
+                  </m:oMathPara>
+                </a14:m>
+                <a:endParaRPr lang="en-US" sz="2000" dirty="0"/>
+              </a:p>
+            </p:txBody>
+          </p:sp>
+        </mc:Choice>
+        <mc:Fallback>
+          <p:sp>
+            <p:nvSpPr>
+              <p:cNvPr id="99" name="TextBox 98">
+                <a:extLst>
+                  <a:ext uri="{FF2B5EF4-FFF2-40B4-BE49-F238E27FC236}">
+                    <a16:creationId xmlns:a16="http://schemas.microsoft.com/office/drawing/2014/main" id="{7EC8A275-F88E-4F2B-B529-6BA6047003CA}"/>
+                  </a:ext>
+                </a:extLst>
+              </p:cNvPr>
+              <p:cNvSpPr txBox="1">
+                <a:spLocks noRot="1" noChangeAspect="1" noMove="1" noResize="1" noEditPoints="1" noAdjustHandles="1" noChangeArrowheads="1" noChangeShapeType="1" noTextEdit="1"/>
+              </p:cNvSpPr>
+              <p:nvPr/>
+            </p:nvSpPr>
+            <p:spPr>
+              <a:xfrm>
+                <a:off x="9081740" y="3674308"/>
+                <a:ext cx="353020" cy="307777"/>
+              </a:xfrm>
+              <a:prstGeom prst="rect">
+                <a:avLst/>
+              </a:prstGeom>
+              <a:blipFill>
+                <a:blip r:embed="rId19"/>
+                <a:stretch>
+                  <a:fillRect/>
+                </a:stretch>
+              </a:blipFill>
+            </p:spPr>
+            <p:txBody>
+              <a:bodyPr/>
+              <a:lstStyle/>
+              <a:p>
+                <a:r>
+                  <a:rPr lang="en-US">
+                    <a:noFill/>
+                  </a:rPr>
+                  <a:t> </a:t>
+                </a:r>
+              </a:p>
+            </p:txBody>
+          </p:sp>
+        </mc:Fallback>
+      </mc:AlternateContent>
+    </p:spTree>
+    <p:extLst>
+      <p:ext uri="{BB962C8B-B14F-4D97-AF65-F5344CB8AC3E}">
+        <p14:creationId xmlns:p14="http://schemas.microsoft.com/office/powerpoint/2010/main" val="3802869685"/>
       </p:ext>
     </p:extLst>
   </p:cSld>
@@ -34820,6 +38379,858 @@
     <p:extLst>
       <p:ext uri="{BB962C8B-B14F-4D97-AF65-F5344CB8AC3E}">
         <p14:creationId xmlns:p14="http://schemas.microsoft.com/office/powerpoint/2010/main" val="2993760899"/>
+      </p:ext>
+    </p:extLst>
+  </p:cSld>
+  <p:clrMapOvr>
+    <a:masterClrMapping/>
+  </p:clrMapOvr>
+</p:sld>
+</file>
+
+<file path=ppt/slides/slide20.xml><?xml version="1.0" encoding="utf-8"?>
+<p:sld xmlns:a="http://schemas.openxmlformats.org/drawingml/2006/main" xmlns:r="http://schemas.openxmlformats.org/officeDocument/2006/relationships" xmlns:p="http://schemas.openxmlformats.org/presentationml/2006/main">
+  <p:cSld>
+    <p:spTree>
+      <p:nvGrpSpPr>
+        <p:cNvPr id="1" name=""/>
+        <p:cNvGrpSpPr/>
+        <p:nvPr/>
+      </p:nvGrpSpPr>
+      <p:grpSpPr>
+        <a:xfrm>
+          <a:off x="0" y="0"/>
+          <a:ext cx="0" cy="0"/>
+          <a:chOff x="0" y="0"/>
+          <a:chExt cx="0" cy="0"/>
+        </a:xfrm>
+      </p:grpSpPr>
+      <p:sp>
+        <p:nvSpPr>
+          <p:cNvPr id="57" name="Oval 56">
+            <a:extLst>
+              <a:ext uri="{FF2B5EF4-FFF2-40B4-BE49-F238E27FC236}">
+                <a16:creationId xmlns:a16="http://schemas.microsoft.com/office/drawing/2014/main" id="{D271732D-6CCC-46FC-B2E4-05D0ECB00FF5}"/>
+              </a:ext>
+            </a:extLst>
+          </p:cNvPr>
+          <p:cNvSpPr/>
+          <p:nvPr/>
+        </p:nvSpPr>
+        <p:spPr>
+          <a:xfrm>
+            <a:off x="2979098" y="1760664"/>
+            <a:ext cx="3716500" cy="3716500"/>
+          </a:xfrm>
+          <a:prstGeom prst="ellipse">
+            <a:avLst/>
+          </a:prstGeom>
+          <a:noFill/>
+          <a:ln w="22225">
+            <a:solidFill>
+              <a:schemeClr val="tx1"/>
+            </a:solidFill>
+          </a:ln>
+        </p:spPr>
+        <p:style>
+          <a:lnRef idx="2">
+            <a:schemeClr val="accent1">
+              <a:shade val="50000"/>
+            </a:schemeClr>
+          </a:lnRef>
+          <a:fillRef idx="1">
+            <a:schemeClr val="accent1"/>
+          </a:fillRef>
+          <a:effectRef idx="0">
+            <a:schemeClr val="accent1"/>
+          </a:effectRef>
+          <a:fontRef idx="minor">
+            <a:schemeClr val="lt1"/>
+          </a:fontRef>
+        </p:style>
+        <p:txBody>
+          <a:bodyPr rtlCol="0" anchor="ctr"/>
+          <a:lstStyle/>
+          <a:p>
+            <a:pPr algn="ctr"/>
+            <a:endParaRPr lang="en-US"/>
+          </a:p>
+        </p:txBody>
+      </p:sp>
+      <p:cxnSp>
+        <p:nvCxnSpPr>
+          <p:cNvPr id="58" name="Straight Arrow Connector 57">
+            <a:extLst>
+              <a:ext uri="{FF2B5EF4-FFF2-40B4-BE49-F238E27FC236}">
+                <a16:creationId xmlns:a16="http://schemas.microsoft.com/office/drawing/2014/main" id="{6DF46B02-ED21-4C58-A1EB-B340674F6555}"/>
+              </a:ext>
+            </a:extLst>
+          </p:cNvPr>
+          <p:cNvCxnSpPr>
+            <a:cxnSpLocks/>
+          </p:cNvCxnSpPr>
+          <p:nvPr/>
+        </p:nvCxnSpPr>
+        <p:spPr>
+          <a:xfrm>
+            <a:off x="5236664" y="3593903"/>
+            <a:ext cx="0" cy="679012"/>
+          </a:xfrm>
+          <a:prstGeom prst="straightConnector1">
+            <a:avLst/>
+          </a:prstGeom>
+          <a:ln w="9525">
+            <a:solidFill>
+              <a:schemeClr val="tx1"/>
+            </a:solidFill>
+            <a:prstDash val="dash"/>
+            <a:headEnd type="none" w="lg" len="lg"/>
+            <a:tailEnd type="none" w="lg" len="lg"/>
+          </a:ln>
+        </p:spPr>
+        <p:style>
+          <a:lnRef idx="1">
+            <a:schemeClr val="accent1"/>
+          </a:lnRef>
+          <a:fillRef idx="0">
+            <a:schemeClr val="accent1"/>
+          </a:fillRef>
+          <a:effectRef idx="0">
+            <a:schemeClr val="accent1"/>
+          </a:effectRef>
+          <a:fontRef idx="minor">
+            <a:schemeClr val="tx1"/>
+          </a:fontRef>
+        </p:style>
+      </p:cxnSp>
+      <p:sp>
+        <p:nvSpPr>
+          <p:cNvPr id="59" name="Oval 58">
+            <a:extLst>
+              <a:ext uri="{FF2B5EF4-FFF2-40B4-BE49-F238E27FC236}">
+                <a16:creationId xmlns:a16="http://schemas.microsoft.com/office/drawing/2014/main" id="{7BFD5947-D112-4332-A105-1B0B385469E2}"/>
+              </a:ext>
+            </a:extLst>
+          </p:cNvPr>
+          <p:cNvSpPr/>
+          <p:nvPr/>
+        </p:nvSpPr>
+        <p:spPr>
+          <a:xfrm flipH="1">
+            <a:off x="5767277" y="3429000"/>
+            <a:ext cx="322143" cy="336433"/>
+          </a:xfrm>
+          <a:prstGeom prst="ellipse">
+            <a:avLst/>
+          </a:prstGeom>
+          <a:gradFill flip="none" rotWithShape="1">
+            <a:gsLst>
+              <a:gs pos="0">
+                <a:schemeClr val="accent1">
+                  <a:lumMod val="89000"/>
+                </a:schemeClr>
+              </a:gs>
+              <a:gs pos="23000">
+                <a:schemeClr val="accent1">
+                  <a:lumMod val="89000"/>
+                </a:schemeClr>
+              </a:gs>
+              <a:gs pos="69000">
+                <a:schemeClr val="accent1">
+                  <a:lumMod val="75000"/>
+                </a:schemeClr>
+              </a:gs>
+              <a:gs pos="97000">
+                <a:schemeClr val="accent1">
+                  <a:lumMod val="70000"/>
+                </a:schemeClr>
+              </a:gs>
+            </a:gsLst>
+            <a:path path="circle">
+              <a:fillToRect l="50000" t="50000" r="50000" b="50000"/>
+            </a:path>
+            <a:tileRect/>
+          </a:gradFill>
+          <a:ln w="15875">
+            <a:solidFill>
+              <a:schemeClr val="tx1"/>
+            </a:solidFill>
+          </a:ln>
+        </p:spPr>
+        <p:style>
+          <a:lnRef idx="2">
+            <a:schemeClr val="accent1">
+              <a:shade val="50000"/>
+            </a:schemeClr>
+          </a:lnRef>
+          <a:fillRef idx="1">
+            <a:schemeClr val="accent1"/>
+          </a:fillRef>
+          <a:effectRef idx="0">
+            <a:schemeClr val="accent1"/>
+          </a:effectRef>
+          <a:fontRef idx="minor">
+            <a:schemeClr val="lt1"/>
+          </a:fontRef>
+        </p:style>
+        <p:txBody>
+          <a:bodyPr rtlCol="0" anchor="ctr"/>
+          <a:lstStyle/>
+          <a:p>
+            <a:pPr algn="ctr"/>
+            <a:endParaRPr lang="en-US"/>
+          </a:p>
+        </p:txBody>
+      </p:sp>
+      <p:cxnSp>
+        <p:nvCxnSpPr>
+          <p:cNvPr id="63" name="Straight Arrow Connector 62">
+            <a:extLst>
+              <a:ext uri="{FF2B5EF4-FFF2-40B4-BE49-F238E27FC236}">
+                <a16:creationId xmlns:a16="http://schemas.microsoft.com/office/drawing/2014/main" id="{56E94C96-227E-4998-B7A2-8A51A47CBE27}"/>
+              </a:ext>
+            </a:extLst>
+          </p:cNvPr>
+          <p:cNvCxnSpPr>
+            <a:cxnSpLocks/>
+          </p:cNvCxnSpPr>
+          <p:nvPr/>
+        </p:nvCxnSpPr>
+        <p:spPr>
+          <a:xfrm flipH="1">
+            <a:off x="5211952" y="3594533"/>
+            <a:ext cx="555325" cy="0"/>
+          </a:xfrm>
+          <a:prstGeom prst="straightConnector1">
+            <a:avLst/>
+          </a:prstGeom>
+          <a:ln w="31750">
+            <a:solidFill>
+              <a:schemeClr val="tx1"/>
+            </a:solidFill>
+            <a:headEnd type="none" w="lg" len="lg"/>
+            <a:tailEnd type="stealth" w="med" len="lg"/>
+          </a:ln>
+        </p:spPr>
+        <p:style>
+          <a:lnRef idx="1">
+            <a:schemeClr val="accent1"/>
+          </a:lnRef>
+          <a:fillRef idx="0">
+            <a:schemeClr val="accent1"/>
+          </a:fillRef>
+          <a:effectRef idx="0">
+            <a:schemeClr val="accent1"/>
+          </a:effectRef>
+          <a:fontRef idx="minor">
+            <a:schemeClr val="tx1"/>
+          </a:fontRef>
+        </p:style>
+      </p:cxnSp>
+      <p:sp>
+        <p:nvSpPr>
+          <p:cNvPr id="64" name="Oval 63">
+            <a:extLst>
+              <a:ext uri="{FF2B5EF4-FFF2-40B4-BE49-F238E27FC236}">
+                <a16:creationId xmlns:a16="http://schemas.microsoft.com/office/drawing/2014/main" id="{A40F3805-E19F-42E3-81A6-208965F7A026}"/>
+              </a:ext>
+            </a:extLst>
+          </p:cNvPr>
+          <p:cNvSpPr/>
+          <p:nvPr/>
+        </p:nvSpPr>
+        <p:spPr>
+          <a:xfrm flipH="1">
+            <a:off x="4805071" y="3555393"/>
+            <a:ext cx="77023" cy="77023"/>
+          </a:xfrm>
+          <a:prstGeom prst="ellipse">
+            <a:avLst/>
+          </a:prstGeom>
+          <a:solidFill>
+            <a:schemeClr val="tx1"/>
+          </a:solidFill>
+          <a:ln w="28575">
+            <a:solidFill>
+              <a:schemeClr val="tx1"/>
+            </a:solidFill>
+          </a:ln>
+        </p:spPr>
+        <p:style>
+          <a:lnRef idx="2">
+            <a:schemeClr val="accent1">
+              <a:shade val="50000"/>
+            </a:schemeClr>
+          </a:lnRef>
+          <a:fillRef idx="1">
+            <a:schemeClr val="accent1"/>
+          </a:fillRef>
+          <a:effectRef idx="0">
+            <a:schemeClr val="accent1"/>
+          </a:effectRef>
+          <a:fontRef idx="minor">
+            <a:schemeClr val="lt1"/>
+          </a:fontRef>
+        </p:style>
+        <p:txBody>
+          <a:bodyPr rtlCol="0" anchor="ctr"/>
+          <a:lstStyle/>
+          <a:p>
+            <a:pPr algn="ctr"/>
+            <a:endParaRPr lang="en-US"/>
+          </a:p>
+        </p:txBody>
+      </p:sp>
+      <p:cxnSp>
+        <p:nvCxnSpPr>
+          <p:cNvPr id="65" name="Straight Arrow Connector 64">
+            <a:extLst>
+              <a:ext uri="{FF2B5EF4-FFF2-40B4-BE49-F238E27FC236}">
+                <a16:creationId xmlns:a16="http://schemas.microsoft.com/office/drawing/2014/main" id="{75CDD711-9D19-4A21-8F95-FA237DF8D74A}"/>
+              </a:ext>
+            </a:extLst>
+          </p:cNvPr>
+          <p:cNvCxnSpPr>
+            <a:cxnSpLocks/>
+          </p:cNvCxnSpPr>
+          <p:nvPr/>
+        </p:nvCxnSpPr>
+        <p:spPr>
+          <a:xfrm>
+            <a:off x="4882094" y="3593903"/>
+            <a:ext cx="888211" cy="1"/>
+          </a:xfrm>
+          <a:prstGeom prst="straightConnector1">
+            <a:avLst/>
+          </a:prstGeom>
+          <a:ln w="19050">
+            <a:solidFill>
+              <a:schemeClr val="tx1"/>
+            </a:solidFill>
+            <a:prstDash val="solid"/>
+            <a:headEnd type="none" w="lg" len="lg"/>
+            <a:tailEnd type="none" w="lg" len="lg"/>
+          </a:ln>
+        </p:spPr>
+        <p:style>
+          <a:lnRef idx="1">
+            <a:schemeClr val="accent1"/>
+          </a:lnRef>
+          <a:fillRef idx="0">
+            <a:schemeClr val="accent1"/>
+          </a:fillRef>
+          <a:effectRef idx="0">
+            <a:schemeClr val="accent1"/>
+          </a:effectRef>
+          <a:fontRef idx="minor">
+            <a:schemeClr val="tx1"/>
+          </a:fontRef>
+        </p:style>
+      </p:cxnSp>
+      <p:cxnSp>
+        <p:nvCxnSpPr>
+          <p:cNvPr id="70" name="Straight Arrow Connector 69">
+            <a:extLst>
+              <a:ext uri="{FF2B5EF4-FFF2-40B4-BE49-F238E27FC236}">
+                <a16:creationId xmlns:a16="http://schemas.microsoft.com/office/drawing/2014/main" id="{56405A88-C465-47D7-802A-43164EC762E6}"/>
+              </a:ext>
+            </a:extLst>
+          </p:cNvPr>
+          <p:cNvCxnSpPr>
+            <a:cxnSpLocks/>
+            <a:stCxn id="59" idx="5"/>
+          </p:cNvCxnSpPr>
+          <p:nvPr/>
+        </p:nvCxnSpPr>
+        <p:spPr>
+          <a:xfrm flipH="1">
+            <a:off x="5236664" y="3716164"/>
+            <a:ext cx="577790" cy="555558"/>
+          </a:xfrm>
+          <a:prstGeom prst="straightConnector1">
+            <a:avLst/>
+          </a:prstGeom>
+          <a:ln w="31750">
+            <a:solidFill>
+              <a:schemeClr val="tx1"/>
+            </a:solidFill>
+            <a:headEnd type="none" w="lg" len="lg"/>
+            <a:tailEnd type="stealth" w="lg" len="lg"/>
+          </a:ln>
+        </p:spPr>
+        <p:style>
+          <a:lnRef idx="1">
+            <a:schemeClr val="accent1"/>
+          </a:lnRef>
+          <a:fillRef idx="0">
+            <a:schemeClr val="accent1"/>
+          </a:fillRef>
+          <a:effectRef idx="0">
+            <a:schemeClr val="accent1"/>
+          </a:effectRef>
+          <a:fontRef idx="minor">
+            <a:schemeClr val="tx1"/>
+          </a:fontRef>
+        </p:style>
+      </p:cxnSp>
+      <p:cxnSp>
+        <p:nvCxnSpPr>
+          <p:cNvPr id="73" name="Straight Arrow Connector 72">
+            <a:extLst>
+              <a:ext uri="{FF2B5EF4-FFF2-40B4-BE49-F238E27FC236}">
+                <a16:creationId xmlns:a16="http://schemas.microsoft.com/office/drawing/2014/main" id="{3F852167-60E9-4A7B-A997-B486CDF81C3D}"/>
+              </a:ext>
+            </a:extLst>
+          </p:cNvPr>
+          <p:cNvCxnSpPr>
+            <a:cxnSpLocks/>
+          </p:cNvCxnSpPr>
+          <p:nvPr/>
+        </p:nvCxnSpPr>
+        <p:spPr>
+          <a:xfrm>
+            <a:off x="5929190" y="3766626"/>
+            <a:ext cx="0" cy="506289"/>
+          </a:xfrm>
+          <a:prstGeom prst="straightConnector1">
+            <a:avLst/>
+          </a:prstGeom>
+          <a:ln w="31750">
+            <a:solidFill>
+              <a:schemeClr val="tx1"/>
+            </a:solidFill>
+            <a:headEnd type="none" w="lg" len="lg"/>
+            <a:tailEnd type="stealth" w="med" len="lg"/>
+          </a:ln>
+        </p:spPr>
+        <p:style>
+          <a:lnRef idx="1">
+            <a:schemeClr val="accent1"/>
+          </a:lnRef>
+          <a:fillRef idx="0">
+            <a:schemeClr val="accent1"/>
+          </a:fillRef>
+          <a:effectRef idx="0">
+            <a:schemeClr val="accent1"/>
+          </a:effectRef>
+          <a:fontRef idx="minor">
+            <a:schemeClr val="tx1"/>
+          </a:fontRef>
+        </p:style>
+      </p:cxnSp>
+      <p:cxnSp>
+        <p:nvCxnSpPr>
+          <p:cNvPr id="74" name="Straight Arrow Connector 73">
+            <a:extLst>
+              <a:ext uri="{FF2B5EF4-FFF2-40B4-BE49-F238E27FC236}">
+                <a16:creationId xmlns:a16="http://schemas.microsoft.com/office/drawing/2014/main" id="{700ACF02-F341-4B5C-9AC8-34B8E575E1BC}"/>
+              </a:ext>
+            </a:extLst>
+          </p:cNvPr>
+          <p:cNvCxnSpPr>
+            <a:cxnSpLocks/>
+          </p:cNvCxnSpPr>
+          <p:nvPr/>
+        </p:nvCxnSpPr>
+        <p:spPr>
+          <a:xfrm>
+            <a:off x="5236664" y="4272915"/>
+            <a:ext cx="691684" cy="0"/>
+          </a:xfrm>
+          <a:prstGeom prst="straightConnector1">
+            <a:avLst/>
+          </a:prstGeom>
+          <a:ln w="9525">
+            <a:solidFill>
+              <a:schemeClr val="tx1"/>
+            </a:solidFill>
+            <a:prstDash val="dash"/>
+            <a:headEnd type="none" w="lg" len="lg"/>
+            <a:tailEnd type="none" w="lg" len="lg"/>
+          </a:ln>
+        </p:spPr>
+        <p:style>
+          <a:lnRef idx="1">
+            <a:schemeClr val="accent1"/>
+          </a:lnRef>
+          <a:fillRef idx="0">
+            <a:schemeClr val="accent1"/>
+          </a:fillRef>
+          <a:effectRef idx="0">
+            <a:schemeClr val="accent1"/>
+          </a:effectRef>
+          <a:fontRef idx="minor">
+            <a:schemeClr val="tx1"/>
+          </a:fontRef>
+        </p:style>
+      </p:cxnSp>
+      <mc:AlternateContent xmlns:mc="http://schemas.openxmlformats.org/markup-compatibility/2006">
+        <mc:Choice xmlns:a14="http://schemas.microsoft.com/office/drawing/2010/main" Requires="a14">
+          <p:sp>
+            <p:nvSpPr>
+              <p:cNvPr id="82" name="TextBox 81">
+                <a:extLst>
+                  <a:ext uri="{FF2B5EF4-FFF2-40B4-BE49-F238E27FC236}">
+                    <a16:creationId xmlns:a16="http://schemas.microsoft.com/office/drawing/2014/main" id="{E7DBE6A9-2EB4-433F-8326-2119AA1C8EBC}"/>
+                  </a:ext>
+                </a:extLst>
+              </p:cNvPr>
+              <p:cNvSpPr txBox="1"/>
+              <p:nvPr/>
+            </p:nvSpPr>
+            <p:spPr>
+              <a:xfrm>
+                <a:off x="5260879" y="3247614"/>
+                <a:ext cx="336053" cy="307777"/>
+              </a:xfrm>
+              <a:prstGeom prst="rect">
+                <a:avLst/>
+              </a:prstGeom>
+              <a:noFill/>
+            </p:spPr>
+            <p:txBody>
+              <a:bodyPr wrap="none" lIns="0" tIns="0" rIns="0" bIns="0" rtlCol="0">
+                <a:spAutoFit/>
+              </a:bodyPr>
+              <a:lstStyle/>
+              <a:p>
+                <a:pPr/>
+                <a14:m>
+                  <m:oMathPara xmlns:m="http://schemas.openxmlformats.org/officeDocument/2006/math">
+                    <m:oMathParaPr>
+                      <m:jc m:val="centerGroup"/>
+                    </m:oMathParaPr>
+                    <m:oMath xmlns:m="http://schemas.openxmlformats.org/officeDocument/2006/math">
+                      <m:acc>
+                        <m:accPr>
+                          <m:chr m:val="⃗"/>
+                          <m:ctrlPr>
+                            <a:rPr lang="en-US" sz="2000" i="1" smtClean="0">
+                              <a:latin typeface="Cambria Math" panose="02040503050406030204" pitchFamily="18" charset="0"/>
+                            </a:rPr>
+                          </m:ctrlPr>
+                        </m:accPr>
+                        <m:e>
+                          <m:sSub>
+                            <m:sSubPr>
+                              <m:ctrlPr>
+                                <a:rPr lang="en-US" sz="2000" b="0" i="1" smtClean="0">
+                                  <a:latin typeface="Cambria Math" panose="02040503050406030204" pitchFamily="18" charset="0"/>
+                                </a:rPr>
+                              </m:ctrlPr>
+                            </m:sSubPr>
+                            <m:e>
+                              <m:r>
+                                <a:rPr lang="en-US" sz="2000" b="0" i="1" smtClean="0">
+                                  <a:latin typeface="Cambria Math" panose="02040503050406030204" pitchFamily="18" charset="0"/>
+                                </a:rPr>
+                                <m:t>𝑎</m:t>
+                              </m:r>
+                            </m:e>
+                            <m:sub>
+                              <m:r>
+                                <a:rPr lang="en-US" sz="2000" b="0" i="1" smtClean="0">
+                                  <a:latin typeface="Cambria Math" panose="02040503050406030204" pitchFamily="18" charset="0"/>
+                                </a:rPr>
+                                <m:t>𝑛</m:t>
+                              </m:r>
+                            </m:sub>
+                          </m:sSub>
+                        </m:e>
+                      </m:acc>
+                    </m:oMath>
+                  </m:oMathPara>
+                </a14:m>
+                <a:endParaRPr lang="en-US" sz="2000" dirty="0"/>
+              </a:p>
+            </p:txBody>
+          </p:sp>
+        </mc:Choice>
+        <mc:Fallback>
+          <p:sp>
+            <p:nvSpPr>
+              <p:cNvPr id="82" name="TextBox 81">
+                <a:extLst>
+                  <a:ext uri="{FF2B5EF4-FFF2-40B4-BE49-F238E27FC236}">
+                    <a16:creationId xmlns:a16="http://schemas.microsoft.com/office/drawing/2014/main" id="{E7DBE6A9-2EB4-433F-8326-2119AA1C8EBC}"/>
+                  </a:ext>
+                </a:extLst>
+              </p:cNvPr>
+              <p:cNvSpPr txBox="1">
+                <a:spLocks noRot="1" noChangeAspect="1" noMove="1" noResize="1" noEditPoints="1" noAdjustHandles="1" noChangeArrowheads="1" noChangeShapeType="1" noTextEdit="1"/>
+              </p:cNvSpPr>
+              <p:nvPr/>
+            </p:nvSpPr>
+            <p:spPr>
+              <a:xfrm>
+                <a:off x="5260879" y="3247614"/>
+                <a:ext cx="336053" cy="307777"/>
+              </a:xfrm>
+              <a:prstGeom prst="rect">
+                <a:avLst/>
+              </a:prstGeom>
+              <a:blipFill>
+                <a:blip r:embed="rId2"/>
+                <a:stretch>
+                  <a:fillRect l="-9091" r="-1818" b="-12000"/>
+                </a:stretch>
+              </a:blipFill>
+            </p:spPr>
+            <p:txBody>
+              <a:bodyPr/>
+              <a:lstStyle/>
+              <a:p>
+                <a:r>
+                  <a:rPr lang="en-US">
+                    <a:noFill/>
+                  </a:rPr>
+                  <a:t> </a:t>
+                </a:r>
+              </a:p>
+            </p:txBody>
+          </p:sp>
+        </mc:Fallback>
+      </mc:AlternateContent>
+      <mc:AlternateContent xmlns:mc="http://schemas.openxmlformats.org/markup-compatibility/2006">
+        <mc:Choice xmlns:a14="http://schemas.microsoft.com/office/drawing/2010/main" Requires="a14">
+          <p:sp>
+            <p:nvSpPr>
+              <p:cNvPr id="83" name="TextBox 82">
+                <a:extLst>
+                  <a:ext uri="{FF2B5EF4-FFF2-40B4-BE49-F238E27FC236}">
+                    <a16:creationId xmlns:a16="http://schemas.microsoft.com/office/drawing/2014/main" id="{6B4D4B56-A3E5-4737-A05D-8E3E84A48D42}"/>
+                  </a:ext>
+                </a:extLst>
+              </p:cNvPr>
+              <p:cNvSpPr txBox="1"/>
+              <p:nvPr/>
+            </p:nvSpPr>
+            <p:spPr>
+              <a:xfrm>
+                <a:off x="5989254" y="3993943"/>
+                <a:ext cx="309636" cy="307777"/>
+              </a:xfrm>
+              <a:prstGeom prst="rect">
+                <a:avLst/>
+              </a:prstGeom>
+              <a:noFill/>
+            </p:spPr>
+            <p:txBody>
+              <a:bodyPr wrap="none" lIns="0" tIns="0" rIns="0" bIns="0" rtlCol="0">
+                <a:spAutoFit/>
+              </a:bodyPr>
+              <a:lstStyle/>
+              <a:p>
+                <a:pPr/>
+                <a14:m>
+                  <m:oMathPara xmlns:m="http://schemas.openxmlformats.org/officeDocument/2006/math">
+                    <m:oMathParaPr>
+                      <m:jc m:val="centerGroup"/>
+                    </m:oMathParaPr>
+                    <m:oMath xmlns:m="http://schemas.openxmlformats.org/officeDocument/2006/math">
+                      <m:acc>
+                        <m:accPr>
+                          <m:chr m:val="⃗"/>
+                          <m:ctrlPr>
+                            <a:rPr lang="en-US" sz="2000" i="1" smtClean="0">
+                              <a:latin typeface="Cambria Math" panose="02040503050406030204" pitchFamily="18" charset="0"/>
+                            </a:rPr>
+                          </m:ctrlPr>
+                        </m:accPr>
+                        <m:e>
+                          <m:sSub>
+                            <m:sSubPr>
+                              <m:ctrlPr>
+                                <a:rPr lang="en-US" sz="2000" b="0" i="1" smtClean="0">
+                                  <a:latin typeface="Cambria Math" panose="02040503050406030204" pitchFamily="18" charset="0"/>
+                                </a:rPr>
+                              </m:ctrlPr>
+                            </m:sSubPr>
+                            <m:e>
+                              <m:r>
+                                <a:rPr lang="en-US" sz="2000" b="0" i="1" smtClean="0">
+                                  <a:latin typeface="Cambria Math" panose="02040503050406030204" pitchFamily="18" charset="0"/>
+                                </a:rPr>
+                                <m:t>𝑎</m:t>
+                              </m:r>
+                            </m:e>
+                            <m:sub>
+                              <m:r>
+                                <a:rPr lang="ru-RU" sz="2000" i="1">
+                                  <a:latin typeface="Cambria Math" panose="02040503050406030204" pitchFamily="18" charset="0"/>
+                                  <a:ea typeface="Cambria Math" panose="02040503050406030204" pitchFamily="18" charset="0"/>
+                                </a:rPr>
+                                <m:t>𝜏</m:t>
+                              </m:r>
+                            </m:sub>
+                          </m:sSub>
+                        </m:e>
+                      </m:acc>
+                    </m:oMath>
+                  </m:oMathPara>
+                </a14:m>
+                <a:endParaRPr lang="en-US" sz="2000" dirty="0"/>
+              </a:p>
+            </p:txBody>
+          </p:sp>
+        </mc:Choice>
+        <mc:Fallback>
+          <p:sp>
+            <p:nvSpPr>
+              <p:cNvPr id="83" name="TextBox 82">
+                <a:extLst>
+                  <a:ext uri="{FF2B5EF4-FFF2-40B4-BE49-F238E27FC236}">
+                    <a16:creationId xmlns:a16="http://schemas.microsoft.com/office/drawing/2014/main" id="{6B4D4B56-A3E5-4737-A05D-8E3E84A48D42}"/>
+                  </a:ext>
+                </a:extLst>
+              </p:cNvPr>
+              <p:cNvSpPr txBox="1">
+                <a:spLocks noRot="1" noChangeAspect="1" noMove="1" noResize="1" noEditPoints="1" noAdjustHandles="1" noChangeArrowheads="1" noChangeShapeType="1" noTextEdit="1"/>
+              </p:cNvSpPr>
+              <p:nvPr/>
+            </p:nvSpPr>
+            <p:spPr>
+              <a:xfrm>
+                <a:off x="5989254" y="3993943"/>
+                <a:ext cx="309636" cy="307777"/>
+              </a:xfrm>
+              <a:prstGeom prst="rect">
+                <a:avLst/>
+              </a:prstGeom>
+              <a:blipFill>
+                <a:blip r:embed="rId3"/>
+                <a:stretch>
+                  <a:fillRect l="-9804" r="-1961" b="-9804"/>
+                </a:stretch>
+              </a:blipFill>
+            </p:spPr>
+            <p:txBody>
+              <a:bodyPr/>
+              <a:lstStyle/>
+              <a:p>
+                <a:r>
+                  <a:rPr lang="en-US">
+                    <a:noFill/>
+                  </a:rPr>
+                  <a:t> </a:t>
+                </a:r>
+              </a:p>
+            </p:txBody>
+          </p:sp>
+        </mc:Fallback>
+      </mc:AlternateContent>
+      <mc:AlternateContent xmlns:mc="http://schemas.openxmlformats.org/markup-compatibility/2006">
+        <mc:Choice xmlns:a14="http://schemas.microsoft.com/office/drawing/2010/main" Requires="a14">
+          <p:sp>
+            <p:nvSpPr>
+              <p:cNvPr id="84" name="TextBox 83">
+                <a:extLst>
+                  <a:ext uri="{FF2B5EF4-FFF2-40B4-BE49-F238E27FC236}">
+                    <a16:creationId xmlns:a16="http://schemas.microsoft.com/office/drawing/2014/main" id="{2D3C1072-2DBE-47DB-9FF2-8FFAA26DDD88}"/>
+                  </a:ext>
+                </a:extLst>
+              </p:cNvPr>
+              <p:cNvSpPr txBox="1"/>
+              <p:nvPr/>
+            </p:nvSpPr>
+            <p:spPr>
+              <a:xfrm>
+                <a:off x="5242906" y="3824001"/>
+                <a:ext cx="206660" cy="307777"/>
+              </a:xfrm>
+              <a:prstGeom prst="rect">
+                <a:avLst/>
+              </a:prstGeom>
+              <a:noFill/>
+            </p:spPr>
+            <p:txBody>
+              <a:bodyPr wrap="none" lIns="0" tIns="0" rIns="0" bIns="0" rtlCol="0">
+                <a:spAutoFit/>
+              </a:bodyPr>
+              <a:lstStyle/>
+              <a:p>
+                <a:pPr/>
+                <a14:m>
+                  <m:oMathPara xmlns:m="http://schemas.openxmlformats.org/officeDocument/2006/math">
+                    <m:oMathParaPr>
+                      <m:jc m:val="centerGroup"/>
+                    </m:oMathParaPr>
+                    <m:oMath xmlns:m="http://schemas.openxmlformats.org/officeDocument/2006/math">
+                      <m:acc>
+                        <m:accPr>
+                          <m:chr m:val="⃗"/>
+                          <m:ctrlPr>
+                            <a:rPr lang="en-US" sz="2000" i="1" smtClean="0">
+                              <a:latin typeface="Cambria Math" panose="02040503050406030204" pitchFamily="18" charset="0"/>
+                            </a:rPr>
+                          </m:ctrlPr>
+                        </m:accPr>
+                        <m:e>
+                          <m:r>
+                            <a:rPr lang="en-US" sz="2000" b="0" i="1" smtClean="0">
+                              <a:latin typeface="Cambria Math" panose="02040503050406030204" pitchFamily="18" charset="0"/>
+                            </a:rPr>
+                            <m:t>𝑎</m:t>
+                          </m:r>
+                        </m:e>
+                      </m:acc>
+                    </m:oMath>
+                  </m:oMathPara>
+                </a14:m>
+                <a:endParaRPr lang="en-US" sz="2000" dirty="0"/>
+              </a:p>
+            </p:txBody>
+          </p:sp>
+        </mc:Choice>
+        <mc:Fallback>
+          <p:sp>
+            <p:nvSpPr>
+              <p:cNvPr id="84" name="TextBox 83">
+                <a:extLst>
+                  <a:ext uri="{FF2B5EF4-FFF2-40B4-BE49-F238E27FC236}">
+                    <a16:creationId xmlns:a16="http://schemas.microsoft.com/office/drawing/2014/main" id="{2D3C1072-2DBE-47DB-9FF2-8FFAA26DDD88}"/>
+                  </a:ext>
+                </a:extLst>
+              </p:cNvPr>
+              <p:cNvSpPr txBox="1">
+                <a:spLocks noRot="1" noChangeAspect="1" noMove="1" noResize="1" noEditPoints="1" noAdjustHandles="1" noChangeArrowheads="1" noChangeShapeType="1" noTextEdit="1"/>
+              </p:cNvSpPr>
+              <p:nvPr/>
+            </p:nvSpPr>
+            <p:spPr>
+              <a:xfrm>
+                <a:off x="5242906" y="3824001"/>
+                <a:ext cx="206660" cy="307777"/>
+              </a:xfrm>
+              <a:prstGeom prst="rect">
+                <a:avLst/>
+              </a:prstGeom>
+              <a:blipFill>
+                <a:blip r:embed="rId4"/>
+                <a:stretch>
+                  <a:fillRect l="-23529" t="-37255" r="-97059" b="-1961"/>
+                </a:stretch>
+              </a:blipFill>
+            </p:spPr>
+            <p:txBody>
+              <a:bodyPr/>
+              <a:lstStyle/>
+              <a:p>
+                <a:r>
+                  <a:rPr lang="en-US">
+                    <a:noFill/>
+                  </a:rPr>
+                  <a:t> </a:t>
+                </a:r>
+              </a:p>
+            </p:txBody>
+          </p:sp>
+        </mc:Fallback>
+      </mc:AlternateContent>
+    </p:spTree>
+    <p:extLst>
+      <p:ext uri="{BB962C8B-B14F-4D97-AF65-F5344CB8AC3E}">
+        <p14:creationId xmlns:p14="http://schemas.microsoft.com/office/powerpoint/2010/main" val="2312459311"/>
       </p:ext>
     </p:extLst>
   </p:cSld>

</xml_diff>